<commit_message>
Exclude presentation cache file from GIT Add appveyor file
</commit_message>
<xml_diff>
--- a/Presentation/Full Open-Source CI.pptx
+++ b/Presentation/Full Open-Source CI.pptx
@@ -1048,7 +1048,7 @@
           <a:noFill/>
           <a:extLst>
             <a:ext uri="{909E8E84-426E-40dd-AFC4-6F175D3DCCD1}">
-              <a14:hiddenFill xmlns="" xmlns:a14="http://schemas.microsoft.com/office/drawing/2010/main">
+              <a14:hiddenFill xmlns:a14="http://schemas.microsoft.com/office/drawing/2010/main" xmlns="">
                 <a:solidFill>
                   <a:srgbClr val="FFFFFF"/>
                 </a:solidFill>
@@ -1108,7 +1108,7 @@
             </a:ln>
             <a:extLst>
               <a:ext uri="{91240B29-F687-4f45-9708-019B960494DF}">
-                <a14:hiddenLine xmlns="" xmlns:a14="http://schemas.microsoft.com/office/drawing/2010/main" w="9525">
+                <a14:hiddenLine xmlns:a14="http://schemas.microsoft.com/office/drawing/2010/main" xmlns="" w="9525">
                   <a:solidFill>
                     <a:srgbClr val="000000"/>
                   </a:solidFill>
@@ -1198,7 +1198,7 @@
             </a:ln>
             <a:extLst>
               <a:ext uri="{91240B29-F687-4f45-9708-019B960494DF}">
-                <a14:hiddenLine xmlns="" xmlns:a14="http://schemas.microsoft.com/office/drawing/2010/main" w="9525">
+                <a14:hiddenLine xmlns:a14="http://schemas.microsoft.com/office/drawing/2010/main" xmlns="" w="9525">
                   <a:solidFill>
                     <a:srgbClr val="000000"/>
                   </a:solidFill>
@@ -1288,7 +1288,7 @@
             </a:ln>
             <a:extLst>
               <a:ext uri="{91240B29-F687-4f45-9708-019B960494DF}">
-                <a14:hiddenLine xmlns="" xmlns:a14="http://schemas.microsoft.com/office/drawing/2010/main" w="9525">
+                <a14:hiddenLine xmlns:a14="http://schemas.microsoft.com/office/drawing/2010/main" xmlns="" w="9525">
                   <a:solidFill>
                     <a:srgbClr val="000000"/>
                   </a:solidFill>
@@ -1322,7 +1322,7 @@
             </a:ln>
             <a:extLst>
               <a:ext uri="{91240B29-F687-4f45-9708-019B960494DF}">
-                <a14:hiddenLine xmlns="" xmlns:a14="http://schemas.microsoft.com/office/drawing/2010/main" w="9525">
+                <a14:hiddenLine xmlns:a14="http://schemas.microsoft.com/office/drawing/2010/main" xmlns="" w="9525">
                   <a:solidFill>
                     <a:srgbClr val="000000"/>
                   </a:solidFill>
@@ -1412,7 +1412,7 @@
             </a:ln>
             <a:extLst>
               <a:ext uri="{91240B29-F687-4f45-9708-019B960494DF}">
-                <a14:hiddenLine xmlns="" xmlns:a14="http://schemas.microsoft.com/office/drawing/2010/main" w="9525">
+                <a14:hiddenLine xmlns:a14="http://schemas.microsoft.com/office/drawing/2010/main" xmlns="" w="9525">
                   <a:solidFill>
                     <a:srgbClr val="000000"/>
                   </a:solidFill>
@@ -1474,7 +1474,7 @@
             </a:ln>
             <a:extLst>
               <a:ext uri="{91240B29-F687-4f45-9708-019B960494DF}">
-                <a14:hiddenLine xmlns="" xmlns:a14="http://schemas.microsoft.com/office/drawing/2010/main" w="9525">
+                <a14:hiddenLine xmlns:a14="http://schemas.microsoft.com/office/drawing/2010/main" xmlns="" w="9525">
                   <a:solidFill>
                     <a:srgbClr val="000000"/>
                   </a:solidFill>
@@ -1536,7 +1536,7 @@
             </a:ln>
             <a:extLst>
               <a:ext uri="{91240B29-F687-4f45-9708-019B960494DF}">
-                <a14:hiddenLine xmlns="" xmlns:a14="http://schemas.microsoft.com/office/drawing/2010/main" w="9525">
+                <a14:hiddenLine xmlns:a14="http://schemas.microsoft.com/office/drawing/2010/main" xmlns="" w="9525">
                   <a:solidFill>
                     <a:srgbClr val="000000"/>
                   </a:solidFill>
@@ -1626,7 +1626,7 @@
             </a:ln>
             <a:extLst>
               <a:ext uri="{91240B29-F687-4f45-9708-019B960494DF}">
-                <a14:hiddenLine xmlns="" xmlns:a14="http://schemas.microsoft.com/office/drawing/2010/main" w="9525">
+                <a14:hiddenLine xmlns:a14="http://schemas.microsoft.com/office/drawing/2010/main" xmlns="" w="9525">
                   <a:solidFill>
                     <a:srgbClr val="000000"/>
                   </a:solidFill>
@@ -1688,7 +1688,7 @@
             </a:ln>
             <a:extLst>
               <a:ext uri="{91240B29-F687-4f45-9708-019B960494DF}">
-                <a14:hiddenLine xmlns="" xmlns:a14="http://schemas.microsoft.com/office/drawing/2010/main" w="9525">
+                <a14:hiddenLine xmlns:a14="http://schemas.microsoft.com/office/drawing/2010/main" xmlns="" w="9525">
                   <a:solidFill>
                     <a:srgbClr val="000000"/>
                   </a:solidFill>
@@ -1750,7 +1750,7 @@
             </a:ln>
             <a:extLst>
               <a:ext uri="{91240B29-F687-4f45-9708-019B960494DF}">
-                <a14:hiddenLine xmlns="" xmlns:a14="http://schemas.microsoft.com/office/drawing/2010/main" w="9525">
+                <a14:hiddenLine xmlns:a14="http://schemas.microsoft.com/office/drawing/2010/main" xmlns="" w="9525">
                   <a:solidFill>
                     <a:srgbClr val="000000"/>
                   </a:solidFill>
@@ -1840,7 +1840,7 @@
             </a:ln>
             <a:extLst>
               <a:ext uri="{91240B29-F687-4f45-9708-019B960494DF}">
-                <a14:hiddenLine xmlns="" xmlns:a14="http://schemas.microsoft.com/office/drawing/2010/main" w="9525">
+                <a14:hiddenLine xmlns:a14="http://schemas.microsoft.com/office/drawing/2010/main" xmlns="" w="9525">
                   <a:solidFill>
                     <a:srgbClr val="000000"/>
                   </a:solidFill>
@@ -1930,7 +1930,7 @@
             </a:ln>
             <a:extLst>
               <a:ext uri="{91240B29-F687-4f45-9708-019B960494DF}">
-                <a14:hiddenLine xmlns="" xmlns:a14="http://schemas.microsoft.com/office/drawing/2010/main" w="9525">
+                <a14:hiddenLine xmlns:a14="http://schemas.microsoft.com/office/drawing/2010/main" xmlns="" w="9525">
                   <a:solidFill>
                     <a:srgbClr val="000000"/>
                   </a:solidFill>
@@ -1992,7 +1992,7 @@
             </a:ln>
             <a:extLst>
               <a:ext uri="{91240B29-F687-4f45-9708-019B960494DF}">
-                <a14:hiddenLine xmlns="" xmlns:a14="http://schemas.microsoft.com/office/drawing/2010/main" w="9525">
+                <a14:hiddenLine xmlns:a14="http://schemas.microsoft.com/office/drawing/2010/main" xmlns="" w="9525">
                   <a:solidFill>
                     <a:srgbClr val="000000"/>
                   </a:solidFill>
@@ -2102,7 +2102,7 @@
             </a:ln>
             <a:extLst>
               <a:ext uri="{91240B29-F687-4f45-9708-019B960494DF}">
-                <a14:hiddenLine xmlns="" xmlns:a14="http://schemas.microsoft.com/office/drawing/2010/main" w="9525">
+                <a14:hiddenLine xmlns:a14="http://schemas.microsoft.com/office/drawing/2010/main" xmlns="" w="9525">
                   <a:solidFill>
                     <a:srgbClr val="000000"/>
                   </a:solidFill>
@@ -2164,7 +2164,7 @@
             </a:ln>
             <a:extLst>
               <a:ext uri="{91240B29-F687-4f45-9708-019B960494DF}">
-                <a14:hiddenLine xmlns="" xmlns:a14="http://schemas.microsoft.com/office/drawing/2010/main" w="9525">
+                <a14:hiddenLine xmlns:a14="http://schemas.microsoft.com/office/drawing/2010/main" xmlns="" w="9525">
                   <a:solidFill>
                     <a:srgbClr val="000000"/>
                   </a:solidFill>
@@ -2254,7 +2254,7 @@
             </a:ln>
             <a:extLst>
               <a:ext uri="{91240B29-F687-4f45-9708-019B960494DF}">
-                <a14:hiddenLine xmlns="" xmlns:a14="http://schemas.microsoft.com/office/drawing/2010/main" w="9525">
+                <a14:hiddenLine xmlns:a14="http://schemas.microsoft.com/office/drawing/2010/main" xmlns="" w="9525">
                   <a:solidFill>
                     <a:srgbClr val="000000"/>
                   </a:solidFill>
@@ -2344,7 +2344,7 @@
             </a:ln>
             <a:extLst>
               <a:ext uri="{91240B29-F687-4f45-9708-019B960494DF}">
-                <a14:hiddenLine xmlns="" xmlns:a14="http://schemas.microsoft.com/office/drawing/2010/main" w="9525">
+                <a14:hiddenLine xmlns:a14="http://schemas.microsoft.com/office/drawing/2010/main" xmlns="" w="9525">
                   <a:solidFill>
                     <a:srgbClr val="000000"/>
                   </a:solidFill>
@@ -2406,7 +2406,7 @@
             </a:ln>
             <a:extLst>
               <a:ext uri="{91240B29-F687-4f45-9708-019B960494DF}">
-                <a14:hiddenLine xmlns="" xmlns:a14="http://schemas.microsoft.com/office/drawing/2010/main" w="9525">
+                <a14:hiddenLine xmlns:a14="http://schemas.microsoft.com/office/drawing/2010/main" xmlns="" w="9525">
                   <a:solidFill>
                     <a:srgbClr val="000000"/>
                   </a:solidFill>
@@ -2496,7 +2496,7 @@
             </a:ln>
             <a:extLst>
               <a:ext uri="{91240B29-F687-4f45-9708-019B960494DF}">
-                <a14:hiddenLine xmlns="" xmlns:a14="http://schemas.microsoft.com/office/drawing/2010/main" w="9525">
+                <a14:hiddenLine xmlns:a14="http://schemas.microsoft.com/office/drawing/2010/main" xmlns="" w="9525">
                   <a:solidFill>
                     <a:srgbClr val="000000"/>
                   </a:solidFill>
@@ -2586,7 +2586,7 @@
             </a:ln>
             <a:extLst>
               <a:ext uri="{91240B29-F687-4f45-9708-019B960494DF}">
-                <a14:hiddenLine xmlns="" xmlns:a14="http://schemas.microsoft.com/office/drawing/2010/main" w="9525">
+                <a14:hiddenLine xmlns:a14="http://schemas.microsoft.com/office/drawing/2010/main" xmlns="" w="9525">
                   <a:solidFill>
                     <a:srgbClr val="000000"/>
                   </a:solidFill>
@@ -2642,7 +2642,7 @@
             </a:ln>
             <a:extLst>
               <a:ext uri="{91240B29-F687-4f45-9708-019B960494DF}">
-                <a14:hiddenLine xmlns="" xmlns:a14="http://schemas.microsoft.com/office/drawing/2010/main" w="9525">
+                <a14:hiddenLine xmlns:a14="http://schemas.microsoft.com/office/drawing/2010/main" xmlns="" w="9525">
                   <a:solidFill>
                     <a:srgbClr val="000000"/>
                   </a:solidFill>
@@ -2732,7 +2732,7 @@
             </a:ln>
             <a:extLst>
               <a:ext uri="{91240B29-F687-4f45-9708-019B960494DF}">
-                <a14:hiddenLine xmlns="" xmlns:a14="http://schemas.microsoft.com/office/drawing/2010/main" w="9525">
+                <a14:hiddenLine xmlns:a14="http://schemas.microsoft.com/office/drawing/2010/main" xmlns="" w="9525">
                   <a:solidFill>
                     <a:srgbClr val="000000"/>
                   </a:solidFill>
@@ -2788,7 +2788,7 @@
             </a:ln>
             <a:extLst>
               <a:ext uri="{91240B29-F687-4f45-9708-019B960494DF}">
-                <a14:hiddenLine xmlns="" xmlns:a14="http://schemas.microsoft.com/office/drawing/2010/main" w="9525">
+                <a14:hiddenLine xmlns:a14="http://schemas.microsoft.com/office/drawing/2010/main" xmlns="" w="9525">
                   <a:solidFill>
                     <a:srgbClr val="000000"/>
                   </a:solidFill>
@@ -2878,7 +2878,7 @@
             </a:ln>
             <a:extLst>
               <a:ext uri="{91240B29-F687-4f45-9708-019B960494DF}">
-                <a14:hiddenLine xmlns="" xmlns:a14="http://schemas.microsoft.com/office/drawing/2010/main" w="9525">
+                <a14:hiddenLine xmlns:a14="http://schemas.microsoft.com/office/drawing/2010/main" xmlns="" w="9525">
                   <a:solidFill>
                     <a:srgbClr val="000000"/>
                   </a:solidFill>
@@ -2946,7 +2946,7 @@
             </a:ln>
             <a:extLst>
               <a:ext uri="{91240B29-F687-4f45-9708-019B960494DF}">
-                <a14:hiddenLine xmlns="" xmlns:a14="http://schemas.microsoft.com/office/drawing/2010/main" w="9525">
+                <a14:hiddenLine xmlns:a14="http://schemas.microsoft.com/office/drawing/2010/main" xmlns="" w="9525">
                   <a:solidFill>
                     <a:srgbClr val="000000"/>
                   </a:solidFill>
@@ -3036,7 +3036,7 @@
             </a:ln>
             <a:extLst>
               <a:ext uri="{91240B29-F687-4f45-9708-019B960494DF}">
-                <a14:hiddenLine xmlns="" xmlns:a14="http://schemas.microsoft.com/office/drawing/2010/main" w="9525">
+                <a14:hiddenLine xmlns:a14="http://schemas.microsoft.com/office/drawing/2010/main" xmlns="" w="9525">
                   <a:solidFill>
                     <a:srgbClr val="000000"/>
                   </a:solidFill>
@@ -3104,7 +3104,7 @@
             </a:ln>
             <a:extLst>
               <a:ext uri="{91240B29-F687-4f45-9708-019B960494DF}">
-                <a14:hiddenLine xmlns="" xmlns:a14="http://schemas.microsoft.com/office/drawing/2010/main" w="9525">
+                <a14:hiddenLine xmlns:a14="http://schemas.microsoft.com/office/drawing/2010/main" xmlns="" w="9525">
                   <a:solidFill>
                     <a:srgbClr val="000000"/>
                   </a:solidFill>
@@ -3194,7 +3194,7 @@
             </a:ln>
             <a:extLst>
               <a:ext uri="{91240B29-F687-4f45-9708-019B960494DF}">
-                <a14:hiddenLine xmlns="" xmlns:a14="http://schemas.microsoft.com/office/drawing/2010/main" w="9525">
+                <a14:hiddenLine xmlns:a14="http://schemas.microsoft.com/office/drawing/2010/main" xmlns="" w="9525">
                   <a:solidFill>
                     <a:srgbClr val="000000"/>
                   </a:solidFill>
@@ -3228,7 +3228,7 @@
             </a:ln>
             <a:extLst>
               <a:ext uri="{91240B29-F687-4f45-9708-019B960494DF}">
-                <a14:hiddenLine xmlns="" xmlns:a14="http://schemas.microsoft.com/office/drawing/2010/main" w="9525">
+                <a14:hiddenLine xmlns:a14="http://schemas.microsoft.com/office/drawing/2010/main" xmlns="" w="9525">
                   <a:solidFill>
                     <a:srgbClr val="000000"/>
                   </a:solidFill>
@@ -3318,7 +3318,7 @@
             </a:ln>
             <a:extLst>
               <a:ext uri="{91240B29-F687-4f45-9708-019B960494DF}">
-                <a14:hiddenLine xmlns="" xmlns:a14="http://schemas.microsoft.com/office/drawing/2010/main" w="9525">
+                <a14:hiddenLine xmlns:a14="http://schemas.microsoft.com/office/drawing/2010/main" xmlns="" w="9525">
                   <a:solidFill>
                     <a:srgbClr val="000000"/>
                   </a:solidFill>
@@ -3380,7 +3380,7 @@
             </a:ln>
             <a:extLst>
               <a:ext uri="{91240B29-F687-4f45-9708-019B960494DF}">
-                <a14:hiddenLine xmlns="" xmlns:a14="http://schemas.microsoft.com/office/drawing/2010/main" w="9525">
+                <a14:hiddenLine xmlns:a14="http://schemas.microsoft.com/office/drawing/2010/main" xmlns="" w="9525">
                   <a:solidFill>
                     <a:srgbClr val="000000"/>
                   </a:solidFill>
@@ -3442,7 +3442,7 @@
             </a:ln>
             <a:extLst>
               <a:ext uri="{91240B29-F687-4f45-9708-019B960494DF}">
-                <a14:hiddenLine xmlns="" xmlns:a14="http://schemas.microsoft.com/office/drawing/2010/main" w="9525">
+                <a14:hiddenLine xmlns:a14="http://schemas.microsoft.com/office/drawing/2010/main" xmlns="" w="9525">
                   <a:solidFill>
                     <a:srgbClr val="000000"/>
                   </a:solidFill>
@@ -3532,7 +3532,7 @@
             </a:ln>
             <a:extLst>
               <a:ext uri="{91240B29-F687-4f45-9708-019B960494DF}">
-                <a14:hiddenLine xmlns="" xmlns:a14="http://schemas.microsoft.com/office/drawing/2010/main" w="9525">
+                <a14:hiddenLine xmlns:a14="http://schemas.microsoft.com/office/drawing/2010/main" xmlns="" w="9525">
                   <a:solidFill>
                     <a:srgbClr val="000000"/>
                   </a:solidFill>
@@ -3600,7 +3600,7 @@
             </a:ln>
             <a:extLst>
               <a:ext uri="{91240B29-F687-4f45-9708-019B960494DF}">
-                <a14:hiddenLine xmlns="" xmlns:a14="http://schemas.microsoft.com/office/drawing/2010/main" w="9525">
+                <a14:hiddenLine xmlns:a14="http://schemas.microsoft.com/office/drawing/2010/main" xmlns="" w="9525">
                   <a:solidFill>
                     <a:srgbClr val="000000"/>
                   </a:solidFill>
@@ -3662,7 +3662,7 @@
             </a:ln>
             <a:extLst>
               <a:ext uri="{91240B29-F687-4f45-9708-019B960494DF}">
-                <a14:hiddenLine xmlns="" xmlns:a14="http://schemas.microsoft.com/office/drawing/2010/main" w="9525">
+                <a14:hiddenLine xmlns:a14="http://schemas.microsoft.com/office/drawing/2010/main" xmlns="" w="9525">
                   <a:solidFill>
                     <a:srgbClr val="000000"/>
                   </a:solidFill>
@@ -3752,7 +3752,7 @@
             </a:ln>
             <a:extLst>
               <a:ext uri="{91240B29-F687-4f45-9708-019B960494DF}">
-                <a14:hiddenLine xmlns="" xmlns:a14="http://schemas.microsoft.com/office/drawing/2010/main" w="9525">
+                <a14:hiddenLine xmlns:a14="http://schemas.microsoft.com/office/drawing/2010/main" xmlns="" w="9525">
                   <a:solidFill>
                     <a:srgbClr val="000000"/>
                   </a:solidFill>
@@ -3814,7 +3814,7 @@
             </a:ln>
             <a:extLst>
               <a:ext uri="{91240B29-F687-4f45-9708-019B960494DF}">
-                <a14:hiddenLine xmlns="" xmlns:a14="http://schemas.microsoft.com/office/drawing/2010/main" w="9525">
+                <a14:hiddenLine xmlns:a14="http://schemas.microsoft.com/office/drawing/2010/main" xmlns="" w="9525">
                   <a:solidFill>
                     <a:srgbClr val="000000"/>
                   </a:solidFill>
@@ -3904,7 +3904,7 @@
             </a:ln>
             <a:extLst>
               <a:ext uri="{91240B29-F687-4f45-9708-019B960494DF}">
-                <a14:hiddenLine xmlns="" xmlns:a14="http://schemas.microsoft.com/office/drawing/2010/main" w="9525">
+                <a14:hiddenLine xmlns:a14="http://schemas.microsoft.com/office/drawing/2010/main" xmlns="" w="9525">
                   <a:solidFill>
                     <a:srgbClr val="000000"/>
                   </a:solidFill>
@@ -3966,7 +3966,7 @@
             </a:ln>
             <a:extLst>
               <a:ext uri="{91240B29-F687-4f45-9708-019B960494DF}">
-                <a14:hiddenLine xmlns="" xmlns:a14="http://schemas.microsoft.com/office/drawing/2010/main" w="9525">
+                <a14:hiddenLine xmlns:a14="http://schemas.microsoft.com/office/drawing/2010/main" xmlns="" w="9525">
                   <a:solidFill>
                     <a:srgbClr val="000000"/>
                   </a:solidFill>
@@ -4056,7 +4056,7 @@
             </a:ln>
             <a:extLst>
               <a:ext uri="{91240B29-F687-4f45-9708-019B960494DF}">
-                <a14:hiddenLine xmlns="" xmlns:a14="http://schemas.microsoft.com/office/drawing/2010/main" w="9525">
+                <a14:hiddenLine xmlns:a14="http://schemas.microsoft.com/office/drawing/2010/main" xmlns="" w="9525">
                   <a:solidFill>
                     <a:srgbClr val="000000"/>
                   </a:solidFill>
@@ -4090,7 +4090,7 @@
             </a:ln>
             <a:extLst>
               <a:ext uri="{91240B29-F687-4f45-9708-019B960494DF}">
-                <a14:hiddenLine xmlns="" xmlns:a14="http://schemas.microsoft.com/office/drawing/2010/main" w="9525">
+                <a14:hiddenLine xmlns:a14="http://schemas.microsoft.com/office/drawing/2010/main" xmlns="" w="9525">
                   <a:solidFill>
                     <a:srgbClr val="000000"/>
                   </a:solidFill>
@@ -4155,7 +4155,7 @@
             </a:ln>
             <a:extLst>
               <a:ext uri="{91240B29-F687-4f45-9708-019B960494DF}">
-                <a14:hiddenLine xmlns="" xmlns:a14="http://schemas.microsoft.com/office/drawing/2010/main" w="9525">
+                <a14:hiddenLine xmlns:a14="http://schemas.microsoft.com/office/drawing/2010/main" xmlns="" w="9525">
                   <a:solidFill>
                     <a:srgbClr val="000000"/>
                   </a:solidFill>
@@ -4245,7 +4245,7 @@
             </a:ln>
             <a:extLst>
               <a:ext uri="{91240B29-F687-4f45-9708-019B960494DF}">
-                <a14:hiddenLine xmlns="" xmlns:a14="http://schemas.microsoft.com/office/drawing/2010/main" w="9525">
+                <a14:hiddenLine xmlns:a14="http://schemas.microsoft.com/office/drawing/2010/main" xmlns="" w="9525">
                   <a:solidFill>
                     <a:srgbClr val="000000"/>
                   </a:solidFill>
@@ -4307,7 +4307,7 @@
             </a:ln>
             <a:extLst>
               <a:ext uri="{91240B29-F687-4f45-9708-019B960494DF}">
-                <a14:hiddenLine xmlns="" xmlns:a14="http://schemas.microsoft.com/office/drawing/2010/main" w="9525">
+                <a14:hiddenLine xmlns:a14="http://schemas.microsoft.com/office/drawing/2010/main" xmlns="" w="9525">
                   <a:solidFill>
                     <a:srgbClr val="000000"/>
                   </a:solidFill>
@@ -4397,7 +4397,7 @@
             </a:ln>
             <a:extLst>
               <a:ext uri="{91240B29-F687-4f45-9708-019B960494DF}">
-                <a14:hiddenLine xmlns="" xmlns:a14="http://schemas.microsoft.com/office/drawing/2010/main" w="9525">
+                <a14:hiddenLine xmlns:a14="http://schemas.microsoft.com/office/drawing/2010/main" xmlns="" w="9525">
                   <a:solidFill>
                     <a:srgbClr val="000000"/>
                   </a:solidFill>
@@ -4487,7 +4487,7 @@
             </a:ln>
             <a:extLst>
               <a:ext uri="{91240B29-F687-4f45-9708-019B960494DF}">
-                <a14:hiddenLine xmlns="" xmlns:a14="http://schemas.microsoft.com/office/drawing/2010/main" w="9525">
+                <a14:hiddenLine xmlns:a14="http://schemas.microsoft.com/office/drawing/2010/main" xmlns="" w="9525">
                   <a:solidFill>
                     <a:srgbClr val="000000"/>
                   </a:solidFill>
@@ -4552,7 +4552,7 @@
             </a:ln>
             <a:extLst>
               <a:ext uri="{91240B29-F687-4f45-9708-019B960494DF}">
-                <a14:hiddenLine xmlns="" xmlns:a14="http://schemas.microsoft.com/office/drawing/2010/main" w="9525">
+                <a14:hiddenLine xmlns:a14="http://schemas.microsoft.com/office/drawing/2010/main" xmlns="" w="9525">
                   <a:solidFill>
                     <a:srgbClr val="000000"/>
                   </a:solidFill>
@@ -4614,7 +4614,7 @@
             </a:ln>
             <a:extLst>
               <a:ext uri="{91240B29-F687-4f45-9708-019B960494DF}">
-                <a14:hiddenLine xmlns="" xmlns:a14="http://schemas.microsoft.com/office/drawing/2010/main" w="9525">
+                <a14:hiddenLine xmlns:a14="http://schemas.microsoft.com/office/drawing/2010/main" xmlns="" w="9525">
                   <a:solidFill>
                     <a:srgbClr val="000000"/>
                   </a:solidFill>
@@ -4704,7 +4704,7 @@
             </a:ln>
             <a:extLst>
               <a:ext uri="{91240B29-F687-4f45-9708-019B960494DF}">
-                <a14:hiddenLine xmlns="" xmlns:a14="http://schemas.microsoft.com/office/drawing/2010/main" w="9525">
+                <a14:hiddenLine xmlns:a14="http://schemas.microsoft.com/office/drawing/2010/main" xmlns="" w="9525">
                   <a:solidFill>
                     <a:srgbClr val="000000"/>
                   </a:solidFill>
@@ -4794,7 +4794,7 @@
             </a:ln>
             <a:extLst>
               <a:ext uri="{91240B29-F687-4f45-9708-019B960494DF}">
-                <a14:hiddenLine xmlns="" xmlns:a14="http://schemas.microsoft.com/office/drawing/2010/main" w="9525">
+                <a14:hiddenLine xmlns:a14="http://schemas.microsoft.com/office/drawing/2010/main" xmlns="" w="9525">
                   <a:solidFill>
                     <a:srgbClr val="000000"/>
                   </a:solidFill>
@@ -4856,7 +4856,7 @@
             </a:ln>
             <a:extLst>
               <a:ext uri="{91240B29-F687-4f45-9708-019B960494DF}">
-                <a14:hiddenLine xmlns="" xmlns:a14="http://schemas.microsoft.com/office/drawing/2010/main" w="9525">
+                <a14:hiddenLine xmlns:a14="http://schemas.microsoft.com/office/drawing/2010/main" xmlns="" w="9525">
                   <a:solidFill>
                     <a:srgbClr val="000000"/>
                   </a:solidFill>
@@ -4976,7 +4976,7 @@
             </a:ln>
             <a:extLst>
               <a:ext uri="{91240B29-F687-4f45-9708-019B960494DF}">
-                <a14:hiddenLine xmlns="" xmlns:a14="http://schemas.microsoft.com/office/drawing/2010/main" w="9525">
+                <a14:hiddenLine xmlns:a14="http://schemas.microsoft.com/office/drawing/2010/main" xmlns="" w="9525">
                   <a:solidFill>
                     <a:srgbClr val="000000"/>
                   </a:solidFill>
@@ -5044,7 +5044,7 @@
             </a:ln>
             <a:extLst>
               <a:ext uri="{91240B29-F687-4f45-9708-019B960494DF}">
-                <a14:hiddenLine xmlns="" xmlns:a14="http://schemas.microsoft.com/office/drawing/2010/main" w="9525">
+                <a14:hiddenLine xmlns:a14="http://schemas.microsoft.com/office/drawing/2010/main" xmlns="" w="9525">
                   <a:solidFill>
                     <a:srgbClr val="000000"/>
                   </a:solidFill>
@@ -5134,7 +5134,7 @@
             </a:ln>
             <a:extLst>
               <a:ext uri="{91240B29-F687-4f45-9708-019B960494DF}">
-                <a14:hiddenLine xmlns="" xmlns:a14="http://schemas.microsoft.com/office/drawing/2010/main" w="9525">
+                <a14:hiddenLine xmlns:a14="http://schemas.microsoft.com/office/drawing/2010/main" xmlns="" w="9525">
                   <a:solidFill>
                     <a:srgbClr val="000000"/>
                   </a:solidFill>
@@ -9975,7 +9975,7 @@
           <a:noFill/>
           <a:extLst>
             <a:ext uri="{909E8E84-426E-40dd-AFC4-6F175D3DCCD1}">
-              <a14:hiddenFill xmlns="" xmlns:a14="http://schemas.microsoft.com/office/drawing/2010/main">
+              <a14:hiddenFill xmlns:a14="http://schemas.microsoft.com/office/drawing/2010/main" xmlns="">
                 <a:solidFill>
                   <a:srgbClr val="FFFFFF"/>
                 </a:solidFill>
@@ -10049,7 +10049,7 @@
               </a:ln>
               <a:extLst>
                 <a:ext uri="{91240B29-F687-4f45-9708-019B960494DF}">
-                  <a14:hiddenLine xmlns="" xmlns:a14="http://schemas.microsoft.com/office/drawing/2010/main" w="9525">
+                  <a14:hiddenLine xmlns:a14="http://schemas.microsoft.com/office/drawing/2010/main" xmlns="" w="9525">
                     <a:solidFill>
                       <a:srgbClr val="000000"/>
                     </a:solidFill>
@@ -10139,7 +10139,7 @@
               </a:ln>
               <a:extLst>
                 <a:ext uri="{91240B29-F687-4f45-9708-019B960494DF}">
-                  <a14:hiddenLine xmlns="" xmlns:a14="http://schemas.microsoft.com/office/drawing/2010/main" w="9525">
+                  <a14:hiddenLine xmlns:a14="http://schemas.microsoft.com/office/drawing/2010/main" xmlns="" w="9525">
                     <a:solidFill>
                       <a:srgbClr val="000000"/>
                     </a:solidFill>
@@ -10229,7 +10229,7 @@
               </a:ln>
               <a:extLst>
                 <a:ext uri="{91240B29-F687-4f45-9708-019B960494DF}">
-                  <a14:hiddenLine xmlns="" xmlns:a14="http://schemas.microsoft.com/office/drawing/2010/main" w="9525">
+                  <a14:hiddenLine xmlns:a14="http://schemas.microsoft.com/office/drawing/2010/main" xmlns="" w="9525">
                     <a:solidFill>
                       <a:srgbClr val="000000"/>
                     </a:solidFill>
@@ -10291,7 +10291,7 @@
               </a:ln>
               <a:extLst>
                 <a:ext uri="{91240B29-F687-4f45-9708-019B960494DF}">
-                  <a14:hiddenLine xmlns="" xmlns:a14="http://schemas.microsoft.com/office/drawing/2010/main" w="9525">
+                  <a14:hiddenLine xmlns:a14="http://schemas.microsoft.com/office/drawing/2010/main" xmlns="" w="9525">
                     <a:solidFill>
                       <a:srgbClr val="000000"/>
                     </a:solidFill>
@@ -10381,7 +10381,7 @@
               </a:ln>
               <a:extLst>
                 <a:ext uri="{91240B29-F687-4f45-9708-019B960494DF}">
-                  <a14:hiddenLine xmlns="" xmlns:a14="http://schemas.microsoft.com/office/drawing/2010/main" w="9525">
+                  <a14:hiddenLine xmlns:a14="http://schemas.microsoft.com/office/drawing/2010/main" xmlns="" w="9525">
                     <a:solidFill>
                       <a:srgbClr val="000000"/>
                     </a:solidFill>
@@ -10443,7 +10443,7 @@
               </a:ln>
               <a:extLst>
                 <a:ext uri="{91240B29-F687-4f45-9708-019B960494DF}">
-                  <a14:hiddenLine xmlns="" xmlns:a14="http://schemas.microsoft.com/office/drawing/2010/main" w="9525">
+                  <a14:hiddenLine xmlns:a14="http://schemas.microsoft.com/office/drawing/2010/main" xmlns="" w="9525">
                     <a:solidFill>
                       <a:srgbClr val="000000"/>
                     </a:solidFill>
@@ -10505,7 +10505,7 @@
               </a:ln>
               <a:extLst>
                 <a:ext uri="{91240B29-F687-4f45-9708-019B960494DF}">
-                  <a14:hiddenLine xmlns="" xmlns:a14="http://schemas.microsoft.com/office/drawing/2010/main" w="9525">
+                  <a14:hiddenLine xmlns:a14="http://schemas.microsoft.com/office/drawing/2010/main" xmlns="" w="9525">
                     <a:solidFill>
                       <a:srgbClr val="000000"/>
                     </a:solidFill>
@@ -10595,7 +10595,7 @@
               </a:ln>
               <a:extLst>
                 <a:ext uri="{91240B29-F687-4f45-9708-019B960494DF}">
-                  <a14:hiddenLine xmlns="" xmlns:a14="http://schemas.microsoft.com/office/drawing/2010/main" w="9525">
+                  <a14:hiddenLine xmlns:a14="http://schemas.microsoft.com/office/drawing/2010/main" xmlns="" w="9525">
                     <a:solidFill>
                       <a:srgbClr val="000000"/>
                     </a:solidFill>
@@ -10685,7 +10685,7 @@
               </a:ln>
               <a:extLst>
                 <a:ext uri="{91240B29-F687-4f45-9708-019B960494DF}">
-                  <a14:hiddenLine xmlns="" xmlns:a14="http://schemas.microsoft.com/office/drawing/2010/main" w="9525">
+                  <a14:hiddenLine xmlns:a14="http://schemas.microsoft.com/office/drawing/2010/main" xmlns="" w="9525">
                     <a:solidFill>
                       <a:srgbClr val="000000"/>
                     </a:solidFill>
@@ -10747,7 +10747,7 @@
               </a:ln>
               <a:extLst>
                 <a:ext uri="{91240B29-F687-4f45-9708-019B960494DF}">
-                  <a14:hiddenLine xmlns="" xmlns:a14="http://schemas.microsoft.com/office/drawing/2010/main" w="9525">
+                  <a14:hiddenLine xmlns:a14="http://schemas.microsoft.com/office/drawing/2010/main" xmlns="" w="9525">
                     <a:solidFill>
                       <a:srgbClr val="000000"/>
                     </a:solidFill>
@@ -10857,7 +10857,7 @@
               </a:ln>
               <a:extLst>
                 <a:ext uri="{91240B29-F687-4f45-9708-019B960494DF}">
-                  <a14:hiddenLine xmlns="" xmlns:a14="http://schemas.microsoft.com/office/drawing/2010/main" w="9525">
+                  <a14:hiddenLine xmlns:a14="http://schemas.microsoft.com/office/drawing/2010/main" xmlns="" w="9525">
                     <a:solidFill>
                       <a:srgbClr val="000000"/>
                     </a:solidFill>
@@ -10941,7 +10941,7 @@
               </a:ln>
               <a:extLst>
                 <a:ext uri="{91240B29-F687-4f45-9708-019B960494DF}">
-                  <a14:hiddenLine xmlns="" xmlns:a14="http://schemas.microsoft.com/office/drawing/2010/main" w="9525">
+                  <a14:hiddenLine xmlns:a14="http://schemas.microsoft.com/office/drawing/2010/main" xmlns="" w="9525">
                     <a:solidFill>
                       <a:srgbClr val="000000"/>
                     </a:solidFill>
@@ -11003,7 +11003,7 @@
               </a:ln>
               <a:extLst>
                 <a:ext uri="{91240B29-F687-4f45-9708-019B960494DF}">
-                  <a14:hiddenLine xmlns="" xmlns:a14="http://schemas.microsoft.com/office/drawing/2010/main" w="9525">
+                  <a14:hiddenLine xmlns:a14="http://schemas.microsoft.com/office/drawing/2010/main" xmlns="" w="9525">
                     <a:solidFill>
                       <a:srgbClr val="000000"/>
                     </a:solidFill>
@@ -11065,7 +11065,7 @@
               </a:ln>
               <a:extLst>
                 <a:ext uri="{91240B29-F687-4f45-9708-019B960494DF}">
-                  <a14:hiddenLine xmlns="" xmlns:a14="http://schemas.microsoft.com/office/drawing/2010/main" w="9525">
+                  <a14:hiddenLine xmlns:a14="http://schemas.microsoft.com/office/drawing/2010/main" xmlns="" w="9525">
                     <a:solidFill>
                       <a:srgbClr val="000000"/>
                     </a:solidFill>
@@ -11155,7 +11155,7 @@
               </a:ln>
               <a:extLst>
                 <a:ext uri="{91240B29-F687-4f45-9708-019B960494DF}">
-                  <a14:hiddenLine xmlns="" xmlns:a14="http://schemas.microsoft.com/office/drawing/2010/main" w="9525">
+                  <a14:hiddenLine xmlns:a14="http://schemas.microsoft.com/office/drawing/2010/main" xmlns="" w="9525">
                     <a:solidFill>
                       <a:srgbClr val="000000"/>
                     </a:solidFill>
@@ -11189,7 +11189,7 @@
               </a:ln>
               <a:extLst>
                 <a:ext uri="{91240B29-F687-4f45-9708-019B960494DF}">
-                  <a14:hiddenLine xmlns="" xmlns:a14="http://schemas.microsoft.com/office/drawing/2010/main" w="9525">
+                  <a14:hiddenLine xmlns:a14="http://schemas.microsoft.com/office/drawing/2010/main" xmlns="" w="9525">
                     <a:solidFill>
                       <a:srgbClr val="000000"/>
                     </a:solidFill>
@@ -11254,7 +11254,7 @@
               </a:ln>
               <a:extLst>
                 <a:ext uri="{91240B29-F687-4f45-9708-019B960494DF}">
-                  <a14:hiddenLine xmlns="" xmlns:a14="http://schemas.microsoft.com/office/drawing/2010/main" w="9525">
+                  <a14:hiddenLine xmlns:a14="http://schemas.microsoft.com/office/drawing/2010/main" xmlns="" w="9525">
                     <a:solidFill>
                       <a:srgbClr val="000000"/>
                     </a:solidFill>
@@ -11344,7 +11344,7 @@
               </a:ln>
               <a:extLst>
                 <a:ext uri="{91240B29-F687-4f45-9708-019B960494DF}">
-                  <a14:hiddenLine xmlns="" xmlns:a14="http://schemas.microsoft.com/office/drawing/2010/main" w="9525">
+                  <a14:hiddenLine xmlns:a14="http://schemas.microsoft.com/office/drawing/2010/main" xmlns="" w="9525">
                     <a:solidFill>
                       <a:srgbClr val="000000"/>
                     </a:solidFill>
@@ -11406,7 +11406,7 @@
               </a:ln>
               <a:extLst>
                 <a:ext uri="{91240B29-F687-4f45-9708-019B960494DF}">
-                  <a14:hiddenLine xmlns="" xmlns:a14="http://schemas.microsoft.com/office/drawing/2010/main" w="9525">
+                  <a14:hiddenLine xmlns:a14="http://schemas.microsoft.com/office/drawing/2010/main" xmlns="" w="9525">
                     <a:solidFill>
                       <a:srgbClr val="000000"/>
                     </a:solidFill>
@@ -11496,7 +11496,7 @@
               </a:ln>
               <a:extLst>
                 <a:ext uri="{91240B29-F687-4f45-9708-019B960494DF}">
-                  <a14:hiddenLine xmlns="" xmlns:a14="http://schemas.microsoft.com/office/drawing/2010/main" w="9525">
+                  <a14:hiddenLine xmlns:a14="http://schemas.microsoft.com/office/drawing/2010/main" xmlns="" w="9525">
                     <a:solidFill>
                       <a:srgbClr val="000000"/>
                     </a:solidFill>
@@ -11561,7 +11561,7 @@
               </a:ln>
               <a:extLst>
                 <a:ext uri="{91240B29-F687-4f45-9708-019B960494DF}">
-                  <a14:hiddenLine xmlns="" xmlns:a14="http://schemas.microsoft.com/office/drawing/2010/main" w="9525">
+                  <a14:hiddenLine xmlns:a14="http://schemas.microsoft.com/office/drawing/2010/main" xmlns="" w="9525">
                     <a:solidFill>
                       <a:srgbClr val="000000"/>
                     </a:solidFill>
@@ -11623,7 +11623,7 @@
               </a:ln>
               <a:extLst>
                 <a:ext uri="{91240B29-F687-4f45-9708-019B960494DF}">
-                  <a14:hiddenLine xmlns="" xmlns:a14="http://schemas.microsoft.com/office/drawing/2010/main" w="9525">
+                  <a14:hiddenLine xmlns:a14="http://schemas.microsoft.com/office/drawing/2010/main" xmlns="" w="9525">
                     <a:solidFill>
                       <a:srgbClr val="000000"/>
                     </a:solidFill>
@@ -11713,7 +11713,7 @@
               </a:ln>
               <a:extLst>
                 <a:ext uri="{91240B29-F687-4f45-9708-019B960494DF}">
-                  <a14:hiddenLine xmlns="" xmlns:a14="http://schemas.microsoft.com/office/drawing/2010/main" w="9525">
+                  <a14:hiddenLine xmlns:a14="http://schemas.microsoft.com/office/drawing/2010/main" xmlns="" w="9525">
                     <a:solidFill>
                       <a:srgbClr val="000000"/>
                     </a:solidFill>
@@ -11803,7 +11803,7 @@
               </a:ln>
               <a:extLst>
                 <a:ext uri="{91240B29-F687-4f45-9708-019B960494DF}">
-                  <a14:hiddenLine xmlns="" xmlns:a14="http://schemas.microsoft.com/office/drawing/2010/main" w="9525">
+                  <a14:hiddenLine xmlns:a14="http://schemas.microsoft.com/office/drawing/2010/main" xmlns="" w="9525">
                     <a:solidFill>
                       <a:srgbClr val="000000"/>
                     </a:solidFill>
@@ -11868,7 +11868,7 @@
               </a:ln>
               <a:extLst>
                 <a:ext uri="{91240B29-F687-4f45-9708-019B960494DF}">
-                  <a14:hiddenLine xmlns="" xmlns:a14="http://schemas.microsoft.com/office/drawing/2010/main" w="9525">
+                  <a14:hiddenLine xmlns:a14="http://schemas.microsoft.com/office/drawing/2010/main" xmlns="" w="9525">
                     <a:solidFill>
                       <a:srgbClr val="000000"/>
                     </a:solidFill>
@@ -11988,7 +11988,7 @@
               </a:ln>
               <a:extLst>
                 <a:ext uri="{91240B29-F687-4f45-9708-019B960494DF}">
-                  <a14:hiddenLine xmlns="" xmlns:a14="http://schemas.microsoft.com/office/drawing/2010/main" w="9525">
+                  <a14:hiddenLine xmlns:a14="http://schemas.microsoft.com/office/drawing/2010/main" xmlns="" w="9525">
                     <a:solidFill>
                       <a:srgbClr val="000000"/>
                     </a:solidFill>
@@ -12086,7 +12086,7 @@
               </a:ln>
               <a:extLst>
                 <a:ext uri="{91240B29-F687-4f45-9708-019B960494DF}">
-                  <a14:hiddenLine xmlns="" xmlns:a14="http://schemas.microsoft.com/office/drawing/2010/main" w="9525">
+                  <a14:hiddenLine xmlns:a14="http://schemas.microsoft.com/office/drawing/2010/main" xmlns="" w="9525">
                     <a:solidFill>
                       <a:srgbClr val="000000"/>
                     </a:solidFill>
@@ -12201,7 +12201,7 @@
               </a:ln>
               <a:extLst>
                 <a:ext uri="{91240B29-F687-4f45-9708-019B960494DF}">
-                  <a14:hiddenLine xmlns="" xmlns:a14="http://schemas.microsoft.com/office/drawing/2010/main" w="9525">
+                  <a14:hiddenLine xmlns:a14="http://schemas.microsoft.com/office/drawing/2010/main" xmlns="" w="9525">
                     <a:solidFill>
                       <a:srgbClr val="000000"/>
                     </a:solidFill>
@@ -12291,7 +12291,7 @@
               </a:ln>
               <a:extLst>
                 <a:ext uri="{91240B29-F687-4f45-9708-019B960494DF}">
-                  <a14:hiddenLine xmlns="" xmlns:a14="http://schemas.microsoft.com/office/drawing/2010/main" w="9525">
+                  <a14:hiddenLine xmlns:a14="http://schemas.microsoft.com/office/drawing/2010/main" xmlns="" w="9525">
                     <a:solidFill>
                       <a:srgbClr val="000000"/>
                     </a:solidFill>
@@ -12356,7 +12356,7 @@
               </a:ln>
               <a:extLst>
                 <a:ext uri="{91240B29-F687-4f45-9708-019B960494DF}">
-                  <a14:hiddenLine xmlns="" xmlns:a14="http://schemas.microsoft.com/office/drawing/2010/main" w="9525">
+                  <a14:hiddenLine xmlns:a14="http://schemas.microsoft.com/office/drawing/2010/main" xmlns="" w="9525">
                     <a:solidFill>
                       <a:srgbClr val="000000"/>
                     </a:solidFill>
@@ -12446,7 +12446,7 @@
               </a:ln>
               <a:extLst>
                 <a:ext uri="{91240B29-F687-4f45-9708-019B960494DF}">
-                  <a14:hiddenLine xmlns="" xmlns:a14="http://schemas.microsoft.com/office/drawing/2010/main" w="9525">
+                  <a14:hiddenLine xmlns:a14="http://schemas.microsoft.com/office/drawing/2010/main" xmlns="" w="9525">
                     <a:solidFill>
                       <a:srgbClr val="000000"/>
                     </a:solidFill>
@@ -12514,7 +12514,7 @@
               </a:ln>
               <a:extLst>
                 <a:ext uri="{91240B29-F687-4f45-9708-019B960494DF}">
-                  <a14:hiddenLine xmlns="" xmlns:a14="http://schemas.microsoft.com/office/drawing/2010/main" w="9525">
+                  <a14:hiddenLine xmlns:a14="http://schemas.microsoft.com/office/drawing/2010/main" xmlns="" w="9525">
                     <a:solidFill>
                       <a:srgbClr val="000000"/>
                     </a:solidFill>
@@ -12604,7 +12604,7 @@
               </a:ln>
               <a:extLst>
                 <a:ext uri="{91240B29-F687-4f45-9708-019B960494DF}">
-                  <a14:hiddenLine xmlns="" xmlns:a14="http://schemas.microsoft.com/office/drawing/2010/main" w="9525">
+                  <a14:hiddenLine xmlns:a14="http://schemas.microsoft.com/office/drawing/2010/main" xmlns="" w="9525">
                     <a:solidFill>
                       <a:srgbClr val="000000"/>
                     </a:solidFill>
@@ -12672,7 +12672,7 @@
               </a:ln>
               <a:extLst>
                 <a:ext uri="{91240B29-F687-4f45-9708-019B960494DF}">
-                  <a14:hiddenLine xmlns="" xmlns:a14="http://schemas.microsoft.com/office/drawing/2010/main" w="9525">
+                  <a14:hiddenLine xmlns:a14="http://schemas.microsoft.com/office/drawing/2010/main" xmlns="" w="9525">
                     <a:solidFill>
                       <a:srgbClr val="000000"/>
                     </a:solidFill>
@@ -12762,7 +12762,7 @@
               </a:ln>
               <a:extLst>
                 <a:ext uri="{91240B29-F687-4f45-9708-019B960494DF}">
-                  <a14:hiddenLine xmlns="" xmlns:a14="http://schemas.microsoft.com/office/drawing/2010/main" w="9525">
+                  <a14:hiddenLine xmlns:a14="http://schemas.microsoft.com/office/drawing/2010/main" xmlns="" w="9525">
                     <a:solidFill>
                       <a:srgbClr val="000000"/>
                     </a:solidFill>
@@ -12796,7 +12796,7 @@
               </a:ln>
               <a:extLst>
                 <a:ext uri="{91240B29-F687-4f45-9708-019B960494DF}">
-                  <a14:hiddenLine xmlns="" xmlns:a14="http://schemas.microsoft.com/office/drawing/2010/main" w="9525">
+                  <a14:hiddenLine xmlns:a14="http://schemas.microsoft.com/office/drawing/2010/main" xmlns="" w="9525">
                     <a:solidFill>
                       <a:srgbClr val="000000"/>
                     </a:solidFill>
@@ -14181,7 +14181,9 @@
         </p:nvSpPr>
         <p:spPr/>
         <p:txBody>
-          <a:bodyPr/>
+          <a:bodyPr>
+            <a:normAutofit fontScale="92500" lnSpcReduction="10000"/>
+          </a:bodyPr>
           <a:lstStyle/>
           <a:p>
             <a:r>
@@ -14211,6 +14213,12 @@
             <a:r>
               <a:rPr lang="en-US" dirty="0"/>
               <a:t>Select the GitHub link</a:t>
+            </a:r>
+          </a:p>
+          <a:p>
+            <a:r>
+              <a:rPr lang="en-US" dirty="0"/>
+              <a:t>Authorize GitHub</a:t>
             </a:r>
           </a:p>
           <a:p>

</xml_diff>

<commit_message>
Prepare for typescript building on appveyor (#3)
* Prepare for typescript building on appveyor

Create stage2 folder for client side building.

* Update to build client

* Add unit tests.

* Update 1

* Re-arrange folder structure and merge gitignore

* Update path
</commit_message>
<xml_diff>
--- a/Presentation/Full Open-Source CI.pptx
+++ b/Presentation/Full Open-Source CI.pptx
@@ -16,6 +16,10 @@
     <p:sldId id="263" r:id="rId10"/>
     <p:sldId id="264" r:id="rId11"/>
     <p:sldId id="266" r:id="rId12"/>
+    <p:sldId id="267" r:id="rId13"/>
+    <p:sldId id="268" r:id="rId14"/>
+    <p:sldId id="269" r:id="rId15"/>
+    <p:sldId id="270" r:id="rId16"/>
   </p:sldIdLst>
   <p:sldSz cx="12192000" cy="6858000"/>
   <p:notesSz cx="6858000" cy="9144000"/>
@@ -1048,7 +1052,7 @@
           <a:noFill/>
           <a:extLst>
             <a:ext uri="{909E8E84-426E-40dd-AFC4-6F175D3DCCD1}">
-              <a14:hiddenFill xmlns:a14="http://schemas.microsoft.com/office/drawing/2010/main" xmlns="">
+              <a14:hiddenFill xmlns="" xmlns:a14="http://schemas.microsoft.com/office/drawing/2010/main">
                 <a:solidFill>
                   <a:srgbClr val="FFFFFF"/>
                 </a:solidFill>
@@ -1108,7 +1112,7 @@
             </a:ln>
             <a:extLst>
               <a:ext uri="{91240B29-F687-4f45-9708-019B960494DF}">
-                <a14:hiddenLine xmlns:a14="http://schemas.microsoft.com/office/drawing/2010/main" xmlns="" w="9525">
+                <a14:hiddenLine xmlns="" xmlns:a14="http://schemas.microsoft.com/office/drawing/2010/main" w="9525">
                   <a:solidFill>
                     <a:srgbClr val="000000"/>
                   </a:solidFill>
@@ -1198,7 +1202,7 @@
             </a:ln>
             <a:extLst>
               <a:ext uri="{91240B29-F687-4f45-9708-019B960494DF}">
-                <a14:hiddenLine xmlns:a14="http://schemas.microsoft.com/office/drawing/2010/main" xmlns="" w="9525">
+                <a14:hiddenLine xmlns="" xmlns:a14="http://schemas.microsoft.com/office/drawing/2010/main" w="9525">
                   <a:solidFill>
                     <a:srgbClr val="000000"/>
                   </a:solidFill>
@@ -1288,7 +1292,7 @@
             </a:ln>
             <a:extLst>
               <a:ext uri="{91240B29-F687-4f45-9708-019B960494DF}">
-                <a14:hiddenLine xmlns:a14="http://schemas.microsoft.com/office/drawing/2010/main" xmlns="" w="9525">
+                <a14:hiddenLine xmlns="" xmlns:a14="http://schemas.microsoft.com/office/drawing/2010/main" w="9525">
                   <a:solidFill>
                     <a:srgbClr val="000000"/>
                   </a:solidFill>
@@ -1322,7 +1326,7 @@
             </a:ln>
             <a:extLst>
               <a:ext uri="{91240B29-F687-4f45-9708-019B960494DF}">
-                <a14:hiddenLine xmlns:a14="http://schemas.microsoft.com/office/drawing/2010/main" xmlns="" w="9525">
+                <a14:hiddenLine xmlns="" xmlns:a14="http://schemas.microsoft.com/office/drawing/2010/main" w="9525">
                   <a:solidFill>
                     <a:srgbClr val="000000"/>
                   </a:solidFill>
@@ -1412,7 +1416,7 @@
             </a:ln>
             <a:extLst>
               <a:ext uri="{91240B29-F687-4f45-9708-019B960494DF}">
-                <a14:hiddenLine xmlns:a14="http://schemas.microsoft.com/office/drawing/2010/main" xmlns="" w="9525">
+                <a14:hiddenLine xmlns="" xmlns:a14="http://schemas.microsoft.com/office/drawing/2010/main" w="9525">
                   <a:solidFill>
                     <a:srgbClr val="000000"/>
                   </a:solidFill>
@@ -1474,7 +1478,7 @@
             </a:ln>
             <a:extLst>
               <a:ext uri="{91240B29-F687-4f45-9708-019B960494DF}">
-                <a14:hiddenLine xmlns:a14="http://schemas.microsoft.com/office/drawing/2010/main" xmlns="" w="9525">
+                <a14:hiddenLine xmlns="" xmlns:a14="http://schemas.microsoft.com/office/drawing/2010/main" w="9525">
                   <a:solidFill>
                     <a:srgbClr val="000000"/>
                   </a:solidFill>
@@ -1536,7 +1540,7 @@
             </a:ln>
             <a:extLst>
               <a:ext uri="{91240B29-F687-4f45-9708-019B960494DF}">
-                <a14:hiddenLine xmlns:a14="http://schemas.microsoft.com/office/drawing/2010/main" xmlns="" w="9525">
+                <a14:hiddenLine xmlns="" xmlns:a14="http://schemas.microsoft.com/office/drawing/2010/main" w="9525">
                   <a:solidFill>
                     <a:srgbClr val="000000"/>
                   </a:solidFill>
@@ -1626,7 +1630,7 @@
             </a:ln>
             <a:extLst>
               <a:ext uri="{91240B29-F687-4f45-9708-019B960494DF}">
-                <a14:hiddenLine xmlns:a14="http://schemas.microsoft.com/office/drawing/2010/main" xmlns="" w="9525">
+                <a14:hiddenLine xmlns="" xmlns:a14="http://schemas.microsoft.com/office/drawing/2010/main" w="9525">
                   <a:solidFill>
                     <a:srgbClr val="000000"/>
                   </a:solidFill>
@@ -1688,7 +1692,7 @@
             </a:ln>
             <a:extLst>
               <a:ext uri="{91240B29-F687-4f45-9708-019B960494DF}">
-                <a14:hiddenLine xmlns:a14="http://schemas.microsoft.com/office/drawing/2010/main" xmlns="" w="9525">
+                <a14:hiddenLine xmlns="" xmlns:a14="http://schemas.microsoft.com/office/drawing/2010/main" w="9525">
                   <a:solidFill>
                     <a:srgbClr val="000000"/>
                   </a:solidFill>
@@ -1750,7 +1754,7 @@
             </a:ln>
             <a:extLst>
               <a:ext uri="{91240B29-F687-4f45-9708-019B960494DF}">
-                <a14:hiddenLine xmlns:a14="http://schemas.microsoft.com/office/drawing/2010/main" xmlns="" w="9525">
+                <a14:hiddenLine xmlns="" xmlns:a14="http://schemas.microsoft.com/office/drawing/2010/main" w="9525">
                   <a:solidFill>
                     <a:srgbClr val="000000"/>
                   </a:solidFill>
@@ -1840,7 +1844,7 @@
             </a:ln>
             <a:extLst>
               <a:ext uri="{91240B29-F687-4f45-9708-019B960494DF}">
-                <a14:hiddenLine xmlns:a14="http://schemas.microsoft.com/office/drawing/2010/main" xmlns="" w="9525">
+                <a14:hiddenLine xmlns="" xmlns:a14="http://schemas.microsoft.com/office/drawing/2010/main" w="9525">
                   <a:solidFill>
                     <a:srgbClr val="000000"/>
                   </a:solidFill>
@@ -1930,7 +1934,7 @@
             </a:ln>
             <a:extLst>
               <a:ext uri="{91240B29-F687-4f45-9708-019B960494DF}">
-                <a14:hiddenLine xmlns:a14="http://schemas.microsoft.com/office/drawing/2010/main" xmlns="" w="9525">
+                <a14:hiddenLine xmlns="" xmlns:a14="http://schemas.microsoft.com/office/drawing/2010/main" w="9525">
                   <a:solidFill>
                     <a:srgbClr val="000000"/>
                   </a:solidFill>
@@ -1992,7 +1996,7 @@
             </a:ln>
             <a:extLst>
               <a:ext uri="{91240B29-F687-4f45-9708-019B960494DF}">
-                <a14:hiddenLine xmlns:a14="http://schemas.microsoft.com/office/drawing/2010/main" xmlns="" w="9525">
+                <a14:hiddenLine xmlns="" xmlns:a14="http://schemas.microsoft.com/office/drawing/2010/main" w="9525">
                   <a:solidFill>
                     <a:srgbClr val="000000"/>
                   </a:solidFill>
@@ -2102,7 +2106,7 @@
             </a:ln>
             <a:extLst>
               <a:ext uri="{91240B29-F687-4f45-9708-019B960494DF}">
-                <a14:hiddenLine xmlns:a14="http://schemas.microsoft.com/office/drawing/2010/main" xmlns="" w="9525">
+                <a14:hiddenLine xmlns="" xmlns:a14="http://schemas.microsoft.com/office/drawing/2010/main" w="9525">
                   <a:solidFill>
                     <a:srgbClr val="000000"/>
                   </a:solidFill>
@@ -2164,7 +2168,7 @@
             </a:ln>
             <a:extLst>
               <a:ext uri="{91240B29-F687-4f45-9708-019B960494DF}">
-                <a14:hiddenLine xmlns:a14="http://schemas.microsoft.com/office/drawing/2010/main" xmlns="" w="9525">
+                <a14:hiddenLine xmlns="" xmlns:a14="http://schemas.microsoft.com/office/drawing/2010/main" w="9525">
                   <a:solidFill>
                     <a:srgbClr val="000000"/>
                   </a:solidFill>
@@ -2254,7 +2258,7 @@
             </a:ln>
             <a:extLst>
               <a:ext uri="{91240B29-F687-4f45-9708-019B960494DF}">
-                <a14:hiddenLine xmlns:a14="http://schemas.microsoft.com/office/drawing/2010/main" xmlns="" w="9525">
+                <a14:hiddenLine xmlns="" xmlns:a14="http://schemas.microsoft.com/office/drawing/2010/main" w="9525">
                   <a:solidFill>
                     <a:srgbClr val="000000"/>
                   </a:solidFill>
@@ -2344,7 +2348,7 @@
             </a:ln>
             <a:extLst>
               <a:ext uri="{91240B29-F687-4f45-9708-019B960494DF}">
-                <a14:hiddenLine xmlns:a14="http://schemas.microsoft.com/office/drawing/2010/main" xmlns="" w="9525">
+                <a14:hiddenLine xmlns="" xmlns:a14="http://schemas.microsoft.com/office/drawing/2010/main" w="9525">
                   <a:solidFill>
                     <a:srgbClr val="000000"/>
                   </a:solidFill>
@@ -2406,7 +2410,7 @@
             </a:ln>
             <a:extLst>
               <a:ext uri="{91240B29-F687-4f45-9708-019B960494DF}">
-                <a14:hiddenLine xmlns:a14="http://schemas.microsoft.com/office/drawing/2010/main" xmlns="" w="9525">
+                <a14:hiddenLine xmlns="" xmlns:a14="http://schemas.microsoft.com/office/drawing/2010/main" w="9525">
                   <a:solidFill>
                     <a:srgbClr val="000000"/>
                   </a:solidFill>
@@ -2496,7 +2500,7 @@
             </a:ln>
             <a:extLst>
               <a:ext uri="{91240B29-F687-4f45-9708-019B960494DF}">
-                <a14:hiddenLine xmlns:a14="http://schemas.microsoft.com/office/drawing/2010/main" xmlns="" w="9525">
+                <a14:hiddenLine xmlns="" xmlns:a14="http://schemas.microsoft.com/office/drawing/2010/main" w="9525">
                   <a:solidFill>
                     <a:srgbClr val="000000"/>
                   </a:solidFill>
@@ -2586,7 +2590,7 @@
             </a:ln>
             <a:extLst>
               <a:ext uri="{91240B29-F687-4f45-9708-019B960494DF}">
-                <a14:hiddenLine xmlns:a14="http://schemas.microsoft.com/office/drawing/2010/main" xmlns="" w="9525">
+                <a14:hiddenLine xmlns="" xmlns:a14="http://schemas.microsoft.com/office/drawing/2010/main" w="9525">
                   <a:solidFill>
                     <a:srgbClr val="000000"/>
                   </a:solidFill>
@@ -2642,7 +2646,7 @@
             </a:ln>
             <a:extLst>
               <a:ext uri="{91240B29-F687-4f45-9708-019B960494DF}">
-                <a14:hiddenLine xmlns:a14="http://schemas.microsoft.com/office/drawing/2010/main" xmlns="" w="9525">
+                <a14:hiddenLine xmlns="" xmlns:a14="http://schemas.microsoft.com/office/drawing/2010/main" w="9525">
                   <a:solidFill>
                     <a:srgbClr val="000000"/>
                   </a:solidFill>
@@ -2732,7 +2736,7 @@
             </a:ln>
             <a:extLst>
               <a:ext uri="{91240B29-F687-4f45-9708-019B960494DF}">
-                <a14:hiddenLine xmlns:a14="http://schemas.microsoft.com/office/drawing/2010/main" xmlns="" w="9525">
+                <a14:hiddenLine xmlns="" xmlns:a14="http://schemas.microsoft.com/office/drawing/2010/main" w="9525">
                   <a:solidFill>
                     <a:srgbClr val="000000"/>
                   </a:solidFill>
@@ -2788,7 +2792,7 @@
             </a:ln>
             <a:extLst>
               <a:ext uri="{91240B29-F687-4f45-9708-019B960494DF}">
-                <a14:hiddenLine xmlns:a14="http://schemas.microsoft.com/office/drawing/2010/main" xmlns="" w="9525">
+                <a14:hiddenLine xmlns="" xmlns:a14="http://schemas.microsoft.com/office/drawing/2010/main" w="9525">
                   <a:solidFill>
                     <a:srgbClr val="000000"/>
                   </a:solidFill>
@@ -2878,7 +2882,7 @@
             </a:ln>
             <a:extLst>
               <a:ext uri="{91240B29-F687-4f45-9708-019B960494DF}">
-                <a14:hiddenLine xmlns:a14="http://schemas.microsoft.com/office/drawing/2010/main" xmlns="" w="9525">
+                <a14:hiddenLine xmlns="" xmlns:a14="http://schemas.microsoft.com/office/drawing/2010/main" w="9525">
                   <a:solidFill>
                     <a:srgbClr val="000000"/>
                   </a:solidFill>
@@ -2946,7 +2950,7 @@
             </a:ln>
             <a:extLst>
               <a:ext uri="{91240B29-F687-4f45-9708-019B960494DF}">
-                <a14:hiddenLine xmlns:a14="http://schemas.microsoft.com/office/drawing/2010/main" xmlns="" w="9525">
+                <a14:hiddenLine xmlns="" xmlns:a14="http://schemas.microsoft.com/office/drawing/2010/main" w="9525">
                   <a:solidFill>
                     <a:srgbClr val="000000"/>
                   </a:solidFill>
@@ -3036,7 +3040,7 @@
             </a:ln>
             <a:extLst>
               <a:ext uri="{91240B29-F687-4f45-9708-019B960494DF}">
-                <a14:hiddenLine xmlns:a14="http://schemas.microsoft.com/office/drawing/2010/main" xmlns="" w="9525">
+                <a14:hiddenLine xmlns="" xmlns:a14="http://schemas.microsoft.com/office/drawing/2010/main" w="9525">
                   <a:solidFill>
                     <a:srgbClr val="000000"/>
                   </a:solidFill>
@@ -3104,7 +3108,7 @@
             </a:ln>
             <a:extLst>
               <a:ext uri="{91240B29-F687-4f45-9708-019B960494DF}">
-                <a14:hiddenLine xmlns:a14="http://schemas.microsoft.com/office/drawing/2010/main" xmlns="" w="9525">
+                <a14:hiddenLine xmlns="" xmlns:a14="http://schemas.microsoft.com/office/drawing/2010/main" w="9525">
                   <a:solidFill>
                     <a:srgbClr val="000000"/>
                   </a:solidFill>
@@ -3194,7 +3198,7 @@
             </a:ln>
             <a:extLst>
               <a:ext uri="{91240B29-F687-4f45-9708-019B960494DF}">
-                <a14:hiddenLine xmlns:a14="http://schemas.microsoft.com/office/drawing/2010/main" xmlns="" w="9525">
+                <a14:hiddenLine xmlns="" xmlns:a14="http://schemas.microsoft.com/office/drawing/2010/main" w="9525">
                   <a:solidFill>
                     <a:srgbClr val="000000"/>
                   </a:solidFill>
@@ -3228,7 +3232,7 @@
             </a:ln>
             <a:extLst>
               <a:ext uri="{91240B29-F687-4f45-9708-019B960494DF}">
-                <a14:hiddenLine xmlns:a14="http://schemas.microsoft.com/office/drawing/2010/main" xmlns="" w="9525">
+                <a14:hiddenLine xmlns="" xmlns:a14="http://schemas.microsoft.com/office/drawing/2010/main" w="9525">
                   <a:solidFill>
                     <a:srgbClr val="000000"/>
                   </a:solidFill>
@@ -3318,7 +3322,7 @@
             </a:ln>
             <a:extLst>
               <a:ext uri="{91240B29-F687-4f45-9708-019B960494DF}">
-                <a14:hiddenLine xmlns:a14="http://schemas.microsoft.com/office/drawing/2010/main" xmlns="" w="9525">
+                <a14:hiddenLine xmlns="" xmlns:a14="http://schemas.microsoft.com/office/drawing/2010/main" w="9525">
                   <a:solidFill>
                     <a:srgbClr val="000000"/>
                   </a:solidFill>
@@ -3380,7 +3384,7 @@
             </a:ln>
             <a:extLst>
               <a:ext uri="{91240B29-F687-4f45-9708-019B960494DF}">
-                <a14:hiddenLine xmlns:a14="http://schemas.microsoft.com/office/drawing/2010/main" xmlns="" w="9525">
+                <a14:hiddenLine xmlns="" xmlns:a14="http://schemas.microsoft.com/office/drawing/2010/main" w="9525">
                   <a:solidFill>
                     <a:srgbClr val="000000"/>
                   </a:solidFill>
@@ -3442,7 +3446,7 @@
             </a:ln>
             <a:extLst>
               <a:ext uri="{91240B29-F687-4f45-9708-019B960494DF}">
-                <a14:hiddenLine xmlns:a14="http://schemas.microsoft.com/office/drawing/2010/main" xmlns="" w="9525">
+                <a14:hiddenLine xmlns="" xmlns:a14="http://schemas.microsoft.com/office/drawing/2010/main" w="9525">
                   <a:solidFill>
                     <a:srgbClr val="000000"/>
                   </a:solidFill>
@@ -3532,7 +3536,7 @@
             </a:ln>
             <a:extLst>
               <a:ext uri="{91240B29-F687-4f45-9708-019B960494DF}">
-                <a14:hiddenLine xmlns:a14="http://schemas.microsoft.com/office/drawing/2010/main" xmlns="" w="9525">
+                <a14:hiddenLine xmlns="" xmlns:a14="http://schemas.microsoft.com/office/drawing/2010/main" w="9525">
                   <a:solidFill>
                     <a:srgbClr val="000000"/>
                   </a:solidFill>
@@ -3600,7 +3604,7 @@
             </a:ln>
             <a:extLst>
               <a:ext uri="{91240B29-F687-4f45-9708-019B960494DF}">
-                <a14:hiddenLine xmlns:a14="http://schemas.microsoft.com/office/drawing/2010/main" xmlns="" w="9525">
+                <a14:hiddenLine xmlns="" xmlns:a14="http://schemas.microsoft.com/office/drawing/2010/main" w="9525">
                   <a:solidFill>
                     <a:srgbClr val="000000"/>
                   </a:solidFill>
@@ -3662,7 +3666,7 @@
             </a:ln>
             <a:extLst>
               <a:ext uri="{91240B29-F687-4f45-9708-019B960494DF}">
-                <a14:hiddenLine xmlns:a14="http://schemas.microsoft.com/office/drawing/2010/main" xmlns="" w="9525">
+                <a14:hiddenLine xmlns="" xmlns:a14="http://schemas.microsoft.com/office/drawing/2010/main" w="9525">
                   <a:solidFill>
                     <a:srgbClr val="000000"/>
                   </a:solidFill>
@@ -3752,7 +3756,7 @@
             </a:ln>
             <a:extLst>
               <a:ext uri="{91240B29-F687-4f45-9708-019B960494DF}">
-                <a14:hiddenLine xmlns:a14="http://schemas.microsoft.com/office/drawing/2010/main" xmlns="" w="9525">
+                <a14:hiddenLine xmlns="" xmlns:a14="http://schemas.microsoft.com/office/drawing/2010/main" w="9525">
                   <a:solidFill>
                     <a:srgbClr val="000000"/>
                   </a:solidFill>
@@ -3814,7 +3818,7 @@
             </a:ln>
             <a:extLst>
               <a:ext uri="{91240B29-F687-4f45-9708-019B960494DF}">
-                <a14:hiddenLine xmlns:a14="http://schemas.microsoft.com/office/drawing/2010/main" xmlns="" w="9525">
+                <a14:hiddenLine xmlns="" xmlns:a14="http://schemas.microsoft.com/office/drawing/2010/main" w="9525">
                   <a:solidFill>
                     <a:srgbClr val="000000"/>
                   </a:solidFill>
@@ -3904,7 +3908,7 @@
             </a:ln>
             <a:extLst>
               <a:ext uri="{91240B29-F687-4f45-9708-019B960494DF}">
-                <a14:hiddenLine xmlns:a14="http://schemas.microsoft.com/office/drawing/2010/main" xmlns="" w="9525">
+                <a14:hiddenLine xmlns="" xmlns:a14="http://schemas.microsoft.com/office/drawing/2010/main" w="9525">
                   <a:solidFill>
                     <a:srgbClr val="000000"/>
                   </a:solidFill>
@@ -3966,7 +3970,7 @@
             </a:ln>
             <a:extLst>
               <a:ext uri="{91240B29-F687-4f45-9708-019B960494DF}">
-                <a14:hiddenLine xmlns:a14="http://schemas.microsoft.com/office/drawing/2010/main" xmlns="" w="9525">
+                <a14:hiddenLine xmlns="" xmlns:a14="http://schemas.microsoft.com/office/drawing/2010/main" w="9525">
                   <a:solidFill>
                     <a:srgbClr val="000000"/>
                   </a:solidFill>
@@ -4056,7 +4060,7 @@
             </a:ln>
             <a:extLst>
               <a:ext uri="{91240B29-F687-4f45-9708-019B960494DF}">
-                <a14:hiddenLine xmlns:a14="http://schemas.microsoft.com/office/drawing/2010/main" xmlns="" w="9525">
+                <a14:hiddenLine xmlns="" xmlns:a14="http://schemas.microsoft.com/office/drawing/2010/main" w="9525">
                   <a:solidFill>
                     <a:srgbClr val="000000"/>
                   </a:solidFill>
@@ -4090,7 +4094,7 @@
             </a:ln>
             <a:extLst>
               <a:ext uri="{91240B29-F687-4f45-9708-019B960494DF}">
-                <a14:hiddenLine xmlns:a14="http://schemas.microsoft.com/office/drawing/2010/main" xmlns="" w="9525">
+                <a14:hiddenLine xmlns="" xmlns:a14="http://schemas.microsoft.com/office/drawing/2010/main" w="9525">
                   <a:solidFill>
                     <a:srgbClr val="000000"/>
                   </a:solidFill>
@@ -4155,7 +4159,7 @@
             </a:ln>
             <a:extLst>
               <a:ext uri="{91240B29-F687-4f45-9708-019B960494DF}">
-                <a14:hiddenLine xmlns:a14="http://schemas.microsoft.com/office/drawing/2010/main" xmlns="" w="9525">
+                <a14:hiddenLine xmlns="" xmlns:a14="http://schemas.microsoft.com/office/drawing/2010/main" w="9525">
                   <a:solidFill>
                     <a:srgbClr val="000000"/>
                   </a:solidFill>
@@ -4245,7 +4249,7 @@
             </a:ln>
             <a:extLst>
               <a:ext uri="{91240B29-F687-4f45-9708-019B960494DF}">
-                <a14:hiddenLine xmlns:a14="http://schemas.microsoft.com/office/drawing/2010/main" xmlns="" w="9525">
+                <a14:hiddenLine xmlns="" xmlns:a14="http://schemas.microsoft.com/office/drawing/2010/main" w="9525">
                   <a:solidFill>
                     <a:srgbClr val="000000"/>
                   </a:solidFill>
@@ -4307,7 +4311,7 @@
             </a:ln>
             <a:extLst>
               <a:ext uri="{91240B29-F687-4f45-9708-019B960494DF}">
-                <a14:hiddenLine xmlns:a14="http://schemas.microsoft.com/office/drawing/2010/main" xmlns="" w="9525">
+                <a14:hiddenLine xmlns="" xmlns:a14="http://schemas.microsoft.com/office/drawing/2010/main" w="9525">
                   <a:solidFill>
                     <a:srgbClr val="000000"/>
                   </a:solidFill>
@@ -4397,7 +4401,7 @@
             </a:ln>
             <a:extLst>
               <a:ext uri="{91240B29-F687-4f45-9708-019B960494DF}">
-                <a14:hiddenLine xmlns:a14="http://schemas.microsoft.com/office/drawing/2010/main" xmlns="" w="9525">
+                <a14:hiddenLine xmlns="" xmlns:a14="http://schemas.microsoft.com/office/drawing/2010/main" w="9525">
                   <a:solidFill>
                     <a:srgbClr val="000000"/>
                   </a:solidFill>
@@ -4487,7 +4491,7 @@
             </a:ln>
             <a:extLst>
               <a:ext uri="{91240B29-F687-4f45-9708-019B960494DF}">
-                <a14:hiddenLine xmlns:a14="http://schemas.microsoft.com/office/drawing/2010/main" xmlns="" w="9525">
+                <a14:hiddenLine xmlns="" xmlns:a14="http://schemas.microsoft.com/office/drawing/2010/main" w="9525">
                   <a:solidFill>
                     <a:srgbClr val="000000"/>
                   </a:solidFill>
@@ -4552,7 +4556,7 @@
             </a:ln>
             <a:extLst>
               <a:ext uri="{91240B29-F687-4f45-9708-019B960494DF}">
-                <a14:hiddenLine xmlns:a14="http://schemas.microsoft.com/office/drawing/2010/main" xmlns="" w="9525">
+                <a14:hiddenLine xmlns="" xmlns:a14="http://schemas.microsoft.com/office/drawing/2010/main" w="9525">
                   <a:solidFill>
                     <a:srgbClr val="000000"/>
                   </a:solidFill>
@@ -4614,7 +4618,7 @@
             </a:ln>
             <a:extLst>
               <a:ext uri="{91240B29-F687-4f45-9708-019B960494DF}">
-                <a14:hiddenLine xmlns:a14="http://schemas.microsoft.com/office/drawing/2010/main" xmlns="" w="9525">
+                <a14:hiddenLine xmlns="" xmlns:a14="http://schemas.microsoft.com/office/drawing/2010/main" w="9525">
                   <a:solidFill>
                     <a:srgbClr val="000000"/>
                   </a:solidFill>
@@ -4704,7 +4708,7 @@
             </a:ln>
             <a:extLst>
               <a:ext uri="{91240B29-F687-4f45-9708-019B960494DF}">
-                <a14:hiddenLine xmlns:a14="http://schemas.microsoft.com/office/drawing/2010/main" xmlns="" w="9525">
+                <a14:hiddenLine xmlns="" xmlns:a14="http://schemas.microsoft.com/office/drawing/2010/main" w="9525">
                   <a:solidFill>
                     <a:srgbClr val="000000"/>
                   </a:solidFill>
@@ -4794,7 +4798,7 @@
             </a:ln>
             <a:extLst>
               <a:ext uri="{91240B29-F687-4f45-9708-019B960494DF}">
-                <a14:hiddenLine xmlns:a14="http://schemas.microsoft.com/office/drawing/2010/main" xmlns="" w="9525">
+                <a14:hiddenLine xmlns="" xmlns:a14="http://schemas.microsoft.com/office/drawing/2010/main" w="9525">
                   <a:solidFill>
                     <a:srgbClr val="000000"/>
                   </a:solidFill>
@@ -4856,7 +4860,7 @@
             </a:ln>
             <a:extLst>
               <a:ext uri="{91240B29-F687-4f45-9708-019B960494DF}">
-                <a14:hiddenLine xmlns:a14="http://schemas.microsoft.com/office/drawing/2010/main" xmlns="" w="9525">
+                <a14:hiddenLine xmlns="" xmlns:a14="http://schemas.microsoft.com/office/drawing/2010/main" w="9525">
                   <a:solidFill>
                     <a:srgbClr val="000000"/>
                   </a:solidFill>
@@ -4976,7 +4980,7 @@
             </a:ln>
             <a:extLst>
               <a:ext uri="{91240B29-F687-4f45-9708-019B960494DF}">
-                <a14:hiddenLine xmlns:a14="http://schemas.microsoft.com/office/drawing/2010/main" xmlns="" w="9525">
+                <a14:hiddenLine xmlns="" xmlns:a14="http://schemas.microsoft.com/office/drawing/2010/main" w="9525">
                   <a:solidFill>
                     <a:srgbClr val="000000"/>
                   </a:solidFill>
@@ -5044,7 +5048,7 @@
             </a:ln>
             <a:extLst>
               <a:ext uri="{91240B29-F687-4f45-9708-019B960494DF}">
-                <a14:hiddenLine xmlns:a14="http://schemas.microsoft.com/office/drawing/2010/main" xmlns="" w="9525">
+                <a14:hiddenLine xmlns="" xmlns:a14="http://schemas.microsoft.com/office/drawing/2010/main" w="9525">
                   <a:solidFill>
                     <a:srgbClr val="000000"/>
                   </a:solidFill>
@@ -5134,7 +5138,7 @@
             </a:ln>
             <a:extLst>
               <a:ext uri="{91240B29-F687-4f45-9708-019B960494DF}">
-                <a14:hiddenLine xmlns:a14="http://schemas.microsoft.com/office/drawing/2010/main" xmlns="" w="9525">
+                <a14:hiddenLine xmlns="" xmlns:a14="http://schemas.microsoft.com/office/drawing/2010/main" w="9525">
                   <a:solidFill>
                     <a:srgbClr val="000000"/>
                   </a:solidFill>
@@ -5275,7 +5279,7 @@
             <a:fld id="{B61BEF0D-F0BB-DE4B-95CE-6DB70DBA9567}" type="datetimeFigureOut">
               <a:rPr lang="en-US" smtClean="0"/>
               <a:pPr/>
-              <a:t>15/07/2018</a:t>
+              <a:t>21/07/2018</a:t>
             </a:fld>
             <a:endParaRPr lang="en-US" dirty="0"/>
           </a:p>
@@ -5544,7 +5548,7 @@
             <a:fld id="{B61BEF0D-F0BB-DE4B-95CE-6DB70DBA9567}" type="datetimeFigureOut">
               <a:rPr lang="en-US" smtClean="0"/>
               <a:pPr/>
-              <a:t>15/07/2018</a:t>
+              <a:t>21/07/2018</a:t>
             </a:fld>
             <a:endParaRPr lang="en-US" dirty="0"/>
           </a:p>
@@ -5742,7 +5746,7 @@
             <a:fld id="{B61BEF0D-F0BB-DE4B-95CE-6DB70DBA9567}" type="datetimeFigureOut">
               <a:rPr lang="en-US" smtClean="0"/>
               <a:pPr/>
-              <a:t>15/07/2018</a:t>
+              <a:t>21/07/2018</a:t>
             </a:fld>
             <a:endParaRPr lang="en-US" dirty="0"/>
           </a:p>
@@ -6007,7 +6011,7 @@
             <a:fld id="{B61BEF0D-F0BB-DE4B-95CE-6DB70DBA9567}" type="datetimeFigureOut">
               <a:rPr lang="en-US" smtClean="0"/>
               <a:pPr/>
-              <a:t>15/07/2018</a:t>
+              <a:t>21/07/2018</a:t>
             </a:fld>
             <a:endParaRPr lang="en-US" dirty="0"/>
           </a:p>
@@ -6443,7 +6447,7 @@
             <a:fld id="{B61BEF0D-F0BB-DE4B-95CE-6DB70DBA9567}" type="datetimeFigureOut">
               <a:rPr lang="en-US" smtClean="0"/>
               <a:pPr/>
-              <a:t>15/07/2018</a:t>
+              <a:t>21/07/2018</a:t>
             </a:fld>
             <a:endParaRPr lang="en-US" dirty="0"/>
           </a:p>
@@ -6991,7 +6995,7 @@
             <a:fld id="{B61BEF0D-F0BB-DE4B-95CE-6DB70DBA9567}" type="datetimeFigureOut">
               <a:rPr lang="en-US" smtClean="0"/>
               <a:pPr/>
-              <a:t>15/07/2018</a:t>
+              <a:t>21/07/2018</a:t>
             </a:fld>
             <a:endParaRPr lang="en-US" dirty="0"/>
           </a:p>
@@ -7713,7 +7717,7 @@
             <a:fld id="{B61BEF0D-F0BB-DE4B-95CE-6DB70DBA9567}" type="datetimeFigureOut">
               <a:rPr lang="en-US" smtClean="0"/>
               <a:pPr/>
-              <a:t>15/07/2018</a:t>
+              <a:t>21/07/2018</a:t>
             </a:fld>
             <a:endParaRPr lang="en-US" dirty="0"/>
           </a:p>
@@ -7885,7 +7889,7 @@
             <a:fld id="{B61BEF0D-F0BB-DE4B-95CE-6DB70DBA9567}" type="datetimeFigureOut">
               <a:rPr lang="en-US" smtClean="0"/>
               <a:pPr/>
-              <a:t>15/07/2018</a:t>
+              <a:t>21/07/2018</a:t>
             </a:fld>
             <a:endParaRPr lang="en-US" dirty="0"/>
           </a:p>
@@ -8067,7 +8071,7 @@
             <a:fld id="{B61BEF0D-F0BB-DE4B-95CE-6DB70DBA9567}" type="datetimeFigureOut">
               <a:rPr lang="en-US" smtClean="0"/>
               <a:pPr/>
-              <a:t>15/07/2018</a:t>
+              <a:t>21/07/2018</a:t>
             </a:fld>
             <a:endParaRPr lang="en-US" dirty="0"/>
           </a:p>
@@ -8239,7 +8243,7 @@
             <a:fld id="{B61BEF0D-F0BB-DE4B-95CE-6DB70DBA9567}" type="datetimeFigureOut">
               <a:rPr lang="en-US" smtClean="0"/>
               <a:pPr/>
-              <a:t>15/07/2018</a:t>
+              <a:t>21/07/2018</a:t>
             </a:fld>
             <a:endParaRPr lang="en-US" dirty="0"/>
           </a:p>
@@ -8491,7 +8495,7 @@
             <a:fld id="{B61BEF0D-F0BB-DE4B-95CE-6DB70DBA9567}" type="datetimeFigureOut">
               <a:rPr lang="en-US" smtClean="0"/>
               <a:pPr/>
-              <a:t>15/07/2018</a:t>
+              <a:t>21/07/2018</a:t>
             </a:fld>
             <a:endParaRPr lang="en-US" dirty="0"/>
           </a:p>
@@ -8725,7 +8729,7 @@
             <a:fld id="{B61BEF0D-F0BB-DE4B-95CE-6DB70DBA9567}" type="datetimeFigureOut">
               <a:rPr lang="en-US" smtClean="0"/>
               <a:pPr/>
-              <a:t>15/07/2018</a:t>
+              <a:t>21/07/2018</a:t>
             </a:fld>
             <a:endParaRPr lang="en-US" dirty="0"/>
           </a:p>
@@ -9108,7 +9112,7 @@
             <a:fld id="{B61BEF0D-F0BB-DE4B-95CE-6DB70DBA9567}" type="datetimeFigureOut">
               <a:rPr lang="en-US" smtClean="0"/>
               <a:pPr/>
-              <a:t>15/07/2018</a:t>
+              <a:t>21/07/2018</a:t>
             </a:fld>
             <a:endParaRPr lang="en-US" dirty="0"/>
           </a:p>
@@ -9228,7 +9232,7 @@
             <a:fld id="{B61BEF0D-F0BB-DE4B-95CE-6DB70DBA9567}" type="datetimeFigureOut">
               <a:rPr lang="en-US" smtClean="0"/>
               <a:pPr/>
-              <a:t>15/07/2018</a:t>
+              <a:t>21/07/2018</a:t>
             </a:fld>
             <a:endParaRPr lang="en-US" dirty="0"/>
           </a:p>
@@ -9325,7 +9329,7 @@
             <a:fld id="{B61BEF0D-F0BB-DE4B-95CE-6DB70DBA9567}" type="datetimeFigureOut">
               <a:rPr lang="en-US" smtClean="0"/>
               <a:pPr/>
-              <a:t>15/07/2018</a:t>
+              <a:t>21/07/2018</a:t>
             </a:fld>
             <a:endParaRPr lang="en-US" dirty="0"/>
           </a:p>
@@ -9576,7 +9580,7 @@
             <a:fld id="{B61BEF0D-F0BB-DE4B-95CE-6DB70DBA9567}" type="datetimeFigureOut">
               <a:rPr lang="en-US" smtClean="0"/>
               <a:pPr/>
-              <a:t>15/07/2018</a:t>
+              <a:t>21/07/2018</a:t>
             </a:fld>
             <a:endParaRPr lang="en-US" dirty="0"/>
           </a:p>
@@ -9858,7 +9862,7 @@
             <a:fld id="{B61BEF0D-F0BB-DE4B-95CE-6DB70DBA9567}" type="datetimeFigureOut">
               <a:rPr lang="en-US" smtClean="0"/>
               <a:pPr/>
-              <a:t>15/07/2018</a:t>
+              <a:t>21/07/2018</a:t>
             </a:fld>
             <a:endParaRPr lang="en-US" dirty="0"/>
           </a:p>
@@ -9975,7 +9979,7 @@
           <a:noFill/>
           <a:extLst>
             <a:ext uri="{909E8E84-426E-40dd-AFC4-6F175D3DCCD1}">
-              <a14:hiddenFill xmlns:a14="http://schemas.microsoft.com/office/drawing/2010/main" xmlns="">
+              <a14:hiddenFill xmlns="" xmlns:a14="http://schemas.microsoft.com/office/drawing/2010/main">
                 <a:solidFill>
                   <a:srgbClr val="FFFFFF"/>
                 </a:solidFill>
@@ -10049,7 +10053,7 @@
               </a:ln>
               <a:extLst>
                 <a:ext uri="{91240B29-F687-4f45-9708-019B960494DF}">
-                  <a14:hiddenLine xmlns:a14="http://schemas.microsoft.com/office/drawing/2010/main" xmlns="" w="9525">
+                  <a14:hiddenLine xmlns="" xmlns:a14="http://schemas.microsoft.com/office/drawing/2010/main" w="9525">
                     <a:solidFill>
                       <a:srgbClr val="000000"/>
                     </a:solidFill>
@@ -10139,7 +10143,7 @@
               </a:ln>
               <a:extLst>
                 <a:ext uri="{91240B29-F687-4f45-9708-019B960494DF}">
-                  <a14:hiddenLine xmlns:a14="http://schemas.microsoft.com/office/drawing/2010/main" xmlns="" w="9525">
+                  <a14:hiddenLine xmlns="" xmlns:a14="http://schemas.microsoft.com/office/drawing/2010/main" w="9525">
                     <a:solidFill>
                       <a:srgbClr val="000000"/>
                     </a:solidFill>
@@ -10229,7 +10233,7 @@
               </a:ln>
               <a:extLst>
                 <a:ext uri="{91240B29-F687-4f45-9708-019B960494DF}">
-                  <a14:hiddenLine xmlns:a14="http://schemas.microsoft.com/office/drawing/2010/main" xmlns="" w="9525">
+                  <a14:hiddenLine xmlns="" xmlns:a14="http://schemas.microsoft.com/office/drawing/2010/main" w="9525">
                     <a:solidFill>
                       <a:srgbClr val="000000"/>
                     </a:solidFill>
@@ -10291,7 +10295,7 @@
               </a:ln>
               <a:extLst>
                 <a:ext uri="{91240B29-F687-4f45-9708-019B960494DF}">
-                  <a14:hiddenLine xmlns:a14="http://schemas.microsoft.com/office/drawing/2010/main" xmlns="" w="9525">
+                  <a14:hiddenLine xmlns="" xmlns:a14="http://schemas.microsoft.com/office/drawing/2010/main" w="9525">
                     <a:solidFill>
                       <a:srgbClr val="000000"/>
                     </a:solidFill>
@@ -10381,7 +10385,7 @@
               </a:ln>
               <a:extLst>
                 <a:ext uri="{91240B29-F687-4f45-9708-019B960494DF}">
-                  <a14:hiddenLine xmlns:a14="http://schemas.microsoft.com/office/drawing/2010/main" xmlns="" w="9525">
+                  <a14:hiddenLine xmlns="" xmlns:a14="http://schemas.microsoft.com/office/drawing/2010/main" w="9525">
                     <a:solidFill>
                       <a:srgbClr val="000000"/>
                     </a:solidFill>
@@ -10443,7 +10447,7 @@
               </a:ln>
               <a:extLst>
                 <a:ext uri="{91240B29-F687-4f45-9708-019B960494DF}">
-                  <a14:hiddenLine xmlns:a14="http://schemas.microsoft.com/office/drawing/2010/main" xmlns="" w="9525">
+                  <a14:hiddenLine xmlns="" xmlns:a14="http://schemas.microsoft.com/office/drawing/2010/main" w="9525">
                     <a:solidFill>
                       <a:srgbClr val="000000"/>
                     </a:solidFill>
@@ -10505,7 +10509,7 @@
               </a:ln>
               <a:extLst>
                 <a:ext uri="{91240B29-F687-4f45-9708-019B960494DF}">
-                  <a14:hiddenLine xmlns:a14="http://schemas.microsoft.com/office/drawing/2010/main" xmlns="" w="9525">
+                  <a14:hiddenLine xmlns="" xmlns:a14="http://schemas.microsoft.com/office/drawing/2010/main" w="9525">
                     <a:solidFill>
                       <a:srgbClr val="000000"/>
                     </a:solidFill>
@@ -10595,7 +10599,7 @@
               </a:ln>
               <a:extLst>
                 <a:ext uri="{91240B29-F687-4f45-9708-019B960494DF}">
-                  <a14:hiddenLine xmlns:a14="http://schemas.microsoft.com/office/drawing/2010/main" xmlns="" w="9525">
+                  <a14:hiddenLine xmlns="" xmlns:a14="http://schemas.microsoft.com/office/drawing/2010/main" w="9525">
                     <a:solidFill>
                       <a:srgbClr val="000000"/>
                     </a:solidFill>
@@ -10685,7 +10689,7 @@
               </a:ln>
               <a:extLst>
                 <a:ext uri="{91240B29-F687-4f45-9708-019B960494DF}">
-                  <a14:hiddenLine xmlns:a14="http://schemas.microsoft.com/office/drawing/2010/main" xmlns="" w="9525">
+                  <a14:hiddenLine xmlns="" xmlns:a14="http://schemas.microsoft.com/office/drawing/2010/main" w="9525">
                     <a:solidFill>
                       <a:srgbClr val="000000"/>
                     </a:solidFill>
@@ -10747,7 +10751,7 @@
               </a:ln>
               <a:extLst>
                 <a:ext uri="{91240B29-F687-4f45-9708-019B960494DF}">
-                  <a14:hiddenLine xmlns:a14="http://schemas.microsoft.com/office/drawing/2010/main" xmlns="" w="9525">
+                  <a14:hiddenLine xmlns="" xmlns:a14="http://schemas.microsoft.com/office/drawing/2010/main" w="9525">
                     <a:solidFill>
                       <a:srgbClr val="000000"/>
                     </a:solidFill>
@@ -10857,7 +10861,7 @@
               </a:ln>
               <a:extLst>
                 <a:ext uri="{91240B29-F687-4f45-9708-019B960494DF}">
-                  <a14:hiddenLine xmlns:a14="http://schemas.microsoft.com/office/drawing/2010/main" xmlns="" w="9525">
+                  <a14:hiddenLine xmlns="" xmlns:a14="http://schemas.microsoft.com/office/drawing/2010/main" w="9525">
                     <a:solidFill>
                       <a:srgbClr val="000000"/>
                     </a:solidFill>
@@ -10941,7 +10945,7 @@
               </a:ln>
               <a:extLst>
                 <a:ext uri="{91240B29-F687-4f45-9708-019B960494DF}">
-                  <a14:hiddenLine xmlns:a14="http://schemas.microsoft.com/office/drawing/2010/main" xmlns="" w="9525">
+                  <a14:hiddenLine xmlns="" xmlns:a14="http://schemas.microsoft.com/office/drawing/2010/main" w="9525">
                     <a:solidFill>
                       <a:srgbClr val="000000"/>
                     </a:solidFill>
@@ -11003,7 +11007,7 @@
               </a:ln>
               <a:extLst>
                 <a:ext uri="{91240B29-F687-4f45-9708-019B960494DF}">
-                  <a14:hiddenLine xmlns:a14="http://schemas.microsoft.com/office/drawing/2010/main" xmlns="" w="9525">
+                  <a14:hiddenLine xmlns="" xmlns:a14="http://schemas.microsoft.com/office/drawing/2010/main" w="9525">
                     <a:solidFill>
                       <a:srgbClr val="000000"/>
                     </a:solidFill>
@@ -11065,7 +11069,7 @@
               </a:ln>
               <a:extLst>
                 <a:ext uri="{91240B29-F687-4f45-9708-019B960494DF}">
-                  <a14:hiddenLine xmlns:a14="http://schemas.microsoft.com/office/drawing/2010/main" xmlns="" w="9525">
+                  <a14:hiddenLine xmlns="" xmlns:a14="http://schemas.microsoft.com/office/drawing/2010/main" w="9525">
                     <a:solidFill>
                       <a:srgbClr val="000000"/>
                     </a:solidFill>
@@ -11155,7 +11159,7 @@
               </a:ln>
               <a:extLst>
                 <a:ext uri="{91240B29-F687-4f45-9708-019B960494DF}">
-                  <a14:hiddenLine xmlns:a14="http://schemas.microsoft.com/office/drawing/2010/main" xmlns="" w="9525">
+                  <a14:hiddenLine xmlns="" xmlns:a14="http://schemas.microsoft.com/office/drawing/2010/main" w="9525">
                     <a:solidFill>
                       <a:srgbClr val="000000"/>
                     </a:solidFill>
@@ -11189,7 +11193,7 @@
               </a:ln>
               <a:extLst>
                 <a:ext uri="{91240B29-F687-4f45-9708-019B960494DF}">
-                  <a14:hiddenLine xmlns:a14="http://schemas.microsoft.com/office/drawing/2010/main" xmlns="" w="9525">
+                  <a14:hiddenLine xmlns="" xmlns:a14="http://schemas.microsoft.com/office/drawing/2010/main" w="9525">
                     <a:solidFill>
                       <a:srgbClr val="000000"/>
                     </a:solidFill>
@@ -11254,7 +11258,7 @@
               </a:ln>
               <a:extLst>
                 <a:ext uri="{91240B29-F687-4f45-9708-019B960494DF}">
-                  <a14:hiddenLine xmlns:a14="http://schemas.microsoft.com/office/drawing/2010/main" xmlns="" w="9525">
+                  <a14:hiddenLine xmlns="" xmlns:a14="http://schemas.microsoft.com/office/drawing/2010/main" w="9525">
                     <a:solidFill>
                       <a:srgbClr val="000000"/>
                     </a:solidFill>
@@ -11344,7 +11348,7 @@
               </a:ln>
               <a:extLst>
                 <a:ext uri="{91240B29-F687-4f45-9708-019B960494DF}">
-                  <a14:hiddenLine xmlns:a14="http://schemas.microsoft.com/office/drawing/2010/main" xmlns="" w="9525">
+                  <a14:hiddenLine xmlns="" xmlns:a14="http://schemas.microsoft.com/office/drawing/2010/main" w="9525">
                     <a:solidFill>
                       <a:srgbClr val="000000"/>
                     </a:solidFill>
@@ -11406,7 +11410,7 @@
               </a:ln>
               <a:extLst>
                 <a:ext uri="{91240B29-F687-4f45-9708-019B960494DF}">
-                  <a14:hiddenLine xmlns:a14="http://schemas.microsoft.com/office/drawing/2010/main" xmlns="" w="9525">
+                  <a14:hiddenLine xmlns="" xmlns:a14="http://schemas.microsoft.com/office/drawing/2010/main" w="9525">
                     <a:solidFill>
                       <a:srgbClr val="000000"/>
                     </a:solidFill>
@@ -11496,7 +11500,7 @@
               </a:ln>
               <a:extLst>
                 <a:ext uri="{91240B29-F687-4f45-9708-019B960494DF}">
-                  <a14:hiddenLine xmlns:a14="http://schemas.microsoft.com/office/drawing/2010/main" xmlns="" w="9525">
+                  <a14:hiddenLine xmlns="" xmlns:a14="http://schemas.microsoft.com/office/drawing/2010/main" w="9525">
                     <a:solidFill>
                       <a:srgbClr val="000000"/>
                     </a:solidFill>
@@ -11561,7 +11565,7 @@
               </a:ln>
               <a:extLst>
                 <a:ext uri="{91240B29-F687-4f45-9708-019B960494DF}">
-                  <a14:hiddenLine xmlns:a14="http://schemas.microsoft.com/office/drawing/2010/main" xmlns="" w="9525">
+                  <a14:hiddenLine xmlns="" xmlns:a14="http://schemas.microsoft.com/office/drawing/2010/main" w="9525">
                     <a:solidFill>
                       <a:srgbClr val="000000"/>
                     </a:solidFill>
@@ -11623,7 +11627,7 @@
               </a:ln>
               <a:extLst>
                 <a:ext uri="{91240B29-F687-4f45-9708-019B960494DF}">
-                  <a14:hiddenLine xmlns:a14="http://schemas.microsoft.com/office/drawing/2010/main" xmlns="" w="9525">
+                  <a14:hiddenLine xmlns="" xmlns:a14="http://schemas.microsoft.com/office/drawing/2010/main" w="9525">
                     <a:solidFill>
                       <a:srgbClr val="000000"/>
                     </a:solidFill>
@@ -11713,7 +11717,7 @@
               </a:ln>
               <a:extLst>
                 <a:ext uri="{91240B29-F687-4f45-9708-019B960494DF}">
-                  <a14:hiddenLine xmlns:a14="http://schemas.microsoft.com/office/drawing/2010/main" xmlns="" w="9525">
+                  <a14:hiddenLine xmlns="" xmlns:a14="http://schemas.microsoft.com/office/drawing/2010/main" w="9525">
                     <a:solidFill>
                       <a:srgbClr val="000000"/>
                     </a:solidFill>
@@ -11803,7 +11807,7 @@
               </a:ln>
               <a:extLst>
                 <a:ext uri="{91240B29-F687-4f45-9708-019B960494DF}">
-                  <a14:hiddenLine xmlns:a14="http://schemas.microsoft.com/office/drawing/2010/main" xmlns="" w="9525">
+                  <a14:hiddenLine xmlns="" xmlns:a14="http://schemas.microsoft.com/office/drawing/2010/main" w="9525">
                     <a:solidFill>
                       <a:srgbClr val="000000"/>
                     </a:solidFill>
@@ -11868,7 +11872,7 @@
               </a:ln>
               <a:extLst>
                 <a:ext uri="{91240B29-F687-4f45-9708-019B960494DF}">
-                  <a14:hiddenLine xmlns:a14="http://schemas.microsoft.com/office/drawing/2010/main" xmlns="" w="9525">
+                  <a14:hiddenLine xmlns="" xmlns:a14="http://schemas.microsoft.com/office/drawing/2010/main" w="9525">
                     <a:solidFill>
                       <a:srgbClr val="000000"/>
                     </a:solidFill>
@@ -11988,7 +11992,7 @@
               </a:ln>
               <a:extLst>
                 <a:ext uri="{91240B29-F687-4f45-9708-019B960494DF}">
-                  <a14:hiddenLine xmlns:a14="http://schemas.microsoft.com/office/drawing/2010/main" xmlns="" w="9525">
+                  <a14:hiddenLine xmlns="" xmlns:a14="http://schemas.microsoft.com/office/drawing/2010/main" w="9525">
                     <a:solidFill>
                       <a:srgbClr val="000000"/>
                     </a:solidFill>
@@ -12086,7 +12090,7 @@
               </a:ln>
               <a:extLst>
                 <a:ext uri="{91240B29-F687-4f45-9708-019B960494DF}">
-                  <a14:hiddenLine xmlns:a14="http://schemas.microsoft.com/office/drawing/2010/main" xmlns="" w="9525">
+                  <a14:hiddenLine xmlns="" xmlns:a14="http://schemas.microsoft.com/office/drawing/2010/main" w="9525">
                     <a:solidFill>
                       <a:srgbClr val="000000"/>
                     </a:solidFill>
@@ -12201,7 +12205,7 @@
               </a:ln>
               <a:extLst>
                 <a:ext uri="{91240B29-F687-4f45-9708-019B960494DF}">
-                  <a14:hiddenLine xmlns:a14="http://schemas.microsoft.com/office/drawing/2010/main" xmlns="" w="9525">
+                  <a14:hiddenLine xmlns="" xmlns:a14="http://schemas.microsoft.com/office/drawing/2010/main" w="9525">
                     <a:solidFill>
                       <a:srgbClr val="000000"/>
                     </a:solidFill>
@@ -12291,7 +12295,7 @@
               </a:ln>
               <a:extLst>
                 <a:ext uri="{91240B29-F687-4f45-9708-019B960494DF}">
-                  <a14:hiddenLine xmlns:a14="http://schemas.microsoft.com/office/drawing/2010/main" xmlns="" w="9525">
+                  <a14:hiddenLine xmlns="" xmlns:a14="http://schemas.microsoft.com/office/drawing/2010/main" w="9525">
                     <a:solidFill>
                       <a:srgbClr val="000000"/>
                     </a:solidFill>
@@ -12356,7 +12360,7 @@
               </a:ln>
               <a:extLst>
                 <a:ext uri="{91240B29-F687-4f45-9708-019B960494DF}">
-                  <a14:hiddenLine xmlns:a14="http://schemas.microsoft.com/office/drawing/2010/main" xmlns="" w="9525">
+                  <a14:hiddenLine xmlns="" xmlns:a14="http://schemas.microsoft.com/office/drawing/2010/main" w="9525">
                     <a:solidFill>
                       <a:srgbClr val="000000"/>
                     </a:solidFill>
@@ -12446,7 +12450,7 @@
               </a:ln>
               <a:extLst>
                 <a:ext uri="{91240B29-F687-4f45-9708-019B960494DF}">
-                  <a14:hiddenLine xmlns:a14="http://schemas.microsoft.com/office/drawing/2010/main" xmlns="" w="9525">
+                  <a14:hiddenLine xmlns="" xmlns:a14="http://schemas.microsoft.com/office/drawing/2010/main" w="9525">
                     <a:solidFill>
                       <a:srgbClr val="000000"/>
                     </a:solidFill>
@@ -12514,7 +12518,7 @@
               </a:ln>
               <a:extLst>
                 <a:ext uri="{91240B29-F687-4f45-9708-019B960494DF}">
-                  <a14:hiddenLine xmlns:a14="http://schemas.microsoft.com/office/drawing/2010/main" xmlns="" w="9525">
+                  <a14:hiddenLine xmlns="" xmlns:a14="http://schemas.microsoft.com/office/drawing/2010/main" w="9525">
                     <a:solidFill>
                       <a:srgbClr val="000000"/>
                     </a:solidFill>
@@ -12604,7 +12608,7 @@
               </a:ln>
               <a:extLst>
                 <a:ext uri="{91240B29-F687-4f45-9708-019B960494DF}">
-                  <a14:hiddenLine xmlns:a14="http://schemas.microsoft.com/office/drawing/2010/main" xmlns="" w="9525">
+                  <a14:hiddenLine xmlns="" xmlns:a14="http://schemas.microsoft.com/office/drawing/2010/main" w="9525">
                     <a:solidFill>
                       <a:srgbClr val="000000"/>
                     </a:solidFill>
@@ -12672,7 +12676,7 @@
               </a:ln>
               <a:extLst>
                 <a:ext uri="{91240B29-F687-4f45-9708-019B960494DF}">
-                  <a14:hiddenLine xmlns:a14="http://schemas.microsoft.com/office/drawing/2010/main" xmlns="" w="9525">
+                  <a14:hiddenLine xmlns="" xmlns:a14="http://schemas.microsoft.com/office/drawing/2010/main" w="9525">
                     <a:solidFill>
                       <a:srgbClr val="000000"/>
                     </a:solidFill>
@@ -12762,7 +12766,7 @@
               </a:ln>
               <a:extLst>
                 <a:ext uri="{91240B29-F687-4f45-9708-019B960494DF}">
-                  <a14:hiddenLine xmlns:a14="http://schemas.microsoft.com/office/drawing/2010/main" xmlns="" w="9525">
+                  <a14:hiddenLine xmlns="" xmlns:a14="http://schemas.microsoft.com/office/drawing/2010/main" w="9525">
                     <a:solidFill>
                       <a:srgbClr val="000000"/>
                     </a:solidFill>
@@ -12796,7 +12800,7 @@
               </a:ln>
               <a:extLst>
                 <a:ext uri="{91240B29-F687-4f45-9708-019B960494DF}">
-                  <a14:hiddenLine xmlns:a14="http://schemas.microsoft.com/office/drawing/2010/main" xmlns="" w="9525">
+                  <a14:hiddenLine xmlns="" xmlns:a14="http://schemas.microsoft.com/office/drawing/2010/main" w="9525">
                     <a:solidFill>
                       <a:srgbClr val="000000"/>
                     </a:solidFill>
@@ -12937,7 +12941,7 @@
             <a:fld id="{B61BEF0D-F0BB-DE4B-95CE-6DB70DBA9567}" type="datetimeFigureOut">
               <a:rPr lang="en-US" smtClean="0"/>
               <a:pPr/>
-              <a:t>15/07/2018</a:t>
+              <a:t>21/07/2018</a:t>
             </a:fld>
             <a:endParaRPr lang="en-US" dirty="0"/>
           </a:p>
@@ -14389,6 +14393,555 @@
       </p:par>
     </p:tnLst>
   </p:timing>
+</p:sld>
+</file>
+
+<file path=ppt/slides/slide12.xml><?xml version="1.0" encoding="utf-8"?>
+<p:sld xmlns:a="http://schemas.openxmlformats.org/drawingml/2006/main" xmlns:r="http://schemas.openxmlformats.org/officeDocument/2006/relationships" xmlns:p="http://schemas.openxmlformats.org/presentationml/2006/main">
+  <p:cSld>
+    <p:spTree>
+      <p:nvGrpSpPr>
+        <p:cNvPr id="1" name=""/>
+        <p:cNvGrpSpPr/>
+        <p:nvPr/>
+      </p:nvGrpSpPr>
+      <p:grpSpPr>
+        <a:xfrm>
+          <a:off x="0" y="0"/>
+          <a:ext cx="0" cy="0"/>
+          <a:chOff x="0" y="0"/>
+          <a:chExt cx="0" cy="0"/>
+        </a:xfrm>
+      </p:grpSpPr>
+      <p:sp>
+        <p:nvSpPr>
+          <p:cNvPr id="2" name="Title 1">
+            <a:extLst>
+              <a:ext uri="{FF2B5EF4-FFF2-40B4-BE49-F238E27FC236}">
+                <a16:creationId xmlns:a16="http://schemas.microsoft.com/office/drawing/2014/main" id="{CA56FDF9-0EA1-4F27-9781-53660756AFEC}"/>
+              </a:ext>
+            </a:extLst>
+          </p:cNvPr>
+          <p:cNvSpPr>
+            <a:spLocks noGrp="1"/>
+          </p:cNvSpPr>
+          <p:nvPr>
+            <p:ph type="title"/>
+          </p:nvPr>
+        </p:nvSpPr>
+        <p:spPr/>
+        <p:txBody>
+          <a:bodyPr/>
+          <a:lstStyle/>
+          <a:p>
+            <a:r>
+              <a:rPr lang="en-US" dirty="0"/>
+              <a:t>Save the YAML</a:t>
+            </a:r>
+          </a:p>
+        </p:txBody>
+      </p:sp>
+      <p:pic>
+        <p:nvPicPr>
+          <p:cNvPr id="4" name="Picture 3">
+            <a:extLst>
+              <a:ext uri="{FF2B5EF4-FFF2-40B4-BE49-F238E27FC236}">
+                <a16:creationId xmlns:a16="http://schemas.microsoft.com/office/drawing/2014/main" id="{0C26CC36-C4F3-4EFC-8EBB-8CAF222D1AC3}"/>
+              </a:ext>
+            </a:extLst>
+          </p:cNvPr>
+          <p:cNvPicPr>
+            <a:picLocks noChangeAspect="1"/>
+          </p:cNvPicPr>
+          <p:nvPr/>
+        </p:nvPicPr>
+        <p:blipFill>
+          <a:blip r:embed="rId2"/>
+          <a:stretch>
+            <a:fillRect/>
+          </a:stretch>
+        </p:blipFill>
+        <p:spPr>
+          <a:xfrm>
+            <a:off x="5106207" y="76619"/>
+            <a:ext cx="5133333" cy="6704762"/>
+          </a:xfrm>
+          <a:prstGeom prst="rect">
+            <a:avLst/>
+          </a:prstGeom>
+        </p:spPr>
+      </p:pic>
+    </p:spTree>
+    <p:extLst>
+      <p:ext uri="{BB962C8B-B14F-4D97-AF65-F5344CB8AC3E}">
+        <p14:creationId xmlns:p14="http://schemas.microsoft.com/office/powerpoint/2010/main" val="643365849"/>
+      </p:ext>
+    </p:extLst>
+  </p:cSld>
+  <p:clrMapOvr>
+    <a:masterClrMapping/>
+  </p:clrMapOvr>
+</p:sld>
+</file>
+
+<file path=ppt/slides/slide13.xml><?xml version="1.0" encoding="utf-8"?>
+<p:sld xmlns:a="http://schemas.openxmlformats.org/drawingml/2006/main" xmlns:r="http://schemas.openxmlformats.org/officeDocument/2006/relationships" xmlns:p="http://schemas.openxmlformats.org/presentationml/2006/main">
+  <p:cSld>
+    <p:spTree>
+      <p:nvGrpSpPr>
+        <p:cNvPr id="1" name=""/>
+        <p:cNvGrpSpPr/>
+        <p:nvPr/>
+      </p:nvGrpSpPr>
+      <p:grpSpPr>
+        <a:xfrm>
+          <a:off x="0" y="0"/>
+          <a:ext cx="0" cy="0"/>
+          <a:chOff x="0" y="0"/>
+          <a:chExt cx="0" cy="0"/>
+        </a:xfrm>
+      </p:grpSpPr>
+      <p:sp>
+        <p:nvSpPr>
+          <p:cNvPr id="2" name="Title 1">
+            <a:extLst>
+              <a:ext uri="{FF2B5EF4-FFF2-40B4-BE49-F238E27FC236}">
+                <a16:creationId xmlns:a16="http://schemas.microsoft.com/office/drawing/2014/main" id="{37D8A537-A2B0-4D56-BC9E-9511417717F4}"/>
+              </a:ext>
+            </a:extLst>
+          </p:cNvPr>
+          <p:cNvSpPr>
+            <a:spLocks noGrp="1"/>
+          </p:cNvSpPr>
+          <p:nvPr>
+            <p:ph type="title"/>
+          </p:nvPr>
+        </p:nvSpPr>
+        <p:spPr/>
+        <p:txBody>
+          <a:bodyPr/>
+          <a:lstStyle/>
+          <a:p>
+            <a:r>
+              <a:rPr lang="en-US" dirty="0"/>
+              <a:t>Let’s add Unit Tests</a:t>
+            </a:r>
+          </a:p>
+        </p:txBody>
+      </p:sp>
+      <p:sp>
+        <p:nvSpPr>
+          <p:cNvPr id="4" name="Content Placeholder 2">
+            <a:extLst>
+              <a:ext uri="{FF2B5EF4-FFF2-40B4-BE49-F238E27FC236}">
+                <a16:creationId xmlns:a16="http://schemas.microsoft.com/office/drawing/2014/main" id="{59CB68D9-0DD9-4942-AD7A-7E86905E00D6}"/>
+              </a:ext>
+            </a:extLst>
+          </p:cNvPr>
+          <p:cNvSpPr>
+            <a:spLocks noGrp="1"/>
+          </p:cNvSpPr>
+          <p:nvPr>
+            <p:ph idx="1"/>
+          </p:nvPr>
+        </p:nvSpPr>
+        <p:spPr>
+          <a:xfrm>
+            <a:off x="1141413" y="1735831"/>
+            <a:ext cx="9905998" cy="4503651"/>
+          </a:xfrm>
+          <a:solidFill>
+            <a:schemeClr val="bg1"/>
+          </a:solidFill>
+        </p:spPr>
+        <p:txBody>
+          <a:bodyPr>
+            <a:normAutofit/>
+          </a:bodyPr>
+          <a:lstStyle/>
+          <a:p>
+            <a:r>
+              <a:rPr lang="en-US" dirty="0"/>
+              <a:t>Create a new folder at same level</a:t>
+            </a:r>
+          </a:p>
+          <a:p>
+            <a:pPr marL="0" indent="0">
+              <a:buNone/>
+            </a:pPr>
+            <a:r>
+              <a:rPr lang="en-US" dirty="0">
+                <a:solidFill>
+                  <a:srgbClr val="92D050"/>
+                </a:solidFill>
+              </a:rPr>
+              <a:t>cd ..</a:t>
+            </a:r>
+          </a:p>
+          <a:p>
+            <a:pPr marL="0" indent="0">
+              <a:buNone/>
+            </a:pPr>
+            <a:r>
+              <a:rPr lang="en-US" dirty="0" err="1">
+                <a:solidFill>
+                  <a:srgbClr val="92D050"/>
+                </a:solidFill>
+              </a:rPr>
+              <a:t>mkdir</a:t>
+            </a:r>
+            <a:r>
+              <a:rPr lang="en-US" dirty="0">
+                <a:solidFill>
+                  <a:srgbClr val="92D050"/>
+                </a:solidFill>
+              </a:rPr>
+              <a:t> tests</a:t>
+            </a:r>
+          </a:p>
+          <a:p>
+            <a:pPr marL="0" indent="0">
+              <a:buNone/>
+            </a:pPr>
+            <a:r>
+              <a:rPr lang="en-US" dirty="0">
+                <a:solidFill>
+                  <a:srgbClr val="92D050"/>
+                </a:solidFill>
+              </a:rPr>
+              <a:t>cd tests</a:t>
+            </a:r>
+          </a:p>
+          <a:p>
+            <a:pPr marL="0" indent="0">
+              <a:buNone/>
+            </a:pPr>
+            <a:r>
+              <a:rPr lang="en-US" dirty="0">
+                <a:solidFill>
+                  <a:srgbClr val="92D050"/>
+                </a:solidFill>
+              </a:rPr>
+              <a:t>dotnet new </a:t>
+            </a:r>
+            <a:r>
+              <a:rPr lang="en-US" dirty="0" err="1">
+                <a:solidFill>
+                  <a:srgbClr val="92D050"/>
+                </a:solidFill>
+              </a:rPr>
+              <a:t>xunit</a:t>
+            </a:r>
+            <a:endParaRPr lang="en-US" dirty="0">
+              <a:solidFill>
+                <a:srgbClr val="92D050"/>
+              </a:solidFill>
+            </a:endParaRPr>
+          </a:p>
+          <a:p>
+            <a:r>
+              <a:rPr lang="en-US" dirty="0"/>
+              <a:t>Add reference to the project (use your .</a:t>
+            </a:r>
+            <a:r>
+              <a:rPr lang="en-US" dirty="0" err="1"/>
+              <a:t>csproj</a:t>
+            </a:r>
+            <a:r>
+              <a:rPr lang="en-US" dirty="0"/>
+              <a:t> path)</a:t>
+            </a:r>
+          </a:p>
+          <a:p>
+            <a:pPr marL="0" indent="0">
+              <a:buNone/>
+            </a:pPr>
+            <a:r>
+              <a:rPr lang="en-US" dirty="0">
+                <a:solidFill>
+                  <a:srgbClr val="92D050"/>
+                </a:solidFill>
+              </a:rPr>
+              <a:t>dotnet add reference ../</a:t>
+            </a:r>
+            <a:r>
+              <a:rPr lang="en-US" dirty="0" err="1">
+                <a:solidFill>
+                  <a:srgbClr val="92D050"/>
+                </a:solidFill>
+              </a:rPr>
+              <a:t>src</a:t>
+            </a:r>
+            <a:r>
+              <a:rPr lang="en-US" dirty="0">
+                <a:solidFill>
+                  <a:srgbClr val="92D050"/>
+                </a:solidFill>
+              </a:rPr>
+              <a:t>/stage1.csproj</a:t>
+            </a:r>
+          </a:p>
+          <a:p>
+            <a:pPr marL="0" indent="0">
+              <a:buNone/>
+            </a:pPr>
+            <a:r>
+              <a:rPr lang="en-US" dirty="0">
+                <a:solidFill>
+                  <a:srgbClr val="92D050"/>
+                </a:solidFill>
+              </a:rPr>
+              <a:t>dotnet restore</a:t>
+            </a:r>
+          </a:p>
+        </p:txBody>
+      </p:sp>
+    </p:spTree>
+    <p:extLst>
+      <p:ext uri="{BB962C8B-B14F-4D97-AF65-F5344CB8AC3E}">
+        <p14:creationId xmlns:p14="http://schemas.microsoft.com/office/powerpoint/2010/main" val="305112464"/>
+      </p:ext>
+    </p:extLst>
+  </p:cSld>
+  <p:clrMapOvr>
+    <a:masterClrMapping/>
+  </p:clrMapOvr>
+</p:sld>
+</file>
+
+<file path=ppt/slides/slide14.xml><?xml version="1.0" encoding="utf-8"?>
+<p:sld xmlns:a="http://schemas.openxmlformats.org/drawingml/2006/main" xmlns:r="http://schemas.openxmlformats.org/officeDocument/2006/relationships" xmlns:p="http://schemas.openxmlformats.org/presentationml/2006/main">
+  <p:cSld>
+    <p:spTree>
+      <p:nvGrpSpPr>
+        <p:cNvPr id="1" name=""/>
+        <p:cNvGrpSpPr/>
+        <p:nvPr/>
+      </p:nvGrpSpPr>
+      <p:grpSpPr>
+        <a:xfrm>
+          <a:off x="0" y="0"/>
+          <a:ext cx="0" cy="0"/>
+          <a:chOff x="0" y="0"/>
+          <a:chExt cx="0" cy="0"/>
+        </a:xfrm>
+      </p:grpSpPr>
+      <p:sp>
+        <p:nvSpPr>
+          <p:cNvPr id="2" name="Title 1">
+            <a:extLst>
+              <a:ext uri="{FF2B5EF4-FFF2-40B4-BE49-F238E27FC236}">
+                <a16:creationId xmlns:a16="http://schemas.microsoft.com/office/drawing/2014/main" id="{734E23CA-696F-400C-9D2D-425CF06A9334}"/>
+              </a:ext>
+            </a:extLst>
+          </p:cNvPr>
+          <p:cNvSpPr>
+            <a:spLocks noGrp="1"/>
+          </p:cNvSpPr>
+          <p:nvPr>
+            <p:ph type="title"/>
+          </p:nvPr>
+        </p:nvSpPr>
+        <p:spPr/>
+        <p:txBody>
+          <a:bodyPr/>
+          <a:lstStyle/>
+          <a:p>
+            <a:r>
+              <a:rPr lang="en-US" dirty="0"/>
+              <a:t>Create a dummy Service</a:t>
+            </a:r>
+          </a:p>
+        </p:txBody>
+      </p:sp>
+      <p:pic>
+        <p:nvPicPr>
+          <p:cNvPr id="4" name="Picture 3">
+            <a:extLst>
+              <a:ext uri="{FF2B5EF4-FFF2-40B4-BE49-F238E27FC236}">
+                <a16:creationId xmlns:a16="http://schemas.microsoft.com/office/drawing/2014/main" id="{94B43CBE-7CB7-441A-BC57-A064D4DF5B67}"/>
+              </a:ext>
+            </a:extLst>
+          </p:cNvPr>
+          <p:cNvPicPr>
+            <a:picLocks noChangeAspect="1"/>
+          </p:cNvPicPr>
+          <p:nvPr/>
+        </p:nvPicPr>
+        <p:blipFill>
+          <a:blip r:embed="rId2"/>
+          <a:stretch>
+            <a:fillRect/>
+          </a:stretch>
+        </p:blipFill>
+        <p:spPr>
+          <a:xfrm>
+            <a:off x="933241" y="2012826"/>
+            <a:ext cx="4428571" cy="3495238"/>
+          </a:xfrm>
+          <a:prstGeom prst="rect">
+            <a:avLst/>
+          </a:prstGeom>
+        </p:spPr>
+      </p:pic>
+      <p:pic>
+        <p:nvPicPr>
+          <p:cNvPr id="5" name="Picture 4">
+            <a:extLst>
+              <a:ext uri="{FF2B5EF4-FFF2-40B4-BE49-F238E27FC236}">
+                <a16:creationId xmlns:a16="http://schemas.microsoft.com/office/drawing/2014/main" id="{E1171B56-7A93-406B-A1FB-380559FC67DA}"/>
+              </a:ext>
+            </a:extLst>
+          </p:cNvPr>
+          <p:cNvPicPr>
+            <a:picLocks noChangeAspect="1"/>
+          </p:cNvPicPr>
+          <p:nvPr/>
+        </p:nvPicPr>
+        <p:blipFill>
+          <a:blip r:embed="rId3"/>
+          <a:stretch>
+            <a:fillRect/>
+          </a:stretch>
+        </p:blipFill>
+        <p:spPr>
+          <a:xfrm>
+            <a:off x="6663027" y="1320897"/>
+            <a:ext cx="4142857" cy="1552381"/>
+          </a:xfrm>
+          <a:prstGeom prst="rect">
+            <a:avLst/>
+          </a:prstGeom>
+        </p:spPr>
+      </p:pic>
+      <p:pic>
+        <p:nvPicPr>
+          <p:cNvPr id="6" name="Picture 5">
+            <a:extLst>
+              <a:ext uri="{FF2B5EF4-FFF2-40B4-BE49-F238E27FC236}">
+                <a16:creationId xmlns:a16="http://schemas.microsoft.com/office/drawing/2014/main" id="{872FE68B-7CED-4F50-94A5-0DF16F086CF0}"/>
+              </a:ext>
+            </a:extLst>
+          </p:cNvPr>
+          <p:cNvPicPr>
+            <a:picLocks noChangeAspect="1"/>
+          </p:cNvPicPr>
+          <p:nvPr/>
+        </p:nvPicPr>
+        <p:blipFill>
+          <a:blip r:embed="rId4"/>
+          <a:stretch>
+            <a:fillRect/>
+          </a:stretch>
+        </p:blipFill>
+        <p:spPr>
+          <a:xfrm>
+            <a:off x="5617029" y="3002567"/>
+            <a:ext cx="6234854" cy="3602748"/>
+          </a:xfrm>
+          <a:prstGeom prst="rect">
+            <a:avLst/>
+          </a:prstGeom>
+        </p:spPr>
+      </p:pic>
+    </p:spTree>
+    <p:extLst>
+      <p:ext uri="{BB962C8B-B14F-4D97-AF65-F5344CB8AC3E}">
+        <p14:creationId xmlns:p14="http://schemas.microsoft.com/office/powerpoint/2010/main" val="2877021556"/>
+      </p:ext>
+    </p:extLst>
+  </p:cSld>
+  <p:clrMapOvr>
+    <a:masterClrMapping/>
+  </p:clrMapOvr>
+</p:sld>
+</file>
+
+<file path=ppt/slides/slide15.xml><?xml version="1.0" encoding="utf-8"?>
+<p:sld xmlns:a="http://schemas.openxmlformats.org/drawingml/2006/main" xmlns:r="http://schemas.openxmlformats.org/officeDocument/2006/relationships" xmlns:p="http://schemas.openxmlformats.org/presentationml/2006/main">
+  <p:cSld>
+    <p:spTree>
+      <p:nvGrpSpPr>
+        <p:cNvPr id="1" name=""/>
+        <p:cNvGrpSpPr/>
+        <p:nvPr/>
+      </p:nvGrpSpPr>
+      <p:grpSpPr>
+        <a:xfrm>
+          <a:off x="0" y="0"/>
+          <a:ext cx="0" cy="0"/>
+          <a:chOff x="0" y="0"/>
+          <a:chExt cx="0" cy="0"/>
+        </a:xfrm>
+      </p:grpSpPr>
+      <p:sp>
+        <p:nvSpPr>
+          <p:cNvPr id="2" name="Title 1">
+            <a:extLst>
+              <a:ext uri="{FF2B5EF4-FFF2-40B4-BE49-F238E27FC236}">
+                <a16:creationId xmlns:a16="http://schemas.microsoft.com/office/drawing/2014/main" id="{AF662CFC-6A35-4009-9A5C-9A4B135298A3}"/>
+              </a:ext>
+            </a:extLst>
+          </p:cNvPr>
+          <p:cNvSpPr>
+            <a:spLocks noGrp="1"/>
+          </p:cNvSpPr>
+          <p:nvPr>
+            <p:ph type="title"/>
+          </p:nvPr>
+        </p:nvSpPr>
+        <p:spPr/>
+        <p:txBody>
+          <a:bodyPr/>
+          <a:lstStyle/>
+          <a:p>
+            <a:r>
+              <a:rPr lang="en-US" dirty="0"/>
+              <a:t>Add Unit Test</a:t>
+            </a:r>
+          </a:p>
+        </p:txBody>
+      </p:sp>
+      <p:pic>
+        <p:nvPicPr>
+          <p:cNvPr id="4" name="Picture 3">
+            <a:extLst>
+              <a:ext uri="{FF2B5EF4-FFF2-40B4-BE49-F238E27FC236}">
+                <a16:creationId xmlns:a16="http://schemas.microsoft.com/office/drawing/2014/main" id="{788B86B9-4097-4EFE-B458-9BE76D655F1A}"/>
+              </a:ext>
+            </a:extLst>
+          </p:cNvPr>
+          <p:cNvPicPr>
+            <a:picLocks noChangeAspect="1"/>
+          </p:cNvPicPr>
+          <p:nvPr/>
+        </p:nvPicPr>
+        <p:blipFill>
+          <a:blip r:embed="rId2"/>
+          <a:stretch>
+            <a:fillRect/>
+          </a:stretch>
+        </p:blipFill>
+        <p:spPr>
+          <a:xfrm>
+            <a:off x="2627094" y="1666766"/>
+            <a:ext cx="5873094" cy="4946870"/>
+          </a:xfrm>
+          <a:prstGeom prst="rect">
+            <a:avLst/>
+          </a:prstGeom>
+        </p:spPr>
+      </p:pic>
+    </p:spTree>
+    <p:extLst>
+      <p:ext uri="{BB962C8B-B14F-4D97-AF65-F5344CB8AC3E}">
+        <p14:creationId xmlns:p14="http://schemas.microsoft.com/office/powerpoint/2010/main" val="1477371138"/>
+      </p:ext>
+    </p:extLst>
+  </p:cSld>
+  <p:clrMapOvr>
+    <a:masterClrMapping/>
+  </p:clrMapOvr>
 </p:sld>
 </file>
 
@@ -17116,10 +17669,10 @@
       </p:sp>
       <p:pic>
         <p:nvPicPr>
-          <p:cNvPr id="8" name="Picture 7">
+          <p:cNvPr id="6" name="Picture 5">
             <a:extLst>
               <a:ext uri="{FF2B5EF4-FFF2-40B4-BE49-F238E27FC236}">
-                <a16:creationId xmlns:a16="http://schemas.microsoft.com/office/drawing/2014/main" id="{E225E7E5-78DB-4C35-81DB-DE1861BF8DB9}"/>
+                <a16:creationId xmlns:a16="http://schemas.microsoft.com/office/drawing/2014/main" id="{D42BC964-7788-4877-84F6-0700F3420B20}"/>
               </a:ext>
             </a:extLst>
           </p:cNvPr>
@@ -17136,8 +17689,8 @@
         </p:blipFill>
         <p:spPr>
           <a:xfrm>
-            <a:off x="3692972" y="145835"/>
-            <a:ext cx="3290071" cy="6259160"/>
+            <a:off x="3703541" y="354563"/>
+            <a:ext cx="3401170" cy="6148873"/>
           </a:xfrm>
           <a:prstGeom prst="rect">
             <a:avLst/>
@@ -17188,7 +17741,7 @@
                                           </p:stCondLst>
                                         </p:cTn>
                                         <p:tgtEl>
-                                          <p:spTgt spid="8"/>
+                                          <p:spTgt spid="6"/>
                                         </p:tgtEl>
                                         <p:attrNameLst>
                                           <p:attrName>style.visibility</p:attrName>

</xml_diff>

<commit_message>
First push to test opencover
</commit_message>
<xml_diff>
--- a/Presentation/Full Open-Source CI.pptx
+++ b/Presentation/Full Open-Source CI.pptx
@@ -20,6 +20,9 @@
     <p:sldId id="268" r:id="rId14"/>
     <p:sldId id="269" r:id="rId15"/>
     <p:sldId id="270" r:id="rId16"/>
+    <p:sldId id="271" r:id="rId17"/>
+    <p:sldId id="272" r:id="rId18"/>
+    <p:sldId id="273" r:id="rId19"/>
   </p:sldIdLst>
   <p:sldSz cx="12192000" cy="6858000"/>
   <p:notesSz cx="6858000" cy="9144000"/>
@@ -1052,7 +1055,7 @@
           <a:noFill/>
           <a:extLst>
             <a:ext uri="{909E8E84-426E-40dd-AFC4-6F175D3DCCD1}">
-              <a14:hiddenFill xmlns="" xmlns:a14="http://schemas.microsoft.com/office/drawing/2010/main">
+              <a14:hiddenFill xmlns:a14="http://schemas.microsoft.com/office/drawing/2010/main" xmlns="">
                 <a:solidFill>
                   <a:srgbClr val="FFFFFF"/>
                 </a:solidFill>
@@ -1112,7 +1115,7 @@
             </a:ln>
             <a:extLst>
               <a:ext uri="{91240B29-F687-4f45-9708-019B960494DF}">
-                <a14:hiddenLine xmlns="" xmlns:a14="http://schemas.microsoft.com/office/drawing/2010/main" w="9525">
+                <a14:hiddenLine xmlns:a14="http://schemas.microsoft.com/office/drawing/2010/main" xmlns="" w="9525">
                   <a:solidFill>
                     <a:srgbClr val="000000"/>
                   </a:solidFill>
@@ -1202,7 +1205,7 @@
             </a:ln>
             <a:extLst>
               <a:ext uri="{91240B29-F687-4f45-9708-019B960494DF}">
-                <a14:hiddenLine xmlns="" xmlns:a14="http://schemas.microsoft.com/office/drawing/2010/main" w="9525">
+                <a14:hiddenLine xmlns:a14="http://schemas.microsoft.com/office/drawing/2010/main" xmlns="" w="9525">
                   <a:solidFill>
                     <a:srgbClr val="000000"/>
                   </a:solidFill>
@@ -1292,7 +1295,7 @@
             </a:ln>
             <a:extLst>
               <a:ext uri="{91240B29-F687-4f45-9708-019B960494DF}">
-                <a14:hiddenLine xmlns="" xmlns:a14="http://schemas.microsoft.com/office/drawing/2010/main" w="9525">
+                <a14:hiddenLine xmlns:a14="http://schemas.microsoft.com/office/drawing/2010/main" xmlns="" w="9525">
                   <a:solidFill>
                     <a:srgbClr val="000000"/>
                   </a:solidFill>
@@ -1326,7 +1329,7 @@
             </a:ln>
             <a:extLst>
               <a:ext uri="{91240B29-F687-4f45-9708-019B960494DF}">
-                <a14:hiddenLine xmlns="" xmlns:a14="http://schemas.microsoft.com/office/drawing/2010/main" w="9525">
+                <a14:hiddenLine xmlns:a14="http://schemas.microsoft.com/office/drawing/2010/main" xmlns="" w="9525">
                   <a:solidFill>
                     <a:srgbClr val="000000"/>
                   </a:solidFill>
@@ -1416,7 +1419,7 @@
             </a:ln>
             <a:extLst>
               <a:ext uri="{91240B29-F687-4f45-9708-019B960494DF}">
-                <a14:hiddenLine xmlns="" xmlns:a14="http://schemas.microsoft.com/office/drawing/2010/main" w="9525">
+                <a14:hiddenLine xmlns:a14="http://schemas.microsoft.com/office/drawing/2010/main" xmlns="" w="9525">
                   <a:solidFill>
                     <a:srgbClr val="000000"/>
                   </a:solidFill>
@@ -1478,7 +1481,7 @@
             </a:ln>
             <a:extLst>
               <a:ext uri="{91240B29-F687-4f45-9708-019B960494DF}">
-                <a14:hiddenLine xmlns="" xmlns:a14="http://schemas.microsoft.com/office/drawing/2010/main" w="9525">
+                <a14:hiddenLine xmlns:a14="http://schemas.microsoft.com/office/drawing/2010/main" xmlns="" w="9525">
                   <a:solidFill>
                     <a:srgbClr val="000000"/>
                   </a:solidFill>
@@ -1540,7 +1543,7 @@
             </a:ln>
             <a:extLst>
               <a:ext uri="{91240B29-F687-4f45-9708-019B960494DF}">
-                <a14:hiddenLine xmlns="" xmlns:a14="http://schemas.microsoft.com/office/drawing/2010/main" w="9525">
+                <a14:hiddenLine xmlns:a14="http://schemas.microsoft.com/office/drawing/2010/main" xmlns="" w="9525">
                   <a:solidFill>
                     <a:srgbClr val="000000"/>
                   </a:solidFill>
@@ -1630,7 +1633,7 @@
             </a:ln>
             <a:extLst>
               <a:ext uri="{91240B29-F687-4f45-9708-019B960494DF}">
-                <a14:hiddenLine xmlns="" xmlns:a14="http://schemas.microsoft.com/office/drawing/2010/main" w="9525">
+                <a14:hiddenLine xmlns:a14="http://schemas.microsoft.com/office/drawing/2010/main" xmlns="" w="9525">
                   <a:solidFill>
                     <a:srgbClr val="000000"/>
                   </a:solidFill>
@@ -1692,7 +1695,7 @@
             </a:ln>
             <a:extLst>
               <a:ext uri="{91240B29-F687-4f45-9708-019B960494DF}">
-                <a14:hiddenLine xmlns="" xmlns:a14="http://schemas.microsoft.com/office/drawing/2010/main" w="9525">
+                <a14:hiddenLine xmlns:a14="http://schemas.microsoft.com/office/drawing/2010/main" xmlns="" w="9525">
                   <a:solidFill>
                     <a:srgbClr val="000000"/>
                   </a:solidFill>
@@ -1754,7 +1757,7 @@
             </a:ln>
             <a:extLst>
               <a:ext uri="{91240B29-F687-4f45-9708-019B960494DF}">
-                <a14:hiddenLine xmlns="" xmlns:a14="http://schemas.microsoft.com/office/drawing/2010/main" w="9525">
+                <a14:hiddenLine xmlns:a14="http://schemas.microsoft.com/office/drawing/2010/main" xmlns="" w="9525">
                   <a:solidFill>
                     <a:srgbClr val="000000"/>
                   </a:solidFill>
@@ -1844,7 +1847,7 @@
             </a:ln>
             <a:extLst>
               <a:ext uri="{91240B29-F687-4f45-9708-019B960494DF}">
-                <a14:hiddenLine xmlns="" xmlns:a14="http://schemas.microsoft.com/office/drawing/2010/main" w="9525">
+                <a14:hiddenLine xmlns:a14="http://schemas.microsoft.com/office/drawing/2010/main" xmlns="" w="9525">
                   <a:solidFill>
                     <a:srgbClr val="000000"/>
                   </a:solidFill>
@@ -1934,7 +1937,7 @@
             </a:ln>
             <a:extLst>
               <a:ext uri="{91240B29-F687-4f45-9708-019B960494DF}">
-                <a14:hiddenLine xmlns="" xmlns:a14="http://schemas.microsoft.com/office/drawing/2010/main" w="9525">
+                <a14:hiddenLine xmlns:a14="http://schemas.microsoft.com/office/drawing/2010/main" xmlns="" w="9525">
                   <a:solidFill>
                     <a:srgbClr val="000000"/>
                   </a:solidFill>
@@ -1996,7 +1999,7 @@
             </a:ln>
             <a:extLst>
               <a:ext uri="{91240B29-F687-4f45-9708-019B960494DF}">
-                <a14:hiddenLine xmlns="" xmlns:a14="http://schemas.microsoft.com/office/drawing/2010/main" w="9525">
+                <a14:hiddenLine xmlns:a14="http://schemas.microsoft.com/office/drawing/2010/main" xmlns="" w="9525">
                   <a:solidFill>
                     <a:srgbClr val="000000"/>
                   </a:solidFill>
@@ -2106,7 +2109,7 @@
             </a:ln>
             <a:extLst>
               <a:ext uri="{91240B29-F687-4f45-9708-019B960494DF}">
-                <a14:hiddenLine xmlns="" xmlns:a14="http://schemas.microsoft.com/office/drawing/2010/main" w="9525">
+                <a14:hiddenLine xmlns:a14="http://schemas.microsoft.com/office/drawing/2010/main" xmlns="" w="9525">
                   <a:solidFill>
                     <a:srgbClr val="000000"/>
                   </a:solidFill>
@@ -2168,7 +2171,7 @@
             </a:ln>
             <a:extLst>
               <a:ext uri="{91240B29-F687-4f45-9708-019B960494DF}">
-                <a14:hiddenLine xmlns="" xmlns:a14="http://schemas.microsoft.com/office/drawing/2010/main" w="9525">
+                <a14:hiddenLine xmlns:a14="http://schemas.microsoft.com/office/drawing/2010/main" xmlns="" w="9525">
                   <a:solidFill>
                     <a:srgbClr val="000000"/>
                   </a:solidFill>
@@ -2258,7 +2261,7 @@
             </a:ln>
             <a:extLst>
               <a:ext uri="{91240B29-F687-4f45-9708-019B960494DF}">
-                <a14:hiddenLine xmlns="" xmlns:a14="http://schemas.microsoft.com/office/drawing/2010/main" w="9525">
+                <a14:hiddenLine xmlns:a14="http://schemas.microsoft.com/office/drawing/2010/main" xmlns="" w="9525">
                   <a:solidFill>
                     <a:srgbClr val="000000"/>
                   </a:solidFill>
@@ -2348,7 +2351,7 @@
             </a:ln>
             <a:extLst>
               <a:ext uri="{91240B29-F687-4f45-9708-019B960494DF}">
-                <a14:hiddenLine xmlns="" xmlns:a14="http://schemas.microsoft.com/office/drawing/2010/main" w="9525">
+                <a14:hiddenLine xmlns:a14="http://schemas.microsoft.com/office/drawing/2010/main" xmlns="" w="9525">
                   <a:solidFill>
                     <a:srgbClr val="000000"/>
                   </a:solidFill>
@@ -2410,7 +2413,7 @@
             </a:ln>
             <a:extLst>
               <a:ext uri="{91240B29-F687-4f45-9708-019B960494DF}">
-                <a14:hiddenLine xmlns="" xmlns:a14="http://schemas.microsoft.com/office/drawing/2010/main" w="9525">
+                <a14:hiddenLine xmlns:a14="http://schemas.microsoft.com/office/drawing/2010/main" xmlns="" w="9525">
                   <a:solidFill>
                     <a:srgbClr val="000000"/>
                   </a:solidFill>
@@ -2500,7 +2503,7 @@
             </a:ln>
             <a:extLst>
               <a:ext uri="{91240B29-F687-4f45-9708-019B960494DF}">
-                <a14:hiddenLine xmlns="" xmlns:a14="http://schemas.microsoft.com/office/drawing/2010/main" w="9525">
+                <a14:hiddenLine xmlns:a14="http://schemas.microsoft.com/office/drawing/2010/main" xmlns="" w="9525">
                   <a:solidFill>
                     <a:srgbClr val="000000"/>
                   </a:solidFill>
@@ -2590,7 +2593,7 @@
             </a:ln>
             <a:extLst>
               <a:ext uri="{91240B29-F687-4f45-9708-019B960494DF}">
-                <a14:hiddenLine xmlns="" xmlns:a14="http://schemas.microsoft.com/office/drawing/2010/main" w="9525">
+                <a14:hiddenLine xmlns:a14="http://schemas.microsoft.com/office/drawing/2010/main" xmlns="" w="9525">
                   <a:solidFill>
                     <a:srgbClr val="000000"/>
                   </a:solidFill>
@@ -2646,7 +2649,7 @@
             </a:ln>
             <a:extLst>
               <a:ext uri="{91240B29-F687-4f45-9708-019B960494DF}">
-                <a14:hiddenLine xmlns="" xmlns:a14="http://schemas.microsoft.com/office/drawing/2010/main" w="9525">
+                <a14:hiddenLine xmlns:a14="http://schemas.microsoft.com/office/drawing/2010/main" xmlns="" w="9525">
                   <a:solidFill>
                     <a:srgbClr val="000000"/>
                   </a:solidFill>
@@ -2736,7 +2739,7 @@
             </a:ln>
             <a:extLst>
               <a:ext uri="{91240B29-F687-4f45-9708-019B960494DF}">
-                <a14:hiddenLine xmlns="" xmlns:a14="http://schemas.microsoft.com/office/drawing/2010/main" w="9525">
+                <a14:hiddenLine xmlns:a14="http://schemas.microsoft.com/office/drawing/2010/main" xmlns="" w="9525">
                   <a:solidFill>
                     <a:srgbClr val="000000"/>
                   </a:solidFill>
@@ -2792,7 +2795,7 @@
             </a:ln>
             <a:extLst>
               <a:ext uri="{91240B29-F687-4f45-9708-019B960494DF}">
-                <a14:hiddenLine xmlns="" xmlns:a14="http://schemas.microsoft.com/office/drawing/2010/main" w="9525">
+                <a14:hiddenLine xmlns:a14="http://schemas.microsoft.com/office/drawing/2010/main" xmlns="" w="9525">
                   <a:solidFill>
                     <a:srgbClr val="000000"/>
                   </a:solidFill>
@@ -2882,7 +2885,7 @@
             </a:ln>
             <a:extLst>
               <a:ext uri="{91240B29-F687-4f45-9708-019B960494DF}">
-                <a14:hiddenLine xmlns="" xmlns:a14="http://schemas.microsoft.com/office/drawing/2010/main" w="9525">
+                <a14:hiddenLine xmlns:a14="http://schemas.microsoft.com/office/drawing/2010/main" xmlns="" w="9525">
                   <a:solidFill>
                     <a:srgbClr val="000000"/>
                   </a:solidFill>
@@ -2950,7 +2953,7 @@
             </a:ln>
             <a:extLst>
               <a:ext uri="{91240B29-F687-4f45-9708-019B960494DF}">
-                <a14:hiddenLine xmlns="" xmlns:a14="http://schemas.microsoft.com/office/drawing/2010/main" w="9525">
+                <a14:hiddenLine xmlns:a14="http://schemas.microsoft.com/office/drawing/2010/main" xmlns="" w="9525">
                   <a:solidFill>
                     <a:srgbClr val="000000"/>
                   </a:solidFill>
@@ -3040,7 +3043,7 @@
             </a:ln>
             <a:extLst>
               <a:ext uri="{91240B29-F687-4f45-9708-019B960494DF}">
-                <a14:hiddenLine xmlns="" xmlns:a14="http://schemas.microsoft.com/office/drawing/2010/main" w="9525">
+                <a14:hiddenLine xmlns:a14="http://schemas.microsoft.com/office/drawing/2010/main" xmlns="" w="9525">
                   <a:solidFill>
                     <a:srgbClr val="000000"/>
                   </a:solidFill>
@@ -3108,7 +3111,7 @@
             </a:ln>
             <a:extLst>
               <a:ext uri="{91240B29-F687-4f45-9708-019B960494DF}">
-                <a14:hiddenLine xmlns="" xmlns:a14="http://schemas.microsoft.com/office/drawing/2010/main" w="9525">
+                <a14:hiddenLine xmlns:a14="http://schemas.microsoft.com/office/drawing/2010/main" xmlns="" w="9525">
                   <a:solidFill>
                     <a:srgbClr val="000000"/>
                   </a:solidFill>
@@ -3198,7 +3201,7 @@
             </a:ln>
             <a:extLst>
               <a:ext uri="{91240B29-F687-4f45-9708-019B960494DF}">
-                <a14:hiddenLine xmlns="" xmlns:a14="http://schemas.microsoft.com/office/drawing/2010/main" w="9525">
+                <a14:hiddenLine xmlns:a14="http://schemas.microsoft.com/office/drawing/2010/main" xmlns="" w="9525">
                   <a:solidFill>
                     <a:srgbClr val="000000"/>
                   </a:solidFill>
@@ -3232,7 +3235,7 @@
             </a:ln>
             <a:extLst>
               <a:ext uri="{91240B29-F687-4f45-9708-019B960494DF}">
-                <a14:hiddenLine xmlns="" xmlns:a14="http://schemas.microsoft.com/office/drawing/2010/main" w="9525">
+                <a14:hiddenLine xmlns:a14="http://schemas.microsoft.com/office/drawing/2010/main" xmlns="" w="9525">
                   <a:solidFill>
                     <a:srgbClr val="000000"/>
                   </a:solidFill>
@@ -3322,7 +3325,7 @@
             </a:ln>
             <a:extLst>
               <a:ext uri="{91240B29-F687-4f45-9708-019B960494DF}">
-                <a14:hiddenLine xmlns="" xmlns:a14="http://schemas.microsoft.com/office/drawing/2010/main" w="9525">
+                <a14:hiddenLine xmlns:a14="http://schemas.microsoft.com/office/drawing/2010/main" xmlns="" w="9525">
                   <a:solidFill>
                     <a:srgbClr val="000000"/>
                   </a:solidFill>
@@ -3384,7 +3387,7 @@
             </a:ln>
             <a:extLst>
               <a:ext uri="{91240B29-F687-4f45-9708-019B960494DF}">
-                <a14:hiddenLine xmlns="" xmlns:a14="http://schemas.microsoft.com/office/drawing/2010/main" w="9525">
+                <a14:hiddenLine xmlns:a14="http://schemas.microsoft.com/office/drawing/2010/main" xmlns="" w="9525">
                   <a:solidFill>
                     <a:srgbClr val="000000"/>
                   </a:solidFill>
@@ -3446,7 +3449,7 @@
             </a:ln>
             <a:extLst>
               <a:ext uri="{91240B29-F687-4f45-9708-019B960494DF}">
-                <a14:hiddenLine xmlns="" xmlns:a14="http://schemas.microsoft.com/office/drawing/2010/main" w="9525">
+                <a14:hiddenLine xmlns:a14="http://schemas.microsoft.com/office/drawing/2010/main" xmlns="" w="9525">
                   <a:solidFill>
                     <a:srgbClr val="000000"/>
                   </a:solidFill>
@@ -3536,7 +3539,7 @@
             </a:ln>
             <a:extLst>
               <a:ext uri="{91240B29-F687-4f45-9708-019B960494DF}">
-                <a14:hiddenLine xmlns="" xmlns:a14="http://schemas.microsoft.com/office/drawing/2010/main" w="9525">
+                <a14:hiddenLine xmlns:a14="http://schemas.microsoft.com/office/drawing/2010/main" xmlns="" w="9525">
                   <a:solidFill>
                     <a:srgbClr val="000000"/>
                   </a:solidFill>
@@ -3604,7 +3607,7 @@
             </a:ln>
             <a:extLst>
               <a:ext uri="{91240B29-F687-4f45-9708-019B960494DF}">
-                <a14:hiddenLine xmlns="" xmlns:a14="http://schemas.microsoft.com/office/drawing/2010/main" w="9525">
+                <a14:hiddenLine xmlns:a14="http://schemas.microsoft.com/office/drawing/2010/main" xmlns="" w="9525">
                   <a:solidFill>
                     <a:srgbClr val="000000"/>
                   </a:solidFill>
@@ -3666,7 +3669,7 @@
             </a:ln>
             <a:extLst>
               <a:ext uri="{91240B29-F687-4f45-9708-019B960494DF}">
-                <a14:hiddenLine xmlns="" xmlns:a14="http://schemas.microsoft.com/office/drawing/2010/main" w="9525">
+                <a14:hiddenLine xmlns:a14="http://schemas.microsoft.com/office/drawing/2010/main" xmlns="" w="9525">
                   <a:solidFill>
                     <a:srgbClr val="000000"/>
                   </a:solidFill>
@@ -3756,7 +3759,7 @@
             </a:ln>
             <a:extLst>
               <a:ext uri="{91240B29-F687-4f45-9708-019B960494DF}">
-                <a14:hiddenLine xmlns="" xmlns:a14="http://schemas.microsoft.com/office/drawing/2010/main" w="9525">
+                <a14:hiddenLine xmlns:a14="http://schemas.microsoft.com/office/drawing/2010/main" xmlns="" w="9525">
                   <a:solidFill>
                     <a:srgbClr val="000000"/>
                   </a:solidFill>
@@ -3818,7 +3821,7 @@
             </a:ln>
             <a:extLst>
               <a:ext uri="{91240B29-F687-4f45-9708-019B960494DF}">
-                <a14:hiddenLine xmlns="" xmlns:a14="http://schemas.microsoft.com/office/drawing/2010/main" w="9525">
+                <a14:hiddenLine xmlns:a14="http://schemas.microsoft.com/office/drawing/2010/main" xmlns="" w="9525">
                   <a:solidFill>
                     <a:srgbClr val="000000"/>
                   </a:solidFill>
@@ -3908,7 +3911,7 @@
             </a:ln>
             <a:extLst>
               <a:ext uri="{91240B29-F687-4f45-9708-019B960494DF}">
-                <a14:hiddenLine xmlns="" xmlns:a14="http://schemas.microsoft.com/office/drawing/2010/main" w="9525">
+                <a14:hiddenLine xmlns:a14="http://schemas.microsoft.com/office/drawing/2010/main" xmlns="" w="9525">
                   <a:solidFill>
                     <a:srgbClr val="000000"/>
                   </a:solidFill>
@@ -3970,7 +3973,7 @@
             </a:ln>
             <a:extLst>
               <a:ext uri="{91240B29-F687-4f45-9708-019B960494DF}">
-                <a14:hiddenLine xmlns="" xmlns:a14="http://schemas.microsoft.com/office/drawing/2010/main" w="9525">
+                <a14:hiddenLine xmlns:a14="http://schemas.microsoft.com/office/drawing/2010/main" xmlns="" w="9525">
                   <a:solidFill>
                     <a:srgbClr val="000000"/>
                   </a:solidFill>
@@ -4060,7 +4063,7 @@
             </a:ln>
             <a:extLst>
               <a:ext uri="{91240B29-F687-4f45-9708-019B960494DF}">
-                <a14:hiddenLine xmlns="" xmlns:a14="http://schemas.microsoft.com/office/drawing/2010/main" w="9525">
+                <a14:hiddenLine xmlns:a14="http://schemas.microsoft.com/office/drawing/2010/main" xmlns="" w="9525">
                   <a:solidFill>
                     <a:srgbClr val="000000"/>
                   </a:solidFill>
@@ -4094,7 +4097,7 @@
             </a:ln>
             <a:extLst>
               <a:ext uri="{91240B29-F687-4f45-9708-019B960494DF}">
-                <a14:hiddenLine xmlns="" xmlns:a14="http://schemas.microsoft.com/office/drawing/2010/main" w="9525">
+                <a14:hiddenLine xmlns:a14="http://schemas.microsoft.com/office/drawing/2010/main" xmlns="" w="9525">
                   <a:solidFill>
                     <a:srgbClr val="000000"/>
                   </a:solidFill>
@@ -4159,7 +4162,7 @@
             </a:ln>
             <a:extLst>
               <a:ext uri="{91240B29-F687-4f45-9708-019B960494DF}">
-                <a14:hiddenLine xmlns="" xmlns:a14="http://schemas.microsoft.com/office/drawing/2010/main" w="9525">
+                <a14:hiddenLine xmlns:a14="http://schemas.microsoft.com/office/drawing/2010/main" xmlns="" w="9525">
                   <a:solidFill>
                     <a:srgbClr val="000000"/>
                   </a:solidFill>
@@ -4249,7 +4252,7 @@
             </a:ln>
             <a:extLst>
               <a:ext uri="{91240B29-F687-4f45-9708-019B960494DF}">
-                <a14:hiddenLine xmlns="" xmlns:a14="http://schemas.microsoft.com/office/drawing/2010/main" w="9525">
+                <a14:hiddenLine xmlns:a14="http://schemas.microsoft.com/office/drawing/2010/main" xmlns="" w="9525">
                   <a:solidFill>
                     <a:srgbClr val="000000"/>
                   </a:solidFill>
@@ -4311,7 +4314,7 @@
             </a:ln>
             <a:extLst>
               <a:ext uri="{91240B29-F687-4f45-9708-019B960494DF}">
-                <a14:hiddenLine xmlns="" xmlns:a14="http://schemas.microsoft.com/office/drawing/2010/main" w="9525">
+                <a14:hiddenLine xmlns:a14="http://schemas.microsoft.com/office/drawing/2010/main" xmlns="" w="9525">
                   <a:solidFill>
                     <a:srgbClr val="000000"/>
                   </a:solidFill>
@@ -4401,7 +4404,7 @@
             </a:ln>
             <a:extLst>
               <a:ext uri="{91240B29-F687-4f45-9708-019B960494DF}">
-                <a14:hiddenLine xmlns="" xmlns:a14="http://schemas.microsoft.com/office/drawing/2010/main" w="9525">
+                <a14:hiddenLine xmlns:a14="http://schemas.microsoft.com/office/drawing/2010/main" xmlns="" w="9525">
                   <a:solidFill>
                     <a:srgbClr val="000000"/>
                   </a:solidFill>
@@ -4491,7 +4494,7 @@
             </a:ln>
             <a:extLst>
               <a:ext uri="{91240B29-F687-4f45-9708-019B960494DF}">
-                <a14:hiddenLine xmlns="" xmlns:a14="http://schemas.microsoft.com/office/drawing/2010/main" w="9525">
+                <a14:hiddenLine xmlns:a14="http://schemas.microsoft.com/office/drawing/2010/main" xmlns="" w="9525">
                   <a:solidFill>
                     <a:srgbClr val="000000"/>
                   </a:solidFill>
@@ -4556,7 +4559,7 @@
             </a:ln>
             <a:extLst>
               <a:ext uri="{91240B29-F687-4f45-9708-019B960494DF}">
-                <a14:hiddenLine xmlns="" xmlns:a14="http://schemas.microsoft.com/office/drawing/2010/main" w="9525">
+                <a14:hiddenLine xmlns:a14="http://schemas.microsoft.com/office/drawing/2010/main" xmlns="" w="9525">
                   <a:solidFill>
                     <a:srgbClr val="000000"/>
                   </a:solidFill>
@@ -4618,7 +4621,7 @@
             </a:ln>
             <a:extLst>
               <a:ext uri="{91240B29-F687-4f45-9708-019B960494DF}">
-                <a14:hiddenLine xmlns="" xmlns:a14="http://schemas.microsoft.com/office/drawing/2010/main" w="9525">
+                <a14:hiddenLine xmlns:a14="http://schemas.microsoft.com/office/drawing/2010/main" xmlns="" w="9525">
                   <a:solidFill>
                     <a:srgbClr val="000000"/>
                   </a:solidFill>
@@ -4708,7 +4711,7 @@
             </a:ln>
             <a:extLst>
               <a:ext uri="{91240B29-F687-4f45-9708-019B960494DF}">
-                <a14:hiddenLine xmlns="" xmlns:a14="http://schemas.microsoft.com/office/drawing/2010/main" w="9525">
+                <a14:hiddenLine xmlns:a14="http://schemas.microsoft.com/office/drawing/2010/main" xmlns="" w="9525">
                   <a:solidFill>
                     <a:srgbClr val="000000"/>
                   </a:solidFill>
@@ -4798,7 +4801,7 @@
             </a:ln>
             <a:extLst>
               <a:ext uri="{91240B29-F687-4f45-9708-019B960494DF}">
-                <a14:hiddenLine xmlns="" xmlns:a14="http://schemas.microsoft.com/office/drawing/2010/main" w="9525">
+                <a14:hiddenLine xmlns:a14="http://schemas.microsoft.com/office/drawing/2010/main" xmlns="" w="9525">
                   <a:solidFill>
                     <a:srgbClr val="000000"/>
                   </a:solidFill>
@@ -4860,7 +4863,7 @@
             </a:ln>
             <a:extLst>
               <a:ext uri="{91240B29-F687-4f45-9708-019B960494DF}">
-                <a14:hiddenLine xmlns="" xmlns:a14="http://schemas.microsoft.com/office/drawing/2010/main" w="9525">
+                <a14:hiddenLine xmlns:a14="http://schemas.microsoft.com/office/drawing/2010/main" xmlns="" w="9525">
                   <a:solidFill>
                     <a:srgbClr val="000000"/>
                   </a:solidFill>
@@ -4980,7 +4983,7 @@
             </a:ln>
             <a:extLst>
               <a:ext uri="{91240B29-F687-4f45-9708-019B960494DF}">
-                <a14:hiddenLine xmlns="" xmlns:a14="http://schemas.microsoft.com/office/drawing/2010/main" w="9525">
+                <a14:hiddenLine xmlns:a14="http://schemas.microsoft.com/office/drawing/2010/main" xmlns="" w="9525">
                   <a:solidFill>
                     <a:srgbClr val="000000"/>
                   </a:solidFill>
@@ -5048,7 +5051,7 @@
             </a:ln>
             <a:extLst>
               <a:ext uri="{91240B29-F687-4f45-9708-019B960494DF}">
-                <a14:hiddenLine xmlns="" xmlns:a14="http://schemas.microsoft.com/office/drawing/2010/main" w="9525">
+                <a14:hiddenLine xmlns:a14="http://schemas.microsoft.com/office/drawing/2010/main" xmlns="" w="9525">
                   <a:solidFill>
                     <a:srgbClr val="000000"/>
                   </a:solidFill>
@@ -5138,7 +5141,7 @@
             </a:ln>
             <a:extLst>
               <a:ext uri="{91240B29-F687-4f45-9708-019B960494DF}">
-                <a14:hiddenLine xmlns="" xmlns:a14="http://schemas.microsoft.com/office/drawing/2010/main" w="9525">
+                <a14:hiddenLine xmlns:a14="http://schemas.microsoft.com/office/drawing/2010/main" xmlns="" w="9525">
                   <a:solidFill>
                     <a:srgbClr val="000000"/>
                   </a:solidFill>
@@ -5279,7 +5282,7 @@
             <a:fld id="{B61BEF0D-F0BB-DE4B-95CE-6DB70DBA9567}" type="datetimeFigureOut">
               <a:rPr lang="en-US" smtClean="0"/>
               <a:pPr/>
-              <a:t>21/07/2018</a:t>
+              <a:t>22/07/2018</a:t>
             </a:fld>
             <a:endParaRPr lang="en-US" dirty="0"/>
           </a:p>
@@ -5548,7 +5551,7 @@
             <a:fld id="{B61BEF0D-F0BB-DE4B-95CE-6DB70DBA9567}" type="datetimeFigureOut">
               <a:rPr lang="en-US" smtClean="0"/>
               <a:pPr/>
-              <a:t>21/07/2018</a:t>
+              <a:t>22/07/2018</a:t>
             </a:fld>
             <a:endParaRPr lang="en-US" dirty="0"/>
           </a:p>
@@ -5746,7 +5749,7 @@
             <a:fld id="{B61BEF0D-F0BB-DE4B-95CE-6DB70DBA9567}" type="datetimeFigureOut">
               <a:rPr lang="en-US" smtClean="0"/>
               <a:pPr/>
-              <a:t>21/07/2018</a:t>
+              <a:t>22/07/2018</a:t>
             </a:fld>
             <a:endParaRPr lang="en-US" dirty="0"/>
           </a:p>
@@ -6011,7 +6014,7 @@
             <a:fld id="{B61BEF0D-F0BB-DE4B-95CE-6DB70DBA9567}" type="datetimeFigureOut">
               <a:rPr lang="en-US" smtClean="0"/>
               <a:pPr/>
-              <a:t>21/07/2018</a:t>
+              <a:t>22/07/2018</a:t>
             </a:fld>
             <a:endParaRPr lang="en-US" dirty="0"/>
           </a:p>
@@ -6447,7 +6450,7 @@
             <a:fld id="{B61BEF0D-F0BB-DE4B-95CE-6DB70DBA9567}" type="datetimeFigureOut">
               <a:rPr lang="en-US" smtClean="0"/>
               <a:pPr/>
-              <a:t>21/07/2018</a:t>
+              <a:t>22/07/2018</a:t>
             </a:fld>
             <a:endParaRPr lang="en-US" dirty="0"/>
           </a:p>
@@ -6995,7 +6998,7 @@
             <a:fld id="{B61BEF0D-F0BB-DE4B-95CE-6DB70DBA9567}" type="datetimeFigureOut">
               <a:rPr lang="en-US" smtClean="0"/>
               <a:pPr/>
-              <a:t>21/07/2018</a:t>
+              <a:t>22/07/2018</a:t>
             </a:fld>
             <a:endParaRPr lang="en-US" dirty="0"/>
           </a:p>
@@ -7717,7 +7720,7 @@
             <a:fld id="{B61BEF0D-F0BB-DE4B-95CE-6DB70DBA9567}" type="datetimeFigureOut">
               <a:rPr lang="en-US" smtClean="0"/>
               <a:pPr/>
-              <a:t>21/07/2018</a:t>
+              <a:t>22/07/2018</a:t>
             </a:fld>
             <a:endParaRPr lang="en-US" dirty="0"/>
           </a:p>
@@ -7889,7 +7892,7 @@
             <a:fld id="{B61BEF0D-F0BB-DE4B-95CE-6DB70DBA9567}" type="datetimeFigureOut">
               <a:rPr lang="en-US" smtClean="0"/>
               <a:pPr/>
-              <a:t>21/07/2018</a:t>
+              <a:t>22/07/2018</a:t>
             </a:fld>
             <a:endParaRPr lang="en-US" dirty="0"/>
           </a:p>
@@ -8071,7 +8074,7 @@
             <a:fld id="{B61BEF0D-F0BB-DE4B-95CE-6DB70DBA9567}" type="datetimeFigureOut">
               <a:rPr lang="en-US" smtClean="0"/>
               <a:pPr/>
-              <a:t>21/07/2018</a:t>
+              <a:t>22/07/2018</a:t>
             </a:fld>
             <a:endParaRPr lang="en-US" dirty="0"/>
           </a:p>
@@ -8243,7 +8246,7 @@
             <a:fld id="{B61BEF0D-F0BB-DE4B-95CE-6DB70DBA9567}" type="datetimeFigureOut">
               <a:rPr lang="en-US" smtClean="0"/>
               <a:pPr/>
-              <a:t>21/07/2018</a:t>
+              <a:t>22/07/2018</a:t>
             </a:fld>
             <a:endParaRPr lang="en-US" dirty="0"/>
           </a:p>
@@ -8495,7 +8498,7 @@
             <a:fld id="{B61BEF0D-F0BB-DE4B-95CE-6DB70DBA9567}" type="datetimeFigureOut">
               <a:rPr lang="en-US" smtClean="0"/>
               <a:pPr/>
-              <a:t>21/07/2018</a:t>
+              <a:t>22/07/2018</a:t>
             </a:fld>
             <a:endParaRPr lang="en-US" dirty="0"/>
           </a:p>
@@ -8729,7 +8732,7 @@
             <a:fld id="{B61BEF0D-F0BB-DE4B-95CE-6DB70DBA9567}" type="datetimeFigureOut">
               <a:rPr lang="en-US" smtClean="0"/>
               <a:pPr/>
-              <a:t>21/07/2018</a:t>
+              <a:t>22/07/2018</a:t>
             </a:fld>
             <a:endParaRPr lang="en-US" dirty="0"/>
           </a:p>
@@ -9112,7 +9115,7 @@
             <a:fld id="{B61BEF0D-F0BB-DE4B-95CE-6DB70DBA9567}" type="datetimeFigureOut">
               <a:rPr lang="en-US" smtClean="0"/>
               <a:pPr/>
-              <a:t>21/07/2018</a:t>
+              <a:t>22/07/2018</a:t>
             </a:fld>
             <a:endParaRPr lang="en-US" dirty="0"/>
           </a:p>
@@ -9232,7 +9235,7 @@
             <a:fld id="{B61BEF0D-F0BB-DE4B-95CE-6DB70DBA9567}" type="datetimeFigureOut">
               <a:rPr lang="en-US" smtClean="0"/>
               <a:pPr/>
-              <a:t>21/07/2018</a:t>
+              <a:t>22/07/2018</a:t>
             </a:fld>
             <a:endParaRPr lang="en-US" dirty="0"/>
           </a:p>
@@ -9329,7 +9332,7 @@
             <a:fld id="{B61BEF0D-F0BB-DE4B-95CE-6DB70DBA9567}" type="datetimeFigureOut">
               <a:rPr lang="en-US" smtClean="0"/>
               <a:pPr/>
-              <a:t>21/07/2018</a:t>
+              <a:t>22/07/2018</a:t>
             </a:fld>
             <a:endParaRPr lang="en-US" dirty="0"/>
           </a:p>
@@ -9580,7 +9583,7 @@
             <a:fld id="{B61BEF0D-F0BB-DE4B-95CE-6DB70DBA9567}" type="datetimeFigureOut">
               <a:rPr lang="en-US" smtClean="0"/>
               <a:pPr/>
-              <a:t>21/07/2018</a:t>
+              <a:t>22/07/2018</a:t>
             </a:fld>
             <a:endParaRPr lang="en-US" dirty="0"/>
           </a:p>
@@ -9862,7 +9865,7 @@
             <a:fld id="{B61BEF0D-F0BB-DE4B-95CE-6DB70DBA9567}" type="datetimeFigureOut">
               <a:rPr lang="en-US" smtClean="0"/>
               <a:pPr/>
-              <a:t>21/07/2018</a:t>
+              <a:t>22/07/2018</a:t>
             </a:fld>
             <a:endParaRPr lang="en-US" dirty="0"/>
           </a:p>
@@ -9979,7 +9982,7 @@
           <a:noFill/>
           <a:extLst>
             <a:ext uri="{909E8E84-426E-40dd-AFC4-6F175D3DCCD1}">
-              <a14:hiddenFill xmlns="" xmlns:a14="http://schemas.microsoft.com/office/drawing/2010/main">
+              <a14:hiddenFill xmlns:a14="http://schemas.microsoft.com/office/drawing/2010/main" xmlns="">
                 <a:solidFill>
                   <a:srgbClr val="FFFFFF"/>
                 </a:solidFill>
@@ -10053,7 +10056,7 @@
               </a:ln>
               <a:extLst>
                 <a:ext uri="{91240B29-F687-4f45-9708-019B960494DF}">
-                  <a14:hiddenLine xmlns="" xmlns:a14="http://schemas.microsoft.com/office/drawing/2010/main" w="9525">
+                  <a14:hiddenLine xmlns:a14="http://schemas.microsoft.com/office/drawing/2010/main" xmlns="" w="9525">
                     <a:solidFill>
                       <a:srgbClr val="000000"/>
                     </a:solidFill>
@@ -10143,7 +10146,7 @@
               </a:ln>
               <a:extLst>
                 <a:ext uri="{91240B29-F687-4f45-9708-019B960494DF}">
-                  <a14:hiddenLine xmlns="" xmlns:a14="http://schemas.microsoft.com/office/drawing/2010/main" w="9525">
+                  <a14:hiddenLine xmlns:a14="http://schemas.microsoft.com/office/drawing/2010/main" xmlns="" w="9525">
                     <a:solidFill>
                       <a:srgbClr val="000000"/>
                     </a:solidFill>
@@ -10233,7 +10236,7 @@
               </a:ln>
               <a:extLst>
                 <a:ext uri="{91240B29-F687-4f45-9708-019B960494DF}">
-                  <a14:hiddenLine xmlns="" xmlns:a14="http://schemas.microsoft.com/office/drawing/2010/main" w="9525">
+                  <a14:hiddenLine xmlns:a14="http://schemas.microsoft.com/office/drawing/2010/main" xmlns="" w="9525">
                     <a:solidFill>
                       <a:srgbClr val="000000"/>
                     </a:solidFill>
@@ -10295,7 +10298,7 @@
               </a:ln>
               <a:extLst>
                 <a:ext uri="{91240B29-F687-4f45-9708-019B960494DF}">
-                  <a14:hiddenLine xmlns="" xmlns:a14="http://schemas.microsoft.com/office/drawing/2010/main" w="9525">
+                  <a14:hiddenLine xmlns:a14="http://schemas.microsoft.com/office/drawing/2010/main" xmlns="" w="9525">
                     <a:solidFill>
                       <a:srgbClr val="000000"/>
                     </a:solidFill>
@@ -10385,7 +10388,7 @@
               </a:ln>
               <a:extLst>
                 <a:ext uri="{91240B29-F687-4f45-9708-019B960494DF}">
-                  <a14:hiddenLine xmlns="" xmlns:a14="http://schemas.microsoft.com/office/drawing/2010/main" w="9525">
+                  <a14:hiddenLine xmlns:a14="http://schemas.microsoft.com/office/drawing/2010/main" xmlns="" w="9525">
                     <a:solidFill>
                       <a:srgbClr val="000000"/>
                     </a:solidFill>
@@ -10447,7 +10450,7 @@
               </a:ln>
               <a:extLst>
                 <a:ext uri="{91240B29-F687-4f45-9708-019B960494DF}">
-                  <a14:hiddenLine xmlns="" xmlns:a14="http://schemas.microsoft.com/office/drawing/2010/main" w="9525">
+                  <a14:hiddenLine xmlns:a14="http://schemas.microsoft.com/office/drawing/2010/main" xmlns="" w="9525">
                     <a:solidFill>
                       <a:srgbClr val="000000"/>
                     </a:solidFill>
@@ -10509,7 +10512,7 @@
               </a:ln>
               <a:extLst>
                 <a:ext uri="{91240B29-F687-4f45-9708-019B960494DF}">
-                  <a14:hiddenLine xmlns="" xmlns:a14="http://schemas.microsoft.com/office/drawing/2010/main" w="9525">
+                  <a14:hiddenLine xmlns:a14="http://schemas.microsoft.com/office/drawing/2010/main" xmlns="" w="9525">
                     <a:solidFill>
                       <a:srgbClr val="000000"/>
                     </a:solidFill>
@@ -10599,7 +10602,7 @@
               </a:ln>
               <a:extLst>
                 <a:ext uri="{91240B29-F687-4f45-9708-019B960494DF}">
-                  <a14:hiddenLine xmlns="" xmlns:a14="http://schemas.microsoft.com/office/drawing/2010/main" w="9525">
+                  <a14:hiddenLine xmlns:a14="http://schemas.microsoft.com/office/drawing/2010/main" xmlns="" w="9525">
                     <a:solidFill>
                       <a:srgbClr val="000000"/>
                     </a:solidFill>
@@ -10689,7 +10692,7 @@
               </a:ln>
               <a:extLst>
                 <a:ext uri="{91240B29-F687-4f45-9708-019B960494DF}">
-                  <a14:hiddenLine xmlns="" xmlns:a14="http://schemas.microsoft.com/office/drawing/2010/main" w="9525">
+                  <a14:hiddenLine xmlns:a14="http://schemas.microsoft.com/office/drawing/2010/main" xmlns="" w="9525">
                     <a:solidFill>
                       <a:srgbClr val="000000"/>
                     </a:solidFill>
@@ -10751,7 +10754,7 @@
               </a:ln>
               <a:extLst>
                 <a:ext uri="{91240B29-F687-4f45-9708-019B960494DF}">
-                  <a14:hiddenLine xmlns="" xmlns:a14="http://schemas.microsoft.com/office/drawing/2010/main" w="9525">
+                  <a14:hiddenLine xmlns:a14="http://schemas.microsoft.com/office/drawing/2010/main" xmlns="" w="9525">
                     <a:solidFill>
                       <a:srgbClr val="000000"/>
                     </a:solidFill>
@@ -10861,7 +10864,7 @@
               </a:ln>
               <a:extLst>
                 <a:ext uri="{91240B29-F687-4f45-9708-019B960494DF}">
-                  <a14:hiddenLine xmlns="" xmlns:a14="http://schemas.microsoft.com/office/drawing/2010/main" w="9525">
+                  <a14:hiddenLine xmlns:a14="http://schemas.microsoft.com/office/drawing/2010/main" xmlns="" w="9525">
                     <a:solidFill>
                       <a:srgbClr val="000000"/>
                     </a:solidFill>
@@ -10945,7 +10948,7 @@
               </a:ln>
               <a:extLst>
                 <a:ext uri="{91240B29-F687-4f45-9708-019B960494DF}">
-                  <a14:hiddenLine xmlns="" xmlns:a14="http://schemas.microsoft.com/office/drawing/2010/main" w="9525">
+                  <a14:hiddenLine xmlns:a14="http://schemas.microsoft.com/office/drawing/2010/main" xmlns="" w="9525">
                     <a:solidFill>
                       <a:srgbClr val="000000"/>
                     </a:solidFill>
@@ -11007,7 +11010,7 @@
               </a:ln>
               <a:extLst>
                 <a:ext uri="{91240B29-F687-4f45-9708-019B960494DF}">
-                  <a14:hiddenLine xmlns="" xmlns:a14="http://schemas.microsoft.com/office/drawing/2010/main" w="9525">
+                  <a14:hiddenLine xmlns:a14="http://schemas.microsoft.com/office/drawing/2010/main" xmlns="" w="9525">
                     <a:solidFill>
                       <a:srgbClr val="000000"/>
                     </a:solidFill>
@@ -11069,7 +11072,7 @@
               </a:ln>
               <a:extLst>
                 <a:ext uri="{91240B29-F687-4f45-9708-019B960494DF}">
-                  <a14:hiddenLine xmlns="" xmlns:a14="http://schemas.microsoft.com/office/drawing/2010/main" w="9525">
+                  <a14:hiddenLine xmlns:a14="http://schemas.microsoft.com/office/drawing/2010/main" xmlns="" w="9525">
                     <a:solidFill>
                       <a:srgbClr val="000000"/>
                     </a:solidFill>
@@ -11159,7 +11162,7 @@
               </a:ln>
               <a:extLst>
                 <a:ext uri="{91240B29-F687-4f45-9708-019B960494DF}">
-                  <a14:hiddenLine xmlns="" xmlns:a14="http://schemas.microsoft.com/office/drawing/2010/main" w="9525">
+                  <a14:hiddenLine xmlns:a14="http://schemas.microsoft.com/office/drawing/2010/main" xmlns="" w="9525">
                     <a:solidFill>
                       <a:srgbClr val="000000"/>
                     </a:solidFill>
@@ -11193,7 +11196,7 @@
               </a:ln>
               <a:extLst>
                 <a:ext uri="{91240B29-F687-4f45-9708-019B960494DF}">
-                  <a14:hiddenLine xmlns="" xmlns:a14="http://schemas.microsoft.com/office/drawing/2010/main" w="9525">
+                  <a14:hiddenLine xmlns:a14="http://schemas.microsoft.com/office/drawing/2010/main" xmlns="" w="9525">
                     <a:solidFill>
                       <a:srgbClr val="000000"/>
                     </a:solidFill>
@@ -11258,7 +11261,7 @@
               </a:ln>
               <a:extLst>
                 <a:ext uri="{91240B29-F687-4f45-9708-019B960494DF}">
-                  <a14:hiddenLine xmlns="" xmlns:a14="http://schemas.microsoft.com/office/drawing/2010/main" w="9525">
+                  <a14:hiddenLine xmlns:a14="http://schemas.microsoft.com/office/drawing/2010/main" xmlns="" w="9525">
                     <a:solidFill>
                       <a:srgbClr val="000000"/>
                     </a:solidFill>
@@ -11348,7 +11351,7 @@
               </a:ln>
               <a:extLst>
                 <a:ext uri="{91240B29-F687-4f45-9708-019B960494DF}">
-                  <a14:hiddenLine xmlns="" xmlns:a14="http://schemas.microsoft.com/office/drawing/2010/main" w="9525">
+                  <a14:hiddenLine xmlns:a14="http://schemas.microsoft.com/office/drawing/2010/main" xmlns="" w="9525">
                     <a:solidFill>
                       <a:srgbClr val="000000"/>
                     </a:solidFill>
@@ -11410,7 +11413,7 @@
               </a:ln>
               <a:extLst>
                 <a:ext uri="{91240B29-F687-4f45-9708-019B960494DF}">
-                  <a14:hiddenLine xmlns="" xmlns:a14="http://schemas.microsoft.com/office/drawing/2010/main" w="9525">
+                  <a14:hiddenLine xmlns:a14="http://schemas.microsoft.com/office/drawing/2010/main" xmlns="" w="9525">
                     <a:solidFill>
                       <a:srgbClr val="000000"/>
                     </a:solidFill>
@@ -11500,7 +11503,7 @@
               </a:ln>
               <a:extLst>
                 <a:ext uri="{91240B29-F687-4f45-9708-019B960494DF}">
-                  <a14:hiddenLine xmlns="" xmlns:a14="http://schemas.microsoft.com/office/drawing/2010/main" w="9525">
+                  <a14:hiddenLine xmlns:a14="http://schemas.microsoft.com/office/drawing/2010/main" xmlns="" w="9525">
                     <a:solidFill>
                       <a:srgbClr val="000000"/>
                     </a:solidFill>
@@ -11565,7 +11568,7 @@
               </a:ln>
               <a:extLst>
                 <a:ext uri="{91240B29-F687-4f45-9708-019B960494DF}">
-                  <a14:hiddenLine xmlns="" xmlns:a14="http://schemas.microsoft.com/office/drawing/2010/main" w="9525">
+                  <a14:hiddenLine xmlns:a14="http://schemas.microsoft.com/office/drawing/2010/main" xmlns="" w="9525">
                     <a:solidFill>
                       <a:srgbClr val="000000"/>
                     </a:solidFill>
@@ -11627,7 +11630,7 @@
               </a:ln>
               <a:extLst>
                 <a:ext uri="{91240B29-F687-4f45-9708-019B960494DF}">
-                  <a14:hiddenLine xmlns="" xmlns:a14="http://schemas.microsoft.com/office/drawing/2010/main" w="9525">
+                  <a14:hiddenLine xmlns:a14="http://schemas.microsoft.com/office/drawing/2010/main" xmlns="" w="9525">
                     <a:solidFill>
                       <a:srgbClr val="000000"/>
                     </a:solidFill>
@@ -11717,7 +11720,7 @@
               </a:ln>
               <a:extLst>
                 <a:ext uri="{91240B29-F687-4f45-9708-019B960494DF}">
-                  <a14:hiddenLine xmlns="" xmlns:a14="http://schemas.microsoft.com/office/drawing/2010/main" w="9525">
+                  <a14:hiddenLine xmlns:a14="http://schemas.microsoft.com/office/drawing/2010/main" xmlns="" w="9525">
                     <a:solidFill>
                       <a:srgbClr val="000000"/>
                     </a:solidFill>
@@ -11807,7 +11810,7 @@
               </a:ln>
               <a:extLst>
                 <a:ext uri="{91240B29-F687-4f45-9708-019B960494DF}">
-                  <a14:hiddenLine xmlns="" xmlns:a14="http://schemas.microsoft.com/office/drawing/2010/main" w="9525">
+                  <a14:hiddenLine xmlns:a14="http://schemas.microsoft.com/office/drawing/2010/main" xmlns="" w="9525">
                     <a:solidFill>
                       <a:srgbClr val="000000"/>
                     </a:solidFill>
@@ -11872,7 +11875,7 @@
               </a:ln>
               <a:extLst>
                 <a:ext uri="{91240B29-F687-4f45-9708-019B960494DF}">
-                  <a14:hiddenLine xmlns="" xmlns:a14="http://schemas.microsoft.com/office/drawing/2010/main" w="9525">
+                  <a14:hiddenLine xmlns:a14="http://schemas.microsoft.com/office/drawing/2010/main" xmlns="" w="9525">
                     <a:solidFill>
                       <a:srgbClr val="000000"/>
                     </a:solidFill>
@@ -11992,7 +11995,7 @@
               </a:ln>
               <a:extLst>
                 <a:ext uri="{91240B29-F687-4f45-9708-019B960494DF}">
-                  <a14:hiddenLine xmlns="" xmlns:a14="http://schemas.microsoft.com/office/drawing/2010/main" w="9525">
+                  <a14:hiddenLine xmlns:a14="http://schemas.microsoft.com/office/drawing/2010/main" xmlns="" w="9525">
                     <a:solidFill>
                       <a:srgbClr val="000000"/>
                     </a:solidFill>
@@ -12090,7 +12093,7 @@
               </a:ln>
               <a:extLst>
                 <a:ext uri="{91240B29-F687-4f45-9708-019B960494DF}">
-                  <a14:hiddenLine xmlns="" xmlns:a14="http://schemas.microsoft.com/office/drawing/2010/main" w="9525">
+                  <a14:hiddenLine xmlns:a14="http://schemas.microsoft.com/office/drawing/2010/main" xmlns="" w="9525">
                     <a:solidFill>
                       <a:srgbClr val="000000"/>
                     </a:solidFill>
@@ -12205,7 +12208,7 @@
               </a:ln>
               <a:extLst>
                 <a:ext uri="{91240B29-F687-4f45-9708-019B960494DF}">
-                  <a14:hiddenLine xmlns="" xmlns:a14="http://schemas.microsoft.com/office/drawing/2010/main" w="9525">
+                  <a14:hiddenLine xmlns:a14="http://schemas.microsoft.com/office/drawing/2010/main" xmlns="" w="9525">
                     <a:solidFill>
                       <a:srgbClr val="000000"/>
                     </a:solidFill>
@@ -12295,7 +12298,7 @@
               </a:ln>
               <a:extLst>
                 <a:ext uri="{91240B29-F687-4f45-9708-019B960494DF}">
-                  <a14:hiddenLine xmlns="" xmlns:a14="http://schemas.microsoft.com/office/drawing/2010/main" w="9525">
+                  <a14:hiddenLine xmlns:a14="http://schemas.microsoft.com/office/drawing/2010/main" xmlns="" w="9525">
                     <a:solidFill>
                       <a:srgbClr val="000000"/>
                     </a:solidFill>
@@ -12360,7 +12363,7 @@
               </a:ln>
               <a:extLst>
                 <a:ext uri="{91240B29-F687-4f45-9708-019B960494DF}">
-                  <a14:hiddenLine xmlns="" xmlns:a14="http://schemas.microsoft.com/office/drawing/2010/main" w="9525">
+                  <a14:hiddenLine xmlns:a14="http://schemas.microsoft.com/office/drawing/2010/main" xmlns="" w="9525">
                     <a:solidFill>
                       <a:srgbClr val="000000"/>
                     </a:solidFill>
@@ -12450,7 +12453,7 @@
               </a:ln>
               <a:extLst>
                 <a:ext uri="{91240B29-F687-4f45-9708-019B960494DF}">
-                  <a14:hiddenLine xmlns="" xmlns:a14="http://schemas.microsoft.com/office/drawing/2010/main" w="9525">
+                  <a14:hiddenLine xmlns:a14="http://schemas.microsoft.com/office/drawing/2010/main" xmlns="" w="9525">
                     <a:solidFill>
                       <a:srgbClr val="000000"/>
                     </a:solidFill>
@@ -12518,7 +12521,7 @@
               </a:ln>
               <a:extLst>
                 <a:ext uri="{91240B29-F687-4f45-9708-019B960494DF}">
-                  <a14:hiddenLine xmlns="" xmlns:a14="http://schemas.microsoft.com/office/drawing/2010/main" w="9525">
+                  <a14:hiddenLine xmlns:a14="http://schemas.microsoft.com/office/drawing/2010/main" xmlns="" w="9525">
                     <a:solidFill>
                       <a:srgbClr val="000000"/>
                     </a:solidFill>
@@ -12608,7 +12611,7 @@
               </a:ln>
               <a:extLst>
                 <a:ext uri="{91240B29-F687-4f45-9708-019B960494DF}">
-                  <a14:hiddenLine xmlns="" xmlns:a14="http://schemas.microsoft.com/office/drawing/2010/main" w="9525">
+                  <a14:hiddenLine xmlns:a14="http://schemas.microsoft.com/office/drawing/2010/main" xmlns="" w="9525">
                     <a:solidFill>
                       <a:srgbClr val="000000"/>
                     </a:solidFill>
@@ -12676,7 +12679,7 @@
               </a:ln>
               <a:extLst>
                 <a:ext uri="{91240B29-F687-4f45-9708-019B960494DF}">
-                  <a14:hiddenLine xmlns="" xmlns:a14="http://schemas.microsoft.com/office/drawing/2010/main" w="9525">
+                  <a14:hiddenLine xmlns:a14="http://schemas.microsoft.com/office/drawing/2010/main" xmlns="" w="9525">
                     <a:solidFill>
                       <a:srgbClr val="000000"/>
                     </a:solidFill>
@@ -12766,7 +12769,7 @@
               </a:ln>
               <a:extLst>
                 <a:ext uri="{91240B29-F687-4f45-9708-019B960494DF}">
-                  <a14:hiddenLine xmlns="" xmlns:a14="http://schemas.microsoft.com/office/drawing/2010/main" w="9525">
+                  <a14:hiddenLine xmlns:a14="http://schemas.microsoft.com/office/drawing/2010/main" xmlns="" w="9525">
                     <a:solidFill>
                       <a:srgbClr val="000000"/>
                     </a:solidFill>
@@ -12800,7 +12803,7 @@
               </a:ln>
               <a:extLst>
                 <a:ext uri="{91240B29-F687-4f45-9708-019B960494DF}">
-                  <a14:hiddenLine xmlns="" xmlns:a14="http://schemas.microsoft.com/office/drawing/2010/main" w="9525">
+                  <a14:hiddenLine xmlns:a14="http://schemas.microsoft.com/office/drawing/2010/main" xmlns="" w="9525">
                     <a:solidFill>
                       <a:srgbClr val="000000"/>
                     </a:solidFill>
@@ -12941,7 +12944,7 @@
             <a:fld id="{B61BEF0D-F0BB-DE4B-95CE-6DB70DBA9567}" type="datetimeFigureOut">
               <a:rPr lang="en-US" smtClean="0"/>
               <a:pPr/>
-              <a:t>21/07/2018</a:t>
+              <a:t>22/07/2018</a:t>
             </a:fld>
             <a:endParaRPr lang="en-US" dirty="0"/>
           </a:p>
@@ -14936,6 +14939,947 @@
     <p:extLst>
       <p:ext uri="{BB962C8B-B14F-4D97-AF65-F5344CB8AC3E}">
         <p14:creationId xmlns:p14="http://schemas.microsoft.com/office/powerpoint/2010/main" val="1477371138"/>
+      </p:ext>
+    </p:extLst>
+  </p:cSld>
+  <p:clrMapOvr>
+    <a:masterClrMapping/>
+  </p:clrMapOvr>
+</p:sld>
+</file>
+
+<file path=ppt/slides/slide16.xml><?xml version="1.0" encoding="utf-8"?>
+<p:sld xmlns:a="http://schemas.openxmlformats.org/drawingml/2006/main" xmlns:r="http://schemas.openxmlformats.org/officeDocument/2006/relationships" xmlns:p="http://schemas.openxmlformats.org/presentationml/2006/main">
+  <p:cSld>
+    <p:spTree>
+      <p:nvGrpSpPr>
+        <p:cNvPr id="1" name=""/>
+        <p:cNvGrpSpPr/>
+        <p:nvPr/>
+      </p:nvGrpSpPr>
+      <p:grpSpPr>
+        <a:xfrm>
+          <a:off x="0" y="0"/>
+          <a:ext cx="0" cy="0"/>
+          <a:chOff x="0" y="0"/>
+          <a:chExt cx="0" cy="0"/>
+        </a:xfrm>
+      </p:grpSpPr>
+      <p:sp>
+        <p:nvSpPr>
+          <p:cNvPr id="2" name="Title 1">
+            <a:extLst>
+              <a:ext uri="{FF2B5EF4-FFF2-40B4-BE49-F238E27FC236}">
+                <a16:creationId xmlns:a16="http://schemas.microsoft.com/office/drawing/2014/main" id="{2A9646E5-3310-41AE-AA3E-A5FEB53FA87D}"/>
+              </a:ext>
+            </a:extLst>
+          </p:cNvPr>
+          <p:cNvSpPr>
+            <a:spLocks noGrp="1"/>
+          </p:cNvSpPr>
+          <p:nvPr>
+            <p:ph type="title"/>
+          </p:nvPr>
+        </p:nvSpPr>
+        <p:spPr/>
+        <p:txBody>
+          <a:bodyPr/>
+          <a:lstStyle/>
+          <a:p>
+            <a:r>
+              <a:rPr lang="en-US" dirty="0"/>
+              <a:t>Run tests in CI</a:t>
+            </a:r>
+          </a:p>
+        </p:txBody>
+      </p:sp>
+      <p:pic>
+        <p:nvPicPr>
+          <p:cNvPr id="4" name="Picture 3">
+            <a:extLst>
+              <a:ext uri="{FF2B5EF4-FFF2-40B4-BE49-F238E27FC236}">
+                <a16:creationId xmlns:a16="http://schemas.microsoft.com/office/drawing/2014/main" id="{4D34D43C-8A0A-4AF0-BE40-648228B50C13}"/>
+              </a:ext>
+            </a:extLst>
+          </p:cNvPr>
+          <p:cNvPicPr>
+            <a:picLocks noChangeAspect="1"/>
+          </p:cNvPicPr>
+          <p:nvPr/>
+        </p:nvPicPr>
+        <p:blipFill>
+          <a:blip r:embed="rId2"/>
+          <a:stretch>
+            <a:fillRect/>
+          </a:stretch>
+        </p:blipFill>
+        <p:spPr>
+          <a:xfrm>
+            <a:off x="4627985" y="175199"/>
+            <a:ext cx="7323885" cy="6507601"/>
+          </a:xfrm>
+          <a:prstGeom prst="rect">
+            <a:avLst/>
+          </a:prstGeom>
+        </p:spPr>
+      </p:pic>
+      <p:pic>
+        <p:nvPicPr>
+          <p:cNvPr id="6" name="Picture 5">
+            <a:extLst>
+              <a:ext uri="{FF2B5EF4-FFF2-40B4-BE49-F238E27FC236}">
+                <a16:creationId xmlns:a16="http://schemas.microsoft.com/office/drawing/2014/main" id="{E5D93A16-B1B8-4757-834A-E715C29D844D}"/>
+              </a:ext>
+            </a:extLst>
+          </p:cNvPr>
+          <p:cNvPicPr>
+            <a:picLocks noChangeAspect="1"/>
+          </p:cNvPicPr>
+          <p:nvPr/>
+        </p:nvPicPr>
+        <p:blipFill>
+          <a:blip r:embed="rId3"/>
+          <a:stretch>
+            <a:fillRect/>
+          </a:stretch>
+        </p:blipFill>
+        <p:spPr>
+          <a:xfrm>
+            <a:off x="401903" y="2159272"/>
+            <a:ext cx="11385017" cy="2539454"/>
+          </a:xfrm>
+          <a:prstGeom prst="rect">
+            <a:avLst/>
+          </a:prstGeom>
+          <a:ln>
+            <a:solidFill>
+              <a:schemeClr val="tx1"/>
+            </a:solidFill>
+          </a:ln>
+        </p:spPr>
+      </p:pic>
+    </p:spTree>
+    <p:extLst>
+      <p:ext uri="{BB962C8B-B14F-4D97-AF65-F5344CB8AC3E}">
+        <p14:creationId xmlns:p14="http://schemas.microsoft.com/office/powerpoint/2010/main" val="289945505"/>
+      </p:ext>
+    </p:extLst>
+  </p:cSld>
+  <p:clrMapOvr>
+    <a:masterClrMapping/>
+  </p:clrMapOvr>
+  <p:timing>
+    <p:tnLst>
+      <p:par>
+        <p:cTn id="1" dur="indefinite" restart="never" nodeType="tmRoot">
+          <p:childTnLst>
+            <p:seq concurrent="1" nextAc="seek">
+              <p:cTn id="2" dur="indefinite" nodeType="mainSeq">
+                <p:childTnLst>
+                  <p:par>
+                    <p:cTn id="3" fill="hold">
+                      <p:stCondLst>
+                        <p:cond delay="indefinite"/>
+                      </p:stCondLst>
+                      <p:childTnLst>
+                        <p:par>
+                          <p:cTn id="4" fill="hold">
+                            <p:stCondLst>
+                              <p:cond delay="0"/>
+                            </p:stCondLst>
+                            <p:childTnLst>
+                              <p:par>
+                                <p:cTn id="5" presetID="1" presetClass="entr" presetSubtype="0" fill="hold" nodeType="clickEffect">
+                                  <p:stCondLst>
+                                    <p:cond delay="0"/>
+                                  </p:stCondLst>
+                                  <p:childTnLst>
+                                    <p:set>
+                                      <p:cBhvr>
+                                        <p:cTn id="6" dur="1" fill="hold">
+                                          <p:stCondLst>
+                                            <p:cond delay="0"/>
+                                          </p:stCondLst>
+                                        </p:cTn>
+                                        <p:tgtEl>
+                                          <p:spTgt spid="6"/>
+                                        </p:tgtEl>
+                                        <p:attrNameLst>
+                                          <p:attrName>style.visibility</p:attrName>
+                                        </p:attrNameLst>
+                                      </p:cBhvr>
+                                      <p:to>
+                                        <p:strVal val="visible"/>
+                                      </p:to>
+                                    </p:set>
+                                  </p:childTnLst>
+                                </p:cTn>
+                              </p:par>
+                            </p:childTnLst>
+                          </p:cTn>
+                        </p:par>
+                      </p:childTnLst>
+                    </p:cTn>
+                  </p:par>
+                </p:childTnLst>
+              </p:cTn>
+              <p:prevCondLst>
+                <p:cond evt="onPrev" delay="0">
+                  <p:tgtEl>
+                    <p:sldTgt/>
+                  </p:tgtEl>
+                </p:cond>
+              </p:prevCondLst>
+              <p:nextCondLst>
+                <p:cond evt="onNext" delay="0">
+                  <p:tgtEl>
+                    <p:sldTgt/>
+                  </p:tgtEl>
+                </p:cond>
+              </p:nextCondLst>
+            </p:seq>
+          </p:childTnLst>
+        </p:cTn>
+      </p:par>
+    </p:tnLst>
+  </p:timing>
+</p:sld>
+</file>
+
+<file path=ppt/slides/slide17.xml><?xml version="1.0" encoding="utf-8"?>
+<p:sld xmlns:a="http://schemas.openxmlformats.org/drawingml/2006/main" xmlns:r="http://schemas.openxmlformats.org/officeDocument/2006/relationships" xmlns:p="http://schemas.openxmlformats.org/presentationml/2006/main">
+  <p:cSld>
+    <p:spTree>
+      <p:nvGrpSpPr>
+        <p:cNvPr id="1" name=""/>
+        <p:cNvGrpSpPr/>
+        <p:nvPr/>
+      </p:nvGrpSpPr>
+      <p:grpSpPr>
+        <a:xfrm>
+          <a:off x="0" y="0"/>
+          <a:ext cx="0" cy="0"/>
+          <a:chOff x="0" y="0"/>
+          <a:chExt cx="0" cy="0"/>
+        </a:xfrm>
+      </p:grpSpPr>
+      <p:sp>
+        <p:nvSpPr>
+          <p:cNvPr id="2" name="Title 1">
+            <a:extLst>
+              <a:ext uri="{FF2B5EF4-FFF2-40B4-BE49-F238E27FC236}">
+                <a16:creationId xmlns:a16="http://schemas.microsoft.com/office/drawing/2014/main" id="{1F17101C-C182-484C-8B30-8786585B633D}"/>
+              </a:ext>
+            </a:extLst>
+          </p:cNvPr>
+          <p:cNvSpPr>
+            <a:spLocks noGrp="1"/>
+          </p:cNvSpPr>
+          <p:nvPr>
+            <p:ph type="title"/>
+          </p:nvPr>
+        </p:nvSpPr>
+        <p:spPr/>
+        <p:txBody>
+          <a:bodyPr/>
+          <a:lstStyle/>
+          <a:p>
+            <a:r>
+              <a:rPr lang="en-US" dirty="0"/>
+              <a:t>Let’s add Code Coverage</a:t>
+            </a:r>
+          </a:p>
+        </p:txBody>
+      </p:sp>
+      <p:sp>
+        <p:nvSpPr>
+          <p:cNvPr id="4" name="Content Placeholder 2">
+            <a:extLst>
+              <a:ext uri="{FF2B5EF4-FFF2-40B4-BE49-F238E27FC236}">
+                <a16:creationId xmlns:a16="http://schemas.microsoft.com/office/drawing/2014/main" id="{53D969F6-A566-4D12-AC27-8C134A16B817}"/>
+              </a:ext>
+            </a:extLst>
+          </p:cNvPr>
+          <p:cNvSpPr>
+            <a:spLocks noGrp="1"/>
+          </p:cNvSpPr>
+          <p:nvPr>
+            <p:ph idx="1"/>
+          </p:nvPr>
+        </p:nvSpPr>
+        <p:spPr>
+          <a:xfrm>
+            <a:off x="1141413" y="1735831"/>
+            <a:ext cx="9905998" cy="4503651"/>
+          </a:xfrm>
+          <a:solidFill>
+            <a:schemeClr val="bg1"/>
+          </a:solidFill>
+        </p:spPr>
+        <p:txBody>
+          <a:bodyPr>
+            <a:normAutofit fontScale="92500"/>
+          </a:bodyPr>
+          <a:lstStyle/>
+          <a:p>
+            <a:r>
+              <a:rPr lang="en-US" dirty="0"/>
+              <a:t>Add </a:t>
+            </a:r>
+            <a:r>
+              <a:rPr lang="en-US" dirty="0" err="1"/>
+              <a:t>opencover</a:t>
+            </a:r>
+            <a:r>
+              <a:rPr lang="en-US" dirty="0"/>
+              <a:t> dependency</a:t>
+            </a:r>
+          </a:p>
+          <a:p>
+            <a:pPr marL="0" indent="0">
+              <a:buNone/>
+            </a:pPr>
+            <a:r>
+              <a:rPr lang="en-US" dirty="0">
+                <a:solidFill>
+                  <a:srgbClr val="92D050"/>
+                </a:solidFill>
+              </a:rPr>
+              <a:t>dotnet add package </a:t>
+            </a:r>
+            <a:r>
+              <a:rPr lang="en-US" dirty="0" err="1">
+                <a:solidFill>
+                  <a:srgbClr val="92D050"/>
+                </a:solidFill>
+              </a:rPr>
+              <a:t>opencover</a:t>
+            </a:r>
+            <a:endParaRPr lang="en-US" dirty="0">
+              <a:solidFill>
+                <a:srgbClr val="92D050"/>
+              </a:solidFill>
+            </a:endParaRPr>
+          </a:p>
+          <a:p>
+            <a:pPr marL="0" indent="0">
+              <a:buNone/>
+            </a:pPr>
+            <a:r>
+              <a:rPr lang="en-US" dirty="0">
+                <a:solidFill>
+                  <a:srgbClr val="92D050"/>
+                </a:solidFill>
+              </a:rPr>
+              <a:t>dotnet restore</a:t>
+            </a:r>
+          </a:p>
+          <a:p>
+            <a:r>
+              <a:rPr lang="en-US" dirty="0"/>
+              <a:t>Find the local </a:t>
+            </a:r>
+            <a:r>
+              <a:rPr lang="en-US" dirty="0" err="1"/>
+              <a:t>nuget</a:t>
+            </a:r>
+            <a:r>
+              <a:rPr lang="en-US" dirty="0"/>
+              <a:t> folder</a:t>
+            </a:r>
+          </a:p>
+          <a:p>
+            <a:pPr marL="0" indent="0">
+              <a:buNone/>
+            </a:pPr>
+            <a:r>
+              <a:rPr lang="en-US" dirty="0">
+                <a:solidFill>
+                  <a:srgbClr val="92D050"/>
+                </a:solidFill>
+              </a:rPr>
+              <a:t>dotnet </a:t>
+            </a:r>
+            <a:r>
+              <a:rPr lang="en-US" dirty="0" err="1">
+                <a:solidFill>
+                  <a:srgbClr val="92D050"/>
+                </a:solidFill>
+              </a:rPr>
+              <a:t>nuget</a:t>
+            </a:r>
+            <a:r>
+              <a:rPr lang="en-US" dirty="0">
+                <a:solidFill>
+                  <a:srgbClr val="92D050"/>
+                </a:solidFill>
+              </a:rPr>
+              <a:t> locals -l global-packages</a:t>
+            </a:r>
+          </a:p>
+          <a:p>
+            <a:r>
+              <a:rPr lang="en-US" dirty="0"/>
+              <a:t>Run </a:t>
+            </a:r>
+            <a:r>
+              <a:rPr lang="en-US" dirty="0" err="1"/>
+              <a:t>opencover</a:t>
+            </a:r>
+            <a:endParaRPr lang="en-US" dirty="0"/>
+          </a:p>
+          <a:p>
+            <a:pPr marL="0" indent="0">
+              <a:buNone/>
+            </a:pPr>
+            <a:r>
+              <a:rPr lang="en-US" dirty="0">
+                <a:solidFill>
+                  <a:srgbClr val="92D050"/>
+                </a:solidFill>
+              </a:rPr>
+              <a:t>&amp; $HOME\.</a:t>
+            </a:r>
+            <a:r>
+              <a:rPr lang="en-US" dirty="0" err="1">
+                <a:solidFill>
+                  <a:srgbClr val="92D050"/>
+                </a:solidFill>
+              </a:rPr>
+              <a:t>nuget</a:t>
+            </a:r>
+            <a:r>
+              <a:rPr lang="en-US" dirty="0">
+                <a:solidFill>
+                  <a:srgbClr val="92D050"/>
+                </a:solidFill>
+              </a:rPr>
+              <a:t>\packages\</a:t>
+            </a:r>
+            <a:r>
+              <a:rPr lang="en-US" dirty="0" err="1">
+                <a:solidFill>
+                  <a:srgbClr val="92D050"/>
+                </a:solidFill>
+              </a:rPr>
+              <a:t>opencover</a:t>
+            </a:r>
+            <a:r>
+              <a:rPr lang="en-US" dirty="0">
+                <a:solidFill>
+                  <a:srgbClr val="92D050"/>
+                </a:solidFill>
+              </a:rPr>
+              <a:t>\4.6.519\tools\OpenCover.Console.exe -</a:t>
+            </a:r>
+            <a:r>
+              <a:rPr lang="en-US" dirty="0" err="1">
+                <a:solidFill>
+                  <a:srgbClr val="92D050"/>
+                </a:solidFill>
+              </a:rPr>
+              <a:t>register:user</a:t>
+            </a:r>
+            <a:r>
+              <a:rPr lang="en-US" dirty="0">
+                <a:solidFill>
+                  <a:srgbClr val="92D050"/>
+                </a:solidFill>
+              </a:rPr>
+              <a:t> -</a:t>
+            </a:r>
+            <a:r>
+              <a:rPr lang="en-US" dirty="0" err="1">
+                <a:solidFill>
+                  <a:srgbClr val="92D050"/>
+                </a:solidFill>
+              </a:rPr>
+              <a:t>oldStyle</a:t>
+            </a:r>
+            <a:r>
+              <a:rPr lang="en-US" dirty="0">
+                <a:solidFill>
+                  <a:srgbClr val="92D050"/>
+                </a:solidFill>
+              </a:rPr>
+              <a:t> -</a:t>
+            </a:r>
+            <a:r>
+              <a:rPr lang="en-US" dirty="0" err="1">
+                <a:solidFill>
+                  <a:srgbClr val="92D050"/>
+                </a:solidFill>
+              </a:rPr>
+              <a:t>target:"dotnet.exe</a:t>
+            </a:r>
+            <a:r>
+              <a:rPr lang="en-US" dirty="0">
+                <a:solidFill>
+                  <a:srgbClr val="92D050"/>
+                </a:solidFill>
+              </a:rPr>
+              <a:t>" -</a:t>
+            </a:r>
+            <a:r>
+              <a:rPr lang="en-US" dirty="0" err="1">
+                <a:solidFill>
+                  <a:srgbClr val="92D050"/>
+                </a:solidFill>
+              </a:rPr>
+              <a:t>targetargs</a:t>
+            </a:r>
+            <a:r>
+              <a:rPr lang="en-US" dirty="0">
+                <a:solidFill>
+                  <a:srgbClr val="92D050"/>
+                </a:solidFill>
+              </a:rPr>
+              <a:t>:"test </a:t>
+            </a:r>
+            <a:r>
+              <a:rPr lang="en-US" dirty="0" err="1">
+                <a:solidFill>
+                  <a:srgbClr val="92D050"/>
+                </a:solidFill>
+              </a:rPr>
+              <a:t>tests.csproj</a:t>
+            </a:r>
+            <a:r>
+              <a:rPr lang="en-US" dirty="0">
+                <a:solidFill>
+                  <a:srgbClr val="92D050"/>
+                </a:solidFill>
+              </a:rPr>
+              <a:t>" -filter:"+[</a:t>
+            </a:r>
+            <a:r>
+              <a:rPr lang="en-US" dirty="0" err="1">
+                <a:solidFill>
+                  <a:srgbClr val="92D050"/>
+                </a:solidFill>
+              </a:rPr>
+              <a:t>opensourceci</a:t>
+            </a:r>
+            <a:r>
+              <a:rPr lang="en-US" dirty="0">
+                <a:solidFill>
+                  <a:srgbClr val="92D050"/>
+                </a:solidFill>
+              </a:rPr>
+              <a:t>*]* +[tests*]*" -</a:t>
+            </a:r>
+            <a:r>
+              <a:rPr lang="en-US" dirty="0" err="1">
+                <a:solidFill>
+                  <a:srgbClr val="92D050"/>
+                </a:solidFill>
+              </a:rPr>
+              <a:t>output:"coverage.xml</a:t>
+            </a:r>
+            <a:r>
+              <a:rPr lang="en-US" dirty="0">
+                <a:solidFill>
+                  <a:srgbClr val="92D050"/>
+                </a:solidFill>
+              </a:rPr>
+              <a:t>"</a:t>
+            </a:r>
+          </a:p>
+          <a:p>
+            <a:pPr marL="0" indent="0">
+              <a:buNone/>
+            </a:pPr>
+            <a:endParaRPr lang="en-US" dirty="0">
+              <a:solidFill>
+                <a:srgbClr val="92D050"/>
+              </a:solidFill>
+            </a:endParaRPr>
+          </a:p>
+        </p:txBody>
+      </p:sp>
+      <p:sp>
+        <p:nvSpPr>
+          <p:cNvPr id="5" name="TextBox 4">
+            <a:extLst>
+              <a:ext uri="{FF2B5EF4-FFF2-40B4-BE49-F238E27FC236}">
+                <a16:creationId xmlns:a16="http://schemas.microsoft.com/office/drawing/2014/main" id="{41221D88-437B-4D82-A71A-9D2B7AF51A8D}"/>
+              </a:ext>
+            </a:extLst>
+          </p:cNvPr>
+          <p:cNvSpPr txBox="1"/>
+          <p:nvPr/>
+        </p:nvSpPr>
+        <p:spPr>
+          <a:xfrm>
+            <a:off x="1141413" y="1571610"/>
+            <a:ext cx="9905997" cy="4832092"/>
+          </a:xfrm>
+          <a:prstGeom prst="rect">
+            <a:avLst/>
+          </a:prstGeom>
+          <a:solidFill>
+            <a:schemeClr val="bg2">
+              <a:lumMod val="75000"/>
+            </a:schemeClr>
+          </a:solidFill>
+          <a:ln w="12700">
+            <a:solidFill>
+              <a:schemeClr val="tx1"/>
+            </a:solidFill>
+          </a:ln>
+        </p:spPr>
+        <p:txBody>
+          <a:bodyPr wrap="square" rtlCol="0">
+            <a:spAutoFit/>
+          </a:bodyPr>
+          <a:lstStyle/>
+          <a:p>
+            <a:r>
+              <a:rPr lang="en-US" sz="2800" dirty="0" err="1"/>
+              <a:t>Opencover</a:t>
+            </a:r>
+            <a:r>
+              <a:rPr lang="en-US" sz="2800" dirty="0"/>
+              <a:t> parameters:</a:t>
+            </a:r>
+          </a:p>
+          <a:p>
+            <a:pPr marL="285750" indent="-285750">
+              <a:buFontTx/>
+              <a:buChar char="-"/>
+            </a:pPr>
+            <a:r>
+              <a:rPr lang="en-US" sz="2800" dirty="0"/>
+              <a:t> </a:t>
+            </a:r>
+            <a:r>
+              <a:rPr lang="en-US" sz="2800" b="1" dirty="0">
+                <a:solidFill>
+                  <a:schemeClr val="accent1">
+                    <a:lumMod val="75000"/>
+                  </a:schemeClr>
+                </a:solidFill>
+              </a:rPr>
+              <a:t>register</a:t>
+            </a:r>
+            <a:r>
+              <a:rPr lang="en-US" sz="2800" dirty="0"/>
+              <a:t>: to register the code coverage (the OS will not let you inspect DLL if this setting is not correct). In our case, use “-</a:t>
+            </a:r>
+            <a:r>
+              <a:rPr lang="en-US" sz="2800" dirty="0" err="1"/>
+              <a:t>register:user</a:t>
+            </a:r>
+            <a:r>
+              <a:rPr lang="en-US" sz="2800" dirty="0"/>
+              <a:t>”</a:t>
+            </a:r>
+          </a:p>
+          <a:p>
+            <a:pPr marL="285750" indent="-285750">
+              <a:buFontTx/>
+              <a:buChar char="-"/>
+            </a:pPr>
+            <a:r>
+              <a:rPr lang="en-US" sz="2800" dirty="0"/>
+              <a:t> </a:t>
+            </a:r>
+            <a:r>
+              <a:rPr lang="en-US" sz="2800" b="1" dirty="0" err="1">
+                <a:solidFill>
+                  <a:schemeClr val="accent1">
+                    <a:lumMod val="75000"/>
+                  </a:schemeClr>
+                </a:solidFill>
+              </a:rPr>
+              <a:t>oldStyle</a:t>
+            </a:r>
+            <a:r>
+              <a:rPr lang="en-US" sz="2800" dirty="0"/>
+              <a:t>: used for pre-Silverlight code. It also helps to inspect dotnet core code </a:t>
+            </a:r>
+            <a:r>
+              <a:rPr lang="en-US" sz="2800" dirty="0">
+                <a:sym typeface="Wingdings" panose="05000000000000000000" pitchFamily="2" charset="2"/>
+              </a:rPr>
+              <a:t></a:t>
+            </a:r>
+          </a:p>
+          <a:p>
+            <a:pPr marL="285750" indent="-285750">
+              <a:buFontTx/>
+              <a:buChar char="-"/>
+            </a:pPr>
+            <a:r>
+              <a:rPr lang="en-US" sz="2800" dirty="0">
+                <a:sym typeface="Wingdings" panose="05000000000000000000" pitchFamily="2" charset="2"/>
+              </a:rPr>
+              <a:t> </a:t>
+            </a:r>
+            <a:r>
+              <a:rPr lang="en-US" sz="2800" b="1" dirty="0">
+                <a:solidFill>
+                  <a:schemeClr val="accent1">
+                    <a:lumMod val="75000"/>
+                  </a:schemeClr>
+                </a:solidFill>
+                <a:sym typeface="Wingdings" panose="05000000000000000000" pitchFamily="2" charset="2"/>
+              </a:rPr>
+              <a:t>target</a:t>
+            </a:r>
+            <a:r>
+              <a:rPr lang="en-US" sz="2800" dirty="0">
+                <a:sym typeface="Wingdings" panose="05000000000000000000" pitchFamily="2" charset="2"/>
+              </a:rPr>
+              <a:t>: what command to execute</a:t>
+            </a:r>
+          </a:p>
+          <a:p>
+            <a:pPr marL="285750" indent="-285750">
+              <a:buFontTx/>
+              <a:buChar char="-"/>
+            </a:pPr>
+            <a:r>
+              <a:rPr lang="en-US" sz="2800" dirty="0"/>
+              <a:t> </a:t>
+            </a:r>
+            <a:r>
+              <a:rPr lang="en-US" sz="2800" b="1" dirty="0" err="1">
+                <a:solidFill>
+                  <a:schemeClr val="accent1">
+                    <a:lumMod val="75000"/>
+                  </a:schemeClr>
+                </a:solidFill>
+              </a:rPr>
+              <a:t>targetargs</a:t>
+            </a:r>
+            <a:r>
+              <a:rPr lang="en-US" sz="2800" dirty="0"/>
+              <a:t>: the parameters to run the above command</a:t>
+            </a:r>
+          </a:p>
+          <a:p>
+            <a:pPr marL="285750" indent="-285750">
+              <a:buFontTx/>
+              <a:buChar char="-"/>
+            </a:pPr>
+            <a:r>
+              <a:rPr lang="en-US" sz="2800" dirty="0"/>
+              <a:t> </a:t>
+            </a:r>
+            <a:r>
+              <a:rPr lang="en-US" sz="2800" b="1" dirty="0">
+                <a:solidFill>
+                  <a:schemeClr val="accent1">
+                    <a:lumMod val="75000"/>
+                  </a:schemeClr>
+                </a:solidFill>
+              </a:rPr>
+              <a:t>filter</a:t>
+            </a:r>
+            <a:r>
+              <a:rPr lang="en-US" sz="2800" dirty="0"/>
+              <a:t>: to include/exclude code to cover (namespace names, supports wildcard)</a:t>
+            </a:r>
+          </a:p>
+          <a:p>
+            <a:pPr marL="285750" indent="-285750">
+              <a:buFontTx/>
+              <a:buChar char="-"/>
+            </a:pPr>
+            <a:r>
+              <a:rPr lang="en-US" sz="2800" dirty="0"/>
+              <a:t> </a:t>
+            </a:r>
+            <a:r>
+              <a:rPr lang="en-US" sz="2800" b="1" dirty="0">
+                <a:solidFill>
+                  <a:schemeClr val="accent1">
+                    <a:lumMod val="75000"/>
+                  </a:schemeClr>
+                </a:solidFill>
+              </a:rPr>
+              <a:t>output</a:t>
+            </a:r>
+            <a:r>
+              <a:rPr lang="en-US" sz="2800" dirty="0"/>
+              <a:t>: the XML to output that can be sent to reporting</a:t>
+            </a:r>
+          </a:p>
+        </p:txBody>
+      </p:sp>
+    </p:spTree>
+    <p:extLst>
+      <p:ext uri="{BB962C8B-B14F-4D97-AF65-F5344CB8AC3E}">
+        <p14:creationId xmlns:p14="http://schemas.microsoft.com/office/powerpoint/2010/main" val="1447913520"/>
+      </p:ext>
+    </p:extLst>
+  </p:cSld>
+  <p:clrMapOvr>
+    <a:masterClrMapping/>
+  </p:clrMapOvr>
+  <p:timing>
+    <p:tnLst>
+      <p:par>
+        <p:cTn id="1" dur="indefinite" restart="never" nodeType="tmRoot">
+          <p:childTnLst>
+            <p:seq concurrent="1" nextAc="seek">
+              <p:cTn id="2" dur="indefinite" nodeType="mainSeq">
+                <p:childTnLst>
+                  <p:par>
+                    <p:cTn id="3" fill="hold">
+                      <p:stCondLst>
+                        <p:cond delay="indefinite"/>
+                      </p:stCondLst>
+                      <p:childTnLst>
+                        <p:par>
+                          <p:cTn id="4" fill="hold">
+                            <p:stCondLst>
+                              <p:cond delay="0"/>
+                            </p:stCondLst>
+                            <p:childTnLst>
+                              <p:par>
+                                <p:cTn id="5" presetID="1" presetClass="exit" presetSubtype="0" fill="hold" grpId="0" nodeType="clickEffect">
+                                  <p:stCondLst>
+                                    <p:cond delay="0"/>
+                                  </p:stCondLst>
+                                  <p:childTnLst>
+                                    <p:set>
+                                      <p:cBhvr>
+                                        <p:cTn id="6" dur="1" fill="hold">
+                                          <p:stCondLst>
+                                            <p:cond delay="0"/>
+                                          </p:stCondLst>
+                                        </p:cTn>
+                                        <p:tgtEl>
+                                          <p:spTgt spid="5"/>
+                                        </p:tgtEl>
+                                        <p:attrNameLst>
+                                          <p:attrName>style.visibility</p:attrName>
+                                        </p:attrNameLst>
+                                      </p:cBhvr>
+                                      <p:to>
+                                        <p:strVal val="hidden"/>
+                                      </p:to>
+                                    </p:set>
+                                  </p:childTnLst>
+                                </p:cTn>
+                              </p:par>
+                            </p:childTnLst>
+                          </p:cTn>
+                        </p:par>
+                      </p:childTnLst>
+                    </p:cTn>
+                  </p:par>
+                </p:childTnLst>
+              </p:cTn>
+              <p:prevCondLst>
+                <p:cond evt="onPrev" delay="0">
+                  <p:tgtEl>
+                    <p:sldTgt/>
+                  </p:tgtEl>
+                </p:cond>
+              </p:prevCondLst>
+              <p:nextCondLst>
+                <p:cond evt="onNext" delay="0">
+                  <p:tgtEl>
+                    <p:sldTgt/>
+                  </p:tgtEl>
+                </p:cond>
+              </p:nextCondLst>
+            </p:seq>
+          </p:childTnLst>
+        </p:cTn>
+      </p:par>
+    </p:tnLst>
+    <p:bldLst>
+      <p:bldP spid="5" grpId="0" animBg="1"/>
+    </p:bldLst>
+  </p:timing>
+</p:sld>
+</file>
+
+<file path=ppt/slides/slide18.xml><?xml version="1.0" encoding="utf-8"?>
+<p:sld xmlns:a="http://schemas.openxmlformats.org/drawingml/2006/main" xmlns:r="http://schemas.openxmlformats.org/officeDocument/2006/relationships" xmlns:p="http://schemas.openxmlformats.org/presentationml/2006/main">
+  <p:cSld>
+    <p:spTree>
+      <p:nvGrpSpPr>
+        <p:cNvPr id="1" name=""/>
+        <p:cNvGrpSpPr/>
+        <p:nvPr/>
+      </p:nvGrpSpPr>
+      <p:grpSpPr>
+        <a:xfrm>
+          <a:off x="0" y="0"/>
+          <a:ext cx="0" cy="0"/>
+          <a:chOff x="0" y="0"/>
+          <a:chExt cx="0" cy="0"/>
+        </a:xfrm>
+      </p:grpSpPr>
+      <p:sp>
+        <p:nvSpPr>
+          <p:cNvPr id="2" name="Title 1">
+            <a:extLst>
+              <a:ext uri="{FF2B5EF4-FFF2-40B4-BE49-F238E27FC236}">
+                <a16:creationId xmlns:a16="http://schemas.microsoft.com/office/drawing/2014/main" id="{DEDF95E6-31A7-4A4D-B81B-67A931C484D1}"/>
+              </a:ext>
+            </a:extLst>
+          </p:cNvPr>
+          <p:cNvSpPr>
+            <a:spLocks noGrp="1"/>
+          </p:cNvSpPr>
+          <p:nvPr>
+            <p:ph type="title"/>
+          </p:nvPr>
+        </p:nvSpPr>
+        <p:spPr/>
+        <p:txBody>
+          <a:bodyPr/>
+          <a:lstStyle/>
+          <a:p>
+            <a:r>
+              <a:rPr lang="en-US" dirty="0"/>
+              <a:t>Links and credits</a:t>
+            </a:r>
+          </a:p>
+        </p:txBody>
+      </p:sp>
+      <p:sp>
+        <p:nvSpPr>
+          <p:cNvPr id="3" name="Content Placeholder 2">
+            <a:extLst>
+              <a:ext uri="{FF2B5EF4-FFF2-40B4-BE49-F238E27FC236}">
+                <a16:creationId xmlns:a16="http://schemas.microsoft.com/office/drawing/2014/main" id="{854FB79B-E0E0-4106-9101-482D7D707EAC}"/>
+              </a:ext>
+            </a:extLst>
+          </p:cNvPr>
+          <p:cNvSpPr>
+            <a:spLocks noGrp="1"/>
+          </p:cNvSpPr>
+          <p:nvPr>
+            <p:ph idx="1"/>
+          </p:nvPr>
+        </p:nvSpPr>
+        <p:spPr/>
+        <p:txBody>
+          <a:bodyPr/>
+          <a:lstStyle/>
+          <a:p>
+            <a:r>
+              <a:rPr lang="en-US" dirty="0" err="1"/>
+              <a:t>Opencover</a:t>
+            </a:r>
+            <a:r>
+              <a:rPr lang="en-US" dirty="0"/>
+              <a:t>: https://github.com/opencover/opencover/wiki/Usage</a:t>
+            </a:r>
+          </a:p>
+        </p:txBody>
+      </p:sp>
+    </p:spTree>
+    <p:extLst>
+      <p:ext uri="{BB962C8B-B14F-4D97-AF65-F5344CB8AC3E}">
+        <p14:creationId xmlns:p14="http://schemas.microsoft.com/office/powerpoint/2010/main" val="3021987684"/>
       </p:ext>
     </p:extLst>
   </p:cSld>

</xml_diff>

<commit_message>
Add codecov.yml. First test.
</commit_message>
<xml_diff>
--- a/Presentation/Full Open-Source CI.pptx
+++ b/Presentation/Full Open-Source CI.pptx
@@ -22,7 +22,12 @@
     <p:sldId id="270" r:id="rId16"/>
     <p:sldId id="271" r:id="rId17"/>
     <p:sldId id="272" r:id="rId18"/>
-    <p:sldId id="273" r:id="rId19"/>
+    <p:sldId id="274" r:id="rId19"/>
+    <p:sldId id="275" r:id="rId20"/>
+    <p:sldId id="279" r:id="rId21"/>
+    <p:sldId id="277" r:id="rId22"/>
+    <p:sldId id="278" r:id="rId23"/>
+    <p:sldId id="273" r:id="rId24"/>
   </p:sldIdLst>
   <p:sldSz cx="12192000" cy="6858000"/>
   <p:notesSz cx="6858000" cy="9144000"/>
@@ -15821,7 +15826,7 @@
           <p:cNvPr id="2" name="Title 1">
             <a:extLst>
               <a:ext uri="{FF2B5EF4-FFF2-40B4-BE49-F238E27FC236}">
-                <a16:creationId xmlns:a16="http://schemas.microsoft.com/office/drawing/2014/main" id="{DEDF95E6-31A7-4A4D-B81B-67A931C484D1}"/>
+                <a16:creationId xmlns:a16="http://schemas.microsoft.com/office/drawing/2014/main" id="{BEA83E5A-C125-4E9E-B1BF-948FA0FC8D4D}"/>
               </a:ext>
             </a:extLst>
           </p:cNvPr>
@@ -15839,17 +15844,254 @@
           <a:p>
             <a:r>
               <a:rPr lang="en-US" dirty="0"/>
-              <a:t>Links and credits</a:t>
-            </a:r>
+              <a:t>But… it doesn’t work </a:t>
+            </a:r>
+            <a:r>
+              <a:rPr lang="en-US" dirty="0">
+                <a:sym typeface="Wingdings" panose="05000000000000000000" pitchFamily="2" charset="2"/>
+              </a:rPr>
+              <a:t></a:t>
+            </a:r>
+            <a:endParaRPr lang="en-US" dirty="0"/>
           </a:p>
         </p:txBody>
       </p:sp>
+      <p:pic>
+        <p:nvPicPr>
+          <p:cNvPr id="4" name="Picture 3">
+            <a:extLst>
+              <a:ext uri="{FF2B5EF4-FFF2-40B4-BE49-F238E27FC236}">
+                <a16:creationId xmlns:a16="http://schemas.microsoft.com/office/drawing/2014/main" id="{482E1AA7-C8C0-417C-9579-FF9EE45BE7FE}"/>
+              </a:ext>
+            </a:extLst>
+          </p:cNvPr>
+          <p:cNvPicPr>
+            <a:picLocks noChangeAspect="1"/>
+          </p:cNvPicPr>
+          <p:nvPr/>
+        </p:nvPicPr>
+        <p:blipFill>
+          <a:blip r:embed="rId2"/>
+          <a:stretch>
+            <a:fillRect/>
+          </a:stretch>
+        </p:blipFill>
+        <p:spPr>
+          <a:xfrm>
+            <a:off x="1141412" y="2008014"/>
+            <a:ext cx="6748959" cy="1478570"/>
+          </a:xfrm>
+          <a:prstGeom prst="rect">
+            <a:avLst/>
+          </a:prstGeom>
+        </p:spPr>
+      </p:pic>
+      <p:pic>
+        <p:nvPicPr>
+          <p:cNvPr id="5" name="Picture 4">
+            <a:extLst>
+              <a:ext uri="{FF2B5EF4-FFF2-40B4-BE49-F238E27FC236}">
+                <a16:creationId xmlns:a16="http://schemas.microsoft.com/office/drawing/2014/main" id="{734AEBAD-2D07-4333-A15D-F7D9EFA3425C}"/>
+              </a:ext>
+            </a:extLst>
+          </p:cNvPr>
+          <p:cNvPicPr>
+            <a:picLocks noChangeAspect="1"/>
+          </p:cNvPicPr>
+          <p:nvPr/>
+        </p:nvPicPr>
+        <p:blipFill>
+          <a:blip r:embed="rId3"/>
+          <a:stretch>
+            <a:fillRect/>
+          </a:stretch>
+        </p:blipFill>
+        <p:spPr>
+          <a:xfrm>
+            <a:off x="1141412" y="4296584"/>
+            <a:ext cx="4571429" cy="1771429"/>
+          </a:xfrm>
+          <a:prstGeom prst="rect">
+            <a:avLst/>
+          </a:prstGeom>
+        </p:spPr>
+      </p:pic>
       <p:sp>
         <p:nvSpPr>
-          <p:cNvPr id="3" name="Content Placeholder 2">
+          <p:cNvPr id="6" name="TextBox 5">
             <a:extLst>
               <a:ext uri="{FF2B5EF4-FFF2-40B4-BE49-F238E27FC236}">
-                <a16:creationId xmlns:a16="http://schemas.microsoft.com/office/drawing/2014/main" id="{854FB79B-E0E0-4106-9101-482D7D707EAC}"/>
+                <a16:creationId xmlns:a16="http://schemas.microsoft.com/office/drawing/2014/main" id="{81136B66-258A-49D2-A699-3720CFE96290}"/>
+              </a:ext>
+            </a:extLst>
+          </p:cNvPr>
+          <p:cNvSpPr txBox="1"/>
+          <p:nvPr/>
+        </p:nvSpPr>
+        <p:spPr>
+          <a:xfrm>
+            <a:off x="1141412" y="3706918"/>
+            <a:ext cx="7591527" cy="369332"/>
+          </a:xfrm>
+          <a:prstGeom prst="rect">
+            <a:avLst/>
+          </a:prstGeom>
+          <a:noFill/>
+        </p:spPr>
+        <p:txBody>
+          <a:bodyPr wrap="square" rtlCol="0">
+            <a:spAutoFit/>
+          </a:bodyPr>
+          <a:lstStyle/>
+          <a:p>
+            <a:r>
+              <a:rPr lang="en-US" dirty="0"/>
+              <a:t>We need to add “FULL” debug mode in both application and test projects:</a:t>
+            </a:r>
+          </a:p>
+        </p:txBody>
+      </p:sp>
+    </p:spTree>
+    <p:extLst>
+      <p:ext uri="{BB962C8B-B14F-4D97-AF65-F5344CB8AC3E}">
+        <p14:creationId xmlns:p14="http://schemas.microsoft.com/office/powerpoint/2010/main" val="2884773143"/>
+      </p:ext>
+    </p:extLst>
+  </p:cSld>
+  <p:clrMapOvr>
+    <a:masterClrMapping/>
+  </p:clrMapOvr>
+  <p:timing>
+    <p:tnLst>
+      <p:par>
+        <p:cTn id="1" dur="indefinite" restart="never" nodeType="tmRoot">
+          <p:childTnLst>
+            <p:seq concurrent="1" nextAc="seek">
+              <p:cTn id="2" dur="indefinite" nodeType="mainSeq">
+                <p:childTnLst>
+                  <p:par>
+                    <p:cTn id="3" fill="hold">
+                      <p:stCondLst>
+                        <p:cond delay="indefinite"/>
+                      </p:stCondLst>
+                      <p:childTnLst>
+                        <p:par>
+                          <p:cTn id="4" fill="hold">
+                            <p:stCondLst>
+                              <p:cond delay="0"/>
+                            </p:stCondLst>
+                            <p:childTnLst>
+                              <p:par>
+                                <p:cTn id="5" presetID="1" presetClass="entr" presetSubtype="0" fill="hold" grpId="0" nodeType="clickEffect">
+                                  <p:stCondLst>
+                                    <p:cond delay="0"/>
+                                  </p:stCondLst>
+                                  <p:childTnLst>
+                                    <p:set>
+                                      <p:cBhvr>
+                                        <p:cTn id="6" dur="1" fill="hold">
+                                          <p:stCondLst>
+                                            <p:cond delay="0"/>
+                                          </p:stCondLst>
+                                        </p:cTn>
+                                        <p:tgtEl>
+                                          <p:spTgt spid="6"/>
+                                        </p:tgtEl>
+                                        <p:attrNameLst>
+                                          <p:attrName>style.visibility</p:attrName>
+                                        </p:attrNameLst>
+                                      </p:cBhvr>
+                                      <p:to>
+                                        <p:strVal val="visible"/>
+                                      </p:to>
+                                    </p:set>
+                                  </p:childTnLst>
+                                </p:cTn>
+                              </p:par>
+                              <p:par>
+                                <p:cTn id="7" presetID="1" presetClass="entr" presetSubtype="0" fill="hold" nodeType="withEffect">
+                                  <p:stCondLst>
+                                    <p:cond delay="0"/>
+                                  </p:stCondLst>
+                                  <p:childTnLst>
+                                    <p:set>
+                                      <p:cBhvr>
+                                        <p:cTn id="8" dur="1" fill="hold">
+                                          <p:stCondLst>
+                                            <p:cond delay="0"/>
+                                          </p:stCondLst>
+                                        </p:cTn>
+                                        <p:tgtEl>
+                                          <p:spTgt spid="5"/>
+                                        </p:tgtEl>
+                                        <p:attrNameLst>
+                                          <p:attrName>style.visibility</p:attrName>
+                                        </p:attrNameLst>
+                                      </p:cBhvr>
+                                      <p:to>
+                                        <p:strVal val="visible"/>
+                                      </p:to>
+                                    </p:set>
+                                  </p:childTnLst>
+                                </p:cTn>
+                              </p:par>
+                            </p:childTnLst>
+                          </p:cTn>
+                        </p:par>
+                      </p:childTnLst>
+                    </p:cTn>
+                  </p:par>
+                </p:childTnLst>
+              </p:cTn>
+              <p:prevCondLst>
+                <p:cond evt="onPrev" delay="0">
+                  <p:tgtEl>
+                    <p:sldTgt/>
+                  </p:tgtEl>
+                </p:cond>
+              </p:prevCondLst>
+              <p:nextCondLst>
+                <p:cond evt="onNext" delay="0">
+                  <p:tgtEl>
+                    <p:sldTgt/>
+                  </p:tgtEl>
+                </p:cond>
+              </p:nextCondLst>
+            </p:seq>
+          </p:childTnLst>
+        </p:cTn>
+      </p:par>
+    </p:tnLst>
+    <p:bldLst>
+      <p:bldP spid="6" grpId="0"/>
+    </p:bldLst>
+  </p:timing>
+</p:sld>
+</file>
+
+<file path=ppt/slides/slide19.xml><?xml version="1.0" encoding="utf-8"?>
+<p:sld xmlns:a="http://schemas.openxmlformats.org/drawingml/2006/main" xmlns:r="http://schemas.openxmlformats.org/officeDocument/2006/relationships" xmlns:p="http://schemas.openxmlformats.org/presentationml/2006/main">
+  <p:cSld>
+    <p:spTree>
+      <p:nvGrpSpPr>
+        <p:cNvPr id="1" name=""/>
+        <p:cNvGrpSpPr/>
+        <p:nvPr/>
+      </p:nvGrpSpPr>
+      <p:grpSpPr>
+        <a:xfrm>
+          <a:off x="0" y="0"/>
+          <a:ext cx="0" cy="0"/>
+          <a:chOff x="0" y="0"/>
+          <a:chExt cx="0" cy="0"/>
+        </a:xfrm>
+      </p:grpSpPr>
+      <p:sp>
+        <p:nvSpPr>
+          <p:cNvPr id="2" name="Title 1">
+            <a:extLst>
+              <a:ext uri="{FF2B5EF4-FFF2-40B4-BE49-F238E27FC236}">
+                <a16:creationId xmlns:a16="http://schemas.microsoft.com/office/drawing/2014/main" id="{2D7D0F29-4B3B-47E7-BB28-16138E10ED7B}"/>
               </a:ext>
             </a:extLst>
           </p:cNvPr>
@@ -15857,7 +16099,7 @@
             <a:spLocks noGrp="1"/>
           </p:cNvSpPr>
           <p:nvPr>
-            <p:ph idx="1"/>
+            <p:ph type="title"/>
           </p:nvPr>
         </p:nvSpPr>
         <p:spPr/>
@@ -15866,26 +16108,301 @@
           <a:lstStyle/>
           <a:p>
             <a:r>
-              <a:rPr lang="en-US" dirty="0" err="1"/>
-              <a:t>Opencover</a:t>
-            </a:r>
-            <a:r>
               <a:rPr lang="en-US" dirty="0"/>
-              <a:t>: https://github.com/opencover/opencover/wiki/Usage</a:t>
+              <a:t>Let’s run this in the CI</a:t>
             </a:r>
           </a:p>
         </p:txBody>
       </p:sp>
+      <p:pic>
+        <p:nvPicPr>
+          <p:cNvPr id="4" name="Picture 3">
+            <a:extLst>
+              <a:ext uri="{FF2B5EF4-FFF2-40B4-BE49-F238E27FC236}">
+                <a16:creationId xmlns:a16="http://schemas.microsoft.com/office/drawing/2014/main" id="{E57A8206-98A4-49ED-8D1A-A7561263B2CD}"/>
+              </a:ext>
+            </a:extLst>
+          </p:cNvPr>
+          <p:cNvPicPr>
+            <a:picLocks noChangeAspect="1"/>
+          </p:cNvPicPr>
+          <p:nvPr/>
+        </p:nvPicPr>
+        <p:blipFill>
+          <a:blip r:embed="rId2"/>
+          <a:stretch>
+            <a:fillRect/>
+          </a:stretch>
+        </p:blipFill>
+        <p:spPr>
+          <a:xfrm>
+            <a:off x="1677398" y="1603970"/>
+            <a:ext cx="8971428" cy="5076190"/>
+          </a:xfrm>
+          <a:prstGeom prst="rect">
+            <a:avLst/>
+          </a:prstGeom>
+        </p:spPr>
+      </p:pic>
+      <p:sp>
+        <p:nvSpPr>
+          <p:cNvPr id="5" name="TextBox 4">
+            <a:extLst>
+              <a:ext uri="{FF2B5EF4-FFF2-40B4-BE49-F238E27FC236}">
+                <a16:creationId xmlns:a16="http://schemas.microsoft.com/office/drawing/2014/main" id="{1DEB5DFB-4BD8-4B0A-B9A2-41531311CA6C}"/>
+              </a:ext>
+            </a:extLst>
+          </p:cNvPr>
+          <p:cNvSpPr txBox="1"/>
+          <p:nvPr/>
+        </p:nvSpPr>
+        <p:spPr>
+          <a:xfrm>
+            <a:off x="5013229" y="3357235"/>
+            <a:ext cx="5635597" cy="1569660"/>
+          </a:xfrm>
+          <a:prstGeom prst="rect">
+            <a:avLst/>
+          </a:prstGeom>
+          <a:solidFill>
+            <a:schemeClr val="bg1"/>
+          </a:solidFill>
+          <a:ln w="19050">
+            <a:solidFill>
+              <a:schemeClr val="tx1"/>
+            </a:solidFill>
+          </a:ln>
+        </p:spPr>
+        <p:txBody>
+          <a:bodyPr wrap="square" rtlCol="0">
+            <a:spAutoFit/>
+          </a:bodyPr>
+          <a:lstStyle/>
+          <a:p>
+            <a:r>
+              <a:rPr lang="en-US" sz="2400" dirty="0"/>
+              <a:t>Why build again???</a:t>
+            </a:r>
+          </a:p>
+          <a:p>
+            <a:endParaRPr lang="en-US" sz="2400" dirty="0"/>
+          </a:p>
+          <a:p>
+            <a:r>
+              <a:rPr lang="en-US" sz="2400" dirty="0"/>
+              <a:t>We can add “--no-build” to the “</a:t>
+            </a:r>
+            <a:r>
+              <a:rPr lang="en-US" sz="2400" dirty="0" err="1"/>
+              <a:t>targetargs</a:t>
+            </a:r>
+            <a:r>
+              <a:rPr lang="en-US" sz="2400" dirty="0"/>
+              <a:t>”</a:t>
+            </a:r>
+          </a:p>
+          <a:p>
+            <a:r>
+              <a:rPr lang="en-US" sz="2400" dirty="0">
+                <a:solidFill>
+                  <a:srgbClr val="92D050"/>
+                </a:solidFill>
+              </a:rPr>
+              <a:t>-</a:t>
+            </a:r>
+            <a:r>
+              <a:rPr lang="en-US" sz="2400" dirty="0" err="1">
+                <a:solidFill>
+                  <a:srgbClr val="92D050"/>
+                </a:solidFill>
+              </a:rPr>
+              <a:t>targetargs</a:t>
+            </a:r>
+            <a:r>
+              <a:rPr lang="en-US" sz="2400" dirty="0">
+                <a:solidFill>
+                  <a:srgbClr val="92D050"/>
+                </a:solidFill>
+              </a:rPr>
+              <a:t>:"test --no-build </a:t>
+            </a:r>
+            <a:r>
+              <a:rPr lang="en-US" sz="2400" dirty="0" err="1">
+                <a:solidFill>
+                  <a:srgbClr val="92D050"/>
+                </a:solidFill>
+              </a:rPr>
+              <a:t>tests.csproj</a:t>
+            </a:r>
+            <a:r>
+              <a:rPr lang="en-US" sz="2400" dirty="0">
+                <a:solidFill>
+                  <a:srgbClr val="92D050"/>
+                </a:solidFill>
+              </a:rPr>
+              <a:t>"</a:t>
+            </a:r>
+            <a:endParaRPr lang="en-US" sz="2400" dirty="0"/>
+          </a:p>
+        </p:txBody>
+      </p:sp>
+      <p:cxnSp>
+        <p:nvCxnSpPr>
+          <p:cNvPr id="7" name="Straight Arrow Connector 6">
+            <a:extLst>
+              <a:ext uri="{FF2B5EF4-FFF2-40B4-BE49-F238E27FC236}">
+                <a16:creationId xmlns:a16="http://schemas.microsoft.com/office/drawing/2014/main" id="{28909823-D798-4281-87B2-19B07A94C46B}"/>
+              </a:ext>
+            </a:extLst>
+          </p:cNvPr>
+          <p:cNvCxnSpPr/>
+          <p:nvPr/>
+        </p:nvCxnSpPr>
+        <p:spPr>
+          <a:xfrm flipH="1" flipV="1">
+            <a:off x="3987734" y="3504586"/>
+            <a:ext cx="1025495" cy="264109"/>
+          </a:xfrm>
+          <a:prstGeom prst="straightConnector1">
+            <a:avLst/>
+          </a:prstGeom>
+          <a:ln w="57150">
+            <a:solidFill>
+              <a:srgbClr val="FFC000"/>
+            </a:solidFill>
+            <a:tailEnd type="triangle"/>
+          </a:ln>
+        </p:spPr>
+        <p:style>
+          <a:lnRef idx="1">
+            <a:schemeClr val="accent1"/>
+          </a:lnRef>
+          <a:fillRef idx="0">
+            <a:schemeClr val="accent1"/>
+          </a:fillRef>
+          <a:effectRef idx="0">
+            <a:schemeClr val="accent1"/>
+          </a:effectRef>
+          <a:fontRef idx="minor">
+            <a:schemeClr val="tx1"/>
+          </a:fontRef>
+        </p:style>
+      </p:cxnSp>
     </p:spTree>
     <p:extLst>
       <p:ext uri="{BB962C8B-B14F-4D97-AF65-F5344CB8AC3E}">
-        <p14:creationId xmlns:p14="http://schemas.microsoft.com/office/powerpoint/2010/main" val="3021987684"/>
+        <p14:creationId xmlns:p14="http://schemas.microsoft.com/office/powerpoint/2010/main" val="2674377342"/>
       </p:ext>
     </p:extLst>
   </p:cSld>
   <p:clrMapOvr>
     <a:masterClrMapping/>
   </p:clrMapOvr>
+  <p:timing>
+    <p:tnLst>
+      <p:par>
+        <p:cTn id="1" dur="indefinite" restart="never" nodeType="tmRoot">
+          <p:childTnLst>
+            <p:seq concurrent="1" nextAc="seek">
+              <p:cTn id="2" dur="indefinite" nodeType="mainSeq">
+                <p:childTnLst>
+                  <p:par>
+                    <p:cTn id="3" fill="hold">
+                      <p:stCondLst>
+                        <p:cond delay="indefinite"/>
+                      </p:stCondLst>
+                      <p:childTnLst>
+                        <p:par>
+                          <p:cTn id="4" fill="hold">
+                            <p:stCondLst>
+                              <p:cond delay="0"/>
+                            </p:stCondLst>
+                            <p:childTnLst>
+                              <p:par>
+                                <p:cTn id="5" presetID="1" presetClass="entr" presetSubtype="0" fill="hold" nodeType="clickEffect">
+                                  <p:stCondLst>
+                                    <p:cond delay="0"/>
+                                  </p:stCondLst>
+                                  <p:childTnLst>
+                                    <p:set>
+                                      <p:cBhvr>
+                                        <p:cTn id="6" dur="1" fill="hold">
+                                          <p:stCondLst>
+                                            <p:cond delay="0"/>
+                                          </p:stCondLst>
+                                        </p:cTn>
+                                        <p:tgtEl>
+                                          <p:spTgt spid="7"/>
+                                        </p:tgtEl>
+                                        <p:attrNameLst>
+                                          <p:attrName>style.visibility</p:attrName>
+                                        </p:attrNameLst>
+                                      </p:cBhvr>
+                                      <p:to>
+                                        <p:strVal val="visible"/>
+                                      </p:to>
+                                    </p:set>
+                                  </p:childTnLst>
+                                </p:cTn>
+                              </p:par>
+                              <p:par>
+                                <p:cTn id="7" presetID="1" presetClass="entr" presetSubtype="0" fill="hold" grpId="0" nodeType="withEffect">
+                                  <p:stCondLst>
+                                    <p:cond delay="0"/>
+                                  </p:stCondLst>
+                                  <p:childTnLst>
+                                    <p:set>
+                                      <p:cBhvr>
+                                        <p:cTn id="8" dur="1" fill="hold">
+                                          <p:stCondLst>
+                                            <p:cond delay="0"/>
+                                          </p:stCondLst>
+                                        </p:cTn>
+                                        <p:tgtEl>
+                                          <p:spTgt spid="5"/>
+                                        </p:tgtEl>
+                                        <p:attrNameLst>
+                                          <p:attrName>style.visibility</p:attrName>
+                                        </p:attrNameLst>
+                                      </p:cBhvr>
+                                      <p:to>
+                                        <p:strVal val="visible"/>
+                                      </p:to>
+                                    </p:set>
+                                  </p:childTnLst>
+                                </p:cTn>
+                              </p:par>
+                            </p:childTnLst>
+                          </p:cTn>
+                        </p:par>
+                      </p:childTnLst>
+                    </p:cTn>
+                  </p:par>
+                </p:childTnLst>
+              </p:cTn>
+              <p:prevCondLst>
+                <p:cond evt="onPrev" delay="0">
+                  <p:tgtEl>
+                    <p:sldTgt/>
+                  </p:tgtEl>
+                </p:cond>
+              </p:prevCondLst>
+              <p:nextCondLst>
+                <p:cond evt="onNext" delay="0">
+                  <p:tgtEl>
+                    <p:sldTgt/>
+                  </p:tgtEl>
+                </p:cond>
+              </p:nextCondLst>
+            </p:seq>
+          </p:childTnLst>
+        </p:cTn>
+      </p:par>
+    </p:tnLst>
+    <p:bldLst>
+      <p:bldP spid="5" grpId="0" animBg="1"/>
+    </p:bldLst>
+  </p:timing>
 </p:sld>
 </file>
 
@@ -16004,6 +16521,1257 @@
     <p:extLst>
       <p:ext uri="{BB962C8B-B14F-4D97-AF65-F5344CB8AC3E}">
         <p14:creationId xmlns:p14="http://schemas.microsoft.com/office/powerpoint/2010/main" val="567128038"/>
+      </p:ext>
+    </p:extLst>
+  </p:cSld>
+  <p:clrMapOvr>
+    <a:masterClrMapping/>
+  </p:clrMapOvr>
+</p:sld>
+</file>
+
+<file path=ppt/slides/slide20.xml><?xml version="1.0" encoding="utf-8"?>
+<p:sld xmlns:a="http://schemas.openxmlformats.org/drawingml/2006/main" xmlns:r="http://schemas.openxmlformats.org/officeDocument/2006/relationships" xmlns:p="http://schemas.openxmlformats.org/presentationml/2006/main">
+  <p:cSld>
+    <p:spTree>
+      <p:nvGrpSpPr>
+        <p:cNvPr id="1" name=""/>
+        <p:cNvGrpSpPr/>
+        <p:nvPr/>
+      </p:nvGrpSpPr>
+      <p:grpSpPr>
+        <a:xfrm>
+          <a:off x="0" y="0"/>
+          <a:ext cx="0" cy="0"/>
+          <a:chOff x="0" y="0"/>
+          <a:chExt cx="0" cy="0"/>
+        </a:xfrm>
+      </p:grpSpPr>
+      <p:sp>
+        <p:nvSpPr>
+          <p:cNvPr id="2" name="Title 1">
+            <a:extLst>
+              <a:ext uri="{FF2B5EF4-FFF2-40B4-BE49-F238E27FC236}">
+                <a16:creationId xmlns:a16="http://schemas.microsoft.com/office/drawing/2014/main" id="{81980DBC-4746-437B-BC33-D0D64E0AB1D5}"/>
+              </a:ext>
+            </a:extLst>
+          </p:cNvPr>
+          <p:cNvSpPr>
+            <a:spLocks noGrp="1"/>
+          </p:cNvSpPr>
+          <p:nvPr>
+            <p:ph type="title"/>
+          </p:nvPr>
+        </p:nvSpPr>
+        <p:spPr/>
+        <p:txBody>
+          <a:bodyPr/>
+          <a:lstStyle/>
+          <a:p>
+            <a:r>
+              <a:rPr lang="en-US" dirty="0"/>
+              <a:t>Pushing code coverage to </a:t>
+            </a:r>
+            <a:r>
+              <a:rPr lang="en-US" dirty="0" err="1"/>
+              <a:t>CodeCov</a:t>
+            </a:r>
+            <a:endParaRPr lang="en-US" dirty="0"/>
+          </a:p>
+        </p:txBody>
+      </p:sp>
+      <p:sp>
+        <p:nvSpPr>
+          <p:cNvPr id="3" name="Content Placeholder 2">
+            <a:extLst>
+              <a:ext uri="{FF2B5EF4-FFF2-40B4-BE49-F238E27FC236}">
+                <a16:creationId xmlns:a16="http://schemas.microsoft.com/office/drawing/2014/main" id="{10B5B78F-277E-4800-8F6B-90703E676B06}"/>
+              </a:ext>
+            </a:extLst>
+          </p:cNvPr>
+          <p:cNvSpPr>
+            <a:spLocks noGrp="1"/>
+          </p:cNvSpPr>
+          <p:nvPr>
+            <p:ph idx="1"/>
+          </p:nvPr>
+        </p:nvSpPr>
+        <p:spPr/>
+        <p:txBody>
+          <a:bodyPr/>
+          <a:lstStyle/>
+          <a:p>
+            <a:r>
+              <a:rPr lang="en-US" dirty="0"/>
+              <a:t>Go to </a:t>
+            </a:r>
+            <a:r>
+              <a:rPr lang="en-US" dirty="0">
+                <a:hlinkClick r:id="rId2"/>
+              </a:rPr>
+              <a:t>https://codecov.io</a:t>
+            </a:r>
+            <a:endParaRPr lang="en-US" dirty="0"/>
+          </a:p>
+          <a:p>
+            <a:r>
+              <a:rPr lang="en-US" dirty="0"/>
+              <a:t>Click on Sign-in</a:t>
+            </a:r>
+          </a:p>
+        </p:txBody>
+      </p:sp>
+      <p:pic>
+        <p:nvPicPr>
+          <p:cNvPr id="4" name="Picture 3">
+            <a:extLst>
+              <a:ext uri="{FF2B5EF4-FFF2-40B4-BE49-F238E27FC236}">
+                <a16:creationId xmlns:a16="http://schemas.microsoft.com/office/drawing/2014/main" id="{35856296-B34B-4DF9-A0F6-8C07A2D5638E}"/>
+              </a:ext>
+            </a:extLst>
+          </p:cNvPr>
+          <p:cNvPicPr>
+            <a:picLocks noChangeAspect="1"/>
+          </p:cNvPicPr>
+          <p:nvPr/>
+        </p:nvPicPr>
+        <p:blipFill>
+          <a:blip r:embed="rId3"/>
+          <a:stretch>
+            <a:fillRect/>
+          </a:stretch>
+        </p:blipFill>
+        <p:spPr>
+          <a:xfrm>
+            <a:off x="1713458" y="1681381"/>
+            <a:ext cx="8761905" cy="3495238"/>
+          </a:xfrm>
+          <a:prstGeom prst="rect">
+            <a:avLst/>
+          </a:prstGeom>
+        </p:spPr>
+      </p:pic>
+      <p:pic>
+        <p:nvPicPr>
+          <p:cNvPr id="5" name="Picture 4">
+            <a:extLst>
+              <a:ext uri="{FF2B5EF4-FFF2-40B4-BE49-F238E27FC236}">
+                <a16:creationId xmlns:a16="http://schemas.microsoft.com/office/drawing/2014/main" id="{74C17962-A654-439B-8070-F3C726848154}"/>
+              </a:ext>
+            </a:extLst>
+          </p:cNvPr>
+          <p:cNvPicPr>
+            <a:picLocks noChangeAspect="1"/>
+          </p:cNvPicPr>
+          <p:nvPr/>
+        </p:nvPicPr>
+        <p:blipFill>
+          <a:blip r:embed="rId4"/>
+          <a:stretch>
+            <a:fillRect/>
+          </a:stretch>
+        </p:blipFill>
+        <p:spPr>
+          <a:xfrm>
+            <a:off x="3700573" y="304530"/>
+            <a:ext cx="4790853" cy="6248939"/>
+          </a:xfrm>
+          <a:prstGeom prst="rect">
+            <a:avLst/>
+          </a:prstGeom>
+        </p:spPr>
+      </p:pic>
+      <p:pic>
+        <p:nvPicPr>
+          <p:cNvPr id="6" name="Picture 5">
+            <a:extLst>
+              <a:ext uri="{FF2B5EF4-FFF2-40B4-BE49-F238E27FC236}">
+                <a16:creationId xmlns:a16="http://schemas.microsoft.com/office/drawing/2014/main" id="{A7456321-F616-46C8-A6C9-F2849AD58074}"/>
+              </a:ext>
+            </a:extLst>
+          </p:cNvPr>
+          <p:cNvPicPr>
+            <a:picLocks noChangeAspect="1"/>
+          </p:cNvPicPr>
+          <p:nvPr/>
+        </p:nvPicPr>
+        <p:blipFill>
+          <a:blip r:embed="rId5"/>
+          <a:stretch>
+            <a:fillRect/>
+          </a:stretch>
+        </p:blipFill>
+        <p:spPr>
+          <a:xfrm>
+            <a:off x="4586476" y="2338524"/>
+            <a:ext cx="3019048" cy="2180952"/>
+          </a:xfrm>
+          <a:prstGeom prst="rect">
+            <a:avLst/>
+          </a:prstGeom>
+        </p:spPr>
+      </p:pic>
+      <p:pic>
+        <p:nvPicPr>
+          <p:cNvPr id="7" name="Picture 6">
+            <a:extLst>
+              <a:ext uri="{FF2B5EF4-FFF2-40B4-BE49-F238E27FC236}">
+                <a16:creationId xmlns:a16="http://schemas.microsoft.com/office/drawing/2014/main" id="{328F111A-FD70-4F13-91FC-93EFE76912C3}"/>
+              </a:ext>
+            </a:extLst>
+          </p:cNvPr>
+          <p:cNvPicPr>
+            <a:picLocks noChangeAspect="1"/>
+          </p:cNvPicPr>
+          <p:nvPr/>
+        </p:nvPicPr>
+        <p:blipFill>
+          <a:blip r:embed="rId6"/>
+          <a:stretch>
+            <a:fillRect/>
+          </a:stretch>
+        </p:blipFill>
+        <p:spPr>
+          <a:xfrm>
+            <a:off x="1318571" y="457180"/>
+            <a:ext cx="9551677" cy="5943638"/>
+          </a:xfrm>
+          <a:prstGeom prst="rect">
+            <a:avLst/>
+          </a:prstGeom>
+        </p:spPr>
+      </p:pic>
+      <p:pic>
+        <p:nvPicPr>
+          <p:cNvPr id="8" name="Picture 7">
+            <a:extLst>
+              <a:ext uri="{FF2B5EF4-FFF2-40B4-BE49-F238E27FC236}">
+                <a16:creationId xmlns:a16="http://schemas.microsoft.com/office/drawing/2014/main" id="{AEB05DC9-3240-4BEE-8772-F7F338B7C79E}"/>
+              </a:ext>
+            </a:extLst>
+          </p:cNvPr>
+          <p:cNvPicPr>
+            <a:picLocks noChangeAspect="1"/>
+          </p:cNvPicPr>
+          <p:nvPr/>
+        </p:nvPicPr>
+        <p:blipFill>
+          <a:blip r:embed="rId7"/>
+          <a:stretch>
+            <a:fillRect/>
+          </a:stretch>
+        </p:blipFill>
+        <p:spPr>
+          <a:xfrm>
+            <a:off x="2624571" y="2733762"/>
+            <a:ext cx="6942857" cy="1390476"/>
+          </a:xfrm>
+          <a:prstGeom prst="rect">
+            <a:avLst/>
+          </a:prstGeom>
+          <a:ln w="28575">
+            <a:solidFill>
+              <a:schemeClr val="bg1"/>
+            </a:solidFill>
+          </a:ln>
+        </p:spPr>
+      </p:pic>
+    </p:spTree>
+    <p:extLst>
+      <p:ext uri="{BB962C8B-B14F-4D97-AF65-F5344CB8AC3E}">
+        <p14:creationId xmlns:p14="http://schemas.microsoft.com/office/powerpoint/2010/main" val="3661388448"/>
+      </p:ext>
+    </p:extLst>
+  </p:cSld>
+  <p:clrMapOvr>
+    <a:masterClrMapping/>
+  </p:clrMapOvr>
+  <p:timing>
+    <p:tnLst>
+      <p:par>
+        <p:cTn id="1" dur="indefinite" restart="never" nodeType="tmRoot">
+          <p:childTnLst>
+            <p:seq concurrent="1" nextAc="seek">
+              <p:cTn id="2" dur="indefinite" nodeType="mainSeq">
+                <p:childTnLst>
+                  <p:par>
+                    <p:cTn id="3" fill="hold">
+                      <p:stCondLst>
+                        <p:cond delay="indefinite"/>
+                      </p:stCondLst>
+                      <p:childTnLst>
+                        <p:par>
+                          <p:cTn id="4" fill="hold">
+                            <p:stCondLst>
+                              <p:cond delay="0"/>
+                            </p:stCondLst>
+                            <p:childTnLst>
+                              <p:par>
+                                <p:cTn id="5" presetID="1" presetClass="entr" presetSubtype="0" fill="hold" nodeType="clickEffect">
+                                  <p:stCondLst>
+                                    <p:cond delay="0"/>
+                                  </p:stCondLst>
+                                  <p:childTnLst>
+                                    <p:set>
+                                      <p:cBhvr>
+                                        <p:cTn id="6" dur="1" fill="hold">
+                                          <p:stCondLst>
+                                            <p:cond delay="0"/>
+                                          </p:stCondLst>
+                                        </p:cTn>
+                                        <p:tgtEl>
+                                          <p:spTgt spid="4"/>
+                                        </p:tgtEl>
+                                        <p:attrNameLst>
+                                          <p:attrName>style.visibility</p:attrName>
+                                        </p:attrNameLst>
+                                      </p:cBhvr>
+                                      <p:to>
+                                        <p:strVal val="visible"/>
+                                      </p:to>
+                                    </p:set>
+                                  </p:childTnLst>
+                                </p:cTn>
+                              </p:par>
+                            </p:childTnLst>
+                          </p:cTn>
+                        </p:par>
+                      </p:childTnLst>
+                    </p:cTn>
+                  </p:par>
+                  <p:par>
+                    <p:cTn id="7" fill="hold">
+                      <p:stCondLst>
+                        <p:cond delay="indefinite"/>
+                      </p:stCondLst>
+                      <p:childTnLst>
+                        <p:par>
+                          <p:cTn id="8" fill="hold">
+                            <p:stCondLst>
+                              <p:cond delay="0"/>
+                            </p:stCondLst>
+                            <p:childTnLst>
+                              <p:par>
+                                <p:cTn id="9" presetID="1" presetClass="entr" presetSubtype="0" fill="hold" nodeType="clickEffect">
+                                  <p:stCondLst>
+                                    <p:cond delay="0"/>
+                                  </p:stCondLst>
+                                  <p:childTnLst>
+                                    <p:set>
+                                      <p:cBhvr>
+                                        <p:cTn id="10" dur="1" fill="hold">
+                                          <p:stCondLst>
+                                            <p:cond delay="0"/>
+                                          </p:stCondLst>
+                                        </p:cTn>
+                                        <p:tgtEl>
+                                          <p:spTgt spid="5"/>
+                                        </p:tgtEl>
+                                        <p:attrNameLst>
+                                          <p:attrName>style.visibility</p:attrName>
+                                        </p:attrNameLst>
+                                      </p:cBhvr>
+                                      <p:to>
+                                        <p:strVal val="visible"/>
+                                      </p:to>
+                                    </p:set>
+                                  </p:childTnLst>
+                                </p:cTn>
+                              </p:par>
+                            </p:childTnLst>
+                          </p:cTn>
+                        </p:par>
+                      </p:childTnLst>
+                    </p:cTn>
+                  </p:par>
+                  <p:par>
+                    <p:cTn id="11" fill="hold">
+                      <p:stCondLst>
+                        <p:cond delay="indefinite"/>
+                      </p:stCondLst>
+                      <p:childTnLst>
+                        <p:par>
+                          <p:cTn id="12" fill="hold">
+                            <p:stCondLst>
+                              <p:cond delay="0"/>
+                            </p:stCondLst>
+                            <p:childTnLst>
+                              <p:par>
+                                <p:cTn id="13" presetID="1" presetClass="entr" presetSubtype="0" fill="hold" nodeType="clickEffect">
+                                  <p:stCondLst>
+                                    <p:cond delay="0"/>
+                                  </p:stCondLst>
+                                  <p:childTnLst>
+                                    <p:set>
+                                      <p:cBhvr>
+                                        <p:cTn id="14" dur="1" fill="hold">
+                                          <p:stCondLst>
+                                            <p:cond delay="0"/>
+                                          </p:stCondLst>
+                                        </p:cTn>
+                                        <p:tgtEl>
+                                          <p:spTgt spid="6"/>
+                                        </p:tgtEl>
+                                        <p:attrNameLst>
+                                          <p:attrName>style.visibility</p:attrName>
+                                        </p:attrNameLst>
+                                      </p:cBhvr>
+                                      <p:to>
+                                        <p:strVal val="visible"/>
+                                      </p:to>
+                                    </p:set>
+                                  </p:childTnLst>
+                                </p:cTn>
+                              </p:par>
+                              <p:par>
+                                <p:cTn id="15" presetID="1" presetClass="exit" presetSubtype="0" fill="hold" nodeType="withEffect">
+                                  <p:stCondLst>
+                                    <p:cond delay="0"/>
+                                  </p:stCondLst>
+                                  <p:childTnLst>
+                                    <p:set>
+                                      <p:cBhvr>
+                                        <p:cTn id="16" dur="1" fill="hold">
+                                          <p:stCondLst>
+                                            <p:cond delay="0"/>
+                                          </p:stCondLst>
+                                        </p:cTn>
+                                        <p:tgtEl>
+                                          <p:spTgt spid="5"/>
+                                        </p:tgtEl>
+                                        <p:attrNameLst>
+                                          <p:attrName>style.visibility</p:attrName>
+                                        </p:attrNameLst>
+                                      </p:cBhvr>
+                                      <p:to>
+                                        <p:strVal val="hidden"/>
+                                      </p:to>
+                                    </p:set>
+                                  </p:childTnLst>
+                                </p:cTn>
+                              </p:par>
+                              <p:par>
+                                <p:cTn id="17" presetID="1" presetClass="exit" presetSubtype="0" fill="hold" nodeType="withEffect">
+                                  <p:stCondLst>
+                                    <p:cond delay="0"/>
+                                  </p:stCondLst>
+                                  <p:childTnLst>
+                                    <p:set>
+                                      <p:cBhvr>
+                                        <p:cTn id="18" dur="1" fill="hold">
+                                          <p:stCondLst>
+                                            <p:cond delay="0"/>
+                                          </p:stCondLst>
+                                        </p:cTn>
+                                        <p:tgtEl>
+                                          <p:spTgt spid="4"/>
+                                        </p:tgtEl>
+                                        <p:attrNameLst>
+                                          <p:attrName>style.visibility</p:attrName>
+                                        </p:attrNameLst>
+                                      </p:cBhvr>
+                                      <p:to>
+                                        <p:strVal val="hidden"/>
+                                      </p:to>
+                                    </p:set>
+                                  </p:childTnLst>
+                                </p:cTn>
+                              </p:par>
+                            </p:childTnLst>
+                          </p:cTn>
+                        </p:par>
+                      </p:childTnLst>
+                    </p:cTn>
+                  </p:par>
+                  <p:par>
+                    <p:cTn id="19" fill="hold">
+                      <p:stCondLst>
+                        <p:cond delay="indefinite"/>
+                      </p:stCondLst>
+                      <p:childTnLst>
+                        <p:par>
+                          <p:cTn id="20" fill="hold">
+                            <p:stCondLst>
+                              <p:cond delay="0"/>
+                            </p:stCondLst>
+                            <p:childTnLst>
+                              <p:par>
+                                <p:cTn id="21" presetID="1" presetClass="entr" presetSubtype="0" fill="hold" nodeType="clickEffect">
+                                  <p:stCondLst>
+                                    <p:cond delay="0"/>
+                                  </p:stCondLst>
+                                  <p:childTnLst>
+                                    <p:set>
+                                      <p:cBhvr>
+                                        <p:cTn id="22" dur="1" fill="hold">
+                                          <p:stCondLst>
+                                            <p:cond delay="0"/>
+                                          </p:stCondLst>
+                                        </p:cTn>
+                                        <p:tgtEl>
+                                          <p:spTgt spid="7"/>
+                                        </p:tgtEl>
+                                        <p:attrNameLst>
+                                          <p:attrName>style.visibility</p:attrName>
+                                        </p:attrNameLst>
+                                      </p:cBhvr>
+                                      <p:to>
+                                        <p:strVal val="visible"/>
+                                      </p:to>
+                                    </p:set>
+                                  </p:childTnLst>
+                                </p:cTn>
+                              </p:par>
+                            </p:childTnLst>
+                          </p:cTn>
+                        </p:par>
+                      </p:childTnLst>
+                    </p:cTn>
+                  </p:par>
+                  <p:par>
+                    <p:cTn id="23" fill="hold">
+                      <p:stCondLst>
+                        <p:cond delay="indefinite"/>
+                      </p:stCondLst>
+                      <p:childTnLst>
+                        <p:par>
+                          <p:cTn id="24" fill="hold">
+                            <p:stCondLst>
+                              <p:cond delay="0"/>
+                            </p:stCondLst>
+                            <p:childTnLst>
+                              <p:par>
+                                <p:cTn id="25" presetID="1" presetClass="entr" presetSubtype="0" fill="hold" nodeType="clickEffect">
+                                  <p:stCondLst>
+                                    <p:cond delay="0"/>
+                                  </p:stCondLst>
+                                  <p:childTnLst>
+                                    <p:set>
+                                      <p:cBhvr>
+                                        <p:cTn id="26" dur="1" fill="hold">
+                                          <p:stCondLst>
+                                            <p:cond delay="0"/>
+                                          </p:stCondLst>
+                                        </p:cTn>
+                                        <p:tgtEl>
+                                          <p:spTgt spid="8"/>
+                                        </p:tgtEl>
+                                        <p:attrNameLst>
+                                          <p:attrName>style.visibility</p:attrName>
+                                        </p:attrNameLst>
+                                      </p:cBhvr>
+                                      <p:to>
+                                        <p:strVal val="visible"/>
+                                      </p:to>
+                                    </p:set>
+                                  </p:childTnLst>
+                                </p:cTn>
+                              </p:par>
+                            </p:childTnLst>
+                          </p:cTn>
+                        </p:par>
+                      </p:childTnLst>
+                    </p:cTn>
+                  </p:par>
+                </p:childTnLst>
+              </p:cTn>
+              <p:prevCondLst>
+                <p:cond evt="onPrev" delay="0">
+                  <p:tgtEl>
+                    <p:sldTgt/>
+                  </p:tgtEl>
+                </p:cond>
+              </p:prevCondLst>
+              <p:nextCondLst>
+                <p:cond evt="onNext" delay="0">
+                  <p:tgtEl>
+                    <p:sldTgt/>
+                  </p:tgtEl>
+                </p:cond>
+              </p:nextCondLst>
+            </p:seq>
+          </p:childTnLst>
+        </p:cTn>
+      </p:par>
+    </p:tnLst>
+  </p:timing>
+</p:sld>
+</file>
+
+<file path=ppt/slides/slide21.xml><?xml version="1.0" encoding="utf-8"?>
+<p:sld xmlns:a="http://schemas.openxmlformats.org/drawingml/2006/main" xmlns:r="http://schemas.openxmlformats.org/officeDocument/2006/relationships" xmlns:p="http://schemas.openxmlformats.org/presentationml/2006/main">
+  <p:cSld>
+    <p:spTree>
+      <p:nvGrpSpPr>
+        <p:cNvPr id="1" name=""/>
+        <p:cNvGrpSpPr/>
+        <p:nvPr/>
+      </p:nvGrpSpPr>
+      <p:grpSpPr>
+        <a:xfrm>
+          <a:off x="0" y="0"/>
+          <a:ext cx="0" cy="0"/>
+          <a:chOff x="0" y="0"/>
+          <a:chExt cx="0" cy="0"/>
+        </a:xfrm>
+      </p:grpSpPr>
+      <p:sp>
+        <p:nvSpPr>
+          <p:cNvPr id="2" name="Title 1">
+            <a:extLst>
+              <a:ext uri="{FF2B5EF4-FFF2-40B4-BE49-F238E27FC236}">
+                <a16:creationId xmlns:a16="http://schemas.microsoft.com/office/drawing/2014/main" id="{744C9B27-AD08-4F88-983C-331EA55E4E7C}"/>
+              </a:ext>
+            </a:extLst>
+          </p:cNvPr>
+          <p:cNvSpPr>
+            <a:spLocks noGrp="1"/>
+          </p:cNvSpPr>
+          <p:nvPr>
+            <p:ph type="title"/>
+          </p:nvPr>
+        </p:nvSpPr>
+        <p:spPr/>
+        <p:txBody>
+          <a:bodyPr/>
+          <a:lstStyle/>
+          <a:p>
+            <a:r>
+              <a:rPr lang="en-US" dirty="0"/>
+              <a:t>Authorize </a:t>
+            </a:r>
+            <a:r>
+              <a:rPr lang="en-US" dirty="0" err="1"/>
+              <a:t>Codecov</a:t>
+            </a:r>
+            <a:r>
+              <a:rPr lang="en-US" dirty="0"/>
+              <a:t> in </a:t>
+            </a:r>
+            <a:r>
+              <a:rPr lang="en-US" dirty="0" err="1"/>
+              <a:t>github</a:t>
+            </a:r>
+            <a:endParaRPr lang="en-US" dirty="0"/>
+          </a:p>
+        </p:txBody>
+      </p:sp>
+      <p:pic>
+        <p:nvPicPr>
+          <p:cNvPr id="5" name="Picture 4">
+            <a:extLst>
+              <a:ext uri="{FF2B5EF4-FFF2-40B4-BE49-F238E27FC236}">
+                <a16:creationId xmlns:a16="http://schemas.microsoft.com/office/drawing/2014/main" id="{FEF33038-279E-4528-B47F-209591DA568D}"/>
+              </a:ext>
+            </a:extLst>
+          </p:cNvPr>
+          <p:cNvPicPr>
+            <a:picLocks noChangeAspect="1"/>
+          </p:cNvPicPr>
+          <p:nvPr/>
+        </p:nvPicPr>
+        <p:blipFill>
+          <a:blip r:embed="rId2"/>
+          <a:stretch>
+            <a:fillRect/>
+          </a:stretch>
+        </p:blipFill>
+        <p:spPr>
+          <a:xfrm>
+            <a:off x="644273" y="2326014"/>
+            <a:ext cx="10733333" cy="504762"/>
+          </a:xfrm>
+          <a:prstGeom prst="rect">
+            <a:avLst/>
+          </a:prstGeom>
+        </p:spPr>
+      </p:pic>
+      <p:sp>
+        <p:nvSpPr>
+          <p:cNvPr id="6" name="Arrow: Down 5">
+            <a:extLst>
+              <a:ext uri="{FF2B5EF4-FFF2-40B4-BE49-F238E27FC236}">
+                <a16:creationId xmlns:a16="http://schemas.microsoft.com/office/drawing/2014/main" id="{69A6056C-A19F-4C12-BCC1-B62CC1080CF1}"/>
+              </a:ext>
+            </a:extLst>
+          </p:cNvPr>
+          <p:cNvSpPr/>
+          <p:nvPr/>
+        </p:nvSpPr>
+        <p:spPr>
+          <a:xfrm>
+            <a:off x="8654902" y="1796902"/>
+            <a:ext cx="457200" cy="648586"/>
+          </a:xfrm>
+          <a:prstGeom prst="downArrow">
+            <a:avLst/>
+          </a:prstGeom>
+          <a:solidFill>
+            <a:schemeClr val="accent2"/>
+          </a:solidFill>
+          <a:ln>
+            <a:solidFill>
+              <a:schemeClr val="accent2"/>
+            </a:solidFill>
+          </a:ln>
+        </p:spPr>
+        <p:style>
+          <a:lnRef idx="2">
+            <a:schemeClr val="accent1">
+              <a:shade val="50000"/>
+            </a:schemeClr>
+          </a:lnRef>
+          <a:fillRef idx="1">
+            <a:schemeClr val="accent1"/>
+          </a:fillRef>
+          <a:effectRef idx="0">
+            <a:schemeClr val="accent1"/>
+          </a:effectRef>
+          <a:fontRef idx="minor">
+            <a:schemeClr val="lt1"/>
+          </a:fontRef>
+        </p:style>
+        <p:txBody>
+          <a:bodyPr rtlCol="0" anchor="ctr"/>
+          <a:lstStyle/>
+          <a:p>
+            <a:pPr algn="ctr"/>
+            <a:endParaRPr lang="en-US">
+              <a:solidFill>
+                <a:schemeClr val="accent2"/>
+              </a:solidFill>
+            </a:endParaRPr>
+          </a:p>
+        </p:txBody>
+      </p:sp>
+      <p:pic>
+        <p:nvPicPr>
+          <p:cNvPr id="8" name="Picture 7">
+            <a:extLst>
+              <a:ext uri="{FF2B5EF4-FFF2-40B4-BE49-F238E27FC236}">
+                <a16:creationId xmlns:a16="http://schemas.microsoft.com/office/drawing/2014/main" id="{9FB54463-678A-4E5F-828F-FBFF982086C9}"/>
+              </a:ext>
+            </a:extLst>
+          </p:cNvPr>
+          <p:cNvPicPr>
+            <a:picLocks noChangeAspect="1"/>
+          </p:cNvPicPr>
+          <p:nvPr/>
+        </p:nvPicPr>
+        <p:blipFill>
+          <a:blip r:embed="rId3"/>
+          <a:stretch>
+            <a:fillRect/>
+          </a:stretch>
+        </p:blipFill>
+        <p:spPr>
+          <a:xfrm>
+            <a:off x="2110834" y="814296"/>
+            <a:ext cx="7967156" cy="5229407"/>
+          </a:xfrm>
+          <a:prstGeom prst="rect">
+            <a:avLst/>
+          </a:prstGeom>
+        </p:spPr>
+      </p:pic>
+      <p:sp>
+        <p:nvSpPr>
+          <p:cNvPr id="9" name="Arrow: Down 8">
+            <a:extLst>
+              <a:ext uri="{FF2B5EF4-FFF2-40B4-BE49-F238E27FC236}">
+                <a16:creationId xmlns:a16="http://schemas.microsoft.com/office/drawing/2014/main" id="{39CC4F0A-04FE-466C-B6F0-6B2B5BA06B1B}"/>
+              </a:ext>
+            </a:extLst>
+          </p:cNvPr>
+          <p:cNvSpPr/>
+          <p:nvPr/>
+        </p:nvSpPr>
+        <p:spPr>
+          <a:xfrm rot="14969901">
+            <a:off x="6858001" y="814298"/>
+            <a:ext cx="574158" cy="859408"/>
+          </a:xfrm>
+          <a:prstGeom prst="downArrow">
+            <a:avLst/>
+          </a:prstGeom>
+          <a:solidFill>
+            <a:schemeClr val="accent2"/>
+          </a:solidFill>
+          <a:ln>
+            <a:solidFill>
+              <a:schemeClr val="accent2"/>
+            </a:solidFill>
+          </a:ln>
+        </p:spPr>
+        <p:style>
+          <a:lnRef idx="2">
+            <a:schemeClr val="accent1">
+              <a:shade val="50000"/>
+            </a:schemeClr>
+          </a:lnRef>
+          <a:fillRef idx="1">
+            <a:schemeClr val="accent1"/>
+          </a:fillRef>
+          <a:effectRef idx="0">
+            <a:schemeClr val="accent1"/>
+          </a:effectRef>
+          <a:fontRef idx="minor">
+            <a:schemeClr val="lt1"/>
+          </a:fontRef>
+        </p:style>
+        <p:txBody>
+          <a:bodyPr rtlCol="0" anchor="ctr"/>
+          <a:lstStyle/>
+          <a:p>
+            <a:pPr algn="ctr"/>
+            <a:endParaRPr lang="en-US"/>
+          </a:p>
+        </p:txBody>
+      </p:sp>
+      <p:pic>
+        <p:nvPicPr>
+          <p:cNvPr id="10" name="Picture 9">
+            <a:extLst>
+              <a:ext uri="{FF2B5EF4-FFF2-40B4-BE49-F238E27FC236}">
+                <a16:creationId xmlns:a16="http://schemas.microsoft.com/office/drawing/2014/main" id="{AC554496-8049-44FA-96FE-43095F05C326}"/>
+              </a:ext>
+            </a:extLst>
+          </p:cNvPr>
+          <p:cNvPicPr>
+            <a:picLocks noChangeAspect="1"/>
+          </p:cNvPicPr>
+          <p:nvPr/>
+        </p:nvPicPr>
+        <p:blipFill>
+          <a:blip r:embed="rId4"/>
+          <a:stretch>
+            <a:fillRect/>
+          </a:stretch>
+        </p:blipFill>
+        <p:spPr>
+          <a:xfrm>
+            <a:off x="3950375" y="341913"/>
+            <a:ext cx="4121128" cy="6174171"/>
+          </a:xfrm>
+          <a:prstGeom prst="rect">
+            <a:avLst/>
+          </a:prstGeom>
+        </p:spPr>
+      </p:pic>
+    </p:spTree>
+    <p:extLst>
+      <p:ext uri="{BB962C8B-B14F-4D97-AF65-F5344CB8AC3E}">
+        <p14:creationId xmlns:p14="http://schemas.microsoft.com/office/powerpoint/2010/main" val="1539474575"/>
+      </p:ext>
+    </p:extLst>
+  </p:cSld>
+  <p:clrMapOvr>
+    <a:masterClrMapping/>
+  </p:clrMapOvr>
+  <p:timing>
+    <p:tnLst>
+      <p:par>
+        <p:cTn id="1" dur="indefinite" restart="never" nodeType="tmRoot">
+          <p:childTnLst>
+            <p:seq concurrent="1" nextAc="seek">
+              <p:cTn id="2" dur="indefinite" nodeType="mainSeq">
+                <p:childTnLst>
+                  <p:par>
+                    <p:cTn id="3" fill="hold">
+                      <p:stCondLst>
+                        <p:cond delay="indefinite"/>
+                      </p:stCondLst>
+                      <p:childTnLst>
+                        <p:par>
+                          <p:cTn id="4" fill="hold">
+                            <p:stCondLst>
+                              <p:cond delay="0"/>
+                            </p:stCondLst>
+                            <p:childTnLst>
+                              <p:par>
+                                <p:cTn id="5" presetID="1" presetClass="entr" presetSubtype="0" fill="hold" grpId="0" nodeType="clickEffect">
+                                  <p:stCondLst>
+                                    <p:cond delay="0"/>
+                                  </p:stCondLst>
+                                  <p:childTnLst>
+                                    <p:set>
+                                      <p:cBhvr>
+                                        <p:cTn id="6" dur="1" fill="hold">
+                                          <p:stCondLst>
+                                            <p:cond delay="0"/>
+                                          </p:stCondLst>
+                                        </p:cTn>
+                                        <p:tgtEl>
+                                          <p:spTgt spid="9"/>
+                                        </p:tgtEl>
+                                        <p:attrNameLst>
+                                          <p:attrName>style.visibility</p:attrName>
+                                        </p:attrNameLst>
+                                      </p:cBhvr>
+                                      <p:to>
+                                        <p:strVal val="visible"/>
+                                      </p:to>
+                                    </p:set>
+                                  </p:childTnLst>
+                                </p:cTn>
+                              </p:par>
+                              <p:par>
+                                <p:cTn id="7" presetID="1" presetClass="entr" presetSubtype="0" fill="hold" nodeType="withEffect">
+                                  <p:stCondLst>
+                                    <p:cond delay="0"/>
+                                  </p:stCondLst>
+                                  <p:childTnLst>
+                                    <p:set>
+                                      <p:cBhvr>
+                                        <p:cTn id="8" dur="1" fill="hold">
+                                          <p:stCondLst>
+                                            <p:cond delay="0"/>
+                                          </p:stCondLst>
+                                        </p:cTn>
+                                        <p:tgtEl>
+                                          <p:spTgt spid="8"/>
+                                        </p:tgtEl>
+                                        <p:attrNameLst>
+                                          <p:attrName>style.visibility</p:attrName>
+                                        </p:attrNameLst>
+                                      </p:cBhvr>
+                                      <p:to>
+                                        <p:strVal val="visible"/>
+                                      </p:to>
+                                    </p:set>
+                                  </p:childTnLst>
+                                </p:cTn>
+                              </p:par>
+                            </p:childTnLst>
+                          </p:cTn>
+                        </p:par>
+                      </p:childTnLst>
+                    </p:cTn>
+                  </p:par>
+                  <p:par>
+                    <p:cTn id="9" fill="hold">
+                      <p:stCondLst>
+                        <p:cond delay="indefinite"/>
+                      </p:stCondLst>
+                      <p:childTnLst>
+                        <p:par>
+                          <p:cTn id="10" fill="hold">
+                            <p:stCondLst>
+                              <p:cond delay="0"/>
+                            </p:stCondLst>
+                            <p:childTnLst>
+                              <p:par>
+                                <p:cTn id="11" presetID="1" presetClass="entr" presetSubtype="0" fill="hold" nodeType="clickEffect">
+                                  <p:stCondLst>
+                                    <p:cond delay="0"/>
+                                  </p:stCondLst>
+                                  <p:childTnLst>
+                                    <p:set>
+                                      <p:cBhvr>
+                                        <p:cTn id="12" dur="1" fill="hold">
+                                          <p:stCondLst>
+                                            <p:cond delay="0"/>
+                                          </p:stCondLst>
+                                        </p:cTn>
+                                        <p:tgtEl>
+                                          <p:spTgt spid="10"/>
+                                        </p:tgtEl>
+                                        <p:attrNameLst>
+                                          <p:attrName>style.visibility</p:attrName>
+                                        </p:attrNameLst>
+                                      </p:cBhvr>
+                                      <p:to>
+                                        <p:strVal val="visible"/>
+                                      </p:to>
+                                    </p:set>
+                                  </p:childTnLst>
+                                </p:cTn>
+                              </p:par>
+                              <p:par>
+                                <p:cTn id="13" presetID="1" presetClass="exit" presetSubtype="0" fill="hold" grpId="1" nodeType="withEffect">
+                                  <p:stCondLst>
+                                    <p:cond delay="0"/>
+                                  </p:stCondLst>
+                                  <p:childTnLst>
+                                    <p:set>
+                                      <p:cBhvr>
+                                        <p:cTn id="14" dur="1" fill="hold">
+                                          <p:stCondLst>
+                                            <p:cond delay="0"/>
+                                          </p:stCondLst>
+                                        </p:cTn>
+                                        <p:tgtEl>
+                                          <p:spTgt spid="9"/>
+                                        </p:tgtEl>
+                                        <p:attrNameLst>
+                                          <p:attrName>style.visibility</p:attrName>
+                                        </p:attrNameLst>
+                                      </p:cBhvr>
+                                      <p:to>
+                                        <p:strVal val="hidden"/>
+                                      </p:to>
+                                    </p:set>
+                                  </p:childTnLst>
+                                </p:cTn>
+                              </p:par>
+                              <p:par>
+                                <p:cTn id="15" presetID="1" presetClass="exit" presetSubtype="0" fill="hold" nodeType="withEffect">
+                                  <p:stCondLst>
+                                    <p:cond delay="0"/>
+                                  </p:stCondLst>
+                                  <p:childTnLst>
+                                    <p:set>
+                                      <p:cBhvr>
+                                        <p:cTn id="16" dur="1" fill="hold">
+                                          <p:stCondLst>
+                                            <p:cond delay="0"/>
+                                          </p:stCondLst>
+                                        </p:cTn>
+                                        <p:tgtEl>
+                                          <p:spTgt spid="8"/>
+                                        </p:tgtEl>
+                                        <p:attrNameLst>
+                                          <p:attrName>style.visibility</p:attrName>
+                                        </p:attrNameLst>
+                                      </p:cBhvr>
+                                      <p:to>
+                                        <p:strVal val="hidden"/>
+                                      </p:to>
+                                    </p:set>
+                                  </p:childTnLst>
+                                </p:cTn>
+                              </p:par>
+                              <p:par>
+                                <p:cTn id="17" presetID="1" presetClass="exit" presetSubtype="0" fill="hold" nodeType="withEffect">
+                                  <p:stCondLst>
+                                    <p:cond delay="0"/>
+                                  </p:stCondLst>
+                                  <p:childTnLst>
+                                    <p:set>
+                                      <p:cBhvr>
+                                        <p:cTn id="18" dur="1" fill="hold">
+                                          <p:stCondLst>
+                                            <p:cond delay="0"/>
+                                          </p:stCondLst>
+                                        </p:cTn>
+                                        <p:tgtEl>
+                                          <p:spTgt spid="5"/>
+                                        </p:tgtEl>
+                                        <p:attrNameLst>
+                                          <p:attrName>style.visibility</p:attrName>
+                                        </p:attrNameLst>
+                                      </p:cBhvr>
+                                      <p:to>
+                                        <p:strVal val="hidden"/>
+                                      </p:to>
+                                    </p:set>
+                                  </p:childTnLst>
+                                </p:cTn>
+                              </p:par>
+                            </p:childTnLst>
+                          </p:cTn>
+                        </p:par>
+                      </p:childTnLst>
+                    </p:cTn>
+                  </p:par>
+                </p:childTnLst>
+              </p:cTn>
+              <p:prevCondLst>
+                <p:cond evt="onPrev" delay="0">
+                  <p:tgtEl>
+                    <p:sldTgt/>
+                  </p:tgtEl>
+                </p:cond>
+              </p:prevCondLst>
+              <p:nextCondLst>
+                <p:cond evt="onNext" delay="0">
+                  <p:tgtEl>
+                    <p:sldTgt/>
+                  </p:tgtEl>
+                </p:cond>
+              </p:nextCondLst>
+            </p:seq>
+          </p:childTnLst>
+        </p:cTn>
+      </p:par>
+    </p:tnLst>
+    <p:bldLst>
+      <p:bldP spid="9" grpId="0" animBg="1"/>
+      <p:bldP spid="9" grpId="1" animBg="1"/>
+    </p:bldLst>
+  </p:timing>
+</p:sld>
+</file>
+
+<file path=ppt/slides/slide22.xml><?xml version="1.0" encoding="utf-8"?>
+<p:sld xmlns:a="http://schemas.openxmlformats.org/drawingml/2006/main" xmlns:r="http://schemas.openxmlformats.org/officeDocument/2006/relationships" xmlns:p="http://schemas.openxmlformats.org/presentationml/2006/main">
+  <p:cSld>
+    <p:spTree>
+      <p:nvGrpSpPr>
+        <p:cNvPr id="1" name=""/>
+        <p:cNvGrpSpPr/>
+        <p:nvPr/>
+      </p:nvGrpSpPr>
+      <p:grpSpPr>
+        <a:xfrm>
+          <a:off x="0" y="0"/>
+          <a:ext cx="0" cy="0"/>
+          <a:chOff x="0" y="0"/>
+          <a:chExt cx="0" cy="0"/>
+        </a:xfrm>
+      </p:grpSpPr>
+      <p:sp>
+        <p:nvSpPr>
+          <p:cNvPr id="2" name="Title 1">
+            <a:extLst>
+              <a:ext uri="{FF2B5EF4-FFF2-40B4-BE49-F238E27FC236}">
+                <a16:creationId xmlns:a16="http://schemas.microsoft.com/office/drawing/2014/main" id="{CE5E301C-4E6B-40FF-A659-3752214D12F1}"/>
+              </a:ext>
+            </a:extLst>
+          </p:cNvPr>
+          <p:cNvSpPr>
+            <a:spLocks noGrp="1"/>
+          </p:cNvSpPr>
+          <p:nvPr>
+            <p:ph type="title"/>
+          </p:nvPr>
+        </p:nvSpPr>
+        <p:spPr/>
+        <p:txBody>
+          <a:bodyPr/>
+          <a:lstStyle/>
+          <a:p>
+            <a:r>
+              <a:rPr lang="en-US" dirty="0"/>
+              <a:t>Create a YAML for </a:t>
+            </a:r>
+            <a:r>
+              <a:rPr lang="en-US" dirty="0" err="1"/>
+              <a:t>Codecov</a:t>
+            </a:r>
+            <a:endParaRPr lang="en-US" dirty="0"/>
+          </a:p>
+        </p:txBody>
+      </p:sp>
+      <p:sp>
+        <p:nvSpPr>
+          <p:cNvPr id="3" name="Content Placeholder 2">
+            <a:extLst>
+              <a:ext uri="{FF2B5EF4-FFF2-40B4-BE49-F238E27FC236}">
+                <a16:creationId xmlns:a16="http://schemas.microsoft.com/office/drawing/2014/main" id="{94B64657-41CA-4186-848D-91ED3D29A457}"/>
+              </a:ext>
+            </a:extLst>
+          </p:cNvPr>
+          <p:cNvSpPr>
+            <a:spLocks noGrp="1"/>
+          </p:cNvSpPr>
+          <p:nvPr>
+            <p:ph idx="1"/>
+          </p:nvPr>
+        </p:nvSpPr>
+        <p:spPr/>
+        <p:txBody>
+          <a:bodyPr/>
+          <a:lstStyle/>
+          <a:p>
+            <a:endParaRPr lang="en-US"/>
+          </a:p>
+        </p:txBody>
+      </p:sp>
+    </p:spTree>
+    <p:extLst>
+      <p:ext uri="{BB962C8B-B14F-4D97-AF65-F5344CB8AC3E}">
+        <p14:creationId xmlns:p14="http://schemas.microsoft.com/office/powerpoint/2010/main" val="3260222621"/>
+      </p:ext>
+    </p:extLst>
+  </p:cSld>
+  <p:clrMapOvr>
+    <a:masterClrMapping/>
+  </p:clrMapOvr>
+</p:sld>
+</file>
+
+<file path=ppt/slides/slide23.xml><?xml version="1.0" encoding="utf-8"?>
+<p:sld xmlns:a="http://schemas.openxmlformats.org/drawingml/2006/main" xmlns:r="http://schemas.openxmlformats.org/officeDocument/2006/relationships" xmlns:p="http://schemas.openxmlformats.org/presentationml/2006/main">
+  <p:cSld>
+    <p:spTree>
+      <p:nvGrpSpPr>
+        <p:cNvPr id="1" name=""/>
+        <p:cNvGrpSpPr/>
+        <p:nvPr/>
+      </p:nvGrpSpPr>
+      <p:grpSpPr>
+        <a:xfrm>
+          <a:off x="0" y="0"/>
+          <a:ext cx="0" cy="0"/>
+          <a:chOff x="0" y="0"/>
+          <a:chExt cx="0" cy="0"/>
+        </a:xfrm>
+      </p:grpSpPr>
+      <p:sp>
+        <p:nvSpPr>
+          <p:cNvPr id="2" name="Title 1">
+            <a:extLst>
+              <a:ext uri="{FF2B5EF4-FFF2-40B4-BE49-F238E27FC236}">
+                <a16:creationId xmlns:a16="http://schemas.microsoft.com/office/drawing/2014/main" id="{DEDF95E6-31A7-4A4D-B81B-67A931C484D1}"/>
+              </a:ext>
+            </a:extLst>
+          </p:cNvPr>
+          <p:cNvSpPr>
+            <a:spLocks noGrp="1"/>
+          </p:cNvSpPr>
+          <p:nvPr>
+            <p:ph type="title"/>
+          </p:nvPr>
+        </p:nvSpPr>
+        <p:spPr/>
+        <p:txBody>
+          <a:bodyPr/>
+          <a:lstStyle/>
+          <a:p>
+            <a:r>
+              <a:rPr lang="en-US" dirty="0"/>
+              <a:t>Links and credits</a:t>
+            </a:r>
+          </a:p>
+        </p:txBody>
+      </p:sp>
+      <p:sp>
+        <p:nvSpPr>
+          <p:cNvPr id="3" name="Content Placeholder 2">
+            <a:extLst>
+              <a:ext uri="{FF2B5EF4-FFF2-40B4-BE49-F238E27FC236}">
+                <a16:creationId xmlns:a16="http://schemas.microsoft.com/office/drawing/2014/main" id="{854FB79B-E0E0-4106-9101-482D7D707EAC}"/>
+              </a:ext>
+            </a:extLst>
+          </p:cNvPr>
+          <p:cNvSpPr>
+            <a:spLocks noGrp="1"/>
+          </p:cNvSpPr>
+          <p:nvPr>
+            <p:ph idx="1"/>
+          </p:nvPr>
+        </p:nvSpPr>
+        <p:spPr/>
+        <p:txBody>
+          <a:bodyPr/>
+          <a:lstStyle/>
+          <a:p>
+            <a:r>
+              <a:rPr lang="en-US" dirty="0" err="1"/>
+              <a:t>Opencover</a:t>
+            </a:r>
+            <a:r>
+              <a:rPr lang="en-US" dirty="0"/>
+              <a:t>: https://github.com/opencover/opencover/wiki/Usage</a:t>
+            </a:r>
+          </a:p>
+        </p:txBody>
+      </p:sp>
+    </p:spTree>
+    <p:extLst>
+      <p:ext uri="{BB962C8B-B14F-4D97-AF65-F5344CB8AC3E}">
+        <p14:creationId xmlns:p14="http://schemas.microsoft.com/office/powerpoint/2010/main" val="3021987684"/>
       </p:ext>
     </p:extLst>
   </p:cSld>
@@ -16323,6 +18091,17 @@
           <a:p>
             <a:pPr algn="just"/>
             <a:r>
+              <a:rPr lang="en-US" dirty="0" err="1"/>
+              <a:t>NodeJs</a:t>
+            </a:r>
+            <a:r>
+              <a:rPr lang="en-US" dirty="0"/>
+              <a:t>: mostly for the build environment</a:t>
+            </a:r>
+          </a:p>
+          <a:p>
+            <a:pPr algn="just"/>
+            <a:r>
               <a:rPr lang="en-US" dirty="0"/>
               <a:t>Yarn (or NPM)</a:t>
             </a:r>
@@ -16334,8 +18113,45 @@
               <a:t>Dotnet core 2.1 (other version should work fine)</a:t>
             </a:r>
           </a:p>
+          <a:p>
+            <a:pPr algn="just"/>
+            <a:r>
+              <a:rPr lang="en-US" dirty="0"/>
+              <a:t>Chocolatey</a:t>
+            </a:r>
+          </a:p>
         </p:txBody>
       </p:sp>
+      <p:pic>
+        <p:nvPicPr>
+          <p:cNvPr id="4" name="Picture 3">
+            <a:extLst>
+              <a:ext uri="{FF2B5EF4-FFF2-40B4-BE49-F238E27FC236}">
+                <a16:creationId xmlns:a16="http://schemas.microsoft.com/office/drawing/2014/main" id="{69C5ED94-B7FC-49FE-A8F3-401D03ADC5BF}"/>
+              </a:ext>
+            </a:extLst>
+          </p:cNvPr>
+          <p:cNvPicPr>
+            <a:picLocks noChangeAspect="1"/>
+          </p:cNvPicPr>
+          <p:nvPr/>
+        </p:nvPicPr>
+        <p:blipFill>
+          <a:blip r:embed="rId2"/>
+          <a:stretch>
+            <a:fillRect/>
+          </a:stretch>
+        </p:blipFill>
+        <p:spPr>
+          <a:xfrm>
+            <a:off x="3661669" y="838503"/>
+            <a:ext cx="4865484" cy="5180994"/>
+          </a:xfrm>
+          <a:prstGeom prst="rect">
+            <a:avLst/>
+          </a:prstGeom>
+        </p:spPr>
+      </p:pic>
     </p:spTree>
     <p:extLst>
       <p:ext uri="{BB962C8B-B14F-4D97-AF65-F5344CB8AC3E}">
@@ -16346,6 +18162,81 @@
   <p:clrMapOvr>
     <a:masterClrMapping/>
   </p:clrMapOvr>
+  <p:timing>
+    <p:tnLst>
+      <p:par>
+        <p:cTn id="1" dur="indefinite" restart="never" nodeType="tmRoot">
+          <p:childTnLst>
+            <p:seq concurrent="1" nextAc="seek">
+              <p:cTn id="2" dur="indefinite" nodeType="mainSeq">
+                <p:childTnLst>
+                  <p:par>
+                    <p:cTn id="3" fill="hold">
+                      <p:stCondLst>
+                        <p:cond delay="indefinite"/>
+                      </p:stCondLst>
+                      <p:childTnLst>
+                        <p:par>
+                          <p:cTn id="4" fill="hold">
+                            <p:stCondLst>
+                              <p:cond delay="0"/>
+                            </p:stCondLst>
+                            <p:childTnLst>
+                              <p:par>
+                                <p:cTn id="5" presetID="1" presetClass="entr" presetSubtype="0" fill="hold" nodeType="clickEffect">
+                                  <p:stCondLst>
+                                    <p:cond delay="0"/>
+                                  </p:stCondLst>
+                                  <p:childTnLst>
+                                    <p:set>
+                                      <p:cBhvr>
+                                        <p:cTn id="6" dur="1" fill="hold">
+                                          <p:stCondLst>
+                                            <p:cond delay="0"/>
+                                          </p:stCondLst>
+                                        </p:cTn>
+                                        <p:tgtEl>
+                                          <p:spTgt spid="4"/>
+                                        </p:tgtEl>
+                                        <p:attrNameLst>
+                                          <p:attrName>style.visibility</p:attrName>
+                                        </p:attrNameLst>
+                                      </p:cBhvr>
+                                      <p:to>
+                                        <p:strVal val="visible"/>
+                                      </p:to>
+                                    </p:set>
+                                  </p:childTnLst>
+                                </p:cTn>
+                              </p:par>
+                            </p:childTnLst>
+                          </p:cTn>
+                        </p:par>
+                      </p:childTnLst>
+                    </p:cTn>
+                  </p:par>
+                </p:childTnLst>
+              </p:cTn>
+              <p:prevCondLst>
+                <p:cond evt="onPrev" delay="0">
+                  <p:tgtEl>
+                    <p:sldTgt/>
+                  </p:tgtEl>
+                </p:cond>
+              </p:prevCondLst>
+              <p:nextCondLst>
+                <p:cond evt="onNext" delay="0">
+                  <p:tgtEl>
+                    <p:sldTgt/>
+                  </p:tgtEl>
+                </p:cond>
+              </p:nextCondLst>
+            </p:seq>
+          </p:childTnLst>
+        </p:cTn>
+      </p:par>
+    </p:tnLst>
+  </p:timing>
 </p:sld>
 </file>
 

</xml_diff>

<commit_message>
Add code coverage (#4)
* Move things around for easy stage building

* First push to test opencover

* Previous YAML not updated

* Try to find proper user directory

* Update 2

* Update 3

* Add codecov.yml. First test.

* Change sequence to get codecov

* Update 4

* Update solution file

* Update 5

* Update 6
</commit_message>
<xml_diff>
--- a/Presentation/Full Open-Source CI.pptx
+++ b/Presentation/Full Open-Source CI.pptx
@@ -20,6 +20,14 @@
     <p:sldId id="268" r:id="rId14"/>
     <p:sldId id="269" r:id="rId15"/>
     <p:sldId id="270" r:id="rId16"/>
+    <p:sldId id="271" r:id="rId17"/>
+    <p:sldId id="272" r:id="rId18"/>
+    <p:sldId id="274" r:id="rId19"/>
+    <p:sldId id="275" r:id="rId20"/>
+    <p:sldId id="279" r:id="rId21"/>
+    <p:sldId id="277" r:id="rId22"/>
+    <p:sldId id="278" r:id="rId23"/>
+    <p:sldId id="273" r:id="rId24"/>
   </p:sldIdLst>
   <p:sldSz cx="12192000" cy="6858000"/>
   <p:notesSz cx="6858000" cy="9144000"/>
@@ -1052,7 +1060,7 @@
           <a:noFill/>
           <a:extLst>
             <a:ext uri="{909E8E84-426E-40dd-AFC4-6F175D3DCCD1}">
-              <a14:hiddenFill xmlns="" xmlns:a14="http://schemas.microsoft.com/office/drawing/2010/main">
+              <a14:hiddenFill xmlns:a14="http://schemas.microsoft.com/office/drawing/2010/main" xmlns="">
                 <a:solidFill>
                   <a:srgbClr val="FFFFFF"/>
                 </a:solidFill>
@@ -1112,7 +1120,7 @@
             </a:ln>
             <a:extLst>
               <a:ext uri="{91240B29-F687-4f45-9708-019B960494DF}">
-                <a14:hiddenLine xmlns="" xmlns:a14="http://schemas.microsoft.com/office/drawing/2010/main" w="9525">
+                <a14:hiddenLine xmlns:a14="http://schemas.microsoft.com/office/drawing/2010/main" xmlns="" w="9525">
                   <a:solidFill>
                     <a:srgbClr val="000000"/>
                   </a:solidFill>
@@ -1202,7 +1210,7 @@
             </a:ln>
             <a:extLst>
               <a:ext uri="{91240B29-F687-4f45-9708-019B960494DF}">
-                <a14:hiddenLine xmlns="" xmlns:a14="http://schemas.microsoft.com/office/drawing/2010/main" w="9525">
+                <a14:hiddenLine xmlns:a14="http://schemas.microsoft.com/office/drawing/2010/main" xmlns="" w="9525">
                   <a:solidFill>
                     <a:srgbClr val="000000"/>
                   </a:solidFill>
@@ -1292,7 +1300,7 @@
             </a:ln>
             <a:extLst>
               <a:ext uri="{91240B29-F687-4f45-9708-019B960494DF}">
-                <a14:hiddenLine xmlns="" xmlns:a14="http://schemas.microsoft.com/office/drawing/2010/main" w="9525">
+                <a14:hiddenLine xmlns:a14="http://schemas.microsoft.com/office/drawing/2010/main" xmlns="" w="9525">
                   <a:solidFill>
                     <a:srgbClr val="000000"/>
                   </a:solidFill>
@@ -1326,7 +1334,7 @@
             </a:ln>
             <a:extLst>
               <a:ext uri="{91240B29-F687-4f45-9708-019B960494DF}">
-                <a14:hiddenLine xmlns="" xmlns:a14="http://schemas.microsoft.com/office/drawing/2010/main" w="9525">
+                <a14:hiddenLine xmlns:a14="http://schemas.microsoft.com/office/drawing/2010/main" xmlns="" w="9525">
                   <a:solidFill>
                     <a:srgbClr val="000000"/>
                   </a:solidFill>
@@ -1416,7 +1424,7 @@
             </a:ln>
             <a:extLst>
               <a:ext uri="{91240B29-F687-4f45-9708-019B960494DF}">
-                <a14:hiddenLine xmlns="" xmlns:a14="http://schemas.microsoft.com/office/drawing/2010/main" w="9525">
+                <a14:hiddenLine xmlns:a14="http://schemas.microsoft.com/office/drawing/2010/main" xmlns="" w="9525">
                   <a:solidFill>
                     <a:srgbClr val="000000"/>
                   </a:solidFill>
@@ -1478,7 +1486,7 @@
             </a:ln>
             <a:extLst>
               <a:ext uri="{91240B29-F687-4f45-9708-019B960494DF}">
-                <a14:hiddenLine xmlns="" xmlns:a14="http://schemas.microsoft.com/office/drawing/2010/main" w="9525">
+                <a14:hiddenLine xmlns:a14="http://schemas.microsoft.com/office/drawing/2010/main" xmlns="" w="9525">
                   <a:solidFill>
                     <a:srgbClr val="000000"/>
                   </a:solidFill>
@@ -1540,7 +1548,7 @@
             </a:ln>
             <a:extLst>
               <a:ext uri="{91240B29-F687-4f45-9708-019B960494DF}">
-                <a14:hiddenLine xmlns="" xmlns:a14="http://schemas.microsoft.com/office/drawing/2010/main" w="9525">
+                <a14:hiddenLine xmlns:a14="http://schemas.microsoft.com/office/drawing/2010/main" xmlns="" w="9525">
                   <a:solidFill>
                     <a:srgbClr val="000000"/>
                   </a:solidFill>
@@ -1630,7 +1638,7 @@
             </a:ln>
             <a:extLst>
               <a:ext uri="{91240B29-F687-4f45-9708-019B960494DF}">
-                <a14:hiddenLine xmlns="" xmlns:a14="http://schemas.microsoft.com/office/drawing/2010/main" w="9525">
+                <a14:hiddenLine xmlns:a14="http://schemas.microsoft.com/office/drawing/2010/main" xmlns="" w="9525">
                   <a:solidFill>
                     <a:srgbClr val="000000"/>
                   </a:solidFill>
@@ -1692,7 +1700,7 @@
             </a:ln>
             <a:extLst>
               <a:ext uri="{91240B29-F687-4f45-9708-019B960494DF}">
-                <a14:hiddenLine xmlns="" xmlns:a14="http://schemas.microsoft.com/office/drawing/2010/main" w="9525">
+                <a14:hiddenLine xmlns:a14="http://schemas.microsoft.com/office/drawing/2010/main" xmlns="" w="9525">
                   <a:solidFill>
                     <a:srgbClr val="000000"/>
                   </a:solidFill>
@@ -1754,7 +1762,7 @@
             </a:ln>
             <a:extLst>
               <a:ext uri="{91240B29-F687-4f45-9708-019B960494DF}">
-                <a14:hiddenLine xmlns="" xmlns:a14="http://schemas.microsoft.com/office/drawing/2010/main" w="9525">
+                <a14:hiddenLine xmlns:a14="http://schemas.microsoft.com/office/drawing/2010/main" xmlns="" w="9525">
                   <a:solidFill>
                     <a:srgbClr val="000000"/>
                   </a:solidFill>
@@ -1844,7 +1852,7 @@
             </a:ln>
             <a:extLst>
               <a:ext uri="{91240B29-F687-4f45-9708-019B960494DF}">
-                <a14:hiddenLine xmlns="" xmlns:a14="http://schemas.microsoft.com/office/drawing/2010/main" w="9525">
+                <a14:hiddenLine xmlns:a14="http://schemas.microsoft.com/office/drawing/2010/main" xmlns="" w="9525">
                   <a:solidFill>
                     <a:srgbClr val="000000"/>
                   </a:solidFill>
@@ -1934,7 +1942,7 @@
             </a:ln>
             <a:extLst>
               <a:ext uri="{91240B29-F687-4f45-9708-019B960494DF}">
-                <a14:hiddenLine xmlns="" xmlns:a14="http://schemas.microsoft.com/office/drawing/2010/main" w="9525">
+                <a14:hiddenLine xmlns:a14="http://schemas.microsoft.com/office/drawing/2010/main" xmlns="" w="9525">
                   <a:solidFill>
                     <a:srgbClr val="000000"/>
                   </a:solidFill>
@@ -1996,7 +2004,7 @@
             </a:ln>
             <a:extLst>
               <a:ext uri="{91240B29-F687-4f45-9708-019B960494DF}">
-                <a14:hiddenLine xmlns="" xmlns:a14="http://schemas.microsoft.com/office/drawing/2010/main" w="9525">
+                <a14:hiddenLine xmlns:a14="http://schemas.microsoft.com/office/drawing/2010/main" xmlns="" w="9525">
                   <a:solidFill>
                     <a:srgbClr val="000000"/>
                   </a:solidFill>
@@ -2106,7 +2114,7 @@
             </a:ln>
             <a:extLst>
               <a:ext uri="{91240B29-F687-4f45-9708-019B960494DF}">
-                <a14:hiddenLine xmlns="" xmlns:a14="http://schemas.microsoft.com/office/drawing/2010/main" w="9525">
+                <a14:hiddenLine xmlns:a14="http://schemas.microsoft.com/office/drawing/2010/main" xmlns="" w="9525">
                   <a:solidFill>
                     <a:srgbClr val="000000"/>
                   </a:solidFill>
@@ -2168,7 +2176,7 @@
             </a:ln>
             <a:extLst>
               <a:ext uri="{91240B29-F687-4f45-9708-019B960494DF}">
-                <a14:hiddenLine xmlns="" xmlns:a14="http://schemas.microsoft.com/office/drawing/2010/main" w="9525">
+                <a14:hiddenLine xmlns:a14="http://schemas.microsoft.com/office/drawing/2010/main" xmlns="" w="9525">
                   <a:solidFill>
                     <a:srgbClr val="000000"/>
                   </a:solidFill>
@@ -2258,7 +2266,7 @@
             </a:ln>
             <a:extLst>
               <a:ext uri="{91240B29-F687-4f45-9708-019B960494DF}">
-                <a14:hiddenLine xmlns="" xmlns:a14="http://schemas.microsoft.com/office/drawing/2010/main" w="9525">
+                <a14:hiddenLine xmlns:a14="http://schemas.microsoft.com/office/drawing/2010/main" xmlns="" w="9525">
                   <a:solidFill>
                     <a:srgbClr val="000000"/>
                   </a:solidFill>
@@ -2348,7 +2356,7 @@
             </a:ln>
             <a:extLst>
               <a:ext uri="{91240B29-F687-4f45-9708-019B960494DF}">
-                <a14:hiddenLine xmlns="" xmlns:a14="http://schemas.microsoft.com/office/drawing/2010/main" w="9525">
+                <a14:hiddenLine xmlns:a14="http://schemas.microsoft.com/office/drawing/2010/main" xmlns="" w="9525">
                   <a:solidFill>
                     <a:srgbClr val="000000"/>
                   </a:solidFill>
@@ -2410,7 +2418,7 @@
             </a:ln>
             <a:extLst>
               <a:ext uri="{91240B29-F687-4f45-9708-019B960494DF}">
-                <a14:hiddenLine xmlns="" xmlns:a14="http://schemas.microsoft.com/office/drawing/2010/main" w="9525">
+                <a14:hiddenLine xmlns:a14="http://schemas.microsoft.com/office/drawing/2010/main" xmlns="" w="9525">
                   <a:solidFill>
                     <a:srgbClr val="000000"/>
                   </a:solidFill>
@@ -2500,7 +2508,7 @@
             </a:ln>
             <a:extLst>
               <a:ext uri="{91240B29-F687-4f45-9708-019B960494DF}">
-                <a14:hiddenLine xmlns="" xmlns:a14="http://schemas.microsoft.com/office/drawing/2010/main" w="9525">
+                <a14:hiddenLine xmlns:a14="http://schemas.microsoft.com/office/drawing/2010/main" xmlns="" w="9525">
                   <a:solidFill>
                     <a:srgbClr val="000000"/>
                   </a:solidFill>
@@ -2590,7 +2598,7 @@
             </a:ln>
             <a:extLst>
               <a:ext uri="{91240B29-F687-4f45-9708-019B960494DF}">
-                <a14:hiddenLine xmlns="" xmlns:a14="http://schemas.microsoft.com/office/drawing/2010/main" w="9525">
+                <a14:hiddenLine xmlns:a14="http://schemas.microsoft.com/office/drawing/2010/main" xmlns="" w="9525">
                   <a:solidFill>
                     <a:srgbClr val="000000"/>
                   </a:solidFill>
@@ -2646,7 +2654,7 @@
             </a:ln>
             <a:extLst>
               <a:ext uri="{91240B29-F687-4f45-9708-019B960494DF}">
-                <a14:hiddenLine xmlns="" xmlns:a14="http://schemas.microsoft.com/office/drawing/2010/main" w="9525">
+                <a14:hiddenLine xmlns:a14="http://schemas.microsoft.com/office/drawing/2010/main" xmlns="" w="9525">
                   <a:solidFill>
                     <a:srgbClr val="000000"/>
                   </a:solidFill>
@@ -2736,7 +2744,7 @@
             </a:ln>
             <a:extLst>
               <a:ext uri="{91240B29-F687-4f45-9708-019B960494DF}">
-                <a14:hiddenLine xmlns="" xmlns:a14="http://schemas.microsoft.com/office/drawing/2010/main" w="9525">
+                <a14:hiddenLine xmlns:a14="http://schemas.microsoft.com/office/drawing/2010/main" xmlns="" w="9525">
                   <a:solidFill>
                     <a:srgbClr val="000000"/>
                   </a:solidFill>
@@ -2792,7 +2800,7 @@
             </a:ln>
             <a:extLst>
               <a:ext uri="{91240B29-F687-4f45-9708-019B960494DF}">
-                <a14:hiddenLine xmlns="" xmlns:a14="http://schemas.microsoft.com/office/drawing/2010/main" w="9525">
+                <a14:hiddenLine xmlns:a14="http://schemas.microsoft.com/office/drawing/2010/main" xmlns="" w="9525">
                   <a:solidFill>
                     <a:srgbClr val="000000"/>
                   </a:solidFill>
@@ -2882,7 +2890,7 @@
             </a:ln>
             <a:extLst>
               <a:ext uri="{91240B29-F687-4f45-9708-019B960494DF}">
-                <a14:hiddenLine xmlns="" xmlns:a14="http://schemas.microsoft.com/office/drawing/2010/main" w="9525">
+                <a14:hiddenLine xmlns:a14="http://schemas.microsoft.com/office/drawing/2010/main" xmlns="" w="9525">
                   <a:solidFill>
                     <a:srgbClr val="000000"/>
                   </a:solidFill>
@@ -2950,7 +2958,7 @@
             </a:ln>
             <a:extLst>
               <a:ext uri="{91240B29-F687-4f45-9708-019B960494DF}">
-                <a14:hiddenLine xmlns="" xmlns:a14="http://schemas.microsoft.com/office/drawing/2010/main" w="9525">
+                <a14:hiddenLine xmlns:a14="http://schemas.microsoft.com/office/drawing/2010/main" xmlns="" w="9525">
                   <a:solidFill>
                     <a:srgbClr val="000000"/>
                   </a:solidFill>
@@ -3040,7 +3048,7 @@
             </a:ln>
             <a:extLst>
               <a:ext uri="{91240B29-F687-4f45-9708-019B960494DF}">
-                <a14:hiddenLine xmlns="" xmlns:a14="http://schemas.microsoft.com/office/drawing/2010/main" w="9525">
+                <a14:hiddenLine xmlns:a14="http://schemas.microsoft.com/office/drawing/2010/main" xmlns="" w="9525">
                   <a:solidFill>
                     <a:srgbClr val="000000"/>
                   </a:solidFill>
@@ -3108,7 +3116,7 @@
             </a:ln>
             <a:extLst>
               <a:ext uri="{91240B29-F687-4f45-9708-019B960494DF}">
-                <a14:hiddenLine xmlns="" xmlns:a14="http://schemas.microsoft.com/office/drawing/2010/main" w="9525">
+                <a14:hiddenLine xmlns:a14="http://schemas.microsoft.com/office/drawing/2010/main" xmlns="" w="9525">
                   <a:solidFill>
                     <a:srgbClr val="000000"/>
                   </a:solidFill>
@@ -3198,7 +3206,7 @@
             </a:ln>
             <a:extLst>
               <a:ext uri="{91240B29-F687-4f45-9708-019B960494DF}">
-                <a14:hiddenLine xmlns="" xmlns:a14="http://schemas.microsoft.com/office/drawing/2010/main" w="9525">
+                <a14:hiddenLine xmlns:a14="http://schemas.microsoft.com/office/drawing/2010/main" xmlns="" w="9525">
                   <a:solidFill>
                     <a:srgbClr val="000000"/>
                   </a:solidFill>
@@ -3232,7 +3240,7 @@
             </a:ln>
             <a:extLst>
               <a:ext uri="{91240B29-F687-4f45-9708-019B960494DF}">
-                <a14:hiddenLine xmlns="" xmlns:a14="http://schemas.microsoft.com/office/drawing/2010/main" w="9525">
+                <a14:hiddenLine xmlns:a14="http://schemas.microsoft.com/office/drawing/2010/main" xmlns="" w="9525">
                   <a:solidFill>
                     <a:srgbClr val="000000"/>
                   </a:solidFill>
@@ -3322,7 +3330,7 @@
             </a:ln>
             <a:extLst>
               <a:ext uri="{91240B29-F687-4f45-9708-019B960494DF}">
-                <a14:hiddenLine xmlns="" xmlns:a14="http://schemas.microsoft.com/office/drawing/2010/main" w="9525">
+                <a14:hiddenLine xmlns:a14="http://schemas.microsoft.com/office/drawing/2010/main" xmlns="" w="9525">
                   <a:solidFill>
                     <a:srgbClr val="000000"/>
                   </a:solidFill>
@@ -3384,7 +3392,7 @@
             </a:ln>
             <a:extLst>
               <a:ext uri="{91240B29-F687-4f45-9708-019B960494DF}">
-                <a14:hiddenLine xmlns="" xmlns:a14="http://schemas.microsoft.com/office/drawing/2010/main" w="9525">
+                <a14:hiddenLine xmlns:a14="http://schemas.microsoft.com/office/drawing/2010/main" xmlns="" w="9525">
                   <a:solidFill>
                     <a:srgbClr val="000000"/>
                   </a:solidFill>
@@ -3446,7 +3454,7 @@
             </a:ln>
             <a:extLst>
               <a:ext uri="{91240B29-F687-4f45-9708-019B960494DF}">
-                <a14:hiddenLine xmlns="" xmlns:a14="http://schemas.microsoft.com/office/drawing/2010/main" w="9525">
+                <a14:hiddenLine xmlns:a14="http://schemas.microsoft.com/office/drawing/2010/main" xmlns="" w="9525">
                   <a:solidFill>
                     <a:srgbClr val="000000"/>
                   </a:solidFill>
@@ -3536,7 +3544,7 @@
             </a:ln>
             <a:extLst>
               <a:ext uri="{91240B29-F687-4f45-9708-019B960494DF}">
-                <a14:hiddenLine xmlns="" xmlns:a14="http://schemas.microsoft.com/office/drawing/2010/main" w="9525">
+                <a14:hiddenLine xmlns:a14="http://schemas.microsoft.com/office/drawing/2010/main" xmlns="" w="9525">
                   <a:solidFill>
                     <a:srgbClr val="000000"/>
                   </a:solidFill>
@@ -3604,7 +3612,7 @@
             </a:ln>
             <a:extLst>
               <a:ext uri="{91240B29-F687-4f45-9708-019B960494DF}">
-                <a14:hiddenLine xmlns="" xmlns:a14="http://schemas.microsoft.com/office/drawing/2010/main" w="9525">
+                <a14:hiddenLine xmlns:a14="http://schemas.microsoft.com/office/drawing/2010/main" xmlns="" w="9525">
                   <a:solidFill>
                     <a:srgbClr val="000000"/>
                   </a:solidFill>
@@ -3666,7 +3674,7 @@
             </a:ln>
             <a:extLst>
               <a:ext uri="{91240B29-F687-4f45-9708-019B960494DF}">
-                <a14:hiddenLine xmlns="" xmlns:a14="http://schemas.microsoft.com/office/drawing/2010/main" w="9525">
+                <a14:hiddenLine xmlns:a14="http://schemas.microsoft.com/office/drawing/2010/main" xmlns="" w="9525">
                   <a:solidFill>
                     <a:srgbClr val="000000"/>
                   </a:solidFill>
@@ -3756,7 +3764,7 @@
             </a:ln>
             <a:extLst>
               <a:ext uri="{91240B29-F687-4f45-9708-019B960494DF}">
-                <a14:hiddenLine xmlns="" xmlns:a14="http://schemas.microsoft.com/office/drawing/2010/main" w="9525">
+                <a14:hiddenLine xmlns:a14="http://schemas.microsoft.com/office/drawing/2010/main" xmlns="" w="9525">
                   <a:solidFill>
                     <a:srgbClr val="000000"/>
                   </a:solidFill>
@@ -3818,7 +3826,7 @@
             </a:ln>
             <a:extLst>
               <a:ext uri="{91240B29-F687-4f45-9708-019B960494DF}">
-                <a14:hiddenLine xmlns="" xmlns:a14="http://schemas.microsoft.com/office/drawing/2010/main" w="9525">
+                <a14:hiddenLine xmlns:a14="http://schemas.microsoft.com/office/drawing/2010/main" xmlns="" w="9525">
                   <a:solidFill>
                     <a:srgbClr val="000000"/>
                   </a:solidFill>
@@ -3908,7 +3916,7 @@
             </a:ln>
             <a:extLst>
               <a:ext uri="{91240B29-F687-4f45-9708-019B960494DF}">
-                <a14:hiddenLine xmlns="" xmlns:a14="http://schemas.microsoft.com/office/drawing/2010/main" w="9525">
+                <a14:hiddenLine xmlns:a14="http://schemas.microsoft.com/office/drawing/2010/main" xmlns="" w="9525">
                   <a:solidFill>
                     <a:srgbClr val="000000"/>
                   </a:solidFill>
@@ -3970,7 +3978,7 @@
             </a:ln>
             <a:extLst>
               <a:ext uri="{91240B29-F687-4f45-9708-019B960494DF}">
-                <a14:hiddenLine xmlns="" xmlns:a14="http://schemas.microsoft.com/office/drawing/2010/main" w="9525">
+                <a14:hiddenLine xmlns:a14="http://schemas.microsoft.com/office/drawing/2010/main" xmlns="" w="9525">
                   <a:solidFill>
                     <a:srgbClr val="000000"/>
                   </a:solidFill>
@@ -4060,7 +4068,7 @@
             </a:ln>
             <a:extLst>
               <a:ext uri="{91240B29-F687-4f45-9708-019B960494DF}">
-                <a14:hiddenLine xmlns="" xmlns:a14="http://schemas.microsoft.com/office/drawing/2010/main" w="9525">
+                <a14:hiddenLine xmlns:a14="http://schemas.microsoft.com/office/drawing/2010/main" xmlns="" w="9525">
                   <a:solidFill>
                     <a:srgbClr val="000000"/>
                   </a:solidFill>
@@ -4094,7 +4102,7 @@
             </a:ln>
             <a:extLst>
               <a:ext uri="{91240B29-F687-4f45-9708-019B960494DF}">
-                <a14:hiddenLine xmlns="" xmlns:a14="http://schemas.microsoft.com/office/drawing/2010/main" w="9525">
+                <a14:hiddenLine xmlns:a14="http://schemas.microsoft.com/office/drawing/2010/main" xmlns="" w="9525">
                   <a:solidFill>
                     <a:srgbClr val="000000"/>
                   </a:solidFill>
@@ -4159,7 +4167,7 @@
             </a:ln>
             <a:extLst>
               <a:ext uri="{91240B29-F687-4f45-9708-019B960494DF}">
-                <a14:hiddenLine xmlns="" xmlns:a14="http://schemas.microsoft.com/office/drawing/2010/main" w="9525">
+                <a14:hiddenLine xmlns:a14="http://schemas.microsoft.com/office/drawing/2010/main" xmlns="" w="9525">
                   <a:solidFill>
                     <a:srgbClr val="000000"/>
                   </a:solidFill>
@@ -4249,7 +4257,7 @@
             </a:ln>
             <a:extLst>
               <a:ext uri="{91240B29-F687-4f45-9708-019B960494DF}">
-                <a14:hiddenLine xmlns="" xmlns:a14="http://schemas.microsoft.com/office/drawing/2010/main" w="9525">
+                <a14:hiddenLine xmlns:a14="http://schemas.microsoft.com/office/drawing/2010/main" xmlns="" w="9525">
                   <a:solidFill>
                     <a:srgbClr val="000000"/>
                   </a:solidFill>
@@ -4311,7 +4319,7 @@
             </a:ln>
             <a:extLst>
               <a:ext uri="{91240B29-F687-4f45-9708-019B960494DF}">
-                <a14:hiddenLine xmlns="" xmlns:a14="http://schemas.microsoft.com/office/drawing/2010/main" w="9525">
+                <a14:hiddenLine xmlns:a14="http://schemas.microsoft.com/office/drawing/2010/main" xmlns="" w="9525">
                   <a:solidFill>
                     <a:srgbClr val="000000"/>
                   </a:solidFill>
@@ -4401,7 +4409,7 @@
             </a:ln>
             <a:extLst>
               <a:ext uri="{91240B29-F687-4f45-9708-019B960494DF}">
-                <a14:hiddenLine xmlns="" xmlns:a14="http://schemas.microsoft.com/office/drawing/2010/main" w="9525">
+                <a14:hiddenLine xmlns:a14="http://schemas.microsoft.com/office/drawing/2010/main" xmlns="" w="9525">
                   <a:solidFill>
                     <a:srgbClr val="000000"/>
                   </a:solidFill>
@@ -4491,7 +4499,7 @@
             </a:ln>
             <a:extLst>
               <a:ext uri="{91240B29-F687-4f45-9708-019B960494DF}">
-                <a14:hiddenLine xmlns="" xmlns:a14="http://schemas.microsoft.com/office/drawing/2010/main" w="9525">
+                <a14:hiddenLine xmlns:a14="http://schemas.microsoft.com/office/drawing/2010/main" xmlns="" w="9525">
                   <a:solidFill>
                     <a:srgbClr val="000000"/>
                   </a:solidFill>
@@ -4556,7 +4564,7 @@
             </a:ln>
             <a:extLst>
               <a:ext uri="{91240B29-F687-4f45-9708-019B960494DF}">
-                <a14:hiddenLine xmlns="" xmlns:a14="http://schemas.microsoft.com/office/drawing/2010/main" w="9525">
+                <a14:hiddenLine xmlns:a14="http://schemas.microsoft.com/office/drawing/2010/main" xmlns="" w="9525">
                   <a:solidFill>
                     <a:srgbClr val="000000"/>
                   </a:solidFill>
@@ -4618,7 +4626,7 @@
             </a:ln>
             <a:extLst>
               <a:ext uri="{91240B29-F687-4f45-9708-019B960494DF}">
-                <a14:hiddenLine xmlns="" xmlns:a14="http://schemas.microsoft.com/office/drawing/2010/main" w="9525">
+                <a14:hiddenLine xmlns:a14="http://schemas.microsoft.com/office/drawing/2010/main" xmlns="" w="9525">
                   <a:solidFill>
                     <a:srgbClr val="000000"/>
                   </a:solidFill>
@@ -4708,7 +4716,7 @@
             </a:ln>
             <a:extLst>
               <a:ext uri="{91240B29-F687-4f45-9708-019B960494DF}">
-                <a14:hiddenLine xmlns="" xmlns:a14="http://schemas.microsoft.com/office/drawing/2010/main" w="9525">
+                <a14:hiddenLine xmlns:a14="http://schemas.microsoft.com/office/drawing/2010/main" xmlns="" w="9525">
                   <a:solidFill>
                     <a:srgbClr val="000000"/>
                   </a:solidFill>
@@ -4798,7 +4806,7 @@
             </a:ln>
             <a:extLst>
               <a:ext uri="{91240B29-F687-4f45-9708-019B960494DF}">
-                <a14:hiddenLine xmlns="" xmlns:a14="http://schemas.microsoft.com/office/drawing/2010/main" w="9525">
+                <a14:hiddenLine xmlns:a14="http://schemas.microsoft.com/office/drawing/2010/main" xmlns="" w="9525">
                   <a:solidFill>
                     <a:srgbClr val="000000"/>
                   </a:solidFill>
@@ -4860,7 +4868,7 @@
             </a:ln>
             <a:extLst>
               <a:ext uri="{91240B29-F687-4f45-9708-019B960494DF}">
-                <a14:hiddenLine xmlns="" xmlns:a14="http://schemas.microsoft.com/office/drawing/2010/main" w="9525">
+                <a14:hiddenLine xmlns:a14="http://schemas.microsoft.com/office/drawing/2010/main" xmlns="" w="9525">
                   <a:solidFill>
                     <a:srgbClr val="000000"/>
                   </a:solidFill>
@@ -4980,7 +4988,7 @@
             </a:ln>
             <a:extLst>
               <a:ext uri="{91240B29-F687-4f45-9708-019B960494DF}">
-                <a14:hiddenLine xmlns="" xmlns:a14="http://schemas.microsoft.com/office/drawing/2010/main" w="9525">
+                <a14:hiddenLine xmlns:a14="http://schemas.microsoft.com/office/drawing/2010/main" xmlns="" w="9525">
                   <a:solidFill>
                     <a:srgbClr val="000000"/>
                   </a:solidFill>
@@ -5048,7 +5056,7 @@
             </a:ln>
             <a:extLst>
               <a:ext uri="{91240B29-F687-4f45-9708-019B960494DF}">
-                <a14:hiddenLine xmlns="" xmlns:a14="http://schemas.microsoft.com/office/drawing/2010/main" w="9525">
+                <a14:hiddenLine xmlns:a14="http://schemas.microsoft.com/office/drawing/2010/main" xmlns="" w="9525">
                   <a:solidFill>
                     <a:srgbClr val="000000"/>
                   </a:solidFill>
@@ -5138,7 +5146,7 @@
             </a:ln>
             <a:extLst>
               <a:ext uri="{91240B29-F687-4f45-9708-019B960494DF}">
-                <a14:hiddenLine xmlns="" xmlns:a14="http://schemas.microsoft.com/office/drawing/2010/main" w="9525">
+                <a14:hiddenLine xmlns:a14="http://schemas.microsoft.com/office/drawing/2010/main" xmlns="" w="9525">
                   <a:solidFill>
                     <a:srgbClr val="000000"/>
                   </a:solidFill>
@@ -5279,7 +5287,7 @@
             <a:fld id="{B61BEF0D-F0BB-DE4B-95CE-6DB70DBA9567}" type="datetimeFigureOut">
               <a:rPr lang="en-US" smtClean="0"/>
               <a:pPr/>
-              <a:t>21/07/2018</a:t>
+              <a:t>22/07/2018</a:t>
             </a:fld>
             <a:endParaRPr lang="en-US" dirty="0"/>
           </a:p>
@@ -5548,7 +5556,7 @@
             <a:fld id="{B61BEF0D-F0BB-DE4B-95CE-6DB70DBA9567}" type="datetimeFigureOut">
               <a:rPr lang="en-US" smtClean="0"/>
               <a:pPr/>
-              <a:t>21/07/2018</a:t>
+              <a:t>22/07/2018</a:t>
             </a:fld>
             <a:endParaRPr lang="en-US" dirty="0"/>
           </a:p>
@@ -5746,7 +5754,7 @@
             <a:fld id="{B61BEF0D-F0BB-DE4B-95CE-6DB70DBA9567}" type="datetimeFigureOut">
               <a:rPr lang="en-US" smtClean="0"/>
               <a:pPr/>
-              <a:t>21/07/2018</a:t>
+              <a:t>22/07/2018</a:t>
             </a:fld>
             <a:endParaRPr lang="en-US" dirty="0"/>
           </a:p>
@@ -6011,7 +6019,7 @@
             <a:fld id="{B61BEF0D-F0BB-DE4B-95CE-6DB70DBA9567}" type="datetimeFigureOut">
               <a:rPr lang="en-US" smtClean="0"/>
               <a:pPr/>
-              <a:t>21/07/2018</a:t>
+              <a:t>22/07/2018</a:t>
             </a:fld>
             <a:endParaRPr lang="en-US" dirty="0"/>
           </a:p>
@@ -6447,7 +6455,7 @@
             <a:fld id="{B61BEF0D-F0BB-DE4B-95CE-6DB70DBA9567}" type="datetimeFigureOut">
               <a:rPr lang="en-US" smtClean="0"/>
               <a:pPr/>
-              <a:t>21/07/2018</a:t>
+              <a:t>22/07/2018</a:t>
             </a:fld>
             <a:endParaRPr lang="en-US" dirty="0"/>
           </a:p>
@@ -6995,7 +7003,7 @@
             <a:fld id="{B61BEF0D-F0BB-DE4B-95CE-6DB70DBA9567}" type="datetimeFigureOut">
               <a:rPr lang="en-US" smtClean="0"/>
               <a:pPr/>
-              <a:t>21/07/2018</a:t>
+              <a:t>22/07/2018</a:t>
             </a:fld>
             <a:endParaRPr lang="en-US" dirty="0"/>
           </a:p>
@@ -7717,7 +7725,7 @@
             <a:fld id="{B61BEF0D-F0BB-DE4B-95CE-6DB70DBA9567}" type="datetimeFigureOut">
               <a:rPr lang="en-US" smtClean="0"/>
               <a:pPr/>
-              <a:t>21/07/2018</a:t>
+              <a:t>22/07/2018</a:t>
             </a:fld>
             <a:endParaRPr lang="en-US" dirty="0"/>
           </a:p>
@@ -7889,7 +7897,7 @@
             <a:fld id="{B61BEF0D-F0BB-DE4B-95CE-6DB70DBA9567}" type="datetimeFigureOut">
               <a:rPr lang="en-US" smtClean="0"/>
               <a:pPr/>
-              <a:t>21/07/2018</a:t>
+              <a:t>22/07/2018</a:t>
             </a:fld>
             <a:endParaRPr lang="en-US" dirty="0"/>
           </a:p>
@@ -8071,7 +8079,7 @@
             <a:fld id="{B61BEF0D-F0BB-DE4B-95CE-6DB70DBA9567}" type="datetimeFigureOut">
               <a:rPr lang="en-US" smtClean="0"/>
               <a:pPr/>
-              <a:t>21/07/2018</a:t>
+              <a:t>22/07/2018</a:t>
             </a:fld>
             <a:endParaRPr lang="en-US" dirty="0"/>
           </a:p>
@@ -8243,7 +8251,7 @@
             <a:fld id="{B61BEF0D-F0BB-DE4B-95CE-6DB70DBA9567}" type="datetimeFigureOut">
               <a:rPr lang="en-US" smtClean="0"/>
               <a:pPr/>
-              <a:t>21/07/2018</a:t>
+              <a:t>22/07/2018</a:t>
             </a:fld>
             <a:endParaRPr lang="en-US" dirty="0"/>
           </a:p>
@@ -8495,7 +8503,7 @@
             <a:fld id="{B61BEF0D-F0BB-DE4B-95CE-6DB70DBA9567}" type="datetimeFigureOut">
               <a:rPr lang="en-US" smtClean="0"/>
               <a:pPr/>
-              <a:t>21/07/2018</a:t>
+              <a:t>22/07/2018</a:t>
             </a:fld>
             <a:endParaRPr lang="en-US" dirty="0"/>
           </a:p>
@@ -8729,7 +8737,7 @@
             <a:fld id="{B61BEF0D-F0BB-DE4B-95CE-6DB70DBA9567}" type="datetimeFigureOut">
               <a:rPr lang="en-US" smtClean="0"/>
               <a:pPr/>
-              <a:t>21/07/2018</a:t>
+              <a:t>22/07/2018</a:t>
             </a:fld>
             <a:endParaRPr lang="en-US" dirty="0"/>
           </a:p>
@@ -9112,7 +9120,7 @@
             <a:fld id="{B61BEF0D-F0BB-DE4B-95CE-6DB70DBA9567}" type="datetimeFigureOut">
               <a:rPr lang="en-US" smtClean="0"/>
               <a:pPr/>
-              <a:t>21/07/2018</a:t>
+              <a:t>22/07/2018</a:t>
             </a:fld>
             <a:endParaRPr lang="en-US" dirty="0"/>
           </a:p>
@@ -9232,7 +9240,7 @@
             <a:fld id="{B61BEF0D-F0BB-DE4B-95CE-6DB70DBA9567}" type="datetimeFigureOut">
               <a:rPr lang="en-US" smtClean="0"/>
               <a:pPr/>
-              <a:t>21/07/2018</a:t>
+              <a:t>22/07/2018</a:t>
             </a:fld>
             <a:endParaRPr lang="en-US" dirty="0"/>
           </a:p>
@@ -9329,7 +9337,7 @@
             <a:fld id="{B61BEF0D-F0BB-DE4B-95CE-6DB70DBA9567}" type="datetimeFigureOut">
               <a:rPr lang="en-US" smtClean="0"/>
               <a:pPr/>
-              <a:t>21/07/2018</a:t>
+              <a:t>22/07/2018</a:t>
             </a:fld>
             <a:endParaRPr lang="en-US" dirty="0"/>
           </a:p>
@@ -9580,7 +9588,7 @@
             <a:fld id="{B61BEF0D-F0BB-DE4B-95CE-6DB70DBA9567}" type="datetimeFigureOut">
               <a:rPr lang="en-US" smtClean="0"/>
               <a:pPr/>
-              <a:t>21/07/2018</a:t>
+              <a:t>22/07/2018</a:t>
             </a:fld>
             <a:endParaRPr lang="en-US" dirty="0"/>
           </a:p>
@@ -9862,7 +9870,7 @@
             <a:fld id="{B61BEF0D-F0BB-DE4B-95CE-6DB70DBA9567}" type="datetimeFigureOut">
               <a:rPr lang="en-US" smtClean="0"/>
               <a:pPr/>
-              <a:t>21/07/2018</a:t>
+              <a:t>22/07/2018</a:t>
             </a:fld>
             <a:endParaRPr lang="en-US" dirty="0"/>
           </a:p>
@@ -9979,7 +9987,7 @@
           <a:noFill/>
           <a:extLst>
             <a:ext uri="{909E8E84-426E-40dd-AFC4-6F175D3DCCD1}">
-              <a14:hiddenFill xmlns="" xmlns:a14="http://schemas.microsoft.com/office/drawing/2010/main">
+              <a14:hiddenFill xmlns:a14="http://schemas.microsoft.com/office/drawing/2010/main" xmlns="">
                 <a:solidFill>
                   <a:srgbClr val="FFFFFF"/>
                 </a:solidFill>
@@ -10053,7 +10061,7 @@
               </a:ln>
               <a:extLst>
                 <a:ext uri="{91240B29-F687-4f45-9708-019B960494DF}">
-                  <a14:hiddenLine xmlns="" xmlns:a14="http://schemas.microsoft.com/office/drawing/2010/main" w="9525">
+                  <a14:hiddenLine xmlns:a14="http://schemas.microsoft.com/office/drawing/2010/main" xmlns="" w="9525">
                     <a:solidFill>
                       <a:srgbClr val="000000"/>
                     </a:solidFill>
@@ -10143,7 +10151,7 @@
               </a:ln>
               <a:extLst>
                 <a:ext uri="{91240B29-F687-4f45-9708-019B960494DF}">
-                  <a14:hiddenLine xmlns="" xmlns:a14="http://schemas.microsoft.com/office/drawing/2010/main" w="9525">
+                  <a14:hiddenLine xmlns:a14="http://schemas.microsoft.com/office/drawing/2010/main" xmlns="" w="9525">
                     <a:solidFill>
                       <a:srgbClr val="000000"/>
                     </a:solidFill>
@@ -10233,7 +10241,7 @@
               </a:ln>
               <a:extLst>
                 <a:ext uri="{91240B29-F687-4f45-9708-019B960494DF}">
-                  <a14:hiddenLine xmlns="" xmlns:a14="http://schemas.microsoft.com/office/drawing/2010/main" w="9525">
+                  <a14:hiddenLine xmlns:a14="http://schemas.microsoft.com/office/drawing/2010/main" xmlns="" w="9525">
                     <a:solidFill>
                       <a:srgbClr val="000000"/>
                     </a:solidFill>
@@ -10295,7 +10303,7 @@
               </a:ln>
               <a:extLst>
                 <a:ext uri="{91240B29-F687-4f45-9708-019B960494DF}">
-                  <a14:hiddenLine xmlns="" xmlns:a14="http://schemas.microsoft.com/office/drawing/2010/main" w="9525">
+                  <a14:hiddenLine xmlns:a14="http://schemas.microsoft.com/office/drawing/2010/main" xmlns="" w="9525">
                     <a:solidFill>
                       <a:srgbClr val="000000"/>
                     </a:solidFill>
@@ -10385,7 +10393,7 @@
               </a:ln>
               <a:extLst>
                 <a:ext uri="{91240B29-F687-4f45-9708-019B960494DF}">
-                  <a14:hiddenLine xmlns="" xmlns:a14="http://schemas.microsoft.com/office/drawing/2010/main" w="9525">
+                  <a14:hiddenLine xmlns:a14="http://schemas.microsoft.com/office/drawing/2010/main" xmlns="" w="9525">
                     <a:solidFill>
                       <a:srgbClr val="000000"/>
                     </a:solidFill>
@@ -10447,7 +10455,7 @@
               </a:ln>
               <a:extLst>
                 <a:ext uri="{91240B29-F687-4f45-9708-019B960494DF}">
-                  <a14:hiddenLine xmlns="" xmlns:a14="http://schemas.microsoft.com/office/drawing/2010/main" w="9525">
+                  <a14:hiddenLine xmlns:a14="http://schemas.microsoft.com/office/drawing/2010/main" xmlns="" w="9525">
                     <a:solidFill>
                       <a:srgbClr val="000000"/>
                     </a:solidFill>
@@ -10509,7 +10517,7 @@
               </a:ln>
               <a:extLst>
                 <a:ext uri="{91240B29-F687-4f45-9708-019B960494DF}">
-                  <a14:hiddenLine xmlns="" xmlns:a14="http://schemas.microsoft.com/office/drawing/2010/main" w="9525">
+                  <a14:hiddenLine xmlns:a14="http://schemas.microsoft.com/office/drawing/2010/main" xmlns="" w="9525">
                     <a:solidFill>
                       <a:srgbClr val="000000"/>
                     </a:solidFill>
@@ -10599,7 +10607,7 @@
               </a:ln>
               <a:extLst>
                 <a:ext uri="{91240B29-F687-4f45-9708-019B960494DF}">
-                  <a14:hiddenLine xmlns="" xmlns:a14="http://schemas.microsoft.com/office/drawing/2010/main" w="9525">
+                  <a14:hiddenLine xmlns:a14="http://schemas.microsoft.com/office/drawing/2010/main" xmlns="" w="9525">
                     <a:solidFill>
                       <a:srgbClr val="000000"/>
                     </a:solidFill>
@@ -10689,7 +10697,7 @@
               </a:ln>
               <a:extLst>
                 <a:ext uri="{91240B29-F687-4f45-9708-019B960494DF}">
-                  <a14:hiddenLine xmlns="" xmlns:a14="http://schemas.microsoft.com/office/drawing/2010/main" w="9525">
+                  <a14:hiddenLine xmlns:a14="http://schemas.microsoft.com/office/drawing/2010/main" xmlns="" w="9525">
                     <a:solidFill>
                       <a:srgbClr val="000000"/>
                     </a:solidFill>
@@ -10751,7 +10759,7 @@
               </a:ln>
               <a:extLst>
                 <a:ext uri="{91240B29-F687-4f45-9708-019B960494DF}">
-                  <a14:hiddenLine xmlns="" xmlns:a14="http://schemas.microsoft.com/office/drawing/2010/main" w="9525">
+                  <a14:hiddenLine xmlns:a14="http://schemas.microsoft.com/office/drawing/2010/main" xmlns="" w="9525">
                     <a:solidFill>
                       <a:srgbClr val="000000"/>
                     </a:solidFill>
@@ -10861,7 +10869,7 @@
               </a:ln>
               <a:extLst>
                 <a:ext uri="{91240B29-F687-4f45-9708-019B960494DF}">
-                  <a14:hiddenLine xmlns="" xmlns:a14="http://schemas.microsoft.com/office/drawing/2010/main" w="9525">
+                  <a14:hiddenLine xmlns:a14="http://schemas.microsoft.com/office/drawing/2010/main" xmlns="" w="9525">
                     <a:solidFill>
                       <a:srgbClr val="000000"/>
                     </a:solidFill>
@@ -10945,7 +10953,7 @@
               </a:ln>
               <a:extLst>
                 <a:ext uri="{91240B29-F687-4f45-9708-019B960494DF}">
-                  <a14:hiddenLine xmlns="" xmlns:a14="http://schemas.microsoft.com/office/drawing/2010/main" w="9525">
+                  <a14:hiddenLine xmlns:a14="http://schemas.microsoft.com/office/drawing/2010/main" xmlns="" w="9525">
                     <a:solidFill>
                       <a:srgbClr val="000000"/>
                     </a:solidFill>
@@ -11007,7 +11015,7 @@
               </a:ln>
               <a:extLst>
                 <a:ext uri="{91240B29-F687-4f45-9708-019B960494DF}">
-                  <a14:hiddenLine xmlns="" xmlns:a14="http://schemas.microsoft.com/office/drawing/2010/main" w="9525">
+                  <a14:hiddenLine xmlns:a14="http://schemas.microsoft.com/office/drawing/2010/main" xmlns="" w="9525">
                     <a:solidFill>
                       <a:srgbClr val="000000"/>
                     </a:solidFill>
@@ -11069,7 +11077,7 @@
               </a:ln>
               <a:extLst>
                 <a:ext uri="{91240B29-F687-4f45-9708-019B960494DF}">
-                  <a14:hiddenLine xmlns="" xmlns:a14="http://schemas.microsoft.com/office/drawing/2010/main" w="9525">
+                  <a14:hiddenLine xmlns:a14="http://schemas.microsoft.com/office/drawing/2010/main" xmlns="" w="9525">
                     <a:solidFill>
                       <a:srgbClr val="000000"/>
                     </a:solidFill>
@@ -11159,7 +11167,7 @@
               </a:ln>
               <a:extLst>
                 <a:ext uri="{91240B29-F687-4f45-9708-019B960494DF}">
-                  <a14:hiddenLine xmlns="" xmlns:a14="http://schemas.microsoft.com/office/drawing/2010/main" w="9525">
+                  <a14:hiddenLine xmlns:a14="http://schemas.microsoft.com/office/drawing/2010/main" xmlns="" w="9525">
                     <a:solidFill>
                       <a:srgbClr val="000000"/>
                     </a:solidFill>
@@ -11193,7 +11201,7 @@
               </a:ln>
               <a:extLst>
                 <a:ext uri="{91240B29-F687-4f45-9708-019B960494DF}">
-                  <a14:hiddenLine xmlns="" xmlns:a14="http://schemas.microsoft.com/office/drawing/2010/main" w="9525">
+                  <a14:hiddenLine xmlns:a14="http://schemas.microsoft.com/office/drawing/2010/main" xmlns="" w="9525">
                     <a:solidFill>
                       <a:srgbClr val="000000"/>
                     </a:solidFill>
@@ -11258,7 +11266,7 @@
               </a:ln>
               <a:extLst>
                 <a:ext uri="{91240B29-F687-4f45-9708-019B960494DF}">
-                  <a14:hiddenLine xmlns="" xmlns:a14="http://schemas.microsoft.com/office/drawing/2010/main" w="9525">
+                  <a14:hiddenLine xmlns:a14="http://schemas.microsoft.com/office/drawing/2010/main" xmlns="" w="9525">
                     <a:solidFill>
                       <a:srgbClr val="000000"/>
                     </a:solidFill>
@@ -11348,7 +11356,7 @@
               </a:ln>
               <a:extLst>
                 <a:ext uri="{91240B29-F687-4f45-9708-019B960494DF}">
-                  <a14:hiddenLine xmlns="" xmlns:a14="http://schemas.microsoft.com/office/drawing/2010/main" w="9525">
+                  <a14:hiddenLine xmlns:a14="http://schemas.microsoft.com/office/drawing/2010/main" xmlns="" w="9525">
                     <a:solidFill>
                       <a:srgbClr val="000000"/>
                     </a:solidFill>
@@ -11410,7 +11418,7 @@
               </a:ln>
               <a:extLst>
                 <a:ext uri="{91240B29-F687-4f45-9708-019B960494DF}">
-                  <a14:hiddenLine xmlns="" xmlns:a14="http://schemas.microsoft.com/office/drawing/2010/main" w="9525">
+                  <a14:hiddenLine xmlns:a14="http://schemas.microsoft.com/office/drawing/2010/main" xmlns="" w="9525">
                     <a:solidFill>
                       <a:srgbClr val="000000"/>
                     </a:solidFill>
@@ -11500,7 +11508,7 @@
               </a:ln>
               <a:extLst>
                 <a:ext uri="{91240B29-F687-4f45-9708-019B960494DF}">
-                  <a14:hiddenLine xmlns="" xmlns:a14="http://schemas.microsoft.com/office/drawing/2010/main" w="9525">
+                  <a14:hiddenLine xmlns:a14="http://schemas.microsoft.com/office/drawing/2010/main" xmlns="" w="9525">
                     <a:solidFill>
                       <a:srgbClr val="000000"/>
                     </a:solidFill>
@@ -11565,7 +11573,7 @@
               </a:ln>
               <a:extLst>
                 <a:ext uri="{91240B29-F687-4f45-9708-019B960494DF}">
-                  <a14:hiddenLine xmlns="" xmlns:a14="http://schemas.microsoft.com/office/drawing/2010/main" w="9525">
+                  <a14:hiddenLine xmlns:a14="http://schemas.microsoft.com/office/drawing/2010/main" xmlns="" w="9525">
                     <a:solidFill>
                       <a:srgbClr val="000000"/>
                     </a:solidFill>
@@ -11627,7 +11635,7 @@
               </a:ln>
               <a:extLst>
                 <a:ext uri="{91240B29-F687-4f45-9708-019B960494DF}">
-                  <a14:hiddenLine xmlns="" xmlns:a14="http://schemas.microsoft.com/office/drawing/2010/main" w="9525">
+                  <a14:hiddenLine xmlns:a14="http://schemas.microsoft.com/office/drawing/2010/main" xmlns="" w="9525">
                     <a:solidFill>
                       <a:srgbClr val="000000"/>
                     </a:solidFill>
@@ -11717,7 +11725,7 @@
               </a:ln>
               <a:extLst>
                 <a:ext uri="{91240B29-F687-4f45-9708-019B960494DF}">
-                  <a14:hiddenLine xmlns="" xmlns:a14="http://schemas.microsoft.com/office/drawing/2010/main" w="9525">
+                  <a14:hiddenLine xmlns:a14="http://schemas.microsoft.com/office/drawing/2010/main" xmlns="" w="9525">
                     <a:solidFill>
                       <a:srgbClr val="000000"/>
                     </a:solidFill>
@@ -11807,7 +11815,7 @@
               </a:ln>
               <a:extLst>
                 <a:ext uri="{91240B29-F687-4f45-9708-019B960494DF}">
-                  <a14:hiddenLine xmlns="" xmlns:a14="http://schemas.microsoft.com/office/drawing/2010/main" w="9525">
+                  <a14:hiddenLine xmlns:a14="http://schemas.microsoft.com/office/drawing/2010/main" xmlns="" w="9525">
                     <a:solidFill>
                       <a:srgbClr val="000000"/>
                     </a:solidFill>
@@ -11872,7 +11880,7 @@
               </a:ln>
               <a:extLst>
                 <a:ext uri="{91240B29-F687-4f45-9708-019B960494DF}">
-                  <a14:hiddenLine xmlns="" xmlns:a14="http://schemas.microsoft.com/office/drawing/2010/main" w="9525">
+                  <a14:hiddenLine xmlns:a14="http://schemas.microsoft.com/office/drawing/2010/main" xmlns="" w="9525">
                     <a:solidFill>
                       <a:srgbClr val="000000"/>
                     </a:solidFill>
@@ -11992,7 +12000,7 @@
               </a:ln>
               <a:extLst>
                 <a:ext uri="{91240B29-F687-4f45-9708-019B960494DF}">
-                  <a14:hiddenLine xmlns="" xmlns:a14="http://schemas.microsoft.com/office/drawing/2010/main" w="9525">
+                  <a14:hiddenLine xmlns:a14="http://schemas.microsoft.com/office/drawing/2010/main" xmlns="" w="9525">
                     <a:solidFill>
                       <a:srgbClr val="000000"/>
                     </a:solidFill>
@@ -12090,7 +12098,7 @@
               </a:ln>
               <a:extLst>
                 <a:ext uri="{91240B29-F687-4f45-9708-019B960494DF}">
-                  <a14:hiddenLine xmlns="" xmlns:a14="http://schemas.microsoft.com/office/drawing/2010/main" w="9525">
+                  <a14:hiddenLine xmlns:a14="http://schemas.microsoft.com/office/drawing/2010/main" xmlns="" w="9525">
                     <a:solidFill>
                       <a:srgbClr val="000000"/>
                     </a:solidFill>
@@ -12205,7 +12213,7 @@
               </a:ln>
               <a:extLst>
                 <a:ext uri="{91240B29-F687-4f45-9708-019B960494DF}">
-                  <a14:hiddenLine xmlns="" xmlns:a14="http://schemas.microsoft.com/office/drawing/2010/main" w="9525">
+                  <a14:hiddenLine xmlns:a14="http://schemas.microsoft.com/office/drawing/2010/main" xmlns="" w="9525">
                     <a:solidFill>
                       <a:srgbClr val="000000"/>
                     </a:solidFill>
@@ -12295,7 +12303,7 @@
               </a:ln>
               <a:extLst>
                 <a:ext uri="{91240B29-F687-4f45-9708-019B960494DF}">
-                  <a14:hiddenLine xmlns="" xmlns:a14="http://schemas.microsoft.com/office/drawing/2010/main" w="9525">
+                  <a14:hiddenLine xmlns:a14="http://schemas.microsoft.com/office/drawing/2010/main" xmlns="" w="9525">
                     <a:solidFill>
                       <a:srgbClr val="000000"/>
                     </a:solidFill>
@@ -12360,7 +12368,7 @@
               </a:ln>
               <a:extLst>
                 <a:ext uri="{91240B29-F687-4f45-9708-019B960494DF}">
-                  <a14:hiddenLine xmlns="" xmlns:a14="http://schemas.microsoft.com/office/drawing/2010/main" w="9525">
+                  <a14:hiddenLine xmlns:a14="http://schemas.microsoft.com/office/drawing/2010/main" xmlns="" w="9525">
                     <a:solidFill>
                       <a:srgbClr val="000000"/>
                     </a:solidFill>
@@ -12450,7 +12458,7 @@
               </a:ln>
               <a:extLst>
                 <a:ext uri="{91240B29-F687-4f45-9708-019B960494DF}">
-                  <a14:hiddenLine xmlns="" xmlns:a14="http://schemas.microsoft.com/office/drawing/2010/main" w="9525">
+                  <a14:hiddenLine xmlns:a14="http://schemas.microsoft.com/office/drawing/2010/main" xmlns="" w="9525">
                     <a:solidFill>
                       <a:srgbClr val="000000"/>
                     </a:solidFill>
@@ -12518,7 +12526,7 @@
               </a:ln>
               <a:extLst>
                 <a:ext uri="{91240B29-F687-4f45-9708-019B960494DF}">
-                  <a14:hiddenLine xmlns="" xmlns:a14="http://schemas.microsoft.com/office/drawing/2010/main" w="9525">
+                  <a14:hiddenLine xmlns:a14="http://schemas.microsoft.com/office/drawing/2010/main" xmlns="" w="9525">
                     <a:solidFill>
                       <a:srgbClr val="000000"/>
                     </a:solidFill>
@@ -12608,7 +12616,7 @@
               </a:ln>
               <a:extLst>
                 <a:ext uri="{91240B29-F687-4f45-9708-019B960494DF}">
-                  <a14:hiddenLine xmlns="" xmlns:a14="http://schemas.microsoft.com/office/drawing/2010/main" w="9525">
+                  <a14:hiddenLine xmlns:a14="http://schemas.microsoft.com/office/drawing/2010/main" xmlns="" w="9525">
                     <a:solidFill>
                       <a:srgbClr val="000000"/>
                     </a:solidFill>
@@ -12676,7 +12684,7 @@
               </a:ln>
               <a:extLst>
                 <a:ext uri="{91240B29-F687-4f45-9708-019B960494DF}">
-                  <a14:hiddenLine xmlns="" xmlns:a14="http://schemas.microsoft.com/office/drawing/2010/main" w="9525">
+                  <a14:hiddenLine xmlns:a14="http://schemas.microsoft.com/office/drawing/2010/main" xmlns="" w="9525">
                     <a:solidFill>
                       <a:srgbClr val="000000"/>
                     </a:solidFill>
@@ -12766,7 +12774,7 @@
               </a:ln>
               <a:extLst>
                 <a:ext uri="{91240B29-F687-4f45-9708-019B960494DF}">
-                  <a14:hiddenLine xmlns="" xmlns:a14="http://schemas.microsoft.com/office/drawing/2010/main" w="9525">
+                  <a14:hiddenLine xmlns:a14="http://schemas.microsoft.com/office/drawing/2010/main" xmlns="" w="9525">
                     <a:solidFill>
                       <a:srgbClr val="000000"/>
                     </a:solidFill>
@@ -12800,7 +12808,7 @@
               </a:ln>
               <a:extLst>
                 <a:ext uri="{91240B29-F687-4f45-9708-019B960494DF}">
-                  <a14:hiddenLine xmlns="" xmlns:a14="http://schemas.microsoft.com/office/drawing/2010/main" w="9525">
+                  <a14:hiddenLine xmlns:a14="http://schemas.microsoft.com/office/drawing/2010/main" xmlns="" w="9525">
                     <a:solidFill>
                       <a:srgbClr val="000000"/>
                     </a:solidFill>
@@ -12941,7 +12949,7 @@
             <a:fld id="{B61BEF0D-F0BB-DE4B-95CE-6DB70DBA9567}" type="datetimeFigureOut">
               <a:rPr lang="en-US" smtClean="0"/>
               <a:pPr/>
-              <a:t>21/07/2018</a:t>
+              <a:t>22/07/2018</a:t>
             </a:fld>
             <a:endParaRPr lang="en-US" dirty="0"/>
           </a:p>
@@ -14945,6 +14953,1459 @@
 </p:sld>
 </file>
 
+<file path=ppt/slides/slide16.xml><?xml version="1.0" encoding="utf-8"?>
+<p:sld xmlns:a="http://schemas.openxmlformats.org/drawingml/2006/main" xmlns:r="http://schemas.openxmlformats.org/officeDocument/2006/relationships" xmlns:p="http://schemas.openxmlformats.org/presentationml/2006/main">
+  <p:cSld>
+    <p:spTree>
+      <p:nvGrpSpPr>
+        <p:cNvPr id="1" name=""/>
+        <p:cNvGrpSpPr/>
+        <p:nvPr/>
+      </p:nvGrpSpPr>
+      <p:grpSpPr>
+        <a:xfrm>
+          <a:off x="0" y="0"/>
+          <a:ext cx="0" cy="0"/>
+          <a:chOff x="0" y="0"/>
+          <a:chExt cx="0" cy="0"/>
+        </a:xfrm>
+      </p:grpSpPr>
+      <p:sp>
+        <p:nvSpPr>
+          <p:cNvPr id="2" name="Title 1">
+            <a:extLst>
+              <a:ext uri="{FF2B5EF4-FFF2-40B4-BE49-F238E27FC236}">
+                <a16:creationId xmlns:a16="http://schemas.microsoft.com/office/drawing/2014/main" id="{2A9646E5-3310-41AE-AA3E-A5FEB53FA87D}"/>
+              </a:ext>
+            </a:extLst>
+          </p:cNvPr>
+          <p:cNvSpPr>
+            <a:spLocks noGrp="1"/>
+          </p:cNvSpPr>
+          <p:nvPr>
+            <p:ph type="title"/>
+          </p:nvPr>
+        </p:nvSpPr>
+        <p:spPr/>
+        <p:txBody>
+          <a:bodyPr/>
+          <a:lstStyle/>
+          <a:p>
+            <a:r>
+              <a:rPr lang="en-US" dirty="0"/>
+              <a:t>Run tests in CI</a:t>
+            </a:r>
+          </a:p>
+        </p:txBody>
+      </p:sp>
+      <p:pic>
+        <p:nvPicPr>
+          <p:cNvPr id="4" name="Picture 3">
+            <a:extLst>
+              <a:ext uri="{FF2B5EF4-FFF2-40B4-BE49-F238E27FC236}">
+                <a16:creationId xmlns:a16="http://schemas.microsoft.com/office/drawing/2014/main" id="{4D34D43C-8A0A-4AF0-BE40-648228B50C13}"/>
+              </a:ext>
+            </a:extLst>
+          </p:cNvPr>
+          <p:cNvPicPr>
+            <a:picLocks noChangeAspect="1"/>
+          </p:cNvPicPr>
+          <p:nvPr/>
+        </p:nvPicPr>
+        <p:blipFill>
+          <a:blip r:embed="rId2"/>
+          <a:stretch>
+            <a:fillRect/>
+          </a:stretch>
+        </p:blipFill>
+        <p:spPr>
+          <a:xfrm>
+            <a:off x="4627985" y="175199"/>
+            <a:ext cx="7323885" cy="6507601"/>
+          </a:xfrm>
+          <a:prstGeom prst="rect">
+            <a:avLst/>
+          </a:prstGeom>
+        </p:spPr>
+      </p:pic>
+      <p:pic>
+        <p:nvPicPr>
+          <p:cNvPr id="6" name="Picture 5">
+            <a:extLst>
+              <a:ext uri="{FF2B5EF4-FFF2-40B4-BE49-F238E27FC236}">
+                <a16:creationId xmlns:a16="http://schemas.microsoft.com/office/drawing/2014/main" id="{E5D93A16-B1B8-4757-834A-E715C29D844D}"/>
+              </a:ext>
+            </a:extLst>
+          </p:cNvPr>
+          <p:cNvPicPr>
+            <a:picLocks noChangeAspect="1"/>
+          </p:cNvPicPr>
+          <p:nvPr/>
+        </p:nvPicPr>
+        <p:blipFill>
+          <a:blip r:embed="rId3"/>
+          <a:stretch>
+            <a:fillRect/>
+          </a:stretch>
+        </p:blipFill>
+        <p:spPr>
+          <a:xfrm>
+            <a:off x="401903" y="2159272"/>
+            <a:ext cx="11385017" cy="2539454"/>
+          </a:xfrm>
+          <a:prstGeom prst="rect">
+            <a:avLst/>
+          </a:prstGeom>
+          <a:ln>
+            <a:solidFill>
+              <a:schemeClr val="tx1"/>
+            </a:solidFill>
+          </a:ln>
+        </p:spPr>
+      </p:pic>
+    </p:spTree>
+    <p:extLst>
+      <p:ext uri="{BB962C8B-B14F-4D97-AF65-F5344CB8AC3E}">
+        <p14:creationId xmlns:p14="http://schemas.microsoft.com/office/powerpoint/2010/main" val="289945505"/>
+      </p:ext>
+    </p:extLst>
+  </p:cSld>
+  <p:clrMapOvr>
+    <a:masterClrMapping/>
+  </p:clrMapOvr>
+  <p:timing>
+    <p:tnLst>
+      <p:par>
+        <p:cTn id="1" dur="indefinite" restart="never" nodeType="tmRoot">
+          <p:childTnLst>
+            <p:seq concurrent="1" nextAc="seek">
+              <p:cTn id="2" dur="indefinite" nodeType="mainSeq">
+                <p:childTnLst>
+                  <p:par>
+                    <p:cTn id="3" fill="hold">
+                      <p:stCondLst>
+                        <p:cond delay="indefinite"/>
+                      </p:stCondLst>
+                      <p:childTnLst>
+                        <p:par>
+                          <p:cTn id="4" fill="hold">
+                            <p:stCondLst>
+                              <p:cond delay="0"/>
+                            </p:stCondLst>
+                            <p:childTnLst>
+                              <p:par>
+                                <p:cTn id="5" presetID="1" presetClass="entr" presetSubtype="0" fill="hold" nodeType="clickEffect">
+                                  <p:stCondLst>
+                                    <p:cond delay="0"/>
+                                  </p:stCondLst>
+                                  <p:childTnLst>
+                                    <p:set>
+                                      <p:cBhvr>
+                                        <p:cTn id="6" dur="1" fill="hold">
+                                          <p:stCondLst>
+                                            <p:cond delay="0"/>
+                                          </p:stCondLst>
+                                        </p:cTn>
+                                        <p:tgtEl>
+                                          <p:spTgt spid="6"/>
+                                        </p:tgtEl>
+                                        <p:attrNameLst>
+                                          <p:attrName>style.visibility</p:attrName>
+                                        </p:attrNameLst>
+                                      </p:cBhvr>
+                                      <p:to>
+                                        <p:strVal val="visible"/>
+                                      </p:to>
+                                    </p:set>
+                                  </p:childTnLst>
+                                </p:cTn>
+                              </p:par>
+                            </p:childTnLst>
+                          </p:cTn>
+                        </p:par>
+                      </p:childTnLst>
+                    </p:cTn>
+                  </p:par>
+                </p:childTnLst>
+              </p:cTn>
+              <p:prevCondLst>
+                <p:cond evt="onPrev" delay="0">
+                  <p:tgtEl>
+                    <p:sldTgt/>
+                  </p:tgtEl>
+                </p:cond>
+              </p:prevCondLst>
+              <p:nextCondLst>
+                <p:cond evt="onNext" delay="0">
+                  <p:tgtEl>
+                    <p:sldTgt/>
+                  </p:tgtEl>
+                </p:cond>
+              </p:nextCondLst>
+            </p:seq>
+          </p:childTnLst>
+        </p:cTn>
+      </p:par>
+    </p:tnLst>
+  </p:timing>
+</p:sld>
+</file>
+
+<file path=ppt/slides/slide17.xml><?xml version="1.0" encoding="utf-8"?>
+<p:sld xmlns:a="http://schemas.openxmlformats.org/drawingml/2006/main" xmlns:r="http://schemas.openxmlformats.org/officeDocument/2006/relationships" xmlns:p="http://schemas.openxmlformats.org/presentationml/2006/main">
+  <p:cSld>
+    <p:spTree>
+      <p:nvGrpSpPr>
+        <p:cNvPr id="1" name=""/>
+        <p:cNvGrpSpPr/>
+        <p:nvPr/>
+      </p:nvGrpSpPr>
+      <p:grpSpPr>
+        <a:xfrm>
+          <a:off x="0" y="0"/>
+          <a:ext cx="0" cy="0"/>
+          <a:chOff x="0" y="0"/>
+          <a:chExt cx="0" cy="0"/>
+        </a:xfrm>
+      </p:grpSpPr>
+      <p:sp>
+        <p:nvSpPr>
+          <p:cNvPr id="2" name="Title 1">
+            <a:extLst>
+              <a:ext uri="{FF2B5EF4-FFF2-40B4-BE49-F238E27FC236}">
+                <a16:creationId xmlns:a16="http://schemas.microsoft.com/office/drawing/2014/main" id="{1F17101C-C182-484C-8B30-8786585B633D}"/>
+              </a:ext>
+            </a:extLst>
+          </p:cNvPr>
+          <p:cNvSpPr>
+            <a:spLocks noGrp="1"/>
+          </p:cNvSpPr>
+          <p:nvPr>
+            <p:ph type="title"/>
+          </p:nvPr>
+        </p:nvSpPr>
+        <p:spPr/>
+        <p:txBody>
+          <a:bodyPr/>
+          <a:lstStyle/>
+          <a:p>
+            <a:r>
+              <a:rPr lang="en-US" dirty="0"/>
+              <a:t>Let’s add Code Coverage</a:t>
+            </a:r>
+          </a:p>
+        </p:txBody>
+      </p:sp>
+      <p:sp>
+        <p:nvSpPr>
+          <p:cNvPr id="4" name="Content Placeholder 2">
+            <a:extLst>
+              <a:ext uri="{FF2B5EF4-FFF2-40B4-BE49-F238E27FC236}">
+                <a16:creationId xmlns:a16="http://schemas.microsoft.com/office/drawing/2014/main" id="{53D969F6-A566-4D12-AC27-8C134A16B817}"/>
+              </a:ext>
+            </a:extLst>
+          </p:cNvPr>
+          <p:cNvSpPr>
+            <a:spLocks noGrp="1"/>
+          </p:cNvSpPr>
+          <p:nvPr>
+            <p:ph idx="1"/>
+          </p:nvPr>
+        </p:nvSpPr>
+        <p:spPr>
+          <a:xfrm>
+            <a:off x="1141413" y="1735831"/>
+            <a:ext cx="9905998" cy="4503651"/>
+          </a:xfrm>
+          <a:solidFill>
+            <a:schemeClr val="bg1"/>
+          </a:solidFill>
+        </p:spPr>
+        <p:txBody>
+          <a:bodyPr>
+            <a:normAutofit fontScale="92500"/>
+          </a:bodyPr>
+          <a:lstStyle/>
+          <a:p>
+            <a:r>
+              <a:rPr lang="en-US" dirty="0"/>
+              <a:t>Add </a:t>
+            </a:r>
+            <a:r>
+              <a:rPr lang="en-US" dirty="0" err="1"/>
+              <a:t>opencover</a:t>
+            </a:r>
+            <a:r>
+              <a:rPr lang="en-US" dirty="0"/>
+              <a:t> dependency</a:t>
+            </a:r>
+          </a:p>
+          <a:p>
+            <a:pPr marL="0" indent="0">
+              <a:buNone/>
+            </a:pPr>
+            <a:r>
+              <a:rPr lang="en-US" dirty="0">
+                <a:solidFill>
+                  <a:srgbClr val="92D050"/>
+                </a:solidFill>
+              </a:rPr>
+              <a:t>dotnet add package </a:t>
+            </a:r>
+            <a:r>
+              <a:rPr lang="en-US" dirty="0" err="1">
+                <a:solidFill>
+                  <a:srgbClr val="92D050"/>
+                </a:solidFill>
+              </a:rPr>
+              <a:t>opencover</a:t>
+            </a:r>
+            <a:endParaRPr lang="en-US" dirty="0">
+              <a:solidFill>
+                <a:srgbClr val="92D050"/>
+              </a:solidFill>
+            </a:endParaRPr>
+          </a:p>
+          <a:p>
+            <a:pPr marL="0" indent="0">
+              <a:buNone/>
+            </a:pPr>
+            <a:r>
+              <a:rPr lang="en-US" dirty="0">
+                <a:solidFill>
+                  <a:srgbClr val="92D050"/>
+                </a:solidFill>
+              </a:rPr>
+              <a:t>dotnet restore</a:t>
+            </a:r>
+          </a:p>
+          <a:p>
+            <a:r>
+              <a:rPr lang="en-US" dirty="0"/>
+              <a:t>Find the local </a:t>
+            </a:r>
+            <a:r>
+              <a:rPr lang="en-US" dirty="0" err="1"/>
+              <a:t>nuget</a:t>
+            </a:r>
+            <a:r>
+              <a:rPr lang="en-US" dirty="0"/>
+              <a:t> folder</a:t>
+            </a:r>
+          </a:p>
+          <a:p>
+            <a:pPr marL="0" indent="0">
+              <a:buNone/>
+            </a:pPr>
+            <a:r>
+              <a:rPr lang="en-US" dirty="0">
+                <a:solidFill>
+                  <a:srgbClr val="92D050"/>
+                </a:solidFill>
+              </a:rPr>
+              <a:t>dotnet </a:t>
+            </a:r>
+            <a:r>
+              <a:rPr lang="en-US" dirty="0" err="1">
+                <a:solidFill>
+                  <a:srgbClr val="92D050"/>
+                </a:solidFill>
+              </a:rPr>
+              <a:t>nuget</a:t>
+            </a:r>
+            <a:r>
+              <a:rPr lang="en-US" dirty="0">
+                <a:solidFill>
+                  <a:srgbClr val="92D050"/>
+                </a:solidFill>
+              </a:rPr>
+              <a:t> locals -l global-packages</a:t>
+            </a:r>
+          </a:p>
+          <a:p>
+            <a:r>
+              <a:rPr lang="en-US" dirty="0"/>
+              <a:t>Run </a:t>
+            </a:r>
+            <a:r>
+              <a:rPr lang="en-US" dirty="0" err="1"/>
+              <a:t>opencover</a:t>
+            </a:r>
+            <a:endParaRPr lang="en-US" dirty="0"/>
+          </a:p>
+          <a:p>
+            <a:pPr marL="0" indent="0">
+              <a:buNone/>
+            </a:pPr>
+            <a:r>
+              <a:rPr lang="en-US" dirty="0">
+                <a:solidFill>
+                  <a:srgbClr val="92D050"/>
+                </a:solidFill>
+              </a:rPr>
+              <a:t>&amp; $HOME\.</a:t>
+            </a:r>
+            <a:r>
+              <a:rPr lang="en-US" dirty="0" err="1">
+                <a:solidFill>
+                  <a:srgbClr val="92D050"/>
+                </a:solidFill>
+              </a:rPr>
+              <a:t>nuget</a:t>
+            </a:r>
+            <a:r>
+              <a:rPr lang="en-US" dirty="0">
+                <a:solidFill>
+                  <a:srgbClr val="92D050"/>
+                </a:solidFill>
+              </a:rPr>
+              <a:t>\packages\</a:t>
+            </a:r>
+            <a:r>
+              <a:rPr lang="en-US" dirty="0" err="1">
+                <a:solidFill>
+                  <a:srgbClr val="92D050"/>
+                </a:solidFill>
+              </a:rPr>
+              <a:t>opencover</a:t>
+            </a:r>
+            <a:r>
+              <a:rPr lang="en-US" dirty="0">
+                <a:solidFill>
+                  <a:srgbClr val="92D050"/>
+                </a:solidFill>
+              </a:rPr>
+              <a:t>\4.6.519\tools\OpenCover.Console.exe -</a:t>
+            </a:r>
+            <a:r>
+              <a:rPr lang="en-US" dirty="0" err="1">
+                <a:solidFill>
+                  <a:srgbClr val="92D050"/>
+                </a:solidFill>
+              </a:rPr>
+              <a:t>register:user</a:t>
+            </a:r>
+            <a:r>
+              <a:rPr lang="en-US" dirty="0">
+                <a:solidFill>
+                  <a:srgbClr val="92D050"/>
+                </a:solidFill>
+              </a:rPr>
+              <a:t> -</a:t>
+            </a:r>
+            <a:r>
+              <a:rPr lang="en-US" dirty="0" err="1">
+                <a:solidFill>
+                  <a:srgbClr val="92D050"/>
+                </a:solidFill>
+              </a:rPr>
+              <a:t>oldStyle</a:t>
+            </a:r>
+            <a:r>
+              <a:rPr lang="en-US" dirty="0">
+                <a:solidFill>
+                  <a:srgbClr val="92D050"/>
+                </a:solidFill>
+              </a:rPr>
+              <a:t> -</a:t>
+            </a:r>
+            <a:r>
+              <a:rPr lang="en-US" dirty="0" err="1">
+                <a:solidFill>
+                  <a:srgbClr val="92D050"/>
+                </a:solidFill>
+              </a:rPr>
+              <a:t>target:"dotnet.exe</a:t>
+            </a:r>
+            <a:r>
+              <a:rPr lang="en-US" dirty="0">
+                <a:solidFill>
+                  <a:srgbClr val="92D050"/>
+                </a:solidFill>
+              </a:rPr>
+              <a:t>" -</a:t>
+            </a:r>
+            <a:r>
+              <a:rPr lang="en-US" dirty="0" err="1">
+                <a:solidFill>
+                  <a:srgbClr val="92D050"/>
+                </a:solidFill>
+              </a:rPr>
+              <a:t>targetargs</a:t>
+            </a:r>
+            <a:r>
+              <a:rPr lang="en-US" dirty="0">
+                <a:solidFill>
+                  <a:srgbClr val="92D050"/>
+                </a:solidFill>
+              </a:rPr>
+              <a:t>:"test </a:t>
+            </a:r>
+            <a:r>
+              <a:rPr lang="en-US" dirty="0" err="1">
+                <a:solidFill>
+                  <a:srgbClr val="92D050"/>
+                </a:solidFill>
+              </a:rPr>
+              <a:t>tests.csproj</a:t>
+            </a:r>
+            <a:r>
+              <a:rPr lang="en-US" dirty="0">
+                <a:solidFill>
+                  <a:srgbClr val="92D050"/>
+                </a:solidFill>
+              </a:rPr>
+              <a:t>" -filter:"+[</a:t>
+            </a:r>
+            <a:r>
+              <a:rPr lang="en-US" dirty="0" err="1">
+                <a:solidFill>
+                  <a:srgbClr val="92D050"/>
+                </a:solidFill>
+              </a:rPr>
+              <a:t>opensourceci</a:t>
+            </a:r>
+            <a:r>
+              <a:rPr lang="en-US" dirty="0">
+                <a:solidFill>
+                  <a:srgbClr val="92D050"/>
+                </a:solidFill>
+              </a:rPr>
+              <a:t>*]* +[tests*]*" -</a:t>
+            </a:r>
+            <a:r>
+              <a:rPr lang="en-US" dirty="0" err="1">
+                <a:solidFill>
+                  <a:srgbClr val="92D050"/>
+                </a:solidFill>
+              </a:rPr>
+              <a:t>output:"coverage.xml</a:t>
+            </a:r>
+            <a:r>
+              <a:rPr lang="en-US" dirty="0">
+                <a:solidFill>
+                  <a:srgbClr val="92D050"/>
+                </a:solidFill>
+              </a:rPr>
+              <a:t>"</a:t>
+            </a:r>
+          </a:p>
+          <a:p>
+            <a:pPr marL="0" indent="0">
+              <a:buNone/>
+            </a:pPr>
+            <a:endParaRPr lang="en-US" dirty="0">
+              <a:solidFill>
+                <a:srgbClr val="92D050"/>
+              </a:solidFill>
+            </a:endParaRPr>
+          </a:p>
+        </p:txBody>
+      </p:sp>
+      <p:sp>
+        <p:nvSpPr>
+          <p:cNvPr id="5" name="TextBox 4">
+            <a:extLst>
+              <a:ext uri="{FF2B5EF4-FFF2-40B4-BE49-F238E27FC236}">
+                <a16:creationId xmlns:a16="http://schemas.microsoft.com/office/drawing/2014/main" id="{41221D88-437B-4D82-A71A-9D2B7AF51A8D}"/>
+              </a:ext>
+            </a:extLst>
+          </p:cNvPr>
+          <p:cNvSpPr txBox="1"/>
+          <p:nvPr/>
+        </p:nvSpPr>
+        <p:spPr>
+          <a:xfrm>
+            <a:off x="1141413" y="1571610"/>
+            <a:ext cx="9905997" cy="4832092"/>
+          </a:xfrm>
+          <a:prstGeom prst="rect">
+            <a:avLst/>
+          </a:prstGeom>
+          <a:solidFill>
+            <a:schemeClr val="bg2">
+              <a:lumMod val="75000"/>
+            </a:schemeClr>
+          </a:solidFill>
+          <a:ln w="12700">
+            <a:solidFill>
+              <a:schemeClr val="tx1"/>
+            </a:solidFill>
+          </a:ln>
+        </p:spPr>
+        <p:txBody>
+          <a:bodyPr wrap="square" rtlCol="0">
+            <a:spAutoFit/>
+          </a:bodyPr>
+          <a:lstStyle/>
+          <a:p>
+            <a:r>
+              <a:rPr lang="en-US" sz="2800" dirty="0" err="1"/>
+              <a:t>Opencover</a:t>
+            </a:r>
+            <a:r>
+              <a:rPr lang="en-US" sz="2800" dirty="0"/>
+              <a:t> parameters:</a:t>
+            </a:r>
+          </a:p>
+          <a:p>
+            <a:pPr marL="285750" indent="-285750">
+              <a:buFontTx/>
+              <a:buChar char="-"/>
+            </a:pPr>
+            <a:r>
+              <a:rPr lang="en-US" sz="2800" dirty="0"/>
+              <a:t> </a:t>
+            </a:r>
+            <a:r>
+              <a:rPr lang="en-US" sz="2800" b="1" dirty="0">
+                <a:solidFill>
+                  <a:schemeClr val="accent1">
+                    <a:lumMod val="75000"/>
+                  </a:schemeClr>
+                </a:solidFill>
+              </a:rPr>
+              <a:t>register</a:t>
+            </a:r>
+            <a:r>
+              <a:rPr lang="en-US" sz="2800" dirty="0"/>
+              <a:t>: to register the code coverage (the OS will not let you inspect DLL if this setting is not correct). In our case, use “-</a:t>
+            </a:r>
+            <a:r>
+              <a:rPr lang="en-US" sz="2800" dirty="0" err="1"/>
+              <a:t>register:user</a:t>
+            </a:r>
+            <a:r>
+              <a:rPr lang="en-US" sz="2800" dirty="0"/>
+              <a:t>”</a:t>
+            </a:r>
+          </a:p>
+          <a:p>
+            <a:pPr marL="285750" indent="-285750">
+              <a:buFontTx/>
+              <a:buChar char="-"/>
+            </a:pPr>
+            <a:r>
+              <a:rPr lang="en-US" sz="2800" dirty="0"/>
+              <a:t> </a:t>
+            </a:r>
+            <a:r>
+              <a:rPr lang="en-US" sz="2800" b="1" dirty="0" err="1">
+                <a:solidFill>
+                  <a:schemeClr val="accent1">
+                    <a:lumMod val="75000"/>
+                  </a:schemeClr>
+                </a:solidFill>
+              </a:rPr>
+              <a:t>oldStyle</a:t>
+            </a:r>
+            <a:r>
+              <a:rPr lang="en-US" sz="2800" dirty="0"/>
+              <a:t>: used for pre-Silverlight code. It also helps to inspect dotnet core code </a:t>
+            </a:r>
+            <a:r>
+              <a:rPr lang="en-US" sz="2800" dirty="0">
+                <a:sym typeface="Wingdings" panose="05000000000000000000" pitchFamily="2" charset="2"/>
+              </a:rPr>
+              <a:t></a:t>
+            </a:r>
+          </a:p>
+          <a:p>
+            <a:pPr marL="285750" indent="-285750">
+              <a:buFontTx/>
+              <a:buChar char="-"/>
+            </a:pPr>
+            <a:r>
+              <a:rPr lang="en-US" sz="2800" dirty="0">
+                <a:sym typeface="Wingdings" panose="05000000000000000000" pitchFamily="2" charset="2"/>
+              </a:rPr>
+              <a:t> </a:t>
+            </a:r>
+            <a:r>
+              <a:rPr lang="en-US" sz="2800" b="1" dirty="0">
+                <a:solidFill>
+                  <a:schemeClr val="accent1">
+                    <a:lumMod val="75000"/>
+                  </a:schemeClr>
+                </a:solidFill>
+                <a:sym typeface="Wingdings" panose="05000000000000000000" pitchFamily="2" charset="2"/>
+              </a:rPr>
+              <a:t>target</a:t>
+            </a:r>
+            <a:r>
+              <a:rPr lang="en-US" sz="2800" dirty="0">
+                <a:sym typeface="Wingdings" panose="05000000000000000000" pitchFamily="2" charset="2"/>
+              </a:rPr>
+              <a:t>: what command to execute</a:t>
+            </a:r>
+          </a:p>
+          <a:p>
+            <a:pPr marL="285750" indent="-285750">
+              <a:buFontTx/>
+              <a:buChar char="-"/>
+            </a:pPr>
+            <a:r>
+              <a:rPr lang="en-US" sz="2800" dirty="0"/>
+              <a:t> </a:t>
+            </a:r>
+            <a:r>
+              <a:rPr lang="en-US" sz="2800" b="1" dirty="0" err="1">
+                <a:solidFill>
+                  <a:schemeClr val="accent1">
+                    <a:lumMod val="75000"/>
+                  </a:schemeClr>
+                </a:solidFill>
+              </a:rPr>
+              <a:t>targetargs</a:t>
+            </a:r>
+            <a:r>
+              <a:rPr lang="en-US" sz="2800" dirty="0"/>
+              <a:t>: the parameters to run the above command</a:t>
+            </a:r>
+          </a:p>
+          <a:p>
+            <a:pPr marL="285750" indent="-285750">
+              <a:buFontTx/>
+              <a:buChar char="-"/>
+            </a:pPr>
+            <a:r>
+              <a:rPr lang="en-US" sz="2800" dirty="0"/>
+              <a:t> </a:t>
+            </a:r>
+            <a:r>
+              <a:rPr lang="en-US" sz="2800" b="1" dirty="0">
+                <a:solidFill>
+                  <a:schemeClr val="accent1">
+                    <a:lumMod val="75000"/>
+                  </a:schemeClr>
+                </a:solidFill>
+              </a:rPr>
+              <a:t>filter</a:t>
+            </a:r>
+            <a:r>
+              <a:rPr lang="en-US" sz="2800" dirty="0"/>
+              <a:t>: to include/exclude code to cover (namespace names, supports wildcard)</a:t>
+            </a:r>
+          </a:p>
+          <a:p>
+            <a:pPr marL="285750" indent="-285750">
+              <a:buFontTx/>
+              <a:buChar char="-"/>
+            </a:pPr>
+            <a:r>
+              <a:rPr lang="en-US" sz="2800" dirty="0"/>
+              <a:t> </a:t>
+            </a:r>
+            <a:r>
+              <a:rPr lang="en-US" sz="2800" b="1" dirty="0">
+                <a:solidFill>
+                  <a:schemeClr val="accent1">
+                    <a:lumMod val="75000"/>
+                  </a:schemeClr>
+                </a:solidFill>
+              </a:rPr>
+              <a:t>output</a:t>
+            </a:r>
+            <a:r>
+              <a:rPr lang="en-US" sz="2800" dirty="0"/>
+              <a:t>: the XML to output that can be sent to reporting</a:t>
+            </a:r>
+          </a:p>
+        </p:txBody>
+      </p:sp>
+    </p:spTree>
+    <p:extLst>
+      <p:ext uri="{BB962C8B-B14F-4D97-AF65-F5344CB8AC3E}">
+        <p14:creationId xmlns:p14="http://schemas.microsoft.com/office/powerpoint/2010/main" val="1447913520"/>
+      </p:ext>
+    </p:extLst>
+  </p:cSld>
+  <p:clrMapOvr>
+    <a:masterClrMapping/>
+  </p:clrMapOvr>
+  <p:timing>
+    <p:tnLst>
+      <p:par>
+        <p:cTn id="1" dur="indefinite" restart="never" nodeType="tmRoot">
+          <p:childTnLst>
+            <p:seq concurrent="1" nextAc="seek">
+              <p:cTn id="2" dur="indefinite" nodeType="mainSeq">
+                <p:childTnLst>
+                  <p:par>
+                    <p:cTn id="3" fill="hold">
+                      <p:stCondLst>
+                        <p:cond delay="indefinite"/>
+                      </p:stCondLst>
+                      <p:childTnLst>
+                        <p:par>
+                          <p:cTn id="4" fill="hold">
+                            <p:stCondLst>
+                              <p:cond delay="0"/>
+                            </p:stCondLst>
+                            <p:childTnLst>
+                              <p:par>
+                                <p:cTn id="5" presetID="1" presetClass="exit" presetSubtype="0" fill="hold" grpId="0" nodeType="clickEffect">
+                                  <p:stCondLst>
+                                    <p:cond delay="0"/>
+                                  </p:stCondLst>
+                                  <p:childTnLst>
+                                    <p:set>
+                                      <p:cBhvr>
+                                        <p:cTn id="6" dur="1" fill="hold">
+                                          <p:stCondLst>
+                                            <p:cond delay="0"/>
+                                          </p:stCondLst>
+                                        </p:cTn>
+                                        <p:tgtEl>
+                                          <p:spTgt spid="5"/>
+                                        </p:tgtEl>
+                                        <p:attrNameLst>
+                                          <p:attrName>style.visibility</p:attrName>
+                                        </p:attrNameLst>
+                                      </p:cBhvr>
+                                      <p:to>
+                                        <p:strVal val="hidden"/>
+                                      </p:to>
+                                    </p:set>
+                                  </p:childTnLst>
+                                </p:cTn>
+                              </p:par>
+                            </p:childTnLst>
+                          </p:cTn>
+                        </p:par>
+                      </p:childTnLst>
+                    </p:cTn>
+                  </p:par>
+                </p:childTnLst>
+              </p:cTn>
+              <p:prevCondLst>
+                <p:cond evt="onPrev" delay="0">
+                  <p:tgtEl>
+                    <p:sldTgt/>
+                  </p:tgtEl>
+                </p:cond>
+              </p:prevCondLst>
+              <p:nextCondLst>
+                <p:cond evt="onNext" delay="0">
+                  <p:tgtEl>
+                    <p:sldTgt/>
+                  </p:tgtEl>
+                </p:cond>
+              </p:nextCondLst>
+            </p:seq>
+          </p:childTnLst>
+        </p:cTn>
+      </p:par>
+    </p:tnLst>
+    <p:bldLst>
+      <p:bldP spid="5" grpId="0" animBg="1"/>
+    </p:bldLst>
+  </p:timing>
+</p:sld>
+</file>
+
+<file path=ppt/slides/slide18.xml><?xml version="1.0" encoding="utf-8"?>
+<p:sld xmlns:a="http://schemas.openxmlformats.org/drawingml/2006/main" xmlns:r="http://schemas.openxmlformats.org/officeDocument/2006/relationships" xmlns:p="http://schemas.openxmlformats.org/presentationml/2006/main">
+  <p:cSld>
+    <p:spTree>
+      <p:nvGrpSpPr>
+        <p:cNvPr id="1" name=""/>
+        <p:cNvGrpSpPr/>
+        <p:nvPr/>
+      </p:nvGrpSpPr>
+      <p:grpSpPr>
+        <a:xfrm>
+          <a:off x="0" y="0"/>
+          <a:ext cx="0" cy="0"/>
+          <a:chOff x="0" y="0"/>
+          <a:chExt cx="0" cy="0"/>
+        </a:xfrm>
+      </p:grpSpPr>
+      <p:sp>
+        <p:nvSpPr>
+          <p:cNvPr id="2" name="Title 1">
+            <a:extLst>
+              <a:ext uri="{FF2B5EF4-FFF2-40B4-BE49-F238E27FC236}">
+                <a16:creationId xmlns:a16="http://schemas.microsoft.com/office/drawing/2014/main" id="{BEA83E5A-C125-4E9E-B1BF-948FA0FC8D4D}"/>
+              </a:ext>
+            </a:extLst>
+          </p:cNvPr>
+          <p:cNvSpPr>
+            <a:spLocks noGrp="1"/>
+          </p:cNvSpPr>
+          <p:nvPr>
+            <p:ph type="title"/>
+          </p:nvPr>
+        </p:nvSpPr>
+        <p:spPr/>
+        <p:txBody>
+          <a:bodyPr/>
+          <a:lstStyle/>
+          <a:p>
+            <a:r>
+              <a:rPr lang="en-US" dirty="0"/>
+              <a:t>But… it doesn’t work </a:t>
+            </a:r>
+            <a:r>
+              <a:rPr lang="en-US" dirty="0">
+                <a:sym typeface="Wingdings" panose="05000000000000000000" pitchFamily="2" charset="2"/>
+              </a:rPr>
+              <a:t></a:t>
+            </a:r>
+            <a:endParaRPr lang="en-US" dirty="0"/>
+          </a:p>
+        </p:txBody>
+      </p:sp>
+      <p:pic>
+        <p:nvPicPr>
+          <p:cNvPr id="4" name="Picture 3">
+            <a:extLst>
+              <a:ext uri="{FF2B5EF4-FFF2-40B4-BE49-F238E27FC236}">
+                <a16:creationId xmlns:a16="http://schemas.microsoft.com/office/drawing/2014/main" id="{482E1AA7-C8C0-417C-9579-FF9EE45BE7FE}"/>
+              </a:ext>
+            </a:extLst>
+          </p:cNvPr>
+          <p:cNvPicPr>
+            <a:picLocks noChangeAspect="1"/>
+          </p:cNvPicPr>
+          <p:nvPr/>
+        </p:nvPicPr>
+        <p:blipFill>
+          <a:blip r:embed="rId2"/>
+          <a:stretch>
+            <a:fillRect/>
+          </a:stretch>
+        </p:blipFill>
+        <p:spPr>
+          <a:xfrm>
+            <a:off x="1141412" y="2008014"/>
+            <a:ext cx="6748959" cy="1478570"/>
+          </a:xfrm>
+          <a:prstGeom prst="rect">
+            <a:avLst/>
+          </a:prstGeom>
+        </p:spPr>
+      </p:pic>
+      <p:pic>
+        <p:nvPicPr>
+          <p:cNvPr id="5" name="Picture 4">
+            <a:extLst>
+              <a:ext uri="{FF2B5EF4-FFF2-40B4-BE49-F238E27FC236}">
+                <a16:creationId xmlns:a16="http://schemas.microsoft.com/office/drawing/2014/main" id="{734AEBAD-2D07-4333-A15D-F7D9EFA3425C}"/>
+              </a:ext>
+            </a:extLst>
+          </p:cNvPr>
+          <p:cNvPicPr>
+            <a:picLocks noChangeAspect="1"/>
+          </p:cNvPicPr>
+          <p:nvPr/>
+        </p:nvPicPr>
+        <p:blipFill>
+          <a:blip r:embed="rId3"/>
+          <a:stretch>
+            <a:fillRect/>
+          </a:stretch>
+        </p:blipFill>
+        <p:spPr>
+          <a:xfrm>
+            <a:off x="1141412" y="4296584"/>
+            <a:ext cx="4571429" cy="1771429"/>
+          </a:xfrm>
+          <a:prstGeom prst="rect">
+            <a:avLst/>
+          </a:prstGeom>
+        </p:spPr>
+      </p:pic>
+      <p:sp>
+        <p:nvSpPr>
+          <p:cNvPr id="6" name="TextBox 5">
+            <a:extLst>
+              <a:ext uri="{FF2B5EF4-FFF2-40B4-BE49-F238E27FC236}">
+                <a16:creationId xmlns:a16="http://schemas.microsoft.com/office/drawing/2014/main" id="{81136B66-258A-49D2-A699-3720CFE96290}"/>
+              </a:ext>
+            </a:extLst>
+          </p:cNvPr>
+          <p:cNvSpPr txBox="1"/>
+          <p:nvPr/>
+        </p:nvSpPr>
+        <p:spPr>
+          <a:xfrm>
+            <a:off x="1141412" y="3706918"/>
+            <a:ext cx="7591527" cy="369332"/>
+          </a:xfrm>
+          <a:prstGeom prst="rect">
+            <a:avLst/>
+          </a:prstGeom>
+          <a:noFill/>
+        </p:spPr>
+        <p:txBody>
+          <a:bodyPr wrap="square" rtlCol="0">
+            <a:spAutoFit/>
+          </a:bodyPr>
+          <a:lstStyle/>
+          <a:p>
+            <a:r>
+              <a:rPr lang="en-US" dirty="0"/>
+              <a:t>We need to add “FULL” debug mode in both application and test projects:</a:t>
+            </a:r>
+          </a:p>
+        </p:txBody>
+      </p:sp>
+    </p:spTree>
+    <p:extLst>
+      <p:ext uri="{BB962C8B-B14F-4D97-AF65-F5344CB8AC3E}">
+        <p14:creationId xmlns:p14="http://schemas.microsoft.com/office/powerpoint/2010/main" val="2884773143"/>
+      </p:ext>
+    </p:extLst>
+  </p:cSld>
+  <p:clrMapOvr>
+    <a:masterClrMapping/>
+  </p:clrMapOvr>
+  <p:timing>
+    <p:tnLst>
+      <p:par>
+        <p:cTn id="1" dur="indefinite" restart="never" nodeType="tmRoot">
+          <p:childTnLst>
+            <p:seq concurrent="1" nextAc="seek">
+              <p:cTn id="2" dur="indefinite" nodeType="mainSeq">
+                <p:childTnLst>
+                  <p:par>
+                    <p:cTn id="3" fill="hold">
+                      <p:stCondLst>
+                        <p:cond delay="indefinite"/>
+                      </p:stCondLst>
+                      <p:childTnLst>
+                        <p:par>
+                          <p:cTn id="4" fill="hold">
+                            <p:stCondLst>
+                              <p:cond delay="0"/>
+                            </p:stCondLst>
+                            <p:childTnLst>
+                              <p:par>
+                                <p:cTn id="5" presetID="1" presetClass="entr" presetSubtype="0" fill="hold" grpId="0" nodeType="clickEffect">
+                                  <p:stCondLst>
+                                    <p:cond delay="0"/>
+                                  </p:stCondLst>
+                                  <p:childTnLst>
+                                    <p:set>
+                                      <p:cBhvr>
+                                        <p:cTn id="6" dur="1" fill="hold">
+                                          <p:stCondLst>
+                                            <p:cond delay="0"/>
+                                          </p:stCondLst>
+                                        </p:cTn>
+                                        <p:tgtEl>
+                                          <p:spTgt spid="6"/>
+                                        </p:tgtEl>
+                                        <p:attrNameLst>
+                                          <p:attrName>style.visibility</p:attrName>
+                                        </p:attrNameLst>
+                                      </p:cBhvr>
+                                      <p:to>
+                                        <p:strVal val="visible"/>
+                                      </p:to>
+                                    </p:set>
+                                  </p:childTnLst>
+                                </p:cTn>
+                              </p:par>
+                              <p:par>
+                                <p:cTn id="7" presetID="1" presetClass="entr" presetSubtype="0" fill="hold" nodeType="withEffect">
+                                  <p:stCondLst>
+                                    <p:cond delay="0"/>
+                                  </p:stCondLst>
+                                  <p:childTnLst>
+                                    <p:set>
+                                      <p:cBhvr>
+                                        <p:cTn id="8" dur="1" fill="hold">
+                                          <p:stCondLst>
+                                            <p:cond delay="0"/>
+                                          </p:stCondLst>
+                                        </p:cTn>
+                                        <p:tgtEl>
+                                          <p:spTgt spid="5"/>
+                                        </p:tgtEl>
+                                        <p:attrNameLst>
+                                          <p:attrName>style.visibility</p:attrName>
+                                        </p:attrNameLst>
+                                      </p:cBhvr>
+                                      <p:to>
+                                        <p:strVal val="visible"/>
+                                      </p:to>
+                                    </p:set>
+                                  </p:childTnLst>
+                                </p:cTn>
+                              </p:par>
+                            </p:childTnLst>
+                          </p:cTn>
+                        </p:par>
+                      </p:childTnLst>
+                    </p:cTn>
+                  </p:par>
+                </p:childTnLst>
+              </p:cTn>
+              <p:prevCondLst>
+                <p:cond evt="onPrev" delay="0">
+                  <p:tgtEl>
+                    <p:sldTgt/>
+                  </p:tgtEl>
+                </p:cond>
+              </p:prevCondLst>
+              <p:nextCondLst>
+                <p:cond evt="onNext" delay="0">
+                  <p:tgtEl>
+                    <p:sldTgt/>
+                  </p:tgtEl>
+                </p:cond>
+              </p:nextCondLst>
+            </p:seq>
+          </p:childTnLst>
+        </p:cTn>
+      </p:par>
+    </p:tnLst>
+    <p:bldLst>
+      <p:bldP spid="6" grpId="0"/>
+    </p:bldLst>
+  </p:timing>
+</p:sld>
+</file>
+
+<file path=ppt/slides/slide19.xml><?xml version="1.0" encoding="utf-8"?>
+<p:sld xmlns:a="http://schemas.openxmlformats.org/drawingml/2006/main" xmlns:r="http://schemas.openxmlformats.org/officeDocument/2006/relationships" xmlns:p="http://schemas.openxmlformats.org/presentationml/2006/main">
+  <p:cSld>
+    <p:spTree>
+      <p:nvGrpSpPr>
+        <p:cNvPr id="1" name=""/>
+        <p:cNvGrpSpPr/>
+        <p:nvPr/>
+      </p:nvGrpSpPr>
+      <p:grpSpPr>
+        <a:xfrm>
+          <a:off x="0" y="0"/>
+          <a:ext cx="0" cy="0"/>
+          <a:chOff x="0" y="0"/>
+          <a:chExt cx="0" cy="0"/>
+        </a:xfrm>
+      </p:grpSpPr>
+      <p:sp>
+        <p:nvSpPr>
+          <p:cNvPr id="2" name="Title 1">
+            <a:extLst>
+              <a:ext uri="{FF2B5EF4-FFF2-40B4-BE49-F238E27FC236}">
+                <a16:creationId xmlns:a16="http://schemas.microsoft.com/office/drawing/2014/main" id="{2D7D0F29-4B3B-47E7-BB28-16138E10ED7B}"/>
+              </a:ext>
+            </a:extLst>
+          </p:cNvPr>
+          <p:cNvSpPr>
+            <a:spLocks noGrp="1"/>
+          </p:cNvSpPr>
+          <p:nvPr>
+            <p:ph type="title"/>
+          </p:nvPr>
+        </p:nvSpPr>
+        <p:spPr/>
+        <p:txBody>
+          <a:bodyPr/>
+          <a:lstStyle/>
+          <a:p>
+            <a:r>
+              <a:rPr lang="en-US" dirty="0"/>
+              <a:t>Let’s run this in the CI</a:t>
+            </a:r>
+          </a:p>
+        </p:txBody>
+      </p:sp>
+      <p:pic>
+        <p:nvPicPr>
+          <p:cNvPr id="4" name="Picture 3">
+            <a:extLst>
+              <a:ext uri="{FF2B5EF4-FFF2-40B4-BE49-F238E27FC236}">
+                <a16:creationId xmlns:a16="http://schemas.microsoft.com/office/drawing/2014/main" id="{E57A8206-98A4-49ED-8D1A-A7561263B2CD}"/>
+              </a:ext>
+            </a:extLst>
+          </p:cNvPr>
+          <p:cNvPicPr>
+            <a:picLocks noChangeAspect="1"/>
+          </p:cNvPicPr>
+          <p:nvPr/>
+        </p:nvPicPr>
+        <p:blipFill>
+          <a:blip r:embed="rId2"/>
+          <a:stretch>
+            <a:fillRect/>
+          </a:stretch>
+        </p:blipFill>
+        <p:spPr>
+          <a:xfrm>
+            <a:off x="1677398" y="1603970"/>
+            <a:ext cx="8971428" cy="5076190"/>
+          </a:xfrm>
+          <a:prstGeom prst="rect">
+            <a:avLst/>
+          </a:prstGeom>
+        </p:spPr>
+      </p:pic>
+      <p:sp>
+        <p:nvSpPr>
+          <p:cNvPr id="5" name="TextBox 4">
+            <a:extLst>
+              <a:ext uri="{FF2B5EF4-FFF2-40B4-BE49-F238E27FC236}">
+                <a16:creationId xmlns:a16="http://schemas.microsoft.com/office/drawing/2014/main" id="{1DEB5DFB-4BD8-4B0A-B9A2-41531311CA6C}"/>
+              </a:ext>
+            </a:extLst>
+          </p:cNvPr>
+          <p:cNvSpPr txBox="1"/>
+          <p:nvPr/>
+        </p:nvSpPr>
+        <p:spPr>
+          <a:xfrm>
+            <a:off x="5013229" y="3357235"/>
+            <a:ext cx="5635597" cy="1569660"/>
+          </a:xfrm>
+          <a:prstGeom prst="rect">
+            <a:avLst/>
+          </a:prstGeom>
+          <a:solidFill>
+            <a:schemeClr val="bg1"/>
+          </a:solidFill>
+          <a:ln w="19050">
+            <a:solidFill>
+              <a:schemeClr val="tx1"/>
+            </a:solidFill>
+          </a:ln>
+        </p:spPr>
+        <p:txBody>
+          <a:bodyPr wrap="square" rtlCol="0">
+            <a:spAutoFit/>
+          </a:bodyPr>
+          <a:lstStyle/>
+          <a:p>
+            <a:r>
+              <a:rPr lang="en-US" sz="2400" dirty="0"/>
+              <a:t>Why build again???</a:t>
+            </a:r>
+          </a:p>
+          <a:p>
+            <a:endParaRPr lang="en-US" sz="2400" dirty="0"/>
+          </a:p>
+          <a:p>
+            <a:r>
+              <a:rPr lang="en-US" sz="2400" dirty="0"/>
+              <a:t>We can add “--no-build” to the “</a:t>
+            </a:r>
+            <a:r>
+              <a:rPr lang="en-US" sz="2400" dirty="0" err="1"/>
+              <a:t>targetargs</a:t>
+            </a:r>
+            <a:r>
+              <a:rPr lang="en-US" sz="2400" dirty="0"/>
+              <a:t>”</a:t>
+            </a:r>
+          </a:p>
+          <a:p>
+            <a:r>
+              <a:rPr lang="en-US" sz="2400" dirty="0">
+                <a:solidFill>
+                  <a:srgbClr val="92D050"/>
+                </a:solidFill>
+              </a:rPr>
+              <a:t>-</a:t>
+            </a:r>
+            <a:r>
+              <a:rPr lang="en-US" sz="2400" dirty="0" err="1">
+                <a:solidFill>
+                  <a:srgbClr val="92D050"/>
+                </a:solidFill>
+              </a:rPr>
+              <a:t>targetargs</a:t>
+            </a:r>
+            <a:r>
+              <a:rPr lang="en-US" sz="2400" dirty="0">
+                <a:solidFill>
+                  <a:srgbClr val="92D050"/>
+                </a:solidFill>
+              </a:rPr>
+              <a:t>:"test --no-build </a:t>
+            </a:r>
+            <a:r>
+              <a:rPr lang="en-US" sz="2400" dirty="0" err="1">
+                <a:solidFill>
+                  <a:srgbClr val="92D050"/>
+                </a:solidFill>
+              </a:rPr>
+              <a:t>tests.csproj</a:t>
+            </a:r>
+            <a:r>
+              <a:rPr lang="en-US" sz="2400" dirty="0">
+                <a:solidFill>
+                  <a:srgbClr val="92D050"/>
+                </a:solidFill>
+              </a:rPr>
+              <a:t>"</a:t>
+            </a:r>
+            <a:endParaRPr lang="en-US" sz="2400" dirty="0"/>
+          </a:p>
+        </p:txBody>
+      </p:sp>
+      <p:cxnSp>
+        <p:nvCxnSpPr>
+          <p:cNvPr id="7" name="Straight Arrow Connector 6">
+            <a:extLst>
+              <a:ext uri="{FF2B5EF4-FFF2-40B4-BE49-F238E27FC236}">
+                <a16:creationId xmlns:a16="http://schemas.microsoft.com/office/drawing/2014/main" id="{28909823-D798-4281-87B2-19B07A94C46B}"/>
+              </a:ext>
+            </a:extLst>
+          </p:cNvPr>
+          <p:cNvCxnSpPr/>
+          <p:nvPr/>
+        </p:nvCxnSpPr>
+        <p:spPr>
+          <a:xfrm flipH="1" flipV="1">
+            <a:off x="3987734" y="3504586"/>
+            <a:ext cx="1025495" cy="264109"/>
+          </a:xfrm>
+          <a:prstGeom prst="straightConnector1">
+            <a:avLst/>
+          </a:prstGeom>
+          <a:ln w="57150">
+            <a:solidFill>
+              <a:srgbClr val="FFC000"/>
+            </a:solidFill>
+            <a:tailEnd type="triangle"/>
+          </a:ln>
+        </p:spPr>
+        <p:style>
+          <a:lnRef idx="1">
+            <a:schemeClr val="accent1"/>
+          </a:lnRef>
+          <a:fillRef idx="0">
+            <a:schemeClr val="accent1"/>
+          </a:fillRef>
+          <a:effectRef idx="0">
+            <a:schemeClr val="accent1"/>
+          </a:effectRef>
+          <a:fontRef idx="minor">
+            <a:schemeClr val="tx1"/>
+          </a:fontRef>
+        </p:style>
+      </p:cxnSp>
+    </p:spTree>
+    <p:extLst>
+      <p:ext uri="{BB962C8B-B14F-4D97-AF65-F5344CB8AC3E}">
+        <p14:creationId xmlns:p14="http://schemas.microsoft.com/office/powerpoint/2010/main" val="2674377342"/>
+      </p:ext>
+    </p:extLst>
+  </p:cSld>
+  <p:clrMapOvr>
+    <a:masterClrMapping/>
+  </p:clrMapOvr>
+  <p:timing>
+    <p:tnLst>
+      <p:par>
+        <p:cTn id="1" dur="indefinite" restart="never" nodeType="tmRoot">
+          <p:childTnLst>
+            <p:seq concurrent="1" nextAc="seek">
+              <p:cTn id="2" dur="indefinite" nodeType="mainSeq">
+                <p:childTnLst>
+                  <p:par>
+                    <p:cTn id="3" fill="hold">
+                      <p:stCondLst>
+                        <p:cond delay="indefinite"/>
+                      </p:stCondLst>
+                      <p:childTnLst>
+                        <p:par>
+                          <p:cTn id="4" fill="hold">
+                            <p:stCondLst>
+                              <p:cond delay="0"/>
+                            </p:stCondLst>
+                            <p:childTnLst>
+                              <p:par>
+                                <p:cTn id="5" presetID="1" presetClass="entr" presetSubtype="0" fill="hold" nodeType="clickEffect">
+                                  <p:stCondLst>
+                                    <p:cond delay="0"/>
+                                  </p:stCondLst>
+                                  <p:childTnLst>
+                                    <p:set>
+                                      <p:cBhvr>
+                                        <p:cTn id="6" dur="1" fill="hold">
+                                          <p:stCondLst>
+                                            <p:cond delay="0"/>
+                                          </p:stCondLst>
+                                        </p:cTn>
+                                        <p:tgtEl>
+                                          <p:spTgt spid="7"/>
+                                        </p:tgtEl>
+                                        <p:attrNameLst>
+                                          <p:attrName>style.visibility</p:attrName>
+                                        </p:attrNameLst>
+                                      </p:cBhvr>
+                                      <p:to>
+                                        <p:strVal val="visible"/>
+                                      </p:to>
+                                    </p:set>
+                                  </p:childTnLst>
+                                </p:cTn>
+                              </p:par>
+                              <p:par>
+                                <p:cTn id="7" presetID="1" presetClass="entr" presetSubtype="0" fill="hold" grpId="0" nodeType="withEffect">
+                                  <p:stCondLst>
+                                    <p:cond delay="0"/>
+                                  </p:stCondLst>
+                                  <p:childTnLst>
+                                    <p:set>
+                                      <p:cBhvr>
+                                        <p:cTn id="8" dur="1" fill="hold">
+                                          <p:stCondLst>
+                                            <p:cond delay="0"/>
+                                          </p:stCondLst>
+                                        </p:cTn>
+                                        <p:tgtEl>
+                                          <p:spTgt spid="5"/>
+                                        </p:tgtEl>
+                                        <p:attrNameLst>
+                                          <p:attrName>style.visibility</p:attrName>
+                                        </p:attrNameLst>
+                                      </p:cBhvr>
+                                      <p:to>
+                                        <p:strVal val="visible"/>
+                                      </p:to>
+                                    </p:set>
+                                  </p:childTnLst>
+                                </p:cTn>
+                              </p:par>
+                            </p:childTnLst>
+                          </p:cTn>
+                        </p:par>
+                      </p:childTnLst>
+                    </p:cTn>
+                  </p:par>
+                </p:childTnLst>
+              </p:cTn>
+              <p:prevCondLst>
+                <p:cond evt="onPrev" delay="0">
+                  <p:tgtEl>
+                    <p:sldTgt/>
+                  </p:tgtEl>
+                </p:cond>
+              </p:prevCondLst>
+              <p:nextCondLst>
+                <p:cond evt="onNext" delay="0">
+                  <p:tgtEl>
+                    <p:sldTgt/>
+                  </p:tgtEl>
+                </p:cond>
+              </p:nextCondLst>
+            </p:seq>
+          </p:childTnLst>
+        </p:cTn>
+      </p:par>
+    </p:tnLst>
+    <p:bldLst>
+      <p:bldP spid="5" grpId="0" animBg="1"/>
+    </p:bldLst>
+  </p:timing>
+</p:sld>
+</file>
+
 <file path=ppt/slides/slide2.xml><?xml version="1.0" encoding="utf-8"?>
 <p:sld xmlns:a="http://schemas.openxmlformats.org/drawingml/2006/main" xmlns:r="http://schemas.openxmlformats.org/officeDocument/2006/relationships" xmlns:p="http://schemas.openxmlformats.org/presentationml/2006/main">
   <p:cSld>
@@ -15060,6 +16521,1257 @@
     <p:extLst>
       <p:ext uri="{BB962C8B-B14F-4D97-AF65-F5344CB8AC3E}">
         <p14:creationId xmlns:p14="http://schemas.microsoft.com/office/powerpoint/2010/main" val="567128038"/>
+      </p:ext>
+    </p:extLst>
+  </p:cSld>
+  <p:clrMapOvr>
+    <a:masterClrMapping/>
+  </p:clrMapOvr>
+</p:sld>
+</file>
+
+<file path=ppt/slides/slide20.xml><?xml version="1.0" encoding="utf-8"?>
+<p:sld xmlns:a="http://schemas.openxmlformats.org/drawingml/2006/main" xmlns:r="http://schemas.openxmlformats.org/officeDocument/2006/relationships" xmlns:p="http://schemas.openxmlformats.org/presentationml/2006/main">
+  <p:cSld>
+    <p:spTree>
+      <p:nvGrpSpPr>
+        <p:cNvPr id="1" name=""/>
+        <p:cNvGrpSpPr/>
+        <p:nvPr/>
+      </p:nvGrpSpPr>
+      <p:grpSpPr>
+        <a:xfrm>
+          <a:off x="0" y="0"/>
+          <a:ext cx="0" cy="0"/>
+          <a:chOff x="0" y="0"/>
+          <a:chExt cx="0" cy="0"/>
+        </a:xfrm>
+      </p:grpSpPr>
+      <p:sp>
+        <p:nvSpPr>
+          <p:cNvPr id="2" name="Title 1">
+            <a:extLst>
+              <a:ext uri="{FF2B5EF4-FFF2-40B4-BE49-F238E27FC236}">
+                <a16:creationId xmlns:a16="http://schemas.microsoft.com/office/drawing/2014/main" id="{81980DBC-4746-437B-BC33-D0D64E0AB1D5}"/>
+              </a:ext>
+            </a:extLst>
+          </p:cNvPr>
+          <p:cNvSpPr>
+            <a:spLocks noGrp="1"/>
+          </p:cNvSpPr>
+          <p:nvPr>
+            <p:ph type="title"/>
+          </p:nvPr>
+        </p:nvSpPr>
+        <p:spPr/>
+        <p:txBody>
+          <a:bodyPr/>
+          <a:lstStyle/>
+          <a:p>
+            <a:r>
+              <a:rPr lang="en-US" dirty="0"/>
+              <a:t>Pushing code coverage to </a:t>
+            </a:r>
+            <a:r>
+              <a:rPr lang="en-US" dirty="0" err="1"/>
+              <a:t>CodeCov</a:t>
+            </a:r>
+            <a:endParaRPr lang="en-US" dirty="0"/>
+          </a:p>
+        </p:txBody>
+      </p:sp>
+      <p:sp>
+        <p:nvSpPr>
+          <p:cNvPr id="3" name="Content Placeholder 2">
+            <a:extLst>
+              <a:ext uri="{FF2B5EF4-FFF2-40B4-BE49-F238E27FC236}">
+                <a16:creationId xmlns:a16="http://schemas.microsoft.com/office/drawing/2014/main" id="{10B5B78F-277E-4800-8F6B-90703E676B06}"/>
+              </a:ext>
+            </a:extLst>
+          </p:cNvPr>
+          <p:cNvSpPr>
+            <a:spLocks noGrp="1"/>
+          </p:cNvSpPr>
+          <p:nvPr>
+            <p:ph idx="1"/>
+          </p:nvPr>
+        </p:nvSpPr>
+        <p:spPr/>
+        <p:txBody>
+          <a:bodyPr/>
+          <a:lstStyle/>
+          <a:p>
+            <a:r>
+              <a:rPr lang="en-US" dirty="0"/>
+              <a:t>Go to </a:t>
+            </a:r>
+            <a:r>
+              <a:rPr lang="en-US" dirty="0">
+                <a:hlinkClick r:id="rId2"/>
+              </a:rPr>
+              <a:t>https://codecov.io</a:t>
+            </a:r>
+            <a:endParaRPr lang="en-US" dirty="0"/>
+          </a:p>
+          <a:p>
+            <a:r>
+              <a:rPr lang="en-US" dirty="0"/>
+              <a:t>Click on Sign-in</a:t>
+            </a:r>
+          </a:p>
+        </p:txBody>
+      </p:sp>
+      <p:pic>
+        <p:nvPicPr>
+          <p:cNvPr id="4" name="Picture 3">
+            <a:extLst>
+              <a:ext uri="{FF2B5EF4-FFF2-40B4-BE49-F238E27FC236}">
+                <a16:creationId xmlns:a16="http://schemas.microsoft.com/office/drawing/2014/main" id="{35856296-B34B-4DF9-A0F6-8C07A2D5638E}"/>
+              </a:ext>
+            </a:extLst>
+          </p:cNvPr>
+          <p:cNvPicPr>
+            <a:picLocks noChangeAspect="1"/>
+          </p:cNvPicPr>
+          <p:nvPr/>
+        </p:nvPicPr>
+        <p:blipFill>
+          <a:blip r:embed="rId3"/>
+          <a:stretch>
+            <a:fillRect/>
+          </a:stretch>
+        </p:blipFill>
+        <p:spPr>
+          <a:xfrm>
+            <a:off x="1713458" y="1681381"/>
+            <a:ext cx="8761905" cy="3495238"/>
+          </a:xfrm>
+          <a:prstGeom prst="rect">
+            <a:avLst/>
+          </a:prstGeom>
+        </p:spPr>
+      </p:pic>
+      <p:pic>
+        <p:nvPicPr>
+          <p:cNvPr id="5" name="Picture 4">
+            <a:extLst>
+              <a:ext uri="{FF2B5EF4-FFF2-40B4-BE49-F238E27FC236}">
+                <a16:creationId xmlns:a16="http://schemas.microsoft.com/office/drawing/2014/main" id="{74C17962-A654-439B-8070-F3C726848154}"/>
+              </a:ext>
+            </a:extLst>
+          </p:cNvPr>
+          <p:cNvPicPr>
+            <a:picLocks noChangeAspect="1"/>
+          </p:cNvPicPr>
+          <p:nvPr/>
+        </p:nvPicPr>
+        <p:blipFill>
+          <a:blip r:embed="rId4"/>
+          <a:stretch>
+            <a:fillRect/>
+          </a:stretch>
+        </p:blipFill>
+        <p:spPr>
+          <a:xfrm>
+            <a:off x="3700573" y="304530"/>
+            <a:ext cx="4790853" cy="6248939"/>
+          </a:xfrm>
+          <a:prstGeom prst="rect">
+            <a:avLst/>
+          </a:prstGeom>
+        </p:spPr>
+      </p:pic>
+      <p:pic>
+        <p:nvPicPr>
+          <p:cNvPr id="6" name="Picture 5">
+            <a:extLst>
+              <a:ext uri="{FF2B5EF4-FFF2-40B4-BE49-F238E27FC236}">
+                <a16:creationId xmlns:a16="http://schemas.microsoft.com/office/drawing/2014/main" id="{A7456321-F616-46C8-A6C9-F2849AD58074}"/>
+              </a:ext>
+            </a:extLst>
+          </p:cNvPr>
+          <p:cNvPicPr>
+            <a:picLocks noChangeAspect="1"/>
+          </p:cNvPicPr>
+          <p:nvPr/>
+        </p:nvPicPr>
+        <p:blipFill>
+          <a:blip r:embed="rId5"/>
+          <a:stretch>
+            <a:fillRect/>
+          </a:stretch>
+        </p:blipFill>
+        <p:spPr>
+          <a:xfrm>
+            <a:off x="4586476" y="2338524"/>
+            <a:ext cx="3019048" cy="2180952"/>
+          </a:xfrm>
+          <a:prstGeom prst="rect">
+            <a:avLst/>
+          </a:prstGeom>
+        </p:spPr>
+      </p:pic>
+      <p:pic>
+        <p:nvPicPr>
+          <p:cNvPr id="7" name="Picture 6">
+            <a:extLst>
+              <a:ext uri="{FF2B5EF4-FFF2-40B4-BE49-F238E27FC236}">
+                <a16:creationId xmlns:a16="http://schemas.microsoft.com/office/drawing/2014/main" id="{328F111A-FD70-4F13-91FC-93EFE76912C3}"/>
+              </a:ext>
+            </a:extLst>
+          </p:cNvPr>
+          <p:cNvPicPr>
+            <a:picLocks noChangeAspect="1"/>
+          </p:cNvPicPr>
+          <p:nvPr/>
+        </p:nvPicPr>
+        <p:blipFill>
+          <a:blip r:embed="rId6"/>
+          <a:stretch>
+            <a:fillRect/>
+          </a:stretch>
+        </p:blipFill>
+        <p:spPr>
+          <a:xfrm>
+            <a:off x="1318571" y="457180"/>
+            <a:ext cx="9551677" cy="5943638"/>
+          </a:xfrm>
+          <a:prstGeom prst="rect">
+            <a:avLst/>
+          </a:prstGeom>
+        </p:spPr>
+      </p:pic>
+      <p:pic>
+        <p:nvPicPr>
+          <p:cNvPr id="8" name="Picture 7">
+            <a:extLst>
+              <a:ext uri="{FF2B5EF4-FFF2-40B4-BE49-F238E27FC236}">
+                <a16:creationId xmlns:a16="http://schemas.microsoft.com/office/drawing/2014/main" id="{AEB05DC9-3240-4BEE-8772-F7F338B7C79E}"/>
+              </a:ext>
+            </a:extLst>
+          </p:cNvPr>
+          <p:cNvPicPr>
+            <a:picLocks noChangeAspect="1"/>
+          </p:cNvPicPr>
+          <p:nvPr/>
+        </p:nvPicPr>
+        <p:blipFill>
+          <a:blip r:embed="rId7"/>
+          <a:stretch>
+            <a:fillRect/>
+          </a:stretch>
+        </p:blipFill>
+        <p:spPr>
+          <a:xfrm>
+            <a:off x="2624571" y="2733762"/>
+            <a:ext cx="6942857" cy="1390476"/>
+          </a:xfrm>
+          <a:prstGeom prst="rect">
+            <a:avLst/>
+          </a:prstGeom>
+          <a:ln w="28575">
+            <a:solidFill>
+              <a:schemeClr val="bg1"/>
+            </a:solidFill>
+          </a:ln>
+        </p:spPr>
+      </p:pic>
+    </p:spTree>
+    <p:extLst>
+      <p:ext uri="{BB962C8B-B14F-4D97-AF65-F5344CB8AC3E}">
+        <p14:creationId xmlns:p14="http://schemas.microsoft.com/office/powerpoint/2010/main" val="3661388448"/>
+      </p:ext>
+    </p:extLst>
+  </p:cSld>
+  <p:clrMapOvr>
+    <a:masterClrMapping/>
+  </p:clrMapOvr>
+  <p:timing>
+    <p:tnLst>
+      <p:par>
+        <p:cTn id="1" dur="indefinite" restart="never" nodeType="tmRoot">
+          <p:childTnLst>
+            <p:seq concurrent="1" nextAc="seek">
+              <p:cTn id="2" dur="indefinite" nodeType="mainSeq">
+                <p:childTnLst>
+                  <p:par>
+                    <p:cTn id="3" fill="hold">
+                      <p:stCondLst>
+                        <p:cond delay="indefinite"/>
+                      </p:stCondLst>
+                      <p:childTnLst>
+                        <p:par>
+                          <p:cTn id="4" fill="hold">
+                            <p:stCondLst>
+                              <p:cond delay="0"/>
+                            </p:stCondLst>
+                            <p:childTnLst>
+                              <p:par>
+                                <p:cTn id="5" presetID="1" presetClass="entr" presetSubtype="0" fill="hold" nodeType="clickEffect">
+                                  <p:stCondLst>
+                                    <p:cond delay="0"/>
+                                  </p:stCondLst>
+                                  <p:childTnLst>
+                                    <p:set>
+                                      <p:cBhvr>
+                                        <p:cTn id="6" dur="1" fill="hold">
+                                          <p:stCondLst>
+                                            <p:cond delay="0"/>
+                                          </p:stCondLst>
+                                        </p:cTn>
+                                        <p:tgtEl>
+                                          <p:spTgt spid="4"/>
+                                        </p:tgtEl>
+                                        <p:attrNameLst>
+                                          <p:attrName>style.visibility</p:attrName>
+                                        </p:attrNameLst>
+                                      </p:cBhvr>
+                                      <p:to>
+                                        <p:strVal val="visible"/>
+                                      </p:to>
+                                    </p:set>
+                                  </p:childTnLst>
+                                </p:cTn>
+                              </p:par>
+                            </p:childTnLst>
+                          </p:cTn>
+                        </p:par>
+                      </p:childTnLst>
+                    </p:cTn>
+                  </p:par>
+                  <p:par>
+                    <p:cTn id="7" fill="hold">
+                      <p:stCondLst>
+                        <p:cond delay="indefinite"/>
+                      </p:stCondLst>
+                      <p:childTnLst>
+                        <p:par>
+                          <p:cTn id="8" fill="hold">
+                            <p:stCondLst>
+                              <p:cond delay="0"/>
+                            </p:stCondLst>
+                            <p:childTnLst>
+                              <p:par>
+                                <p:cTn id="9" presetID="1" presetClass="entr" presetSubtype="0" fill="hold" nodeType="clickEffect">
+                                  <p:stCondLst>
+                                    <p:cond delay="0"/>
+                                  </p:stCondLst>
+                                  <p:childTnLst>
+                                    <p:set>
+                                      <p:cBhvr>
+                                        <p:cTn id="10" dur="1" fill="hold">
+                                          <p:stCondLst>
+                                            <p:cond delay="0"/>
+                                          </p:stCondLst>
+                                        </p:cTn>
+                                        <p:tgtEl>
+                                          <p:spTgt spid="5"/>
+                                        </p:tgtEl>
+                                        <p:attrNameLst>
+                                          <p:attrName>style.visibility</p:attrName>
+                                        </p:attrNameLst>
+                                      </p:cBhvr>
+                                      <p:to>
+                                        <p:strVal val="visible"/>
+                                      </p:to>
+                                    </p:set>
+                                  </p:childTnLst>
+                                </p:cTn>
+                              </p:par>
+                            </p:childTnLst>
+                          </p:cTn>
+                        </p:par>
+                      </p:childTnLst>
+                    </p:cTn>
+                  </p:par>
+                  <p:par>
+                    <p:cTn id="11" fill="hold">
+                      <p:stCondLst>
+                        <p:cond delay="indefinite"/>
+                      </p:stCondLst>
+                      <p:childTnLst>
+                        <p:par>
+                          <p:cTn id="12" fill="hold">
+                            <p:stCondLst>
+                              <p:cond delay="0"/>
+                            </p:stCondLst>
+                            <p:childTnLst>
+                              <p:par>
+                                <p:cTn id="13" presetID="1" presetClass="entr" presetSubtype="0" fill="hold" nodeType="clickEffect">
+                                  <p:stCondLst>
+                                    <p:cond delay="0"/>
+                                  </p:stCondLst>
+                                  <p:childTnLst>
+                                    <p:set>
+                                      <p:cBhvr>
+                                        <p:cTn id="14" dur="1" fill="hold">
+                                          <p:stCondLst>
+                                            <p:cond delay="0"/>
+                                          </p:stCondLst>
+                                        </p:cTn>
+                                        <p:tgtEl>
+                                          <p:spTgt spid="6"/>
+                                        </p:tgtEl>
+                                        <p:attrNameLst>
+                                          <p:attrName>style.visibility</p:attrName>
+                                        </p:attrNameLst>
+                                      </p:cBhvr>
+                                      <p:to>
+                                        <p:strVal val="visible"/>
+                                      </p:to>
+                                    </p:set>
+                                  </p:childTnLst>
+                                </p:cTn>
+                              </p:par>
+                              <p:par>
+                                <p:cTn id="15" presetID="1" presetClass="exit" presetSubtype="0" fill="hold" nodeType="withEffect">
+                                  <p:stCondLst>
+                                    <p:cond delay="0"/>
+                                  </p:stCondLst>
+                                  <p:childTnLst>
+                                    <p:set>
+                                      <p:cBhvr>
+                                        <p:cTn id="16" dur="1" fill="hold">
+                                          <p:stCondLst>
+                                            <p:cond delay="0"/>
+                                          </p:stCondLst>
+                                        </p:cTn>
+                                        <p:tgtEl>
+                                          <p:spTgt spid="5"/>
+                                        </p:tgtEl>
+                                        <p:attrNameLst>
+                                          <p:attrName>style.visibility</p:attrName>
+                                        </p:attrNameLst>
+                                      </p:cBhvr>
+                                      <p:to>
+                                        <p:strVal val="hidden"/>
+                                      </p:to>
+                                    </p:set>
+                                  </p:childTnLst>
+                                </p:cTn>
+                              </p:par>
+                              <p:par>
+                                <p:cTn id="17" presetID="1" presetClass="exit" presetSubtype="0" fill="hold" nodeType="withEffect">
+                                  <p:stCondLst>
+                                    <p:cond delay="0"/>
+                                  </p:stCondLst>
+                                  <p:childTnLst>
+                                    <p:set>
+                                      <p:cBhvr>
+                                        <p:cTn id="18" dur="1" fill="hold">
+                                          <p:stCondLst>
+                                            <p:cond delay="0"/>
+                                          </p:stCondLst>
+                                        </p:cTn>
+                                        <p:tgtEl>
+                                          <p:spTgt spid="4"/>
+                                        </p:tgtEl>
+                                        <p:attrNameLst>
+                                          <p:attrName>style.visibility</p:attrName>
+                                        </p:attrNameLst>
+                                      </p:cBhvr>
+                                      <p:to>
+                                        <p:strVal val="hidden"/>
+                                      </p:to>
+                                    </p:set>
+                                  </p:childTnLst>
+                                </p:cTn>
+                              </p:par>
+                            </p:childTnLst>
+                          </p:cTn>
+                        </p:par>
+                      </p:childTnLst>
+                    </p:cTn>
+                  </p:par>
+                  <p:par>
+                    <p:cTn id="19" fill="hold">
+                      <p:stCondLst>
+                        <p:cond delay="indefinite"/>
+                      </p:stCondLst>
+                      <p:childTnLst>
+                        <p:par>
+                          <p:cTn id="20" fill="hold">
+                            <p:stCondLst>
+                              <p:cond delay="0"/>
+                            </p:stCondLst>
+                            <p:childTnLst>
+                              <p:par>
+                                <p:cTn id="21" presetID="1" presetClass="entr" presetSubtype="0" fill="hold" nodeType="clickEffect">
+                                  <p:stCondLst>
+                                    <p:cond delay="0"/>
+                                  </p:stCondLst>
+                                  <p:childTnLst>
+                                    <p:set>
+                                      <p:cBhvr>
+                                        <p:cTn id="22" dur="1" fill="hold">
+                                          <p:stCondLst>
+                                            <p:cond delay="0"/>
+                                          </p:stCondLst>
+                                        </p:cTn>
+                                        <p:tgtEl>
+                                          <p:spTgt spid="7"/>
+                                        </p:tgtEl>
+                                        <p:attrNameLst>
+                                          <p:attrName>style.visibility</p:attrName>
+                                        </p:attrNameLst>
+                                      </p:cBhvr>
+                                      <p:to>
+                                        <p:strVal val="visible"/>
+                                      </p:to>
+                                    </p:set>
+                                  </p:childTnLst>
+                                </p:cTn>
+                              </p:par>
+                            </p:childTnLst>
+                          </p:cTn>
+                        </p:par>
+                      </p:childTnLst>
+                    </p:cTn>
+                  </p:par>
+                  <p:par>
+                    <p:cTn id="23" fill="hold">
+                      <p:stCondLst>
+                        <p:cond delay="indefinite"/>
+                      </p:stCondLst>
+                      <p:childTnLst>
+                        <p:par>
+                          <p:cTn id="24" fill="hold">
+                            <p:stCondLst>
+                              <p:cond delay="0"/>
+                            </p:stCondLst>
+                            <p:childTnLst>
+                              <p:par>
+                                <p:cTn id="25" presetID="1" presetClass="entr" presetSubtype="0" fill="hold" nodeType="clickEffect">
+                                  <p:stCondLst>
+                                    <p:cond delay="0"/>
+                                  </p:stCondLst>
+                                  <p:childTnLst>
+                                    <p:set>
+                                      <p:cBhvr>
+                                        <p:cTn id="26" dur="1" fill="hold">
+                                          <p:stCondLst>
+                                            <p:cond delay="0"/>
+                                          </p:stCondLst>
+                                        </p:cTn>
+                                        <p:tgtEl>
+                                          <p:spTgt spid="8"/>
+                                        </p:tgtEl>
+                                        <p:attrNameLst>
+                                          <p:attrName>style.visibility</p:attrName>
+                                        </p:attrNameLst>
+                                      </p:cBhvr>
+                                      <p:to>
+                                        <p:strVal val="visible"/>
+                                      </p:to>
+                                    </p:set>
+                                  </p:childTnLst>
+                                </p:cTn>
+                              </p:par>
+                            </p:childTnLst>
+                          </p:cTn>
+                        </p:par>
+                      </p:childTnLst>
+                    </p:cTn>
+                  </p:par>
+                </p:childTnLst>
+              </p:cTn>
+              <p:prevCondLst>
+                <p:cond evt="onPrev" delay="0">
+                  <p:tgtEl>
+                    <p:sldTgt/>
+                  </p:tgtEl>
+                </p:cond>
+              </p:prevCondLst>
+              <p:nextCondLst>
+                <p:cond evt="onNext" delay="0">
+                  <p:tgtEl>
+                    <p:sldTgt/>
+                  </p:tgtEl>
+                </p:cond>
+              </p:nextCondLst>
+            </p:seq>
+          </p:childTnLst>
+        </p:cTn>
+      </p:par>
+    </p:tnLst>
+  </p:timing>
+</p:sld>
+</file>
+
+<file path=ppt/slides/slide21.xml><?xml version="1.0" encoding="utf-8"?>
+<p:sld xmlns:a="http://schemas.openxmlformats.org/drawingml/2006/main" xmlns:r="http://schemas.openxmlformats.org/officeDocument/2006/relationships" xmlns:p="http://schemas.openxmlformats.org/presentationml/2006/main">
+  <p:cSld>
+    <p:spTree>
+      <p:nvGrpSpPr>
+        <p:cNvPr id="1" name=""/>
+        <p:cNvGrpSpPr/>
+        <p:nvPr/>
+      </p:nvGrpSpPr>
+      <p:grpSpPr>
+        <a:xfrm>
+          <a:off x="0" y="0"/>
+          <a:ext cx="0" cy="0"/>
+          <a:chOff x="0" y="0"/>
+          <a:chExt cx="0" cy="0"/>
+        </a:xfrm>
+      </p:grpSpPr>
+      <p:sp>
+        <p:nvSpPr>
+          <p:cNvPr id="2" name="Title 1">
+            <a:extLst>
+              <a:ext uri="{FF2B5EF4-FFF2-40B4-BE49-F238E27FC236}">
+                <a16:creationId xmlns:a16="http://schemas.microsoft.com/office/drawing/2014/main" id="{744C9B27-AD08-4F88-983C-331EA55E4E7C}"/>
+              </a:ext>
+            </a:extLst>
+          </p:cNvPr>
+          <p:cNvSpPr>
+            <a:spLocks noGrp="1"/>
+          </p:cNvSpPr>
+          <p:nvPr>
+            <p:ph type="title"/>
+          </p:nvPr>
+        </p:nvSpPr>
+        <p:spPr/>
+        <p:txBody>
+          <a:bodyPr/>
+          <a:lstStyle/>
+          <a:p>
+            <a:r>
+              <a:rPr lang="en-US" dirty="0"/>
+              <a:t>Authorize </a:t>
+            </a:r>
+            <a:r>
+              <a:rPr lang="en-US" dirty="0" err="1"/>
+              <a:t>Codecov</a:t>
+            </a:r>
+            <a:r>
+              <a:rPr lang="en-US" dirty="0"/>
+              <a:t> in </a:t>
+            </a:r>
+            <a:r>
+              <a:rPr lang="en-US" dirty="0" err="1"/>
+              <a:t>github</a:t>
+            </a:r>
+            <a:endParaRPr lang="en-US" dirty="0"/>
+          </a:p>
+        </p:txBody>
+      </p:sp>
+      <p:pic>
+        <p:nvPicPr>
+          <p:cNvPr id="5" name="Picture 4">
+            <a:extLst>
+              <a:ext uri="{FF2B5EF4-FFF2-40B4-BE49-F238E27FC236}">
+                <a16:creationId xmlns:a16="http://schemas.microsoft.com/office/drawing/2014/main" id="{FEF33038-279E-4528-B47F-209591DA568D}"/>
+              </a:ext>
+            </a:extLst>
+          </p:cNvPr>
+          <p:cNvPicPr>
+            <a:picLocks noChangeAspect="1"/>
+          </p:cNvPicPr>
+          <p:nvPr/>
+        </p:nvPicPr>
+        <p:blipFill>
+          <a:blip r:embed="rId2"/>
+          <a:stretch>
+            <a:fillRect/>
+          </a:stretch>
+        </p:blipFill>
+        <p:spPr>
+          <a:xfrm>
+            <a:off x="644273" y="2326014"/>
+            <a:ext cx="10733333" cy="504762"/>
+          </a:xfrm>
+          <a:prstGeom prst="rect">
+            <a:avLst/>
+          </a:prstGeom>
+        </p:spPr>
+      </p:pic>
+      <p:sp>
+        <p:nvSpPr>
+          <p:cNvPr id="6" name="Arrow: Down 5">
+            <a:extLst>
+              <a:ext uri="{FF2B5EF4-FFF2-40B4-BE49-F238E27FC236}">
+                <a16:creationId xmlns:a16="http://schemas.microsoft.com/office/drawing/2014/main" id="{69A6056C-A19F-4C12-BCC1-B62CC1080CF1}"/>
+              </a:ext>
+            </a:extLst>
+          </p:cNvPr>
+          <p:cNvSpPr/>
+          <p:nvPr/>
+        </p:nvSpPr>
+        <p:spPr>
+          <a:xfrm>
+            <a:off x="8654902" y="1796902"/>
+            <a:ext cx="457200" cy="648586"/>
+          </a:xfrm>
+          <a:prstGeom prst="downArrow">
+            <a:avLst/>
+          </a:prstGeom>
+          <a:solidFill>
+            <a:schemeClr val="accent2"/>
+          </a:solidFill>
+          <a:ln>
+            <a:solidFill>
+              <a:schemeClr val="accent2"/>
+            </a:solidFill>
+          </a:ln>
+        </p:spPr>
+        <p:style>
+          <a:lnRef idx="2">
+            <a:schemeClr val="accent1">
+              <a:shade val="50000"/>
+            </a:schemeClr>
+          </a:lnRef>
+          <a:fillRef idx="1">
+            <a:schemeClr val="accent1"/>
+          </a:fillRef>
+          <a:effectRef idx="0">
+            <a:schemeClr val="accent1"/>
+          </a:effectRef>
+          <a:fontRef idx="minor">
+            <a:schemeClr val="lt1"/>
+          </a:fontRef>
+        </p:style>
+        <p:txBody>
+          <a:bodyPr rtlCol="0" anchor="ctr"/>
+          <a:lstStyle/>
+          <a:p>
+            <a:pPr algn="ctr"/>
+            <a:endParaRPr lang="en-US">
+              <a:solidFill>
+                <a:schemeClr val="accent2"/>
+              </a:solidFill>
+            </a:endParaRPr>
+          </a:p>
+        </p:txBody>
+      </p:sp>
+      <p:pic>
+        <p:nvPicPr>
+          <p:cNvPr id="8" name="Picture 7">
+            <a:extLst>
+              <a:ext uri="{FF2B5EF4-FFF2-40B4-BE49-F238E27FC236}">
+                <a16:creationId xmlns:a16="http://schemas.microsoft.com/office/drawing/2014/main" id="{9FB54463-678A-4E5F-828F-FBFF982086C9}"/>
+              </a:ext>
+            </a:extLst>
+          </p:cNvPr>
+          <p:cNvPicPr>
+            <a:picLocks noChangeAspect="1"/>
+          </p:cNvPicPr>
+          <p:nvPr/>
+        </p:nvPicPr>
+        <p:blipFill>
+          <a:blip r:embed="rId3"/>
+          <a:stretch>
+            <a:fillRect/>
+          </a:stretch>
+        </p:blipFill>
+        <p:spPr>
+          <a:xfrm>
+            <a:off x="2110834" y="814296"/>
+            <a:ext cx="7967156" cy="5229407"/>
+          </a:xfrm>
+          <a:prstGeom prst="rect">
+            <a:avLst/>
+          </a:prstGeom>
+        </p:spPr>
+      </p:pic>
+      <p:sp>
+        <p:nvSpPr>
+          <p:cNvPr id="9" name="Arrow: Down 8">
+            <a:extLst>
+              <a:ext uri="{FF2B5EF4-FFF2-40B4-BE49-F238E27FC236}">
+                <a16:creationId xmlns:a16="http://schemas.microsoft.com/office/drawing/2014/main" id="{39CC4F0A-04FE-466C-B6F0-6B2B5BA06B1B}"/>
+              </a:ext>
+            </a:extLst>
+          </p:cNvPr>
+          <p:cNvSpPr/>
+          <p:nvPr/>
+        </p:nvSpPr>
+        <p:spPr>
+          <a:xfrm rot="14969901">
+            <a:off x="6858001" y="814298"/>
+            <a:ext cx="574158" cy="859408"/>
+          </a:xfrm>
+          <a:prstGeom prst="downArrow">
+            <a:avLst/>
+          </a:prstGeom>
+          <a:solidFill>
+            <a:schemeClr val="accent2"/>
+          </a:solidFill>
+          <a:ln>
+            <a:solidFill>
+              <a:schemeClr val="accent2"/>
+            </a:solidFill>
+          </a:ln>
+        </p:spPr>
+        <p:style>
+          <a:lnRef idx="2">
+            <a:schemeClr val="accent1">
+              <a:shade val="50000"/>
+            </a:schemeClr>
+          </a:lnRef>
+          <a:fillRef idx="1">
+            <a:schemeClr val="accent1"/>
+          </a:fillRef>
+          <a:effectRef idx="0">
+            <a:schemeClr val="accent1"/>
+          </a:effectRef>
+          <a:fontRef idx="minor">
+            <a:schemeClr val="lt1"/>
+          </a:fontRef>
+        </p:style>
+        <p:txBody>
+          <a:bodyPr rtlCol="0" anchor="ctr"/>
+          <a:lstStyle/>
+          <a:p>
+            <a:pPr algn="ctr"/>
+            <a:endParaRPr lang="en-US"/>
+          </a:p>
+        </p:txBody>
+      </p:sp>
+      <p:pic>
+        <p:nvPicPr>
+          <p:cNvPr id="10" name="Picture 9">
+            <a:extLst>
+              <a:ext uri="{FF2B5EF4-FFF2-40B4-BE49-F238E27FC236}">
+                <a16:creationId xmlns:a16="http://schemas.microsoft.com/office/drawing/2014/main" id="{AC554496-8049-44FA-96FE-43095F05C326}"/>
+              </a:ext>
+            </a:extLst>
+          </p:cNvPr>
+          <p:cNvPicPr>
+            <a:picLocks noChangeAspect="1"/>
+          </p:cNvPicPr>
+          <p:nvPr/>
+        </p:nvPicPr>
+        <p:blipFill>
+          <a:blip r:embed="rId4"/>
+          <a:stretch>
+            <a:fillRect/>
+          </a:stretch>
+        </p:blipFill>
+        <p:spPr>
+          <a:xfrm>
+            <a:off x="3950375" y="341913"/>
+            <a:ext cx="4121128" cy="6174171"/>
+          </a:xfrm>
+          <a:prstGeom prst="rect">
+            <a:avLst/>
+          </a:prstGeom>
+        </p:spPr>
+      </p:pic>
+    </p:spTree>
+    <p:extLst>
+      <p:ext uri="{BB962C8B-B14F-4D97-AF65-F5344CB8AC3E}">
+        <p14:creationId xmlns:p14="http://schemas.microsoft.com/office/powerpoint/2010/main" val="1539474575"/>
+      </p:ext>
+    </p:extLst>
+  </p:cSld>
+  <p:clrMapOvr>
+    <a:masterClrMapping/>
+  </p:clrMapOvr>
+  <p:timing>
+    <p:tnLst>
+      <p:par>
+        <p:cTn id="1" dur="indefinite" restart="never" nodeType="tmRoot">
+          <p:childTnLst>
+            <p:seq concurrent="1" nextAc="seek">
+              <p:cTn id="2" dur="indefinite" nodeType="mainSeq">
+                <p:childTnLst>
+                  <p:par>
+                    <p:cTn id="3" fill="hold">
+                      <p:stCondLst>
+                        <p:cond delay="indefinite"/>
+                      </p:stCondLst>
+                      <p:childTnLst>
+                        <p:par>
+                          <p:cTn id="4" fill="hold">
+                            <p:stCondLst>
+                              <p:cond delay="0"/>
+                            </p:stCondLst>
+                            <p:childTnLst>
+                              <p:par>
+                                <p:cTn id="5" presetID="1" presetClass="entr" presetSubtype="0" fill="hold" grpId="0" nodeType="clickEffect">
+                                  <p:stCondLst>
+                                    <p:cond delay="0"/>
+                                  </p:stCondLst>
+                                  <p:childTnLst>
+                                    <p:set>
+                                      <p:cBhvr>
+                                        <p:cTn id="6" dur="1" fill="hold">
+                                          <p:stCondLst>
+                                            <p:cond delay="0"/>
+                                          </p:stCondLst>
+                                        </p:cTn>
+                                        <p:tgtEl>
+                                          <p:spTgt spid="9"/>
+                                        </p:tgtEl>
+                                        <p:attrNameLst>
+                                          <p:attrName>style.visibility</p:attrName>
+                                        </p:attrNameLst>
+                                      </p:cBhvr>
+                                      <p:to>
+                                        <p:strVal val="visible"/>
+                                      </p:to>
+                                    </p:set>
+                                  </p:childTnLst>
+                                </p:cTn>
+                              </p:par>
+                              <p:par>
+                                <p:cTn id="7" presetID="1" presetClass="entr" presetSubtype="0" fill="hold" nodeType="withEffect">
+                                  <p:stCondLst>
+                                    <p:cond delay="0"/>
+                                  </p:stCondLst>
+                                  <p:childTnLst>
+                                    <p:set>
+                                      <p:cBhvr>
+                                        <p:cTn id="8" dur="1" fill="hold">
+                                          <p:stCondLst>
+                                            <p:cond delay="0"/>
+                                          </p:stCondLst>
+                                        </p:cTn>
+                                        <p:tgtEl>
+                                          <p:spTgt spid="8"/>
+                                        </p:tgtEl>
+                                        <p:attrNameLst>
+                                          <p:attrName>style.visibility</p:attrName>
+                                        </p:attrNameLst>
+                                      </p:cBhvr>
+                                      <p:to>
+                                        <p:strVal val="visible"/>
+                                      </p:to>
+                                    </p:set>
+                                  </p:childTnLst>
+                                </p:cTn>
+                              </p:par>
+                            </p:childTnLst>
+                          </p:cTn>
+                        </p:par>
+                      </p:childTnLst>
+                    </p:cTn>
+                  </p:par>
+                  <p:par>
+                    <p:cTn id="9" fill="hold">
+                      <p:stCondLst>
+                        <p:cond delay="indefinite"/>
+                      </p:stCondLst>
+                      <p:childTnLst>
+                        <p:par>
+                          <p:cTn id="10" fill="hold">
+                            <p:stCondLst>
+                              <p:cond delay="0"/>
+                            </p:stCondLst>
+                            <p:childTnLst>
+                              <p:par>
+                                <p:cTn id="11" presetID="1" presetClass="entr" presetSubtype="0" fill="hold" nodeType="clickEffect">
+                                  <p:stCondLst>
+                                    <p:cond delay="0"/>
+                                  </p:stCondLst>
+                                  <p:childTnLst>
+                                    <p:set>
+                                      <p:cBhvr>
+                                        <p:cTn id="12" dur="1" fill="hold">
+                                          <p:stCondLst>
+                                            <p:cond delay="0"/>
+                                          </p:stCondLst>
+                                        </p:cTn>
+                                        <p:tgtEl>
+                                          <p:spTgt spid="10"/>
+                                        </p:tgtEl>
+                                        <p:attrNameLst>
+                                          <p:attrName>style.visibility</p:attrName>
+                                        </p:attrNameLst>
+                                      </p:cBhvr>
+                                      <p:to>
+                                        <p:strVal val="visible"/>
+                                      </p:to>
+                                    </p:set>
+                                  </p:childTnLst>
+                                </p:cTn>
+                              </p:par>
+                              <p:par>
+                                <p:cTn id="13" presetID="1" presetClass="exit" presetSubtype="0" fill="hold" grpId="1" nodeType="withEffect">
+                                  <p:stCondLst>
+                                    <p:cond delay="0"/>
+                                  </p:stCondLst>
+                                  <p:childTnLst>
+                                    <p:set>
+                                      <p:cBhvr>
+                                        <p:cTn id="14" dur="1" fill="hold">
+                                          <p:stCondLst>
+                                            <p:cond delay="0"/>
+                                          </p:stCondLst>
+                                        </p:cTn>
+                                        <p:tgtEl>
+                                          <p:spTgt spid="9"/>
+                                        </p:tgtEl>
+                                        <p:attrNameLst>
+                                          <p:attrName>style.visibility</p:attrName>
+                                        </p:attrNameLst>
+                                      </p:cBhvr>
+                                      <p:to>
+                                        <p:strVal val="hidden"/>
+                                      </p:to>
+                                    </p:set>
+                                  </p:childTnLst>
+                                </p:cTn>
+                              </p:par>
+                              <p:par>
+                                <p:cTn id="15" presetID="1" presetClass="exit" presetSubtype="0" fill="hold" nodeType="withEffect">
+                                  <p:stCondLst>
+                                    <p:cond delay="0"/>
+                                  </p:stCondLst>
+                                  <p:childTnLst>
+                                    <p:set>
+                                      <p:cBhvr>
+                                        <p:cTn id="16" dur="1" fill="hold">
+                                          <p:stCondLst>
+                                            <p:cond delay="0"/>
+                                          </p:stCondLst>
+                                        </p:cTn>
+                                        <p:tgtEl>
+                                          <p:spTgt spid="8"/>
+                                        </p:tgtEl>
+                                        <p:attrNameLst>
+                                          <p:attrName>style.visibility</p:attrName>
+                                        </p:attrNameLst>
+                                      </p:cBhvr>
+                                      <p:to>
+                                        <p:strVal val="hidden"/>
+                                      </p:to>
+                                    </p:set>
+                                  </p:childTnLst>
+                                </p:cTn>
+                              </p:par>
+                              <p:par>
+                                <p:cTn id="17" presetID="1" presetClass="exit" presetSubtype="0" fill="hold" nodeType="withEffect">
+                                  <p:stCondLst>
+                                    <p:cond delay="0"/>
+                                  </p:stCondLst>
+                                  <p:childTnLst>
+                                    <p:set>
+                                      <p:cBhvr>
+                                        <p:cTn id="18" dur="1" fill="hold">
+                                          <p:stCondLst>
+                                            <p:cond delay="0"/>
+                                          </p:stCondLst>
+                                        </p:cTn>
+                                        <p:tgtEl>
+                                          <p:spTgt spid="5"/>
+                                        </p:tgtEl>
+                                        <p:attrNameLst>
+                                          <p:attrName>style.visibility</p:attrName>
+                                        </p:attrNameLst>
+                                      </p:cBhvr>
+                                      <p:to>
+                                        <p:strVal val="hidden"/>
+                                      </p:to>
+                                    </p:set>
+                                  </p:childTnLst>
+                                </p:cTn>
+                              </p:par>
+                            </p:childTnLst>
+                          </p:cTn>
+                        </p:par>
+                      </p:childTnLst>
+                    </p:cTn>
+                  </p:par>
+                </p:childTnLst>
+              </p:cTn>
+              <p:prevCondLst>
+                <p:cond evt="onPrev" delay="0">
+                  <p:tgtEl>
+                    <p:sldTgt/>
+                  </p:tgtEl>
+                </p:cond>
+              </p:prevCondLst>
+              <p:nextCondLst>
+                <p:cond evt="onNext" delay="0">
+                  <p:tgtEl>
+                    <p:sldTgt/>
+                  </p:tgtEl>
+                </p:cond>
+              </p:nextCondLst>
+            </p:seq>
+          </p:childTnLst>
+        </p:cTn>
+      </p:par>
+    </p:tnLst>
+    <p:bldLst>
+      <p:bldP spid="9" grpId="0" animBg="1"/>
+      <p:bldP spid="9" grpId="1" animBg="1"/>
+    </p:bldLst>
+  </p:timing>
+</p:sld>
+</file>
+
+<file path=ppt/slides/slide22.xml><?xml version="1.0" encoding="utf-8"?>
+<p:sld xmlns:a="http://schemas.openxmlformats.org/drawingml/2006/main" xmlns:r="http://schemas.openxmlformats.org/officeDocument/2006/relationships" xmlns:p="http://schemas.openxmlformats.org/presentationml/2006/main">
+  <p:cSld>
+    <p:spTree>
+      <p:nvGrpSpPr>
+        <p:cNvPr id="1" name=""/>
+        <p:cNvGrpSpPr/>
+        <p:nvPr/>
+      </p:nvGrpSpPr>
+      <p:grpSpPr>
+        <a:xfrm>
+          <a:off x="0" y="0"/>
+          <a:ext cx="0" cy="0"/>
+          <a:chOff x="0" y="0"/>
+          <a:chExt cx="0" cy="0"/>
+        </a:xfrm>
+      </p:grpSpPr>
+      <p:sp>
+        <p:nvSpPr>
+          <p:cNvPr id="2" name="Title 1">
+            <a:extLst>
+              <a:ext uri="{FF2B5EF4-FFF2-40B4-BE49-F238E27FC236}">
+                <a16:creationId xmlns:a16="http://schemas.microsoft.com/office/drawing/2014/main" id="{CE5E301C-4E6B-40FF-A659-3752214D12F1}"/>
+              </a:ext>
+            </a:extLst>
+          </p:cNvPr>
+          <p:cNvSpPr>
+            <a:spLocks noGrp="1"/>
+          </p:cNvSpPr>
+          <p:nvPr>
+            <p:ph type="title"/>
+          </p:nvPr>
+        </p:nvSpPr>
+        <p:spPr/>
+        <p:txBody>
+          <a:bodyPr/>
+          <a:lstStyle/>
+          <a:p>
+            <a:r>
+              <a:rPr lang="en-US" dirty="0"/>
+              <a:t>Create a YAML for </a:t>
+            </a:r>
+            <a:r>
+              <a:rPr lang="en-US" dirty="0" err="1"/>
+              <a:t>Codecov</a:t>
+            </a:r>
+            <a:endParaRPr lang="en-US" dirty="0"/>
+          </a:p>
+        </p:txBody>
+      </p:sp>
+      <p:sp>
+        <p:nvSpPr>
+          <p:cNvPr id="3" name="Content Placeholder 2">
+            <a:extLst>
+              <a:ext uri="{FF2B5EF4-FFF2-40B4-BE49-F238E27FC236}">
+                <a16:creationId xmlns:a16="http://schemas.microsoft.com/office/drawing/2014/main" id="{94B64657-41CA-4186-848D-91ED3D29A457}"/>
+              </a:ext>
+            </a:extLst>
+          </p:cNvPr>
+          <p:cNvSpPr>
+            <a:spLocks noGrp="1"/>
+          </p:cNvSpPr>
+          <p:nvPr>
+            <p:ph idx="1"/>
+          </p:nvPr>
+        </p:nvSpPr>
+        <p:spPr/>
+        <p:txBody>
+          <a:bodyPr/>
+          <a:lstStyle/>
+          <a:p>
+            <a:endParaRPr lang="en-US"/>
+          </a:p>
+        </p:txBody>
+      </p:sp>
+    </p:spTree>
+    <p:extLst>
+      <p:ext uri="{BB962C8B-B14F-4D97-AF65-F5344CB8AC3E}">
+        <p14:creationId xmlns:p14="http://schemas.microsoft.com/office/powerpoint/2010/main" val="3260222621"/>
+      </p:ext>
+    </p:extLst>
+  </p:cSld>
+  <p:clrMapOvr>
+    <a:masterClrMapping/>
+  </p:clrMapOvr>
+</p:sld>
+</file>
+
+<file path=ppt/slides/slide23.xml><?xml version="1.0" encoding="utf-8"?>
+<p:sld xmlns:a="http://schemas.openxmlformats.org/drawingml/2006/main" xmlns:r="http://schemas.openxmlformats.org/officeDocument/2006/relationships" xmlns:p="http://schemas.openxmlformats.org/presentationml/2006/main">
+  <p:cSld>
+    <p:spTree>
+      <p:nvGrpSpPr>
+        <p:cNvPr id="1" name=""/>
+        <p:cNvGrpSpPr/>
+        <p:nvPr/>
+      </p:nvGrpSpPr>
+      <p:grpSpPr>
+        <a:xfrm>
+          <a:off x="0" y="0"/>
+          <a:ext cx="0" cy="0"/>
+          <a:chOff x="0" y="0"/>
+          <a:chExt cx="0" cy="0"/>
+        </a:xfrm>
+      </p:grpSpPr>
+      <p:sp>
+        <p:nvSpPr>
+          <p:cNvPr id="2" name="Title 1">
+            <a:extLst>
+              <a:ext uri="{FF2B5EF4-FFF2-40B4-BE49-F238E27FC236}">
+                <a16:creationId xmlns:a16="http://schemas.microsoft.com/office/drawing/2014/main" id="{DEDF95E6-31A7-4A4D-B81B-67A931C484D1}"/>
+              </a:ext>
+            </a:extLst>
+          </p:cNvPr>
+          <p:cNvSpPr>
+            <a:spLocks noGrp="1"/>
+          </p:cNvSpPr>
+          <p:nvPr>
+            <p:ph type="title"/>
+          </p:nvPr>
+        </p:nvSpPr>
+        <p:spPr/>
+        <p:txBody>
+          <a:bodyPr/>
+          <a:lstStyle/>
+          <a:p>
+            <a:r>
+              <a:rPr lang="en-US" dirty="0"/>
+              <a:t>Links and credits</a:t>
+            </a:r>
+          </a:p>
+        </p:txBody>
+      </p:sp>
+      <p:sp>
+        <p:nvSpPr>
+          <p:cNvPr id="3" name="Content Placeholder 2">
+            <a:extLst>
+              <a:ext uri="{FF2B5EF4-FFF2-40B4-BE49-F238E27FC236}">
+                <a16:creationId xmlns:a16="http://schemas.microsoft.com/office/drawing/2014/main" id="{854FB79B-E0E0-4106-9101-482D7D707EAC}"/>
+              </a:ext>
+            </a:extLst>
+          </p:cNvPr>
+          <p:cNvSpPr>
+            <a:spLocks noGrp="1"/>
+          </p:cNvSpPr>
+          <p:nvPr>
+            <p:ph idx="1"/>
+          </p:nvPr>
+        </p:nvSpPr>
+        <p:spPr/>
+        <p:txBody>
+          <a:bodyPr/>
+          <a:lstStyle/>
+          <a:p>
+            <a:r>
+              <a:rPr lang="en-US" dirty="0" err="1"/>
+              <a:t>Opencover</a:t>
+            </a:r>
+            <a:r>
+              <a:rPr lang="en-US" dirty="0"/>
+              <a:t>: https://github.com/opencover/opencover/wiki/Usage</a:t>
+            </a:r>
+          </a:p>
+        </p:txBody>
+      </p:sp>
+    </p:spTree>
+    <p:extLst>
+      <p:ext uri="{BB962C8B-B14F-4D97-AF65-F5344CB8AC3E}">
+        <p14:creationId xmlns:p14="http://schemas.microsoft.com/office/powerpoint/2010/main" val="3021987684"/>
       </p:ext>
     </p:extLst>
   </p:cSld>
@@ -15379,6 +18091,17 @@
           <a:p>
             <a:pPr algn="just"/>
             <a:r>
+              <a:rPr lang="en-US" dirty="0" err="1"/>
+              <a:t>NodeJs</a:t>
+            </a:r>
+            <a:r>
+              <a:rPr lang="en-US" dirty="0"/>
+              <a:t>: mostly for the build environment</a:t>
+            </a:r>
+          </a:p>
+          <a:p>
+            <a:pPr algn="just"/>
+            <a:r>
               <a:rPr lang="en-US" dirty="0"/>
               <a:t>Yarn (or NPM)</a:t>
             </a:r>
@@ -15390,8 +18113,45 @@
               <a:t>Dotnet core 2.1 (other version should work fine)</a:t>
             </a:r>
           </a:p>
+          <a:p>
+            <a:pPr algn="just"/>
+            <a:r>
+              <a:rPr lang="en-US" dirty="0"/>
+              <a:t>Chocolatey</a:t>
+            </a:r>
+          </a:p>
         </p:txBody>
       </p:sp>
+      <p:pic>
+        <p:nvPicPr>
+          <p:cNvPr id="4" name="Picture 3">
+            <a:extLst>
+              <a:ext uri="{FF2B5EF4-FFF2-40B4-BE49-F238E27FC236}">
+                <a16:creationId xmlns:a16="http://schemas.microsoft.com/office/drawing/2014/main" id="{69C5ED94-B7FC-49FE-A8F3-401D03ADC5BF}"/>
+              </a:ext>
+            </a:extLst>
+          </p:cNvPr>
+          <p:cNvPicPr>
+            <a:picLocks noChangeAspect="1"/>
+          </p:cNvPicPr>
+          <p:nvPr/>
+        </p:nvPicPr>
+        <p:blipFill>
+          <a:blip r:embed="rId2"/>
+          <a:stretch>
+            <a:fillRect/>
+          </a:stretch>
+        </p:blipFill>
+        <p:spPr>
+          <a:xfrm>
+            <a:off x="3661669" y="838503"/>
+            <a:ext cx="4865484" cy="5180994"/>
+          </a:xfrm>
+          <a:prstGeom prst="rect">
+            <a:avLst/>
+          </a:prstGeom>
+        </p:spPr>
+      </p:pic>
     </p:spTree>
     <p:extLst>
       <p:ext uri="{BB962C8B-B14F-4D97-AF65-F5344CB8AC3E}">
@@ -15402,6 +18162,81 @@
   <p:clrMapOvr>
     <a:masterClrMapping/>
   </p:clrMapOvr>
+  <p:timing>
+    <p:tnLst>
+      <p:par>
+        <p:cTn id="1" dur="indefinite" restart="never" nodeType="tmRoot">
+          <p:childTnLst>
+            <p:seq concurrent="1" nextAc="seek">
+              <p:cTn id="2" dur="indefinite" nodeType="mainSeq">
+                <p:childTnLst>
+                  <p:par>
+                    <p:cTn id="3" fill="hold">
+                      <p:stCondLst>
+                        <p:cond delay="indefinite"/>
+                      </p:stCondLst>
+                      <p:childTnLst>
+                        <p:par>
+                          <p:cTn id="4" fill="hold">
+                            <p:stCondLst>
+                              <p:cond delay="0"/>
+                            </p:stCondLst>
+                            <p:childTnLst>
+                              <p:par>
+                                <p:cTn id="5" presetID="1" presetClass="entr" presetSubtype="0" fill="hold" nodeType="clickEffect">
+                                  <p:stCondLst>
+                                    <p:cond delay="0"/>
+                                  </p:stCondLst>
+                                  <p:childTnLst>
+                                    <p:set>
+                                      <p:cBhvr>
+                                        <p:cTn id="6" dur="1" fill="hold">
+                                          <p:stCondLst>
+                                            <p:cond delay="0"/>
+                                          </p:stCondLst>
+                                        </p:cTn>
+                                        <p:tgtEl>
+                                          <p:spTgt spid="4"/>
+                                        </p:tgtEl>
+                                        <p:attrNameLst>
+                                          <p:attrName>style.visibility</p:attrName>
+                                        </p:attrNameLst>
+                                      </p:cBhvr>
+                                      <p:to>
+                                        <p:strVal val="visible"/>
+                                      </p:to>
+                                    </p:set>
+                                  </p:childTnLst>
+                                </p:cTn>
+                              </p:par>
+                            </p:childTnLst>
+                          </p:cTn>
+                        </p:par>
+                      </p:childTnLst>
+                    </p:cTn>
+                  </p:par>
+                </p:childTnLst>
+              </p:cTn>
+              <p:prevCondLst>
+                <p:cond evt="onPrev" delay="0">
+                  <p:tgtEl>
+                    <p:sldTgt/>
+                  </p:tgtEl>
+                </p:cond>
+              </p:prevCondLst>
+              <p:nextCondLst>
+                <p:cond evt="onNext" delay="0">
+                  <p:tgtEl>
+                    <p:sldTgt/>
+                  </p:tgtEl>
+                </p:cond>
+              </p:nextCondLst>
+            </p:seq>
+          </p:childTnLst>
+        </p:cTn>
+      </p:par>
+    </p:tnLst>
+  </p:timing>
 </p:sld>
 </file>
 

</xml_diff>

<commit_message>
Try push correct path in codecov
</commit_message>
<xml_diff>
--- a/Presentation/Full Open-Source CI.pptx
+++ b/Presentation/Full Open-Source CI.pptx
@@ -27,7 +27,9 @@
     <p:sldId id="279" r:id="rId21"/>
     <p:sldId id="277" r:id="rId22"/>
     <p:sldId id="278" r:id="rId23"/>
-    <p:sldId id="273" r:id="rId24"/>
+    <p:sldId id="280" r:id="rId24"/>
+    <p:sldId id="281" r:id="rId25"/>
+    <p:sldId id="273" r:id="rId26"/>
   </p:sldIdLst>
   <p:sldSz cx="12192000" cy="6858000"/>
   <p:notesSz cx="6858000" cy="9144000"/>
@@ -1060,7 +1062,7 @@
           <a:noFill/>
           <a:extLst>
             <a:ext uri="{909E8E84-426E-40dd-AFC4-6F175D3DCCD1}">
-              <a14:hiddenFill xmlns:a14="http://schemas.microsoft.com/office/drawing/2010/main" xmlns="">
+              <a14:hiddenFill xmlns="" xmlns:a14="http://schemas.microsoft.com/office/drawing/2010/main">
                 <a:solidFill>
                   <a:srgbClr val="FFFFFF"/>
                 </a:solidFill>
@@ -1120,7 +1122,7 @@
             </a:ln>
             <a:extLst>
               <a:ext uri="{91240B29-F687-4f45-9708-019B960494DF}">
-                <a14:hiddenLine xmlns:a14="http://schemas.microsoft.com/office/drawing/2010/main" xmlns="" w="9525">
+                <a14:hiddenLine xmlns="" xmlns:a14="http://schemas.microsoft.com/office/drawing/2010/main" w="9525">
                   <a:solidFill>
                     <a:srgbClr val="000000"/>
                   </a:solidFill>
@@ -1210,7 +1212,7 @@
             </a:ln>
             <a:extLst>
               <a:ext uri="{91240B29-F687-4f45-9708-019B960494DF}">
-                <a14:hiddenLine xmlns:a14="http://schemas.microsoft.com/office/drawing/2010/main" xmlns="" w="9525">
+                <a14:hiddenLine xmlns="" xmlns:a14="http://schemas.microsoft.com/office/drawing/2010/main" w="9525">
                   <a:solidFill>
                     <a:srgbClr val="000000"/>
                   </a:solidFill>
@@ -1300,7 +1302,7 @@
             </a:ln>
             <a:extLst>
               <a:ext uri="{91240B29-F687-4f45-9708-019B960494DF}">
-                <a14:hiddenLine xmlns:a14="http://schemas.microsoft.com/office/drawing/2010/main" xmlns="" w="9525">
+                <a14:hiddenLine xmlns="" xmlns:a14="http://schemas.microsoft.com/office/drawing/2010/main" w="9525">
                   <a:solidFill>
                     <a:srgbClr val="000000"/>
                   </a:solidFill>
@@ -1334,7 +1336,7 @@
             </a:ln>
             <a:extLst>
               <a:ext uri="{91240B29-F687-4f45-9708-019B960494DF}">
-                <a14:hiddenLine xmlns:a14="http://schemas.microsoft.com/office/drawing/2010/main" xmlns="" w="9525">
+                <a14:hiddenLine xmlns="" xmlns:a14="http://schemas.microsoft.com/office/drawing/2010/main" w="9525">
                   <a:solidFill>
                     <a:srgbClr val="000000"/>
                   </a:solidFill>
@@ -1424,7 +1426,7 @@
             </a:ln>
             <a:extLst>
               <a:ext uri="{91240B29-F687-4f45-9708-019B960494DF}">
-                <a14:hiddenLine xmlns:a14="http://schemas.microsoft.com/office/drawing/2010/main" xmlns="" w="9525">
+                <a14:hiddenLine xmlns="" xmlns:a14="http://schemas.microsoft.com/office/drawing/2010/main" w="9525">
                   <a:solidFill>
                     <a:srgbClr val="000000"/>
                   </a:solidFill>
@@ -1486,7 +1488,7 @@
             </a:ln>
             <a:extLst>
               <a:ext uri="{91240B29-F687-4f45-9708-019B960494DF}">
-                <a14:hiddenLine xmlns:a14="http://schemas.microsoft.com/office/drawing/2010/main" xmlns="" w="9525">
+                <a14:hiddenLine xmlns="" xmlns:a14="http://schemas.microsoft.com/office/drawing/2010/main" w="9525">
                   <a:solidFill>
                     <a:srgbClr val="000000"/>
                   </a:solidFill>
@@ -1548,7 +1550,7 @@
             </a:ln>
             <a:extLst>
               <a:ext uri="{91240B29-F687-4f45-9708-019B960494DF}">
-                <a14:hiddenLine xmlns:a14="http://schemas.microsoft.com/office/drawing/2010/main" xmlns="" w="9525">
+                <a14:hiddenLine xmlns="" xmlns:a14="http://schemas.microsoft.com/office/drawing/2010/main" w="9525">
                   <a:solidFill>
                     <a:srgbClr val="000000"/>
                   </a:solidFill>
@@ -1638,7 +1640,7 @@
             </a:ln>
             <a:extLst>
               <a:ext uri="{91240B29-F687-4f45-9708-019B960494DF}">
-                <a14:hiddenLine xmlns:a14="http://schemas.microsoft.com/office/drawing/2010/main" xmlns="" w="9525">
+                <a14:hiddenLine xmlns="" xmlns:a14="http://schemas.microsoft.com/office/drawing/2010/main" w="9525">
                   <a:solidFill>
                     <a:srgbClr val="000000"/>
                   </a:solidFill>
@@ -1700,7 +1702,7 @@
             </a:ln>
             <a:extLst>
               <a:ext uri="{91240B29-F687-4f45-9708-019B960494DF}">
-                <a14:hiddenLine xmlns:a14="http://schemas.microsoft.com/office/drawing/2010/main" xmlns="" w="9525">
+                <a14:hiddenLine xmlns="" xmlns:a14="http://schemas.microsoft.com/office/drawing/2010/main" w="9525">
                   <a:solidFill>
                     <a:srgbClr val="000000"/>
                   </a:solidFill>
@@ -1762,7 +1764,7 @@
             </a:ln>
             <a:extLst>
               <a:ext uri="{91240B29-F687-4f45-9708-019B960494DF}">
-                <a14:hiddenLine xmlns:a14="http://schemas.microsoft.com/office/drawing/2010/main" xmlns="" w="9525">
+                <a14:hiddenLine xmlns="" xmlns:a14="http://schemas.microsoft.com/office/drawing/2010/main" w="9525">
                   <a:solidFill>
                     <a:srgbClr val="000000"/>
                   </a:solidFill>
@@ -1852,7 +1854,7 @@
             </a:ln>
             <a:extLst>
               <a:ext uri="{91240B29-F687-4f45-9708-019B960494DF}">
-                <a14:hiddenLine xmlns:a14="http://schemas.microsoft.com/office/drawing/2010/main" xmlns="" w="9525">
+                <a14:hiddenLine xmlns="" xmlns:a14="http://schemas.microsoft.com/office/drawing/2010/main" w="9525">
                   <a:solidFill>
                     <a:srgbClr val="000000"/>
                   </a:solidFill>
@@ -1942,7 +1944,7 @@
             </a:ln>
             <a:extLst>
               <a:ext uri="{91240B29-F687-4f45-9708-019B960494DF}">
-                <a14:hiddenLine xmlns:a14="http://schemas.microsoft.com/office/drawing/2010/main" xmlns="" w="9525">
+                <a14:hiddenLine xmlns="" xmlns:a14="http://schemas.microsoft.com/office/drawing/2010/main" w="9525">
                   <a:solidFill>
                     <a:srgbClr val="000000"/>
                   </a:solidFill>
@@ -2004,7 +2006,7 @@
             </a:ln>
             <a:extLst>
               <a:ext uri="{91240B29-F687-4f45-9708-019B960494DF}">
-                <a14:hiddenLine xmlns:a14="http://schemas.microsoft.com/office/drawing/2010/main" xmlns="" w="9525">
+                <a14:hiddenLine xmlns="" xmlns:a14="http://schemas.microsoft.com/office/drawing/2010/main" w="9525">
                   <a:solidFill>
                     <a:srgbClr val="000000"/>
                   </a:solidFill>
@@ -2114,7 +2116,7 @@
             </a:ln>
             <a:extLst>
               <a:ext uri="{91240B29-F687-4f45-9708-019B960494DF}">
-                <a14:hiddenLine xmlns:a14="http://schemas.microsoft.com/office/drawing/2010/main" xmlns="" w="9525">
+                <a14:hiddenLine xmlns="" xmlns:a14="http://schemas.microsoft.com/office/drawing/2010/main" w="9525">
                   <a:solidFill>
                     <a:srgbClr val="000000"/>
                   </a:solidFill>
@@ -2176,7 +2178,7 @@
             </a:ln>
             <a:extLst>
               <a:ext uri="{91240B29-F687-4f45-9708-019B960494DF}">
-                <a14:hiddenLine xmlns:a14="http://schemas.microsoft.com/office/drawing/2010/main" xmlns="" w="9525">
+                <a14:hiddenLine xmlns="" xmlns:a14="http://schemas.microsoft.com/office/drawing/2010/main" w="9525">
                   <a:solidFill>
                     <a:srgbClr val="000000"/>
                   </a:solidFill>
@@ -2266,7 +2268,7 @@
             </a:ln>
             <a:extLst>
               <a:ext uri="{91240B29-F687-4f45-9708-019B960494DF}">
-                <a14:hiddenLine xmlns:a14="http://schemas.microsoft.com/office/drawing/2010/main" xmlns="" w="9525">
+                <a14:hiddenLine xmlns="" xmlns:a14="http://schemas.microsoft.com/office/drawing/2010/main" w="9525">
                   <a:solidFill>
                     <a:srgbClr val="000000"/>
                   </a:solidFill>
@@ -2356,7 +2358,7 @@
             </a:ln>
             <a:extLst>
               <a:ext uri="{91240B29-F687-4f45-9708-019B960494DF}">
-                <a14:hiddenLine xmlns:a14="http://schemas.microsoft.com/office/drawing/2010/main" xmlns="" w="9525">
+                <a14:hiddenLine xmlns="" xmlns:a14="http://schemas.microsoft.com/office/drawing/2010/main" w="9525">
                   <a:solidFill>
                     <a:srgbClr val="000000"/>
                   </a:solidFill>
@@ -2418,7 +2420,7 @@
             </a:ln>
             <a:extLst>
               <a:ext uri="{91240B29-F687-4f45-9708-019B960494DF}">
-                <a14:hiddenLine xmlns:a14="http://schemas.microsoft.com/office/drawing/2010/main" xmlns="" w="9525">
+                <a14:hiddenLine xmlns="" xmlns:a14="http://schemas.microsoft.com/office/drawing/2010/main" w="9525">
                   <a:solidFill>
                     <a:srgbClr val="000000"/>
                   </a:solidFill>
@@ -2508,7 +2510,7 @@
             </a:ln>
             <a:extLst>
               <a:ext uri="{91240B29-F687-4f45-9708-019B960494DF}">
-                <a14:hiddenLine xmlns:a14="http://schemas.microsoft.com/office/drawing/2010/main" xmlns="" w="9525">
+                <a14:hiddenLine xmlns="" xmlns:a14="http://schemas.microsoft.com/office/drawing/2010/main" w="9525">
                   <a:solidFill>
                     <a:srgbClr val="000000"/>
                   </a:solidFill>
@@ -2598,7 +2600,7 @@
             </a:ln>
             <a:extLst>
               <a:ext uri="{91240B29-F687-4f45-9708-019B960494DF}">
-                <a14:hiddenLine xmlns:a14="http://schemas.microsoft.com/office/drawing/2010/main" xmlns="" w="9525">
+                <a14:hiddenLine xmlns="" xmlns:a14="http://schemas.microsoft.com/office/drawing/2010/main" w="9525">
                   <a:solidFill>
                     <a:srgbClr val="000000"/>
                   </a:solidFill>
@@ -2654,7 +2656,7 @@
             </a:ln>
             <a:extLst>
               <a:ext uri="{91240B29-F687-4f45-9708-019B960494DF}">
-                <a14:hiddenLine xmlns:a14="http://schemas.microsoft.com/office/drawing/2010/main" xmlns="" w="9525">
+                <a14:hiddenLine xmlns="" xmlns:a14="http://schemas.microsoft.com/office/drawing/2010/main" w="9525">
                   <a:solidFill>
                     <a:srgbClr val="000000"/>
                   </a:solidFill>
@@ -2744,7 +2746,7 @@
             </a:ln>
             <a:extLst>
               <a:ext uri="{91240B29-F687-4f45-9708-019B960494DF}">
-                <a14:hiddenLine xmlns:a14="http://schemas.microsoft.com/office/drawing/2010/main" xmlns="" w="9525">
+                <a14:hiddenLine xmlns="" xmlns:a14="http://schemas.microsoft.com/office/drawing/2010/main" w="9525">
                   <a:solidFill>
                     <a:srgbClr val="000000"/>
                   </a:solidFill>
@@ -2800,7 +2802,7 @@
             </a:ln>
             <a:extLst>
               <a:ext uri="{91240B29-F687-4f45-9708-019B960494DF}">
-                <a14:hiddenLine xmlns:a14="http://schemas.microsoft.com/office/drawing/2010/main" xmlns="" w="9525">
+                <a14:hiddenLine xmlns="" xmlns:a14="http://schemas.microsoft.com/office/drawing/2010/main" w="9525">
                   <a:solidFill>
                     <a:srgbClr val="000000"/>
                   </a:solidFill>
@@ -2890,7 +2892,7 @@
             </a:ln>
             <a:extLst>
               <a:ext uri="{91240B29-F687-4f45-9708-019B960494DF}">
-                <a14:hiddenLine xmlns:a14="http://schemas.microsoft.com/office/drawing/2010/main" xmlns="" w="9525">
+                <a14:hiddenLine xmlns="" xmlns:a14="http://schemas.microsoft.com/office/drawing/2010/main" w="9525">
                   <a:solidFill>
                     <a:srgbClr val="000000"/>
                   </a:solidFill>
@@ -2958,7 +2960,7 @@
             </a:ln>
             <a:extLst>
               <a:ext uri="{91240B29-F687-4f45-9708-019B960494DF}">
-                <a14:hiddenLine xmlns:a14="http://schemas.microsoft.com/office/drawing/2010/main" xmlns="" w="9525">
+                <a14:hiddenLine xmlns="" xmlns:a14="http://schemas.microsoft.com/office/drawing/2010/main" w="9525">
                   <a:solidFill>
                     <a:srgbClr val="000000"/>
                   </a:solidFill>
@@ -3048,7 +3050,7 @@
             </a:ln>
             <a:extLst>
               <a:ext uri="{91240B29-F687-4f45-9708-019B960494DF}">
-                <a14:hiddenLine xmlns:a14="http://schemas.microsoft.com/office/drawing/2010/main" xmlns="" w="9525">
+                <a14:hiddenLine xmlns="" xmlns:a14="http://schemas.microsoft.com/office/drawing/2010/main" w="9525">
                   <a:solidFill>
                     <a:srgbClr val="000000"/>
                   </a:solidFill>
@@ -3116,7 +3118,7 @@
             </a:ln>
             <a:extLst>
               <a:ext uri="{91240B29-F687-4f45-9708-019B960494DF}">
-                <a14:hiddenLine xmlns:a14="http://schemas.microsoft.com/office/drawing/2010/main" xmlns="" w="9525">
+                <a14:hiddenLine xmlns="" xmlns:a14="http://schemas.microsoft.com/office/drawing/2010/main" w="9525">
                   <a:solidFill>
                     <a:srgbClr val="000000"/>
                   </a:solidFill>
@@ -3206,7 +3208,7 @@
             </a:ln>
             <a:extLst>
               <a:ext uri="{91240B29-F687-4f45-9708-019B960494DF}">
-                <a14:hiddenLine xmlns:a14="http://schemas.microsoft.com/office/drawing/2010/main" xmlns="" w="9525">
+                <a14:hiddenLine xmlns="" xmlns:a14="http://schemas.microsoft.com/office/drawing/2010/main" w="9525">
                   <a:solidFill>
                     <a:srgbClr val="000000"/>
                   </a:solidFill>
@@ -3240,7 +3242,7 @@
             </a:ln>
             <a:extLst>
               <a:ext uri="{91240B29-F687-4f45-9708-019B960494DF}">
-                <a14:hiddenLine xmlns:a14="http://schemas.microsoft.com/office/drawing/2010/main" xmlns="" w="9525">
+                <a14:hiddenLine xmlns="" xmlns:a14="http://schemas.microsoft.com/office/drawing/2010/main" w="9525">
                   <a:solidFill>
                     <a:srgbClr val="000000"/>
                   </a:solidFill>
@@ -3330,7 +3332,7 @@
             </a:ln>
             <a:extLst>
               <a:ext uri="{91240B29-F687-4f45-9708-019B960494DF}">
-                <a14:hiddenLine xmlns:a14="http://schemas.microsoft.com/office/drawing/2010/main" xmlns="" w="9525">
+                <a14:hiddenLine xmlns="" xmlns:a14="http://schemas.microsoft.com/office/drawing/2010/main" w="9525">
                   <a:solidFill>
                     <a:srgbClr val="000000"/>
                   </a:solidFill>
@@ -3392,7 +3394,7 @@
             </a:ln>
             <a:extLst>
               <a:ext uri="{91240B29-F687-4f45-9708-019B960494DF}">
-                <a14:hiddenLine xmlns:a14="http://schemas.microsoft.com/office/drawing/2010/main" xmlns="" w="9525">
+                <a14:hiddenLine xmlns="" xmlns:a14="http://schemas.microsoft.com/office/drawing/2010/main" w="9525">
                   <a:solidFill>
                     <a:srgbClr val="000000"/>
                   </a:solidFill>
@@ -3454,7 +3456,7 @@
             </a:ln>
             <a:extLst>
               <a:ext uri="{91240B29-F687-4f45-9708-019B960494DF}">
-                <a14:hiddenLine xmlns:a14="http://schemas.microsoft.com/office/drawing/2010/main" xmlns="" w="9525">
+                <a14:hiddenLine xmlns="" xmlns:a14="http://schemas.microsoft.com/office/drawing/2010/main" w="9525">
                   <a:solidFill>
                     <a:srgbClr val="000000"/>
                   </a:solidFill>
@@ -3544,7 +3546,7 @@
             </a:ln>
             <a:extLst>
               <a:ext uri="{91240B29-F687-4f45-9708-019B960494DF}">
-                <a14:hiddenLine xmlns:a14="http://schemas.microsoft.com/office/drawing/2010/main" xmlns="" w="9525">
+                <a14:hiddenLine xmlns="" xmlns:a14="http://schemas.microsoft.com/office/drawing/2010/main" w="9525">
                   <a:solidFill>
                     <a:srgbClr val="000000"/>
                   </a:solidFill>
@@ -3612,7 +3614,7 @@
             </a:ln>
             <a:extLst>
               <a:ext uri="{91240B29-F687-4f45-9708-019B960494DF}">
-                <a14:hiddenLine xmlns:a14="http://schemas.microsoft.com/office/drawing/2010/main" xmlns="" w="9525">
+                <a14:hiddenLine xmlns="" xmlns:a14="http://schemas.microsoft.com/office/drawing/2010/main" w="9525">
                   <a:solidFill>
                     <a:srgbClr val="000000"/>
                   </a:solidFill>
@@ -3674,7 +3676,7 @@
             </a:ln>
             <a:extLst>
               <a:ext uri="{91240B29-F687-4f45-9708-019B960494DF}">
-                <a14:hiddenLine xmlns:a14="http://schemas.microsoft.com/office/drawing/2010/main" xmlns="" w="9525">
+                <a14:hiddenLine xmlns="" xmlns:a14="http://schemas.microsoft.com/office/drawing/2010/main" w="9525">
                   <a:solidFill>
                     <a:srgbClr val="000000"/>
                   </a:solidFill>
@@ -3764,7 +3766,7 @@
             </a:ln>
             <a:extLst>
               <a:ext uri="{91240B29-F687-4f45-9708-019B960494DF}">
-                <a14:hiddenLine xmlns:a14="http://schemas.microsoft.com/office/drawing/2010/main" xmlns="" w="9525">
+                <a14:hiddenLine xmlns="" xmlns:a14="http://schemas.microsoft.com/office/drawing/2010/main" w="9525">
                   <a:solidFill>
                     <a:srgbClr val="000000"/>
                   </a:solidFill>
@@ -3826,7 +3828,7 @@
             </a:ln>
             <a:extLst>
               <a:ext uri="{91240B29-F687-4f45-9708-019B960494DF}">
-                <a14:hiddenLine xmlns:a14="http://schemas.microsoft.com/office/drawing/2010/main" xmlns="" w="9525">
+                <a14:hiddenLine xmlns="" xmlns:a14="http://schemas.microsoft.com/office/drawing/2010/main" w="9525">
                   <a:solidFill>
                     <a:srgbClr val="000000"/>
                   </a:solidFill>
@@ -3916,7 +3918,7 @@
             </a:ln>
             <a:extLst>
               <a:ext uri="{91240B29-F687-4f45-9708-019B960494DF}">
-                <a14:hiddenLine xmlns:a14="http://schemas.microsoft.com/office/drawing/2010/main" xmlns="" w="9525">
+                <a14:hiddenLine xmlns="" xmlns:a14="http://schemas.microsoft.com/office/drawing/2010/main" w="9525">
                   <a:solidFill>
                     <a:srgbClr val="000000"/>
                   </a:solidFill>
@@ -3978,7 +3980,7 @@
             </a:ln>
             <a:extLst>
               <a:ext uri="{91240B29-F687-4f45-9708-019B960494DF}">
-                <a14:hiddenLine xmlns:a14="http://schemas.microsoft.com/office/drawing/2010/main" xmlns="" w="9525">
+                <a14:hiddenLine xmlns="" xmlns:a14="http://schemas.microsoft.com/office/drawing/2010/main" w="9525">
                   <a:solidFill>
                     <a:srgbClr val="000000"/>
                   </a:solidFill>
@@ -4068,7 +4070,7 @@
             </a:ln>
             <a:extLst>
               <a:ext uri="{91240B29-F687-4f45-9708-019B960494DF}">
-                <a14:hiddenLine xmlns:a14="http://schemas.microsoft.com/office/drawing/2010/main" xmlns="" w="9525">
+                <a14:hiddenLine xmlns="" xmlns:a14="http://schemas.microsoft.com/office/drawing/2010/main" w="9525">
                   <a:solidFill>
                     <a:srgbClr val="000000"/>
                   </a:solidFill>
@@ -4102,7 +4104,7 @@
             </a:ln>
             <a:extLst>
               <a:ext uri="{91240B29-F687-4f45-9708-019B960494DF}">
-                <a14:hiddenLine xmlns:a14="http://schemas.microsoft.com/office/drawing/2010/main" xmlns="" w="9525">
+                <a14:hiddenLine xmlns="" xmlns:a14="http://schemas.microsoft.com/office/drawing/2010/main" w="9525">
                   <a:solidFill>
                     <a:srgbClr val="000000"/>
                   </a:solidFill>
@@ -4167,7 +4169,7 @@
             </a:ln>
             <a:extLst>
               <a:ext uri="{91240B29-F687-4f45-9708-019B960494DF}">
-                <a14:hiddenLine xmlns:a14="http://schemas.microsoft.com/office/drawing/2010/main" xmlns="" w="9525">
+                <a14:hiddenLine xmlns="" xmlns:a14="http://schemas.microsoft.com/office/drawing/2010/main" w="9525">
                   <a:solidFill>
                     <a:srgbClr val="000000"/>
                   </a:solidFill>
@@ -4257,7 +4259,7 @@
             </a:ln>
             <a:extLst>
               <a:ext uri="{91240B29-F687-4f45-9708-019B960494DF}">
-                <a14:hiddenLine xmlns:a14="http://schemas.microsoft.com/office/drawing/2010/main" xmlns="" w="9525">
+                <a14:hiddenLine xmlns="" xmlns:a14="http://schemas.microsoft.com/office/drawing/2010/main" w="9525">
                   <a:solidFill>
                     <a:srgbClr val="000000"/>
                   </a:solidFill>
@@ -4319,7 +4321,7 @@
             </a:ln>
             <a:extLst>
               <a:ext uri="{91240B29-F687-4f45-9708-019B960494DF}">
-                <a14:hiddenLine xmlns:a14="http://schemas.microsoft.com/office/drawing/2010/main" xmlns="" w="9525">
+                <a14:hiddenLine xmlns="" xmlns:a14="http://schemas.microsoft.com/office/drawing/2010/main" w="9525">
                   <a:solidFill>
                     <a:srgbClr val="000000"/>
                   </a:solidFill>
@@ -4409,7 +4411,7 @@
             </a:ln>
             <a:extLst>
               <a:ext uri="{91240B29-F687-4f45-9708-019B960494DF}">
-                <a14:hiddenLine xmlns:a14="http://schemas.microsoft.com/office/drawing/2010/main" xmlns="" w="9525">
+                <a14:hiddenLine xmlns="" xmlns:a14="http://schemas.microsoft.com/office/drawing/2010/main" w="9525">
                   <a:solidFill>
                     <a:srgbClr val="000000"/>
                   </a:solidFill>
@@ -4499,7 +4501,7 @@
             </a:ln>
             <a:extLst>
               <a:ext uri="{91240B29-F687-4f45-9708-019B960494DF}">
-                <a14:hiddenLine xmlns:a14="http://schemas.microsoft.com/office/drawing/2010/main" xmlns="" w="9525">
+                <a14:hiddenLine xmlns="" xmlns:a14="http://schemas.microsoft.com/office/drawing/2010/main" w="9525">
                   <a:solidFill>
                     <a:srgbClr val="000000"/>
                   </a:solidFill>
@@ -4564,7 +4566,7 @@
             </a:ln>
             <a:extLst>
               <a:ext uri="{91240B29-F687-4f45-9708-019B960494DF}">
-                <a14:hiddenLine xmlns:a14="http://schemas.microsoft.com/office/drawing/2010/main" xmlns="" w="9525">
+                <a14:hiddenLine xmlns="" xmlns:a14="http://schemas.microsoft.com/office/drawing/2010/main" w="9525">
                   <a:solidFill>
                     <a:srgbClr val="000000"/>
                   </a:solidFill>
@@ -4626,7 +4628,7 @@
             </a:ln>
             <a:extLst>
               <a:ext uri="{91240B29-F687-4f45-9708-019B960494DF}">
-                <a14:hiddenLine xmlns:a14="http://schemas.microsoft.com/office/drawing/2010/main" xmlns="" w="9525">
+                <a14:hiddenLine xmlns="" xmlns:a14="http://schemas.microsoft.com/office/drawing/2010/main" w="9525">
                   <a:solidFill>
                     <a:srgbClr val="000000"/>
                   </a:solidFill>
@@ -4716,7 +4718,7 @@
             </a:ln>
             <a:extLst>
               <a:ext uri="{91240B29-F687-4f45-9708-019B960494DF}">
-                <a14:hiddenLine xmlns:a14="http://schemas.microsoft.com/office/drawing/2010/main" xmlns="" w="9525">
+                <a14:hiddenLine xmlns="" xmlns:a14="http://schemas.microsoft.com/office/drawing/2010/main" w="9525">
                   <a:solidFill>
                     <a:srgbClr val="000000"/>
                   </a:solidFill>
@@ -4806,7 +4808,7 @@
             </a:ln>
             <a:extLst>
               <a:ext uri="{91240B29-F687-4f45-9708-019B960494DF}">
-                <a14:hiddenLine xmlns:a14="http://schemas.microsoft.com/office/drawing/2010/main" xmlns="" w="9525">
+                <a14:hiddenLine xmlns="" xmlns:a14="http://schemas.microsoft.com/office/drawing/2010/main" w="9525">
                   <a:solidFill>
                     <a:srgbClr val="000000"/>
                   </a:solidFill>
@@ -4868,7 +4870,7 @@
             </a:ln>
             <a:extLst>
               <a:ext uri="{91240B29-F687-4f45-9708-019B960494DF}">
-                <a14:hiddenLine xmlns:a14="http://schemas.microsoft.com/office/drawing/2010/main" xmlns="" w="9525">
+                <a14:hiddenLine xmlns="" xmlns:a14="http://schemas.microsoft.com/office/drawing/2010/main" w="9525">
                   <a:solidFill>
                     <a:srgbClr val="000000"/>
                   </a:solidFill>
@@ -4988,7 +4990,7 @@
             </a:ln>
             <a:extLst>
               <a:ext uri="{91240B29-F687-4f45-9708-019B960494DF}">
-                <a14:hiddenLine xmlns:a14="http://schemas.microsoft.com/office/drawing/2010/main" xmlns="" w="9525">
+                <a14:hiddenLine xmlns="" xmlns:a14="http://schemas.microsoft.com/office/drawing/2010/main" w="9525">
                   <a:solidFill>
                     <a:srgbClr val="000000"/>
                   </a:solidFill>
@@ -5056,7 +5058,7 @@
             </a:ln>
             <a:extLst>
               <a:ext uri="{91240B29-F687-4f45-9708-019B960494DF}">
-                <a14:hiddenLine xmlns:a14="http://schemas.microsoft.com/office/drawing/2010/main" xmlns="" w="9525">
+                <a14:hiddenLine xmlns="" xmlns:a14="http://schemas.microsoft.com/office/drawing/2010/main" w="9525">
                   <a:solidFill>
                     <a:srgbClr val="000000"/>
                   </a:solidFill>
@@ -5146,7 +5148,7 @@
             </a:ln>
             <a:extLst>
               <a:ext uri="{91240B29-F687-4f45-9708-019B960494DF}">
-                <a14:hiddenLine xmlns:a14="http://schemas.microsoft.com/office/drawing/2010/main" xmlns="" w="9525">
+                <a14:hiddenLine xmlns="" xmlns:a14="http://schemas.microsoft.com/office/drawing/2010/main" w="9525">
                   <a:solidFill>
                     <a:srgbClr val="000000"/>
                   </a:solidFill>
@@ -9987,7 +9989,7 @@
           <a:noFill/>
           <a:extLst>
             <a:ext uri="{909E8E84-426E-40dd-AFC4-6F175D3DCCD1}">
-              <a14:hiddenFill xmlns:a14="http://schemas.microsoft.com/office/drawing/2010/main" xmlns="">
+              <a14:hiddenFill xmlns="" xmlns:a14="http://schemas.microsoft.com/office/drawing/2010/main">
                 <a:solidFill>
                   <a:srgbClr val="FFFFFF"/>
                 </a:solidFill>
@@ -10061,7 +10063,7 @@
               </a:ln>
               <a:extLst>
                 <a:ext uri="{91240B29-F687-4f45-9708-019B960494DF}">
-                  <a14:hiddenLine xmlns:a14="http://schemas.microsoft.com/office/drawing/2010/main" xmlns="" w="9525">
+                  <a14:hiddenLine xmlns="" xmlns:a14="http://schemas.microsoft.com/office/drawing/2010/main" w="9525">
                     <a:solidFill>
                       <a:srgbClr val="000000"/>
                     </a:solidFill>
@@ -10151,7 +10153,7 @@
               </a:ln>
               <a:extLst>
                 <a:ext uri="{91240B29-F687-4f45-9708-019B960494DF}">
-                  <a14:hiddenLine xmlns:a14="http://schemas.microsoft.com/office/drawing/2010/main" xmlns="" w="9525">
+                  <a14:hiddenLine xmlns="" xmlns:a14="http://schemas.microsoft.com/office/drawing/2010/main" w="9525">
                     <a:solidFill>
                       <a:srgbClr val="000000"/>
                     </a:solidFill>
@@ -10241,7 +10243,7 @@
               </a:ln>
               <a:extLst>
                 <a:ext uri="{91240B29-F687-4f45-9708-019B960494DF}">
-                  <a14:hiddenLine xmlns:a14="http://schemas.microsoft.com/office/drawing/2010/main" xmlns="" w="9525">
+                  <a14:hiddenLine xmlns="" xmlns:a14="http://schemas.microsoft.com/office/drawing/2010/main" w="9525">
                     <a:solidFill>
                       <a:srgbClr val="000000"/>
                     </a:solidFill>
@@ -10303,7 +10305,7 @@
               </a:ln>
               <a:extLst>
                 <a:ext uri="{91240B29-F687-4f45-9708-019B960494DF}">
-                  <a14:hiddenLine xmlns:a14="http://schemas.microsoft.com/office/drawing/2010/main" xmlns="" w="9525">
+                  <a14:hiddenLine xmlns="" xmlns:a14="http://schemas.microsoft.com/office/drawing/2010/main" w="9525">
                     <a:solidFill>
                       <a:srgbClr val="000000"/>
                     </a:solidFill>
@@ -10393,7 +10395,7 @@
               </a:ln>
               <a:extLst>
                 <a:ext uri="{91240B29-F687-4f45-9708-019B960494DF}">
-                  <a14:hiddenLine xmlns:a14="http://schemas.microsoft.com/office/drawing/2010/main" xmlns="" w="9525">
+                  <a14:hiddenLine xmlns="" xmlns:a14="http://schemas.microsoft.com/office/drawing/2010/main" w="9525">
                     <a:solidFill>
                       <a:srgbClr val="000000"/>
                     </a:solidFill>
@@ -10455,7 +10457,7 @@
               </a:ln>
               <a:extLst>
                 <a:ext uri="{91240B29-F687-4f45-9708-019B960494DF}">
-                  <a14:hiddenLine xmlns:a14="http://schemas.microsoft.com/office/drawing/2010/main" xmlns="" w="9525">
+                  <a14:hiddenLine xmlns="" xmlns:a14="http://schemas.microsoft.com/office/drawing/2010/main" w="9525">
                     <a:solidFill>
                       <a:srgbClr val="000000"/>
                     </a:solidFill>
@@ -10517,7 +10519,7 @@
               </a:ln>
               <a:extLst>
                 <a:ext uri="{91240B29-F687-4f45-9708-019B960494DF}">
-                  <a14:hiddenLine xmlns:a14="http://schemas.microsoft.com/office/drawing/2010/main" xmlns="" w="9525">
+                  <a14:hiddenLine xmlns="" xmlns:a14="http://schemas.microsoft.com/office/drawing/2010/main" w="9525">
                     <a:solidFill>
                       <a:srgbClr val="000000"/>
                     </a:solidFill>
@@ -10607,7 +10609,7 @@
               </a:ln>
               <a:extLst>
                 <a:ext uri="{91240B29-F687-4f45-9708-019B960494DF}">
-                  <a14:hiddenLine xmlns:a14="http://schemas.microsoft.com/office/drawing/2010/main" xmlns="" w="9525">
+                  <a14:hiddenLine xmlns="" xmlns:a14="http://schemas.microsoft.com/office/drawing/2010/main" w="9525">
                     <a:solidFill>
                       <a:srgbClr val="000000"/>
                     </a:solidFill>
@@ -10697,7 +10699,7 @@
               </a:ln>
               <a:extLst>
                 <a:ext uri="{91240B29-F687-4f45-9708-019B960494DF}">
-                  <a14:hiddenLine xmlns:a14="http://schemas.microsoft.com/office/drawing/2010/main" xmlns="" w="9525">
+                  <a14:hiddenLine xmlns="" xmlns:a14="http://schemas.microsoft.com/office/drawing/2010/main" w="9525">
                     <a:solidFill>
                       <a:srgbClr val="000000"/>
                     </a:solidFill>
@@ -10759,7 +10761,7 @@
               </a:ln>
               <a:extLst>
                 <a:ext uri="{91240B29-F687-4f45-9708-019B960494DF}">
-                  <a14:hiddenLine xmlns:a14="http://schemas.microsoft.com/office/drawing/2010/main" xmlns="" w="9525">
+                  <a14:hiddenLine xmlns="" xmlns:a14="http://schemas.microsoft.com/office/drawing/2010/main" w="9525">
                     <a:solidFill>
                       <a:srgbClr val="000000"/>
                     </a:solidFill>
@@ -10869,7 +10871,7 @@
               </a:ln>
               <a:extLst>
                 <a:ext uri="{91240B29-F687-4f45-9708-019B960494DF}">
-                  <a14:hiddenLine xmlns:a14="http://schemas.microsoft.com/office/drawing/2010/main" xmlns="" w="9525">
+                  <a14:hiddenLine xmlns="" xmlns:a14="http://schemas.microsoft.com/office/drawing/2010/main" w="9525">
                     <a:solidFill>
                       <a:srgbClr val="000000"/>
                     </a:solidFill>
@@ -10953,7 +10955,7 @@
               </a:ln>
               <a:extLst>
                 <a:ext uri="{91240B29-F687-4f45-9708-019B960494DF}">
-                  <a14:hiddenLine xmlns:a14="http://schemas.microsoft.com/office/drawing/2010/main" xmlns="" w="9525">
+                  <a14:hiddenLine xmlns="" xmlns:a14="http://schemas.microsoft.com/office/drawing/2010/main" w="9525">
                     <a:solidFill>
                       <a:srgbClr val="000000"/>
                     </a:solidFill>
@@ -11015,7 +11017,7 @@
               </a:ln>
               <a:extLst>
                 <a:ext uri="{91240B29-F687-4f45-9708-019B960494DF}">
-                  <a14:hiddenLine xmlns:a14="http://schemas.microsoft.com/office/drawing/2010/main" xmlns="" w="9525">
+                  <a14:hiddenLine xmlns="" xmlns:a14="http://schemas.microsoft.com/office/drawing/2010/main" w="9525">
                     <a:solidFill>
                       <a:srgbClr val="000000"/>
                     </a:solidFill>
@@ -11077,7 +11079,7 @@
               </a:ln>
               <a:extLst>
                 <a:ext uri="{91240B29-F687-4f45-9708-019B960494DF}">
-                  <a14:hiddenLine xmlns:a14="http://schemas.microsoft.com/office/drawing/2010/main" xmlns="" w="9525">
+                  <a14:hiddenLine xmlns="" xmlns:a14="http://schemas.microsoft.com/office/drawing/2010/main" w="9525">
                     <a:solidFill>
                       <a:srgbClr val="000000"/>
                     </a:solidFill>
@@ -11167,7 +11169,7 @@
               </a:ln>
               <a:extLst>
                 <a:ext uri="{91240B29-F687-4f45-9708-019B960494DF}">
-                  <a14:hiddenLine xmlns:a14="http://schemas.microsoft.com/office/drawing/2010/main" xmlns="" w="9525">
+                  <a14:hiddenLine xmlns="" xmlns:a14="http://schemas.microsoft.com/office/drawing/2010/main" w="9525">
                     <a:solidFill>
                       <a:srgbClr val="000000"/>
                     </a:solidFill>
@@ -11201,7 +11203,7 @@
               </a:ln>
               <a:extLst>
                 <a:ext uri="{91240B29-F687-4f45-9708-019B960494DF}">
-                  <a14:hiddenLine xmlns:a14="http://schemas.microsoft.com/office/drawing/2010/main" xmlns="" w="9525">
+                  <a14:hiddenLine xmlns="" xmlns:a14="http://schemas.microsoft.com/office/drawing/2010/main" w="9525">
                     <a:solidFill>
                       <a:srgbClr val="000000"/>
                     </a:solidFill>
@@ -11266,7 +11268,7 @@
               </a:ln>
               <a:extLst>
                 <a:ext uri="{91240B29-F687-4f45-9708-019B960494DF}">
-                  <a14:hiddenLine xmlns:a14="http://schemas.microsoft.com/office/drawing/2010/main" xmlns="" w="9525">
+                  <a14:hiddenLine xmlns="" xmlns:a14="http://schemas.microsoft.com/office/drawing/2010/main" w="9525">
                     <a:solidFill>
                       <a:srgbClr val="000000"/>
                     </a:solidFill>
@@ -11356,7 +11358,7 @@
               </a:ln>
               <a:extLst>
                 <a:ext uri="{91240B29-F687-4f45-9708-019B960494DF}">
-                  <a14:hiddenLine xmlns:a14="http://schemas.microsoft.com/office/drawing/2010/main" xmlns="" w="9525">
+                  <a14:hiddenLine xmlns="" xmlns:a14="http://schemas.microsoft.com/office/drawing/2010/main" w="9525">
                     <a:solidFill>
                       <a:srgbClr val="000000"/>
                     </a:solidFill>
@@ -11418,7 +11420,7 @@
               </a:ln>
               <a:extLst>
                 <a:ext uri="{91240B29-F687-4f45-9708-019B960494DF}">
-                  <a14:hiddenLine xmlns:a14="http://schemas.microsoft.com/office/drawing/2010/main" xmlns="" w="9525">
+                  <a14:hiddenLine xmlns="" xmlns:a14="http://schemas.microsoft.com/office/drawing/2010/main" w="9525">
                     <a:solidFill>
                       <a:srgbClr val="000000"/>
                     </a:solidFill>
@@ -11508,7 +11510,7 @@
               </a:ln>
               <a:extLst>
                 <a:ext uri="{91240B29-F687-4f45-9708-019B960494DF}">
-                  <a14:hiddenLine xmlns:a14="http://schemas.microsoft.com/office/drawing/2010/main" xmlns="" w="9525">
+                  <a14:hiddenLine xmlns="" xmlns:a14="http://schemas.microsoft.com/office/drawing/2010/main" w="9525">
                     <a:solidFill>
                       <a:srgbClr val="000000"/>
                     </a:solidFill>
@@ -11573,7 +11575,7 @@
               </a:ln>
               <a:extLst>
                 <a:ext uri="{91240B29-F687-4f45-9708-019B960494DF}">
-                  <a14:hiddenLine xmlns:a14="http://schemas.microsoft.com/office/drawing/2010/main" xmlns="" w="9525">
+                  <a14:hiddenLine xmlns="" xmlns:a14="http://schemas.microsoft.com/office/drawing/2010/main" w="9525">
                     <a:solidFill>
                       <a:srgbClr val="000000"/>
                     </a:solidFill>
@@ -11635,7 +11637,7 @@
               </a:ln>
               <a:extLst>
                 <a:ext uri="{91240B29-F687-4f45-9708-019B960494DF}">
-                  <a14:hiddenLine xmlns:a14="http://schemas.microsoft.com/office/drawing/2010/main" xmlns="" w="9525">
+                  <a14:hiddenLine xmlns="" xmlns:a14="http://schemas.microsoft.com/office/drawing/2010/main" w="9525">
                     <a:solidFill>
                       <a:srgbClr val="000000"/>
                     </a:solidFill>
@@ -11725,7 +11727,7 @@
               </a:ln>
               <a:extLst>
                 <a:ext uri="{91240B29-F687-4f45-9708-019B960494DF}">
-                  <a14:hiddenLine xmlns:a14="http://schemas.microsoft.com/office/drawing/2010/main" xmlns="" w="9525">
+                  <a14:hiddenLine xmlns="" xmlns:a14="http://schemas.microsoft.com/office/drawing/2010/main" w="9525">
                     <a:solidFill>
                       <a:srgbClr val="000000"/>
                     </a:solidFill>
@@ -11815,7 +11817,7 @@
               </a:ln>
               <a:extLst>
                 <a:ext uri="{91240B29-F687-4f45-9708-019B960494DF}">
-                  <a14:hiddenLine xmlns:a14="http://schemas.microsoft.com/office/drawing/2010/main" xmlns="" w="9525">
+                  <a14:hiddenLine xmlns="" xmlns:a14="http://schemas.microsoft.com/office/drawing/2010/main" w="9525">
                     <a:solidFill>
                       <a:srgbClr val="000000"/>
                     </a:solidFill>
@@ -11880,7 +11882,7 @@
               </a:ln>
               <a:extLst>
                 <a:ext uri="{91240B29-F687-4f45-9708-019B960494DF}">
-                  <a14:hiddenLine xmlns:a14="http://schemas.microsoft.com/office/drawing/2010/main" xmlns="" w="9525">
+                  <a14:hiddenLine xmlns="" xmlns:a14="http://schemas.microsoft.com/office/drawing/2010/main" w="9525">
                     <a:solidFill>
                       <a:srgbClr val="000000"/>
                     </a:solidFill>
@@ -12000,7 +12002,7 @@
               </a:ln>
               <a:extLst>
                 <a:ext uri="{91240B29-F687-4f45-9708-019B960494DF}">
-                  <a14:hiddenLine xmlns:a14="http://schemas.microsoft.com/office/drawing/2010/main" xmlns="" w="9525">
+                  <a14:hiddenLine xmlns="" xmlns:a14="http://schemas.microsoft.com/office/drawing/2010/main" w="9525">
                     <a:solidFill>
                       <a:srgbClr val="000000"/>
                     </a:solidFill>
@@ -12098,7 +12100,7 @@
               </a:ln>
               <a:extLst>
                 <a:ext uri="{91240B29-F687-4f45-9708-019B960494DF}">
-                  <a14:hiddenLine xmlns:a14="http://schemas.microsoft.com/office/drawing/2010/main" xmlns="" w="9525">
+                  <a14:hiddenLine xmlns="" xmlns:a14="http://schemas.microsoft.com/office/drawing/2010/main" w="9525">
                     <a:solidFill>
                       <a:srgbClr val="000000"/>
                     </a:solidFill>
@@ -12213,7 +12215,7 @@
               </a:ln>
               <a:extLst>
                 <a:ext uri="{91240B29-F687-4f45-9708-019B960494DF}">
-                  <a14:hiddenLine xmlns:a14="http://schemas.microsoft.com/office/drawing/2010/main" xmlns="" w="9525">
+                  <a14:hiddenLine xmlns="" xmlns:a14="http://schemas.microsoft.com/office/drawing/2010/main" w="9525">
                     <a:solidFill>
                       <a:srgbClr val="000000"/>
                     </a:solidFill>
@@ -12303,7 +12305,7 @@
               </a:ln>
               <a:extLst>
                 <a:ext uri="{91240B29-F687-4f45-9708-019B960494DF}">
-                  <a14:hiddenLine xmlns:a14="http://schemas.microsoft.com/office/drawing/2010/main" xmlns="" w="9525">
+                  <a14:hiddenLine xmlns="" xmlns:a14="http://schemas.microsoft.com/office/drawing/2010/main" w="9525">
                     <a:solidFill>
                       <a:srgbClr val="000000"/>
                     </a:solidFill>
@@ -12368,7 +12370,7 @@
               </a:ln>
               <a:extLst>
                 <a:ext uri="{91240B29-F687-4f45-9708-019B960494DF}">
-                  <a14:hiddenLine xmlns:a14="http://schemas.microsoft.com/office/drawing/2010/main" xmlns="" w="9525">
+                  <a14:hiddenLine xmlns="" xmlns:a14="http://schemas.microsoft.com/office/drawing/2010/main" w="9525">
                     <a:solidFill>
                       <a:srgbClr val="000000"/>
                     </a:solidFill>
@@ -12458,7 +12460,7 @@
               </a:ln>
               <a:extLst>
                 <a:ext uri="{91240B29-F687-4f45-9708-019B960494DF}">
-                  <a14:hiddenLine xmlns:a14="http://schemas.microsoft.com/office/drawing/2010/main" xmlns="" w="9525">
+                  <a14:hiddenLine xmlns="" xmlns:a14="http://schemas.microsoft.com/office/drawing/2010/main" w="9525">
                     <a:solidFill>
                       <a:srgbClr val="000000"/>
                     </a:solidFill>
@@ -12526,7 +12528,7 @@
               </a:ln>
               <a:extLst>
                 <a:ext uri="{91240B29-F687-4f45-9708-019B960494DF}">
-                  <a14:hiddenLine xmlns:a14="http://schemas.microsoft.com/office/drawing/2010/main" xmlns="" w="9525">
+                  <a14:hiddenLine xmlns="" xmlns:a14="http://schemas.microsoft.com/office/drawing/2010/main" w="9525">
                     <a:solidFill>
                       <a:srgbClr val="000000"/>
                     </a:solidFill>
@@ -12616,7 +12618,7 @@
               </a:ln>
               <a:extLst>
                 <a:ext uri="{91240B29-F687-4f45-9708-019B960494DF}">
-                  <a14:hiddenLine xmlns:a14="http://schemas.microsoft.com/office/drawing/2010/main" xmlns="" w="9525">
+                  <a14:hiddenLine xmlns="" xmlns:a14="http://schemas.microsoft.com/office/drawing/2010/main" w="9525">
                     <a:solidFill>
                       <a:srgbClr val="000000"/>
                     </a:solidFill>
@@ -12684,7 +12686,7 @@
               </a:ln>
               <a:extLst>
                 <a:ext uri="{91240B29-F687-4f45-9708-019B960494DF}">
-                  <a14:hiddenLine xmlns:a14="http://schemas.microsoft.com/office/drawing/2010/main" xmlns="" w="9525">
+                  <a14:hiddenLine xmlns="" xmlns:a14="http://schemas.microsoft.com/office/drawing/2010/main" w="9525">
                     <a:solidFill>
                       <a:srgbClr val="000000"/>
                     </a:solidFill>
@@ -12774,7 +12776,7 @@
               </a:ln>
               <a:extLst>
                 <a:ext uri="{91240B29-F687-4f45-9708-019B960494DF}">
-                  <a14:hiddenLine xmlns:a14="http://schemas.microsoft.com/office/drawing/2010/main" xmlns="" w="9525">
+                  <a14:hiddenLine xmlns="" xmlns:a14="http://schemas.microsoft.com/office/drawing/2010/main" w="9525">
                     <a:solidFill>
                       <a:srgbClr val="000000"/>
                     </a:solidFill>
@@ -12808,7 +12810,7 @@
               </a:ln>
               <a:extLst>
                 <a:ext uri="{91240B29-F687-4f45-9708-019B960494DF}">
-                  <a14:hiddenLine xmlns:a14="http://schemas.microsoft.com/office/drawing/2010/main" xmlns="" w="9525">
+                  <a14:hiddenLine xmlns="" xmlns:a14="http://schemas.microsoft.com/office/drawing/2010/main" w="9525">
                     <a:solidFill>
                       <a:srgbClr val="000000"/>
                     </a:solidFill>
@@ -17653,31 +17655,36 @@
           </a:p>
         </p:txBody>
       </p:sp>
-      <p:sp>
-        <p:nvSpPr>
-          <p:cNvPr id="3" name="Content Placeholder 2">
+      <p:pic>
+        <p:nvPicPr>
+          <p:cNvPr id="4" name="Picture 3">
             <a:extLst>
               <a:ext uri="{FF2B5EF4-FFF2-40B4-BE49-F238E27FC236}">
-                <a16:creationId xmlns:a16="http://schemas.microsoft.com/office/drawing/2014/main" id="{94B64657-41CA-4186-848D-91ED3D29A457}"/>
+                <a16:creationId xmlns:a16="http://schemas.microsoft.com/office/drawing/2014/main" id="{1F85DB48-8EA2-4CE6-A010-2FA994DE9B8A}"/>
               </a:ext>
             </a:extLst>
           </p:cNvPr>
-          <p:cNvSpPr>
-            <a:spLocks noGrp="1"/>
-          </p:cNvSpPr>
-          <p:nvPr>
-            <p:ph idx="1"/>
-          </p:nvPr>
-        </p:nvSpPr>
-        <p:spPr/>
-        <p:txBody>
-          <a:bodyPr/>
-          <a:lstStyle/>
-          <a:p>
-            <a:endParaRPr lang="en-US"/>
-          </a:p>
-        </p:txBody>
-      </p:sp>
+          <p:cNvPicPr>
+            <a:picLocks noChangeAspect="1"/>
+          </p:cNvPicPr>
+          <p:nvPr/>
+        </p:nvPicPr>
+        <p:blipFill>
+          <a:blip r:embed="rId2"/>
+          <a:stretch>
+            <a:fillRect/>
+          </a:stretch>
+        </p:blipFill>
+        <p:spPr>
+          <a:xfrm>
+            <a:off x="4061078" y="1641054"/>
+            <a:ext cx="4066667" cy="5085714"/>
+          </a:xfrm>
+          <a:prstGeom prst="rect">
+            <a:avLst/>
+          </a:prstGeom>
+        </p:spPr>
+      </p:pic>
     </p:spTree>
     <p:extLst>
       <p:ext uri="{BB962C8B-B14F-4D97-AF65-F5344CB8AC3E}">
@@ -17692,6 +17699,387 @@
 </file>
 
 <file path=ppt/slides/slide23.xml><?xml version="1.0" encoding="utf-8"?>
+<p:sld xmlns:a="http://schemas.openxmlformats.org/drawingml/2006/main" xmlns:r="http://schemas.openxmlformats.org/officeDocument/2006/relationships" xmlns:p="http://schemas.openxmlformats.org/presentationml/2006/main">
+  <p:cSld>
+    <p:spTree>
+      <p:nvGrpSpPr>
+        <p:cNvPr id="1" name=""/>
+        <p:cNvGrpSpPr/>
+        <p:nvPr/>
+      </p:nvGrpSpPr>
+      <p:grpSpPr>
+        <a:xfrm>
+          <a:off x="0" y="0"/>
+          <a:ext cx="0" cy="0"/>
+          <a:chOff x="0" y="0"/>
+          <a:chExt cx="0" cy="0"/>
+        </a:xfrm>
+      </p:grpSpPr>
+      <p:sp>
+        <p:nvSpPr>
+          <p:cNvPr id="2" name="Title 1">
+            <a:extLst>
+              <a:ext uri="{FF2B5EF4-FFF2-40B4-BE49-F238E27FC236}">
+                <a16:creationId xmlns:a16="http://schemas.microsoft.com/office/drawing/2014/main" id="{CE5E301C-4E6B-40FF-A659-3752214D12F1}"/>
+              </a:ext>
+            </a:extLst>
+          </p:cNvPr>
+          <p:cNvSpPr>
+            <a:spLocks noGrp="1"/>
+          </p:cNvSpPr>
+          <p:nvPr>
+            <p:ph type="title"/>
+          </p:nvPr>
+        </p:nvSpPr>
+        <p:spPr/>
+        <p:txBody>
+          <a:bodyPr/>
+          <a:lstStyle/>
+          <a:p>
+            <a:r>
+              <a:rPr lang="en-US" dirty="0"/>
+              <a:t>Run the </a:t>
+            </a:r>
+            <a:r>
+              <a:rPr lang="en-US" dirty="0" err="1"/>
+              <a:t>codecov</a:t>
+            </a:r>
+            <a:r>
+              <a:rPr lang="en-US" dirty="0"/>
+              <a:t> plugin</a:t>
+            </a:r>
+          </a:p>
+        </p:txBody>
+      </p:sp>
+      <p:sp>
+        <p:nvSpPr>
+          <p:cNvPr id="5" name="TextBox 4">
+            <a:extLst>
+              <a:ext uri="{FF2B5EF4-FFF2-40B4-BE49-F238E27FC236}">
+                <a16:creationId xmlns:a16="http://schemas.microsoft.com/office/drawing/2014/main" id="{65F98706-2C84-4540-90B5-C137A2A3EF65}"/>
+              </a:ext>
+            </a:extLst>
+          </p:cNvPr>
+          <p:cNvSpPr txBox="1"/>
+          <p:nvPr/>
+        </p:nvSpPr>
+        <p:spPr>
+          <a:xfrm>
+            <a:off x="3715513" y="4912242"/>
+            <a:ext cx="4540102" cy="1200329"/>
+          </a:xfrm>
+          <a:prstGeom prst="rect">
+            <a:avLst/>
+          </a:prstGeom>
+          <a:noFill/>
+        </p:spPr>
+        <p:txBody>
+          <a:bodyPr wrap="square" rtlCol="0">
+            <a:spAutoFit/>
+          </a:bodyPr>
+          <a:lstStyle/>
+          <a:p>
+            <a:r>
+              <a:rPr lang="en-US" dirty="0"/>
+              <a:t>After successful build and push to the PR, you will need to push to the master (or default) branch for </a:t>
+            </a:r>
+            <a:r>
+              <a:rPr lang="en-US" dirty="0" err="1"/>
+              <a:t>codecov</a:t>
+            </a:r>
+            <a:r>
+              <a:rPr lang="en-US" dirty="0"/>
+              <a:t> to be properly indexing things</a:t>
+            </a:r>
+          </a:p>
+        </p:txBody>
+      </p:sp>
+      <p:pic>
+        <p:nvPicPr>
+          <p:cNvPr id="3" name="Picture 2">
+            <a:extLst>
+              <a:ext uri="{FF2B5EF4-FFF2-40B4-BE49-F238E27FC236}">
+                <a16:creationId xmlns:a16="http://schemas.microsoft.com/office/drawing/2014/main" id="{E27623DD-57D5-46D0-8BD8-D0FE5AA15338}"/>
+              </a:ext>
+            </a:extLst>
+          </p:cNvPr>
+          <p:cNvPicPr>
+            <a:picLocks noChangeAspect="1"/>
+          </p:cNvPicPr>
+          <p:nvPr/>
+        </p:nvPicPr>
+        <p:blipFill>
+          <a:blip r:embed="rId2"/>
+          <a:stretch>
+            <a:fillRect/>
+          </a:stretch>
+        </p:blipFill>
+        <p:spPr>
+          <a:xfrm>
+            <a:off x="1141413" y="1990763"/>
+            <a:ext cx="9688303" cy="2432382"/>
+          </a:xfrm>
+          <a:prstGeom prst="rect">
+            <a:avLst/>
+          </a:prstGeom>
+        </p:spPr>
+      </p:pic>
+      <p:pic>
+        <p:nvPicPr>
+          <p:cNvPr id="6" name="Picture 5">
+            <a:extLst>
+              <a:ext uri="{FF2B5EF4-FFF2-40B4-BE49-F238E27FC236}">
+                <a16:creationId xmlns:a16="http://schemas.microsoft.com/office/drawing/2014/main" id="{50C97318-E135-4C4A-AA9F-E31E50A848ED}"/>
+              </a:ext>
+            </a:extLst>
+          </p:cNvPr>
+          <p:cNvPicPr>
+            <a:picLocks noChangeAspect="1"/>
+          </p:cNvPicPr>
+          <p:nvPr/>
+        </p:nvPicPr>
+        <p:blipFill>
+          <a:blip r:embed="rId3"/>
+          <a:stretch>
+            <a:fillRect/>
+          </a:stretch>
+        </p:blipFill>
+        <p:spPr>
+          <a:xfrm>
+            <a:off x="2229921" y="951417"/>
+            <a:ext cx="7728981" cy="4955166"/>
+          </a:xfrm>
+          <a:prstGeom prst="rect">
+            <a:avLst/>
+          </a:prstGeom>
+        </p:spPr>
+      </p:pic>
+    </p:spTree>
+    <p:extLst>
+      <p:ext uri="{BB962C8B-B14F-4D97-AF65-F5344CB8AC3E}">
+        <p14:creationId xmlns:p14="http://schemas.microsoft.com/office/powerpoint/2010/main" val="1922341333"/>
+      </p:ext>
+    </p:extLst>
+  </p:cSld>
+  <p:clrMapOvr>
+    <a:masterClrMapping/>
+  </p:clrMapOvr>
+  <p:timing>
+    <p:tnLst>
+      <p:par>
+        <p:cTn id="1" dur="indefinite" restart="never" nodeType="tmRoot">
+          <p:childTnLst>
+            <p:seq concurrent="1" nextAc="seek">
+              <p:cTn id="2" dur="indefinite" nodeType="mainSeq">
+                <p:childTnLst>
+                  <p:par>
+                    <p:cTn id="3" fill="hold">
+                      <p:stCondLst>
+                        <p:cond delay="indefinite"/>
+                      </p:stCondLst>
+                      <p:childTnLst>
+                        <p:par>
+                          <p:cTn id="4" fill="hold">
+                            <p:stCondLst>
+                              <p:cond delay="0"/>
+                            </p:stCondLst>
+                            <p:childTnLst>
+                              <p:par>
+                                <p:cTn id="5" presetID="1" presetClass="entr" presetSubtype="0" fill="hold" nodeType="clickEffect">
+                                  <p:stCondLst>
+                                    <p:cond delay="0"/>
+                                  </p:stCondLst>
+                                  <p:childTnLst>
+                                    <p:set>
+                                      <p:cBhvr>
+                                        <p:cTn id="6" dur="1" fill="hold">
+                                          <p:stCondLst>
+                                            <p:cond delay="0"/>
+                                          </p:stCondLst>
+                                        </p:cTn>
+                                        <p:tgtEl>
+                                          <p:spTgt spid="6"/>
+                                        </p:tgtEl>
+                                        <p:attrNameLst>
+                                          <p:attrName>style.visibility</p:attrName>
+                                        </p:attrNameLst>
+                                      </p:cBhvr>
+                                      <p:to>
+                                        <p:strVal val="visible"/>
+                                      </p:to>
+                                    </p:set>
+                                  </p:childTnLst>
+                                </p:cTn>
+                              </p:par>
+                            </p:childTnLst>
+                          </p:cTn>
+                        </p:par>
+                      </p:childTnLst>
+                    </p:cTn>
+                  </p:par>
+                  <p:par>
+                    <p:cTn id="7" fill="hold">
+                      <p:stCondLst>
+                        <p:cond delay="indefinite"/>
+                      </p:stCondLst>
+                      <p:childTnLst>
+                        <p:par>
+                          <p:cTn id="8" fill="hold">
+                            <p:stCondLst>
+                              <p:cond delay="0"/>
+                            </p:stCondLst>
+                            <p:childTnLst>
+                              <p:par>
+                                <p:cTn id="9" presetID="1" presetClass="exit" presetSubtype="0" fill="hold" nodeType="clickEffect">
+                                  <p:stCondLst>
+                                    <p:cond delay="0"/>
+                                  </p:stCondLst>
+                                  <p:childTnLst>
+                                    <p:set>
+                                      <p:cBhvr>
+                                        <p:cTn id="10" dur="1" fill="hold">
+                                          <p:stCondLst>
+                                            <p:cond delay="0"/>
+                                          </p:stCondLst>
+                                        </p:cTn>
+                                        <p:tgtEl>
+                                          <p:spTgt spid="6"/>
+                                        </p:tgtEl>
+                                        <p:attrNameLst>
+                                          <p:attrName>style.visibility</p:attrName>
+                                        </p:attrNameLst>
+                                      </p:cBhvr>
+                                      <p:to>
+                                        <p:strVal val="hidden"/>
+                                      </p:to>
+                                    </p:set>
+                                  </p:childTnLst>
+                                </p:cTn>
+                              </p:par>
+                            </p:childTnLst>
+                          </p:cTn>
+                        </p:par>
+                      </p:childTnLst>
+                    </p:cTn>
+                  </p:par>
+                </p:childTnLst>
+              </p:cTn>
+              <p:prevCondLst>
+                <p:cond evt="onPrev" delay="0">
+                  <p:tgtEl>
+                    <p:sldTgt/>
+                  </p:tgtEl>
+                </p:cond>
+              </p:prevCondLst>
+              <p:nextCondLst>
+                <p:cond evt="onNext" delay="0">
+                  <p:tgtEl>
+                    <p:sldTgt/>
+                  </p:tgtEl>
+                </p:cond>
+              </p:nextCondLst>
+            </p:seq>
+          </p:childTnLst>
+        </p:cTn>
+      </p:par>
+    </p:tnLst>
+  </p:timing>
+</p:sld>
+</file>
+
+<file path=ppt/slides/slide24.xml><?xml version="1.0" encoding="utf-8"?>
+<p:sld xmlns:a="http://schemas.openxmlformats.org/drawingml/2006/main" xmlns:r="http://schemas.openxmlformats.org/officeDocument/2006/relationships" xmlns:p="http://schemas.openxmlformats.org/presentationml/2006/main">
+  <p:cSld>
+    <p:spTree>
+      <p:nvGrpSpPr>
+        <p:cNvPr id="1" name=""/>
+        <p:cNvGrpSpPr/>
+        <p:nvPr/>
+      </p:nvGrpSpPr>
+      <p:grpSpPr>
+        <a:xfrm>
+          <a:off x="0" y="0"/>
+          <a:ext cx="0" cy="0"/>
+          <a:chOff x="0" y="0"/>
+          <a:chExt cx="0" cy="0"/>
+        </a:xfrm>
+      </p:grpSpPr>
+      <p:sp>
+        <p:nvSpPr>
+          <p:cNvPr id="2" name="Title 1">
+            <a:extLst>
+              <a:ext uri="{FF2B5EF4-FFF2-40B4-BE49-F238E27FC236}">
+                <a16:creationId xmlns:a16="http://schemas.microsoft.com/office/drawing/2014/main" id="{63B5A632-F62F-4B1C-9D81-42CA2214393D}"/>
+              </a:ext>
+            </a:extLst>
+          </p:cNvPr>
+          <p:cNvSpPr>
+            <a:spLocks noGrp="1"/>
+          </p:cNvSpPr>
+          <p:nvPr>
+            <p:ph type="title"/>
+          </p:nvPr>
+        </p:nvSpPr>
+        <p:spPr/>
+        <p:txBody>
+          <a:bodyPr/>
+          <a:lstStyle/>
+          <a:p>
+            <a:r>
+              <a:rPr lang="en-US" dirty="0" err="1"/>
+              <a:t>Codecov</a:t>
+            </a:r>
+            <a:r>
+              <a:rPr lang="en-US" dirty="0"/>
+              <a:t> dashboard</a:t>
+            </a:r>
+          </a:p>
+        </p:txBody>
+      </p:sp>
+      <p:pic>
+        <p:nvPicPr>
+          <p:cNvPr id="4" name="Picture 3">
+            <a:extLst>
+              <a:ext uri="{FF2B5EF4-FFF2-40B4-BE49-F238E27FC236}">
+                <a16:creationId xmlns:a16="http://schemas.microsoft.com/office/drawing/2014/main" id="{D7CBD207-39F2-4F3B-98CC-8EC8E13CCA6C}"/>
+              </a:ext>
+            </a:extLst>
+          </p:cNvPr>
+          <p:cNvPicPr>
+            <a:picLocks noChangeAspect="1"/>
+          </p:cNvPicPr>
+          <p:nvPr/>
+        </p:nvPicPr>
+        <p:blipFill>
+          <a:blip r:embed="rId2"/>
+          <a:stretch>
+            <a:fillRect/>
+          </a:stretch>
+        </p:blipFill>
+        <p:spPr>
+          <a:xfrm>
+            <a:off x="3440346" y="1648082"/>
+            <a:ext cx="5311307" cy="4933471"/>
+          </a:xfrm>
+          <a:prstGeom prst="rect">
+            <a:avLst/>
+          </a:prstGeom>
+        </p:spPr>
+      </p:pic>
+    </p:spTree>
+    <p:extLst>
+      <p:ext uri="{BB962C8B-B14F-4D97-AF65-F5344CB8AC3E}">
+        <p14:creationId xmlns:p14="http://schemas.microsoft.com/office/powerpoint/2010/main" val="1306724290"/>
+      </p:ext>
+    </p:extLst>
+  </p:cSld>
+  <p:clrMapOvr>
+    <a:masterClrMapping/>
+  </p:clrMapOvr>
+</p:sld>
+</file>
+
+<file path=ppt/slides/slide25.xml><?xml version="1.0" encoding="utf-8"?>
 <p:sld xmlns:a="http://schemas.openxmlformats.org/drawingml/2006/main" xmlns:r="http://schemas.openxmlformats.org/officeDocument/2006/relationships" xmlns:p="http://schemas.openxmlformats.org/presentationml/2006/main">
   <p:cSld>
     <p:spTree>

</xml_diff>

<commit_message>
Test first push to sonar
</commit_message>
<xml_diff>
--- a/Presentation/Full Open-Source CI.pptx
+++ b/Presentation/Full Open-Source CI.pptx
@@ -10,26 +10,31 @@
     <p:sldId id="258" r:id="rId4"/>
     <p:sldId id="259" r:id="rId5"/>
     <p:sldId id="260" r:id="rId6"/>
-    <p:sldId id="265" r:id="rId7"/>
-    <p:sldId id="261" r:id="rId8"/>
-    <p:sldId id="262" r:id="rId9"/>
-    <p:sldId id="263" r:id="rId10"/>
-    <p:sldId id="264" r:id="rId11"/>
-    <p:sldId id="266" r:id="rId12"/>
-    <p:sldId id="267" r:id="rId13"/>
-    <p:sldId id="268" r:id="rId14"/>
-    <p:sldId id="269" r:id="rId15"/>
-    <p:sldId id="270" r:id="rId16"/>
-    <p:sldId id="271" r:id="rId17"/>
-    <p:sldId id="272" r:id="rId18"/>
-    <p:sldId id="274" r:id="rId19"/>
-    <p:sldId id="275" r:id="rId20"/>
-    <p:sldId id="279" r:id="rId21"/>
-    <p:sldId id="277" r:id="rId22"/>
-    <p:sldId id="278" r:id="rId23"/>
-    <p:sldId id="280" r:id="rId24"/>
-    <p:sldId id="281" r:id="rId25"/>
-    <p:sldId id="273" r:id="rId26"/>
+    <p:sldId id="284" r:id="rId7"/>
+    <p:sldId id="265" r:id="rId8"/>
+    <p:sldId id="261" r:id="rId9"/>
+    <p:sldId id="262" r:id="rId10"/>
+    <p:sldId id="263" r:id="rId11"/>
+    <p:sldId id="264" r:id="rId12"/>
+    <p:sldId id="266" r:id="rId13"/>
+    <p:sldId id="267" r:id="rId14"/>
+    <p:sldId id="268" r:id="rId15"/>
+    <p:sldId id="269" r:id="rId16"/>
+    <p:sldId id="270" r:id="rId17"/>
+    <p:sldId id="271" r:id="rId18"/>
+    <p:sldId id="272" r:id="rId19"/>
+    <p:sldId id="274" r:id="rId20"/>
+    <p:sldId id="275" r:id="rId21"/>
+    <p:sldId id="279" r:id="rId22"/>
+    <p:sldId id="277" r:id="rId23"/>
+    <p:sldId id="278" r:id="rId24"/>
+    <p:sldId id="280" r:id="rId25"/>
+    <p:sldId id="281" r:id="rId26"/>
+    <p:sldId id="282" r:id="rId27"/>
+    <p:sldId id="283" r:id="rId28"/>
+    <p:sldId id="286" r:id="rId29"/>
+    <p:sldId id="285" r:id="rId30"/>
+    <p:sldId id="273" r:id="rId31"/>
   </p:sldIdLst>
   <p:sldSz cx="12192000" cy="6858000"/>
   <p:notesSz cx="6858000" cy="9144000"/>
@@ -1062,7 +1067,7 @@
           <a:noFill/>
           <a:extLst>
             <a:ext uri="{909E8E84-426E-40dd-AFC4-6F175D3DCCD1}">
-              <a14:hiddenFill xmlns="" xmlns:a14="http://schemas.microsoft.com/office/drawing/2010/main">
+              <a14:hiddenFill xmlns:a14="http://schemas.microsoft.com/office/drawing/2010/main" xmlns="">
                 <a:solidFill>
                   <a:srgbClr val="FFFFFF"/>
                 </a:solidFill>
@@ -1122,7 +1127,7 @@
             </a:ln>
             <a:extLst>
               <a:ext uri="{91240B29-F687-4f45-9708-019B960494DF}">
-                <a14:hiddenLine xmlns="" xmlns:a14="http://schemas.microsoft.com/office/drawing/2010/main" w="9525">
+                <a14:hiddenLine xmlns:a14="http://schemas.microsoft.com/office/drawing/2010/main" xmlns="" w="9525">
                   <a:solidFill>
                     <a:srgbClr val="000000"/>
                   </a:solidFill>
@@ -1212,7 +1217,7 @@
             </a:ln>
             <a:extLst>
               <a:ext uri="{91240B29-F687-4f45-9708-019B960494DF}">
-                <a14:hiddenLine xmlns="" xmlns:a14="http://schemas.microsoft.com/office/drawing/2010/main" w="9525">
+                <a14:hiddenLine xmlns:a14="http://schemas.microsoft.com/office/drawing/2010/main" xmlns="" w="9525">
                   <a:solidFill>
                     <a:srgbClr val="000000"/>
                   </a:solidFill>
@@ -1302,7 +1307,7 @@
             </a:ln>
             <a:extLst>
               <a:ext uri="{91240B29-F687-4f45-9708-019B960494DF}">
-                <a14:hiddenLine xmlns="" xmlns:a14="http://schemas.microsoft.com/office/drawing/2010/main" w="9525">
+                <a14:hiddenLine xmlns:a14="http://schemas.microsoft.com/office/drawing/2010/main" xmlns="" w="9525">
                   <a:solidFill>
                     <a:srgbClr val="000000"/>
                   </a:solidFill>
@@ -1336,7 +1341,7 @@
             </a:ln>
             <a:extLst>
               <a:ext uri="{91240B29-F687-4f45-9708-019B960494DF}">
-                <a14:hiddenLine xmlns="" xmlns:a14="http://schemas.microsoft.com/office/drawing/2010/main" w="9525">
+                <a14:hiddenLine xmlns:a14="http://schemas.microsoft.com/office/drawing/2010/main" xmlns="" w="9525">
                   <a:solidFill>
                     <a:srgbClr val="000000"/>
                   </a:solidFill>
@@ -1426,7 +1431,7 @@
             </a:ln>
             <a:extLst>
               <a:ext uri="{91240B29-F687-4f45-9708-019B960494DF}">
-                <a14:hiddenLine xmlns="" xmlns:a14="http://schemas.microsoft.com/office/drawing/2010/main" w="9525">
+                <a14:hiddenLine xmlns:a14="http://schemas.microsoft.com/office/drawing/2010/main" xmlns="" w="9525">
                   <a:solidFill>
                     <a:srgbClr val="000000"/>
                   </a:solidFill>
@@ -1488,7 +1493,7 @@
             </a:ln>
             <a:extLst>
               <a:ext uri="{91240B29-F687-4f45-9708-019B960494DF}">
-                <a14:hiddenLine xmlns="" xmlns:a14="http://schemas.microsoft.com/office/drawing/2010/main" w="9525">
+                <a14:hiddenLine xmlns:a14="http://schemas.microsoft.com/office/drawing/2010/main" xmlns="" w="9525">
                   <a:solidFill>
                     <a:srgbClr val="000000"/>
                   </a:solidFill>
@@ -1550,7 +1555,7 @@
             </a:ln>
             <a:extLst>
               <a:ext uri="{91240B29-F687-4f45-9708-019B960494DF}">
-                <a14:hiddenLine xmlns="" xmlns:a14="http://schemas.microsoft.com/office/drawing/2010/main" w="9525">
+                <a14:hiddenLine xmlns:a14="http://schemas.microsoft.com/office/drawing/2010/main" xmlns="" w="9525">
                   <a:solidFill>
                     <a:srgbClr val="000000"/>
                   </a:solidFill>
@@ -1640,7 +1645,7 @@
             </a:ln>
             <a:extLst>
               <a:ext uri="{91240B29-F687-4f45-9708-019B960494DF}">
-                <a14:hiddenLine xmlns="" xmlns:a14="http://schemas.microsoft.com/office/drawing/2010/main" w="9525">
+                <a14:hiddenLine xmlns:a14="http://schemas.microsoft.com/office/drawing/2010/main" xmlns="" w="9525">
                   <a:solidFill>
                     <a:srgbClr val="000000"/>
                   </a:solidFill>
@@ -1702,7 +1707,7 @@
             </a:ln>
             <a:extLst>
               <a:ext uri="{91240B29-F687-4f45-9708-019B960494DF}">
-                <a14:hiddenLine xmlns="" xmlns:a14="http://schemas.microsoft.com/office/drawing/2010/main" w="9525">
+                <a14:hiddenLine xmlns:a14="http://schemas.microsoft.com/office/drawing/2010/main" xmlns="" w="9525">
                   <a:solidFill>
                     <a:srgbClr val="000000"/>
                   </a:solidFill>
@@ -1764,7 +1769,7 @@
             </a:ln>
             <a:extLst>
               <a:ext uri="{91240B29-F687-4f45-9708-019B960494DF}">
-                <a14:hiddenLine xmlns="" xmlns:a14="http://schemas.microsoft.com/office/drawing/2010/main" w="9525">
+                <a14:hiddenLine xmlns:a14="http://schemas.microsoft.com/office/drawing/2010/main" xmlns="" w="9525">
                   <a:solidFill>
                     <a:srgbClr val="000000"/>
                   </a:solidFill>
@@ -1854,7 +1859,7 @@
             </a:ln>
             <a:extLst>
               <a:ext uri="{91240B29-F687-4f45-9708-019B960494DF}">
-                <a14:hiddenLine xmlns="" xmlns:a14="http://schemas.microsoft.com/office/drawing/2010/main" w="9525">
+                <a14:hiddenLine xmlns:a14="http://schemas.microsoft.com/office/drawing/2010/main" xmlns="" w="9525">
                   <a:solidFill>
                     <a:srgbClr val="000000"/>
                   </a:solidFill>
@@ -1944,7 +1949,7 @@
             </a:ln>
             <a:extLst>
               <a:ext uri="{91240B29-F687-4f45-9708-019B960494DF}">
-                <a14:hiddenLine xmlns="" xmlns:a14="http://schemas.microsoft.com/office/drawing/2010/main" w="9525">
+                <a14:hiddenLine xmlns:a14="http://schemas.microsoft.com/office/drawing/2010/main" xmlns="" w="9525">
                   <a:solidFill>
                     <a:srgbClr val="000000"/>
                   </a:solidFill>
@@ -2006,7 +2011,7 @@
             </a:ln>
             <a:extLst>
               <a:ext uri="{91240B29-F687-4f45-9708-019B960494DF}">
-                <a14:hiddenLine xmlns="" xmlns:a14="http://schemas.microsoft.com/office/drawing/2010/main" w="9525">
+                <a14:hiddenLine xmlns:a14="http://schemas.microsoft.com/office/drawing/2010/main" xmlns="" w="9525">
                   <a:solidFill>
                     <a:srgbClr val="000000"/>
                   </a:solidFill>
@@ -2116,7 +2121,7 @@
             </a:ln>
             <a:extLst>
               <a:ext uri="{91240B29-F687-4f45-9708-019B960494DF}">
-                <a14:hiddenLine xmlns="" xmlns:a14="http://schemas.microsoft.com/office/drawing/2010/main" w="9525">
+                <a14:hiddenLine xmlns:a14="http://schemas.microsoft.com/office/drawing/2010/main" xmlns="" w="9525">
                   <a:solidFill>
                     <a:srgbClr val="000000"/>
                   </a:solidFill>
@@ -2178,7 +2183,7 @@
             </a:ln>
             <a:extLst>
               <a:ext uri="{91240B29-F687-4f45-9708-019B960494DF}">
-                <a14:hiddenLine xmlns="" xmlns:a14="http://schemas.microsoft.com/office/drawing/2010/main" w="9525">
+                <a14:hiddenLine xmlns:a14="http://schemas.microsoft.com/office/drawing/2010/main" xmlns="" w="9525">
                   <a:solidFill>
                     <a:srgbClr val="000000"/>
                   </a:solidFill>
@@ -2268,7 +2273,7 @@
             </a:ln>
             <a:extLst>
               <a:ext uri="{91240B29-F687-4f45-9708-019B960494DF}">
-                <a14:hiddenLine xmlns="" xmlns:a14="http://schemas.microsoft.com/office/drawing/2010/main" w="9525">
+                <a14:hiddenLine xmlns:a14="http://schemas.microsoft.com/office/drawing/2010/main" xmlns="" w="9525">
                   <a:solidFill>
                     <a:srgbClr val="000000"/>
                   </a:solidFill>
@@ -2358,7 +2363,7 @@
             </a:ln>
             <a:extLst>
               <a:ext uri="{91240B29-F687-4f45-9708-019B960494DF}">
-                <a14:hiddenLine xmlns="" xmlns:a14="http://schemas.microsoft.com/office/drawing/2010/main" w="9525">
+                <a14:hiddenLine xmlns:a14="http://schemas.microsoft.com/office/drawing/2010/main" xmlns="" w="9525">
                   <a:solidFill>
                     <a:srgbClr val="000000"/>
                   </a:solidFill>
@@ -2420,7 +2425,7 @@
             </a:ln>
             <a:extLst>
               <a:ext uri="{91240B29-F687-4f45-9708-019B960494DF}">
-                <a14:hiddenLine xmlns="" xmlns:a14="http://schemas.microsoft.com/office/drawing/2010/main" w="9525">
+                <a14:hiddenLine xmlns:a14="http://schemas.microsoft.com/office/drawing/2010/main" xmlns="" w="9525">
                   <a:solidFill>
                     <a:srgbClr val="000000"/>
                   </a:solidFill>
@@ -2510,7 +2515,7 @@
             </a:ln>
             <a:extLst>
               <a:ext uri="{91240B29-F687-4f45-9708-019B960494DF}">
-                <a14:hiddenLine xmlns="" xmlns:a14="http://schemas.microsoft.com/office/drawing/2010/main" w="9525">
+                <a14:hiddenLine xmlns:a14="http://schemas.microsoft.com/office/drawing/2010/main" xmlns="" w="9525">
                   <a:solidFill>
                     <a:srgbClr val="000000"/>
                   </a:solidFill>
@@ -2600,7 +2605,7 @@
             </a:ln>
             <a:extLst>
               <a:ext uri="{91240B29-F687-4f45-9708-019B960494DF}">
-                <a14:hiddenLine xmlns="" xmlns:a14="http://schemas.microsoft.com/office/drawing/2010/main" w="9525">
+                <a14:hiddenLine xmlns:a14="http://schemas.microsoft.com/office/drawing/2010/main" xmlns="" w="9525">
                   <a:solidFill>
                     <a:srgbClr val="000000"/>
                   </a:solidFill>
@@ -2656,7 +2661,7 @@
             </a:ln>
             <a:extLst>
               <a:ext uri="{91240B29-F687-4f45-9708-019B960494DF}">
-                <a14:hiddenLine xmlns="" xmlns:a14="http://schemas.microsoft.com/office/drawing/2010/main" w="9525">
+                <a14:hiddenLine xmlns:a14="http://schemas.microsoft.com/office/drawing/2010/main" xmlns="" w="9525">
                   <a:solidFill>
                     <a:srgbClr val="000000"/>
                   </a:solidFill>
@@ -2746,7 +2751,7 @@
             </a:ln>
             <a:extLst>
               <a:ext uri="{91240B29-F687-4f45-9708-019B960494DF}">
-                <a14:hiddenLine xmlns="" xmlns:a14="http://schemas.microsoft.com/office/drawing/2010/main" w="9525">
+                <a14:hiddenLine xmlns:a14="http://schemas.microsoft.com/office/drawing/2010/main" xmlns="" w="9525">
                   <a:solidFill>
                     <a:srgbClr val="000000"/>
                   </a:solidFill>
@@ -2802,7 +2807,7 @@
             </a:ln>
             <a:extLst>
               <a:ext uri="{91240B29-F687-4f45-9708-019B960494DF}">
-                <a14:hiddenLine xmlns="" xmlns:a14="http://schemas.microsoft.com/office/drawing/2010/main" w="9525">
+                <a14:hiddenLine xmlns:a14="http://schemas.microsoft.com/office/drawing/2010/main" xmlns="" w="9525">
                   <a:solidFill>
                     <a:srgbClr val="000000"/>
                   </a:solidFill>
@@ -2892,7 +2897,7 @@
             </a:ln>
             <a:extLst>
               <a:ext uri="{91240B29-F687-4f45-9708-019B960494DF}">
-                <a14:hiddenLine xmlns="" xmlns:a14="http://schemas.microsoft.com/office/drawing/2010/main" w="9525">
+                <a14:hiddenLine xmlns:a14="http://schemas.microsoft.com/office/drawing/2010/main" xmlns="" w="9525">
                   <a:solidFill>
                     <a:srgbClr val="000000"/>
                   </a:solidFill>
@@ -2960,7 +2965,7 @@
             </a:ln>
             <a:extLst>
               <a:ext uri="{91240B29-F687-4f45-9708-019B960494DF}">
-                <a14:hiddenLine xmlns="" xmlns:a14="http://schemas.microsoft.com/office/drawing/2010/main" w="9525">
+                <a14:hiddenLine xmlns:a14="http://schemas.microsoft.com/office/drawing/2010/main" xmlns="" w="9525">
                   <a:solidFill>
                     <a:srgbClr val="000000"/>
                   </a:solidFill>
@@ -3050,7 +3055,7 @@
             </a:ln>
             <a:extLst>
               <a:ext uri="{91240B29-F687-4f45-9708-019B960494DF}">
-                <a14:hiddenLine xmlns="" xmlns:a14="http://schemas.microsoft.com/office/drawing/2010/main" w="9525">
+                <a14:hiddenLine xmlns:a14="http://schemas.microsoft.com/office/drawing/2010/main" xmlns="" w="9525">
                   <a:solidFill>
                     <a:srgbClr val="000000"/>
                   </a:solidFill>
@@ -3118,7 +3123,7 @@
             </a:ln>
             <a:extLst>
               <a:ext uri="{91240B29-F687-4f45-9708-019B960494DF}">
-                <a14:hiddenLine xmlns="" xmlns:a14="http://schemas.microsoft.com/office/drawing/2010/main" w="9525">
+                <a14:hiddenLine xmlns:a14="http://schemas.microsoft.com/office/drawing/2010/main" xmlns="" w="9525">
                   <a:solidFill>
                     <a:srgbClr val="000000"/>
                   </a:solidFill>
@@ -3208,7 +3213,7 @@
             </a:ln>
             <a:extLst>
               <a:ext uri="{91240B29-F687-4f45-9708-019B960494DF}">
-                <a14:hiddenLine xmlns="" xmlns:a14="http://schemas.microsoft.com/office/drawing/2010/main" w="9525">
+                <a14:hiddenLine xmlns:a14="http://schemas.microsoft.com/office/drawing/2010/main" xmlns="" w="9525">
                   <a:solidFill>
                     <a:srgbClr val="000000"/>
                   </a:solidFill>
@@ -3242,7 +3247,7 @@
             </a:ln>
             <a:extLst>
               <a:ext uri="{91240B29-F687-4f45-9708-019B960494DF}">
-                <a14:hiddenLine xmlns="" xmlns:a14="http://schemas.microsoft.com/office/drawing/2010/main" w="9525">
+                <a14:hiddenLine xmlns:a14="http://schemas.microsoft.com/office/drawing/2010/main" xmlns="" w="9525">
                   <a:solidFill>
                     <a:srgbClr val="000000"/>
                   </a:solidFill>
@@ -3332,7 +3337,7 @@
             </a:ln>
             <a:extLst>
               <a:ext uri="{91240B29-F687-4f45-9708-019B960494DF}">
-                <a14:hiddenLine xmlns="" xmlns:a14="http://schemas.microsoft.com/office/drawing/2010/main" w="9525">
+                <a14:hiddenLine xmlns:a14="http://schemas.microsoft.com/office/drawing/2010/main" xmlns="" w="9525">
                   <a:solidFill>
                     <a:srgbClr val="000000"/>
                   </a:solidFill>
@@ -3394,7 +3399,7 @@
             </a:ln>
             <a:extLst>
               <a:ext uri="{91240B29-F687-4f45-9708-019B960494DF}">
-                <a14:hiddenLine xmlns="" xmlns:a14="http://schemas.microsoft.com/office/drawing/2010/main" w="9525">
+                <a14:hiddenLine xmlns:a14="http://schemas.microsoft.com/office/drawing/2010/main" xmlns="" w="9525">
                   <a:solidFill>
                     <a:srgbClr val="000000"/>
                   </a:solidFill>
@@ -3456,7 +3461,7 @@
             </a:ln>
             <a:extLst>
               <a:ext uri="{91240B29-F687-4f45-9708-019B960494DF}">
-                <a14:hiddenLine xmlns="" xmlns:a14="http://schemas.microsoft.com/office/drawing/2010/main" w="9525">
+                <a14:hiddenLine xmlns:a14="http://schemas.microsoft.com/office/drawing/2010/main" xmlns="" w="9525">
                   <a:solidFill>
                     <a:srgbClr val="000000"/>
                   </a:solidFill>
@@ -3546,7 +3551,7 @@
             </a:ln>
             <a:extLst>
               <a:ext uri="{91240B29-F687-4f45-9708-019B960494DF}">
-                <a14:hiddenLine xmlns="" xmlns:a14="http://schemas.microsoft.com/office/drawing/2010/main" w="9525">
+                <a14:hiddenLine xmlns:a14="http://schemas.microsoft.com/office/drawing/2010/main" xmlns="" w="9525">
                   <a:solidFill>
                     <a:srgbClr val="000000"/>
                   </a:solidFill>
@@ -3614,7 +3619,7 @@
             </a:ln>
             <a:extLst>
               <a:ext uri="{91240B29-F687-4f45-9708-019B960494DF}">
-                <a14:hiddenLine xmlns="" xmlns:a14="http://schemas.microsoft.com/office/drawing/2010/main" w="9525">
+                <a14:hiddenLine xmlns:a14="http://schemas.microsoft.com/office/drawing/2010/main" xmlns="" w="9525">
                   <a:solidFill>
                     <a:srgbClr val="000000"/>
                   </a:solidFill>
@@ -3676,7 +3681,7 @@
             </a:ln>
             <a:extLst>
               <a:ext uri="{91240B29-F687-4f45-9708-019B960494DF}">
-                <a14:hiddenLine xmlns="" xmlns:a14="http://schemas.microsoft.com/office/drawing/2010/main" w="9525">
+                <a14:hiddenLine xmlns:a14="http://schemas.microsoft.com/office/drawing/2010/main" xmlns="" w="9525">
                   <a:solidFill>
                     <a:srgbClr val="000000"/>
                   </a:solidFill>
@@ -3766,7 +3771,7 @@
             </a:ln>
             <a:extLst>
               <a:ext uri="{91240B29-F687-4f45-9708-019B960494DF}">
-                <a14:hiddenLine xmlns="" xmlns:a14="http://schemas.microsoft.com/office/drawing/2010/main" w="9525">
+                <a14:hiddenLine xmlns:a14="http://schemas.microsoft.com/office/drawing/2010/main" xmlns="" w="9525">
                   <a:solidFill>
                     <a:srgbClr val="000000"/>
                   </a:solidFill>
@@ -3828,7 +3833,7 @@
             </a:ln>
             <a:extLst>
               <a:ext uri="{91240B29-F687-4f45-9708-019B960494DF}">
-                <a14:hiddenLine xmlns="" xmlns:a14="http://schemas.microsoft.com/office/drawing/2010/main" w="9525">
+                <a14:hiddenLine xmlns:a14="http://schemas.microsoft.com/office/drawing/2010/main" xmlns="" w="9525">
                   <a:solidFill>
                     <a:srgbClr val="000000"/>
                   </a:solidFill>
@@ -3918,7 +3923,7 @@
             </a:ln>
             <a:extLst>
               <a:ext uri="{91240B29-F687-4f45-9708-019B960494DF}">
-                <a14:hiddenLine xmlns="" xmlns:a14="http://schemas.microsoft.com/office/drawing/2010/main" w="9525">
+                <a14:hiddenLine xmlns:a14="http://schemas.microsoft.com/office/drawing/2010/main" xmlns="" w="9525">
                   <a:solidFill>
                     <a:srgbClr val="000000"/>
                   </a:solidFill>
@@ -3980,7 +3985,7 @@
             </a:ln>
             <a:extLst>
               <a:ext uri="{91240B29-F687-4f45-9708-019B960494DF}">
-                <a14:hiddenLine xmlns="" xmlns:a14="http://schemas.microsoft.com/office/drawing/2010/main" w="9525">
+                <a14:hiddenLine xmlns:a14="http://schemas.microsoft.com/office/drawing/2010/main" xmlns="" w="9525">
                   <a:solidFill>
                     <a:srgbClr val="000000"/>
                   </a:solidFill>
@@ -4070,7 +4075,7 @@
             </a:ln>
             <a:extLst>
               <a:ext uri="{91240B29-F687-4f45-9708-019B960494DF}">
-                <a14:hiddenLine xmlns="" xmlns:a14="http://schemas.microsoft.com/office/drawing/2010/main" w="9525">
+                <a14:hiddenLine xmlns:a14="http://schemas.microsoft.com/office/drawing/2010/main" xmlns="" w="9525">
                   <a:solidFill>
                     <a:srgbClr val="000000"/>
                   </a:solidFill>
@@ -4104,7 +4109,7 @@
             </a:ln>
             <a:extLst>
               <a:ext uri="{91240B29-F687-4f45-9708-019B960494DF}">
-                <a14:hiddenLine xmlns="" xmlns:a14="http://schemas.microsoft.com/office/drawing/2010/main" w="9525">
+                <a14:hiddenLine xmlns:a14="http://schemas.microsoft.com/office/drawing/2010/main" xmlns="" w="9525">
                   <a:solidFill>
                     <a:srgbClr val="000000"/>
                   </a:solidFill>
@@ -4169,7 +4174,7 @@
             </a:ln>
             <a:extLst>
               <a:ext uri="{91240B29-F687-4f45-9708-019B960494DF}">
-                <a14:hiddenLine xmlns="" xmlns:a14="http://schemas.microsoft.com/office/drawing/2010/main" w="9525">
+                <a14:hiddenLine xmlns:a14="http://schemas.microsoft.com/office/drawing/2010/main" xmlns="" w="9525">
                   <a:solidFill>
                     <a:srgbClr val="000000"/>
                   </a:solidFill>
@@ -4259,7 +4264,7 @@
             </a:ln>
             <a:extLst>
               <a:ext uri="{91240B29-F687-4f45-9708-019B960494DF}">
-                <a14:hiddenLine xmlns="" xmlns:a14="http://schemas.microsoft.com/office/drawing/2010/main" w="9525">
+                <a14:hiddenLine xmlns:a14="http://schemas.microsoft.com/office/drawing/2010/main" xmlns="" w="9525">
                   <a:solidFill>
                     <a:srgbClr val="000000"/>
                   </a:solidFill>
@@ -4321,7 +4326,7 @@
             </a:ln>
             <a:extLst>
               <a:ext uri="{91240B29-F687-4f45-9708-019B960494DF}">
-                <a14:hiddenLine xmlns="" xmlns:a14="http://schemas.microsoft.com/office/drawing/2010/main" w="9525">
+                <a14:hiddenLine xmlns:a14="http://schemas.microsoft.com/office/drawing/2010/main" xmlns="" w="9525">
                   <a:solidFill>
                     <a:srgbClr val="000000"/>
                   </a:solidFill>
@@ -4411,7 +4416,7 @@
             </a:ln>
             <a:extLst>
               <a:ext uri="{91240B29-F687-4f45-9708-019B960494DF}">
-                <a14:hiddenLine xmlns="" xmlns:a14="http://schemas.microsoft.com/office/drawing/2010/main" w="9525">
+                <a14:hiddenLine xmlns:a14="http://schemas.microsoft.com/office/drawing/2010/main" xmlns="" w="9525">
                   <a:solidFill>
                     <a:srgbClr val="000000"/>
                   </a:solidFill>
@@ -4501,7 +4506,7 @@
             </a:ln>
             <a:extLst>
               <a:ext uri="{91240B29-F687-4f45-9708-019B960494DF}">
-                <a14:hiddenLine xmlns="" xmlns:a14="http://schemas.microsoft.com/office/drawing/2010/main" w="9525">
+                <a14:hiddenLine xmlns:a14="http://schemas.microsoft.com/office/drawing/2010/main" xmlns="" w="9525">
                   <a:solidFill>
                     <a:srgbClr val="000000"/>
                   </a:solidFill>
@@ -4566,7 +4571,7 @@
             </a:ln>
             <a:extLst>
               <a:ext uri="{91240B29-F687-4f45-9708-019B960494DF}">
-                <a14:hiddenLine xmlns="" xmlns:a14="http://schemas.microsoft.com/office/drawing/2010/main" w="9525">
+                <a14:hiddenLine xmlns:a14="http://schemas.microsoft.com/office/drawing/2010/main" xmlns="" w="9525">
                   <a:solidFill>
                     <a:srgbClr val="000000"/>
                   </a:solidFill>
@@ -4628,7 +4633,7 @@
             </a:ln>
             <a:extLst>
               <a:ext uri="{91240B29-F687-4f45-9708-019B960494DF}">
-                <a14:hiddenLine xmlns="" xmlns:a14="http://schemas.microsoft.com/office/drawing/2010/main" w="9525">
+                <a14:hiddenLine xmlns:a14="http://schemas.microsoft.com/office/drawing/2010/main" xmlns="" w="9525">
                   <a:solidFill>
                     <a:srgbClr val="000000"/>
                   </a:solidFill>
@@ -4718,7 +4723,7 @@
             </a:ln>
             <a:extLst>
               <a:ext uri="{91240B29-F687-4f45-9708-019B960494DF}">
-                <a14:hiddenLine xmlns="" xmlns:a14="http://schemas.microsoft.com/office/drawing/2010/main" w="9525">
+                <a14:hiddenLine xmlns:a14="http://schemas.microsoft.com/office/drawing/2010/main" xmlns="" w="9525">
                   <a:solidFill>
                     <a:srgbClr val="000000"/>
                   </a:solidFill>
@@ -4808,7 +4813,7 @@
             </a:ln>
             <a:extLst>
               <a:ext uri="{91240B29-F687-4f45-9708-019B960494DF}">
-                <a14:hiddenLine xmlns="" xmlns:a14="http://schemas.microsoft.com/office/drawing/2010/main" w="9525">
+                <a14:hiddenLine xmlns:a14="http://schemas.microsoft.com/office/drawing/2010/main" xmlns="" w="9525">
                   <a:solidFill>
                     <a:srgbClr val="000000"/>
                   </a:solidFill>
@@ -4870,7 +4875,7 @@
             </a:ln>
             <a:extLst>
               <a:ext uri="{91240B29-F687-4f45-9708-019B960494DF}">
-                <a14:hiddenLine xmlns="" xmlns:a14="http://schemas.microsoft.com/office/drawing/2010/main" w="9525">
+                <a14:hiddenLine xmlns:a14="http://schemas.microsoft.com/office/drawing/2010/main" xmlns="" w="9525">
                   <a:solidFill>
                     <a:srgbClr val="000000"/>
                   </a:solidFill>
@@ -4990,7 +4995,7 @@
             </a:ln>
             <a:extLst>
               <a:ext uri="{91240B29-F687-4f45-9708-019B960494DF}">
-                <a14:hiddenLine xmlns="" xmlns:a14="http://schemas.microsoft.com/office/drawing/2010/main" w="9525">
+                <a14:hiddenLine xmlns:a14="http://schemas.microsoft.com/office/drawing/2010/main" xmlns="" w="9525">
                   <a:solidFill>
                     <a:srgbClr val="000000"/>
                   </a:solidFill>
@@ -5058,7 +5063,7 @@
             </a:ln>
             <a:extLst>
               <a:ext uri="{91240B29-F687-4f45-9708-019B960494DF}">
-                <a14:hiddenLine xmlns="" xmlns:a14="http://schemas.microsoft.com/office/drawing/2010/main" w="9525">
+                <a14:hiddenLine xmlns:a14="http://schemas.microsoft.com/office/drawing/2010/main" xmlns="" w="9525">
                   <a:solidFill>
                     <a:srgbClr val="000000"/>
                   </a:solidFill>
@@ -5148,7 +5153,7 @@
             </a:ln>
             <a:extLst>
               <a:ext uri="{91240B29-F687-4f45-9708-019B960494DF}">
-                <a14:hiddenLine xmlns="" xmlns:a14="http://schemas.microsoft.com/office/drawing/2010/main" w="9525">
+                <a14:hiddenLine xmlns:a14="http://schemas.microsoft.com/office/drawing/2010/main" xmlns="" w="9525">
                   <a:solidFill>
                     <a:srgbClr val="000000"/>
                   </a:solidFill>
@@ -9989,7 +9994,7 @@
           <a:noFill/>
           <a:extLst>
             <a:ext uri="{909E8E84-426E-40dd-AFC4-6F175D3DCCD1}">
-              <a14:hiddenFill xmlns="" xmlns:a14="http://schemas.microsoft.com/office/drawing/2010/main">
+              <a14:hiddenFill xmlns:a14="http://schemas.microsoft.com/office/drawing/2010/main" xmlns="">
                 <a:solidFill>
                   <a:srgbClr val="FFFFFF"/>
                 </a:solidFill>
@@ -10063,7 +10068,7 @@
               </a:ln>
               <a:extLst>
                 <a:ext uri="{91240B29-F687-4f45-9708-019B960494DF}">
-                  <a14:hiddenLine xmlns="" xmlns:a14="http://schemas.microsoft.com/office/drawing/2010/main" w="9525">
+                  <a14:hiddenLine xmlns:a14="http://schemas.microsoft.com/office/drawing/2010/main" xmlns="" w="9525">
                     <a:solidFill>
                       <a:srgbClr val="000000"/>
                     </a:solidFill>
@@ -10153,7 +10158,7 @@
               </a:ln>
               <a:extLst>
                 <a:ext uri="{91240B29-F687-4f45-9708-019B960494DF}">
-                  <a14:hiddenLine xmlns="" xmlns:a14="http://schemas.microsoft.com/office/drawing/2010/main" w="9525">
+                  <a14:hiddenLine xmlns:a14="http://schemas.microsoft.com/office/drawing/2010/main" xmlns="" w="9525">
                     <a:solidFill>
                       <a:srgbClr val="000000"/>
                     </a:solidFill>
@@ -10243,7 +10248,7 @@
               </a:ln>
               <a:extLst>
                 <a:ext uri="{91240B29-F687-4f45-9708-019B960494DF}">
-                  <a14:hiddenLine xmlns="" xmlns:a14="http://schemas.microsoft.com/office/drawing/2010/main" w="9525">
+                  <a14:hiddenLine xmlns:a14="http://schemas.microsoft.com/office/drawing/2010/main" xmlns="" w="9525">
                     <a:solidFill>
                       <a:srgbClr val="000000"/>
                     </a:solidFill>
@@ -10305,7 +10310,7 @@
               </a:ln>
               <a:extLst>
                 <a:ext uri="{91240B29-F687-4f45-9708-019B960494DF}">
-                  <a14:hiddenLine xmlns="" xmlns:a14="http://schemas.microsoft.com/office/drawing/2010/main" w="9525">
+                  <a14:hiddenLine xmlns:a14="http://schemas.microsoft.com/office/drawing/2010/main" xmlns="" w="9525">
                     <a:solidFill>
                       <a:srgbClr val="000000"/>
                     </a:solidFill>
@@ -10395,7 +10400,7 @@
               </a:ln>
               <a:extLst>
                 <a:ext uri="{91240B29-F687-4f45-9708-019B960494DF}">
-                  <a14:hiddenLine xmlns="" xmlns:a14="http://schemas.microsoft.com/office/drawing/2010/main" w="9525">
+                  <a14:hiddenLine xmlns:a14="http://schemas.microsoft.com/office/drawing/2010/main" xmlns="" w="9525">
                     <a:solidFill>
                       <a:srgbClr val="000000"/>
                     </a:solidFill>
@@ -10457,7 +10462,7 @@
               </a:ln>
               <a:extLst>
                 <a:ext uri="{91240B29-F687-4f45-9708-019B960494DF}">
-                  <a14:hiddenLine xmlns="" xmlns:a14="http://schemas.microsoft.com/office/drawing/2010/main" w="9525">
+                  <a14:hiddenLine xmlns:a14="http://schemas.microsoft.com/office/drawing/2010/main" xmlns="" w="9525">
                     <a:solidFill>
                       <a:srgbClr val="000000"/>
                     </a:solidFill>
@@ -10519,7 +10524,7 @@
               </a:ln>
               <a:extLst>
                 <a:ext uri="{91240B29-F687-4f45-9708-019B960494DF}">
-                  <a14:hiddenLine xmlns="" xmlns:a14="http://schemas.microsoft.com/office/drawing/2010/main" w="9525">
+                  <a14:hiddenLine xmlns:a14="http://schemas.microsoft.com/office/drawing/2010/main" xmlns="" w="9525">
                     <a:solidFill>
                       <a:srgbClr val="000000"/>
                     </a:solidFill>
@@ -10609,7 +10614,7 @@
               </a:ln>
               <a:extLst>
                 <a:ext uri="{91240B29-F687-4f45-9708-019B960494DF}">
-                  <a14:hiddenLine xmlns="" xmlns:a14="http://schemas.microsoft.com/office/drawing/2010/main" w="9525">
+                  <a14:hiddenLine xmlns:a14="http://schemas.microsoft.com/office/drawing/2010/main" xmlns="" w="9525">
                     <a:solidFill>
                       <a:srgbClr val="000000"/>
                     </a:solidFill>
@@ -10699,7 +10704,7 @@
               </a:ln>
               <a:extLst>
                 <a:ext uri="{91240B29-F687-4f45-9708-019B960494DF}">
-                  <a14:hiddenLine xmlns="" xmlns:a14="http://schemas.microsoft.com/office/drawing/2010/main" w="9525">
+                  <a14:hiddenLine xmlns:a14="http://schemas.microsoft.com/office/drawing/2010/main" xmlns="" w="9525">
                     <a:solidFill>
                       <a:srgbClr val="000000"/>
                     </a:solidFill>
@@ -10761,7 +10766,7 @@
               </a:ln>
               <a:extLst>
                 <a:ext uri="{91240B29-F687-4f45-9708-019B960494DF}">
-                  <a14:hiddenLine xmlns="" xmlns:a14="http://schemas.microsoft.com/office/drawing/2010/main" w="9525">
+                  <a14:hiddenLine xmlns:a14="http://schemas.microsoft.com/office/drawing/2010/main" xmlns="" w="9525">
                     <a:solidFill>
                       <a:srgbClr val="000000"/>
                     </a:solidFill>
@@ -10871,7 +10876,7 @@
               </a:ln>
               <a:extLst>
                 <a:ext uri="{91240B29-F687-4f45-9708-019B960494DF}">
-                  <a14:hiddenLine xmlns="" xmlns:a14="http://schemas.microsoft.com/office/drawing/2010/main" w="9525">
+                  <a14:hiddenLine xmlns:a14="http://schemas.microsoft.com/office/drawing/2010/main" xmlns="" w="9525">
                     <a:solidFill>
                       <a:srgbClr val="000000"/>
                     </a:solidFill>
@@ -10955,7 +10960,7 @@
               </a:ln>
               <a:extLst>
                 <a:ext uri="{91240B29-F687-4f45-9708-019B960494DF}">
-                  <a14:hiddenLine xmlns="" xmlns:a14="http://schemas.microsoft.com/office/drawing/2010/main" w="9525">
+                  <a14:hiddenLine xmlns:a14="http://schemas.microsoft.com/office/drawing/2010/main" xmlns="" w="9525">
                     <a:solidFill>
                       <a:srgbClr val="000000"/>
                     </a:solidFill>
@@ -11017,7 +11022,7 @@
               </a:ln>
               <a:extLst>
                 <a:ext uri="{91240B29-F687-4f45-9708-019B960494DF}">
-                  <a14:hiddenLine xmlns="" xmlns:a14="http://schemas.microsoft.com/office/drawing/2010/main" w="9525">
+                  <a14:hiddenLine xmlns:a14="http://schemas.microsoft.com/office/drawing/2010/main" xmlns="" w="9525">
                     <a:solidFill>
                       <a:srgbClr val="000000"/>
                     </a:solidFill>
@@ -11079,7 +11084,7 @@
               </a:ln>
               <a:extLst>
                 <a:ext uri="{91240B29-F687-4f45-9708-019B960494DF}">
-                  <a14:hiddenLine xmlns="" xmlns:a14="http://schemas.microsoft.com/office/drawing/2010/main" w="9525">
+                  <a14:hiddenLine xmlns:a14="http://schemas.microsoft.com/office/drawing/2010/main" xmlns="" w="9525">
                     <a:solidFill>
                       <a:srgbClr val="000000"/>
                     </a:solidFill>
@@ -11169,7 +11174,7 @@
               </a:ln>
               <a:extLst>
                 <a:ext uri="{91240B29-F687-4f45-9708-019B960494DF}">
-                  <a14:hiddenLine xmlns="" xmlns:a14="http://schemas.microsoft.com/office/drawing/2010/main" w="9525">
+                  <a14:hiddenLine xmlns:a14="http://schemas.microsoft.com/office/drawing/2010/main" xmlns="" w="9525">
                     <a:solidFill>
                       <a:srgbClr val="000000"/>
                     </a:solidFill>
@@ -11203,7 +11208,7 @@
               </a:ln>
               <a:extLst>
                 <a:ext uri="{91240B29-F687-4f45-9708-019B960494DF}">
-                  <a14:hiddenLine xmlns="" xmlns:a14="http://schemas.microsoft.com/office/drawing/2010/main" w="9525">
+                  <a14:hiddenLine xmlns:a14="http://schemas.microsoft.com/office/drawing/2010/main" xmlns="" w="9525">
                     <a:solidFill>
                       <a:srgbClr val="000000"/>
                     </a:solidFill>
@@ -11268,7 +11273,7 @@
               </a:ln>
               <a:extLst>
                 <a:ext uri="{91240B29-F687-4f45-9708-019B960494DF}">
-                  <a14:hiddenLine xmlns="" xmlns:a14="http://schemas.microsoft.com/office/drawing/2010/main" w="9525">
+                  <a14:hiddenLine xmlns:a14="http://schemas.microsoft.com/office/drawing/2010/main" xmlns="" w="9525">
                     <a:solidFill>
                       <a:srgbClr val="000000"/>
                     </a:solidFill>
@@ -11358,7 +11363,7 @@
               </a:ln>
               <a:extLst>
                 <a:ext uri="{91240B29-F687-4f45-9708-019B960494DF}">
-                  <a14:hiddenLine xmlns="" xmlns:a14="http://schemas.microsoft.com/office/drawing/2010/main" w="9525">
+                  <a14:hiddenLine xmlns:a14="http://schemas.microsoft.com/office/drawing/2010/main" xmlns="" w="9525">
                     <a:solidFill>
                       <a:srgbClr val="000000"/>
                     </a:solidFill>
@@ -11420,7 +11425,7 @@
               </a:ln>
               <a:extLst>
                 <a:ext uri="{91240B29-F687-4f45-9708-019B960494DF}">
-                  <a14:hiddenLine xmlns="" xmlns:a14="http://schemas.microsoft.com/office/drawing/2010/main" w="9525">
+                  <a14:hiddenLine xmlns:a14="http://schemas.microsoft.com/office/drawing/2010/main" xmlns="" w="9525">
                     <a:solidFill>
                       <a:srgbClr val="000000"/>
                     </a:solidFill>
@@ -11510,7 +11515,7 @@
               </a:ln>
               <a:extLst>
                 <a:ext uri="{91240B29-F687-4f45-9708-019B960494DF}">
-                  <a14:hiddenLine xmlns="" xmlns:a14="http://schemas.microsoft.com/office/drawing/2010/main" w="9525">
+                  <a14:hiddenLine xmlns:a14="http://schemas.microsoft.com/office/drawing/2010/main" xmlns="" w="9525">
                     <a:solidFill>
                       <a:srgbClr val="000000"/>
                     </a:solidFill>
@@ -11575,7 +11580,7 @@
               </a:ln>
               <a:extLst>
                 <a:ext uri="{91240B29-F687-4f45-9708-019B960494DF}">
-                  <a14:hiddenLine xmlns="" xmlns:a14="http://schemas.microsoft.com/office/drawing/2010/main" w="9525">
+                  <a14:hiddenLine xmlns:a14="http://schemas.microsoft.com/office/drawing/2010/main" xmlns="" w="9525">
                     <a:solidFill>
                       <a:srgbClr val="000000"/>
                     </a:solidFill>
@@ -11637,7 +11642,7 @@
               </a:ln>
               <a:extLst>
                 <a:ext uri="{91240B29-F687-4f45-9708-019B960494DF}">
-                  <a14:hiddenLine xmlns="" xmlns:a14="http://schemas.microsoft.com/office/drawing/2010/main" w="9525">
+                  <a14:hiddenLine xmlns:a14="http://schemas.microsoft.com/office/drawing/2010/main" xmlns="" w="9525">
                     <a:solidFill>
                       <a:srgbClr val="000000"/>
                     </a:solidFill>
@@ -11727,7 +11732,7 @@
               </a:ln>
               <a:extLst>
                 <a:ext uri="{91240B29-F687-4f45-9708-019B960494DF}">
-                  <a14:hiddenLine xmlns="" xmlns:a14="http://schemas.microsoft.com/office/drawing/2010/main" w="9525">
+                  <a14:hiddenLine xmlns:a14="http://schemas.microsoft.com/office/drawing/2010/main" xmlns="" w="9525">
                     <a:solidFill>
                       <a:srgbClr val="000000"/>
                     </a:solidFill>
@@ -11817,7 +11822,7 @@
               </a:ln>
               <a:extLst>
                 <a:ext uri="{91240B29-F687-4f45-9708-019B960494DF}">
-                  <a14:hiddenLine xmlns="" xmlns:a14="http://schemas.microsoft.com/office/drawing/2010/main" w="9525">
+                  <a14:hiddenLine xmlns:a14="http://schemas.microsoft.com/office/drawing/2010/main" xmlns="" w="9525">
                     <a:solidFill>
                       <a:srgbClr val="000000"/>
                     </a:solidFill>
@@ -11882,7 +11887,7 @@
               </a:ln>
               <a:extLst>
                 <a:ext uri="{91240B29-F687-4f45-9708-019B960494DF}">
-                  <a14:hiddenLine xmlns="" xmlns:a14="http://schemas.microsoft.com/office/drawing/2010/main" w="9525">
+                  <a14:hiddenLine xmlns:a14="http://schemas.microsoft.com/office/drawing/2010/main" xmlns="" w="9525">
                     <a:solidFill>
                       <a:srgbClr val="000000"/>
                     </a:solidFill>
@@ -12002,7 +12007,7 @@
               </a:ln>
               <a:extLst>
                 <a:ext uri="{91240B29-F687-4f45-9708-019B960494DF}">
-                  <a14:hiddenLine xmlns="" xmlns:a14="http://schemas.microsoft.com/office/drawing/2010/main" w="9525">
+                  <a14:hiddenLine xmlns:a14="http://schemas.microsoft.com/office/drawing/2010/main" xmlns="" w="9525">
                     <a:solidFill>
                       <a:srgbClr val="000000"/>
                     </a:solidFill>
@@ -12100,7 +12105,7 @@
               </a:ln>
               <a:extLst>
                 <a:ext uri="{91240B29-F687-4f45-9708-019B960494DF}">
-                  <a14:hiddenLine xmlns="" xmlns:a14="http://schemas.microsoft.com/office/drawing/2010/main" w="9525">
+                  <a14:hiddenLine xmlns:a14="http://schemas.microsoft.com/office/drawing/2010/main" xmlns="" w="9525">
                     <a:solidFill>
                       <a:srgbClr val="000000"/>
                     </a:solidFill>
@@ -12215,7 +12220,7 @@
               </a:ln>
               <a:extLst>
                 <a:ext uri="{91240B29-F687-4f45-9708-019B960494DF}">
-                  <a14:hiddenLine xmlns="" xmlns:a14="http://schemas.microsoft.com/office/drawing/2010/main" w="9525">
+                  <a14:hiddenLine xmlns:a14="http://schemas.microsoft.com/office/drawing/2010/main" xmlns="" w="9525">
                     <a:solidFill>
                       <a:srgbClr val="000000"/>
                     </a:solidFill>
@@ -12305,7 +12310,7 @@
               </a:ln>
               <a:extLst>
                 <a:ext uri="{91240B29-F687-4f45-9708-019B960494DF}">
-                  <a14:hiddenLine xmlns="" xmlns:a14="http://schemas.microsoft.com/office/drawing/2010/main" w="9525">
+                  <a14:hiddenLine xmlns:a14="http://schemas.microsoft.com/office/drawing/2010/main" xmlns="" w="9525">
                     <a:solidFill>
                       <a:srgbClr val="000000"/>
                     </a:solidFill>
@@ -12370,7 +12375,7 @@
               </a:ln>
               <a:extLst>
                 <a:ext uri="{91240B29-F687-4f45-9708-019B960494DF}">
-                  <a14:hiddenLine xmlns="" xmlns:a14="http://schemas.microsoft.com/office/drawing/2010/main" w="9525">
+                  <a14:hiddenLine xmlns:a14="http://schemas.microsoft.com/office/drawing/2010/main" xmlns="" w="9525">
                     <a:solidFill>
                       <a:srgbClr val="000000"/>
                     </a:solidFill>
@@ -12460,7 +12465,7 @@
               </a:ln>
               <a:extLst>
                 <a:ext uri="{91240B29-F687-4f45-9708-019B960494DF}">
-                  <a14:hiddenLine xmlns="" xmlns:a14="http://schemas.microsoft.com/office/drawing/2010/main" w="9525">
+                  <a14:hiddenLine xmlns:a14="http://schemas.microsoft.com/office/drawing/2010/main" xmlns="" w="9525">
                     <a:solidFill>
                       <a:srgbClr val="000000"/>
                     </a:solidFill>
@@ -12528,7 +12533,7 @@
               </a:ln>
               <a:extLst>
                 <a:ext uri="{91240B29-F687-4f45-9708-019B960494DF}">
-                  <a14:hiddenLine xmlns="" xmlns:a14="http://schemas.microsoft.com/office/drawing/2010/main" w="9525">
+                  <a14:hiddenLine xmlns:a14="http://schemas.microsoft.com/office/drawing/2010/main" xmlns="" w="9525">
                     <a:solidFill>
                       <a:srgbClr val="000000"/>
                     </a:solidFill>
@@ -12618,7 +12623,7 @@
               </a:ln>
               <a:extLst>
                 <a:ext uri="{91240B29-F687-4f45-9708-019B960494DF}">
-                  <a14:hiddenLine xmlns="" xmlns:a14="http://schemas.microsoft.com/office/drawing/2010/main" w="9525">
+                  <a14:hiddenLine xmlns:a14="http://schemas.microsoft.com/office/drawing/2010/main" xmlns="" w="9525">
                     <a:solidFill>
                       <a:srgbClr val="000000"/>
                     </a:solidFill>
@@ -12686,7 +12691,7 @@
               </a:ln>
               <a:extLst>
                 <a:ext uri="{91240B29-F687-4f45-9708-019B960494DF}">
-                  <a14:hiddenLine xmlns="" xmlns:a14="http://schemas.microsoft.com/office/drawing/2010/main" w="9525">
+                  <a14:hiddenLine xmlns:a14="http://schemas.microsoft.com/office/drawing/2010/main" xmlns="" w="9525">
                     <a:solidFill>
                       <a:srgbClr val="000000"/>
                     </a:solidFill>
@@ -12776,7 +12781,7 @@
               </a:ln>
               <a:extLst>
                 <a:ext uri="{91240B29-F687-4f45-9708-019B960494DF}">
-                  <a14:hiddenLine xmlns="" xmlns:a14="http://schemas.microsoft.com/office/drawing/2010/main" w="9525">
+                  <a14:hiddenLine xmlns:a14="http://schemas.microsoft.com/office/drawing/2010/main" xmlns="" w="9525">
                     <a:solidFill>
                       <a:srgbClr val="000000"/>
                     </a:solidFill>
@@ -12810,7 +12815,7 @@
               </a:ln>
               <a:extLst>
                 <a:ext uri="{91240B29-F687-4f45-9708-019B960494DF}">
-                  <a14:hiddenLine xmlns="" xmlns:a14="http://schemas.microsoft.com/office/drawing/2010/main" w="9525">
+                  <a14:hiddenLine xmlns:a14="http://schemas.microsoft.com/office/drawing/2010/main" xmlns="" w="9525">
                     <a:solidFill>
                       <a:srgbClr val="000000"/>
                     </a:solidFill>
@@ -13514,6 +13519,110 @@
           <p:cNvPr id="2" name="Title 1">
             <a:extLst>
               <a:ext uri="{FF2B5EF4-FFF2-40B4-BE49-F238E27FC236}">
+                <a16:creationId xmlns:a16="http://schemas.microsoft.com/office/drawing/2014/main" id="{2E652F23-F192-4408-AC0F-AD6D38A44423}"/>
+              </a:ext>
+            </a:extLst>
+          </p:cNvPr>
+          <p:cNvSpPr>
+            <a:spLocks noGrp="1"/>
+          </p:cNvSpPr>
+          <p:nvPr>
+            <p:ph type="title"/>
+          </p:nvPr>
+        </p:nvSpPr>
+        <p:spPr/>
+        <p:txBody>
+          <a:bodyPr/>
+          <a:lstStyle/>
+          <a:p>
+            <a:r>
+              <a:rPr lang="en-US" dirty="0"/>
+              <a:t>Setup GitHub</a:t>
+            </a:r>
+          </a:p>
+        </p:txBody>
+      </p:sp>
+      <p:sp>
+        <p:nvSpPr>
+          <p:cNvPr id="3" name="Content Placeholder 2">
+            <a:extLst>
+              <a:ext uri="{FF2B5EF4-FFF2-40B4-BE49-F238E27FC236}">
+                <a16:creationId xmlns:a16="http://schemas.microsoft.com/office/drawing/2014/main" id="{AFF4C461-2513-499C-93F2-C67681B7919B}"/>
+              </a:ext>
+            </a:extLst>
+          </p:cNvPr>
+          <p:cNvSpPr>
+            <a:spLocks noGrp="1"/>
+          </p:cNvSpPr>
+          <p:nvPr>
+            <p:ph idx="1"/>
+          </p:nvPr>
+        </p:nvSpPr>
+        <p:spPr/>
+        <p:txBody>
+          <a:bodyPr/>
+          <a:lstStyle/>
+          <a:p>
+            <a:r>
+              <a:rPr lang="en-US" dirty="0"/>
+              <a:t>Create an account at GitHub (if you don’t already have one)</a:t>
+            </a:r>
+          </a:p>
+          <a:p>
+            <a:r>
+              <a:rPr lang="en-US" dirty="0"/>
+              <a:t>Create a project in GitHub</a:t>
+            </a:r>
+          </a:p>
+          <a:p>
+            <a:r>
+              <a:rPr lang="en-US" dirty="0"/>
+              <a:t>Create a SSH key (if you don’t already have one)</a:t>
+            </a:r>
+          </a:p>
+          <a:p>
+            <a:r>
+              <a:rPr lang="en-US" dirty="0"/>
+              <a:t>Upload your key</a:t>
+            </a:r>
+          </a:p>
+        </p:txBody>
+      </p:sp>
+    </p:spTree>
+    <p:extLst>
+      <p:ext uri="{BB962C8B-B14F-4D97-AF65-F5344CB8AC3E}">
+        <p14:creationId xmlns:p14="http://schemas.microsoft.com/office/powerpoint/2010/main" val="1785871340"/>
+      </p:ext>
+    </p:extLst>
+  </p:cSld>
+  <p:clrMapOvr>
+    <a:masterClrMapping/>
+  </p:clrMapOvr>
+</p:sld>
+</file>
+
+<file path=ppt/slides/slide11.xml><?xml version="1.0" encoding="utf-8"?>
+<p:sld xmlns:a="http://schemas.openxmlformats.org/drawingml/2006/main" xmlns:r="http://schemas.openxmlformats.org/officeDocument/2006/relationships" xmlns:p="http://schemas.openxmlformats.org/presentationml/2006/main">
+  <p:cSld>
+    <p:spTree>
+      <p:nvGrpSpPr>
+        <p:cNvPr id="1" name=""/>
+        <p:cNvGrpSpPr/>
+        <p:nvPr/>
+      </p:nvGrpSpPr>
+      <p:grpSpPr>
+        <a:xfrm>
+          <a:off x="0" y="0"/>
+          <a:ext cx="0" cy="0"/>
+          <a:chOff x="0" y="0"/>
+          <a:chExt cx="0" cy="0"/>
+        </a:xfrm>
+      </p:grpSpPr>
+      <p:sp>
+        <p:nvSpPr>
+          <p:cNvPr id="2" name="Title 1">
+            <a:extLst>
+              <a:ext uri="{FF2B5EF4-FFF2-40B4-BE49-F238E27FC236}">
                 <a16:creationId xmlns:a16="http://schemas.microsoft.com/office/drawing/2014/main" id="{5F2DED2B-B4A1-4730-A890-FD28FD433D4D}"/>
               </a:ext>
             </a:extLst>
@@ -14131,7 +14240,7 @@
 </p:sld>
 </file>
 
-<file path=ppt/slides/slide11.xml><?xml version="1.0" encoding="utf-8"?>
+<file path=ppt/slides/slide12.xml><?xml version="1.0" encoding="utf-8"?>
 <p:sld xmlns:a="http://schemas.openxmlformats.org/drawingml/2006/main" xmlns:r="http://schemas.openxmlformats.org/officeDocument/2006/relationships" xmlns:p="http://schemas.openxmlformats.org/presentationml/2006/main">
   <p:cSld>
     <p:spTree>
@@ -14406,7 +14515,7 @@
 </p:sld>
 </file>
 
-<file path=ppt/slides/slide12.xml><?xml version="1.0" encoding="utf-8"?>
+<file path=ppt/slides/slide13.xml><?xml version="1.0" encoding="utf-8"?>
 <p:sld xmlns:a="http://schemas.openxmlformats.org/drawingml/2006/main" xmlns:r="http://schemas.openxmlformats.org/officeDocument/2006/relationships" xmlns:p="http://schemas.openxmlformats.org/presentationml/2006/main">
   <p:cSld>
     <p:spTree>
@@ -14494,7 +14603,7 @@
 </p:sld>
 </file>
 
-<file path=ppt/slides/slide13.xml><?xml version="1.0" encoding="utf-8"?>
+<file path=ppt/slides/slide14.xml><?xml version="1.0" encoding="utf-8"?>
 <p:sld xmlns:a="http://schemas.openxmlformats.org/drawingml/2006/main" xmlns:r="http://schemas.openxmlformats.org/officeDocument/2006/relationships" xmlns:p="http://schemas.openxmlformats.org/presentationml/2006/main">
   <p:cSld>
     <p:spTree>
@@ -14719,7 +14828,7 @@
 </p:sld>
 </file>
 
-<file path=ppt/slides/slide14.xml><?xml version="1.0" encoding="utf-8"?>
+<file path=ppt/slides/slide15.xml><?xml version="1.0" encoding="utf-8"?>
 <p:sld xmlns:a="http://schemas.openxmlformats.org/drawingml/2006/main" xmlns:r="http://schemas.openxmlformats.org/officeDocument/2006/relationships" xmlns:p="http://schemas.openxmlformats.org/presentationml/2006/main">
   <p:cSld>
     <p:spTree>
@@ -14867,7 +14976,7 @@
 </p:sld>
 </file>
 
-<file path=ppt/slides/slide15.xml><?xml version="1.0" encoding="utf-8"?>
+<file path=ppt/slides/slide16.xml><?xml version="1.0" encoding="utf-8"?>
 <p:sld xmlns:a="http://schemas.openxmlformats.org/drawingml/2006/main" xmlns:r="http://schemas.openxmlformats.org/officeDocument/2006/relationships" xmlns:p="http://schemas.openxmlformats.org/presentationml/2006/main">
   <p:cSld>
     <p:spTree>
@@ -14955,7 +15064,7 @@
 </p:sld>
 </file>
 
-<file path=ppt/slides/slide16.xml><?xml version="1.0" encoding="utf-8"?>
+<file path=ppt/slides/slide17.xml><?xml version="1.0" encoding="utf-8"?>
 <p:sld xmlns:a="http://schemas.openxmlformats.org/drawingml/2006/main" xmlns:r="http://schemas.openxmlformats.org/officeDocument/2006/relationships" xmlns:p="http://schemas.openxmlformats.org/presentationml/2006/main">
   <p:cSld>
     <p:spTree>
@@ -15153,7 +15262,7 @@
 </p:sld>
 </file>
 
-<file path=ppt/slides/slide17.xml><?xml version="1.0" encoding="utf-8"?>
+<file path=ppt/slides/slide18.xml><?xml version="1.0" encoding="utf-8"?>
 <p:sld xmlns:a="http://schemas.openxmlformats.org/drawingml/2006/main" xmlns:r="http://schemas.openxmlformats.org/officeDocument/2006/relationships" xmlns:p="http://schemas.openxmlformats.org/presentationml/2006/main">
   <p:cSld>
     <p:spTree>
@@ -15806,7 +15915,7 @@
 </p:sld>
 </file>
 
-<file path=ppt/slides/slide18.xml><?xml version="1.0" encoding="utf-8"?>
+<file path=ppt/slides/slide19.xml><?xml version="1.0" encoding="utf-8"?>
 <p:sld xmlns:a="http://schemas.openxmlformats.org/drawingml/2006/main" xmlns:r="http://schemas.openxmlformats.org/officeDocument/2006/relationships" xmlns:p="http://schemas.openxmlformats.org/presentationml/2006/main">
   <p:cSld>
     <p:spTree>
@@ -16071,7 +16180,131 @@
 </p:sld>
 </file>
 
-<file path=ppt/slides/slide19.xml><?xml version="1.0" encoding="utf-8"?>
+<file path=ppt/slides/slide2.xml><?xml version="1.0" encoding="utf-8"?>
+<p:sld xmlns:a="http://schemas.openxmlformats.org/drawingml/2006/main" xmlns:r="http://schemas.openxmlformats.org/officeDocument/2006/relationships" xmlns:p="http://schemas.openxmlformats.org/presentationml/2006/main">
+  <p:cSld>
+    <p:spTree>
+      <p:nvGrpSpPr>
+        <p:cNvPr id="1" name=""/>
+        <p:cNvGrpSpPr/>
+        <p:nvPr/>
+      </p:nvGrpSpPr>
+      <p:grpSpPr>
+        <a:xfrm>
+          <a:off x="0" y="0"/>
+          <a:ext cx="0" cy="0"/>
+          <a:chOff x="0" y="0"/>
+          <a:chExt cx="0" cy="0"/>
+        </a:xfrm>
+      </p:grpSpPr>
+      <p:sp>
+        <p:nvSpPr>
+          <p:cNvPr id="2" name="Title 1">
+            <a:extLst>
+              <a:ext uri="{FF2B5EF4-FFF2-40B4-BE49-F238E27FC236}">
+                <a16:creationId xmlns:a16="http://schemas.microsoft.com/office/drawing/2014/main" id="{A2ABC8B5-47CB-4BEE-8494-E467B6CC9168}"/>
+              </a:ext>
+            </a:extLst>
+          </p:cNvPr>
+          <p:cNvSpPr>
+            <a:spLocks noGrp="1"/>
+          </p:cNvSpPr>
+          <p:nvPr>
+            <p:ph type="title"/>
+          </p:nvPr>
+        </p:nvSpPr>
+        <p:spPr/>
+        <p:txBody>
+          <a:bodyPr/>
+          <a:lstStyle/>
+          <a:p>
+            <a:r>
+              <a:rPr lang="en-US" dirty="0"/>
+              <a:t>Agenda</a:t>
+            </a:r>
+          </a:p>
+        </p:txBody>
+      </p:sp>
+      <p:sp>
+        <p:nvSpPr>
+          <p:cNvPr id="3" name="Content Placeholder 2">
+            <a:extLst>
+              <a:ext uri="{FF2B5EF4-FFF2-40B4-BE49-F238E27FC236}">
+                <a16:creationId xmlns:a16="http://schemas.microsoft.com/office/drawing/2014/main" id="{6209AEB7-A47B-4E65-860C-BAE2F427B214}"/>
+              </a:ext>
+            </a:extLst>
+          </p:cNvPr>
+          <p:cNvSpPr>
+            <a:spLocks noGrp="1"/>
+          </p:cNvSpPr>
+          <p:nvPr>
+            <p:ph idx="1"/>
+          </p:nvPr>
+        </p:nvSpPr>
+        <p:spPr/>
+        <p:txBody>
+          <a:bodyPr>
+            <a:normAutofit fontScale="92500" lnSpcReduction="10000"/>
+          </a:bodyPr>
+          <a:lstStyle/>
+          <a:p>
+            <a:r>
+              <a:rPr lang="en-US" dirty="0"/>
+              <a:t>Definitions</a:t>
+            </a:r>
+          </a:p>
+          <a:p>
+            <a:r>
+              <a:rPr lang="en-US" dirty="0"/>
+              <a:t>Tools</a:t>
+            </a:r>
+          </a:p>
+          <a:p>
+            <a:r>
+              <a:rPr lang="en-US" dirty="0"/>
+              <a:t>Application</a:t>
+            </a:r>
+          </a:p>
+          <a:p>
+            <a:r>
+              <a:rPr lang="en-US" dirty="0"/>
+              <a:t>Build System</a:t>
+            </a:r>
+          </a:p>
+          <a:p>
+            <a:r>
+              <a:rPr lang="en-US" dirty="0"/>
+              <a:t>Code Coverage</a:t>
+            </a:r>
+          </a:p>
+          <a:p>
+            <a:r>
+              <a:rPr lang="en-US" dirty="0"/>
+              <a:t>Code Analysis</a:t>
+            </a:r>
+          </a:p>
+          <a:p>
+            <a:r>
+              <a:rPr lang="en-US" dirty="0"/>
+              <a:t>Hosting</a:t>
+            </a:r>
+          </a:p>
+        </p:txBody>
+      </p:sp>
+    </p:spTree>
+    <p:extLst>
+      <p:ext uri="{BB962C8B-B14F-4D97-AF65-F5344CB8AC3E}">
+        <p14:creationId xmlns:p14="http://schemas.microsoft.com/office/powerpoint/2010/main" val="567128038"/>
+      </p:ext>
+    </p:extLst>
+  </p:cSld>
+  <p:clrMapOvr>
+    <a:masterClrMapping/>
+  </p:clrMapOvr>
+</p:sld>
+</file>
+
+<file path=ppt/slides/slide20.xml><?xml version="1.0" encoding="utf-8"?>
 <p:sld xmlns:a="http://schemas.openxmlformats.org/drawingml/2006/main" xmlns:r="http://schemas.openxmlformats.org/officeDocument/2006/relationships" xmlns:p="http://schemas.openxmlformats.org/presentationml/2006/main">
   <p:cSld>
     <p:spTree>
@@ -16408,131 +16641,7 @@
 </p:sld>
 </file>
 
-<file path=ppt/slides/slide2.xml><?xml version="1.0" encoding="utf-8"?>
-<p:sld xmlns:a="http://schemas.openxmlformats.org/drawingml/2006/main" xmlns:r="http://schemas.openxmlformats.org/officeDocument/2006/relationships" xmlns:p="http://schemas.openxmlformats.org/presentationml/2006/main">
-  <p:cSld>
-    <p:spTree>
-      <p:nvGrpSpPr>
-        <p:cNvPr id="1" name=""/>
-        <p:cNvGrpSpPr/>
-        <p:nvPr/>
-      </p:nvGrpSpPr>
-      <p:grpSpPr>
-        <a:xfrm>
-          <a:off x="0" y="0"/>
-          <a:ext cx="0" cy="0"/>
-          <a:chOff x="0" y="0"/>
-          <a:chExt cx="0" cy="0"/>
-        </a:xfrm>
-      </p:grpSpPr>
-      <p:sp>
-        <p:nvSpPr>
-          <p:cNvPr id="2" name="Title 1">
-            <a:extLst>
-              <a:ext uri="{FF2B5EF4-FFF2-40B4-BE49-F238E27FC236}">
-                <a16:creationId xmlns:a16="http://schemas.microsoft.com/office/drawing/2014/main" id="{A2ABC8B5-47CB-4BEE-8494-E467B6CC9168}"/>
-              </a:ext>
-            </a:extLst>
-          </p:cNvPr>
-          <p:cNvSpPr>
-            <a:spLocks noGrp="1"/>
-          </p:cNvSpPr>
-          <p:nvPr>
-            <p:ph type="title"/>
-          </p:nvPr>
-        </p:nvSpPr>
-        <p:spPr/>
-        <p:txBody>
-          <a:bodyPr/>
-          <a:lstStyle/>
-          <a:p>
-            <a:r>
-              <a:rPr lang="en-US" dirty="0"/>
-              <a:t>Agenda</a:t>
-            </a:r>
-          </a:p>
-        </p:txBody>
-      </p:sp>
-      <p:sp>
-        <p:nvSpPr>
-          <p:cNvPr id="3" name="Content Placeholder 2">
-            <a:extLst>
-              <a:ext uri="{FF2B5EF4-FFF2-40B4-BE49-F238E27FC236}">
-                <a16:creationId xmlns:a16="http://schemas.microsoft.com/office/drawing/2014/main" id="{6209AEB7-A47B-4E65-860C-BAE2F427B214}"/>
-              </a:ext>
-            </a:extLst>
-          </p:cNvPr>
-          <p:cNvSpPr>
-            <a:spLocks noGrp="1"/>
-          </p:cNvSpPr>
-          <p:nvPr>
-            <p:ph idx="1"/>
-          </p:nvPr>
-        </p:nvSpPr>
-        <p:spPr/>
-        <p:txBody>
-          <a:bodyPr>
-            <a:normAutofit fontScale="92500" lnSpcReduction="10000"/>
-          </a:bodyPr>
-          <a:lstStyle/>
-          <a:p>
-            <a:r>
-              <a:rPr lang="en-US" dirty="0"/>
-              <a:t>Definitions</a:t>
-            </a:r>
-          </a:p>
-          <a:p>
-            <a:r>
-              <a:rPr lang="en-US" dirty="0"/>
-              <a:t>Tools</a:t>
-            </a:r>
-          </a:p>
-          <a:p>
-            <a:r>
-              <a:rPr lang="en-US" dirty="0"/>
-              <a:t>Application</a:t>
-            </a:r>
-          </a:p>
-          <a:p>
-            <a:r>
-              <a:rPr lang="en-US" dirty="0"/>
-              <a:t>Build System</a:t>
-            </a:r>
-          </a:p>
-          <a:p>
-            <a:r>
-              <a:rPr lang="en-US" dirty="0"/>
-              <a:t>Code Coverage</a:t>
-            </a:r>
-          </a:p>
-          <a:p>
-            <a:r>
-              <a:rPr lang="en-US" dirty="0"/>
-              <a:t>Code Analysis</a:t>
-            </a:r>
-          </a:p>
-          <a:p>
-            <a:r>
-              <a:rPr lang="en-US" dirty="0"/>
-              <a:t>Hosting</a:t>
-            </a:r>
-          </a:p>
-        </p:txBody>
-      </p:sp>
-    </p:spTree>
-    <p:extLst>
-      <p:ext uri="{BB962C8B-B14F-4D97-AF65-F5344CB8AC3E}">
-        <p14:creationId xmlns:p14="http://schemas.microsoft.com/office/powerpoint/2010/main" val="567128038"/>
-      </p:ext>
-    </p:extLst>
-  </p:cSld>
-  <p:clrMapOvr>
-    <a:masterClrMapping/>
-  </p:clrMapOvr>
-</p:sld>
-</file>
-
-<file path=ppt/slides/slide20.xml><?xml version="1.0" encoding="utf-8"?>
+<file path=ppt/slides/slide21.xml><?xml version="1.0" encoding="utf-8"?>
 <p:sld xmlns:a="http://schemas.openxmlformats.org/drawingml/2006/main" xmlns:r="http://schemas.openxmlformats.org/officeDocument/2006/relationships" xmlns:p="http://schemas.openxmlformats.org/presentationml/2006/main">
   <p:cSld>
     <p:spTree>
@@ -17100,7 +17209,7 @@
 </p:sld>
 </file>
 
-<file path=ppt/slides/slide21.xml><?xml version="1.0" encoding="utf-8"?>
+<file path=ppt/slides/slide22.xml><?xml version="1.0" encoding="utf-8"?>
 <p:sld xmlns:a="http://schemas.openxmlformats.org/drawingml/2006/main" xmlns:r="http://schemas.openxmlformats.org/officeDocument/2006/relationships" xmlns:p="http://schemas.openxmlformats.org/presentationml/2006/main">
   <p:cSld>
     <p:spTree>
@@ -17605,7 +17714,7 @@
 </p:sld>
 </file>
 
-<file path=ppt/slides/slide22.xml><?xml version="1.0" encoding="utf-8"?>
+<file path=ppt/slides/slide23.xml><?xml version="1.0" encoding="utf-8"?>
 <p:sld xmlns:a="http://schemas.openxmlformats.org/drawingml/2006/main" xmlns:r="http://schemas.openxmlformats.org/officeDocument/2006/relationships" xmlns:p="http://schemas.openxmlformats.org/presentationml/2006/main">
   <p:cSld>
     <p:spTree>
@@ -17698,7 +17807,7 @@
 </p:sld>
 </file>
 
-<file path=ppt/slides/slide23.xml><?xml version="1.0" encoding="utf-8"?>
+<file path=ppt/slides/slide24.xml><?xml version="1.0" encoding="utf-8"?>
 <p:sld xmlns:a="http://schemas.openxmlformats.org/drawingml/2006/main" xmlns:r="http://schemas.openxmlformats.org/officeDocument/2006/relationships" xmlns:p="http://schemas.openxmlformats.org/presentationml/2006/main">
   <p:cSld>
     <p:spTree>
@@ -17987,7 +18096,7 @@
 </p:sld>
 </file>
 
-<file path=ppt/slides/slide24.xml><?xml version="1.0" encoding="utf-8"?>
+<file path=ppt/slides/slide25.xml><?xml version="1.0" encoding="utf-8"?>
 <p:sld xmlns:a="http://schemas.openxmlformats.org/drawingml/2006/main" xmlns:r="http://schemas.openxmlformats.org/officeDocument/2006/relationships" xmlns:p="http://schemas.openxmlformats.org/presentationml/2006/main">
   <p:cSld>
     <p:spTree>
@@ -18079,7 +18188,7 @@
 </p:sld>
 </file>
 
-<file path=ppt/slides/slide25.xml><?xml version="1.0" encoding="utf-8"?>
+<file path=ppt/slides/slide26.xml><?xml version="1.0" encoding="utf-8"?>
 <p:sld xmlns:a="http://schemas.openxmlformats.org/drawingml/2006/main" xmlns:r="http://schemas.openxmlformats.org/officeDocument/2006/relationships" xmlns:p="http://schemas.openxmlformats.org/presentationml/2006/main">
   <p:cSld>
     <p:spTree>
@@ -18101,7 +18210,7 @@
           <p:cNvPr id="2" name="Title 1">
             <a:extLst>
               <a:ext uri="{FF2B5EF4-FFF2-40B4-BE49-F238E27FC236}">
-                <a16:creationId xmlns:a16="http://schemas.microsoft.com/office/drawing/2014/main" id="{DEDF95E6-31A7-4A4D-B81B-67A931C484D1}"/>
+                <a16:creationId xmlns:a16="http://schemas.microsoft.com/office/drawing/2014/main" id="{F46C3C21-9FB8-434C-83AF-66D73C9A2AF6}"/>
               </a:ext>
             </a:extLst>
           </p:cNvPr>
@@ -18119,7 +18228,7 @@
           <a:p>
             <a:r>
               <a:rPr lang="en-US" dirty="0"/>
-              <a:t>Links and credits</a:t>
+              <a:t>Let’s add Static Code Analysis</a:t>
             </a:r>
           </a:p>
         </p:txBody>
@@ -18129,7 +18238,7 @@
           <p:cNvPr id="3" name="Content Placeholder 2">
             <a:extLst>
               <a:ext uri="{FF2B5EF4-FFF2-40B4-BE49-F238E27FC236}">
-                <a16:creationId xmlns:a16="http://schemas.microsoft.com/office/drawing/2014/main" id="{854FB79B-E0E0-4106-9101-482D7D707EAC}"/>
+                <a16:creationId xmlns:a16="http://schemas.microsoft.com/office/drawing/2014/main" id="{714B690F-B449-486F-A0D8-B6B62B5B2CC9}"/>
               </a:ext>
             </a:extLst>
           </p:cNvPr>
@@ -18146,12 +18255,1388 @@
           <a:lstStyle/>
           <a:p>
             <a:r>
+              <a:rPr lang="en-US" dirty="0"/>
+              <a:t>Got to </a:t>
+            </a:r>
+            <a:r>
+              <a:rPr lang="en-US" dirty="0">
+                <a:hlinkClick r:id="rId2"/>
+              </a:rPr>
+              <a:t>https://sonarcloud.io</a:t>
+            </a:r>
+            <a:endParaRPr lang="en-US" dirty="0"/>
+          </a:p>
+          <a:p>
+            <a:r>
+              <a:rPr lang="en-US" dirty="0"/>
+              <a:t>Click on “Log-In”</a:t>
+            </a:r>
+          </a:p>
+        </p:txBody>
+      </p:sp>
+      <p:pic>
+        <p:nvPicPr>
+          <p:cNvPr id="4" name="Picture 3">
+            <a:extLst>
+              <a:ext uri="{FF2B5EF4-FFF2-40B4-BE49-F238E27FC236}">
+                <a16:creationId xmlns:a16="http://schemas.microsoft.com/office/drawing/2014/main" id="{F370C14C-4A1D-4198-A80F-2AE4C6442E4A}"/>
+              </a:ext>
+            </a:extLst>
+          </p:cNvPr>
+          <p:cNvPicPr>
+            <a:picLocks noChangeAspect="1"/>
+          </p:cNvPicPr>
+          <p:nvPr/>
+        </p:nvPicPr>
+        <p:blipFill>
+          <a:blip r:embed="rId3"/>
+          <a:stretch>
+            <a:fillRect/>
+          </a:stretch>
+        </p:blipFill>
+        <p:spPr>
+          <a:xfrm>
+            <a:off x="4942030" y="2052809"/>
+            <a:ext cx="2304762" cy="2752381"/>
+          </a:xfrm>
+          <a:prstGeom prst="rect">
+            <a:avLst/>
+          </a:prstGeom>
+        </p:spPr>
+      </p:pic>
+      <p:pic>
+        <p:nvPicPr>
+          <p:cNvPr id="5" name="Picture 4">
+            <a:extLst>
+              <a:ext uri="{FF2B5EF4-FFF2-40B4-BE49-F238E27FC236}">
+                <a16:creationId xmlns:a16="http://schemas.microsoft.com/office/drawing/2014/main" id="{1D581C22-C523-483E-882D-E29A38F52298}"/>
+              </a:ext>
+            </a:extLst>
+          </p:cNvPr>
+          <p:cNvPicPr>
+            <a:picLocks noChangeAspect="1"/>
+          </p:cNvPicPr>
+          <p:nvPr/>
+        </p:nvPicPr>
+        <p:blipFill>
+          <a:blip r:embed="rId4"/>
+          <a:stretch>
+            <a:fillRect/>
+          </a:stretch>
+        </p:blipFill>
+        <p:spPr>
+          <a:xfrm>
+            <a:off x="3575363" y="695665"/>
+            <a:ext cx="5038095" cy="5466667"/>
+          </a:xfrm>
+          <a:prstGeom prst="rect">
+            <a:avLst/>
+          </a:prstGeom>
+        </p:spPr>
+      </p:pic>
+      <p:pic>
+        <p:nvPicPr>
+          <p:cNvPr id="6" name="Picture 5">
+            <a:extLst>
+              <a:ext uri="{FF2B5EF4-FFF2-40B4-BE49-F238E27FC236}">
+                <a16:creationId xmlns:a16="http://schemas.microsoft.com/office/drawing/2014/main" id="{B8218711-A752-4DB5-AF1C-7A5D4BA9B396}"/>
+              </a:ext>
+            </a:extLst>
+          </p:cNvPr>
+          <p:cNvPicPr>
+            <a:picLocks noChangeAspect="1"/>
+          </p:cNvPicPr>
+          <p:nvPr/>
+        </p:nvPicPr>
+        <p:blipFill>
+          <a:blip r:embed="rId5"/>
+          <a:stretch>
+            <a:fillRect/>
+          </a:stretch>
+        </p:blipFill>
+        <p:spPr>
+          <a:xfrm>
+            <a:off x="2286476" y="2181381"/>
+            <a:ext cx="7619048" cy="2495238"/>
+          </a:xfrm>
+          <a:prstGeom prst="rect">
+            <a:avLst/>
+          </a:prstGeom>
+          <a:ln>
+            <a:solidFill>
+              <a:schemeClr val="bg1"/>
+            </a:solidFill>
+          </a:ln>
+        </p:spPr>
+      </p:pic>
+      <p:pic>
+        <p:nvPicPr>
+          <p:cNvPr id="7" name="Picture 6">
+            <a:extLst>
+              <a:ext uri="{FF2B5EF4-FFF2-40B4-BE49-F238E27FC236}">
+                <a16:creationId xmlns:a16="http://schemas.microsoft.com/office/drawing/2014/main" id="{0EDF359E-2D34-4693-AA12-96122346641E}"/>
+              </a:ext>
+            </a:extLst>
+          </p:cNvPr>
+          <p:cNvPicPr>
+            <a:picLocks noChangeAspect="1"/>
+          </p:cNvPicPr>
+          <p:nvPr/>
+        </p:nvPicPr>
+        <p:blipFill>
+          <a:blip r:embed="rId6"/>
+          <a:stretch>
+            <a:fillRect/>
+          </a:stretch>
+        </p:blipFill>
+        <p:spPr>
+          <a:xfrm>
+            <a:off x="1700000" y="1750196"/>
+            <a:ext cx="8788819" cy="3357604"/>
+          </a:xfrm>
+          <a:prstGeom prst="rect">
+            <a:avLst/>
+          </a:prstGeom>
+          <a:ln>
+            <a:solidFill>
+              <a:schemeClr val="bg1"/>
+            </a:solidFill>
+          </a:ln>
+        </p:spPr>
+      </p:pic>
+      <p:pic>
+        <p:nvPicPr>
+          <p:cNvPr id="8" name="Picture 7">
+            <a:extLst>
+              <a:ext uri="{FF2B5EF4-FFF2-40B4-BE49-F238E27FC236}">
+                <a16:creationId xmlns:a16="http://schemas.microsoft.com/office/drawing/2014/main" id="{8AD71F15-B16D-4B45-833B-FA48E4F08D1F}"/>
+              </a:ext>
+            </a:extLst>
+          </p:cNvPr>
+          <p:cNvPicPr>
+            <a:picLocks noChangeAspect="1"/>
+          </p:cNvPicPr>
+          <p:nvPr/>
+        </p:nvPicPr>
+        <p:blipFill>
+          <a:blip r:embed="rId7"/>
+          <a:stretch>
+            <a:fillRect/>
+          </a:stretch>
+        </p:blipFill>
+        <p:spPr>
+          <a:xfrm>
+            <a:off x="982301" y="1220407"/>
+            <a:ext cx="10224215" cy="4417181"/>
+          </a:xfrm>
+          <a:prstGeom prst="rect">
+            <a:avLst/>
+          </a:prstGeom>
+          <a:ln>
+            <a:solidFill>
+              <a:schemeClr val="bg1"/>
+            </a:solidFill>
+          </a:ln>
+        </p:spPr>
+      </p:pic>
+    </p:spTree>
+    <p:extLst>
+      <p:ext uri="{BB962C8B-B14F-4D97-AF65-F5344CB8AC3E}">
+        <p14:creationId xmlns:p14="http://schemas.microsoft.com/office/powerpoint/2010/main" val="543713316"/>
+      </p:ext>
+    </p:extLst>
+  </p:cSld>
+  <p:clrMapOvr>
+    <a:masterClrMapping/>
+  </p:clrMapOvr>
+  <p:timing>
+    <p:tnLst>
+      <p:par>
+        <p:cTn id="1" dur="indefinite" restart="never" nodeType="tmRoot">
+          <p:childTnLst>
+            <p:seq concurrent="1" nextAc="seek">
+              <p:cTn id="2" dur="indefinite" nodeType="mainSeq">
+                <p:childTnLst>
+                  <p:par>
+                    <p:cTn id="3" fill="hold">
+                      <p:stCondLst>
+                        <p:cond delay="indefinite"/>
+                      </p:stCondLst>
+                      <p:childTnLst>
+                        <p:par>
+                          <p:cTn id="4" fill="hold">
+                            <p:stCondLst>
+                              <p:cond delay="0"/>
+                            </p:stCondLst>
+                            <p:childTnLst>
+                              <p:par>
+                                <p:cTn id="5" presetID="1" presetClass="entr" presetSubtype="0" fill="hold" nodeType="clickEffect">
+                                  <p:stCondLst>
+                                    <p:cond delay="0"/>
+                                  </p:stCondLst>
+                                  <p:childTnLst>
+                                    <p:set>
+                                      <p:cBhvr>
+                                        <p:cTn id="6" dur="1" fill="hold">
+                                          <p:stCondLst>
+                                            <p:cond delay="0"/>
+                                          </p:stCondLst>
+                                        </p:cTn>
+                                        <p:tgtEl>
+                                          <p:spTgt spid="4"/>
+                                        </p:tgtEl>
+                                        <p:attrNameLst>
+                                          <p:attrName>style.visibility</p:attrName>
+                                        </p:attrNameLst>
+                                      </p:cBhvr>
+                                      <p:to>
+                                        <p:strVal val="visible"/>
+                                      </p:to>
+                                    </p:set>
+                                  </p:childTnLst>
+                                </p:cTn>
+                              </p:par>
+                            </p:childTnLst>
+                          </p:cTn>
+                        </p:par>
+                      </p:childTnLst>
+                    </p:cTn>
+                  </p:par>
+                  <p:par>
+                    <p:cTn id="7" fill="hold">
+                      <p:stCondLst>
+                        <p:cond delay="indefinite"/>
+                      </p:stCondLst>
+                      <p:childTnLst>
+                        <p:par>
+                          <p:cTn id="8" fill="hold">
+                            <p:stCondLst>
+                              <p:cond delay="0"/>
+                            </p:stCondLst>
+                            <p:childTnLst>
+                              <p:par>
+                                <p:cTn id="9" presetID="1" presetClass="entr" presetSubtype="0" fill="hold" nodeType="clickEffect">
+                                  <p:stCondLst>
+                                    <p:cond delay="0"/>
+                                  </p:stCondLst>
+                                  <p:childTnLst>
+                                    <p:set>
+                                      <p:cBhvr>
+                                        <p:cTn id="10" dur="1" fill="hold">
+                                          <p:stCondLst>
+                                            <p:cond delay="0"/>
+                                          </p:stCondLst>
+                                        </p:cTn>
+                                        <p:tgtEl>
+                                          <p:spTgt spid="5"/>
+                                        </p:tgtEl>
+                                        <p:attrNameLst>
+                                          <p:attrName>style.visibility</p:attrName>
+                                        </p:attrNameLst>
+                                      </p:cBhvr>
+                                      <p:to>
+                                        <p:strVal val="visible"/>
+                                      </p:to>
+                                    </p:set>
+                                  </p:childTnLst>
+                                </p:cTn>
+                              </p:par>
+                            </p:childTnLst>
+                          </p:cTn>
+                        </p:par>
+                      </p:childTnLst>
+                    </p:cTn>
+                  </p:par>
+                  <p:par>
+                    <p:cTn id="11" fill="hold">
+                      <p:stCondLst>
+                        <p:cond delay="indefinite"/>
+                      </p:stCondLst>
+                      <p:childTnLst>
+                        <p:par>
+                          <p:cTn id="12" fill="hold">
+                            <p:stCondLst>
+                              <p:cond delay="0"/>
+                            </p:stCondLst>
+                            <p:childTnLst>
+                              <p:par>
+                                <p:cTn id="13" presetID="1" presetClass="entr" presetSubtype="0" fill="hold" nodeType="clickEffect">
+                                  <p:stCondLst>
+                                    <p:cond delay="0"/>
+                                  </p:stCondLst>
+                                  <p:childTnLst>
+                                    <p:set>
+                                      <p:cBhvr>
+                                        <p:cTn id="14" dur="1" fill="hold">
+                                          <p:stCondLst>
+                                            <p:cond delay="0"/>
+                                          </p:stCondLst>
+                                        </p:cTn>
+                                        <p:tgtEl>
+                                          <p:spTgt spid="6"/>
+                                        </p:tgtEl>
+                                        <p:attrNameLst>
+                                          <p:attrName>style.visibility</p:attrName>
+                                        </p:attrNameLst>
+                                      </p:cBhvr>
+                                      <p:to>
+                                        <p:strVal val="visible"/>
+                                      </p:to>
+                                    </p:set>
+                                  </p:childTnLst>
+                                </p:cTn>
+                              </p:par>
+                            </p:childTnLst>
+                          </p:cTn>
+                        </p:par>
+                      </p:childTnLst>
+                    </p:cTn>
+                  </p:par>
+                  <p:par>
+                    <p:cTn id="15" fill="hold">
+                      <p:stCondLst>
+                        <p:cond delay="indefinite"/>
+                      </p:stCondLst>
+                      <p:childTnLst>
+                        <p:par>
+                          <p:cTn id="16" fill="hold">
+                            <p:stCondLst>
+                              <p:cond delay="0"/>
+                            </p:stCondLst>
+                            <p:childTnLst>
+                              <p:par>
+                                <p:cTn id="17" presetID="1" presetClass="entr" presetSubtype="0" fill="hold" nodeType="clickEffect">
+                                  <p:stCondLst>
+                                    <p:cond delay="0"/>
+                                  </p:stCondLst>
+                                  <p:childTnLst>
+                                    <p:set>
+                                      <p:cBhvr>
+                                        <p:cTn id="18" dur="1" fill="hold">
+                                          <p:stCondLst>
+                                            <p:cond delay="0"/>
+                                          </p:stCondLst>
+                                        </p:cTn>
+                                        <p:tgtEl>
+                                          <p:spTgt spid="7"/>
+                                        </p:tgtEl>
+                                        <p:attrNameLst>
+                                          <p:attrName>style.visibility</p:attrName>
+                                        </p:attrNameLst>
+                                      </p:cBhvr>
+                                      <p:to>
+                                        <p:strVal val="visible"/>
+                                      </p:to>
+                                    </p:set>
+                                  </p:childTnLst>
+                                </p:cTn>
+                              </p:par>
+                            </p:childTnLst>
+                          </p:cTn>
+                        </p:par>
+                      </p:childTnLst>
+                    </p:cTn>
+                  </p:par>
+                </p:childTnLst>
+              </p:cTn>
+              <p:prevCondLst>
+                <p:cond evt="onPrev" delay="0">
+                  <p:tgtEl>
+                    <p:sldTgt/>
+                  </p:tgtEl>
+                </p:cond>
+              </p:prevCondLst>
+              <p:nextCondLst>
+                <p:cond evt="onNext" delay="0">
+                  <p:tgtEl>
+                    <p:sldTgt/>
+                  </p:tgtEl>
+                </p:cond>
+              </p:nextCondLst>
+            </p:seq>
+          </p:childTnLst>
+        </p:cTn>
+      </p:par>
+    </p:tnLst>
+  </p:timing>
+</p:sld>
+</file>
+
+<file path=ppt/slides/slide27.xml><?xml version="1.0" encoding="utf-8"?>
+<p:sld xmlns:a="http://schemas.openxmlformats.org/drawingml/2006/main" xmlns:r="http://schemas.openxmlformats.org/officeDocument/2006/relationships" xmlns:p="http://schemas.openxmlformats.org/presentationml/2006/main">
+  <p:cSld>
+    <p:spTree>
+      <p:nvGrpSpPr>
+        <p:cNvPr id="1" name=""/>
+        <p:cNvGrpSpPr/>
+        <p:nvPr/>
+      </p:nvGrpSpPr>
+      <p:grpSpPr>
+        <a:xfrm>
+          <a:off x="0" y="0"/>
+          <a:ext cx="0" cy="0"/>
+          <a:chOff x="0" y="0"/>
+          <a:chExt cx="0" cy="0"/>
+        </a:xfrm>
+      </p:grpSpPr>
+      <p:sp>
+        <p:nvSpPr>
+          <p:cNvPr id="2" name="Title 1">
+            <a:extLst>
+              <a:ext uri="{FF2B5EF4-FFF2-40B4-BE49-F238E27FC236}">
+                <a16:creationId xmlns:a16="http://schemas.microsoft.com/office/drawing/2014/main" id="{FF3642D6-EEE1-46B3-9007-536E9568FA15}"/>
+              </a:ext>
+            </a:extLst>
+          </p:cNvPr>
+          <p:cNvSpPr>
+            <a:spLocks noGrp="1"/>
+          </p:cNvSpPr>
+          <p:nvPr>
+            <p:ph type="title"/>
+          </p:nvPr>
+        </p:nvSpPr>
+        <p:spPr/>
+        <p:txBody>
+          <a:bodyPr/>
+          <a:lstStyle/>
+          <a:p>
+            <a:r>
+              <a:rPr lang="en-US" dirty="0"/>
+              <a:t>Aww…</a:t>
+            </a:r>
+          </a:p>
+        </p:txBody>
+      </p:sp>
+      <p:sp>
+        <p:nvSpPr>
+          <p:cNvPr id="3" name="Content Placeholder 2">
+            <a:extLst>
+              <a:ext uri="{FF2B5EF4-FFF2-40B4-BE49-F238E27FC236}">
+                <a16:creationId xmlns:a16="http://schemas.microsoft.com/office/drawing/2014/main" id="{A07354DA-3843-46A1-ACC9-C2691170D8C4}"/>
+              </a:ext>
+            </a:extLst>
+          </p:cNvPr>
+          <p:cNvSpPr>
+            <a:spLocks noGrp="1"/>
+          </p:cNvSpPr>
+          <p:nvPr>
+            <p:ph idx="1"/>
+          </p:nvPr>
+        </p:nvSpPr>
+        <p:spPr/>
+        <p:txBody>
+          <a:bodyPr/>
+          <a:lstStyle/>
+          <a:p>
+            <a:r>
+              <a:rPr lang="en-US" dirty="0"/>
+              <a:t>We need to download the </a:t>
+            </a:r>
+            <a:r>
               <a:rPr lang="en-US" dirty="0" err="1"/>
-              <a:t>Opencover</a:t>
+              <a:t>SonarScanner</a:t>
             </a:r>
             <a:r>
               <a:rPr lang="en-US" dirty="0"/>
-              <a:t>: https://github.com/opencover/opencover/wiki/Usage</a:t>
+              <a:t> for </a:t>
+            </a:r>
+            <a:r>
+              <a:rPr lang="en-US" dirty="0" err="1"/>
+              <a:t>MSBuild</a:t>
+            </a:r>
+            <a:endParaRPr lang="en-US" dirty="0"/>
+          </a:p>
+          <a:p>
+            <a:r>
+              <a:rPr lang="en-US" dirty="0"/>
+              <a:t>We’ll add the download in the </a:t>
+            </a:r>
+            <a:r>
+              <a:rPr lang="en-US" dirty="0" err="1"/>
+              <a:t>before_build</a:t>
+            </a:r>
+            <a:r>
+              <a:rPr lang="en-US" dirty="0"/>
+              <a:t> step</a:t>
+            </a:r>
+          </a:p>
+        </p:txBody>
+      </p:sp>
+      <p:sp>
+        <p:nvSpPr>
+          <p:cNvPr id="4" name="Content Placeholder 2">
+            <a:extLst>
+              <a:ext uri="{FF2B5EF4-FFF2-40B4-BE49-F238E27FC236}">
+                <a16:creationId xmlns:a16="http://schemas.microsoft.com/office/drawing/2014/main" id="{55A2E9F3-487C-432E-B0CA-BC274B173411}"/>
+              </a:ext>
+            </a:extLst>
+          </p:cNvPr>
+          <p:cNvSpPr txBox="1">
+            <a:spLocks/>
+          </p:cNvSpPr>
+          <p:nvPr/>
+        </p:nvSpPr>
+        <p:spPr>
+          <a:xfrm>
+            <a:off x="1141413" y="1735831"/>
+            <a:ext cx="9905998" cy="4503651"/>
+          </a:xfrm>
+          <a:prstGeom prst="rect">
+            <a:avLst/>
+          </a:prstGeom>
+          <a:solidFill>
+            <a:schemeClr val="bg1"/>
+          </a:solidFill>
+        </p:spPr>
+        <p:txBody>
+          <a:bodyPr vert="horz" lIns="91440" tIns="45720" rIns="91440" bIns="45720" rtlCol="0">
+            <a:normAutofit lnSpcReduction="10000"/>
+          </a:bodyPr>
+          <a:lstStyle>
+            <a:lvl1pPr marL="228600" indent="-228600" algn="l" defTabSz="914400" rtl="0" eaLnBrk="1" latinLnBrk="0" hangingPunct="1">
+              <a:lnSpc>
+                <a:spcPct val="120000"/>
+              </a:lnSpc>
+              <a:spcBef>
+                <a:spcPts val="1000"/>
+              </a:spcBef>
+              <a:buSzPct val="125000"/>
+              <a:buFont typeface="Arial" panose="020B0604020202020204" pitchFamily="34" charset="0"/>
+              <a:buChar char="•"/>
+              <a:defRPr sz="2400" kern="1200">
+                <a:solidFill>
+                  <a:schemeClr val="tx1"/>
+                </a:solidFill>
+                <a:latin typeface="+mn-lt"/>
+                <a:ea typeface="+mn-ea"/>
+                <a:cs typeface="+mn-cs"/>
+              </a:defRPr>
+            </a:lvl1pPr>
+            <a:lvl2pPr marL="685800" indent="-228600" algn="l" defTabSz="914400" rtl="0" eaLnBrk="1" latinLnBrk="0" hangingPunct="1">
+              <a:lnSpc>
+                <a:spcPct val="120000"/>
+              </a:lnSpc>
+              <a:spcBef>
+                <a:spcPts val="500"/>
+              </a:spcBef>
+              <a:buSzPct val="125000"/>
+              <a:buFont typeface="Arial" panose="020B0604020202020204" pitchFamily="34" charset="0"/>
+              <a:buChar char="•"/>
+              <a:defRPr sz="2000" kern="1200">
+                <a:solidFill>
+                  <a:schemeClr val="tx1"/>
+                </a:solidFill>
+                <a:latin typeface="+mn-lt"/>
+                <a:ea typeface="+mn-ea"/>
+                <a:cs typeface="+mn-cs"/>
+              </a:defRPr>
+            </a:lvl2pPr>
+            <a:lvl3pPr marL="1143000" indent="-228600" algn="l" defTabSz="914400" rtl="0" eaLnBrk="1" latinLnBrk="0" hangingPunct="1">
+              <a:lnSpc>
+                <a:spcPct val="120000"/>
+              </a:lnSpc>
+              <a:spcBef>
+                <a:spcPts val="500"/>
+              </a:spcBef>
+              <a:buSzPct val="125000"/>
+              <a:buFont typeface="Arial" panose="020B0604020202020204" pitchFamily="34" charset="0"/>
+              <a:buChar char="•"/>
+              <a:defRPr sz="1800" kern="1200">
+                <a:solidFill>
+                  <a:schemeClr val="tx1"/>
+                </a:solidFill>
+                <a:latin typeface="+mn-lt"/>
+                <a:ea typeface="+mn-ea"/>
+                <a:cs typeface="+mn-cs"/>
+              </a:defRPr>
+            </a:lvl3pPr>
+            <a:lvl4pPr marL="1600200" indent="-228600" algn="l" defTabSz="914400" rtl="0" eaLnBrk="1" latinLnBrk="0" hangingPunct="1">
+              <a:lnSpc>
+                <a:spcPct val="120000"/>
+              </a:lnSpc>
+              <a:spcBef>
+                <a:spcPts val="500"/>
+              </a:spcBef>
+              <a:buSzPct val="125000"/>
+              <a:buFont typeface="Arial" panose="020B0604020202020204" pitchFamily="34" charset="0"/>
+              <a:buChar char="•"/>
+              <a:defRPr sz="1600" kern="1200">
+                <a:solidFill>
+                  <a:schemeClr val="tx1"/>
+                </a:solidFill>
+                <a:latin typeface="+mn-lt"/>
+                <a:ea typeface="+mn-ea"/>
+                <a:cs typeface="+mn-cs"/>
+              </a:defRPr>
+            </a:lvl4pPr>
+            <a:lvl5pPr marL="2057400" indent="-228600" algn="l" defTabSz="914400" rtl="0" eaLnBrk="1" latinLnBrk="0" hangingPunct="1">
+              <a:lnSpc>
+                <a:spcPct val="120000"/>
+              </a:lnSpc>
+              <a:spcBef>
+                <a:spcPts val="500"/>
+              </a:spcBef>
+              <a:buSzPct val="125000"/>
+              <a:buFont typeface="Arial" panose="020B0604020202020204" pitchFamily="34" charset="0"/>
+              <a:buChar char="•"/>
+              <a:defRPr sz="1600" kern="1200">
+                <a:solidFill>
+                  <a:schemeClr val="tx1"/>
+                </a:solidFill>
+                <a:latin typeface="+mn-lt"/>
+                <a:ea typeface="+mn-ea"/>
+                <a:cs typeface="+mn-cs"/>
+              </a:defRPr>
+            </a:lvl5pPr>
+            <a:lvl6pPr marL="2514600" indent="-228600" algn="l" defTabSz="914400" rtl="0" eaLnBrk="1" latinLnBrk="0" hangingPunct="1">
+              <a:lnSpc>
+                <a:spcPct val="120000"/>
+              </a:lnSpc>
+              <a:spcBef>
+                <a:spcPts val="500"/>
+              </a:spcBef>
+              <a:buSzPct val="125000"/>
+              <a:buFont typeface="Arial" panose="020B0604020202020204" pitchFamily="34" charset="0"/>
+              <a:buChar char="•"/>
+              <a:defRPr sz="1400" kern="1200">
+                <a:solidFill>
+                  <a:schemeClr val="tx1"/>
+                </a:solidFill>
+                <a:latin typeface="+mn-lt"/>
+                <a:ea typeface="+mn-ea"/>
+                <a:cs typeface="+mn-cs"/>
+              </a:defRPr>
+            </a:lvl6pPr>
+            <a:lvl7pPr marL="2971800" indent="-228600" algn="l" defTabSz="914400" rtl="0" eaLnBrk="1" latinLnBrk="0" hangingPunct="1">
+              <a:lnSpc>
+                <a:spcPct val="120000"/>
+              </a:lnSpc>
+              <a:spcBef>
+                <a:spcPts val="500"/>
+              </a:spcBef>
+              <a:buSzPct val="125000"/>
+              <a:buFont typeface="Arial" panose="020B0604020202020204" pitchFamily="34" charset="0"/>
+              <a:buChar char="•"/>
+              <a:defRPr sz="1400" kern="1200">
+                <a:solidFill>
+                  <a:schemeClr val="tx1"/>
+                </a:solidFill>
+                <a:latin typeface="+mn-lt"/>
+                <a:ea typeface="+mn-ea"/>
+                <a:cs typeface="+mn-cs"/>
+              </a:defRPr>
+            </a:lvl7pPr>
+            <a:lvl8pPr marL="3429000" indent="-228600" algn="l" defTabSz="914400" rtl="0" eaLnBrk="1" latinLnBrk="0" hangingPunct="1">
+              <a:lnSpc>
+                <a:spcPct val="120000"/>
+              </a:lnSpc>
+              <a:spcBef>
+                <a:spcPts val="500"/>
+              </a:spcBef>
+              <a:buSzPct val="125000"/>
+              <a:buFont typeface="Arial" panose="020B0604020202020204" pitchFamily="34" charset="0"/>
+              <a:buChar char="•"/>
+              <a:defRPr sz="1400" kern="1200">
+                <a:solidFill>
+                  <a:schemeClr val="tx1"/>
+                </a:solidFill>
+                <a:latin typeface="+mn-lt"/>
+                <a:ea typeface="+mn-ea"/>
+                <a:cs typeface="+mn-cs"/>
+              </a:defRPr>
+            </a:lvl8pPr>
+            <a:lvl9pPr marL="3886200" indent="-228600" algn="l" defTabSz="914400" rtl="0" eaLnBrk="1" latinLnBrk="0" hangingPunct="1">
+              <a:lnSpc>
+                <a:spcPct val="120000"/>
+              </a:lnSpc>
+              <a:spcBef>
+                <a:spcPts val="500"/>
+              </a:spcBef>
+              <a:buSzPct val="125000"/>
+              <a:buFont typeface="Arial" panose="020B0604020202020204" pitchFamily="34" charset="0"/>
+              <a:buChar char="•"/>
+              <a:defRPr sz="1400" kern="1200">
+                <a:solidFill>
+                  <a:schemeClr val="tx1"/>
+                </a:solidFill>
+                <a:latin typeface="+mn-lt"/>
+                <a:ea typeface="+mn-ea"/>
+                <a:cs typeface="+mn-cs"/>
+              </a:defRPr>
+            </a:lvl9pPr>
+          </a:lstStyle>
+          <a:p>
+            <a:r>
+              <a:rPr lang="en-US" dirty="0"/>
+              <a:t>Add in the </a:t>
+            </a:r>
+            <a:r>
+              <a:rPr lang="en-US" dirty="0" err="1"/>
+              <a:t>appveyor.yml</a:t>
+            </a:r>
+            <a:r>
+              <a:rPr lang="en-US" dirty="0"/>
+              <a:t> file</a:t>
+            </a:r>
+          </a:p>
+          <a:p>
+            <a:pPr marL="0" indent="0">
+              <a:buNone/>
+            </a:pPr>
+            <a:endParaRPr lang="en-US" dirty="0">
+              <a:solidFill>
+                <a:srgbClr val="92D050"/>
+              </a:solidFill>
+            </a:endParaRPr>
+          </a:p>
+          <a:p>
+            <a:pPr marL="0" indent="0">
+              <a:buNone/>
+            </a:pPr>
+            <a:r>
+              <a:rPr lang="en-US" dirty="0">
+                <a:solidFill>
+                  <a:srgbClr val="92D050"/>
+                </a:solidFill>
+              </a:rPr>
+              <a:t>Invoke-</a:t>
+            </a:r>
+            <a:r>
+              <a:rPr lang="en-US" dirty="0" err="1">
+                <a:solidFill>
+                  <a:srgbClr val="92D050"/>
+                </a:solidFill>
+              </a:rPr>
+              <a:t>WebRequest</a:t>
+            </a:r>
+            <a:r>
+              <a:rPr lang="en-US" dirty="0">
+                <a:solidFill>
+                  <a:srgbClr val="92D050"/>
+                </a:solidFill>
+              </a:rPr>
+              <a:t> "https://github.com/</a:t>
+            </a:r>
+            <a:r>
+              <a:rPr lang="en-US" dirty="0" err="1">
+                <a:solidFill>
+                  <a:srgbClr val="92D050"/>
+                </a:solidFill>
+              </a:rPr>
+              <a:t>SonarSource</a:t>
+            </a:r>
+            <a:r>
+              <a:rPr lang="en-US" dirty="0">
+                <a:solidFill>
+                  <a:srgbClr val="92D050"/>
+                </a:solidFill>
+              </a:rPr>
+              <a:t>/sonar-scanner-</a:t>
+            </a:r>
+            <a:r>
+              <a:rPr lang="en-US" dirty="0" err="1">
+                <a:solidFill>
+                  <a:srgbClr val="92D050"/>
+                </a:solidFill>
+              </a:rPr>
+              <a:t>msbuild</a:t>
+            </a:r>
+            <a:r>
+              <a:rPr lang="en-US" dirty="0">
+                <a:solidFill>
+                  <a:srgbClr val="92D050"/>
+                </a:solidFill>
+              </a:rPr>
+              <a:t>/releases/download/4.3.1.1372/sonar-scanner-msbuild-4.3.1.1372-net46.zip" -</a:t>
+            </a:r>
+            <a:r>
+              <a:rPr lang="en-US" dirty="0" err="1">
+                <a:solidFill>
+                  <a:srgbClr val="92D050"/>
+                </a:solidFill>
+              </a:rPr>
+              <a:t>OutFile</a:t>
+            </a:r>
+            <a:r>
+              <a:rPr lang="en-US" dirty="0">
+                <a:solidFill>
+                  <a:srgbClr val="92D050"/>
+                </a:solidFill>
+              </a:rPr>
+              <a:t> "$</a:t>
+            </a:r>
+            <a:r>
+              <a:rPr lang="en-US" dirty="0" err="1">
+                <a:solidFill>
+                  <a:srgbClr val="92D050"/>
+                </a:solidFill>
+              </a:rPr>
+              <a:t>env:APPVEYOR_BUILD_FOLDER</a:t>
+            </a:r>
+            <a:r>
+              <a:rPr lang="en-US" dirty="0">
+                <a:solidFill>
+                  <a:srgbClr val="92D050"/>
+                </a:solidFill>
+              </a:rPr>
+              <a:t>\sonar-scanner-msbuild-4.2.0.1214-netcoreapp2.0.zip"</a:t>
+            </a:r>
+          </a:p>
+          <a:p>
+            <a:pPr marL="0" indent="0">
+              <a:buNone/>
+            </a:pPr>
+            <a:endParaRPr lang="en-US" dirty="0">
+              <a:solidFill>
+                <a:srgbClr val="92D050"/>
+              </a:solidFill>
+            </a:endParaRPr>
+          </a:p>
+          <a:p>
+            <a:pPr marL="0" indent="0">
+              <a:buNone/>
+            </a:pPr>
+            <a:r>
+              <a:rPr lang="en-US" dirty="0">
+                <a:solidFill>
+                  <a:srgbClr val="92D050"/>
+                </a:solidFill>
+              </a:rPr>
+              <a:t>7z x "$</a:t>
+            </a:r>
+            <a:r>
+              <a:rPr lang="en-US" dirty="0" err="1">
+                <a:solidFill>
+                  <a:srgbClr val="92D050"/>
+                </a:solidFill>
+              </a:rPr>
+              <a:t>env:APPVEYOR_BUILD_FOLDER</a:t>
+            </a:r>
+            <a:r>
+              <a:rPr lang="en-US" dirty="0">
+                <a:solidFill>
+                  <a:srgbClr val="92D050"/>
+                </a:solidFill>
+              </a:rPr>
+              <a:t>\sonar-scanner-msbuild-4.2.0.1214-netcoreapp2.0.zip" -o"$</a:t>
+            </a:r>
+            <a:r>
+              <a:rPr lang="en-US" dirty="0" err="1">
+                <a:solidFill>
+                  <a:srgbClr val="92D050"/>
+                </a:solidFill>
+              </a:rPr>
+              <a:t>env:APPVEYOR_BUILD_FOLDER</a:t>
+            </a:r>
+            <a:r>
+              <a:rPr lang="en-US" dirty="0">
+                <a:solidFill>
+                  <a:srgbClr val="92D050"/>
+                </a:solidFill>
+              </a:rPr>
+              <a:t>\sonar-scanner-</a:t>
+            </a:r>
+            <a:r>
+              <a:rPr lang="en-US" dirty="0" err="1">
+                <a:solidFill>
+                  <a:srgbClr val="92D050"/>
+                </a:solidFill>
+              </a:rPr>
+              <a:t>msbuild</a:t>
+            </a:r>
+            <a:r>
+              <a:rPr lang="en-US" dirty="0">
+                <a:solidFill>
+                  <a:srgbClr val="92D050"/>
+                </a:solidFill>
+              </a:rPr>
+              <a:t>"</a:t>
+            </a:r>
+          </a:p>
+        </p:txBody>
+      </p:sp>
+      <p:pic>
+        <p:nvPicPr>
+          <p:cNvPr id="5" name="Picture 4">
+            <a:extLst>
+              <a:ext uri="{FF2B5EF4-FFF2-40B4-BE49-F238E27FC236}">
+                <a16:creationId xmlns:a16="http://schemas.microsoft.com/office/drawing/2014/main" id="{3C005A63-3A5C-4C57-8083-B24E058B84F6}"/>
+              </a:ext>
+            </a:extLst>
+          </p:cNvPr>
+          <p:cNvPicPr>
+            <a:picLocks noChangeAspect="1"/>
+          </p:cNvPicPr>
+          <p:nvPr/>
+        </p:nvPicPr>
+        <p:blipFill>
+          <a:blip r:embed="rId2"/>
+          <a:stretch>
+            <a:fillRect/>
+          </a:stretch>
+        </p:blipFill>
+        <p:spPr>
+          <a:xfrm>
+            <a:off x="2608697" y="2010990"/>
+            <a:ext cx="6971428" cy="3495238"/>
+          </a:xfrm>
+          <a:prstGeom prst="rect">
+            <a:avLst/>
+          </a:prstGeom>
+          <a:ln w="19050">
+            <a:solidFill>
+              <a:schemeClr val="tx1"/>
+            </a:solidFill>
+          </a:ln>
+        </p:spPr>
+      </p:pic>
+      <p:cxnSp>
+        <p:nvCxnSpPr>
+          <p:cNvPr id="7" name="Straight Arrow Connector 6">
+            <a:extLst>
+              <a:ext uri="{FF2B5EF4-FFF2-40B4-BE49-F238E27FC236}">
+                <a16:creationId xmlns:a16="http://schemas.microsoft.com/office/drawing/2014/main" id="{FF937251-6016-45FD-A0D5-3D01302597F0}"/>
+              </a:ext>
+            </a:extLst>
+          </p:cNvPr>
+          <p:cNvCxnSpPr/>
+          <p:nvPr/>
+        </p:nvCxnSpPr>
+        <p:spPr>
+          <a:xfrm flipH="1">
+            <a:off x="7304567" y="3758609"/>
+            <a:ext cx="659219" cy="1026042"/>
+          </a:xfrm>
+          <a:prstGeom prst="straightConnector1">
+            <a:avLst/>
+          </a:prstGeom>
+          <a:ln w="76200">
+            <a:solidFill>
+              <a:schemeClr val="accent2"/>
+            </a:solidFill>
+            <a:tailEnd type="triangle"/>
+          </a:ln>
+        </p:spPr>
+        <p:style>
+          <a:lnRef idx="1">
+            <a:schemeClr val="accent1"/>
+          </a:lnRef>
+          <a:fillRef idx="0">
+            <a:schemeClr val="accent1"/>
+          </a:fillRef>
+          <a:effectRef idx="0">
+            <a:schemeClr val="accent1"/>
+          </a:effectRef>
+          <a:fontRef idx="minor">
+            <a:schemeClr val="tx1"/>
+          </a:fontRef>
+        </p:style>
+      </p:cxnSp>
+    </p:spTree>
+    <p:extLst>
+      <p:ext uri="{BB962C8B-B14F-4D97-AF65-F5344CB8AC3E}">
+        <p14:creationId xmlns:p14="http://schemas.microsoft.com/office/powerpoint/2010/main" val="2992100361"/>
+      </p:ext>
+    </p:extLst>
+  </p:cSld>
+  <p:clrMapOvr>
+    <a:masterClrMapping/>
+  </p:clrMapOvr>
+  <p:timing>
+    <p:tnLst>
+      <p:par>
+        <p:cTn id="1" dur="indefinite" restart="never" nodeType="tmRoot">
+          <p:childTnLst>
+            <p:seq concurrent="1" nextAc="seek">
+              <p:cTn id="2" dur="indefinite" nodeType="mainSeq">
+                <p:childTnLst>
+                  <p:par>
+                    <p:cTn id="3" fill="hold">
+                      <p:stCondLst>
+                        <p:cond delay="indefinite"/>
+                      </p:stCondLst>
+                      <p:childTnLst>
+                        <p:par>
+                          <p:cTn id="4" fill="hold">
+                            <p:stCondLst>
+                              <p:cond delay="0"/>
+                            </p:stCondLst>
+                            <p:childTnLst>
+                              <p:par>
+                                <p:cTn id="5" presetID="1" presetClass="entr" presetSubtype="0" fill="hold" grpId="0" nodeType="clickEffect">
+                                  <p:stCondLst>
+                                    <p:cond delay="0"/>
+                                  </p:stCondLst>
+                                  <p:childTnLst>
+                                    <p:set>
+                                      <p:cBhvr>
+                                        <p:cTn id="6" dur="1" fill="hold">
+                                          <p:stCondLst>
+                                            <p:cond delay="0"/>
+                                          </p:stCondLst>
+                                        </p:cTn>
+                                        <p:tgtEl>
+                                          <p:spTgt spid="4"/>
+                                        </p:tgtEl>
+                                        <p:attrNameLst>
+                                          <p:attrName>style.visibility</p:attrName>
+                                        </p:attrNameLst>
+                                      </p:cBhvr>
+                                      <p:to>
+                                        <p:strVal val="visible"/>
+                                      </p:to>
+                                    </p:set>
+                                  </p:childTnLst>
+                                </p:cTn>
+                              </p:par>
+                            </p:childTnLst>
+                          </p:cTn>
+                        </p:par>
+                      </p:childTnLst>
+                    </p:cTn>
+                  </p:par>
+                  <p:par>
+                    <p:cTn id="7" fill="hold">
+                      <p:stCondLst>
+                        <p:cond delay="indefinite"/>
+                      </p:stCondLst>
+                      <p:childTnLst>
+                        <p:par>
+                          <p:cTn id="8" fill="hold">
+                            <p:stCondLst>
+                              <p:cond delay="0"/>
+                            </p:stCondLst>
+                            <p:childTnLst>
+                              <p:par>
+                                <p:cTn id="9" presetID="1" presetClass="entr" presetSubtype="0" fill="hold" nodeType="clickEffect">
+                                  <p:stCondLst>
+                                    <p:cond delay="0"/>
+                                  </p:stCondLst>
+                                  <p:childTnLst>
+                                    <p:set>
+                                      <p:cBhvr>
+                                        <p:cTn id="10" dur="1" fill="hold">
+                                          <p:stCondLst>
+                                            <p:cond delay="0"/>
+                                          </p:stCondLst>
+                                        </p:cTn>
+                                        <p:tgtEl>
+                                          <p:spTgt spid="5"/>
+                                        </p:tgtEl>
+                                        <p:attrNameLst>
+                                          <p:attrName>style.visibility</p:attrName>
+                                        </p:attrNameLst>
+                                      </p:cBhvr>
+                                      <p:to>
+                                        <p:strVal val="visible"/>
+                                      </p:to>
+                                    </p:set>
+                                  </p:childTnLst>
+                                </p:cTn>
+                              </p:par>
+                              <p:par>
+                                <p:cTn id="11" presetID="1" presetClass="entr" presetSubtype="0" fill="hold" nodeType="withEffect">
+                                  <p:stCondLst>
+                                    <p:cond delay="0"/>
+                                  </p:stCondLst>
+                                  <p:childTnLst>
+                                    <p:set>
+                                      <p:cBhvr>
+                                        <p:cTn id="12" dur="1" fill="hold">
+                                          <p:stCondLst>
+                                            <p:cond delay="0"/>
+                                          </p:stCondLst>
+                                        </p:cTn>
+                                        <p:tgtEl>
+                                          <p:spTgt spid="7"/>
+                                        </p:tgtEl>
+                                        <p:attrNameLst>
+                                          <p:attrName>style.visibility</p:attrName>
+                                        </p:attrNameLst>
+                                      </p:cBhvr>
+                                      <p:to>
+                                        <p:strVal val="visible"/>
+                                      </p:to>
+                                    </p:set>
+                                  </p:childTnLst>
+                                </p:cTn>
+                              </p:par>
+                            </p:childTnLst>
+                          </p:cTn>
+                        </p:par>
+                      </p:childTnLst>
+                    </p:cTn>
+                  </p:par>
+                </p:childTnLst>
+              </p:cTn>
+              <p:prevCondLst>
+                <p:cond evt="onPrev" delay="0">
+                  <p:tgtEl>
+                    <p:sldTgt/>
+                  </p:tgtEl>
+                </p:cond>
+              </p:prevCondLst>
+              <p:nextCondLst>
+                <p:cond evt="onNext" delay="0">
+                  <p:tgtEl>
+                    <p:sldTgt/>
+                  </p:tgtEl>
+                </p:cond>
+              </p:nextCondLst>
+            </p:seq>
+          </p:childTnLst>
+        </p:cTn>
+      </p:par>
+    </p:tnLst>
+    <p:bldLst>
+      <p:bldP spid="4" grpId="0" animBg="1"/>
+    </p:bldLst>
+  </p:timing>
+</p:sld>
+</file>
+
+<file path=ppt/slides/slide28.xml><?xml version="1.0" encoding="utf-8"?>
+<p:sld xmlns:a="http://schemas.openxmlformats.org/drawingml/2006/main" xmlns:r="http://schemas.openxmlformats.org/officeDocument/2006/relationships" xmlns:p="http://schemas.openxmlformats.org/presentationml/2006/main">
+  <p:cSld>
+    <p:spTree>
+      <p:nvGrpSpPr>
+        <p:cNvPr id="1" name=""/>
+        <p:cNvGrpSpPr/>
+        <p:nvPr/>
+      </p:nvGrpSpPr>
+      <p:grpSpPr>
+        <a:xfrm>
+          <a:off x="0" y="0"/>
+          <a:ext cx="0" cy="0"/>
+          <a:chOff x="0" y="0"/>
+          <a:chExt cx="0" cy="0"/>
+        </a:xfrm>
+      </p:grpSpPr>
+      <p:sp>
+        <p:nvSpPr>
+          <p:cNvPr id="2" name="Title 1">
+            <a:extLst>
+              <a:ext uri="{FF2B5EF4-FFF2-40B4-BE49-F238E27FC236}">
+                <a16:creationId xmlns:a16="http://schemas.microsoft.com/office/drawing/2014/main" id="{812B660A-7C73-49A9-AFBB-6E767351EBC1}"/>
+              </a:ext>
+            </a:extLst>
+          </p:cNvPr>
+          <p:cNvSpPr>
+            <a:spLocks noGrp="1"/>
+          </p:cNvSpPr>
+          <p:nvPr>
+            <p:ph type="title"/>
+          </p:nvPr>
+        </p:nvSpPr>
+        <p:spPr/>
+        <p:txBody>
+          <a:bodyPr/>
+          <a:lstStyle/>
+          <a:p>
+            <a:r>
+              <a:rPr lang="en-US" dirty="0"/>
+              <a:t>Creating a Secret Key</a:t>
+            </a:r>
+          </a:p>
+        </p:txBody>
+      </p:sp>
+      <p:sp>
+        <p:nvSpPr>
+          <p:cNvPr id="3" name="Content Placeholder 2">
+            <a:extLst>
+              <a:ext uri="{FF2B5EF4-FFF2-40B4-BE49-F238E27FC236}">
+                <a16:creationId xmlns:a16="http://schemas.microsoft.com/office/drawing/2014/main" id="{1A2C28B3-F560-41A5-B716-6285527342E5}"/>
+              </a:ext>
+            </a:extLst>
+          </p:cNvPr>
+          <p:cNvSpPr>
+            <a:spLocks noGrp="1"/>
+          </p:cNvSpPr>
+          <p:nvPr>
+            <p:ph idx="1"/>
+          </p:nvPr>
+        </p:nvSpPr>
+        <p:spPr/>
+        <p:txBody>
+          <a:bodyPr/>
+          <a:lstStyle/>
+          <a:p>
+            <a:r>
+              <a:rPr lang="en-US" dirty="0"/>
+              <a:t>Go to </a:t>
+            </a:r>
+            <a:r>
+              <a:rPr lang="en-US" dirty="0">
+                <a:hlinkClick r:id="rId2"/>
+              </a:rPr>
+              <a:t>https://ci.appveyor.com/tools/encrypt</a:t>
+            </a:r>
+            <a:r>
+              <a:rPr lang="en-US" dirty="0"/>
+              <a:t> </a:t>
+            </a:r>
+          </a:p>
+        </p:txBody>
+      </p:sp>
+      <p:pic>
+        <p:nvPicPr>
+          <p:cNvPr id="4" name="Picture 3">
+            <a:extLst>
+              <a:ext uri="{FF2B5EF4-FFF2-40B4-BE49-F238E27FC236}">
+                <a16:creationId xmlns:a16="http://schemas.microsoft.com/office/drawing/2014/main" id="{AF30D60A-82C5-40B1-8D86-8235AFBE2026}"/>
+              </a:ext>
+            </a:extLst>
+          </p:cNvPr>
+          <p:cNvPicPr>
+            <a:picLocks noChangeAspect="1"/>
+          </p:cNvPicPr>
+          <p:nvPr/>
+        </p:nvPicPr>
+        <p:blipFill>
+          <a:blip r:embed="rId3"/>
+          <a:stretch>
+            <a:fillRect/>
+          </a:stretch>
+        </p:blipFill>
+        <p:spPr>
+          <a:xfrm>
+            <a:off x="1600762" y="1319476"/>
+            <a:ext cx="8990476" cy="4219048"/>
+          </a:xfrm>
+          <a:prstGeom prst="rect">
+            <a:avLst/>
+          </a:prstGeom>
+        </p:spPr>
+      </p:pic>
+    </p:spTree>
+    <p:extLst>
+      <p:ext uri="{BB962C8B-B14F-4D97-AF65-F5344CB8AC3E}">
+        <p14:creationId xmlns:p14="http://schemas.microsoft.com/office/powerpoint/2010/main" val="4158488861"/>
+      </p:ext>
+    </p:extLst>
+  </p:cSld>
+  <p:clrMapOvr>
+    <a:masterClrMapping/>
+  </p:clrMapOvr>
+  <p:timing>
+    <p:tnLst>
+      <p:par>
+        <p:cTn id="1" dur="indefinite" restart="never" nodeType="tmRoot">
+          <p:childTnLst>
+            <p:seq concurrent="1" nextAc="seek">
+              <p:cTn id="2" dur="indefinite" nodeType="mainSeq">
+                <p:childTnLst>
+                  <p:par>
+                    <p:cTn id="3" fill="hold">
+                      <p:stCondLst>
+                        <p:cond delay="indefinite"/>
+                      </p:stCondLst>
+                      <p:childTnLst>
+                        <p:par>
+                          <p:cTn id="4" fill="hold">
+                            <p:stCondLst>
+                              <p:cond delay="0"/>
+                            </p:stCondLst>
+                            <p:childTnLst>
+                              <p:par>
+                                <p:cTn id="5" presetID="1" presetClass="entr" presetSubtype="0" fill="hold" nodeType="clickEffect">
+                                  <p:stCondLst>
+                                    <p:cond delay="0"/>
+                                  </p:stCondLst>
+                                  <p:childTnLst>
+                                    <p:set>
+                                      <p:cBhvr>
+                                        <p:cTn id="6" dur="1" fill="hold">
+                                          <p:stCondLst>
+                                            <p:cond delay="0"/>
+                                          </p:stCondLst>
+                                        </p:cTn>
+                                        <p:tgtEl>
+                                          <p:spTgt spid="4"/>
+                                        </p:tgtEl>
+                                        <p:attrNameLst>
+                                          <p:attrName>style.visibility</p:attrName>
+                                        </p:attrNameLst>
+                                      </p:cBhvr>
+                                      <p:to>
+                                        <p:strVal val="visible"/>
+                                      </p:to>
+                                    </p:set>
+                                  </p:childTnLst>
+                                </p:cTn>
+                              </p:par>
+                            </p:childTnLst>
+                          </p:cTn>
+                        </p:par>
+                      </p:childTnLst>
+                    </p:cTn>
+                  </p:par>
+                </p:childTnLst>
+              </p:cTn>
+              <p:prevCondLst>
+                <p:cond evt="onPrev" delay="0">
+                  <p:tgtEl>
+                    <p:sldTgt/>
+                  </p:tgtEl>
+                </p:cond>
+              </p:prevCondLst>
+              <p:nextCondLst>
+                <p:cond evt="onNext" delay="0">
+                  <p:tgtEl>
+                    <p:sldTgt/>
+                  </p:tgtEl>
+                </p:cond>
+              </p:nextCondLst>
+            </p:seq>
+          </p:childTnLst>
+        </p:cTn>
+      </p:par>
+    </p:tnLst>
+  </p:timing>
+</p:sld>
+</file>
+
+<file path=ppt/slides/slide29.xml><?xml version="1.0" encoding="utf-8"?>
+<p:sld xmlns:a="http://schemas.openxmlformats.org/drawingml/2006/main" xmlns:r="http://schemas.openxmlformats.org/officeDocument/2006/relationships" xmlns:p="http://schemas.openxmlformats.org/presentationml/2006/main">
+  <p:cSld>
+    <p:spTree>
+      <p:nvGrpSpPr>
+        <p:cNvPr id="1" name=""/>
+        <p:cNvGrpSpPr/>
+        <p:nvPr/>
+      </p:nvGrpSpPr>
+      <p:grpSpPr>
+        <a:xfrm>
+          <a:off x="0" y="0"/>
+          <a:ext cx="0" cy="0"/>
+          <a:chOff x="0" y="0"/>
+          <a:chExt cx="0" cy="0"/>
+        </a:xfrm>
+      </p:grpSpPr>
+      <p:sp>
+        <p:nvSpPr>
+          <p:cNvPr id="2" name="Title 1">
+            <a:extLst>
+              <a:ext uri="{FF2B5EF4-FFF2-40B4-BE49-F238E27FC236}">
+                <a16:creationId xmlns:a16="http://schemas.microsoft.com/office/drawing/2014/main" id="{F7212976-CC62-4E86-8BFE-5FB75A184687}"/>
+              </a:ext>
+            </a:extLst>
+          </p:cNvPr>
+          <p:cNvSpPr>
+            <a:spLocks noGrp="1"/>
+          </p:cNvSpPr>
+          <p:nvPr>
+            <p:ph type="title"/>
+          </p:nvPr>
+        </p:nvSpPr>
+        <p:spPr/>
+        <p:txBody>
+          <a:bodyPr/>
+          <a:lstStyle/>
+          <a:p>
+            <a:r>
+              <a:rPr lang="en-US" dirty="0"/>
+              <a:t>Now let’s configure the analysis</a:t>
             </a:r>
           </a:p>
         </p:txBody>
@@ -18159,7 +19644,7 @@
     </p:spTree>
     <p:extLst>
       <p:ext uri="{BB962C8B-B14F-4D97-AF65-F5344CB8AC3E}">
-        <p14:creationId xmlns:p14="http://schemas.microsoft.com/office/powerpoint/2010/main" val="3021987684"/>
+        <p14:creationId xmlns:p14="http://schemas.microsoft.com/office/powerpoint/2010/main" val="2223655246"/>
       </p:ext>
     </p:extLst>
   </p:cSld>
@@ -18278,6 +19763,96 @@
     <p:extLst>
       <p:ext uri="{BB962C8B-B14F-4D97-AF65-F5344CB8AC3E}">
         <p14:creationId xmlns:p14="http://schemas.microsoft.com/office/powerpoint/2010/main" val="3634496765"/>
+      </p:ext>
+    </p:extLst>
+  </p:cSld>
+  <p:clrMapOvr>
+    <a:masterClrMapping/>
+  </p:clrMapOvr>
+</p:sld>
+</file>
+
+<file path=ppt/slides/slide30.xml><?xml version="1.0" encoding="utf-8"?>
+<p:sld xmlns:a="http://schemas.openxmlformats.org/drawingml/2006/main" xmlns:r="http://schemas.openxmlformats.org/officeDocument/2006/relationships" xmlns:p="http://schemas.openxmlformats.org/presentationml/2006/main">
+  <p:cSld>
+    <p:spTree>
+      <p:nvGrpSpPr>
+        <p:cNvPr id="1" name=""/>
+        <p:cNvGrpSpPr/>
+        <p:nvPr/>
+      </p:nvGrpSpPr>
+      <p:grpSpPr>
+        <a:xfrm>
+          <a:off x="0" y="0"/>
+          <a:ext cx="0" cy="0"/>
+          <a:chOff x="0" y="0"/>
+          <a:chExt cx="0" cy="0"/>
+        </a:xfrm>
+      </p:grpSpPr>
+      <p:sp>
+        <p:nvSpPr>
+          <p:cNvPr id="2" name="Title 1">
+            <a:extLst>
+              <a:ext uri="{FF2B5EF4-FFF2-40B4-BE49-F238E27FC236}">
+                <a16:creationId xmlns:a16="http://schemas.microsoft.com/office/drawing/2014/main" id="{DEDF95E6-31A7-4A4D-B81B-67A931C484D1}"/>
+              </a:ext>
+            </a:extLst>
+          </p:cNvPr>
+          <p:cNvSpPr>
+            <a:spLocks noGrp="1"/>
+          </p:cNvSpPr>
+          <p:nvPr>
+            <p:ph type="title"/>
+          </p:nvPr>
+        </p:nvSpPr>
+        <p:spPr/>
+        <p:txBody>
+          <a:bodyPr/>
+          <a:lstStyle/>
+          <a:p>
+            <a:r>
+              <a:rPr lang="en-US" dirty="0"/>
+              <a:t>Links and credits</a:t>
+            </a:r>
+          </a:p>
+        </p:txBody>
+      </p:sp>
+      <p:sp>
+        <p:nvSpPr>
+          <p:cNvPr id="3" name="Content Placeholder 2">
+            <a:extLst>
+              <a:ext uri="{FF2B5EF4-FFF2-40B4-BE49-F238E27FC236}">
+                <a16:creationId xmlns:a16="http://schemas.microsoft.com/office/drawing/2014/main" id="{854FB79B-E0E0-4106-9101-482D7D707EAC}"/>
+              </a:ext>
+            </a:extLst>
+          </p:cNvPr>
+          <p:cNvSpPr>
+            <a:spLocks noGrp="1"/>
+          </p:cNvSpPr>
+          <p:nvPr>
+            <p:ph idx="1"/>
+          </p:nvPr>
+        </p:nvSpPr>
+        <p:spPr/>
+        <p:txBody>
+          <a:bodyPr/>
+          <a:lstStyle/>
+          <a:p>
+            <a:r>
+              <a:rPr lang="en-US" dirty="0" err="1"/>
+              <a:t>Opencover</a:t>
+            </a:r>
+            <a:r>
+              <a:rPr lang="en-US" dirty="0"/>
+              <a:t>: https://github.com/opencover/opencover/wiki/Usage</a:t>
+            </a:r>
+          </a:p>
+        </p:txBody>
+      </p:sp>
+    </p:spTree>
+    <p:extLst>
+      <p:ext uri="{BB962C8B-B14F-4D97-AF65-F5344CB8AC3E}">
+        <p14:creationId xmlns:p14="http://schemas.microsoft.com/office/powerpoint/2010/main" val="3021987684"/>
       </p:ext>
     </p:extLst>
   </p:cSld>
@@ -18505,8 +20080,15 @@
             <a:pPr algn="just"/>
             <a:r>
               <a:rPr lang="en-US" dirty="0"/>
-              <a:t>Chocolatey</a:t>
-            </a:r>
+              <a:t>Chocolatey (maybe not </a:t>
+            </a:r>
+            <a:r>
+              <a:rPr lang="en-US" dirty="0">
+                <a:sym typeface="Wingdings" panose="05000000000000000000" pitchFamily="2" charset="2"/>
+              </a:rPr>
+              <a:t> )</a:t>
+            </a:r>
+            <a:endParaRPr lang="en-US" dirty="0"/>
           </a:p>
         </p:txBody>
       </p:sp>
@@ -18629,6 +20211,110 @@
 </file>
 
 <file path=ppt/slides/slide6.xml><?xml version="1.0" encoding="utf-8"?>
+<p:sld xmlns:a="http://schemas.openxmlformats.org/drawingml/2006/main" xmlns:r="http://schemas.openxmlformats.org/officeDocument/2006/relationships" xmlns:p="http://schemas.openxmlformats.org/presentationml/2006/main">
+  <p:cSld>
+    <p:spTree>
+      <p:nvGrpSpPr>
+        <p:cNvPr id="1" name=""/>
+        <p:cNvGrpSpPr/>
+        <p:nvPr/>
+      </p:nvGrpSpPr>
+      <p:grpSpPr>
+        <a:xfrm>
+          <a:off x="0" y="0"/>
+          <a:ext cx="0" cy="0"/>
+          <a:chOff x="0" y="0"/>
+          <a:chExt cx="0" cy="0"/>
+        </a:xfrm>
+      </p:grpSpPr>
+      <p:sp>
+        <p:nvSpPr>
+          <p:cNvPr id="2" name="Title 1">
+            <a:extLst>
+              <a:ext uri="{FF2B5EF4-FFF2-40B4-BE49-F238E27FC236}">
+                <a16:creationId xmlns:a16="http://schemas.microsoft.com/office/drawing/2014/main" id="{9689C3B6-16FA-4C9D-84EF-3F02FD6A983A}"/>
+              </a:ext>
+            </a:extLst>
+          </p:cNvPr>
+          <p:cNvSpPr>
+            <a:spLocks noGrp="1"/>
+          </p:cNvSpPr>
+          <p:nvPr>
+            <p:ph type="title"/>
+          </p:nvPr>
+        </p:nvSpPr>
+        <p:spPr/>
+        <p:txBody>
+          <a:bodyPr/>
+          <a:lstStyle/>
+          <a:p>
+            <a:r>
+              <a:rPr lang="en-US" dirty="0"/>
+              <a:t>Codeshare.io</a:t>
+            </a:r>
+          </a:p>
+        </p:txBody>
+      </p:sp>
+      <p:sp>
+        <p:nvSpPr>
+          <p:cNvPr id="3" name="Content Placeholder 2">
+            <a:extLst>
+              <a:ext uri="{FF2B5EF4-FFF2-40B4-BE49-F238E27FC236}">
+                <a16:creationId xmlns:a16="http://schemas.microsoft.com/office/drawing/2014/main" id="{1265587A-CFC7-45D8-B348-49DAA7E399D6}"/>
+              </a:ext>
+            </a:extLst>
+          </p:cNvPr>
+          <p:cNvSpPr>
+            <a:spLocks noGrp="1"/>
+          </p:cNvSpPr>
+          <p:nvPr>
+            <p:ph idx="1"/>
+          </p:nvPr>
+        </p:nvSpPr>
+        <p:spPr/>
+        <p:txBody>
+          <a:bodyPr/>
+          <a:lstStyle/>
+          <a:p>
+            <a:r>
+              <a:rPr lang="en-US" dirty="0"/>
+              <a:t>I will paste links and long content to</a:t>
+            </a:r>
+          </a:p>
+          <a:p>
+            <a:endParaRPr lang="en-US" dirty="0"/>
+          </a:p>
+          <a:p>
+            <a:pPr marL="0" indent="0">
+              <a:buNone/>
+            </a:pPr>
+            <a:r>
+              <a:rPr lang="en-US" sz="3600" dirty="0">
+                <a:hlinkClick r:id="rId2"/>
+              </a:rPr>
+              <a:t>https://codeshare.io/TechAtAgoda20180804</a:t>
+            </a:r>
+            <a:r>
+              <a:rPr lang="en-US" dirty="0"/>
+              <a:t> </a:t>
+            </a:r>
+          </a:p>
+        </p:txBody>
+      </p:sp>
+    </p:spTree>
+    <p:extLst>
+      <p:ext uri="{BB962C8B-B14F-4D97-AF65-F5344CB8AC3E}">
+        <p14:creationId xmlns:p14="http://schemas.microsoft.com/office/powerpoint/2010/main" val="652135047"/>
+      </p:ext>
+    </p:extLst>
+  </p:cSld>
+  <p:clrMapOvr>
+    <a:masterClrMapping/>
+  </p:clrMapOvr>
+</p:sld>
+</file>
+
+<file path=ppt/slides/slide7.xml><?xml version="1.0" encoding="utf-8"?>
 <p:sld xmlns:a="http://schemas.openxmlformats.org/drawingml/2006/main" xmlns:r="http://schemas.openxmlformats.org/officeDocument/2006/relationships" xmlns:p="http://schemas.openxmlformats.org/presentationml/2006/main">
   <p:cSld>
     <p:spTree>
@@ -20657,7 +22343,7 @@
 </p:sld>
 </file>
 
-<file path=ppt/slides/slide7.xml><?xml version="1.0" encoding="utf-8"?>
+<file path=ppt/slides/slide8.xml><?xml version="1.0" encoding="utf-8"?>
 <p:sld xmlns:a="http://schemas.openxmlformats.org/drawingml/2006/main" xmlns:r="http://schemas.openxmlformats.org/officeDocument/2006/relationships" xmlns:p="http://schemas.openxmlformats.org/presentationml/2006/main">
   <p:cSld>
     <p:spTree>
@@ -21056,7 +22742,7 @@
 </p:sld>
 </file>
 
-<file path=ppt/slides/slide8.xml><?xml version="1.0" encoding="utf-8"?>
+<file path=ppt/slides/slide9.xml><?xml version="1.0" encoding="utf-8"?>
 <p:sld xmlns:a="http://schemas.openxmlformats.org/drawingml/2006/main" xmlns:r="http://schemas.openxmlformats.org/officeDocument/2006/relationships" xmlns:p="http://schemas.openxmlformats.org/presentationml/2006/main">
   <p:cSld>
     <p:spTree>
@@ -21375,110 +23061,6 @@
       <p:bldP spid="5" grpId="0" animBg="1"/>
     </p:bldLst>
   </p:timing>
-</p:sld>
-</file>
-
-<file path=ppt/slides/slide9.xml><?xml version="1.0" encoding="utf-8"?>
-<p:sld xmlns:a="http://schemas.openxmlformats.org/drawingml/2006/main" xmlns:r="http://schemas.openxmlformats.org/officeDocument/2006/relationships" xmlns:p="http://schemas.openxmlformats.org/presentationml/2006/main">
-  <p:cSld>
-    <p:spTree>
-      <p:nvGrpSpPr>
-        <p:cNvPr id="1" name=""/>
-        <p:cNvGrpSpPr/>
-        <p:nvPr/>
-      </p:nvGrpSpPr>
-      <p:grpSpPr>
-        <a:xfrm>
-          <a:off x="0" y="0"/>
-          <a:ext cx="0" cy="0"/>
-          <a:chOff x="0" y="0"/>
-          <a:chExt cx="0" cy="0"/>
-        </a:xfrm>
-      </p:grpSpPr>
-      <p:sp>
-        <p:nvSpPr>
-          <p:cNvPr id="2" name="Title 1">
-            <a:extLst>
-              <a:ext uri="{FF2B5EF4-FFF2-40B4-BE49-F238E27FC236}">
-                <a16:creationId xmlns:a16="http://schemas.microsoft.com/office/drawing/2014/main" id="{2E652F23-F192-4408-AC0F-AD6D38A44423}"/>
-              </a:ext>
-            </a:extLst>
-          </p:cNvPr>
-          <p:cNvSpPr>
-            <a:spLocks noGrp="1"/>
-          </p:cNvSpPr>
-          <p:nvPr>
-            <p:ph type="title"/>
-          </p:nvPr>
-        </p:nvSpPr>
-        <p:spPr/>
-        <p:txBody>
-          <a:bodyPr/>
-          <a:lstStyle/>
-          <a:p>
-            <a:r>
-              <a:rPr lang="en-US" dirty="0"/>
-              <a:t>Setup GitHub</a:t>
-            </a:r>
-          </a:p>
-        </p:txBody>
-      </p:sp>
-      <p:sp>
-        <p:nvSpPr>
-          <p:cNvPr id="3" name="Content Placeholder 2">
-            <a:extLst>
-              <a:ext uri="{FF2B5EF4-FFF2-40B4-BE49-F238E27FC236}">
-                <a16:creationId xmlns:a16="http://schemas.microsoft.com/office/drawing/2014/main" id="{AFF4C461-2513-499C-93F2-C67681B7919B}"/>
-              </a:ext>
-            </a:extLst>
-          </p:cNvPr>
-          <p:cNvSpPr>
-            <a:spLocks noGrp="1"/>
-          </p:cNvSpPr>
-          <p:nvPr>
-            <p:ph idx="1"/>
-          </p:nvPr>
-        </p:nvSpPr>
-        <p:spPr/>
-        <p:txBody>
-          <a:bodyPr/>
-          <a:lstStyle/>
-          <a:p>
-            <a:r>
-              <a:rPr lang="en-US" dirty="0"/>
-              <a:t>Create an account at GitHub (if you don’t already have one)</a:t>
-            </a:r>
-          </a:p>
-          <a:p>
-            <a:r>
-              <a:rPr lang="en-US" dirty="0"/>
-              <a:t>Create a project in GitHub</a:t>
-            </a:r>
-          </a:p>
-          <a:p>
-            <a:r>
-              <a:rPr lang="en-US" dirty="0"/>
-              <a:t>Create a SSH key (if you don’t already have one)</a:t>
-            </a:r>
-          </a:p>
-          <a:p>
-            <a:r>
-              <a:rPr lang="en-US" dirty="0"/>
-              <a:t>Upload your key</a:t>
-            </a:r>
-          </a:p>
-        </p:txBody>
-      </p:sp>
-    </p:spTree>
-    <p:extLst>
-      <p:ext uri="{BB962C8B-B14F-4D97-AF65-F5344CB8AC3E}">
-        <p14:creationId xmlns:p14="http://schemas.microsoft.com/office/powerpoint/2010/main" val="1785871340"/>
-      </p:ext>
-    </p:extLst>
-  </p:cSld>
-  <p:clrMapOvr>
-    <a:masterClrMapping/>
-  </p:clrMapOvr>
 </p:sld>
 </file>
 

</xml_diff>

<commit_message>
Start commenting PR in github
</commit_message>
<xml_diff>
--- a/Presentation/Full Open-Source CI.pptx
+++ b/Presentation/Full Open-Source CI.pptx
@@ -36,7 +36,8 @@
     <p:sldId id="287" r:id="rId30"/>
     <p:sldId id="288" r:id="rId31"/>
     <p:sldId id="289" r:id="rId32"/>
-    <p:sldId id="273" r:id="rId33"/>
+    <p:sldId id="290" r:id="rId33"/>
+    <p:sldId id="273" r:id="rId34"/>
   </p:sldIdLst>
   <p:sldSz cx="12192000" cy="6858000"/>
   <p:notesSz cx="6858000" cy="9144000"/>
@@ -5296,7 +5297,7 @@
             <a:fld id="{B61BEF0D-F0BB-DE4B-95CE-6DB70DBA9567}" type="datetimeFigureOut">
               <a:rPr lang="en-US" smtClean="0"/>
               <a:pPr/>
-              <a:t>22/07/2018</a:t>
+              <a:t>23/07/2018</a:t>
             </a:fld>
             <a:endParaRPr lang="en-US" dirty="0"/>
           </a:p>
@@ -5565,7 +5566,7 @@
             <a:fld id="{B61BEF0D-F0BB-DE4B-95CE-6DB70DBA9567}" type="datetimeFigureOut">
               <a:rPr lang="en-US" smtClean="0"/>
               <a:pPr/>
-              <a:t>22/07/2018</a:t>
+              <a:t>23/07/2018</a:t>
             </a:fld>
             <a:endParaRPr lang="en-US" dirty="0"/>
           </a:p>
@@ -5763,7 +5764,7 @@
             <a:fld id="{B61BEF0D-F0BB-DE4B-95CE-6DB70DBA9567}" type="datetimeFigureOut">
               <a:rPr lang="en-US" smtClean="0"/>
               <a:pPr/>
-              <a:t>22/07/2018</a:t>
+              <a:t>23/07/2018</a:t>
             </a:fld>
             <a:endParaRPr lang="en-US" dirty="0"/>
           </a:p>
@@ -6028,7 +6029,7 @@
             <a:fld id="{B61BEF0D-F0BB-DE4B-95CE-6DB70DBA9567}" type="datetimeFigureOut">
               <a:rPr lang="en-US" smtClean="0"/>
               <a:pPr/>
-              <a:t>22/07/2018</a:t>
+              <a:t>23/07/2018</a:t>
             </a:fld>
             <a:endParaRPr lang="en-US" dirty="0"/>
           </a:p>
@@ -6464,7 +6465,7 @@
             <a:fld id="{B61BEF0D-F0BB-DE4B-95CE-6DB70DBA9567}" type="datetimeFigureOut">
               <a:rPr lang="en-US" smtClean="0"/>
               <a:pPr/>
-              <a:t>22/07/2018</a:t>
+              <a:t>23/07/2018</a:t>
             </a:fld>
             <a:endParaRPr lang="en-US" dirty="0"/>
           </a:p>
@@ -7012,7 +7013,7 @@
             <a:fld id="{B61BEF0D-F0BB-DE4B-95CE-6DB70DBA9567}" type="datetimeFigureOut">
               <a:rPr lang="en-US" smtClean="0"/>
               <a:pPr/>
-              <a:t>22/07/2018</a:t>
+              <a:t>23/07/2018</a:t>
             </a:fld>
             <a:endParaRPr lang="en-US" dirty="0"/>
           </a:p>
@@ -7734,7 +7735,7 @@
             <a:fld id="{B61BEF0D-F0BB-DE4B-95CE-6DB70DBA9567}" type="datetimeFigureOut">
               <a:rPr lang="en-US" smtClean="0"/>
               <a:pPr/>
-              <a:t>22/07/2018</a:t>
+              <a:t>23/07/2018</a:t>
             </a:fld>
             <a:endParaRPr lang="en-US" dirty="0"/>
           </a:p>
@@ -7906,7 +7907,7 @@
             <a:fld id="{B61BEF0D-F0BB-DE4B-95CE-6DB70DBA9567}" type="datetimeFigureOut">
               <a:rPr lang="en-US" smtClean="0"/>
               <a:pPr/>
-              <a:t>22/07/2018</a:t>
+              <a:t>23/07/2018</a:t>
             </a:fld>
             <a:endParaRPr lang="en-US" dirty="0"/>
           </a:p>
@@ -8088,7 +8089,7 @@
             <a:fld id="{B61BEF0D-F0BB-DE4B-95CE-6DB70DBA9567}" type="datetimeFigureOut">
               <a:rPr lang="en-US" smtClean="0"/>
               <a:pPr/>
-              <a:t>22/07/2018</a:t>
+              <a:t>23/07/2018</a:t>
             </a:fld>
             <a:endParaRPr lang="en-US" dirty="0"/>
           </a:p>
@@ -8260,7 +8261,7 @@
             <a:fld id="{B61BEF0D-F0BB-DE4B-95CE-6DB70DBA9567}" type="datetimeFigureOut">
               <a:rPr lang="en-US" smtClean="0"/>
               <a:pPr/>
-              <a:t>22/07/2018</a:t>
+              <a:t>23/07/2018</a:t>
             </a:fld>
             <a:endParaRPr lang="en-US" dirty="0"/>
           </a:p>
@@ -8512,7 +8513,7 @@
             <a:fld id="{B61BEF0D-F0BB-DE4B-95CE-6DB70DBA9567}" type="datetimeFigureOut">
               <a:rPr lang="en-US" smtClean="0"/>
               <a:pPr/>
-              <a:t>22/07/2018</a:t>
+              <a:t>23/07/2018</a:t>
             </a:fld>
             <a:endParaRPr lang="en-US" dirty="0"/>
           </a:p>
@@ -8746,7 +8747,7 @@
             <a:fld id="{B61BEF0D-F0BB-DE4B-95CE-6DB70DBA9567}" type="datetimeFigureOut">
               <a:rPr lang="en-US" smtClean="0"/>
               <a:pPr/>
-              <a:t>22/07/2018</a:t>
+              <a:t>23/07/2018</a:t>
             </a:fld>
             <a:endParaRPr lang="en-US" dirty="0"/>
           </a:p>
@@ -9129,7 +9130,7 @@
             <a:fld id="{B61BEF0D-F0BB-DE4B-95CE-6DB70DBA9567}" type="datetimeFigureOut">
               <a:rPr lang="en-US" smtClean="0"/>
               <a:pPr/>
-              <a:t>22/07/2018</a:t>
+              <a:t>23/07/2018</a:t>
             </a:fld>
             <a:endParaRPr lang="en-US" dirty="0"/>
           </a:p>
@@ -9249,7 +9250,7 @@
             <a:fld id="{B61BEF0D-F0BB-DE4B-95CE-6DB70DBA9567}" type="datetimeFigureOut">
               <a:rPr lang="en-US" smtClean="0"/>
               <a:pPr/>
-              <a:t>22/07/2018</a:t>
+              <a:t>23/07/2018</a:t>
             </a:fld>
             <a:endParaRPr lang="en-US" dirty="0"/>
           </a:p>
@@ -9346,7 +9347,7 @@
             <a:fld id="{B61BEF0D-F0BB-DE4B-95CE-6DB70DBA9567}" type="datetimeFigureOut">
               <a:rPr lang="en-US" smtClean="0"/>
               <a:pPr/>
-              <a:t>22/07/2018</a:t>
+              <a:t>23/07/2018</a:t>
             </a:fld>
             <a:endParaRPr lang="en-US" dirty="0"/>
           </a:p>
@@ -9597,7 +9598,7 @@
             <a:fld id="{B61BEF0D-F0BB-DE4B-95CE-6DB70DBA9567}" type="datetimeFigureOut">
               <a:rPr lang="en-US" smtClean="0"/>
               <a:pPr/>
-              <a:t>22/07/2018</a:t>
+              <a:t>23/07/2018</a:t>
             </a:fld>
             <a:endParaRPr lang="en-US" dirty="0"/>
           </a:p>
@@ -9879,7 +9880,7 @@
             <a:fld id="{B61BEF0D-F0BB-DE4B-95CE-6DB70DBA9567}" type="datetimeFigureOut">
               <a:rPr lang="en-US" smtClean="0"/>
               <a:pPr/>
-              <a:t>22/07/2018</a:t>
+              <a:t>23/07/2018</a:t>
             </a:fld>
             <a:endParaRPr lang="en-US" dirty="0"/>
           </a:p>
@@ -12958,7 +12959,7 @@
             <a:fld id="{B61BEF0D-F0BB-DE4B-95CE-6DB70DBA9567}" type="datetimeFigureOut">
               <a:rPr lang="en-US" smtClean="0"/>
               <a:pPr/>
-              <a:t>22/07/2018</a:t>
+              <a:t>23/07/2018</a:t>
             </a:fld>
             <a:endParaRPr lang="en-US" dirty="0"/>
           </a:p>
@@ -20712,6 +20713,362 @@
           <p:cNvPr id="2" name="Title 1">
             <a:extLst>
               <a:ext uri="{FF2B5EF4-FFF2-40B4-BE49-F238E27FC236}">
+                <a16:creationId xmlns:a16="http://schemas.microsoft.com/office/drawing/2014/main" id="{48FBD638-F8BC-4B9C-ADEE-7B56268AEB97}"/>
+              </a:ext>
+            </a:extLst>
+          </p:cNvPr>
+          <p:cNvSpPr>
+            <a:spLocks noGrp="1"/>
+          </p:cNvSpPr>
+          <p:nvPr>
+            <p:ph type="title"/>
+          </p:nvPr>
+        </p:nvSpPr>
+        <p:spPr/>
+        <p:txBody>
+          <a:bodyPr/>
+          <a:lstStyle/>
+          <a:p>
+            <a:r>
+              <a:rPr lang="en-US" dirty="0"/>
+              <a:t>Let’s add SQ </a:t>
+            </a:r>
+            <a:r>
+              <a:rPr lang="en-US" dirty="0" err="1"/>
+              <a:t>postback</a:t>
+            </a:r>
+            <a:r>
+              <a:rPr lang="en-US" dirty="0"/>
+              <a:t> to </a:t>
+            </a:r>
+            <a:r>
+              <a:rPr lang="en-US" dirty="0" err="1"/>
+              <a:t>github</a:t>
+            </a:r>
+            <a:endParaRPr lang="en-US" dirty="0"/>
+          </a:p>
+        </p:txBody>
+      </p:sp>
+      <p:pic>
+        <p:nvPicPr>
+          <p:cNvPr id="4" name="Picture 3">
+            <a:extLst>
+              <a:ext uri="{FF2B5EF4-FFF2-40B4-BE49-F238E27FC236}">
+                <a16:creationId xmlns:a16="http://schemas.microsoft.com/office/drawing/2014/main" id="{660E4E45-28B6-43BF-BD01-8BFD0EDF0BA0}"/>
+              </a:ext>
+            </a:extLst>
+          </p:cNvPr>
+          <p:cNvPicPr>
+            <a:picLocks noChangeAspect="1"/>
+          </p:cNvPicPr>
+          <p:nvPr/>
+        </p:nvPicPr>
+        <p:blipFill>
+          <a:blip r:embed="rId2"/>
+          <a:stretch>
+            <a:fillRect/>
+          </a:stretch>
+        </p:blipFill>
+        <p:spPr>
+          <a:xfrm>
+            <a:off x="4894412" y="1857571"/>
+            <a:ext cx="2400000" cy="3142857"/>
+          </a:xfrm>
+          <a:prstGeom prst="rect">
+            <a:avLst/>
+          </a:prstGeom>
+        </p:spPr>
+      </p:pic>
+      <p:pic>
+        <p:nvPicPr>
+          <p:cNvPr id="5" name="Picture 4">
+            <a:extLst>
+              <a:ext uri="{FF2B5EF4-FFF2-40B4-BE49-F238E27FC236}">
+                <a16:creationId xmlns:a16="http://schemas.microsoft.com/office/drawing/2014/main" id="{7618014F-00F1-47B2-8B58-8254789B29B0}"/>
+              </a:ext>
+            </a:extLst>
+          </p:cNvPr>
+          <p:cNvPicPr>
+            <a:picLocks noChangeAspect="1"/>
+          </p:cNvPicPr>
+          <p:nvPr/>
+        </p:nvPicPr>
+        <p:blipFill>
+          <a:blip r:embed="rId3"/>
+          <a:stretch>
+            <a:fillRect/>
+          </a:stretch>
+        </p:blipFill>
+        <p:spPr>
+          <a:xfrm>
+            <a:off x="4443619" y="1967095"/>
+            <a:ext cx="3304762" cy="2923809"/>
+          </a:xfrm>
+          <a:prstGeom prst="rect">
+            <a:avLst/>
+          </a:prstGeom>
+        </p:spPr>
+      </p:pic>
+      <p:pic>
+        <p:nvPicPr>
+          <p:cNvPr id="6" name="Picture 5">
+            <a:extLst>
+              <a:ext uri="{FF2B5EF4-FFF2-40B4-BE49-F238E27FC236}">
+                <a16:creationId xmlns:a16="http://schemas.microsoft.com/office/drawing/2014/main" id="{0B2DB0A7-EEE1-41E3-9ED3-594A501BCEFE}"/>
+              </a:ext>
+            </a:extLst>
+          </p:cNvPr>
+          <p:cNvPicPr>
+            <a:picLocks noChangeAspect="1"/>
+          </p:cNvPicPr>
+          <p:nvPr/>
+        </p:nvPicPr>
+        <p:blipFill>
+          <a:blip r:embed="rId4"/>
+          <a:stretch>
+            <a:fillRect/>
+          </a:stretch>
+        </p:blipFill>
+        <p:spPr>
+          <a:xfrm>
+            <a:off x="3561141" y="594293"/>
+            <a:ext cx="5066541" cy="5669412"/>
+          </a:xfrm>
+          <a:prstGeom prst="rect">
+            <a:avLst/>
+          </a:prstGeom>
+        </p:spPr>
+      </p:pic>
+      <p:pic>
+        <p:nvPicPr>
+          <p:cNvPr id="7" name="Picture 6">
+            <a:extLst>
+              <a:ext uri="{FF2B5EF4-FFF2-40B4-BE49-F238E27FC236}">
+                <a16:creationId xmlns:a16="http://schemas.microsoft.com/office/drawing/2014/main" id="{69E07F2D-6BB3-4136-8D52-2A9B8E00CFE6}"/>
+              </a:ext>
+            </a:extLst>
+          </p:cNvPr>
+          <p:cNvPicPr>
+            <a:picLocks noChangeAspect="1"/>
+          </p:cNvPicPr>
+          <p:nvPr/>
+        </p:nvPicPr>
+        <p:blipFill>
+          <a:blip r:embed="rId5"/>
+          <a:stretch>
+            <a:fillRect/>
+          </a:stretch>
+        </p:blipFill>
+        <p:spPr>
+          <a:xfrm>
+            <a:off x="1467428" y="2771857"/>
+            <a:ext cx="9257143" cy="1314286"/>
+          </a:xfrm>
+          <a:prstGeom prst="rect">
+            <a:avLst/>
+          </a:prstGeom>
+        </p:spPr>
+      </p:pic>
+    </p:spTree>
+    <p:extLst>
+      <p:ext uri="{BB962C8B-B14F-4D97-AF65-F5344CB8AC3E}">
+        <p14:creationId xmlns:p14="http://schemas.microsoft.com/office/powerpoint/2010/main" val="522697813"/>
+      </p:ext>
+    </p:extLst>
+  </p:cSld>
+  <p:clrMapOvr>
+    <a:masterClrMapping/>
+  </p:clrMapOvr>
+  <p:timing>
+    <p:tnLst>
+      <p:par>
+        <p:cTn id="1" dur="indefinite" restart="never" nodeType="tmRoot">
+          <p:childTnLst>
+            <p:seq concurrent="1" nextAc="seek">
+              <p:cTn id="2" dur="indefinite" nodeType="mainSeq">
+                <p:childTnLst>
+                  <p:par>
+                    <p:cTn id="3" fill="hold">
+                      <p:stCondLst>
+                        <p:cond delay="indefinite"/>
+                      </p:stCondLst>
+                      <p:childTnLst>
+                        <p:par>
+                          <p:cTn id="4" fill="hold">
+                            <p:stCondLst>
+                              <p:cond delay="0"/>
+                            </p:stCondLst>
+                            <p:childTnLst>
+                              <p:par>
+                                <p:cTn id="5" presetID="1" presetClass="entr" presetSubtype="0" fill="hold" nodeType="clickEffect">
+                                  <p:stCondLst>
+                                    <p:cond delay="0"/>
+                                  </p:stCondLst>
+                                  <p:childTnLst>
+                                    <p:set>
+                                      <p:cBhvr>
+                                        <p:cTn id="6" dur="1" fill="hold">
+                                          <p:stCondLst>
+                                            <p:cond delay="0"/>
+                                          </p:stCondLst>
+                                        </p:cTn>
+                                        <p:tgtEl>
+                                          <p:spTgt spid="5"/>
+                                        </p:tgtEl>
+                                        <p:attrNameLst>
+                                          <p:attrName>style.visibility</p:attrName>
+                                        </p:attrNameLst>
+                                      </p:cBhvr>
+                                      <p:to>
+                                        <p:strVal val="visible"/>
+                                      </p:to>
+                                    </p:set>
+                                  </p:childTnLst>
+                                </p:cTn>
+                              </p:par>
+                            </p:childTnLst>
+                          </p:cTn>
+                        </p:par>
+                      </p:childTnLst>
+                    </p:cTn>
+                  </p:par>
+                  <p:par>
+                    <p:cTn id="7" fill="hold">
+                      <p:stCondLst>
+                        <p:cond delay="indefinite"/>
+                      </p:stCondLst>
+                      <p:childTnLst>
+                        <p:par>
+                          <p:cTn id="8" fill="hold">
+                            <p:stCondLst>
+                              <p:cond delay="0"/>
+                            </p:stCondLst>
+                            <p:childTnLst>
+                              <p:par>
+                                <p:cTn id="9" presetID="1" presetClass="entr" presetSubtype="0" fill="hold" nodeType="clickEffect">
+                                  <p:stCondLst>
+                                    <p:cond delay="0"/>
+                                  </p:stCondLst>
+                                  <p:childTnLst>
+                                    <p:set>
+                                      <p:cBhvr>
+                                        <p:cTn id="10" dur="1" fill="hold">
+                                          <p:stCondLst>
+                                            <p:cond delay="0"/>
+                                          </p:stCondLst>
+                                        </p:cTn>
+                                        <p:tgtEl>
+                                          <p:spTgt spid="6"/>
+                                        </p:tgtEl>
+                                        <p:attrNameLst>
+                                          <p:attrName>style.visibility</p:attrName>
+                                        </p:attrNameLst>
+                                      </p:cBhvr>
+                                      <p:to>
+                                        <p:strVal val="visible"/>
+                                      </p:to>
+                                    </p:set>
+                                  </p:childTnLst>
+                                </p:cTn>
+                              </p:par>
+                            </p:childTnLst>
+                          </p:cTn>
+                        </p:par>
+                      </p:childTnLst>
+                    </p:cTn>
+                  </p:par>
+                  <p:par>
+                    <p:cTn id="11" fill="hold">
+                      <p:stCondLst>
+                        <p:cond delay="indefinite"/>
+                      </p:stCondLst>
+                      <p:childTnLst>
+                        <p:par>
+                          <p:cTn id="12" fill="hold">
+                            <p:stCondLst>
+                              <p:cond delay="0"/>
+                            </p:stCondLst>
+                            <p:childTnLst>
+                              <p:par>
+                                <p:cTn id="13" presetID="1" presetClass="entr" presetSubtype="0" fill="hold" nodeType="clickEffect">
+                                  <p:stCondLst>
+                                    <p:cond delay="0"/>
+                                  </p:stCondLst>
+                                  <p:childTnLst>
+                                    <p:set>
+                                      <p:cBhvr>
+                                        <p:cTn id="14" dur="1" fill="hold">
+                                          <p:stCondLst>
+                                            <p:cond delay="0"/>
+                                          </p:stCondLst>
+                                        </p:cTn>
+                                        <p:tgtEl>
+                                          <p:spTgt spid="7"/>
+                                        </p:tgtEl>
+                                        <p:attrNameLst>
+                                          <p:attrName>style.visibility</p:attrName>
+                                        </p:attrNameLst>
+                                      </p:cBhvr>
+                                      <p:to>
+                                        <p:strVal val="visible"/>
+                                      </p:to>
+                                    </p:set>
+                                  </p:childTnLst>
+                                </p:cTn>
+                              </p:par>
+                            </p:childTnLst>
+                          </p:cTn>
+                        </p:par>
+                      </p:childTnLst>
+                    </p:cTn>
+                  </p:par>
+                </p:childTnLst>
+              </p:cTn>
+              <p:prevCondLst>
+                <p:cond evt="onPrev" delay="0">
+                  <p:tgtEl>
+                    <p:sldTgt/>
+                  </p:tgtEl>
+                </p:cond>
+              </p:prevCondLst>
+              <p:nextCondLst>
+                <p:cond evt="onNext" delay="0">
+                  <p:tgtEl>
+                    <p:sldTgt/>
+                  </p:tgtEl>
+                </p:cond>
+              </p:nextCondLst>
+            </p:seq>
+          </p:childTnLst>
+        </p:cTn>
+      </p:par>
+    </p:tnLst>
+  </p:timing>
+</p:sld>
+</file>
+
+<file path=ppt/slides/slide33.xml><?xml version="1.0" encoding="utf-8"?>
+<p:sld xmlns:a="http://schemas.openxmlformats.org/drawingml/2006/main" xmlns:r="http://schemas.openxmlformats.org/officeDocument/2006/relationships" xmlns:p="http://schemas.openxmlformats.org/presentationml/2006/main">
+  <p:cSld>
+    <p:spTree>
+      <p:nvGrpSpPr>
+        <p:cNvPr id="1" name=""/>
+        <p:cNvGrpSpPr/>
+        <p:nvPr/>
+      </p:nvGrpSpPr>
+      <p:grpSpPr>
+        <a:xfrm>
+          <a:off x="0" y="0"/>
+          <a:ext cx="0" cy="0"/>
+          <a:chOff x="0" y="0"/>
+          <a:chExt cx="0" cy="0"/>
+        </a:xfrm>
+      </p:grpSpPr>
+      <p:sp>
+        <p:nvSpPr>
+          <p:cNvPr id="2" name="Title 1">
+            <a:extLst>
+              <a:ext uri="{FF2B5EF4-FFF2-40B4-BE49-F238E27FC236}">
                 <a16:creationId xmlns:a16="http://schemas.microsoft.com/office/drawing/2014/main" id="{DEDF95E6-31A7-4A4D-B81B-67A931C484D1}"/>
               </a:ext>
             </a:extLst>

</xml_diff>

<commit_message>
Try to force a SQ failure.
</commit_message>
<xml_diff>
--- a/Presentation/Full Open-Source CI.pptx
+++ b/Presentation/Full Open-Source CI.pptx
@@ -37,7 +37,8 @@
     <p:sldId id="288" r:id="rId31"/>
     <p:sldId id="289" r:id="rId32"/>
     <p:sldId id="290" r:id="rId33"/>
-    <p:sldId id="273" r:id="rId34"/>
+    <p:sldId id="291" r:id="rId34"/>
+    <p:sldId id="273" r:id="rId35"/>
   </p:sldIdLst>
   <p:sldSz cx="12192000" cy="6858000"/>
   <p:notesSz cx="6858000" cy="9144000"/>
@@ -1070,7 +1071,7 @@
           <a:noFill/>
           <a:extLst>
             <a:ext uri="{909E8E84-426E-40dd-AFC4-6F175D3DCCD1}">
-              <a14:hiddenFill xmlns="" xmlns:a14="http://schemas.microsoft.com/office/drawing/2010/main">
+              <a14:hiddenFill xmlns:a14="http://schemas.microsoft.com/office/drawing/2010/main" xmlns="">
                 <a:solidFill>
                   <a:srgbClr val="FFFFFF"/>
                 </a:solidFill>
@@ -1130,7 +1131,7 @@
             </a:ln>
             <a:extLst>
               <a:ext uri="{91240B29-F687-4f45-9708-019B960494DF}">
-                <a14:hiddenLine xmlns="" xmlns:a14="http://schemas.microsoft.com/office/drawing/2010/main" w="9525">
+                <a14:hiddenLine xmlns:a14="http://schemas.microsoft.com/office/drawing/2010/main" xmlns="" w="9525">
                   <a:solidFill>
                     <a:srgbClr val="000000"/>
                   </a:solidFill>
@@ -1220,7 +1221,7 @@
             </a:ln>
             <a:extLst>
               <a:ext uri="{91240B29-F687-4f45-9708-019B960494DF}">
-                <a14:hiddenLine xmlns="" xmlns:a14="http://schemas.microsoft.com/office/drawing/2010/main" w="9525">
+                <a14:hiddenLine xmlns:a14="http://schemas.microsoft.com/office/drawing/2010/main" xmlns="" w="9525">
                   <a:solidFill>
                     <a:srgbClr val="000000"/>
                   </a:solidFill>
@@ -1310,7 +1311,7 @@
             </a:ln>
             <a:extLst>
               <a:ext uri="{91240B29-F687-4f45-9708-019B960494DF}">
-                <a14:hiddenLine xmlns="" xmlns:a14="http://schemas.microsoft.com/office/drawing/2010/main" w="9525">
+                <a14:hiddenLine xmlns:a14="http://schemas.microsoft.com/office/drawing/2010/main" xmlns="" w="9525">
                   <a:solidFill>
                     <a:srgbClr val="000000"/>
                   </a:solidFill>
@@ -1344,7 +1345,7 @@
             </a:ln>
             <a:extLst>
               <a:ext uri="{91240B29-F687-4f45-9708-019B960494DF}">
-                <a14:hiddenLine xmlns="" xmlns:a14="http://schemas.microsoft.com/office/drawing/2010/main" w="9525">
+                <a14:hiddenLine xmlns:a14="http://schemas.microsoft.com/office/drawing/2010/main" xmlns="" w="9525">
                   <a:solidFill>
                     <a:srgbClr val="000000"/>
                   </a:solidFill>
@@ -1434,7 +1435,7 @@
             </a:ln>
             <a:extLst>
               <a:ext uri="{91240B29-F687-4f45-9708-019B960494DF}">
-                <a14:hiddenLine xmlns="" xmlns:a14="http://schemas.microsoft.com/office/drawing/2010/main" w="9525">
+                <a14:hiddenLine xmlns:a14="http://schemas.microsoft.com/office/drawing/2010/main" xmlns="" w="9525">
                   <a:solidFill>
                     <a:srgbClr val="000000"/>
                   </a:solidFill>
@@ -1496,7 +1497,7 @@
             </a:ln>
             <a:extLst>
               <a:ext uri="{91240B29-F687-4f45-9708-019B960494DF}">
-                <a14:hiddenLine xmlns="" xmlns:a14="http://schemas.microsoft.com/office/drawing/2010/main" w="9525">
+                <a14:hiddenLine xmlns:a14="http://schemas.microsoft.com/office/drawing/2010/main" xmlns="" w="9525">
                   <a:solidFill>
                     <a:srgbClr val="000000"/>
                   </a:solidFill>
@@ -1558,7 +1559,7 @@
             </a:ln>
             <a:extLst>
               <a:ext uri="{91240B29-F687-4f45-9708-019B960494DF}">
-                <a14:hiddenLine xmlns="" xmlns:a14="http://schemas.microsoft.com/office/drawing/2010/main" w="9525">
+                <a14:hiddenLine xmlns:a14="http://schemas.microsoft.com/office/drawing/2010/main" xmlns="" w="9525">
                   <a:solidFill>
                     <a:srgbClr val="000000"/>
                   </a:solidFill>
@@ -1648,7 +1649,7 @@
             </a:ln>
             <a:extLst>
               <a:ext uri="{91240B29-F687-4f45-9708-019B960494DF}">
-                <a14:hiddenLine xmlns="" xmlns:a14="http://schemas.microsoft.com/office/drawing/2010/main" w="9525">
+                <a14:hiddenLine xmlns:a14="http://schemas.microsoft.com/office/drawing/2010/main" xmlns="" w="9525">
                   <a:solidFill>
                     <a:srgbClr val="000000"/>
                   </a:solidFill>
@@ -1710,7 +1711,7 @@
             </a:ln>
             <a:extLst>
               <a:ext uri="{91240B29-F687-4f45-9708-019B960494DF}">
-                <a14:hiddenLine xmlns="" xmlns:a14="http://schemas.microsoft.com/office/drawing/2010/main" w="9525">
+                <a14:hiddenLine xmlns:a14="http://schemas.microsoft.com/office/drawing/2010/main" xmlns="" w="9525">
                   <a:solidFill>
                     <a:srgbClr val="000000"/>
                   </a:solidFill>
@@ -1772,7 +1773,7 @@
             </a:ln>
             <a:extLst>
               <a:ext uri="{91240B29-F687-4f45-9708-019B960494DF}">
-                <a14:hiddenLine xmlns="" xmlns:a14="http://schemas.microsoft.com/office/drawing/2010/main" w="9525">
+                <a14:hiddenLine xmlns:a14="http://schemas.microsoft.com/office/drawing/2010/main" xmlns="" w="9525">
                   <a:solidFill>
                     <a:srgbClr val="000000"/>
                   </a:solidFill>
@@ -1862,7 +1863,7 @@
             </a:ln>
             <a:extLst>
               <a:ext uri="{91240B29-F687-4f45-9708-019B960494DF}">
-                <a14:hiddenLine xmlns="" xmlns:a14="http://schemas.microsoft.com/office/drawing/2010/main" w="9525">
+                <a14:hiddenLine xmlns:a14="http://schemas.microsoft.com/office/drawing/2010/main" xmlns="" w="9525">
                   <a:solidFill>
                     <a:srgbClr val="000000"/>
                   </a:solidFill>
@@ -1952,7 +1953,7 @@
             </a:ln>
             <a:extLst>
               <a:ext uri="{91240B29-F687-4f45-9708-019B960494DF}">
-                <a14:hiddenLine xmlns="" xmlns:a14="http://schemas.microsoft.com/office/drawing/2010/main" w="9525">
+                <a14:hiddenLine xmlns:a14="http://schemas.microsoft.com/office/drawing/2010/main" xmlns="" w="9525">
                   <a:solidFill>
                     <a:srgbClr val="000000"/>
                   </a:solidFill>
@@ -2014,7 +2015,7 @@
             </a:ln>
             <a:extLst>
               <a:ext uri="{91240B29-F687-4f45-9708-019B960494DF}">
-                <a14:hiddenLine xmlns="" xmlns:a14="http://schemas.microsoft.com/office/drawing/2010/main" w="9525">
+                <a14:hiddenLine xmlns:a14="http://schemas.microsoft.com/office/drawing/2010/main" xmlns="" w="9525">
                   <a:solidFill>
                     <a:srgbClr val="000000"/>
                   </a:solidFill>
@@ -2124,7 +2125,7 @@
             </a:ln>
             <a:extLst>
               <a:ext uri="{91240B29-F687-4f45-9708-019B960494DF}">
-                <a14:hiddenLine xmlns="" xmlns:a14="http://schemas.microsoft.com/office/drawing/2010/main" w="9525">
+                <a14:hiddenLine xmlns:a14="http://schemas.microsoft.com/office/drawing/2010/main" xmlns="" w="9525">
                   <a:solidFill>
                     <a:srgbClr val="000000"/>
                   </a:solidFill>
@@ -2186,7 +2187,7 @@
             </a:ln>
             <a:extLst>
               <a:ext uri="{91240B29-F687-4f45-9708-019B960494DF}">
-                <a14:hiddenLine xmlns="" xmlns:a14="http://schemas.microsoft.com/office/drawing/2010/main" w="9525">
+                <a14:hiddenLine xmlns:a14="http://schemas.microsoft.com/office/drawing/2010/main" xmlns="" w="9525">
                   <a:solidFill>
                     <a:srgbClr val="000000"/>
                   </a:solidFill>
@@ -2276,7 +2277,7 @@
             </a:ln>
             <a:extLst>
               <a:ext uri="{91240B29-F687-4f45-9708-019B960494DF}">
-                <a14:hiddenLine xmlns="" xmlns:a14="http://schemas.microsoft.com/office/drawing/2010/main" w="9525">
+                <a14:hiddenLine xmlns:a14="http://schemas.microsoft.com/office/drawing/2010/main" xmlns="" w="9525">
                   <a:solidFill>
                     <a:srgbClr val="000000"/>
                   </a:solidFill>
@@ -2366,7 +2367,7 @@
             </a:ln>
             <a:extLst>
               <a:ext uri="{91240B29-F687-4f45-9708-019B960494DF}">
-                <a14:hiddenLine xmlns="" xmlns:a14="http://schemas.microsoft.com/office/drawing/2010/main" w="9525">
+                <a14:hiddenLine xmlns:a14="http://schemas.microsoft.com/office/drawing/2010/main" xmlns="" w="9525">
                   <a:solidFill>
                     <a:srgbClr val="000000"/>
                   </a:solidFill>
@@ -2428,7 +2429,7 @@
             </a:ln>
             <a:extLst>
               <a:ext uri="{91240B29-F687-4f45-9708-019B960494DF}">
-                <a14:hiddenLine xmlns="" xmlns:a14="http://schemas.microsoft.com/office/drawing/2010/main" w="9525">
+                <a14:hiddenLine xmlns:a14="http://schemas.microsoft.com/office/drawing/2010/main" xmlns="" w="9525">
                   <a:solidFill>
                     <a:srgbClr val="000000"/>
                   </a:solidFill>
@@ -2518,7 +2519,7 @@
             </a:ln>
             <a:extLst>
               <a:ext uri="{91240B29-F687-4f45-9708-019B960494DF}">
-                <a14:hiddenLine xmlns="" xmlns:a14="http://schemas.microsoft.com/office/drawing/2010/main" w="9525">
+                <a14:hiddenLine xmlns:a14="http://schemas.microsoft.com/office/drawing/2010/main" xmlns="" w="9525">
                   <a:solidFill>
                     <a:srgbClr val="000000"/>
                   </a:solidFill>
@@ -2608,7 +2609,7 @@
             </a:ln>
             <a:extLst>
               <a:ext uri="{91240B29-F687-4f45-9708-019B960494DF}">
-                <a14:hiddenLine xmlns="" xmlns:a14="http://schemas.microsoft.com/office/drawing/2010/main" w="9525">
+                <a14:hiddenLine xmlns:a14="http://schemas.microsoft.com/office/drawing/2010/main" xmlns="" w="9525">
                   <a:solidFill>
                     <a:srgbClr val="000000"/>
                   </a:solidFill>
@@ -2664,7 +2665,7 @@
             </a:ln>
             <a:extLst>
               <a:ext uri="{91240B29-F687-4f45-9708-019B960494DF}">
-                <a14:hiddenLine xmlns="" xmlns:a14="http://schemas.microsoft.com/office/drawing/2010/main" w="9525">
+                <a14:hiddenLine xmlns:a14="http://schemas.microsoft.com/office/drawing/2010/main" xmlns="" w="9525">
                   <a:solidFill>
                     <a:srgbClr val="000000"/>
                   </a:solidFill>
@@ -2754,7 +2755,7 @@
             </a:ln>
             <a:extLst>
               <a:ext uri="{91240B29-F687-4f45-9708-019B960494DF}">
-                <a14:hiddenLine xmlns="" xmlns:a14="http://schemas.microsoft.com/office/drawing/2010/main" w="9525">
+                <a14:hiddenLine xmlns:a14="http://schemas.microsoft.com/office/drawing/2010/main" xmlns="" w="9525">
                   <a:solidFill>
                     <a:srgbClr val="000000"/>
                   </a:solidFill>
@@ -2810,7 +2811,7 @@
             </a:ln>
             <a:extLst>
               <a:ext uri="{91240B29-F687-4f45-9708-019B960494DF}">
-                <a14:hiddenLine xmlns="" xmlns:a14="http://schemas.microsoft.com/office/drawing/2010/main" w="9525">
+                <a14:hiddenLine xmlns:a14="http://schemas.microsoft.com/office/drawing/2010/main" xmlns="" w="9525">
                   <a:solidFill>
                     <a:srgbClr val="000000"/>
                   </a:solidFill>
@@ -2900,7 +2901,7 @@
             </a:ln>
             <a:extLst>
               <a:ext uri="{91240B29-F687-4f45-9708-019B960494DF}">
-                <a14:hiddenLine xmlns="" xmlns:a14="http://schemas.microsoft.com/office/drawing/2010/main" w="9525">
+                <a14:hiddenLine xmlns:a14="http://schemas.microsoft.com/office/drawing/2010/main" xmlns="" w="9525">
                   <a:solidFill>
                     <a:srgbClr val="000000"/>
                   </a:solidFill>
@@ -2968,7 +2969,7 @@
             </a:ln>
             <a:extLst>
               <a:ext uri="{91240B29-F687-4f45-9708-019B960494DF}">
-                <a14:hiddenLine xmlns="" xmlns:a14="http://schemas.microsoft.com/office/drawing/2010/main" w="9525">
+                <a14:hiddenLine xmlns:a14="http://schemas.microsoft.com/office/drawing/2010/main" xmlns="" w="9525">
                   <a:solidFill>
                     <a:srgbClr val="000000"/>
                   </a:solidFill>
@@ -3058,7 +3059,7 @@
             </a:ln>
             <a:extLst>
               <a:ext uri="{91240B29-F687-4f45-9708-019B960494DF}">
-                <a14:hiddenLine xmlns="" xmlns:a14="http://schemas.microsoft.com/office/drawing/2010/main" w="9525">
+                <a14:hiddenLine xmlns:a14="http://schemas.microsoft.com/office/drawing/2010/main" xmlns="" w="9525">
                   <a:solidFill>
                     <a:srgbClr val="000000"/>
                   </a:solidFill>
@@ -3126,7 +3127,7 @@
             </a:ln>
             <a:extLst>
               <a:ext uri="{91240B29-F687-4f45-9708-019B960494DF}">
-                <a14:hiddenLine xmlns="" xmlns:a14="http://schemas.microsoft.com/office/drawing/2010/main" w="9525">
+                <a14:hiddenLine xmlns:a14="http://schemas.microsoft.com/office/drawing/2010/main" xmlns="" w="9525">
                   <a:solidFill>
                     <a:srgbClr val="000000"/>
                   </a:solidFill>
@@ -3216,7 +3217,7 @@
             </a:ln>
             <a:extLst>
               <a:ext uri="{91240B29-F687-4f45-9708-019B960494DF}">
-                <a14:hiddenLine xmlns="" xmlns:a14="http://schemas.microsoft.com/office/drawing/2010/main" w="9525">
+                <a14:hiddenLine xmlns:a14="http://schemas.microsoft.com/office/drawing/2010/main" xmlns="" w="9525">
                   <a:solidFill>
                     <a:srgbClr val="000000"/>
                   </a:solidFill>
@@ -3250,7 +3251,7 @@
             </a:ln>
             <a:extLst>
               <a:ext uri="{91240B29-F687-4f45-9708-019B960494DF}">
-                <a14:hiddenLine xmlns="" xmlns:a14="http://schemas.microsoft.com/office/drawing/2010/main" w="9525">
+                <a14:hiddenLine xmlns:a14="http://schemas.microsoft.com/office/drawing/2010/main" xmlns="" w="9525">
                   <a:solidFill>
                     <a:srgbClr val="000000"/>
                   </a:solidFill>
@@ -3340,7 +3341,7 @@
             </a:ln>
             <a:extLst>
               <a:ext uri="{91240B29-F687-4f45-9708-019B960494DF}">
-                <a14:hiddenLine xmlns="" xmlns:a14="http://schemas.microsoft.com/office/drawing/2010/main" w="9525">
+                <a14:hiddenLine xmlns:a14="http://schemas.microsoft.com/office/drawing/2010/main" xmlns="" w="9525">
                   <a:solidFill>
                     <a:srgbClr val="000000"/>
                   </a:solidFill>
@@ -3402,7 +3403,7 @@
             </a:ln>
             <a:extLst>
               <a:ext uri="{91240B29-F687-4f45-9708-019B960494DF}">
-                <a14:hiddenLine xmlns="" xmlns:a14="http://schemas.microsoft.com/office/drawing/2010/main" w="9525">
+                <a14:hiddenLine xmlns:a14="http://schemas.microsoft.com/office/drawing/2010/main" xmlns="" w="9525">
                   <a:solidFill>
                     <a:srgbClr val="000000"/>
                   </a:solidFill>
@@ -3464,7 +3465,7 @@
             </a:ln>
             <a:extLst>
               <a:ext uri="{91240B29-F687-4f45-9708-019B960494DF}">
-                <a14:hiddenLine xmlns="" xmlns:a14="http://schemas.microsoft.com/office/drawing/2010/main" w="9525">
+                <a14:hiddenLine xmlns:a14="http://schemas.microsoft.com/office/drawing/2010/main" xmlns="" w="9525">
                   <a:solidFill>
                     <a:srgbClr val="000000"/>
                   </a:solidFill>
@@ -3554,7 +3555,7 @@
             </a:ln>
             <a:extLst>
               <a:ext uri="{91240B29-F687-4f45-9708-019B960494DF}">
-                <a14:hiddenLine xmlns="" xmlns:a14="http://schemas.microsoft.com/office/drawing/2010/main" w="9525">
+                <a14:hiddenLine xmlns:a14="http://schemas.microsoft.com/office/drawing/2010/main" xmlns="" w="9525">
                   <a:solidFill>
                     <a:srgbClr val="000000"/>
                   </a:solidFill>
@@ -3622,7 +3623,7 @@
             </a:ln>
             <a:extLst>
               <a:ext uri="{91240B29-F687-4f45-9708-019B960494DF}">
-                <a14:hiddenLine xmlns="" xmlns:a14="http://schemas.microsoft.com/office/drawing/2010/main" w="9525">
+                <a14:hiddenLine xmlns:a14="http://schemas.microsoft.com/office/drawing/2010/main" xmlns="" w="9525">
                   <a:solidFill>
                     <a:srgbClr val="000000"/>
                   </a:solidFill>
@@ -3684,7 +3685,7 @@
             </a:ln>
             <a:extLst>
               <a:ext uri="{91240B29-F687-4f45-9708-019B960494DF}">
-                <a14:hiddenLine xmlns="" xmlns:a14="http://schemas.microsoft.com/office/drawing/2010/main" w="9525">
+                <a14:hiddenLine xmlns:a14="http://schemas.microsoft.com/office/drawing/2010/main" xmlns="" w="9525">
                   <a:solidFill>
                     <a:srgbClr val="000000"/>
                   </a:solidFill>
@@ -3774,7 +3775,7 @@
             </a:ln>
             <a:extLst>
               <a:ext uri="{91240B29-F687-4f45-9708-019B960494DF}">
-                <a14:hiddenLine xmlns="" xmlns:a14="http://schemas.microsoft.com/office/drawing/2010/main" w="9525">
+                <a14:hiddenLine xmlns:a14="http://schemas.microsoft.com/office/drawing/2010/main" xmlns="" w="9525">
                   <a:solidFill>
                     <a:srgbClr val="000000"/>
                   </a:solidFill>
@@ -3836,7 +3837,7 @@
             </a:ln>
             <a:extLst>
               <a:ext uri="{91240B29-F687-4f45-9708-019B960494DF}">
-                <a14:hiddenLine xmlns="" xmlns:a14="http://schemas.microsoft.com/office/drawing/2010/main" w="9525">
+                <a14:hiddenLine xmlns:a14="http://schemas.microsoft.com/office/drawing/2010/main" xmlns="" w="9525">
                   <a:solidFill>
                     <a:srgbClr val="000000"/>
                   </a:solidFill>
@@ -3926,7 +3927,7 @@
             </a:ln>
             <a:extLst>
               <a:ext uri="{91240B29-F687-4f45-9708-019B960494DF}">
-                <a14:hiddenLine xmlns="" xmlns:a14="http://schemas.microsoft.com/office/drawing/2010/main" w="9525">
+                <a14:hiddenLine xmlns:a14="http://schemas.microsoft.com/office/drawing/2010/main" xmlns="" w="9525">
                   <a:solidFill>
                     <a:srgbClr val="000000"/>
                   </a:solidFill>
@@ -3988,7 +3989,7 @@
             </a:ln>
             <a:extLst>
               <a:ext uri="{91240B29-F687-4f45-9708-019B960494DF}">
-                <a14:hiddenLine xmlns="" xmlns:a14="http://schemas.microsoft.com/office/drawing/2010/main" w="9525">
+                <a14:hiddenLine xmlns:a14="http://schemas.microsoft.com/office/drawing/2010/main" xmlns="" w="9525">
                   <a:solidFill>
                     <a:srgbClr val="000000"/>
                   </a:solidFill>
@@ -4078,7 +4079,7 @@
             </a:ln>
             <a:extLst>
               <a:ext uri="{91240B29-F687-4f45-9708-019B960494DF}">
-                <a14:hiddenLine xmlns="" xmlns:a14="http://schemas.microsoft.com/office/drawing/2010/main" w="9525">
+                <a14:hiddenLine xmlns:a14="http://schemas.microsoft.com/office/drawing/2010/main" xmlns="" w="9525">
                   <a:solidFill>
                     <a:srgbClr val="000000"/>
                   </a:solidFill>
@@ -4112,7 +4113,7 @@
             </a:ln>
             <a:extLst>
               <a:ext uri="{91240B29-F687-4f45-9708-019B960494DF}">
-                <a14:hiddenLine xmlns="" xmlns:a14="http://schemas.microsoft.com/office/drawing/2010/main" w="9525">
+                <a14:hiddenLine xmlns:a14="http://schemas.microsoft.com/office/drawing/2010/main" xmlns="" w="9525">
                   <a:solidFill>
                     <a:srgbClr val="000000"/>
                   </a:solidFill>
@@ -4177,7 +4178,7 @@
             </a:ln>
             <a:extLst>
               <a:ext uri="{91240B29-F687-4f45-9708-019B960494DF}">
-                <a14:hiddenLine xmlns="" xmlns:a14="http://schemas.microsoft.com/office/drawing/2010/main" w="9525">
+                <a14:hiddenLine xmlns:a14="http://schemas.microsoft.com/office/drawing/2010/main" xmlns="" w="9525">
                   <a:solidFill>
                     <a:srgbClr val="000000"/>
                   </a:solidFill>
@@ -4267,7 +4268,7 @@
             </a:ln>
             <a:extLst>
               <a:ext uri="{91240B29-F687-4f45-9708-019B960494DF}">
-                <a14:hiddenLine xmlns="" xmlns:a14="http://schemas.microsoft.com/office/drawing/2010/main" w="9525">
+                <a14:hiddenLine xmlns:a14="http://schemas.microsoft.com/office/drawing/2010/main" xmlns="" w="9525">
                   <a:solidFill>
                     <a:srgbClr val="000000"/>
                   </a:solidFill>
@@ -4329,7 +4330,7 @@
             </a:ln>
             <a:extLst>
               <a:ext uri="{91240B29-F687-4f45-9708-019B960494DF}">
-                <a14:hiddenLine xmlns="" xmlns:a14="http://schemas.microsoft.com/office/drawing/2010/main" w="9525">
+                <a14:hiddenLine xmlns:a14="http://schemas.microsoft.com/office/drawing/2010/main" xmlns="" w="9525">
                   <a:solidFill>
                     <a:srgbClr val="000000"/>
                   </a:solidFill>
@@ -4419,7 +4420,7 @@
             </a:ln>
             <a:extLst>
               <a:ext uri="{91240B29-F687-4f45-9708-019B960494DF}">
-                <a14:hiddenLine xmlns="" xmlns:a14="http://schemas.microsoft.com/office/drawing/2010/main" w="9525">
+                <a14:hiddenLine xmlns:a14="http://schemas.microsoft.com/office/drawing/2010/main" xmlns="" w="9525">
                   <a:solidFill>
                     <a:srgbClr val="000000"/>
                   </a:solidFill>
@@ -4509,7 +4510,7 @@
             </a:ln>
             <a:extLst>
               <a:ext uri="{91240B29-F687-4f45-9708-019B960494DF}">
-                <a14:hiddenLine xmlns="" xmlns:a14="http://schemas.microsoft.com/office/drawing/2010/main" w="9525">
+                <a14:hiddenLine xmlns:a14="http://schemas.microsoft.com/office/drawing/2010/main" xmlns="" w="9525">
                   <a:solidFill>
                     <a:srgbClr val="000000"/>
                   </a:solidFill>
@@ -4574,7 +4575,7 @@
             </a:ln>
             <a:extLst>
               <a:ext uri="{91240B29-F687-4f45-9708-019B960494DF}">
-                <a14:hiddenLine xmlns="" xmlns:a14="http://schemas.microsoft.com/office/drawing/2010/main" w="9525">
+                <a14:hiddenLine xmlns:a14="http://schemas.microsoft.com/office/drawing/2010/main" xmlns="" w="9525">
                   <a:solidFill>
                     <a:srgbClr val="000000"/>
                   </a:solidFill>
@@ -4636,7 +4637,7 @@
             </a:ln>
             <a:extLst>
               <a:ext uri="{91240B29-F687-4f45-9708-019B960494DF}">
-                <a14:hiddenLine xmlns="" xmlns:a14="http://schemas.microsoft.com/office/drawing/2010/main" w="9525">
+                <a14:hiddenLine xmlns:a14="http://schemas.microsoft.com/office/drawing/2010/main" xmlns="" w="9525">
                   <a:solidFill>
                     <a:srgbClr val="000000"/>
                   </a:solidFill>
@@ -4726,7 +4727,7 @@
             </a:ln>
             <a:extLst>
               <a:ext uri="{91240B29-F687-4f45-9708-019B960494DF}">
-                <a14:hiddenLine xmlns="" xmlns:a14="http://schemas.microsoft.com/office/drawing/2010/main" w="9525">
+                <a14:hiddenLine xmlns:a14="http://schemas.microsoft.com/office/drawing/2010/main" xmlns="" w="9525">
                   <a:solidFill>
                     <a:srgbClr val="000000"/>
                   </a:solidFill>
@@ -4816,7 +4817,7 @@
             </a:ln>
             <a:extLst>
               <a:ext uri="{91240B29-F687-4f45-9708-019B960494DF}">
-                <a14:hiddenLine xmlns="" xmlns:a14="http://schemas.microsoft.com/office/drawing/2010/main" w="9525">
+                <a14:hiddenLine xmlns:a14="http://schemas.microsoft.com/office/drawing/2010/main" xmlns="" w="9525">
                   <a:solidFill>
                     <a:srgbClr val="000000"/>
                   </a:solidFill>
@@ -4878,7 +4879,7 @@
             </a:ln>
             <a:extLst>
               <a:ext uri="{91240B29-F687-4f45-9708-019B960494DF}">
-                <a14:hiddenLine xmlns="" xmlns:a14="http://schemas.microsoft.com/office/drawing/2010/main" w="9525">
+                <a14:hiddenLine xmlns:a14="http://schemas.microsoft.com/office/drawing/2010/main" xmlns="" w="9525">
                   <a:solidFill>
                     <a:srgbClr val="000000"/>
                   </a:solidFill>
@@ -4998,7 +4999,7 @@
             </a:ln>
             <a:extLst>
               <a:ext uri="{91240B29-F687-4f45-9708-019B960494DF}">
-                <a14:hiddenLine xmlns="" xmlns:a14="http://schemas.microsoft.com/office/drawing/2010/main" w="9525">
+                <a14:hiddenLine xmlns:a14="http://schemas.microsoft.com/office/drawing/2010/main" xmlns="" w="9525">
                   <a:solidFill>
                     <a:srgbClr val="000000"/>
                   </a:solidFill>
@@ -5066,7 +5067,7 @@
             </a:ln>
             <a:extLst>
               <a:ext uri="{91240B29-F687-4f45-9708-019B960494DF}">
-                <a14:hiddenLine xmlns="" xmlns:a14="http://schemas.microsoft.com/office/drawing/2010/main" w="9525">
+                <a14:hiddenLine xmlns:a14="http://schemas.microsoft.com/office/drawing/2010/main" xmlns="" w="9525">
                   <a:solidFill>
                     <a:srgbClr val="000000"/>
                   </a:solidFill>
@@ -5156,7 +5157,7 @@
             </a:ln>
             <a:extLst>
               <a:ext uri="{91240B29-F687-4f45-9708-019B960494DF}">
-                <a14:hiddenLine xmlns="" xmlns:a14="http://schemas.microsoft.com/office/drawing/2010/main" w="9525">
+                <a14:hiddenLine xmlns:a14="http://schemas.microsoft.com/office/drawing/2010/main" xmlns="" w="9525">
                   <a:solidFill>
                     <a:srgbClr val="000000"/>
                   </a:solidFill>
@@ -5297,7 +5298,7 @@
             <a:fld id="{B61BEF0D-F0BB-DE4B-95CE-6DB70DBA9567}" type="datetimeFigureOut">
               <a:rPr lang="en-US" smtClean="0"/>
               <a:pPr/>
-              <a:t>23/07/2018</a:t>
+              <a:t>25/07/2018</a:t>
             </a:fld>
             <a:endParaRPr lang="en-US" dirty="0"/>
           </a:p>
@@ -5566,7 +5567,7 @@
             <a:fld id="{B61BEF0D-F0BB-DE4B-95CE-6DB70DBA9567}" type="datetimeFigureOut">
               <a:rPr lang="en-US" smtClean="0"/>
               <a:pPr/>
-              <a:t>23/07/2018</a:t>
+              <a:t>25/07/2018</a:t>
             </a:fld>
             <a:endParaRPr lang="en-US" dirty="0"/>
           </a:p>
@@ -5764,7 +5765,7 @@
             <a:fld id="{B61BEF0D-F0BB-DE4B-95CE-6DB70DBA9567}" type="datetimeFigureOut">
               <a:rPr lang="en-US" smtClean="0"/>
               <a:pPr/>
-              <a:t>23/07/2018</a:t>
+              <a:t>25/07/2018</a:t>
             </a:fld>
             <a:endParaRPr lang="en-US" dirty="0"/>
           </a:p>
@@ -6029,7 +6030,7 @@
             <a:fld id="{B61BEF0D-F0BB-DE4B-95CE-6DB70DBA9567}" type="datetimeFigureOut">
               <a:rPr lang="en-US" smtClean="0"/>
               <a:pPr/>
-              <a:t>23/07/2018</a:t>
+              <a:t>25/07/2018</a:t>
             </a:fld>
             <a:endParaRPr lang="en-US" dirty="0"/>
           </a:p>
@@ -6465,7 +6466,7 @@
             <a:fld id="{B61BEF0D-F0BB-DE4B-95CE-6DB70DBA9567}" type="datetimeFigureOut">
               <a:rPr lang="en-US" smtClean="0"/>
               <a:pPr/>
-              <a:t>23/07/2018</a:t>
+              <a:t>25/07/2018</a:t>
             </a:fld>
             <a:endParaRPr lang="en-US" dirty="0"/>
           </a:p>
@@ -7013,7 +7014,7 @@
             <a:fld id="{B61BEF0D-F0BB-DE4B-95CE-6DB70DBA9567}" type="datetimeFigureOut">
               <a:rPr lang="en-US" smtClean="0"/>
               <a:pPr/>
-              <a:t>23/07/2018</a:t>
+              <a:t>25/07/2018</a:t>
             </a:fld>
             <a:endParaRPr lang="en-US" dirty="0"/>
           </a:p>
@@ -7735,7 +7736,7 @@
             <a:fld id="{B61BEF0D-F0BB-DE4B-95CE-6DB70DBA9567}" type="datetimeFigureOut">
               <a:rPr lang="en-US" smtClean="0"/>
               <a:pPr/>
-              <a:t>23/07/2018</a:t>
+              <a:t>25/07/2018</a:t>
             </a:fld>
             <a:endParaRPr lang="en-US" dirty="0"/>
           </a:p>
@@ -7907,7 +7908,7 @@
             <a:fld id="{B61BEF0D-F0BB-DE4B-95CE-6DB70DBA9567}" type="datetimeFigureOut">
               <a:rPr lang="en-US" smtClean="0"/>
               <a:pPr/>
-              <a:t>23/07/2018</a:t>
+              <a:t>25/07/2018</a:t>
             </a:fld>
             <a:endParaRPr lang="en-US" dirty="0"/>
           </a:p>
@@ -8089,7 +8090,7 @@
             <a:fld id="{B61BEF0D-F0BB-DE4B-95CE-6DB70DBA9567}" type="datetimeFigureOut">
               <a:rPr lang="en-US" smtClean="0"/>
               <a:pPr/>
-              <a:t>23/07/2018</a:t>
+              <a:t>25/07/2018</a:t>
             </a:fld>
             <a:endParaRPr lang="en-US" dirty="0"/>
           </a:p>
@@ -8261,7 +8262,7 @@
             <a:fld id="{B61BEF0D-F0BB-DE4B-95CE-6DB70DBA9567}" type="datetimeFigureOut">
               <a:rPr lang="en-US" smtClean="0"/>
               <a:pPr/>
-              <a:t>23/07/2018</a:t>
+              <a:t>25/07/2018</a:t>
             </a:fld>
             <a:endParaRPr lang="en-US" dirty="0"/>
           </a:p>
@@ -8513,7 +8514,7 @@
             <a:fld id="{B61BEF0D-F0BB-DE4B-95CE-6DB70DBA9567}" type="datetimeFigureOut">
               <a:rPr lang="en-US" smtClean="0"/>
               <a:pPr/>
-              <a:t>23/07/2018</a:t>
+              <a:t>25/07/2018</a:t>
             </a:fld>
             <a:endParaRPr lang="en-US" dirty="0"/>
           </a:p>
@@ -8747,7 +8748,7 @@
             <a:fld id="{B61BEF0D-F0BB-DE4B-95CE-6DB70DBA9567}" type="datetimeFigureOut">
               <a:rPr lang="en-US" smtClean="0"/>
               <a:pPr/>
-              <a:t>23/07/2018</a:t>
+              <a:t>25/07/2018</a:t>
             </a:fld>
             <a:endParaRPr lang="en-US" dirty="0"/>
           </a:p>
@@ -9130,7 +9131,7 @@
             <a:fld id="{B61BEF0D-F0BB-DE4B-95CE-6DB70DBA9567}" type="datetimeFigureOut">
               <a:rPr lang="en-US" smtClean="0"/>
               <a:pPr/>
-              <a:t>23/07/2018</a:t>
+              <a:t>25/07/2018</a:t>
             </a:fld>
             <a:endParaRPr lang="en-US" dirty="0"/>
           </a:p>
@@ -9250,7 +9251,7 @@
             <a:fld id="{B61BEF0D-F0BB-DE4B-95CE-6DB70DBA9567}" type="datetimeFigureOut">
               <a:rPr lang="en-US" smtClean="0"/>
               <a:pPr/>
-              <a:t>23/07/2018</a:t>
+              <a:t>25/07/2018</a:t>
             </a:fld>
             <a:endParaRPr lang="en-US" dirty="0"/>
           </a:p>
@@ -9347,7 +9348,7 @@
             <a:fld id="{B61BEF0D-F0BB-DE4B-95CE-6DB70DBA9567}" type="datetimeFigureOut">
               <a:rPr lang="en-US" smtClean="0"/>
               <a:pPr/>
-              <a:t>23/07/2018</a:t>
+              <a:t>25/07/2018</a:t>
             </a:fld>
             <a:endParaRPr lang="en-US" dirty="0"/>
           </a:p>
@@ -9598,7 +9599,7 @@
             <a:fld id="{B61BEF0D-F0BB-DE4B-95CE-6DB70DBA9567}" type="datetimeFigureOut">
               <a:rPr lang="en-US" smtClean="0"/>
               <a:pPr/>
-              <a:t>23/07/2018</a:t>
+              <a:t>25/07/2018</a:t>
             </a:fld>
             <a:endParaRPr lang="en-US" dirty="0"/>
           </a:p>
@@ -9880,7 +9881,7 @@
             <a:fld id="{B61BEF0D-F0BB-DE4B-95CE-6DB70DBA9567}" type="datetimeFigureOut">
               <a:rPr lang="en-US" smtClean="0"/>
               <a:pPr/>
-              <a:t>23/07/2018</a:t>
+              <a:t>25/07/2018</a:t>
             </a:fld>
             <a:endParaRPr lang="en-US" dirty="0"/>
           </a:p>
@@ -9997,7 +9998,7 @@
           <a:noFill/>
           <a:extLst>
             <a:ext uri="{909E8E84-426E-40dd-AFC4-6F175D3DCCD1}">
-              <a14:hiddenFill xmlns="" xmlns:a14="http://schemas.microsoft.com/office/drawing/2010/main">
+              <a14:hiddenFill xmlns:a14="http://schemas.microsoft.com/office/drawing/2010/main" xmlns="">
                 <a:solidFill>
                   <a:srgbClr val="FFFFFF"/>
                 </a:solidFill>
@@ -10071,7 +10072,7 @@
               </a:ln>
               <a:extLst>
                 <a:ext uri="{91240B29-F687-4f45-9708-019B960494DF}">
-                  <a14:hiddenLine xmlns="" xmlns:a14="http://schemas.microsoft.com/office/drawing/2010/main" w="9525">
+                  <a14:hiddenLine xmlns:a14="http://schemas.microsoft.com/office/drawing/2010/main" xmlns="" w="9525">
                     <a:solidFill>
                       <a:srgbClr val="000000"/>
                     </a:solidFill>
@@ -10161,7 +10162,7 @@
               </a:ln>
               <a:extLst>
                 <a:ext uri="{91240B29-F687-4f45-9708-019B960494DF}">
-                  <a14:hiddenLine xmlns="" xmlns:a14="http://schemas.microsoft.com/office/drawing/2010/main" w="9525">
+                  <a14:hiddenLine xmlns:a14="http://schemas.microsoft.com/office/drawing/2010/main" xmlns="" w="9525">
                     <a:solidFill>
                       <a:srgbClr val="000000"/>
                     </a:solidFill>
@@ -10251,7 +10252,7 @@
               </a:ln>
               <a:extLst>
                 <a:ext uri="{91240B29-F687-4f45-9708-019B960494DF}">
-                  <a14:hiddenLine xmlns="" xmlns:a14="http://schemas.microsoft.com/office/drawing/2010/main" w="9525">
+                  <a14:hiddenLine xmlns:a14="http://schemas.microsoft.com/office/drawing/2010/main" xmlns="" w="9525">
                     <a:solidFill>
                       <a:srgbClr val="000000"/>
                     </a:solidFill>
@@ -10313,7 +10314,7 @@
               </a:ln>
               <a:extLst>
                 <a:ext uri="{91240B29-F687-4f45-9708-019B960494DF}">
-                  <a14:hiddenLine xmlns="" xmlns:a14="http://schemas.microsoft.com/office/drawing/2010/main" w="9525">
+                  <a14:hiddenLine xmlns:a14="http://schemas.microsoft.com/office/drawing/2010/main" xmlns="" w="9525">
                     <a:solidFill>
                       <a:srgbClr val="000000"/>
                     </a:solidFill>
@@ -10403,7 +10404,7 @@
               </a:ln>
               <a:extLst>
                 <a:ext uri="{91240B29-F687-4f45-9708-019B960494DF}">
-                  <a14:hiddenLine xmlns="" xmlns:a14="http://schemas.microsoft.com/office/drawing/2010/main" w="9525">
+                  <a14:hiddenLine xmlns:a14="http://schemas.microsoft.com/office/drawing/2010/main" xmlns="" w="9525">
                     <a:solidFill>
                       <a:srgbClr val="000000"/>
                     </a:solidFill>
@@ -10465,7 +10466,7 @@
               </a:ln>
               <a:extLst>
                 <a:ext uri="{91240B29-F687-4f45-9708-019B960494DF}">
-                  <a14:hiddenLine xmlns="" xmlns:a14="http://schemas.microsoft.com/office/drawing/2010/main" w="9525">
+                  <a14:hiddenLine xmlns:a14="http://schemas.microsoft.com/office/drawing/2010/main" xmlns="" w="9525">
                     <a:solidFill>
                       <a:srgbClr val="000000"/>
                     </a:solidFill>
@@ -10527,7 +10528,7 @@
               </a:ln>
               <a:extLst>
                 <a:ext uri="{91240B29-F687-4f45-9708-019B960494DF}">
-                  <a14:hiddenLine xmlns="" xmlns:a14="http://schemas.microsoft.com/office/drawing/2010/main" w="9525">
+                  <a14:hiddenLine xmlns:a14="http://schemas.microsoft.com/office/drawing/2010/main" xmlns="" w="9525">
                     <a:solidFill>
                       <a:srgbClr val="000000"/>
                     </a:solidFill>
@@ -10617,7 +10618,7 @@
               </a:ln>
               <a:extLst>
                 <a:ext uri="{91240B29-F687-4f45-9708-019B960494DF}">
-                  <a14:hiddenLine xmlns="" xmlns:a14="http://schemas.microsoft.com/office/drawing/2010/main" w="9525">
+                  <a14:hiddenLine xmlns:a14="http://schemas.microsoft.com/office/drawing/2010/main" xmlns="" w="9525">
                     <a:solidFill>
                       <a:srgbClr val="000000"/>
                     </a:solidFill>
@@ -10707,7 +10708,7 @@
               </a:ln>
               <a:extLst>
                 <a:ext uri="{91240B29-F687-4f45-9708-019B960494DF}">
-                  <a14:hiddenLine xmlns="" xmlns:a14="http://schemas.microsoft.com/office/drawing/2010/main" w="9525">
+                  <a14:hiddenLine xmlns:a14="http://schemas.microsoft.com/office/drawing/2010/main" xmlns="" w="9525">
                     <a:solidFill>
                       <a:srgbClr val="000000"/>
                     </a:solidFill>
@@ -10769,7 +10770,7 @@
               </a:ln>
               <a:extLst>
                 <a:ext uri="{91240B29-F687-4f45-9708-019B960494DF}">
-                  <a14:hiddenLine xmlns="" xmlns:a14="http://schemas.microsoft.com/office/drawing/2010/main" w="9525">
+                  <a14:hiddenLine xmlns:a14="http://schemas.microsoft.com/office/drawing/2010/main" xmlns="" w="9525">
                     <a:solidFill>
                       <a:srgbClr val="000000"/>
                     </a:solidFill>
@@ -10879,7 +10880,7 @@
               </a:ln>
               <a:extLst>
                 <a:ext uri="{91240B29-F687-4f45-9708-019B960494DF}">
-                  <a14:hiddenLine xmlns="" xmlns:a14="http://schemas.microsoft.com/office/drawing/2010/main" w="9525">
+                  <a14:hiddenLine xmlns:a14="http://schemas.microsoft.com/office/drawing/2010/main" xmlns="" w="9525">
                     <a:solidFill>
                       <a:srgbClr val="000000"/>
                     </a:solidFill>
@@ -10963,7 +10964,7 @@
               </a:ln>
               <a:extLst>
                 <a:ext uri="{91240B29-F687-4f45-9708-019B960494DF}">
-                  <a14:hiddenLine xmlns="" xmlns:a14="http://schemas.microsoft.com/office/drawing/2010/main" w="9525">
+                  <a14:hiddenLine xmlns:a14="http://schemas.microsoft.com/office/drawing/2010/main" xmlns="" w="9525">
                     <a:solidFill>
                       <a:srgbClr val="000000"/>
                     </a:solidFill>
@@ -11025,7 +11026,7 @@
               </a:ln>
               <a:extLst>
                 <a:ext uri="{91240B29-F687-4f45-9708-019B960494DF}">
-                  <a14:hiddenLine xmlns="" xmlns:a14="http://schemas.microsoft.com/office/drawing/2010/main" w="9525">
+                  <a14:hiddenLine xmlns:a14="http://schemas.microsoft.com/office/drawing/2010/main" xmlns="" w="9525">
                     <a:solidFill>
                       <a:srgbClr val="000000"/>
                     </a:solidFill>
@@ -11087,7 +11088,7 @@
               </a:ln>
               <a:extLst>
                 <a:ext uri="{91240B29-F687-4f45-9708-019B960494DF}">
-                  <a14:hiddenLine xmlns="" xmlns:a14="http://schemas.microsoft.com/office/drawing/2010/main" w="9525">
+                  <a14:hiddenLine xmlns:a14="http://schemas.microsoft.com/office/drawing/2010/main" xmlns="" w="9525">
                     <a:solidFill>
                       <a:srgbClr val="000000"/>
                     </a:solidFill>
@@ -11177,7 +11178,7 @@
               </a:ln>
               <a:extLst>
                 <a:ext uri="{91240B29-F687-4f45-9708-019B960494DF}">
-                  <a14:hiddenLine xmlns="" xmlns:a14="http://schemas.microsoft.com/office/drawing/2010/main" w="9525">
+                  <a14:hiddenLine xmlns:a14="http://schemas.microsoft.com/office/drawing/2010/main" xmlns="" w="9525">
                     <a:solidFill>
                       <a:srgbClr val="000000"/>
                     </a:solidFill>
@@ -11211,7 +11212,7 @@
               </a:ln>
               <a:extLst>
                 <a:ext uri="{91240B29-F687-4f45-9708-019B960494DF}">
-                  <a14:hiddenLine xmlns="" xmlns:a14="http://schemas.microsoft.com/office/drawing/2010/main" w="9525">
+                  <a14:hiddenLine xmlns:a14="http://schemas.microsoft.com/office/drawing/2010/main" xmlns="" w="9525">
                     <a:solidFill>
                       <a:srgbClr val="000000"/>
                     </a:solidFill>
@@ -11276,7 +11277,7 @@
               </a:ln>
               <a:extLst>
                 <a:ext uri="{91240B29-F687-4f45-9708-019B960494DF}">
-                  <a14:hiddenLine xmlns="" xmlns:a14="http://schemas.microsoft.com/office/drawing/2010/main" w="9525">
+                  <a14:hiddenLine xmlns:a14="http://schemas.microsoft.com/office/drawing/2010/main" xmlns="" w="9525">
                     <a:solidFill>
                       <a:srgbClr val="000000"/>
                     </a:solidFill>
@@ -11366,7 +11367,7 @@
               </a:ln>
               <a:extLst>
                 <a:ext uri="{91240B29-F687-4f45-9708-019B960494DF}">
-                  <a14:hiddenLine xmlns="" xmlns:a14="http://schemas.microsoft.com/office/drawing/2010/main" w="9525">
+                  <a14:hiddenLine xmlns:a14="http://schemas.microsoft.com/office/drawing/2010/main" xmlns="" w="9525">
                     <a:solidFill>
                       <a:srgbClr val="000000"/>
                     </a:solidFill>
@@ -11428,7 +11429,7 @@
               </a:ln>
               <a:extLst>
                 <a:ext uri="{91240B29-F687-4f45-9708-019B960494DF}">
-                  <a14:hiddenLine xmlns="" xmlns:a14="http://schemas.microsoft.com/office/drawing/2010/main" w="9525">
+                  <a14:hiddenLine xmlns:a14="http://schemas.microsoft.com/office/drawing/2010/main" xmlns="" w="9525">
                     <a:solidFill>
                       <a:srgbClr val="000000"/>
                     </a:solidFill>
@@ -11518,7 +11519,7 @@
               </a:ln>
               <a:extLst>
                 <a:ext uri="{91240B29-F687-4f45-9708-019B960494DF}">
-                  <a14:hiddenLine xmlns="" xmlns:a14="http://schemas.microsoft.com/office/drawing/2010/main" w="9525">
+                  <a14:hiddenLine xmlns:a14="http://schemas.microsoft.com/office/drawing/2010/main" xmlns="" w="9525">
                     <a:solidFill>
                       <a:srgbClr val="000000"/>
                     </a:solidFill>
@@ -11583,7 +11584,7 @@
               </a:ln>
               <a:extLst>
                 <a:ext uri="{91240B29-F687-4f45-9708-019B960494DF}">
-                  <a14:hiddenLine xmlns="" xmlns:a14="http://schemas.microsoft.com/office/drawing/2010/main" w="9525">
+                  <a14:hiddenLine xmlns:a14="http://schemas.microsoft.com/office/drawing/2010/main" xmlns="" w="9525">
                     <a:solidFill>
                       <a:srgbClr val="000000"/>
                     </a:solidFill>
@@ -11645,7 +11646,7 @@
               </a:ln>
               <a:extLst>
                 <a:ext uri="{91240B29-F687-4f45-9708-019B960494DF}">
-                  <a14:hiddenLine xmlns="" xmlns:a14="http://schemas.microsoft.com/office/drawing/2010/main" w="9525">
+                  <a14:hiddenLine xmlns:a14="http://schemas.microsoft.com/office/drawing/2010/main" xmlns="" w="9525">
                     <a:solidFill>
                       <a:srgbClr val="000000"/>
                     </a:solidFill>
@@ -11735,7 +11736,7 @@
               </a:ln>
               <a:extLst>
                 <a:ext uri="{91240B29-F687-4f45-9708-019B960494DF}">
-                  <a14:hiddenLine xmlns="" xmlns:a14="http://schemas.microsoft.com/office/drawing/2010/main" w="9525">
+                  <a14:hiddenLine xmlns:a14="http://schemas.microsoft.com/office/drawing/2010/main" xmlns="" w="9525">
                     <a:solidFill>
                       <a:srgbClr val="000000"/>
                     </a:solidFill>
@@ -11825,7 +11826,7 @@
               </a:ln>
               <a:extLst>
                 <a:ext uri="{91240B29-F687-4f45-9708-019B960494DF}">
-                  <a14:hiddenLine xmlns="" xmlns:a14="http://schemas.microsoft.com/office/drawing/2010/main" w="9525">
+                  <a14:hiddenLine xmlns:a14="http://schemas.microsoft.com/office/drawing/2010/main" xmlns="" w="9525">
                     <a:solidFill>
                       <a:srgbClr val="000000"/>
                     </a:solidFill>
@@ -11890,7 +11891,7 @@
               </a:ln>
               <a:extLst>
                 <a:ext uri="{91240B29-F687-4f45-9708-019B960494DF}">
-                  <a14:hiddenLine xmlns="" xmlns:a14="http://schemas.microsoft.com/office/drawing/2010/main" w="9525">
+                  <a14:hiddenLine xmlns:a14="http://schemas.microsoft.com/office/drawing/2010/main" xmlns="" w="9525">
                     <a:solidFill>
                       <a:srgbClr val="000000"/>
                     </a:solidFill>
@@ -12010,7 +12011,7 @@
               </a:ln>
               <a:extLst>
                 <a:ext uri="{91240B29-F687-4f45-9708-019B960494DF}">
-                  <a14:hiddenLine xmlns="" xmlns:a14="http://schemas.microsoft.com/office/drawing/2010/main" w="9525">
+                  <a14:hiddenLine xmlns:a14="http://schemas.microsoft.com/office/drawing/2010/main" xmlns="" w="9525">
                     <a:solidFill>
                       <a:srgbClr val="000000"/>
                     </a:solidFill>
@@ -12108,7 +12109,7 @@
               </a:ln>
               <a:extLst>
                 <a:ext uri="{91240B29-F687-4f45-9708-019B960494DF}">
-                  <a14:hiddenLine xmlns="" xmlns:a14="http://schemas.microsoft.com/office/drawing/2010/main" w="9525">
+                  <a14:hiddenLine xmlns:a14="http://schemas.microsoft.com/office/drawing/2010/main" xmlns="" w="9525">
                     <a:solidFill>
                       <a:srgbClr val="000000"/>
                     </a:solidFill>
@@ -12223,7 +12224,7 @@
               </a:ln>
               <a:extLst>
                 <a:ext uri="{91240B29-F687-4f45-9708-019B960494DF}">
-                  <a14:hiddenLine xmlns="" xmlns:a14="http://schemas.microsoft.com/office/drawing/2010/main" w="9525">
+                  <a14:hiddenLine xmlns:a14="http://schemas.microsoft.com/office/drawing/2010/main" xmlns="" w="9525">
                     <a:solidFill>
                       <a:srgbClr val="000000"/>
                     </a:solidFill>
@@ -12313,7 +12314,7 @@
               </a:ln>
               <a:extLst>
                 <a:ext uri="{91240B29-F687-4f45-9708-019B960494DF}">
-                  <a14:hiddenLine xmlns="" xmlns:a14="http://schemas.microsoft.com/office/drawing/2010/main" w="9525">
+                  <a14:hiddenLine xmlns:a14="http://schemas.microsoft.com/office/drawing/2010/main" xmlns="" w="9525">
                     <a:solidFill>
                       <a:srgbClr val="000000"/>
                     </a:solidFill>
@@ -12378,7 +12379,7 @@
               </a:ln>
               <a:extLst>
                 <a:ext uri="{91240B29-F687-4f45-9708-019B960494DF}">
-                  <a14:hiddenLine xmlns="" xmlns:a14="http://schemas.microsoft.com/office/drawing/2010/main" w="9525">
+                  <a14:hiddenLine xmlns:a14="http://schemas.microsoft.com/office/drawing/2010/main" xmlns="" w="9525">
                     <a:solidFill>
                       <a:srgbClr val="000000"/>
                     </a:solidFill>
@@ -12468,7 +12469,7 @@
               </a:ln>
               <a:extLst>
                 <a:ext uri="{91240B29-F687-4f45-9708-019B960494DF}">
-                  <a14:hiddenLine xmlns="" xmlns:a14="http://schemas.microsoft.com/office/drawing/2010/main" w="9525">
+                  <a14:hiddenLine xmlns:a14="http://schemas.microsoft.com/office/drawing/2010/main" xmlns="" w="9525">
                     <a:solidFill>
                       <a:srgbClr val="000000"/>
                     </a:solidFill>
@@ -12536,7 +12537,7 @@
               </a:ln>
               <a:extLst>
                 <a:ext uri="{91240B29-F687-4f45-9708-019B960494DF}">
-                  <a14:hiddenLine xmlns="" xmlns:a14="http://schemas.microsoft.com/office/drawing/2010/main" w="9525">
+                  <a14:hiddenLine xmlns:a14="http://schemas.microsoft.com/office/drawing/2010/main" xmlns="" w="9525">
                     <a:solidFill>
                       <a:srgbClr val="000000"/>
                     </a:solidFill>
@@ -12626,7 +12627,7 @@
               </a:ln>
               <a:extLst>
                 <a:ext uri="{91240B29-F687-4f45-9708-019B960494DF}">
-                  <a14:hiddenLine xmlns="" xmlns:a14="http://schemas.microsoft.com/office/drawing/2010/main" w="9525">
+                  <a14:hiddenLine xmlns:a14="http://schemas.microsoft.com/office/drawing/2010/main" xmlns="" w="9525">
                     <a:solidFill>
                       <a:srgbClr val="000000"/>
                     </a:solidFill>
@@ -12694,7 +12695,7 @@
               </a:ln>
               <a:extLst>
                 <a:ext uri="{91240B29-F687-4f45-9708-019B960494DF}">
-                  <a14:hiddenLine xmlns="" xmlns:a14="http://schemas.microsoft.com/office/drawing/2010/main" w="9525">
+                  <a14:hiddenLine xmlns:a14="http://schemas.microsoft.com/office/drawing/2010/main" xmlns="" w="9525">
                     <a:solidFill>
                       <a:srgbClr val="000000"/>
                     </a:solidFill>
@@ -12784,7 +12785,7 @@
               </a:ln>
               <a:extLst>
                 <a:ext uri="{91240B29-F687-4f45-9708-019B960494DF}">
-                  <a14:hiddenLine xmlns="" xmlns:a14="http://schemas.microsoft.com/office/drawing/2010/main" w="9525">
+                  <a14:hiddenLine xmlns:a14="http://schemas.microsoft.com/office/drawing/2010/main" xmlns="" w="9525">
                     <a:solidFill>
                       <a:srgbClr val="000000"/>
                     </a:solidFill>
@@ -12818,7 +12819,7 @@
               </a:ln>
               <a:extLst>
                 <a:ext uri="{91240B29-F687-4f45-9708-019B960494DF}">
-                  <a14:hiddenLine xmlns="" xmlns:a14="http://schemas.microsoft.com/office/drawing/2010/main" w="9525">
+                  <a14:hiddenLine xmlns:a14="http://schemas.microsoft.com/office/drawing/2010/main" xmlns="" w="9525">
                     <a:solidFill>
                       <a:srgbClr val="000000"/>
                     </a:solidFill>
@@ -12959,7 +12960,7 @@
             <a:fld id="{B61BEF0D-F0BB-DE4B-95CE-6DB70DBA9567}" type="datetimeFigureOut">
               <a:rPr lang="en-US" smtClean="0"/>
               <a:pPr/>
-              <a:t>23/07/2018</a:t>
+              <a:t>25/07/2018</a:t>
             </a:fld>
             <a:endParaRPr lang="en-US" dirty="0"/>
           </a:p>
@@ -21069,6 +21070,540 @@
           <p:cNvPr id="2" name="Title 1">
             <a:extLst>
               <a:ext uri="{FF2B5EF4-FFF2-40B4-BE49-F238E27FC236}">
+                <a16:creationId xmlns:a16="http://schemas.microsoft.com/office/drawing/2014/main" id="{8FD4692F-326F-44C0-8D47-7A052019A54E}"/>
+              </a:ext>
+            </a:extLst>
+          </p:cNvPr>
+          <p:cNvSpPr>
+            <a:spLocks noGrp="1"/>
+          </p:cNvSpPr>
+          <p:nvPr>
+            <p:ph type="title"/>
+          </p:nvPr>
+        </p:nvSpPr>
+        <p:spPr/>
+        <p:txBody>
+          <a:bodyPr/>
+          <a:lstStyle/>
+          <a:p>
+            <a:r>
+              <a:rPr lang="en-US" dirty="0"/>
+              <a:t>And let’s report back</a:t>
+            </a:r>
+          </a:p>
+        </p:txBody>
+      </p:sp>
+      <p:sp>
+        <p:nvSpPr>
+          <p:cNvPr id="3" name="Content Placeholder 2">
+            <a:extLst>
+              <a:ext uri="{FF2B5EF4-FFF2-40B4-BE49-F238E27FC236}">
+                <a16:creationId xmlns:a16="http://schemas.microsoft.com/office/drawing/2014/main" id="{B85F2E6A-865A-45D5-AD3B-4878B8E8511A}"/>
+              </a:ext>
+            </a:extLst>
+          </p:cNvPr>
+          <p:cNvSpPr>
+            <a:spLocks noGrp="1"/>
+          </p:cNvSpPr>
+          <p:nvPr>
+            <p:ph idx="1"/>
+          </p:nvPr>
+        </p:nvSpPr>
+        <p:spPr/>
+        <p:txBody>
+          <a:bodyPr>
+            <a:normAutofit lnSpcReduction="10000"/>
+          </a:bodyPr>
+          <a:lstStyle/>
+          <a:p>
+            <a:r>
+              <a:rPr lang="en-US" dirty="0"/>
+              <a:t>For pull requests, we can report back to GitHub and block a merge</a:t>
+            </a:r>
+          </a:p>
+          <a:p>
+            <a:pPr marL="0" indent="0">
+              <a:buNone/>
+            </a:pPr>
+            <a:r>
+              <a:rPr lang="en-US" dirty="0"/>
+              <a:t>We can add an ‘if’ statement and if it is a PR we can add to the ‘begin’ command</a:t>
+            </a:r>
+          </a:p>
+          <a:p>
+            <a:pPr marL="0" indent="0">
+              <a:buNone/>
+            </a:pPr>
+            <a:endParaRPr lang="en-US" dirty="0"/>
+          </a:p>
+          <a:p>
+            <a:pPr marL="0" indent="0">
+              <a:buNone/>
+            </a:pPr>
+            <a:endParaRPr lang="en-US" dirty="0"/>
+          </a:p>
+          <a:p>
+            <a:pPr marL="0" indent="0">
+              <a:buNone/>
+            </a:pPr>
+            <a:endParaRPr lang="en-US" dirty="0"/>
+          </a:p>
+          <a:p>
+            <a:pPr marL="0" indent="0">
+              <a:buNone/>
+            </a:pPr>
+            <a:r>
+              <a:rPr lang="en-US" dirty="0"/>
+              <a:t>We can add some mistake to see </a:t>
+            </a:r>
+            <a:r>
+              <a:rPr lang="en-US"/>
+              <a:t>the effect.</a:t>
+            </a:r>
+            <a:endParaRPr lang="en-US" dirty="0"/>
+          </a:p>
+        </p:txBody>
+      </p:sp>
+      <p:sp>
+        <p:nvSpPr>
+          <p:cNvPr id="4" name="Content Placeholder 2">
+            <a:extLst>
+              <a:ext uri="{FF2B5EF4-FFF2-40B4-BE49-F238E27FC236}">
+                <a16:creationId xmlns:a16="http://schemas.microsoft.com/office/drawing/2014/main" id="{2D0D81E8-4A75-4735-8306-E9903659679B}"/>
+              </a:ext>
+            </a:extLst>
+          </p:cNvPr>
+          <p:cNvSpPr txBox="1">
+            <a:spLocks/>
+          </p:cNvSpPr>
+          <p:nvPr/>
+        </p:nvSpPr>
+        <p:spPr>
+          <a:xfrm>
+            <a:off x="1141413" y="3034557"/>
+            <a:ext cx="9905998" cy="1971573"/>
+          </a:xfrm>
+          <a:prstGeom prst="rect">
+            <a:avLst/>
+          </a:prstGeom>
+          <a:solidFill>
+            <a:schemeClr val="bg1"/>
+          </a:solidFill>
+        </p:spPr>
+        <p:txBody>
+          <a:bodyPr vert="horz" lIns="91440" tIns="45720" rIns="91440" bIns="45720" rtlCol="0">
+            <a:normAutofit/>
+          </a:bodyPr>
+          <a:lstStyle>
+            <a:lvl1pPr marL="228600" indent="-228600" algn="l" defTabSz="914400" rtl="0" eaLnBrk="1" latinLnBrk="0" hangingPunct="1">
+              <a:lnSpc>
+                <a:spcPct val="120000"/>
+              </a:lnSpc>
+              <a:spcBef>
+                <a:spcPts val="1000"/>
+              </a:spcBef>
+              <a:buSzPct val="125000"/>
+              <a:buFont typeface="Arial" panose="020B0604020202020204" pitchFamily="34" charset="0"/>
+              <a:buChar char="•"/>
+              <a:defRPr sz="2400" kern="1200">
+                <a:solidFill>
+                  <a:schemeClr val="tx1"/>
+                </a:solidFill>
+                <a:latin typeface="+mn-lt"/>
+                <a:ea typeface="+mn-ea"/>
+                <a:cs typeface="+mn-cs"/>
+              </a:defRPr>
+            </a:lvl1pPr>
+            <a:lvl2pPr marL="685800" indent="-228600" algn="l" defTabSz="914400" rtl="0" eaLnBrk="1" latinLnBrk="0" hangingPunct="1">
+              <a:lnSpc>
+                <a:spcPct val="120000"/>
+              </a:lnSpc>
+              <a:spcBef>
+                <a:spcPts val="500"/>
+              </a:spcBef>
+              <a:buSzPct val="125000"/>
+              <a:buFont typeface="Arial" panose="020B0604020202020204" pitchFamily="34" charset="0"/>
+              <a:buChar char="•"/>
+              <a:defRPr sz="2000" kern="1200">
+                <a:solidFill>
+                  <a:schemeClr val="tx1"/>
+                </a:solidFill>
+                <a:latin typeface="+mn-lt"/>
+                <a:ea typeface="+mn-ea"/>
+                <a:cs typeface="+mn-cs"/>
+              </a:defRPr>
+            </a:lvl2pPr>
+            <a:lvl3pPr marL="1143000" indent="-228600" algn="l" defTabSz="914400" rtl="0" eaLnBrk="1" latinLnBrk="0" hangingPunct="1">
+              <a:lnSpc>
+                <a:spcPct val="120000"/>
+              </a:lnSpc>
+              <a:spcBef>
+                <a:spcPts val="500"/>
+              </a:spcBef>
+              <a:buSzPct val="125000"/>
+              <a:buFont typeface="Arial" panose="020B0604020202020204" pitchFamily="34" charset="0"/>
+              <a:buChar char="•"/>
+              <a:defRPr sz="1800" kern="1200">
+                <a:solidFill>
+                  <a:schemeClr val="tx1"/>
+                </a:solidFill>
+                <a:latin typeface="+mn-lt"/>
+                <a:ea typeface="+mn-ea"/>
+                <a:cs typeface="+mn-cs"/>
+              </a:defRPr>
+            </a:lvl3pPr>
+            <a:lvl4pPr marL="1600200" indent="-228600" algn="l" defTabSz="914400" rtl="0" eaLnBrk="1" latinLnBrk="0" hangingPunct="1">
+              <a:lnSpc>
+                <a:spcPct val="120000"/>
+              </a:lnSpc>
+              <a:spcBef>
+                <a:spcPts val="500"/>
+              </a:spcBef>
+              <a:buSzPct val="125000"/>
+              <a:buFont typeface="Arial" panose="020B0604020202020204" pitchFamily="34" charset="0"/>
+              <a:buChar char="•"/>
+              <a:defRPr sz="1600" kern="1200">
+                <a:solidFill>
+                  <a:schemeClr val="tx1"/>
+                </a:solidFill>
+                <a:latin typeface="+mn-lt"/>
+                <a:ea typeface="+mn-ea"/>
+                <a:cs typeface="+mn-cs"/>
+              </a:defRPr>
+            </a:lvl4pPr>
+            <a:lvl5pPr marL="2057400" indent="-228600" algn="l" defTabSz="914400" rtl="0" eaLnBrk="1" latinLnBrk="0" hangingPunct="1">
+              <a:lnSpc>
+                <a:spcPct val="120000"/>
+              </a:lnSpc>
+              <a:spcBef>
+                <a:spcPts val="500"/>
+              </a:spcBef>
+              <a:buSzPct val="125000"/>
+              <a:buFont typeface="Arial" panose="020B0604020202020204" pitchFamily="34" charset="0"/>
+              <a:buChar char="•"/>
+              <a:defRPr sz="1600" kern="1200">
+                <a:solidFill>
+                  <a:schemeClr val="tx1"/>
+                </a:solidFill>
+                <a:latin typeface="+mn-lt"/>
+                <a:ea typeface="+mn-ea"/>
+                <a:cs typeface="+mn-cs"/>
+              </a:defRPr>
+            </a:lvl5pPr>
+            <a:lvl6pPr marL="2514600" indent="-228600" algn="l" defTabSz="914400" rtl="0" eaLnBrk="1" latinLnBrk="0" hangingPunct="1">
+              <a:lnSpc>
+                <a:spcPct val="120000"/>
+              </a:lnSpc>
+              <a:spcBef>
+                <a:spcPts val="500"/>
+              </a:spcBef>
+              <a:buSzPct val="125000"/>
+              <a:buFont typeface="Arial" panose="020B0604020202020204" pitchFamily="34" charset="0"/>
+              <a:buChar char="•"/>
+              <a:defRPr sz="1400" kern="1200">
+                <a:solidFill>
+                  <a:schemeClr val="tx1"/>
+                </a:solidFill>
+                <a:latin typeface="+mn-lt"/>
+                <a:ea typeface="+mn-ea"/>
+                <a:cs typeface="+mn-cs"/>
+              </a:defRPr>
+            </a:lvl6pPr>
+            <a:lvl7pPr marL="2971800" indent="-228600" algn="l" defTabSz="914400" rtl="0" eaLnBrk="1" latinLnBrk="0" hangingPunct="1">
+              <a:lnSpc>
+                <a:spcPct val="120000"/>
+              </a:lnSpc>
+              <a:spcBef>
+                <a:spcPts val="500"/>
+              </a:spcBef>
+              <a:buSzPct val="125000"/>
+              <a:buFont typeface="Arial" panose="020B0604020202020204" pitchFamily="34" charset="0"/>
+              <a:buChar char="•"/>
+              <a:defRPr sz="1400" kern="1200">
+                <a:solidFill>
+                  <a:schemeClr val="tx1"/>
+                </a:solidFill>
+                <a:latin typeface="+mn-lt"/>
+                <a:ea typeface="+mn-ea"/>
+                <a:cs typeface="+mn-cs"/>
+              </a:defRPr>
+            </a:lvl7pPr>
+            <a:lvl8pPr marL="3429000" indent="-228600" algn="l" defTabSz="914400" rtl="0" eaLnBrk="1" latinLnBrk="0" hangingPunct="1">
+              <a:lnSpc>
+                <a:spcPct val="120000"/>
+              </a:lnSpc>
+              <a:spcBef>
+                <a:spcPts val="500"/>
+              </a:spcBef>
+              <a:buSzPct val="125000"/>
+              <a:buFont typeface="Arial" panose="020B0604020202020204" pitchFamily="34" charset="0"/>
+              <a:buChar char="•"/>
+              <a:defRPr sz="1400" kern="1200">
+                <a:solidFill>
+                  <a:schemeClr val="tx1"/>
+                </a:solidFill>
+                <a:latin typeface="+mn-lt"/>
+                <a:ea typeface="+mn-ea"/>
+                <a:cs typeface="+mn-cs"/>
+              </a:defRPr>
+            </a:lvl8pPr>
+            <a:lvl9pPr marL="3886200" indent="-228600" algn="l" defTabSz="914400" rtl="0" eaLnBrk="1" latinLnBrk="0" hangingPunct="1">
+              <a:lnSpc>
+                <a:spcPct val="120000"/>
+              </a:lnSpc>
+              <a:spcBef>
+                <a:spcPts val="500"/>
+              </a:spcBef>
+              <a:buSzPct val="125000"/>
+              <a:buFont typeface="Arial" panose="020B0604020202020204" pitchFamily="34" charset="0"/>
+              <a:buChar char="•"/>
+              <a:defRPr sz="1400" kern="1200">
+                <a:solidFill>
+                  <a:schemeClr val="tx1"/>
+                </a:solidFill>
+                <a:latin typeface="+mn-lt"/>
+                <a:ea typeface="+mn-ea"/>
+                <a:cs typeface="+mn-cs"/>
+              </a:defRPr>
+            </a:lvl9pPr>
+          </a:lstStyle>
+          <a:p>
+            <a:pPr marL="0" indent="0">
+              <a:buNone/>
+            </a:pPr>
+            <a:r>
+              <a:rPr lang="en-US" dirty="0">
+                <a:solidFill>
+                  <a:srgbClr val="92D050"/>
+                </a:solidFill>
+              </a:rPr>
+              <a:t>/</a:t>
+            </a:r>
+            <a:r>
+              <a:rPr lang="en-US" dirty="0" err="1">
+                <a:solidFill>
+                  <a:srgbClr val="92D050"/>
+                </a:solidFill>
+              </a:rPr>
+              <a:t>d:sonar.analysis.mode</a:t>
+            </a:r>
+            <a:r>
+              <a:rPr lang="en-US" dirty="0">
+                <a:solidFill>
+                  <a:srgbClr val="92D050"/>
+                </a:solidFill>
+              </a:rPr>
+              <a:t>=preview /</a:t>
+            </a:r>
+            <a:r>
+              <a:rPr lang="en-US" dirty="0" err="1">
+                <a:solidFill>
+                  <a:srgbClr val="92D050"/>
+                </a:solidFill>
+              </a:rPr>
+              <a:t>d:sonar.github.pullRequest</a:t>
+            </a:r>
+            <a:r>
+              <a:rPr lang="en-US" dirty="0">
+                <a:solidFill>
+                  <a:srgbClr val="92D050"/>
+                </a:solidFill>
+              </a:rPr>
+              <a:t>=$</a:t>
+            </a:r>
+            <a:r>
+              <a:rPr lang="en-US" dirty="0" err="1">
+                <a:solidFill>
+                  <a:srgbClr val="92D050"/>
+                </a:solidFill>
+              </a:rPr>
+              <a:t>env:APPVEYOR_PULL_REQUEST_NUMBER</a:t>
+            </a:r>
+            <a:r>
+              <a:rPr lang="en-US" dirty="0">
+                <a:solidFill>
+                  <a:srgbClr val="92D050"/>
+                </a:solidFill>
+              </a:rPr>
+              <a:t> /</a:t>
+            </a:r>
+            <a:r>
+              <a:rPr lang="en-US" dirty="0" err="1">
+                <a:solidFill>
+                  <a:srgbClr val="92D050"/>
+                </a:solidFill>
+              </a:rPr>
+              <a:t>d:sonar.github.repository</a:t>
+            </a:r>
+            <a:r>
+              <a:rPr lang="en-US" dirty="0">
+                <a:solidFill>
+                  <a:srgbClr val="92D050"/>
+                </a:solidFill>
+              </a:rPr>
+              <a:t>=$</a:t>
+            </a:r>
+            <a:r>
+              <a:rPr lang="en-US" dirty="0" err="1">
+                <a:solidFill>
+                  <a:srgbClr val="92D050"/>
+                </a:solidFill>
+              </a:rPr>
+              <a:t>env:APPVEYOR_REPO_NAME</a:t>
+            </a:r>
+            <a:r>
+              <a:rPr lang="en-US" dirty="0">
+                <a:solidFill>
+                  <a:srgbClr val="92D050"/>
+                </a:solidFill>
+              </a:rPr>
+              <a:t> /</a:t>
+            </a:r>
+            <a:r>
+              <a:rPr lang="en-US" dirty="0" err="1">
+                <a:solidFill>
+                  <a:srgbClr val="92D050"/>
+                </a:solidFill>
+              </a:rPr>
+              <a:t>d:sonar.github.oauth</a:t>
+            </a:r>
+            <a:r>
+              <a:rPr lang="en-US" dirty="0">
+                <a:solidFill>
+                  <a:srgbClr val="92D050"/>
+                </a:solidFill>
+              </a:rPr>
+              <a:t>=$</a:t>
+            </a:r>
+            <a:r>
+              <a:rPr lang="en-US" dirty="0" err="1">
+                <a:solidFill>
+                  <a:srgbClr val="92D050"/>
+                </a:solidFill>
+              </a:rPr>
+              <a:t>env:SonarGithubKey</a:t>
+            </a:r>
+            <a:endParaRPr lang="en-US" dirty="0">
+              <a:solidFill>
+                <a:srgbClr val="92D050"/>
+              </a:solidFill>
+            </a:endParaRPr>
+          </a:p>
+        </p:txBody>
+      </p:sp>
+    </p:spTree>
+    <p:extLst>
+      <p:ext uri="{BB962C8B-B14F-4D97-AF65-F5344CB8AC3E}">
+        <p14:creationId xmlns:p14="http://schemas.microsoft.com/office/powerpoint/2010/main" val="199369274"/>
+      </p:ext>
+    </p:extLst>
+  </p:cSld>
+  <p:clrMapOvr>
+    <a:masterClrMapping/>
+  </p:clrMapOvr>
+  <p:timing>
+    <p:tnLst>
+      <p:par>
+        <p:cTn id="1" dur="indefinite" restart="never" nodeType="tmRoot">
+          <p:childTnLst>
+            <p:seq concurrent="1" nextAc="seek">
+              <p:cTn id="2" dur="indefinite" nodeType="mainSeq">
+                <p:childTnLst>
+                  <p:par>
+                    <p:cTn id="3" fill="hold">
+                      <p:stCondLst>
+                        <p:cond delay="indefinite"/>
+                      </p:stCondLst>
+                      <p:childTnLst>
+                        <p:par>
+                          <p:cTn id="4" fill="hold">
+                            <p:stCondLst>
+                              <p:cond delay="0"/>
+                            </p:stCondLst>
+                            <p:childTnLst>
+                              <p:par>
+                                <p:cTn id="5" presetID="1" presetClass="entr" presetSubtype="0" fill="hold" grpId="0" nodeType="clickEffect">
+                                  <p:stCondLst>
+                                    <p:cond delay="0"/>
+                                  </p:stCondLst>
+                                  <p:childTnLst>
+                                    <p:set>
+                                      <p:cBhvr>
+                                        <p:cTn id="6" dur="1" fill="hold">
+                                          <p:stCondLst>
+                                            <p:cond delay="0"/>
+                                          </p:stCondLst>
+                                        </p:cTn>
+                                        <p:tgtEl>
+                                          <p:spTgt spid="4"/>
+                                        </p:tgtEl>
+                                        <p:attrNameLst>
+                                          <p:attrName>style.visibility</p:attrName>
+                                        </p:attrNameLst>
+                                      </p:cBhvr>
+                                      <p:to>
+                                        <p:strVal val="visible"/>
+                                      </p:to>
+                                    </p:set>
+                                  </p:childTnLst>
+                                </p:cTn>
+                              </p:par>
+                            </p:childTnLst>
+                          </p:cTn>
+                        </p:par>
+                      </p:childTnLst>
+                    </p:cTn>
+                  </p:par>
+                </p:childTnLst>
+              </p:cTn>
+              <p:prevCondLst>
+                <p:cond evt="onPrev" delay="0">
+                  <p:tgtEl>
+                    <p:sldTgt/>
+                  </p:tgtEl>
+                </p:cond>
+              </p:prevCondLst>
+              <p:nextCondLst>
+                <p:cond evt="onNext" delay="0">
+                  <p:tgtEl>
+                    <p:sldTgt/>
+                  </p:tgtEl>
+                </p:cond>
+              </p:nextCondLst>
+            </p:seq>
+          </p:childTnLst>
+        </p:cTn>
+      </p:par>
+    </p:tnLst>
+    <p:bldLst>
+      <p:bldP spid="4" grpId="0" animBg="1"/>
+    </p:bldLst>
+  </p:timing>
+</p:sld>
+</file>
+
+<file path=ppt/slides/slide34.xml><?xml version="1.0" encoding="utf-8"?>
+<p:sld xmlns:a="http://schemas.openxmlformats.org/drawingml/2006/main" xmlns:r="http://schemas.openxmlformats.org/officeDocument/2006/relationships" xmlns:p="http://schemas.openxmlformats.org/presentationml/2006/main">
+  <p:cSld>
+    <p:spTree>
+      <p:nvGrpSpPr>
+        <p:cNvPr id="1" name=""/>
+        <p:cNvGrpSpPr/>
+        <p:nvPr/>
+      </p:nvGrpSpPr>
+      <p:grpSpPr>
+        <a:xfrm>
+          <a:off x="0" y="0"/>
+          <a:ext cx="0" cy="0"/>
+          <a:chOff x="0" y="0"/>
+          <a:chExt cx="0" cy="0"/>
+        </a:xfrm>
+      </p:grpSpPr>
+      <p:sp>
+        <p:nvSpPr>
+          <p:cNvPr id="2" name="Title 1">
+            <a:extLst>
+              <a:ext uri="{FF2B5EF4-FFF2-40B4-BE49-F238E27FC236}">
                 <a16:creationId xmlns:a16="http://schemas.microsoft.com/office/drawing/2014/main" id="{DEDF95E6-31A7-4A4D-B81B-67A931C484D1}"/>
               </a:ext>
             </a:extLst>

</xml_diff>

<commit_message>
Fix SQ reported errors.
</commit_message>
<xml_diff>
--- a/Presentation/Full Open-Source CI.pptx
+++ b/Presentation/Full Open-Source CI.pptx
@@ -38,7 +38,12 @@
     <p:sldId id="289" r:id="rId32"/>
     <p:sldId id="290" r:id="rId33"/>
     <p:sldId id="291" r:id="rId34"/>
-    <p:sldId id="273" r:id="rId35"/>
+    <p:sldId id="292" r:id="rId35"/>
+    <p:sldId id="293" r:id="rId36"/>
+    <p:sldId id="294" r:id="rId37"/>
+    <p:sldId id="295" r:id="rId38"/>
+    <p:sldId id="296" r:id="rId39"/>
+    <p:sldId id="273" r:id="rId40"/>
   </p:sldIdLst>
   <p:sldSz cx="12192000" cy="6858000"/>
   <p:notesSz cx="6858000" cy="9144000"/>
@@ -1071,7 +1076,7 @@
           <a:noFill/>
           <a:extLst>
             <a:ext uri="{909E8E84-426E-40dd-AFC4-6F175D3DCCD1}">
-              <a14:hiddenFill xmlns:a14="http://schemas.microsoft.com/office/drawing/2010/main" xmlns="">
+              <a14:hiddenFill xmlns="" xmlns:a14="http://schemas.microsoft.com/office/drawing/2010/main">
                 <a:solidFill>
                   <a:srgbClr val="FFFFFF"/>
                 </a:solidFill>
@@ -1131,7 +1136,7 @@
             </a:ln>
             <a:extLst>
               <a:ext uri="{91240B29-F687-4f45-9708-019B960494DF}">
-                <a14:hiddenLine xmlns:a14="http://schemas.microsoft.com/office/drawing/2010/main" xmlns="" w="9525">
+                <a14:hiddenLine xmlns="" xmlns:a14="http://schemas.microsoft.com/office/drawing/2010/main" w="9525">
                   <a:solidFill>
                     <a:srgbClr val="000000"/>
                   </a:solidFill>
@@ -1221,7 +1226,7 @@
             </a:ln>
             <a:extLst>
               <a:ext uri="{91240B29-F687-4f45-9708-019B960494DF}">
-                <a14:hiddenLine xmlns:a14="http://schemas.microsoft.com/office/drawing/2010/main" xmlns="" w="9525">
+                <a14:hiddenLine xmlns="" xmlns:a14="http://schemas.microsoft.com/office/drawing/2010/main" w="9525">
                   <a:solidFill>
                     <a:srgbClr val="000000"/>
                   </a:solidFill>
@@ -1311,7 +1316,7 @@
             </a:ln>
             <a:extLst>
               <a:ext uri="{91240B29-F687-4f45-9708-019B960494DF}">
-                <a14:hiddenLine xmlns:a14="http://schemas.microsoft.com/office/drawing/2010/main" xmlns="" w="9525">
+                <a14:hiddenLine xmlns="" xmlns:a14="http://schemas.microsoft.com/office/drawing/2010/main" w="9525">
                   <a:solidFill>
                     <a:srgbClr val="000000"/>
                   </a:solidFill>
@@ -1345,7 +1350,7 @@
             </a:ln>
             <a:extLst>
               <a:ext uri="{91240B29-F687-4f45-9708-019B960494DF}">
-                <a14:hiddenLine xmlns:a14="http://schemas.microsoft.com/office/drawing/2010/main" xmlns="" w="9525">
+                <a14:hiddenLine xmlns="" xmlns:a14="http://schemas.microsoft.com/office/drawing/2010/main" w="9525">
                   <a:solidFill>
                     <a:srgbClr val="000000"/>
                   </a:solidFill>
@@ -1435,7 +1440,7 @@
             </a:ln>
             <a:extLst>
               <a:ext uri="{91240B29-F687-4f45-9708-019B960494DF}">
-                <a14:hiddenLine xmlns:a14="http://schemas.microsoft.com/office/drawing/2010/main" xmlns="" w="9525">
+                <a14:hiddenLine xmlns="" xmlns:a14="http://schemas.microsoft.com/office/drawing/2010/main" w="9525">
                   <a:solidFill>
                     <a:srgbClr val="000000"/>
                   </a:solidFill>
@@ -1497,7 +1502,7 @@
             </a:ln>
             <a:extLst>
               <a:ext uri="{91240B29-F687-4f45-9708-019B960494DF}">
-                <a14:hiddenLine xmlns:a14="http://schemas.microsoft.com/office/drawing/2010/main" xmlns="" w="9525">
+                <a14:hiddenLine xmlns="" xmlns:a14="http://schemas.microsoft.com/office/drawing/2010/main" w="9525">
                   <a:solidFill>
                     <a:srgbClr val="000000"/>
                   </a:solidFill>
@@ -1559,7 +1564,7 @@
             </a:ln>
             <a:extLst>
               <a:ext uri="{91240B29-F687-4f45-9708-019B960494DF}">
-                <a14:hiddenLine xmlns:a14="http://schemas.microsoft.com/office/drawing/2010/main" xmlns="" w="9525">
+                <a14:hiddenLine xmlns="" xmlns:a14="http://schemas.microsoft.com/office/drawing/2010/main" w="9525">
                   <a:solidFill>
                     <a:srgbClr val="000000"/>
                   </a:solidFill>
@@ -1649,7 +1654,7 @@
             </a:ln>
             <a:extLst>
               <a:ext uri="{91240B29-F687-4f45-9708-019B960494DF}">
-                <a14:hiddenLine xmlns:a14="http://schemas.microsoft.com/office/drawing/2010/main" xmlns="" w="9525">
+                <a14:hiddenLine xmlns="" xmlns:a14="http://schemas.microsoft.com/office/drawing/2010/main" w="9525">
                   <a:solidFill>
                     <a:srgbClr val="000000"/>
                   </a:solidFill>
@@ -1711,7 +1716,7 @@
             </a:ln>
             <a:extLst>
               <a:ext uri="{91240B29-F687-4f45-9708-019B960494DF}">
-                <a14:hiddenLine xmlns:a14="http://schemas.microsoft.com/office/drawing/2010/main" xmlns="" w="9525">
+                <a14:hiddenLine xmlns="" xmlns:a14="http://schemas.microsoft.com/office/drawing/2010/main" w="9525">
                   <a:solidFill>
                     <a:srgbClr val="000000"/>
                   </a:solidFill>
@@ -1773,7 +1778,7 @@
             </a:ln>
             <a:extLst>
               <a:ext uri="{91240B29-F687-4f45-9708-019B960494DF}">
-                <a14:hiddenLine xmlns:a14="http://schemas.microsoft.com/office/drawing/2010/main" xmlns="" w="9525">
+                <a14:hiddenLine xmlns="" xmlns:a14="http://schemas.microsoft.com/office/drawing/2010/main" w="9525">
                   <a:solidFill>
                     <a:srgbClr val="000000"/>
                   </a:solidFill>
@@ -1863,7 +1868,7 @@
             </a:ln>
             <a:extLst>
               <a:ext uri="{91240B29-F687-4f45-9708-019B960494DF}">
-                <a14:hiddenLine xmlns:a14="http://schemas.microsoft.com/office/drawing/2010/main" xmlns="" w="9525">
+                <a14:hiddenLine xmlns="" xmlns:a14="http://schemas.microsoft.com/office/drawing/2010/main" w="9525">
                   <a:solidFill>
                     <a:srgbClr val="000000"/>
                   </a:solidFill>
@@ -1953,7 +1958,7 @@
             </a:ln>
             <a:extLst>
               <a:ext uri="{91240B29-F687-4f45-9708-019B960494DF}">
-                <a14:hiddenLine xmlns:a14="http://schemas.microsoft.com/office/drawing/2010/main" xmlns="" w="9525">
+                <a14:hiddenLine xmlns="" xmlns:a14="http://schemas.microsoft.com/office/drawing/2010/main" w="9525">
                   <a:solidFill>
                     <a:srgbClr val="000000"/>
                   </a:solidFill>
@@ -2015,7 +2020,7 @@
             </a:ln>
             <a:extLst>
               <a:ext uri="{91240B29-F687-4f45-9708-019B960494DF}">
-                <a14:hiddenLine xmlns:a14="http://schemas.microsoft.com/office/drawing/2010/main" xmlns="" w="9525">
+                <a14:hiddenLine xmlns="" xmlns:a14="http://schemas.microsoft.com/office/drawing/2010/main" w="9525">
                   <a:solidFill>
                     <a:srgbClr val="000000"/>
                   </a:solidFill>
@@ -2125,7 +2130,7 @@
             </a:ln>
             <a:extLst>
               <a:ext uri="{91240B29-F687-4f45-9708-019B960494DF}">
-                <a14:hiddenLine xmlns:a14="http://schemas.microsoft.com/office/drawing/2010/main" xmlns="" w="9525">
+                <a14:hiddenLine xmlns="" xmlns:a14="http://schemas.microsoft.com/office/drawing/2010/main" w="9525">
                   <a:solidFill>
                     <a:srgbClr val="000000"/>
                   </a:solidFill>
@@ -2187,7 +2192,7 @@
             </a:ln>
             <a:extLst>
               <a:ext uri="{91240B29-F687-4f45-9708-019B960494DF}">
-                <a14:hiddenLine xmlns:a14="http://schemas.microsoft.com/office/drawing/2010/main" xmlns="" w="9525">
+                <a14:hiddenLine xmlns="" xmlns:a14="http://schemas.microsoft.com/office/drawing/2010/main" w="9525">
                   <a:solidFill>
                     <a:srgbClr val="000000"/>
                   </a:solidFill>
@@ -2277,7 +2282,7 @@
             </a:ln>
             <a:extLst>
               <a:ext uri="{91240B29-F687-4f45-9708-019B960494DF}">
-                <a14:hiddenLine xmlns:a14="http://schemas.microsoft.com/office/drawing/2010/main" xmlns="" w="9525">
+                <a14:hiddenLine xmlns="" xmlns:a14="http://schemas.microsoft.com/office/drawing/2010/main" w="9525">
                   <a:solidFill>
                     <a:srgbClr val="000000"/>
                   </a:solidFill>
@@ -2367,7 +2372,7 @@
             </a:ln>
             <a:extLst>
               <a:ext uri="{91240B29-F687-4f45-9708-019B960494DF}">
-                <a14:hiddenLine xmlns:a14="http://schemas.microsoft.com/office/drawing/2010/main" xmlns="" w="9525">
+                <a14:hiddenLine xmlns="" xmlns:a14="http://schemas.microsoft.com/office/drawing/2010/main" w="9525">
                   <a:solidFill>
                     <a:srgbClr val="000000"/>
                   </a:solidFill>
@@ -2429,7 +2434,7 @@
             </a:ln>
             <a:extLst>
               <a:ext uri="{91240B29-F687-4f45-9708-019B960494DF}">
-                <a14:hiddenLine xmlns:a14="http://schemas.microsoft.com/office/drawing/2010/main" xmlns="" w="9525">
+                <a14:hiddenLine xmlns="" xmlns:a14="http://schemas.microsoft.com/office/drawing/2010/main" w="9525">
                   <a:solidFill>
                     <a:srgbClr val="000000"/>
                   </a:solidFill>
@@ -2519,7 +2524,7 @@
             </a:ln>
             <a:extLst>
               <a:ext uri="{91240B29-F687-4f45-9708-019B960494DF}">
-                <a14:hiddenLine xmlns:a14="http://schemas.microsoft.com/office/drawing/2010/main" xmlns="" w="9525">
+                <a14:hiddenLine xmlns="" xmlns:a14="http://schemas.microsoft.com/office/drawing/2010/main" w="9525">
                   <a:solidFill>
                     <a:srgbClr val="000000"/>
                   </a:solidFill>
@@ -2609,7 +2614,7 @@
             </a:ln>
             <a:extLst>
               <a:ext uri="{91240B29-F687-4f45-9708-019B960494DF}">
-                <a14:hiddenLine xmlns:a14="http://schemas.microsoft.com/office/drawing/2010/main" xmlns="" w="9525">
+                <a14:hiddenLine xmlns="" xmlns:a14="http://schemas.microsoft.com/office/drawing/2010/main" w="9525">
                   <a:solidFill>
                     <a:srgbClr val="000000"/>
                   </a:solidFill>
@@ -2665,7 +2670,7 @@
             </a:ln>
             <a:extLst>
               <a:ext uri="{91240B29-F687-4f45-9708-019B960494DF}">
-                <a14:hiddenLine xmlns:a14="http://schemas.microsoft.com/office/drawing/2010/main" xmlns="" w="9525">
+                <a14:hiddenLine xmlns="" xmlns:a14="http://schemas.microsoft.com/office/drawing/2010/main" w="9525">
                   <a:solidFill>
                     <a:srgbClr val="000000"/>
                   </a:solidFill>
@@ -2755,7 +2760,7 @@
             </a:ln>
             <a:extLst>
               <a:ext uri="{91240B29-F687-4f45-9708-019B960494DF}">
-                <a14:hiddenLine xmlns:a14="http://schemas.microsoft.com/office/drawing/2010/main" xmlns="" w="9525">
+                <a14:hiddenLine xmlns="" xmlns:a14="http://schemas.microsoft.com/office/drawing/2010/main" w="9525">
                   <a:solidFill>
                     <a:srgbClr val="000000"/>
                   </a:solidFill>
@@ -2811,7 +2816,7 @@
             </a:ln>
             <a:extLst>
               <a:ext uri="{91240B29-F687-4f45-9708-019B960494DF}">
-                <a14:hiddenLine xmlns:a14="http://schemas.microsoft.com/office/drawing/2010/main" xmlns="" w="9525">
+                <a14:hiddenLine xmlns="" xmlns:a14="http://schemas.microsoft.com/office/drawing/2010/main" w="9525">
                   <a:solidFill>
                     <a:srgbClr val="000000"/>
                   </a:solidFill>
@@ -2901,7 +2906,7 @@
             </a:ln>
             <a:extLst>
               <a:ext uri="{91240B29-F687-4f45-9708-019B960494DF}">
-                <a14:hiddenLine xmlns:a14="http://schemas.microsoft.com/office/drawing/2010/main" xmlns="" w="9525">
+                <a14:hiddenLine xmlns="" xmlns:a14="http://schemas.microsoft.com/office/drawing/2010/main" w="9525">
                   <a:solidFill>
                     <a:srgbClr val="000000"/>
                   </a:solidFill>
@@ -2969,7 +2974,7 @@
             </a:ln>
             <a:extLst>
               <a:ext uri="{91240B29-F687-4f45-9708-019B960494DF}">
-                <a14:hiddenLine xmlns:a14="http://schemas.microsoft.com/office/drawing/2010/main" xmlns="" w="9525">
+                <a14:hiddenLine xmlns="" xmlns:a14="http://schemas.microsoft.com/office/drawing/2010/main" w="9525">
                   <a:solidFill>
                     <a:srgbClr val="000000"/>
                   </a:solidFill>
@@ -3059,7 +3064,7 @@
             </a:ln>
             <a:extLst>
               <a:ext uri="{91240B29-F687-4f45-9708-019B960494DF}">
-                <a14:hiddenLine xmlns:a14="http://schemas.microsoft.com/office/drawing/2010/main" xmlns="" w="9525">
+                <a14:hiddenLine xmlns="" xmlns:a14="http://schemas.microsoft.com/office/drawing/2010/main" w="9525">
                   <a:solidFill>
                     <a:srgbClr val="000000"/>
                   </a:solidFill>
@@ -3127,7 +3132,7 @@
             </a:ln>
             <a:extLst>
               <a:ext uri="{91240B29-F687-4f45-9708-019B960494DF}">
-                <a14:hiddenLine xmlns:a14="http://schemas.microsoft.com/office/drawing/2010/main" xmlns="" w="9525">
+                <a14:hiddenLine xmlns="" xmlns:a14="http://schemas.microsoft.com/office/drawing/2010/main" w="9525">
                   <a:solidFill>
                     <a:srgbClr val="000000"/>
                   </a:solidFill>
@@ -3217,7 +3222,7 @@
             </a:ln>
             <a:extLst>
               <a:ext uri="{91240B29-F687-4f45-9708-019B960494DF}">
-                <a14:hiddenLine xmlns:a14="http://schemas.microsoft.com/office/drawing/2010/main" xmlns="" w="9525">
+                <a14:hiddenLine xmlns="" xmlns:a14="http://schemas.microsoft.com/office/drawing/2010/main" w="9525">
                   <a:solidFill>
                     <a:srgbClr val="000000"/>
                   </a:solidFill>
@@ -3251,7 +3256,7 @@
             </a:ln>
             <a:extLst>
               <a:ext uri="{91240B29-F687-4f45-9708-019B960494DF}">
-                <a14:hiddenLine xmlns:a14="http://schemas.microsoft.com/office/drawing/2010/main" xmlns="" w="9525">
+                <a14:hiddenLine xmlns="" xmlns:a14="http://schemas.microsoft.com/office/drawing/2010/main" w="9525">
                   <a:solidFill>
                     <a:srgbClr val="000000"/>
                   </a:solidFill>
@@ -3341,7 +3346,7 @@
             </a:ln>
             <a:extLst>
               <a:ext uri="{91240B29-F687-4f45-9708-019B960494DF}">
-                <a14:hiddenLine xmlns:a14="http://schemas.microsoft.com/office/drawing/2010/main" xmlns="" w="9525">
+                <a14:hiddenLine xmlns="" xmlns:a14="http://schemas.microsoft.com/office/drawing/2010/main" w="9525">
                   <a:solidFill>
                     <a:srgbClr val="000000"/>
                   </a:solidFill>
@@ -3403,7 +3408,7 @@
             </a:ln>
             <a:extLst>
               <a:ext uri="{91240B29-F687-4f45-9708-019B960494DF}">
-                <a14:hiddenLine xmlns:a14="http://schemas.microsoft.com/office/drawing/2010/main" xmlns="" w="9525">
+                <a14:hiddenLine xmlns="" xmlns:a14="http://schemas.microsoft.com/office/drawing/2010/main" w="9525">
                   <a:solidFill>
                     <a:srgbClr val="000000"/>
                   </a:solidFill>
@@ -3465,7 +3470,7 @@
             </a:ln>
             <a:extLst>
               <a:ext uri="{91240B29-F687-4f45-9708-019B960494DF}">
-                <a14:hiddenLine xmlns:a14="http://schemas.microsoft.com/office/drawing/2010/main" xmlns="" w="9525">
+                <a14:hiddenLine xmlns="" xmlns:a14="http://schemas.microsoft.com/office/drawing/2010/main" w="9525">
                   <a:solidFill>
                     <a:srgbClr val="000000"/>
                   </a:solidFill>
@@ -3555,7 +3560,7 @@
             </a:ln>
             <a:extLst>
               <a:ext uri="{91240B29-F687-4f45-9708-019B960494DF}">
-                <a14:hiddenLine xmlns:a14="http://schemas.microsoft.com/office/drawing/2010/main" xmlns="" w="9525">
+                <a14:hiddenLine xmlns="" xmlns:a14="http://schemas.microsoft.com/office/drawing/2010/main" w="9525">
                   <a:solidFill>
                     <a:srgbClr val="000000"/>
                   </a:solidFill>
@@ -3623,7 +3628,7 @@
             </a:ln>
             <a:extLst>
               <a:ext uri="{91240B29-F687-4f45-9708-019B960494DF}">
-                <a14:hiddenLine xmlns:a14="http://schemas.microsoft.com/office/drawing/2010/main" xmlns="" w="9525">
+                <a14:hiddenLine xmlns="" xmlns:a14="http://schemas.microsoft.com/office/drawing/2010/main" w="9525">
                   <a:solidFill>
                     <a:srgbClr val="000000"/>
                   </a:solidFill>
@@ -3685,7 +3690,7 @@
             </a:ln>
             <a:extLst>
               <a:ext uri="{91240B29-F687-4f45-9708-019B960494DF}">
-                <a14:hiddenLine xmlns:a14="http://schemas.microsoft.com/office/drawing/2010/main" xmlns="" w="9525">
+                <a14:hiddenLine xmlns="" xmlns:a14="http://schemas.microsoft.com/office/drawing/2010/main" w="9525">
                   <a:solidFill>
                     <a:srgbClr val="000000"/>
                   </a:solidFill>
@@ -3775,7 +3780,7 @@
             </a:ln>
             <a:extLst>
               <a:ext uri="{91240B29-F687-4f45-9708-019B960494DF}">
-                <a14:hiddenLine xmlns:a14="http://schemas.microsoft.com/office/drawing/2010/main" xmlns="" w="9525">
+                <a14:hiddenLine xmlns="" xmlns:a14="http://schemas.microsoft.com/office/drawing/2010/main" w="9525">
                   <a:solidFill>
                     <a:srgbClr val="000000"/>
                   </a:solidFill>
@@ -3837,7 +3842,7 @@
             </a:ln>
             <a:extLst>
               <a:ext uri="{91240B29-F687-4f45-9708-019B960494DF}">
-                <a14:hiddenLine xmlns:a14="http://schemas.microsoft.com/office/drawing/2010/main" xmlns="" w="9525">
+                <a14:hiddenLine xmlns="" xmlns:a14="http://schemas.microsoft.com/office/drawing/2010/main" w="9525">
                   <a:solidFill>
                     <a:srgbClr val="000000"/>
                   </a:solidFill>
@@ -3927,7 +3932,7 @@
             </a:ln>
             <a:extLst>
               <a:ext uri="{91240B29-F687-4f45-9708-019B960494DF}">
-                <a14:hiddenLine xmlns:a14="http://schemas.microsoft.com/office/drawing/2010/main" xmlns="" w="9525">
+                <a14:hiddenLine xmlns="" xmlns:a14="http://schemas.microsoft.com/office/drawing/2010/main" w="9525">
                   <a:solidFill>
                     <a:srgbClr val="000000"/>
                   </a:solidFill>
@@ -3989,7 +3994,7 @@
             </a:ln>
             <a:extLst>
               <a:ext uri="{91240B29-F687-4f45-9708-019B960494DF}">
-                <a14:hiddenLine xmlns:a14="http://schemas.microsoft.com/office/drawing/2010/main" xmlns="" w="9525">
+                <a14:hiddenLine xmlns="" xmlns:a14="http://schemas.microsoft.com/office/drawing/2010/main" w="9525">
                   <a:solidFill>
                     <a:srgbClr val="000000"/>
                   </a:solidFill>
@@ -4079,7 +4084,7 @@
             </a:ln>
             <a:extLst>
               <a:ext uri="{91240B29-F687-4f45-9708-019B960494DF}">
-                <a14:hiddenLine xmlns:a14="http://schemas.microsoft.com/office/drawing/2010/main" xmlns="" w="9525">
+                <a14:hiddenLine xmlns="" xmlns:a14="http://schemas.microsoft.com/office/drawing/2010/main" w="9525">
                   <a:solidFill>
                     <a:srgbClr val="000000"/>
                   </a:solidFill>
@@ -4113,7 +4118,7 @@
             </a:ln>
             <a:extLst>
               <a:ext uri="{91240B29-F687-4f45-9708-019B960494DF}">
-                <a14:hiddenLine xmlns:a14="http://schemas.microsoft.com/office/drawing/2010/main" xmlns="" w="9525">
+                <a14:hiddenLine xmlns="" xmlns:a14="http://schemas.microsoft.com/office/drawing/2010/main" w="9525">
                   <a:solidFill>
                     <a:srgbClr val="000000"/>
                   </a:solidFill>
@@ -4178,7 +4183,7 @@
             </a:ln>
             <a:extLst>
               <a:ext uri="{91240B29-F687-4f45-9708-019B960494DF}">
-                <a14:hiddenLine xmlns:a14="http://schemas.microsoft.com/office/drawing/2010/main" xmlns="" w="9525">
+                <a14:hiddenLine xmlns="" xmlns:a14="http://schemas.microsoft.com/office/drawing/2010/main" w="9525">
                   <a:solidFill>
                     <a:srgbClr val="000000"/>
                   </a:solidFill>
@@ -4268,7 +4273,7 @@
             </a:ln>
             <a:extLst>
               <a:ext uri="{91240B29-F687-4f45-9708-019B960494DF}">
-                <a14:hiddenLine xmlns:a14="http://schemas.microsoft.com/office/drawing/2010/main" xmlns="" w="9525">
+                <a14:hiddenLine xmlns="" xmlns:a14="http://schemas.microsoft.com/office/drawing/2010/main" w="9525">
                   <a:solidFill>
                     <a:srgbClr val="000000"/>
                   </a:solidFill>
@@ -4330,7 +4335,7 @@
             </a:ln>
             <a:extLst>
               <a:ext uri="{91240B29-F687-4f45-9708-019B960494DF}">
-                <a14:hiddenLine xmlns:a14="http://schemas.microsoft.com/office/drawing/2010/main" xmlns="" w="9525">
+                <a14:hiddenLine xmlns="" xmlns:a14="http://schemas.microsoft.com/office/drawing/2010/main" w="9525">
                   <a:solidFill>
                     <a:srgbClr val="000000"/>
                   </a:solidFill>
@@ -4420,7 +4425,7 @@
             </a:ln>
             <a:extLst>
               <a:ext uri="{91240B29-F687-4f45-9708-019B960494DF}">
-                <a14:hiddenLine xmlns:a14="http://schemas.microsoft.com/office/drawing/2010/main" xmlns="" w="9525">
+                <a14:hiddenLine xmlns="" xmlns:a14="http://schemas.microsoft.com/office/drawing/2010/main" w="9525">
                   <a:solidFill>
                     <a:srgbClr val="000000"/>
                   </a:solidFill>
@@ -4510,7 +4515,7 @@
             </a:ln>
             <a:extLst>
               <a:ext uri="{91240B29-F687-4f45-9708-019B960494DF}">
-                <a14:hiddenLine xmlns:a14="http://schemas.microsoft.com/office/drawing/2010/main" xmlns="" w="9525">
+                <a14:hiddenLine xmlns="" xmlns:a14="http://schemas.microsoft.com/office/drawing/2010/main" w="9525">
                   <a:solidFill>
                     <a:srgbClr val="000000"/>
                   </a:solidFill>
@@ -4575,7 +4580,7 @@
             </a:ln>
             <a:extLst>
               <a:ext uri="{91240B29-F687-4f45-9708-019B960494DF}">
-                <a14:hiddenLine xmlns:a14="http://schemas.microsoft.com/office/drawing/2010/main" xmlns="" w="9525">
+                <a14:hiddenLine xmlns="" xmlns:a14="http://schemas.microsoft.com/office/drawing/2010/main" w="9525">
                   <a:solidFill>
                     <a:srgbClr val="000000"/>
                   </a:solidFill>
@@ -4637,7 +4642,7 @@
             </a:ln>
             <a:extLst>
               <a:ext uri="{91240B29-F687-4f45-9708-019B960494DF}">
-                <a14:hiddenLine xmlns:a14="http://schemas.microsoft.com/office/drawing/2010/main" xmlns="" w="9525">
+                <a14:hiddenLine xmlns="" xmlns:a14="http://schemas.microsoft.com/office/drawing/2010/main" w="9525">
                   <a:solidFill>
                     <a:srgbClr val="000000"/>
                   </a:solidFill>
@@ -4727,7 +4732,7 @@
             </a:ln>
             <a:extLst>
               <a:ext uri="{91240B29-F687-4f45-9708-019B960494DF}">
-                <a14:hiddenLine xmlns:a14="http://schemas.microsoft.com/office/drawing/2010/main" xmlns="" w="9525">
+                <a14:hiddenLine xmlns="" xmlns:a14="http://schemas.microsoft.com/office/drawing/2010/main" w="9525">
                   <a:solidFill>
                     <a:srgbClr val="000000"/>
                   </a:solidFill>
@@ -4817,7 +4822,7 @@
             </a:ln>
             <a:extLst>
               <a:ext uri="{91240B29-F687-4f45-9708-019B960494DF}">
-                <a14:hiddenLine xmlns:a14="http://schemas.microsoft.com/office/drawing/2010/main" xmlns="" w="9525">
+                <a14:hiddenLine xmlns="" xmlns:a14="http://schemas.microsoft.com/office/drawing/2010/main" w="9525">
                   <a:solidFill>
                     <a:srgbClr val="000000"/>
                   </a:solidFill>
@@ -4879,7 +4884,7 @@
             </a:ln>
             <a:extLst>
               <a:ext uri="{91240B29-F687-4f45-9708-019B960494DF}">
-                <a14:hiddenLine xmlns:a14="http://schemas.microsoft.com/office/drawing/2010/main" xmlns="" w="9525">
+                <a14:hiddenLine xmlns="" xmlns:a14="http://schemas.microsoft.com/office/drawing/2010/main" w="9525">
                   <a:solidFill>
                     <a:srgbClr val="000000"/>
                   </a:solidFill>
@@ -4999,7 +5004,7 @@
             </a:ln>
             <a:extLst>
               <a:ext uri="{91240B29-F687-4f45-9708-019B960494DF}">
-                <a14:hiddenLine xmlns:a14="http://schemas.microsoft.com/office/drawing/2010/main" xmlns="" w="9525">
+                <a14:hiddenLine xmlns="" xmlns:a14="http://schemas.microsoft.com/office/drawing/2010/main" w="9525">
                   <a:solidFill>
                     <a:srgbClr val="000000"/>
                   </a:solidFill>
@@ -5067,7 +5072,7 @@
             </a:ln>
             <a:extLst>
               <a:ext uri="{91240B29-F687-4f45-9708-019B960494DF}">
-                <a14:hiddenLine xmlns:a14="http://schemas.microsoft.com/office/drawing/2010/main" xmlns="" w="9525">
+                <a14:hiddenLine xmlns="" xmlns:a14="http://schemas.microsoft.com/office/drawing/2010/main" w="9525">
                   <a:solidFill>
                     <a:srgbClr val="000000"/>
                   </a:solidFill>
@@ -5157,7 +5162,7 @@
             </a:ln>
             <a:extLst>
               <a:ext uri="{91240B29-F687-4f45-9708-019B960494DF}">
-                <a14:hiddenLine xmlns:a14="http://schemas.microsoft.com/office/drawing/2010/main" xmlns="" w="9525">
+                <a14:hiddenLine xmlns="" xmlns:a14="http://schemas.microsoft.com/office/drawing/2010/main" w="9525">
                   <a:solidFill>
                     <a:srgbClr val="000000"/>
                   </a:solidFill>
@@ -9998,7 +10003,7 @@
           <a:noFill/>
           <a:extLst>
             <a:ext uri="{909E8E84-426E-40dd-AFC4-6F175D3DCCD1}">
-              <a14:hiddenFill xmlns:a14="http://schemas.microsoft.com/office/drawing/2010/main" xmlns="">
+              <a14:hiddenFill xmlns="" xmlns:a14="http://schemas.microsoft.com/office/drawing/2010/main">
                 <a:solidFill>
                   <a:srgbClr val="FFFFFF"/>
                 </a:solidFill>
@@ -10072,7 +10077,7 @@
               </a:ln>
               <a:extLst>
                 <a:ext uri="{91240B29-F687-4f45-9708-019B960494DF}">
-                  <a14:hiddenLine xmlns:a14="http://schemas.microsoft.com/office/drawing/2010/main" xmlns="" w="9525">
+                  <a14:hiddenLine xmlns="" xmlns:a14="http://schemas.microsoft.com/office/drawing/2010/main" w="9525">
                     <a:solidFill>
                       <a:srgbClr val="000000"/>
                     </a:solidFill>
@@ -10162,7 +10167,7 @@
               </a:ln>
               <a:extLst>
                 <a:ext uri="{91240B29-F687-4f45-9708-019B960494DF}">
-                  <a14:hiddenLine xmlns:a14="http://schemas.microsoft.com/office/drawing/2010/main" xmlns="" w="9525">
+                  <a14:hiddenLine xmlns="" xmlns:a14="http://schemas.microsoft.com/office/drawing/2010/main" w="9525">
                     <a:solidFill>
                       <a:srgbClr val="000000"/>
                     </a:solidFill>
@@ -10252,7 +10257,7 @@
               </a:ln>
               <a:extLst>
                 <a:ext uri="{91240B29-F687-4f45-9708-019B960494DF}">
-                  <a14:hiddenLine xmlns:a14="http://schemas.microsoft.com/office/drawing/2010/main" xmlns="" w="9525">
+                  <a14:hiddenLine xmlns="" xmlns:a14="http://schemas.microsoft.com/office/drawing/2010/main" w="9525">
                     <a:solidFill>
                       <a:srgbClr val="000000"/>
                     </a:solidFill>
@@ -10314,7 +10319,7 @@
               </a:ln>
               <a:extLst>
                 <a:ext uri="{91240B29-F687-4f45-9708-019B960494DF}">
-                  <a14:hiddenLine xmlns:a14="http://schemas.microsoft.com/office/drawing/2010/main" xmlns="" w="9525">
+                  <a14:hiddenLine xmlns="" xmlns:a14="http://schemas.microsoft.com/office/drawing/2010/main" w="9525">
                     <a:solidFill>
                       <a:srgbClr val="000000"/>
                     </a:solidFill>
@@ -10404,7 +10409,7 @@
               </a:ln>
               <a:extLst>
                 <a:ext uri="{91240B29-F687-4f45-9708-019B960494DF}">
-                  <a14:hiddenLine xmlns:a14="http://schemas.microsoft.com/office/drawing/2010/main" xmlns="" w="9525">
+                  <a14:hiddenLine xmlns="" xmlns:a14="http://schemas.microsoft.com/office/drawing/2010/main" w="9525">
                     <a:solidFill>
                       <a:srgbClr val="000000"/>
                     </a:solidFill>
@@ -10466,7 +10471,7 @@
               </a:ln>
               <a:extLst>
                 <a:ext uri="{91240B29-F687-4f45-9708-019B960494DF}">
-                  <a14:hiddenLine xmlns:a14="http://schemas.microsoft.com/office/drawing/2010/main" xmlns="" w="9525">
+                  <a14:hiddenLine xmlns="" xmlns:a14="http://schemas.microsoft.com/office/drawing/2010/main" w="9525">
                     <a:solidFill>
                       <a:srgbClr val="000000"/>
                     </a:solidFill>
@@ -10528,7 +10533,7 @@
               </a:ln>
               <a:extLst>
                 <a:ext uri="{91240B29-F687-4f45-9708-019B960494DF}">
-                  <a14:hiddenLine xmlns:a14="http://schemas.microsoft.com/office/drawing/2010/main" xmlns="" w="9525">
+                  <a14:hiddenLine xmlns="" xmlns:a14="http://schemas.microsoft.com/office/drawing/2010/main" w="9525">
                     <a:solidFill>
                       <a:srgbClr val="000000"/>
                     </a:solidFill>
@@ -10618,7 +10623,7 @@
               </a:ln>
               <a:extLst>
                 <a:ext uri="{91240B29-F687-4f45-9708-019B960494DF}">
-                  <a14:hiddenLine xmlns:a14="http://schemas.microsoft.com/office/drawing/2010/main" xmlns="" w="9525">
+                  <a14:hiddenLine xmlns="" xmlns:a14="http://schemas.microsoft.com/office/drawing/2010/main" w="9525">
                     <a:solidFill>
                       <a:srgbClr val="000000"/>
                     </a:solidFill>
@@ -10708,7 +10713,7 @@
               </a:ln>
               <a:extLst>
                 <a:ext uri="{91240B29-F687-4f45-9708-019B960494DF}">
-                  <a14:hiddenLine xmlns:a14="http://schemas.microsoft.com/office/drawing/2010/main" xmlns="" w="9525">
+                  <a14:hiddenLine xmlns="" xmlns:a14="http://schemas.microsoft.com/office/drawing/2010/main" w="9525">
                     <a:solidFill>
                       <a:srgbClr val="000000"/>
                     </a:solidFill>
@@ -10770,7 +10775,7 @@
               </a:ln>
               <a:extLst>
                 <a:ext uri="{91240B29-F687-4f45-9708-019B960494DF}">
-                  <a14:hiddenLine xmlns:a14="http://schemas.microsoft.com/office/drawing/2010/main" xmlns="" w="9525">
+                  <a14:hiddenLine xmlns="" xmlns:a14="http://schemas.microsoft.com/office/drawing/2010/main" w="9525">
                     <a:solidFill>
                       <a:srgbClr val="000000"/>
                     </a:solidFill>
@@ -10880,7 +10885,7 @@
               </a:ln>
               <a:extLst>
                 <a:ext uri="{91240B29-F687-4f45-9708-019B960494DF}">
-                  <a14:hiddenLine xmlns:a14="http://schemas.microsoft.com/office/drawing/2010/main" xmlns="" w="9525">
+                  <a14:hiddenLine xmlns="" xmlns:a14="http://schemas.microsoft.com/office/drawing/2010/main" w="9525">
                     <a:solidFill>
                       <a:srgbClr val="000000"/>
                     </a:solidFill>
@@ -10964,7 +10969,7 @@
               </a:ln>
               <a:extLst>
                 <a:ext uri="{91240B29-F687-4f45-9708-019B960494DF}">
-                  <a14:hiddenLine xmlns:a14="http://schemas.microsoft.com/office/drawing/2010/main" xmlns="" w="9525">
+                  <a14:hiddenLine xmlns="" xmlns:a14="http://schemas.microsoft.com/office/drawing/2010/main" w="9525">
                     <a:solidFill>
                       <a:srgbClr val="000000"/>
                     </a:solidFill>
@@ -11026,7 +11031,7 @@
               </a:ln>
               <a:extLst>
                 <a:ext uri="{91240B29-F687-4f45-9708-019B960494DF}">
-                  <a14:hiddenLine xmlns:a14="http://schemas.microsoft.com/office/drawing/2010/main" xmlns="" w="9525">
+                  <a14:hiddenLine xmlns="" xmlns:a14="http://schemas.microsoft.com/office/drawing/2010/main" w="9525">
                     <a:solidFill>
                       <a:srgbClr val="000000"/>
                     </a:solidFill>
@@ -11088,7 +11093,7 @@
               </a:ln>
               <a:extLst>
                 <a:ext uri="{91240B29-F687-4f45-9708-019B960494DF}">
-                  <a14:hiddenLine xmlns:a14="http://schemas.microsoft.com/office/drawing/2010/main" xmlns="" w="9525">
+                  <a14:hiddenLine xmlns="" xmlns:a14="http://schemas.microsoft.com/office/drawing/2010/main" w="9525">
                     <a:solidFill>
                       <a:srgbClr val="000000"/>
                     </a:solidFill>
@@ -11178,7 +11183,7 @@
               </a:ln>
               <a:extLst>
                 <a:ext uri="{91240B29-F687-4f45-9708-019B960494DF}">
-                  <a14:hiddenLine xmlns:a14="http://schemas.microsoft.com/office/drawing/2010/main" xmlns="" w="9525">
+                  <a14:hiddenLine xmlns="" xmlns:a14="http://schemas.microsoft.com/office/drawing/2010/main" w="9525">
                     <a:solidFill>
                       <a:srgbClr val="000000"/>
                     </a:solidFill>
@@ -11212,7 +11217,7 @@
               </a:ln>
               <a:extLst>
                 <a:ext uri="{91240B29-F687-4f45-9708-019B960494DF}">
-                  <a14:hiddenLine xmlns:a14="http://schemas.microsoft.com/office/drawing/2010/main" xmlns="" w="9525">
+                  <a14:hiddenLine xmlns="" xmlns:a14="http://schemas.microsoft.com/office/drawing/2010/main" w="9525">
                     <a:solidFill>
                       <a:srgbClr val="000000"/>
                     </a:solidFill>
@@ -11277,7 +11282,7 @@
               </a:ln>
               <a:extLst>
                 <a:ext uri="{91240B29-F687-4f45-9708-019B960494DF}">
-                  <a14:hiddenLine xmlns:a14="http://schemas.microsoft.com/office/drawing/2010/main" xmlns="" w="9525">
+                  <a14:hiddenLine xmlns="" xmlns:a14="http://schemas.microsoft.com/office/drawing/2010/main" w="9525">
                     <a:solidFill>
                       <a:srgbClr val="000000"/>
                     </a:solidFill>
@@ -11367,7 +11372,7 @@
               </a:ln>
               <a:extLst>
                 <a:ext uri="{91240B29-F687-4f45-9708-019B960494DF}">
-                  <a14:hiddenLine xmlns:a14="http://schemas.microsoft.com/office/drawing/2010/main" xmlns="" w="9525">
+                  <a14:hiddenLine xmlns="" xmlns:a14="http://schemas.microsoft.com/office/drawing/2010/main" w="9525">
                     <a:solidFill>
                       <a:srgbClr val="000000"/>
                     </a:solidFill>
@@ -11429,7 +11434,7 @@
               </a:ln>
               <a:extLst>
                 <a:ext uri="{91240B29-F687-4f45-9708-019B960494DF}">
-                  <a14:hiddenLine xmlns:a14="http://schemas.microsoft.com/office/drawing/2010/main" xmlns="" w="9525">
+                  <a14:hiddenLine xmlns="" xmlns:a14="http://schemas.microsoft.com/office/drawing/2010/main" w="9525">
                     <a:solidFill>
                       <a:srgbClr val="000000"/>
                     </a:solidFill>
@@ -11519,7 +11524,7 @@
               </a:ln>
               <a:extLst>
                 <a:ext uri="{91240B29-F687-4f45-9708-019B960494DF}">
-                  <a14:hiddenLine xmlns:a14="http://schemas.microsoft.com/office/drawing/2010/main" xmlns="" w="9525">
+                  <a14:hiddenLine xmlns="" xmlns:a14="http://schemas.microsoft.com/office/drawing/2010/main" w="9525">
                     <a:solidFill>
                       <a:srgbClr val="000000"/>
                     </a:solidFill>
@@ -11584,7 +11589,7 @@
               </a:ln>
               <a:extLst>
                 <a:ext uri="{91240B29-F687-4f45-9708-019B960494DF}">
-                  <a14:hiddenLine xmlns:a14="http://schemas.microsoft.com/office/drawing/2010/main" xmlns="" w="9525">
+                  <a14:hiddenLine xmlns="" xmlns:a14="http://schemas.microsoft.com/office/drawing/2010/main" w="9525">
                     <a:solidFill>
                       <a:srgbClr val="000000"/>
                     </a:solidFill>
@@ -11646,7 +11651,7 @@
               </a:ln>
               <a:extLst>
                 <a:ext uri="{91240B29-F687-4f45-9708-019B960494DF}">
-                  <a14:hiddenLine xmlns:a14="http://schemas.microsoft.com/office/drawing/2010/main" xmlns="" w="9525">
+                  <a14:hiddenLine xmlns="" xmlns:a14="http://schemas.microsoft.com/office/drawing/2010/main" w="9525">
                     <a:solidFill>
                       <a:srgbClr val="000000"/>
                     </a:solidFill>
@@ -11736,7 +11741,7 @@
               </a:ln>
               <a:extLst>
                 <a:ext uri="{91240B29-F687-4f45-9708-019B960494DF}">
-                  <a14:hiddenLine xmlns:a14="http://schemas.microsoft.com/office/drawing/2010/main" xmlns="" w="9525">
+                  <a14:hiddenLine xmlns="" xmlns:a14="http://schemas.microsoft.com/office/drawing/2010/main" w="9525">
                     <a:solidFill>
                       <a:srgbClr val="000000"/>
                     </a:solidFill>
@@ -11826,7 +11831,7 @@
               </a:ln>
               <a:extLst>
                 <a:ext uri="{91240B29-F687-4f45-9708-019B960494DF}">
-                  <a14:hiddenLine xmlns:a14="http://schemas.microsoft.com/office/drawing/2010/main" xmlns="" w="9525">
+                  <a14:hiddenLine xmlns="" xmlns:a14="http://schemas.microsoft.com/office/drawing/2010/main" w="9525">
                     <a:solidFill>
                       <a:srgbClr val="000000"/>
                     </a:solidFill>
@@ -11891,7 +11896,7 @@
               </a:ln>
               <a:extLst>
                 <a:ext uri="{91240B29-F687-4f45-9708-019B960494DF}">
-                  <a14:hiddenLine xmlns:a14="http://schemas.microsoft.com/office/drawing/2010/main" xmlns="" w="9525">
+                  <a14:hiddenLine xmlns="" xmlns:a14="http://schemas.microsoft.com/office/drawing/2010/main" w="9525">
                     <a:solidFill>
                       <a:srgbClr val="000000"/>
                     </a:solidFill>
@@ -12011,7 +12016,7 @@
               </a:ln>
               <a:extLst>
                 <a:ext uri="{91240B29-F687-4f45-9708-019B960494DF}">
-                  <a14:hiddenLine xmlns:a14="http://schemas.microsoft.com/office/drawing/2010/main" xmlns="" w="9525">
+                  <a14:hiddenLine xmlns="" xmlns:a14="http://schemas.microsoft.com/office/drawing/2010/main" w="9525">
                     <a:solidFill>
                       <a:srgbClr val="000000"/>
                     </a:solidFill>
@@ -12109,7 +12114,7 @@
               </a:ln>
               <a:extLst>
                 <a:ext uri="{91240B29-F687-4f45-9708-019B960494DF}">
-                  <a14:hiddenLine xmlns:a14="http://schemas.microsoft.com/office/drawing/2010/main" xmlns="" w="9525">
+                  <a14:hiddenLine xmlns="" xmlns:a14="http://schemas.microsoft.com/office/drawing/2010/main" w="9525">
                     <a:solidFill>
                       <a:srgbClr val="000000"/>
                     </a:solidFill>
@@ -12224,7 +12229,7 @@
               </a:ln>
               <a:extLst>
                 <a:ext uri="{91240B29-F687-4f45-9708-019B960494DF}">
-                  <a14:hiddenLine xmlns:a14="http://schemas.microsoft.com/office/drawing/2010/main" xmlns="" w="9525">
+                  <a14:hiddenLine xmlns="" xmlns:a14="http://schemas.microsoft.com/office/drawing/2010/main" w="9525">
                     <a:solidFill>
                       <a:srgbClr val="000000"/>
                     </a:solidFill>
@@ -12314,7 +12319,7 @@
               </a:ln>
               <a:extLst>
                 <a:ext uri="{91240B29-F687-4f45-9708-019B960494DF}">
-                  <a14:hiddenLine xmlns:a14="http://schemas.microsoft.com/office/drawing/2010/main" xmlns="" w="9525">
+                  <a14:hiddenLine xmlns="" xmlns:a14="http://schemas.microsoft.com/office/drawing/2010/main" w="9525">
                     <a:solidFill>
                       <a:srgbClr val="000000"/>
                     </a:solidFill>
@@ -12379,7 +12384,7 @@
               </a:ln>
               <a:extLst>
                 <a:ext uri="{91240B29-F687-4f45-9708-019B960494DF}">
-                  <a14:hiddenLine xmlns:a14="http://schemas.microsoft.com/office/drawing/2010/main" xmlns="" w="9525">
+                  <a14:hiddenLine xmlns="" xmlns:a14="http://schemas.microsoft.com/office/drawing/2010/main" w="9525">
                     <a:solidFill>
                       <a:srgbClr val="000000"/>
                     </a:solidFill>
@@ -12469,7 +12474,7 @@
               </a:ln>
               <a:extLst>
                 <a:ext uri="{91240B29-F687-4f45-9708-019B960494DF}">
-                  <a14:hiddenLine xmlns:a14="http://schemas.microsoft.com/office/drawing/2010/main" xmlns="" w="9525">
+                  <a14:hiddenLine xmlns="" xmlns:a14="http://schemas.microsoft.com/office/drawing/2010/main" w="9525">
                     <a:solidFill>
                       <a:srgbClr val="000000"/>
                     </a:solidFill>
@@ -12537,7 +12542,7 @@
               </a:ln>
               <a:extLst>
                 <a:ext uri="{91240B29-F687-4f45-9708-019B960494DF}">
-                  <a14:hiddenLine xmlns:a14="http://schemas.microsoft.com/office/drawing/2010/main" xmlns="" w="9525">
+                  <a14:hiddenLine xmlns="" xmlns:a14="http://schemas.microsoft.com/office/drawing/2010/main" w="9525">
                     <a:solidFill>
                       <a:srgbClr val="000000"/>
                     </a:solidFill>
@@ -12627,7 +12632,7 @@
               </a:ln>
               <a:extLst>
                 <a:ext uri="{91240B29-F687-4f45-9708-019B960494DF}">
-                  <a14:hiddenLine xmlns:a14="http://schemas.microsoft.com/office/drawing/2010/main" xmlns="" w="9525">
+                  <a14:hiddenLine xmlns="" xmlns:a14="http://schemas.microsoft.com/office/drawing/2010/main" w="9525">
                     <a:solidFill>
                       <a:srgbClr val="000000"/>
                     </a:solidFill>
@@ -12695,7 +12700,7 @@
               </a:ln>
               <a:extLst>
                 <a:ext uri="{91240B29-F687-4f45-9708-019B960494DF}">
-                  <a14:hiddenLine xmlns:a14="http://schemas.microsoft.com/office/drawing/2010/main" xmlns="" w="9525">
+                  <a14:hiddenLine xmlns="" xmlns:a14="http://schemas.microsoft.com/office/drawing/2010/main" w="9525">
                     <a:solidFill>
                       <a:srgbClr val="000000"/>
                     </a:solidFill>
@@ -12785,7 +12790,7 @@
               </a:ln>
               <a:extLst>
                 <a:ext uri="{91240B29-F687-4f45-9708-019B960494DF}">
-                  <a14:hiddenLine xmlns:a14="http://schemas.microsoft.com/office/drawing/2010/main" xmlns="" w="9525">
+                  <a14:hiddenLine xmlns="" xmlns:a14="http://schemas.microsoft.com/office/drawing/2010/main" w="9525">
                     <a:solidFill>
                       <a:srgbClr val="000000"/>
                     </a:solidFill>
@@ -12819,7 +12824,7 @@
               </a:ln>
               <a:extLst>
                 <a:ext uri="{91240B29-F687-4f45-9708-019B960494DF}">
-                  <a14:hiddenLine xmlns:a14="http://schemas.microsoft.com/office/drawing/2010/main" xmlns="" w="9525">
+                  <a14:hiddenLine xmlns="" xmlns:a14="http://schemas.microsoft.com/office/drawing/2010/main" w="9525">
                     <a:solidFill>
                       <a:srgbClr val="000000"/>
                     </a:solidFill>
@@ -21583,6 +21588,1212 @@
 </file>
 
 <file path=ppt/slides/slide34.xml><?xml version="1.0" encoding="utf-8"?>
+<p:sld xmlns:a="http://schemas.openxmlformats.org/drawingml/2006/main" xmlns:r="http://schemas.openxmlformats.org/officeDocument/2006/relationships" xmlns:p="http://schemas.openxmlformats.org/presentationml/2006/main">
+  <p:cSld>
+    <p:spTree>
+      <p:nvGrpSpPr>
+        <p:cNvPr id="1" name=""/>
+        <p:cNvGrpSpPr/>
+        <p:nvPr/>
+      </p:nvGrpSpPr>
+      <p:grpSpPr>
+        <a:xfrm>
+          <a:off x="0" y="0"/>
+          <a:ext cx="0" cy="0"/>
+          <a:chOff x="0" y="0"/>
+          <a:chExt cx="0" cy="0"/>
+        </a:xfrm>
+      </p:grpSpPr>
+      <p:sp>
+        <p:nvSpPr>
+          <p:cNvPr id="6" name="Content Placeholder 2">
+            <a:extLst>
+              <a:ext uri="{FF2B5EF4-FFF2-40B4-BE49-F238E27FC236}">
+                <a16:creationId xmlns:a16="http://schemas.microsoft.com/office/drawing/2014/main" id="{BD13C6EB-9F06-4F1D-8C1F-905CB1D1B086}"/>
+              </a:ext>
+            </a:extLst>
+          </p:cNvPr>
+          <p:cNvSpPr>
+            <a:spLocks noGrp="1"/>
+          </p:cNvSpPr>
+          <p:nvPr>
+            <p:ph idx="1"/>
+          </p:nvPr>
+        </p:nvSpPr>
+        <p:spPr>
+          <a:xfrm>
+            <a:off x="1141412" y="2249487"/>
+            <a:ext cx="9905999" cy="3541714"/>
+          </a:xfrm>
+        </p:spPr>
+        <p:txBody>
+          <a:bodyPr/>
+          <a:lstStyle/>
+          <a:p>
+            <a:r>
+              <a:rPr lang="en-US" dirty="0"/>
+              <a:t>In order to prevent bad code to be merged to your master branch, you can protect it</a:t>
+            </a:r>
+          </a:p>
+          <a:p>
+            <a:r>
+              <a:rPr lang="en-US" dirty="0"/>
+              <a:t>To do so you add “required” statuses (remember the custom statuses in </a:t>
+            </a:r>
+            <a:r>
+              <a:rPr lang="en-US" dirty="0" err="1"/>
+              <a:t>AppVeyor</a:t>
+            </a:r>
+            <a:r>
+              <a:rPr lang="en-US" dirty="0"/>
+              <a:t>?)</a:t>
+            </a:r>
+          </a:p>
+        </p:txBody>
+      </p:sp>
+      <p:sp>
+        <p:nvSpPr>
+          <p:cNvPr id="2" name="Title 1">
+            <a:extLst>
+              <a:ext uri="{FF2B5EF4-FFF2-40B4-BE49-F238E27FC236}">
+                <a16:creationId xmlns:a16="http://schemas.microsoft.com/office/drawing/2014/main" id="{97779A85-E716-420E-9D56-1ED553597257}"/>
+              </a:ext>
+            </a:extLst>
+          </p:cNvPr>
+          <p:cNvSpPr>
+            <a:spLocks noGrp="1"/>
+          </p:cNvSpPr>
+          <p:nvPr>
+            <p:ph type="title"/>
+          </p:nvPr>
+        </p:nvSpPr>
+        <p:spPr/>
+        <p:txBody>
+          <a:bodyPr/>
+          <a:lstStyle/>
+          <a:p>
+            <a:r>
+              <a:rPr lang="en-US" dirty="0"/>
+              <a:t>Let’s protected the branch</a:t>
+            </a:r>
+          </a:p>
+        </p:txBody>
+      </p:sp>
+      <p:pic>
+        <p:nvPicPr>
+          <p:cNvPr id="4" name="Picture 3">
+            <a:extLst>
+              <a:ext uri="{FF2B5EF4-FFF2-40B4-BE49-F238E27FC236}">
+                <a16:creationId xmlns:a16="http://schemas.microsoft.com/office/drawing/2014/main" id="{748CC864-E80F-495E-9083-7739CC6580A4}"/>
+              </a:ext>
+            </a:extLst>
+          </p:cNvPr>
+          <p:cNvPicPr>
+            <a:picLocks noChangeAspect="1"/>
+          </p:cNvPicPr>
+          <p:nvPr/>
+        </p:nvPicPr>
+        <p:blipFill>
+          <a:blip r:embed="rId2"/>
+          <a:stretch>
+            <a:fillRect/>
+          </a:stretch>
+        </p:blipFill>
+        <p:spPr>
+          <a:xfrm>
+            <a:off x="1180125" y="233762"/>
+            <a:ext cx="9828571" cy="6390476"/>
+          </a:xfrm>
+          <a:prstGeom prst="rect">
+            <a:avLst/>
+          </a:prstGeom>
+          <a:ln w="28575">
+            <a:solidFill>
+              <a:schemeClr val="bg1"/>
+            </a:solidFill>
+          </a:ln>
+        </p:spPr>
+      </p:pic>
+      <p:pic>
+        <p:nvPicPr>
+          <p:cNvPr id="5" name="Picture 4">
+            <a:extLst>
+              <a:ext uri="{FF2B5EF4-FFF2-40B4-BE49-F238E27FC236}">
+                <a16:creationId xmlns:a16="http://schemas.microsoft.com/office/drawing/2014/main" id="{5D351C49-4471-45F7-8863-CADB48D7562E}"/>
+              </a:ext>
+            </a:extLst>
+          </p:cNvPr>
+          <p:cNvPicPr>
+            <a:picLocks noChangeAspect="1"/>
+          </p:cNvPicPr>
+          <p:nvPr/>
+        </p:nvPicPr>
+        <p:blipFill>
+          <a:blip r:embed="rId3"/>
+          <a:stretch>
+            <a:fillRect/>
+          </a:stretch>
+        </p:blipFill>
+        <p:spPr>
+          <a:xfrm>
+            <a:off x="2731228" y="233761"/>
+            <a:ext cx="6726364" cy="6390477"/>
+          </a:xfrm>
+          <a:prstGeom prst="rect">
+            <a:avLst/>
+          </a:prstGeom>
+          <a:ln w="28575">
+            <a:solidFill>
+              <a:schemeClr val="bg1"/>
+            </a:solidFill>
+          </a:ln>
+        </p:spPr>
+      </p:pic>
+    </p:spTree>
+    <p:extLst>
+      <p:ext uri="{BB962C8B-B14F-4D97-AF65-F5344CB8AC3E}">
+        <p14:creationId xmlns:p14="http://schemas.microsoft.com/office/powerpoint/2010/main" val="2135218928"/>
+      </p:ext>
+    </p:extLst>
+  </p:cSld>
+  <p:clrMapOvr>
+    <a:masterClrMapping/>
+  </p:clrMapOvr>
+  <p:timing>
+    <p:tnLst>
+      <p:par>
+        <p:cTn id="1" dur="indefinite" restart="never" nodeType="tmRoot">
+          <p:childTnLst>
+            <p:seq concurrent="1" nextAc="seek">
+              <p:cTn id="2" dur="indefinite" nodeType="mainSeq">
+                <p:childTnLst>
+                  <p:par>
+                    <p:cTn id="3" fill="hold">
+                      <p:stCondLst>
+                        <p:cond delay="indefinite"/>
+                      </p:stCondLst>
+                      <p:childTnLst>
+                        <p:par>
+                          <p:cTn id="4" fill="hold">
+                            <p:stCondLst>
+                              <p:cond delay="0"/>
+                            </p:stCondLst>
+                            <p:childTnLst>
+                              <p:par>
+                                <p:cTn id="5" presetID="1" presetClass="entr" presetSubtype="0" fill="hold" nodeType="clickEffect">
+                                  <p:stCondLst>
+                                    <p:cond delay="0"/>
+                                  </p:stCondLst>
+                                  <p:childTnLst>
+                                    <p:set>
+                                      <p:cBhvr>
+                                        <p:cTn id="6" dur="1" fill="hold">
+                                          <p:stCondLst>
+                                            <p:cond delay="0"/>
+                                          </p:stCondLst>
+                                        </p:cTn>
+                                        <p:tgtEl>
+                                          <p:spTgt spid="4"/>
+                                        </p:tgtEl>
+                                        <p:attrNameLst>
+                                          <p:attrName>style.visibility</p:attrName>
+                                        </p:attrNameLst>
+                                      </p:cBhvr>
+                                      <p:to>
+                                        <p:strVal val="visible"/>
+                                      </p:to>
+                                    </p:set>
+                                  </p:childTnLst>
+                                </p:cTn>
+                              </p:par>
+                            </p:childTnLst>
+                          </p:cTn>
+                        </p:par>
+                      </p:childTnLst>
+                    </p:cTn>
+                  </p:par>
+                  <p:par>
+                    <p:cTn id="7" fill="hold">
+                      <p:stCondLst>
+                        <p:cond delay="indefinite"/>
+                      </p:stCondLst>
+                      <p:childTnLst>
+                        <p:par>
+                          <p:cTn id="8" fill="hold">
+                            <p:stCondLst>
+                              <p:cond delay="0"/>
+                            </p:stCondLst>
+                            <p:childTnLst>
+                              <p:par>
+                                <p:cTn id="9" presetID="1" presetClass="entr" presetSubtype="0" fill="hold" nodeType="clickEffect">
+                                  <p:stCondLst>
+                                    <p:cond delay="0"/>
+                                  </p:stCondLst>
+                                  <p:childTnLst>
+                                    <p:set>
+                                      <p:cBhvr>
+                                        <p:cTn id="10" dur="1" fill="hold">
+                                          <p:stCondLst>
+                                            <p:cond delay="0"/>
+                                          </p:stCondLst>
+                                        </p:cTn>
+                                        <p:tgtEl>
+                                          <p:spTgt spid="5"/>
+                                        </p:tgtEl>
+                                        <p:attrNameLst>
+                                          <p:attrName>style.visibility</p:attrName>
+                                        </p:attrNameLst>
+                                      </p:cBhvr>
+                                      <p:to>
+                                        <p:strVal val="visible"/>
+                                      </p:to>
+                                    </p:set>
+                                  </p:childTnLst>
+                                </p:cTn>
+                              </p:par>
+                            </p:childTnLst>
+                          </p:cTn>
+                        </p:par>
+                      </p:childTnLst>
+                    </p:cTn>
+                  </p:par>
+                </p:childTnLst>
+              </p:cTn>
+              <p:prevCondLst>
+                <p:cond evt="onPrev" delay="0">
+                  <p:tgtEl>
+                    <p:sldTgt/>
+                  </p:tgtEl>
+                </p:cond>
+              </p:prevCondLst>
+              <p:nextCondLst>
+                <p:cond evt="onNext" delay="0">
+                  <p:tgtEl>
+                    <p:sldTgt/>
+                  </p:tgtEl>
+                </p:cond>
+              </p:nextCondLst>
+            </p:seq>
+          </p:childTnLst>
+        </p:cTn>
+      </p:par>
+    </p:tnLst>
+  </p:timing>
+</p:sld>
+</file>
+
+<file path=ppt/slides/slide35.xml><?xml version="1.0" encoding="utf-8"?>
+<p:sld xmlns:a="http://schemas.openxmlformats.org/drawingml/2006/main" xmlns:r="http://schemas.openxmlformats.org/officeDocument/2006/relationships" xmlns:p="http://schemas.openxmlformats.org/presentationml/2006/main">
+  <p:cSld>
+    <p:spTree>
+      <p:nvGrpSpPr>
+        <p:cNvPr id="1" name=""/>
+        <p:cNvGrpSpPr/>
+        <p:nvPr/>
+      </p:nvGrpSpPr>
+      <p:grpSpPr>
+        <a:xfrm>
+          <a:off x="0" y="0"/>
+          <a:ext cx="0" cy="0"/>
+          <a:chOff x="0" y="0"/>
+          <a:chExt cx="0" cy="0"/>
+        </a:xfrm>
+      </p:grpSpPr>
+      <p:sp>
+        <p:nvSpPr>
+          <p:cNvPr id="2" name="Title 1">
+            <a:extLst>
+              <a:ext uri="{FF2B5EF4-FFF2-40B4-BE49-F238E27FC236}">
+                <a16:creationId xmlns:a16="http://schemas.microsoft.com/office/drawing/2014/main" id="{9ECF5C76-4585-445C-A2C3-DA194F444154}"/>
+              </a:ext>
+            </a:extLst>
+          </p:cNvPr>
+          <p:cNvSpPr>
+            <a:spLocks noGrp="1"/>
+          </p:cNvSpPr>
+          <p:nvPr>
+            <p:ph type="title"/>
+          </p:nvPr>
+        </p:nvSpPr>
+        <p:spPr/>
+        <p:txBody>
+          <a:bodyPr/>
+          <a:lstStyle/>
+          <a:p>
+            <a:r>
+              <a:rPr lang="en-US" dirty="0"/>
+              <a:t>Result of non-blocking errors</a:t>
+            </a:r>
+          </a:p>
+        </p:txBody>
+      </p:sp>
+      <p:pic>
+        <p:nvPicPr>
+          <p:cNvPr id="4" name="Picture 3">
+            <a:extLst>
+              <a:ext uri="{FF2B5EF4-FFF2-40B4-BE49-F238E27FC236}">
+                <a16:creationId xmlns:a16="http://schemas.microsoft.com/office/drawing/2014/main" id="{C72EF7A5-89A6-45EF-A92C-E9CB99039C73}"/>
+              </a:ext>
+            </a:extLst>
+          </p:cNvPr>
+          <p:cNvPicPr>
+            <a:picLocks noChangeAspect="1"/>
+          </p:cNvPicPr>
+          <p:nvPr/>
+        </p:nvPicPr>
+        <p:blipFill>
+          <a:blip r:embed="rId2"/>
+          <a:stretch>
+            <a:fillRect/>
+          </a:stretch>
+        </p:blipFill>
+        <p:spPr>
+          <a:xfrm>
+            <a:off x="1141414" y="1686336"/>
+            <a:ext cx="6397954" cy="4873856"/>
+          </a:xfrm>
+          <a:prstGeom prst="rect">
+            <a:avLst/>
+          </a:prstGeom>
+        </p:spPr>
+      </p:pic>
+      <p:pic>
+        <p:nvPicPr>
+          <p:cNvPr id="5" name="Picture 4">
+            <a:extLst>
+              <a:ext uri="{FF2B5EF4-FFF2-40B4-BE49-F238E27FC236}">
+                <a16:creationId xmlns:a16="http://schemas.microsoft.com/office/drawing/2014/main" id="{29C31697-3A91-4E75-85B9-67A8712BD504}"/>
+              </a:ext>
+            </a:extLst>
+          </p:cNvPr>
+          <p:cNvPicPr>
+            <a:picLocks noChangeAspect="1"/>
+          </p:cNvPicPr>
+          <p:nvPr/>
+        </p:nvPicPr>
+        <p:blipFill>
+          <a:blip r:embed="rId3"/>
+          <a:stretch>
+            <a:fillRect/>
+          </a:stretch>
+        </p:blipFill>
+        <p:spPr>
+          <a:xfrm>
+            <a:off x="4055197" y="1923039"/>
+            <a:ext cx="7571428" cy="4085714"/>
+          </a:xfrm>
+          <a:prstGeom prst="rect">
+            <a:avLst/>
+          </a:prstGeom>
+          <a:ln>
+            <a:solidFill>
+              <a:schemeClr val="bg1"/>
+            </a:solidFill>
+          </a:ln>
+        </p:spPr>
+      </p:pic>
+    </p:spTree>
+    <p:extLst>
+      <p:ext uri="{BB962C8B-B14F-4D97-AF65-F5344CB8AC3E}">
+        <p14:creationId xmlns:p14="http://schemas.microsoft.com/office/powerpoint/2010/main" val="3102296343"/>
+      </p:ext>
+    </p:extLst>
+  </p:cSld>
+  <p:clrMapOvr>
+    <a:masterClrMapping/>
+  </p:clrMapOvr>
+  <p:timing>
+    <p:tnLst>
+      <p:par>
+        <p:cTn id="1" dur="indefinite" restart="never" nodeType="tmRoot">
+          <p:childTnLst>
+            <p:seq concurrent="1" nextAc="seek">
+              <p:cTn id="2" dur="indefinite" nodeType="mainSeq">
+                <p:childTnLst>
+                  <p:par>
+                    <p:cTn id="3" fill="hold">
+                      <p:stCondLst>
+                        <p:cond delay="indefinite"/>
+                      </p:stCondLst>
+                      <p:childTnLst>
+                        <p:par>
+                          <p:cTn id="4" fill="hold">
+                            <p:stCondLst>
+                              <p:cond delay="0"/>
+                            </p:stCondLst>
+                            <p:childTnLst>
+                              <p:par>
+                                <p:cTn id="5" presetID="1" presetClass="entr" presetSubtype="0" fill="hold" nodeType="clickEffect">
+                                  <p:stCondLst>
+                                    <p:cond delay="0"/>
+                                  </p:stCondLst>
+                                  <p:childTnLst>
+                                    <p:set>
+                                      <p:cBhvr>
+                                        <p:cTn id="6" dur="1" fill="hold">
+                                          <p:stCondLst>
+                                            <p:cond delay="0"/>
+                                          </p:stCondLst>
+                                        </p:cTn>
+                                        <p:tgtEl>
+                                          <p:spTgt spid="5"/>
+                                        </p:tgtEl>
+                                        <p:attrNameLst>
+                                          <p:attrName>style.visibility</p:attrName>
+                                        </p:attrNameLst>
+                                      </p:cBhvr>
+                                      <p:to>
+                                        <p:strVal val="visible"/>
+                                      </p:to>
+                                    </p:set>
+                                  </p:childTnLst>
+                                </p:cTn>
+                              </p:par>
+                            </p:childTnLst>
+                          </p:cTn>
+                        </p:par>
+                      </p:childTnLst>
+                    </p:cTn>
+                  </p:par>
+                </p:childTnLst>
+              </p:cTn>
+              <p:prevCondLst>
+                <p:cond evt="onPrev" delay="0">
+                  <p:tgtEl>
+                    <p:sldTgt/>
+                  </p:tgtEl>
+                </p:cond>
+              </p:prevCondLst>
+              <p:nextCondLst>
+                <p:cond evt="onNext" delay="0">
+                  <p:tgtEl>
+                    <p:sldTgt/>
+                  </p:tgtEl>
+                </p:cond>
+              </p:nextCondLst>
+            </p:seq>
+          </p:childTnLst>
+        </p:cTn>
+      </p:par>
+    </p:tnLst>
+  </p:timing>
+</p:sld>
+</file>
+
+<file path=ppt/slides/slide36.xml><?xml version="1.0" encoding="utf-8"?>
+<p:sld xmlns:a="http://schemas.openxmlformats.org/drawingml/2006/main" xmlns:r="http://schemas.openxmlformats.org/officeDocument/2006/relationships" xmlns:p="http://schemas.openxmlformats.org/presentationml/2006/main">
+  <p:cSld>
+    <p:spTree>
+      <p:nvGrpSpPr>
+        <p:cNvPr id="1" name=""/>
+        <p:cNvGrpSpPr/>
+        <p:nvPr/>
+      </p:nvGrpSpPr>
+      <p:grpSpPr>
+        <a:xfrm>
+          <a:off x="0" y="0"/>
+          <a:ext cx="0" cy="0"/>
+          <a:chOff x="0" y="0"/>
+          <a:chExt cx="0" cy="0"/>
+        </a:xfrm>
+      </p:grpSpPr>
+      <p:sp>
+        <p:nvSpPr>
+          <p:cNvPr id="2" name="Title 1">
+            <a:extLst>
+              <a:ext uri="{FF2B5EF4-FFF2-40B4-BE49-F238E27FC236}">
+                <a16:creationId xmlns:a16="http://schemas.microsoft.com/office/drawing/2014/main" id="{C65DF5A6-840D-4B3C-A369-FD85E3D5DF34}"/>
+              </a:ext>
+            </a:extLst>
+          </p:cNvPr>
+          <p:cNvSpPr>
+            <a:spLocks noGrp="1"/>
+          </p:cNvSpPr>
+          <p:nvPr>
+            <p:ph type="title"/>
+          </p:nvPr>
+        </p:nvSpPr>
+        <p:spPr/>
+        <p:txBody>
+          <a:bodyPr/>
+          <a:lstStyle/>
+          <a:p>
+            <a:r>
+              <a:rPr lang="en-US" dirty="0"/>
+              <a:t>Let’s be code-</a:t>
+            </a:r>
+            <a:r>
+              <a:rPr lang="en-US" dirty="0" err="1"/>
+              <a:t>nazi</a:t>
+            </a:r>
+            <a:r>
+              <a:rPr lang="en-US" dirty="0"/>
+              <a:t> </a:t>
+            </a:r>
+            <a:r>
+              <a:rPr lang="en-US" dirty="0">
+                <a:sym typeface="Wingdings" panose="05000000000000000000" pitchFamily="2" charset="2"/>
+              </a:rPr>
+              <a:t></a:t>
+            </a:r>
+            <a:endParaRPr lang="en-US" dirty="0"/>
+          </a:p>
+        </p:txBody>
+      </p:sp>
+      <p:sp>
+        <p:nvSpPr>
+          <p:cNvPr id="3" name="Content Placeholder 2">
+            <a:extLst>
+              <a:ext uri="{FF2B5EF4-FFF2-40B4-BE49-F238E27FC236}">
+                <a16:creationId xmlns:a16="http://schemas.microsoft.com/office/drawing/2014/main" id="{8367AF72-226F-42F2-9D19-F7465DD361E2}"/>
+              </a:ext>
+            </a:extLst>
+          </p:cNvPr>
+          <p:cNvSpPr>
+            <a:spLocks noGrp="1"/>
+          </p:cNvSpPr>
+          <p:nvPr>
+            <p:ph idx="1"/>
+          </p:nvPr>
+        </p:nvSpPr>
+        <p:spPr/>
+        <p:txBody>
+          <a:bodyPr/>
+          <a:lstStyle/>
+          <a:p>
+            <a:r>
+              <a:rPr lang="en-US" dirty="0"/>
+              <a:t>Quality Profile:</a:t>
+            </a:r>
+          </a:p>
+          <a:p>
+            <a:pPr lvl="1"/>
+            <a:r>
+              <a:rPr lang="en-US" dirty="0"/>
+              <a:t>We can define in SonarQube what rules to enable or disable</a:t>
+            </a:r>
+          </a:p>
+          <a:p>
+            <a:pPr lvl="1"/>
+            <a:r>
+              <a:rPr lang="en-US" dirty="0"/>
+              <a:t>We can also define the level of an issue</a:t>
+            </a:r>
+          </a:p>
+          <a:p>
+            <a:r>
+              <a:rPr lang="en-US" dirty="0"/>
+              <a:t>Quality Gate:</a:t>
+            </a:r>
+          </a:p>
+          <a:p>
+            <a:pPr lvl="1"/>
+            <a:r>
+              <a:rPr lang="en-US" dirty="0"/>
+              <a:t>We can define what are the threshold to consider a code version to pass or not the level of quality we define. Examples:</a:t>
+            </a:r>
+          </a:p>
+          <a:p>
+            <a:pPr lvl="2"/>
+            <a:r>
+              <a:rPr lang="en-US" dirty="0"/>
+              <a:t>Fail if &lt; 40% code coverage</a:t>
+            </a:r>
+          </a:p>
+          <a:p>
+            <a:pPr lvl="2"/>
+            <a:r>
+              <a:rPr lang="en-US" dirty="0"/>
+              <a:t>Fail if &gt; 2 days of technical debt</a:t>
+            </a:r>
+          </a:p>
+        </p:txBody>
+      </p:sp>
+    </p:spTree>
+    <p:extLst>
+      <p:ext uri="{BB962C8B-B14F-4D97-AF65-F5344CB8AC3E}">
+        <p14:creationId xmlns:p14="http://schemas.microsoft.com/office/powerpoint/2010/main" val="3457405849"/>
+      </p:ext>
+    </p:extLst>
+  </p:cSld>
+  <p:clrMapOvr>
+    <a:masterClrMapping/>
+  </p:clrMapOvr>
+</p:sld>
+</file>
+
+<file path=ppt/slides/slide37.xml><?xml version="1.0" encoding="utf-8"?>
+<p:sld xmlns:a="http://schemas.openxmlformats.org/drawingml/2006/main" xmlns:r="http://schemas.openxmlformats.org/officeDocument/2006/relationships" xmlns:p="http://schemas.openxmlformats.org/presentationml/2006/main">
+  <p:cSld>
+    <p:spTree>
+      <p:nvGrpSpPr>
+        <p:cNvPr id="1" name=""/>
+        <p:cNvGrpSpPr/>
+        <p:nvPr/>
+      </p:nvGrpSpPr>
+      <p:grpSpPr>
+        <a:xfrm>
+          <a:off x="0" y="0"/>
+          <a:ext cx="0" cy="0"/>
+          <a:chOff x="0" y="0"/>
+          <a:chExt cx="0" cy="0"/>
+        </a:xfrm>
+      </p:grpSpPr>
+      <p:sp>
+        <p:nvSpPr>
+          <p:cNvPr id="2" name="Title 1">
+            <a:extLst>
+              <a:ext uri="{FF2B5EF4-FFF2-40B4-BE49-F238E27FC236}">
+                <a16:creationId xmlns:a16="http://schemas.microsoft.com/office/drawing/2014/main" id="{219AD24E-6BF6-4B11-964A-D580B0CA9170}"/>
+              </a:ext>
+            </a:extLst>
+          </p:cNvPr>
+          <p:cNvSpPr>
+            <a:spLocks noGrp="1"/>
+          </p:cNvSpPr>
+          <p:nvPr>
+            <p:ph type="title"/>
+          </p:nvPr>
+        </p:nvSpPr>
+        <p:spPr/>
+        <p:txBody>
+          <a:bodyPr/>
+          <a:lstStyle/>
+          <a:p>
+            <a:r>
+              <a:rPr lang="en-US" dirty="0"/>
+              <a:t>How to change SonarQube rules and levels</a:t>
+            </a:r>
+          </a:p>
+        </p:txBody>
+      </p:sp>
+      <p:pic>
+        <p:nvPicPr>
+          <p:cNvPr id="4" name="Picture 3">
+            <a:extLst>
+              <a:ext uri="{FF2B5EF4-FFF2-40B4-BE49-F238E27FC236}">
+                <a16:creationId xmlns:a16="http://schemas.microsoft.com/office/drawing/2014/main" id="{E179240E-D482-43FC-BADF-CACC9C32C237}"/>
+              </a:ext>
+            </a:extLst>
+          </p:cNvPr>
+          <p:cNvPicPr>
+            <a:picLocks noChangeAspect="1"/>
+          </p:cNvPicPr>
+          <p:nvPr/>
+        </p:nvPicPr>
+        <p:blipFill>
+          <a:blip r:embed="rId2"/>
+          <a:stretch>
+            <a:fillRect/>
+          </a:stretch>
+        </p:blipFill>
+        <p:spPr>
+          <a:xfrm>
+            <a:off x="4818221" y="2143285"/>
+            <a:ext cx="2552381" cy="2571429"/>
+          </a:xfrm>
+          <a:prstGeom prst="rect">
+            <a:avLst/>
+          </a:prstGeom>
+        </p:spPr>
+      </p:pic>
+      <p:pic>
+        <p:nvPicPr>
+          <p:cNvPr id="5" name="Picture 4">
+            <a:extLst>
+              <a:ext uri="{FF2B5EF4-FFF2-40B4-BE49-F238E27FC236}">
+                <a16:creationId xmlns:a16="http://schemas.microsoft.com/office/drawing/2014/main" id="{16545510-833B-4FE5-8C4B-E60CA9CD83DC}"/>
+              </a:ext>
+            </a:extLst>
+          </p:cNvPr>
+          <p:cNvPicPr>
+            <a:picLocks noChangeAspect="1"/>
+          </p:cNvPicPr>
+          <p:nvPr/>
+        </p:nvPicPr>
+        <p:blipFill>
+          <a:blip r:embed="rId3"/>
+          <a:stretch>
+            <a:fillRect/>
+          </a:stretch>
+        </p:blipFill>
+        <p:spPr>
+          <a:xfrm>
+            <a:off x="2651608" y="611895"/>
+            <a:ext cx="6885606" cy="5627587"/>
+          </a:xfrm>
+          <a:prstGeom prst="rect">
+            <a:avLst/>
+          </a:prstGeom>
+        </p:spPr>
+      </p:pic>
+      <p:pic>
+        <p:nvPicPr>
+          <p:cNvPr id="6" name="Picture 5">
+            <a:extLst>
+              <a:ext uri="{FF2B5EF4-FFF2-40B4-BE49-F238E27FC236}">
+                <a16:creationId xmlns:a16="http://schemas.microsoft.com/office/drawing/2014/main" id="{328C8D0F-DC34-4178-B78A-6826A8193189}"/>
+              </a:ext>
+            </a:extLst>
+          </p:cNvPr>
+          <p:cNvPicPr>
+            <a:picLocks noChangeAspect="1"/>
+          </p:cNvPicPr>
+          <p:nvPr/>
+        </p:nvPicPr>
+        <p:blipFill>
+          <a:blip r:embed="rId4"/>
+          <a:stretch>
+            <a:fillRect/>
+          </a:stretch>
+        </p:blipFill>
+        <p:spPr>
+          <a:xfrm>
+            <a:off x="801969" y="1971413"/>
+            <a:ext cx="10777633" cy="3394150"/>
+          </a:xfrm>
+          <a:prstGeom prst="rect">
+            <a:avLst/>
+          </a:prstGeom>
+          <a:ln w="28575">
+            <a:solidFill>
+              <a:schemeClr val="bg1"/>
+            </a:solidFill>
+          </a:ln>
+        </p:spPr>
+      </p:pic>
+      <p:pic>
+        <p:nvPicPr>
+          <p:cNvPr id="7" name="Picture 6">
+            <a:extLst>
+              <a:ext uri="{FF2B5EF4-FFF2-40B4-BE49-F238E27FC236}">
+                <a16:creationId xmlns:a16="http://schemas.microsoft.com/office/drawing/2014/main" id="{EEFC00F4-F75B-46B5-B4DB-7C38CE4FACCF}"/>
+              </a:ext>
+            </a:extLst>
+          </p:cNvPr>
+          <p:cNvPicPr>
+            <a:picLocks noChangeAspect="1"/>
+          </p:cNvPicPr>
+          <p:nvPr/>
+        </p:nvPicPr>
+        <p:blipFill>
+          <a:blip r:embed="rId5"/>
+          <a:stretch>
+            <a:fillRect/>
+          </a:stretch>
+        </p:blipFill>
+        <p:spPr>
+          <a:xfrm>
+            <a:off x="1501205" y="680391"/>
+            <a:ext cx="9379159" cy="5490594"/>
+          </a:xfrm>
+          <a:prstGeom prst="rect">
+            <a:avLst/>
+          </a:prstGeom>
+          <a:ln w="28575">
+            <a:solidFill>
+              <a:schemeClr val="bg1"/>
+            </a:solidFill>
+          </a:ln>
+        </p:spPr>
+      </p:pic>
+      <p:pic>
+        <p:nvPicPr>
+          <p:cNvPr id="8" name="Picture 7">
+            <a:extLst>
+              <a:ext uri="{FF2B5EF4-FFF2-40B4-BE49-F238E27FC236}">
+                <a16:creationId xmlns:a16="http://schemas.microsoft.com/office/drawing/2014/main" id="{3A7E3F47-B95E-439B-8A6A-D6DD4D6C6753}"/>
+              </a:ext>
+            </a:extLst>
+          </p:cNvPr>
+          <p:cNvPicPr>
+            <a:picLocks noChangeAspect="1"/>
+          </p:cNvPicPr>
+          <p:nvPr/>
+        </p:nvPicPr>
+        <p:blipFill>
+          <a:blip r:embed="rId6"/>
+          <a:stretch>
+            <a:fillRect/>
+          </a:stretch>
+        </p:blipFill>
+        <p:spPr>
+          <a:xfrm>
+            <a:off x="575239" y="2019678"/>
+            <a:ext cx="11231090" cy="2812020"/>
+          </a:xfrm>
+          <a:prstGeom prst="rect">
+            <a:avLst/>
+          </a:prstGeom>
+          <a:ln w="28575">
+            <a:solidFill>
+              <a:schemeClr val="bg1"/>
+            </a:solidFill>
+          </a:ln>
+        </p:spPr>
+      </p:pic>
+      <p:pic>
+        <p:nvPicPr>
+          <p:cNvPr id="9" name="Picture 8">
+            <a:extLst>
+              <a:ext uri="{FF2B5EF4-FFF2-40B4-BE49-F238E27FC236}">
+                <a16:creationId xmlns:a16="http://schemas.microsoft.com/office/drawing/2014/main" id="{58159947-4E04-48DD-BDC7-69C574C4A491}"/>
+              </a:ext>
+            </a:extLst>
+          </p:cNvPr>
+          <p:cNvPicPr>
+            <a:picLocks noChangeAspect="1"/>
+          </p:cNvPicPr>
+          <p:nvPr/>
+        </p:nvPicPr>
+        <p:blipFill>
+          <a:blip r:embed="rId7"/>
+          <a:stretch>
+            <a:fillRect/>
+          </a:stretch>
+        </p:blipFill>
+        <p:spPr>
+          <a:xfrm>
+            <a:off x="3524571" y="2543285"/>
+            <a:ext cx="5142857" cy="1771429"/>
+          </a:xfrm>
+          <a:prstGeom prst="rect">
+            <a:avLst/>
+          </a:prstGeom>
+          <a:ln w="28575">
+            <a:solidFill>
+              <a:schemeClr val="bg1"/>
+            </a:solidFill>
+          </a:ln>
+        </p:spPr>
+      </p:pic>
+    </p:spTree>
+    <p:extLst>
+      <p:ext uri="{BB962C8B-B14F-4D97-AF65-F5344CB8AC3E}">
+        <p14:creationId xmlns:p14="http://schemas.microsoft.com/office/powerpoint/2010/main" val="4253968347"/>
+      </p:ext>
+    </p:extLst>
+  </p:cSld>
+  <p:clrMapOvr>
+    <a:masterClrMapping/>
+  </p:clrMapOvr>
+  <p:timing>
+    <p:tnLst>
+      <p:par>
+        <p:cTn id="1" dur="indefinite" restart="never" nodeType="tmRoot">
+          <p:childTnLst>
+            <p:seq concurrent="1" nextAc="seek">
+              <p:cTn id="2" dur="indefinite" nodeType="mainSeq">
+                <p:childTnLst>
+                  <p:par>
+                    <p:cTn id="3" fill="hold">
+                      <p:stCondLst>
+                        <p:cond delay="indefinite"/>
+                      </p:stCondLst>
+                      <p:childTnLst>
+                        <p:par>
+                          <p:cTn id="4" fill="hold">
+                            <p:stCondLst>
+                              <p:cond delay="0"/>
+                            </p:stCondLst>
+                            <p:childTnLst>
+                              <p:par>
+                                <p:cTn id="5" presetID="1" presetClass="entr" presetSubtype="0" fill="hold" nodeType="clickEffect">
+                                  <p:stCondLst>
+                                    <p:cond delay="0"/>
+                                  </p:stCondLst>
+                                  <p:childTnLst>
+                                    <p:set>
+                                      <p:cBhvr>
+                                        <p:cTn id="6" dur="1" fill="hold">
+                                          <p:stCondLst>
+                                            <p:cond delay="0"/>
+                                          </p:stCondLst>
+                                        </p:cTn>
+                                        <p:tgtEl>
+                                          <p:spTgt spid="5"/>
+                                        </p:tgtEl>
+                                        <p:attrNameLst>
+                                          <p:attrName>style.visibility</p:attrName>
+                                        </p:attrNameLst>
+                                      </p:cBhvr>
+                                      <p:to>
+                                        <p:strVal val="visible"/>
+                                      </p:to>
+                                    </p:set>
+                                  </p:childTnLst>
+                                </p:cTn>
+                              </p:par>
+                            </p:childTnLst>
+                          </p:cTn>
+                        </p:par>
+                      </p:childTnLst>
+                    </p:cTn>
+                  </p:par>
+                  <p:par>
+                    <p:cTn id="7" fill="hold">
+                      <p:stCondLst>
+                        <p:cond delay="indefinite"/>
+                      </p:stCondLst>
+                      <p:childTnLst>
+                        <p:par>
+                          <p:cTn id="8" fill="hold">
+                            <p:stCondLst>
+                              <p:cond delay="0"/>
+                            </p:stCondLst>
+                            <p:childTnLst>
+                              <p:par>
+                                <p:cTn id="9" presetID="1" presetClass="entr" presetSubtype="0" fill="hold" nodeType="clickEffect">
+                                  <p:stCondLst>
+                                    <p:cond delay="0"/>
+                                  </p:stCondLst>
+                                  <p:childTnLst>
+                                    <p:set>
+                                      <p:cBhvr>
+                                        <p:cTn id="10" dur="1" fill="hold">
+                                          <p:stCondLst>
+                                            <p:cond delay="0"/>
+                                          </p:stCondLst>
+                                        </p:cTn>
+                                        <p:tgtEl>
+                                          <p:spTgt spid="6"/>
+                                        </p:tgtEl>
+                                        <p:attrNameLst>
+                                          <p:attrName>style.visibility</p:attrName>
+                                        </p:attrNameLst>
+                                      </p:cBhvr>
+                                      <p:to>
+                                        <p:strVal val="visible"/>
+                                      </p:to>
+                                    </p:set>
+                                  </p:childTnLst>
+                                </p:cTn>
+                              </p:par>
+                            </p:childTnLst>
+                          </p:cTn>
+                        </p:par>
+                      </p:childTnLst>
+                    </p:cTn>
+                  </p:par>
+                  <p:par>
+                    <p:cTn id="11" fill="hold">
+                      <p:stCondLst>
+                        <p:cond delay="indefinite"/>
+                      </p:stCondLst>
+                      <p:childTnLst>
+                        <p:par>
+                          <p:cTn id="12" fill="hold">
+                            <p:stCondLst>
+                              <p:cond delay="0"/>
+                            </p:stCondLst>
+                            <p:childTnLst>
+                              <p:par>
+                                <p:cTn id="13" presetID="1" presetClass="entr" presetSubtype="0" fill="hold" nodeType="clickEffect">
+                                  <p:stCondLst>
+                                    <p:cond delay="0"/>
+                                  </p:stCondLst>
+                                  <p:childTnLst>
+                                    <p:set>
+                                      <p:cBhvr>
+                                        <p:cTn id="14" dur="1" fill="hold">
+                                          <p:stCondLst>
+                                            <p:cond delay="0"/>
+                                          </p:stCondLst>
+                                        </p:cTn>
+                                        <p:tgtEl>
+                                          <p:spTgt spid="7"/>
+                                        </p:tgtEl>
+                                        <p:attrNameLst>
+                                          <p:attrName>style.visibility</p:attrName>
+                                        </p:attrNameLst>
+                                      </p:cBhvr>
+                                      <p:to>
+                                        <p:strVal val="visible"/>
+                                      </p:to>
+                                    </p:set>
+                                  </p:childTnLst>
+                                </p:cTn>
+                              </p:par>
+                            </p:childTnLst>
+                          </p:cTn>
+                        </p:par>
+                      </p:childTnLst>
+                    </p:cTn>
+                  </p:par>
+                  <p:par>
+                    <p:cTn id="15" fill="hold">
+                      <p:stCondLst>
+                        <p:cond delay="indefinite"/>
+                      </p:stCondLst>
+                      <p:childTnLst>
+                        <p:par>
+                          <p:cTn id="16" fill="hold">
+                            <p:stCondLst>
+                              <p:cond delay="0"/>
+                            </p:stCondLst>
+                            <p:childTnLst>
+                              <p:par>
+                                <p:cTn id="17" presetID="1" presetClass="entr" presetSubtype="0" fill="hold" nodeType="clickEffect">
+                                  <p:stCondLst>
+                                    <p:cond delay="0"/>
+                                  </p:stCondLst>
+                                  <p:childTnLst>
+                                    <p:set>
+                                      <p:cBhvr>
+                                        <p:cTn id="18" dur="1" fill="hold">
+                                          <p:stCondLst>
+                                            <p:cond delay="0"/>
+                                          </p:stCondLst>
+                                        </p:cTn>
+                                        <p:tgtEl>
+                                          <p:spTgt spid="8"/>
+                                        </p:tgtEl>
+                                        <p:attrNameLst>
+                                          <p:attrName>style.visibility</p:attrName>
+                                        </p:attrNameLst>
+                                      </p:cBhvr>
+                                      <p:to>
+                                        <p:strVal val="visible"/>
+                                      </p:to>
+                                    </p:set>
+                                  </p:childTnLst>
+                                </p:cTn>
+                              </p:par>
+                            </p:childTnLst>
+                          </p:cTn>
+                        </p:par>
+                      </p:childTnLst>
+                    </p:cTn>
+                  </p:par>
+                  <p:par>
+                    <p:cTn id="19" fill="hold">
+                      <p:stCondLst>
+                        <p:cond delay="indefinite"/>
+                      </p:stCondLst>
+                      <p:childTnLst>
+                        <p:par>
+                          <p:cTn id="20" fill="hold">
+                            <p:stCondLst>
+                              <p:cond delay="0"/>
+                            </p:stCondLst>
+                            <p:childTnLst>
+                              <p:par>
+                                <p:cTn id="21" presetID="1" presetClass="entr" presetSubtype="0" fill="hold" nodeType="clickEffect">
+                                  <p:stCondLst>
+                                    <p:cond delay="0"/>
+                                  </p:stCondLst>
+                                  <p:childTnLst>
+                                    <p:set>
+                                      <p:cBhvr>
+                                        <p:cTn id="22" dur="1" fill="hold">
+                                          <p:stCondLst>
+                                            <p:cond delay="0"/>
+                                          </p:stCondLst>
+                                        </p:cTn>
+                                        <p:tgtEl>
+                                          <p:spTgt spid="9"/>
+                                        </p:tgtEl>
+                                        <p:attrNameLst>
+                                          <p:attrName>style.visibility</p:attrName>
+                                        </p:attrNameLst>
+                                      </p:cBhvr>
+                                      <p:to>
+                                        <p:strVal val="visible"/>
+                                      </p:to>
+                                    </p:set>
+                                  </p:childTnLst>
+                                </p:cTn>
+                              </p:par>
+                            </p:childTnLst>
+                          </p:cTn>
+                        </p:par>
+                      </p:childTnLst>
+                    </p:cTn>
+                  </p:par>
+                </p:childTnLst>
+              </p:cTn>
+              <p:prevCondLst>
+                <p:cond evt="onPrev" delay="0">
+                  <p:tgtEl>
+                    <p:sldTgt/>
+                  </p:tgtEl>
+                </p:cond>
+              </p:prevCondLst>
+              <p:nextCondLst>
+                <p:cond evt="onNext" delay="0">
+                  <p:tgtEl>
+                    <p:sldTgt/>
+                  </p:tgtEl>
+                </p:cond>
+              </p:nextCondLst>
+            </p:seq>
+          </p:childTnLst>
+        </p:cTn>
+      </p:par>
+    </p:tnLst>
+  </p:timing>
+</p:sld>
+</file>
+
+<file path=ppt/slides/slide38.xml><?xml version="1.0" encoding="utf-8"?>
+<p:sld xmlns:a="http://schemas.openxmlformats.org/drawingml/2006/main" xmlns:r="http://schemas.openxmlformats.org/officeDocument/2006/relationships" xmlns:p="http://schemas.openxmlformats.org/presentationml/2006/main">
+  <p:cSld>
+    <p:spTree>
+      <p:nvGrpSpPr>
+        <p:cNvPr id="1" name=""/>
+        <p:cNvGrpSpPr/>
+        <p:nvPr/>
+      </p:nvGrpSpPr>
+      <p:grpSpPr>
+        <a:xfrm>
+          <a:off x="0" y="0"/>
+          <a:ext cx="0" cy="0"/>
+          <a:chOff x="0" y="0"/>
+          <a:chExt cx="0" cy="0"/>
+        </a:xfrm>
+      </p:grpSpPr>
+      <p:sp>
+        <p:nvSpPr>
+          <p:cNvPr id="2" name="Title 1">
+            <a:extLst>
+              <a:ext uri="{FF2B5EF4-FFF2-40B4-BE49-F238E27FC236}">
+                <a16:creationId xmlns:a16="http://schemas.microsoft.com/office/drawing/2014/main" id="{A76F987B-8AF7-48C5-825C-F0BDBB32C203}"/>
+              </a:ext>
+            </a:extLst>
+          </p:cNvPr>
+          <p:cNvSpPr>
+            <a:spLocks noGrp="1"/>
+          </p:cNvSpPr>
+          <p:nvPr>
+            <p:ph type="title"/>
+          </p:nvPr>
+        </p:nvSpPr>
+        <p:spPr/>
+        <p:txBody>
+          <a:bodyPr/>
+          <a:lstStyle/>
+          <a:p>
+            <a:r>
+              <a:rPr lang="en-US" dirty="0"/>
+              <a:t>Kaboom!</a:t>
+            </a:r>
+          </a:p>
+        </p:txBody>
+      </p:sp>
+    </p:spTree>
+    <p:extLst>
+      <p:ext uri="{BB962C8B-B14F-4D97-AF65-F5344CB8AC3E}">
+        <p14:creationId xmlns:p14="http://schemas.microsoft.com/office/powerpoint/2010/main" val="672686608"/>
+      </p:ext>
+    </p:extLst>
+  </p:cSld>
+  <p:clrMapOvr>
+    <a:masterClrMapping/>
+  </p:clrMapOvr>
+</p:sld>
+</file>
+
+<file path=ppt/slides/slide39.xml><?xml version="1.0" encoding="utf-8"?>
 <p:sld xmlns:a="http://schemas.openxmlformats.org/drawingml/2006/main" xmlns:r="http://schemas.openxmlformats.org/officeDocument/2006/relationships" xmlns:p="http://schemas.openxmlformats.org/presentationml/2006/main">
   <p:cSld>
     <p:spTree>

</xml_diff>

<commit_message>
Add deployment to Azure
- Clean-up config, move to .ps1 files.
</commit_message>
<xml_diff>
--- a/Presentation/Full Open-Source CI.pptx
+++ b/Presentation/Full Open-Source CI.pptx
@@ -43,7 +43,8 @@
     <p:sldId id="294" r:id="rId37"/>
     <p:sldId id="295" r:id="rId38"/>
     <p:sldId id="296" r:id="rId39"/>
-    <p:sldId id="273" r:id="rId40"/>
+    <p:sldId id="297" r:id="rId40"/>
+    <p:sldId id="273" r:id="rId41"/>
   </p:sldIdLst>
   <p:sldSz cx="12192000" cy="6858000"/>
   <p:notesSz cx="6858000" cy="9144000"/>
@@ -1076,7 +1077,7 @@
           <a:noFill/>
           <a:extLst>
             <a:ext uri="{909E8E84-426E-40dd-AFC4-6F175D3DCCD1}">
-              <a14:hiddenFill xmlns="" xmlns:a14="http://schemas.microsoft.com/office/drawing/2010/main">
+              <a14:hiddenFill xmlns:a14="http://schemas.microsoft.com/office/drawing/2010/main" xmlns="">
                 <a:solidFill>
                   <a:srgbClr val="FFFFFF"/>
                 </a:solidFill>
@@ -1136,7 +1137,7 @@
             </a:ln>
             <a:extLst>
               <a:ext uri="{91240B29-F687-4f45-9708-019B960494DF}">
-                <a14:hiddenLine xmlns="" xmlns:a14="http://schemas.microsoft.com/office/drawing/2010/main" w="9525">
+                <a14:hiddenLine xmlns:a14="http://schemas.microsoft.com/office/drawing/2010/main" xmlns="" w="9525">
                   <a:solidFill>
                     <a:srgbClr val="000000"/>
                   </a:solidFill>
@@ -1226,7 +1227,7 @@
             </a:ln>
             <a:extLst>
               <a:ext uri="{91240B29-F687-4f45-9708-019B960494DF}">
-                <a14:hiddenLine xmlns="" xmlns:a14="http://schemas.microsoft.com/office/drawing/2010/main" w="9525">
+                <a14:hiddenLine xmlns:a14="http://schemas.microsoft.com/office/drawing/2010/main" xmlns="" w="9525">
                   <a:solidFill>
                     <a:srgbClr val="000000"/>
                   </a:solidFill>
@@ -1316,7 +1317,7 @@
             </a:ln>
             <a:extLst>
               <a:ext uri="{91240B29-F687-4f45-9708-019B960494DF}">
-                <a14:hiddenLine xmlns="" xmlns:a14="http://schemas.microsoft.com/office/drawing/2010/main" w="9525">
+                <a14:hiddenLine xmlns:a14="http://schemas.microsoft.com/office/drawing/2010/main" xmlns="" w="9525">
                   <a:solidFill>
                     <a:srgbClr val="000000"/>
                   </a:solidFill>
@@ -1350,7 +1351,7 @@
             </a:ln>
             <a:extLst>
               <a:ext uri="{91240B29-F687-4f45-9708-019B960494DF}">
-                <a14:hiddenLine xmlns="" xmlns:a14="http://schemas.microsoft.com/office/drawing/2010/main" w="9525">
+                <a14:hiddenLine xmlns:a14="http://schemas.microsoft.com/office/drawing/2010/main" xmlns="" w="9525">
                   <a:solidFill>
                     <a:srgbClr val="000000"/>
                   </a:solidFill>
@@ -1440,7 +1441,7 @@
             </a:ln>
             <a:extLst>
               <a:ext uri="{91240B29-F687-4f45-9708-019B960494DF}">
-                <a14:hiddenLine xmlns="" xmlns:a14="http://schemas.microsoft.com/office/drawing/2010/main" w="9525">
+                <a14:hiddenLine xmlns:a14="http://schemas.microsoft.com/office/drawing/2010/main" xmlns="" w="9525">
                   <a:solidFill>
                     <a:srgbClr val="000000"/>
                   </a:solidFill>
@@ -1502,7 +1503,7 @@
             </a:ln>
             <a:extLst>
               <a:ext uri="{91240B29-F687-4f45-9708-019B960494DF}">
-                <a14:hiddenLine xmlns="" xmlns:a14="http://schemas.microsoft.com/office/drawing/2010/main" w="9525">
+                <a14:hiddenLine xmlns:a14="http://schemas.microsoft.com/office/drawing/2010/main" xmlns="" w="9525">
                   <a:solidFill>
                     <a:srgbClr val="000000"/>
                   </a:solidFill>
@@ -1564,7 +1565,7 @@
             </a:ln>
             <a:extLst>
               <a:ext uri="{91240B29-F687-4f45-9708-019B960494DF}">
-                <a14:hiddenLine xmlns="" xmlns:a14="http://schemas.microsoft.com/office/drawing/2010/main" w="9525">
+                <a14:hiddenLine xmlns:a14="http://schemas.microsoft.com/office/drawing/2010/main" xmlns="" w="9525">
                   <a:solidFill>
                     <a:srgbClr val="000000"/>
                   </a:solidFill>
@@ -1654,7 +1655,7 @@
             </a:ln>
             <a:extLst>
               <a:ext uri="{91240B29-F687-4f45-9708-019B960494DF}">
-                <a14:hiddenLine xmlns="" xmlns:a14="http://schemas.microsoft.com/office/drawing/2010/main" w="9525">
+                <a14:hiddenLine xmlns:a14="http://schemas.microsoft.com/office/drawing/2010/main" xmlns="" w="9525">
                   <a:solidFill>
                     <a:srgbClr val="000000"/>
                   </a:solidFill>
@@ -1716,7 +1717,7 @@
             </a:ln>
             <a:extLst>
               <a:ext uri="{91240B29-F687-4f45-9708-019B960494DF}">
-                <a14:hiddenLine xmlns="" xmlns:a14="http://schemas.microsoft.com/office/drawing/2010/main" w="9525">
+                <a14:hiddenLine xmlns:a14="http://schemas.microsoft.com/office/drawing/2010/main" xmlns="" w="9525">
                   <a:solidFill>
                     <a:srgbClr val="000000"/>
                   </a:solidFill>
@@ -1778,7 +1779,7 @@
             </a:ln>
             <a:extLst>
               <a:ext uri="{91240B29-F687-4f45-9708-019B960494DF}">
-                <a14:hiddenLine xmlns="" xmlns:a14="http://schemas.microsoft.com/office/drawing/2010/main" w="9525">
+                <a14:hiddenLine xmlns:a14="http://schemas.microsoft.com/office/drawing/2010/main" xmlns="" w="9525">
                   <a:solidFill>
                     <a:srgbClr val="000000"/>
                   </a:solidFill>
@@ -1868,7 +1869,7 @@
             </a:ln>
             <a:extLst>
               <a:ext uri="{91240B29-F687-4f45-9708-019B960494DF}">
-                <a14:hiddenLine xmlns="" xmlns:a14="http://schemas.microsoft.com/office/drawing/2010/main" w="9525">
+                <a14:hiddenLine xmlns:a14="http://schemas.microsoft.com/office/drawing/2010/main" xmlns="" w="9525">
                   <a:solidFill>
                     <a:srgbClr val="000000"/>
                   </a:solidFill>
@@ -1958,7 +1959,7 @@
             </a:ln>
             <a:extLst>
               <a:ext uri="{91240B29-F687-4f45-9708-019B960494DF}">
-                <a14:hiddenLine xmlns="" xmlns:a14="http://schemas.microsoft.com/office/drawing/2010/main" w="9525">
+                <a14:hiddenLine xmlns:a14="http://schemas.microsoft.com/office/drawing/2010/main" xmlns="" w="9525">
                   <a:solidFill>
                     <a:srgbClr val="000000"/>
                   </a:solidFill>
@@ -2020,7 +2021,7 @@
             </a:ln>
             <a:extLst>
               <a:ext uri="{91240B29-F687-4f45-9708-019B960494DF}">
-                <a14:hiddenLine xmlns="" xmlns:a14="http://schemas.microsoft.com/office/drawing/2010/main" w="9525">
+                <a14:hiddenLine xmlns:a14="http://schemas.microsoft.com/office/drawing/2010/main" xmlns="" w="9525">
                   <a:solidFill>
                     <a:srgbClr val="000000"/>
                   </a:solidFill>
@@ -2130,7 +2131,7 @@
             </a:ln>
             <a:extLst>
               <a:ext uri="{91240B29-F687-4f45-9708-019B960494DF}">
-                <a14:hiddenLine xmlns="" xmlns:a14="http://schemas.microsoft.com/office/drawing/2010/main" w="9525">
+                <a14:hiddenLine xmlns:a14="http://schemas.microsoft.com/office/drawing/2010/main" xmlns="" w="9525">
                   <a:solidFill>
                     <a:srgbClr val="000000"/>
                   </a:solidFill>
@@ -2192,7 +2193,7 @@
             </a:ln>
             <a:extLst>
               <a:ext uri="{91240B29-F687-4f45-9708-019B960494DF}">
-                <a14:hiddenLine xmlns="" xmlns:a14="http://schemas.microsoft.com/office/drawing/2010/main" w="9525">
+                <a14:hiddenLine xmlns:a14="http://schemas.microsoft.com/office/drawing/2010/main" xmlns="" w="9525">
                   <a:solidFill>
                     <a:srgbClr val="000000"/>
                   </a:solidFill>
@@ -2282,7 +2283,7 @@
             </a:ln>
             <a:extLst>
               <a:ext uri="{91240B29-F687-4f45-9708-019B960494DF}">
-                <a14:hiddenLine xmlns="" xmlns:a14="http://schemas.microsoft.com/office/drawing/2010/main" w="9525">
+                <a14:hiddenLine xmlns:a14="http://schemas.microsoft.com/office/drawing/2010/main" xmlns="" w="9525">
                   <a:solidFill>
                     <a:srgbClr val="000000"/>
                   </a:solidFill>
@@ -2372,7 +2373,7 @@
             </a:ln>
             <a:extLst>
               <a:ext uri="{91240B29-F687-4f45-9708-019B960494DF}">
-                <a14:hiddenLine xmlns="" xmlns:a14="http://schemas.microsoft.com/office/drawing/2010/main" w="9525">
+                <a14:hiddenLine xmlns:a14="http://schemas.microsoft.com/office/drawing/2010/main" xmlns="" w="9525">
                   <a:solidFill>
                     <a:srgbClr val="000000"/>
                   </a:solidFill>
@@ -2434,7 +2435,7 @@
             </a:ln>
             <a:extLst>
               <a:ext uri="{91240B29-F687-4f45-9708-019B960494DF}">
-                <a14:hiddenLine xmlns="" xmlns:a14="http://schemas.microsoft.com/office/drawing/2010/main" w="9525">
+                <a14:hiddenLine xmlns:a14="http://schemas.microsoft.com/office/drawing/2010/main" xmlns="" w="9525">
                   <a:solidFill>
                     <a:srgbClr val="000000"/>
                   </a:solidFill>
@@ -2524,7 +2525,7 @@
             </a:ln>
             <a:extLst>
               <a:ext uri="{91240B29-F687-4f45-9708-019B960494DF}">
-                <a14:hiddenLine xmlns="" xmlns:a14="http://schemas.microsoft.com/office/drawing/2010/main" w="9525">
+                <a14:hiddenLine xmlns:a14="http://schemas.microsoft.com/office/drawing/2010/main" xmlns="" w="9525">
                   <a:solidFill>
                     <a:srgbClr val="000000"/>
                   </a:solidFill>
@@ -2614,7 +2615,7 @@
             </a:ln>
             <a:extLst>
               <a:ext uri="{91240B29-F687-4f45-9708-019B960494DF}">
-                <a14:hiddenLine xmlns="" xmlns:a14="http://schemas.microsoft.com/office/drawing/2010/main" w="9525">
+                <a14:hiddenLine xmlns:a14="http://schemas.microsoft.com/office/drawing/2010/main" xmlns="" w="9525">
                   <a:solidFill>
                     <a:srgbClr val="000000"/>
                   </a:solidFill>
@@ -2670,7 +2671,7 @@
             </a:ln>
             <a:extLst>
               <a:ext uri="{91240B29-F687-4f45-9708-019B960494DF}">
-                <a14:hiddenLine xmlns="" xmlns:a14="http://schemas.microsoft.com/office/drawing/2010/main" w="9525">
+                <a14:hiddenLine xmlns:a14="http://schemas.microsoft.com/office/drawing/2010/main" xmlns="" w="9525">
                   <a:solidFill>
                     <a:srgbClr val="000000"/>
                   </a:solidFill>
@@ -2760,7 +2761,7 @@
             </a:ln>
             <a:extLst>
               <a:ext uri="{91240B29-F687-4f45-9708-019B960494DF}">
-                <a14:hiddenLine xmlns="" xmlns:a14="http://schemas.microsoft.com/office/drawing/2010/main" w="9525">
+                <a14:hiddenLine xmlns:a14="http://schemas.microsoft.com/office/drawing/2010/main" xmlns="" w="9525">
                   <a:solidFill>
                     <a:srgbClr val="000000"/>
                   </a:solidFill>
@@ -2816,7 +2817,7 @@
             </a:ln>
             <a:extLst>
               <a:ext uri="{91240B29-F687-4f45-9708-019B960494DF}">
-                <a14:hiddenLine xmlns="" xmlns:a14="http://schemas.microsoft.com/office/drawing/2010/main" w="9525">
+                <a14:hiddenLine xmlns:a14="http://schemas.microsoft.com/office/drawing/2010/main" xmlns="" w="9525">
                   <a:solidFill>
                     <a:srgbClr val="000000"/>
                   </a:solidFill>
@@ -2906,7 +2907,7 @@
             </a:ln>
             <a:extLst>
               <a:ext uri="{91240B29-F687-4f45-9708-019B960494DF}">
-                <a14:hiddenLine xmlns="" xmlns:a14="http://schemas.microsoft.com/office/drawing/2010/main" w="9525">
+                <a14:hiddenLine xmlns:a14="http://schemas.microsoft.com/office/drawing/2010/main" xmlns="" w="9525">
                   <a:solidFill>
                     <a:srgbClr val="000000"/>
                   </a:solidFill>
@@ -2974,7 +2975,7 @@
             </a:ln>
             <a:extLst>
               <a:ext uri="{91240B29-F687-4f45-9708-019B960494DF}">
-                <a14:hiddenLine xmlns="" xmlns:a14="http://schemas.microsoft.com/office/drawing/2010/main" w="9525">
+                <a14:hiddenLine xmlns:a14="http://schemas.microsoft.com/office/drawing/2010/main" xmlns="" w="9525">
                   <a:solidFill>
                     <a:srgbClr val="000000"/>
                   </a:solidFill>
@@ -3064,7 +3065,7 @@
             </a:ln>
             <a:extLst>
               <a:ext uri="{91240B29-F687-4f45-9708-019B960494DF}">
-                <a14:hiddenLine xmlns="" xmlns:a14="http://schemas.microsoft.com/office/drawing/2010/main" w="9525">
+                <a14:hiddenLine xmlns:a14="http://schemas.microsoft.com/office/drawing/2010/main" xmlns="" w="9525">
                   <a:solidFill>
                     <a:srgbClr val="000000"/>
                   </a:solidFill>
@@ -3132,7 +3133,7 @@
             </a:ln>
             <a:extLst>
               <a:ext uri="{91240B29-F687-4f45-9708-019B960494DF}">
-                <a14:hiddenLine xmlns="" xmlns:a14="http://schemas.microsoft.com/office/drawing/2010/main" w="9525">
+                <a14:hiddenLine xmlns:a14="http://schemas.microsoft.com/office/drawing/2010/main" xmlns="" w="9525">
                   <a:solidFill>
                     <a:srgbClr val="000000"/>
                   </a:solidFill>
@@ -3222,7 +3223,7 @@
             </a:ln>
             <a:extLst>
               <a:ext uri="{91240B29-F687-4f45-9708-019B960494DF}">
-                <a14:hiddenLine xmlns="" xmlns:a14="http://schemas.microsoft.com/office/drawing/2010/main" w="9525">
+                <a14:hiddenLine xmlns:a14="http://schemas.microsoft.com/office/drawing/2010/main" xmlns="" w="9525">
                   <a:solidFill>
                     <a:srgbClr val="000000"/>
                   </a:solidFill>
@@ -3256,7 +3257,7 @@
             </a:ln>
             <a:extLst>
               <a:ext uri="{91240B29-F687-4f45-9708-019B960494DF}">
-                <a14:hiddenLine xmlns="" xmlns:a14="http://schemas.microsoft.com/office/drawing/2010/main" w="9525">
+                <a14:hiddenLine xmlns:a14="http://schemas.microsoft.com/office/drawing/2010/main" xmlns="" w="9525">
                   <a:solidFill>
                     <a:srgbClr val="000000"/>
                   </a:solidFill>
@@ -3346,7 +3347,7 @@
             </a:ln>
             <a:extLst>
               <a:ext uri="{91240B29-F687-4f45-9708-019B960494DF}">
-                <a14:hiddenLine xmlns="" xmlns:a14="http://schemas.microsoft.com/office/drawing/2010/main" w="9525">
+                <a14:hiddenLine xmlns:a14="http://schemas.microsoft.com/office/drawing/2010/main" xmlns="" w="9525">
                   <a:solidFill>
                     <a:srgbClr val="000000"/>
                   </a:solidFill>
@@ -3408,7 +3409,7 @@
             </a:ln>
             <a:extLst>
               <a:ext uri="{91240B29-F687-4f45-9708-019B960494DF}">
-                <a14:hiddenLine xmlns="" xmlns:a14="http://schemas.microsoft.com/office/drawing/2010/main" w="9525">
+                <a14:hiddenLine xmlns:a14="http://schemas.microsoft.com/office/drawing/2010/main" xmlns="" w="9525">
                   <a:solidFill>
                     <a:srgbClr val="000000"/>
                   </a:solidFill>
@@ -3470,7 +3471,7 @@
             </a:ln>
             <a:extLst>
               <a:ext uri="{91240B29-F687-4f45-9708-019B960494DF}">
-                <a14:hiddenLine xmlns="" xmlns:a14="http://schemas.microsoft.com/office/drawing/2010/main" w="9525">
+                <a14:hiddenLine xmlns:a14="http://schemas.microsoft.com/office/drawing/2010/main" xmlns="" w="9525">
                   <a:solidFill>
                     <a:srgbClr val="000000"/>
                   </a:solidFill>
@@ -3560,7 +3561,7 @@
             </a:ln>
             <a:extLst>
               <a:ext uri="{91240B29-F687-4f45-9708-019B960494DF}">
-                <a14:hiddenLine xmlns="" xmlns:a14="http://schemas.microsoft.com/office/drawing/2010/main" w="9525">
+                <a14:hiddenLine xmlns:a14="http://schemas.microsoft.com/office/drawing/2010/main" xmlns="" w="9525">
                   <a:solidFill>
                     <a:srgbClr val="000000"/>
                   </a:solidFill>
@@ -3628,7 +3629,7 @@
             </a:ln>
             <a:extLst>
               <a:ext uri="{91240B29-F687-4f45-9708-019B960494DF}">
-                <a14:hiddenLine xmlns="" xmlns:a14="http://schemas.microsoft.com/office/drawing/2010/main" w="9525">
+                <a14:hiddenLine xmlns:a14="http://schemas.microsoft.com/office/drawing/2010/main" xmlns="" w="9525">
                   <a:solidFill>
                     <a:srgbClr val="000000"/>
                   </a:solidFill>
@@ -3690,7 +3691,7 @@
             </a:ln>
             <a:extLst>
               <a:ext uri="{91240B29-F687-4f45-9708-019B960494DF}">
-                <a14:hiddenLine xmlns="" xmlns:a14="http://schemas.microsoft.com/office/drawing/2010/main" w="9525">
+                <a14:hiddenLine xmlns:a14="http://schemas.microsoft.com/office/drawing/2010/main" xmlns="" w="9525">
                   <a:solidFill>
                     <a:srgbClr val="000000"/>
                   </a:solidFill>
@@ -3780,7 +3781,7 @@
             </a:ln>
             <a:extLst>
               <a:ext uri="{91240B29-F687-4f45-9708-019B960494DF}">
-                <a14:hiddenLine xmlns="" xmlns:a14="http://schemas.microsoft.com/office/drawing/2010/main" w="9525">
+                <a14:hiddenLine xmlns:a14="http://schemas.microsoft.com/office/drawing/2010/main" xmlns="" w="9525">
                   <a:solidFill>
                     <a:srgbClr val="000000"/>
                   </a:solidFill>
@@ -3842,7 +3843,7 @@
             </a:ln>
             <a:extLst>
               <a:ext uri="{91240B29-F687-4f45-9708-019B960494DF}">
-                <a14:hiddenLine xmlns="" xmlns:a14="http://schemas.microsoft.com/office/drawing/2010/main" w="9525">
+                <a14:hiddenLine xmlns:a14="http://schemas.microsoft.com/office/drawing/2010/main" xmlns="" w="9525">
                   <a:solidFill>
                     <a:srgbClr val="000000"/>
                   </a:solidFill>
@@ -3932,7 +3933,7 @@
             </a:ln>
             <a:extLst>
               <a:ext uri="{91240B29-F687-4f45-9708-019B960494DF}">
-                <a14:hiddenLine xmlns="" xmlns:a14="http://schemas.microsoft.com/office/drawing/2010/main" w="9525">
+                <a14:hiddenLine xmlns:a14="http://schemas.microsoft.com/office/drawing/2010/main" xmlns="" w="9525">
                   <a:solidFill>
                     <a:srgbClr val="000000"/>
                   </a:solidFill>
@@ -3994,7 +3995,7 @@
             </a:ln>
             <a:extLst>
               <a:ext uri="{91240B29-F687-4f45-9708-019B960494DF}">
-                <a14:hiddenLine xmlns="" xmlns:a14="http://schemas.microsoft.com/office/drawing/2010/main" w="9525">
+                <a14:hiddenLine xmlns:a14="http://schemas.microsoft.com/office/drawing/2010/main" xmlns="" w="9525">
                   <a:solidFill>
                     <a:srgbClr val="000000"/>
                   </a:solidFill>
@@ -4084,7 +4085,7 @@
             </a:ln>
             <a:extLst>
               <a:ext uri="{91240B29-F687-4f45-9708-019B960494DF}">
-                <a14:hiddenLine xmlns="" xmlns:a14="http://schemas.microsoft.com/office/drawing/2010/main" w="9525">
+                <a14:hiddenLine xmlns:a14="http://schemas.microsoft.com/office/drawing/2010/main" xmlns="" w="9525">
                   <a:solidFill>
                     <a:srgbClr val="000000"/>
                   </a:solidFill>
@@ -4118,7 +4119,7 @@
             </a:ln>
             <a:extLst>
               <a:ext uri="{91240B29-F687-4f45-9708-019B960494DF}">
-                <a14:hiddenLine xmlns="" xmlns:a14="http://schemas.microsoft.com/office/drawing/2010/main" w="9525">
+                <a14:hiddenLine xmlns:a14="http://schemas.microsoft.com/office/drawing/2010/main" xmlns="" w="9525">
                   <a:solidFill>
                     <a:srgbClr val="000000"/>
                   </a:solidFill>
@@ -4183,7 +4184,7 @@
             </a:ln>
             <a:extLst>
               <a:ext uri="{91240B29-F687-4f45-9708-019B960494DF}">
-                <a14:hiddenLine xmlns="" xmlns:a14="http://schemas.microsoft.com/office/drawing/2010/main" w="9525">
+                <a14:hiddenLine xmlns:a14="http://schemas.microsoft.com/office/drawing/2010/main" xmlns="" w="9525">
                   <a:solidFill>
                     <a:srgbClr val="000000"/>
                   </a:solidFill>
@@ -4273,7 +4274,7 @@
             </a:ln>
             <a:extLst>
               <a:ext uri="{91240B29-F687-4f45-9708-019B960494DF}">
-                <a14:hiddenLine xmlns="" xmlns:a14="http://schemas.microsoft.com/office/drawing/2010/main" w="9525">
+                <a14:hiddenLine xmlns:a14="http://schemas.microsoft.com/office/drawing/2010/main" xmlns="" w="9525">
                   <a:solidFill>
                     <a:srgbClr val="000000"/>
                   </a:solidFill>
@@ -4335,7 +4336,7 @@
             </a:ln>
             <a:extLst>
               <a:ext uri="{91240B29-F687-4f45-9708-019B960494DF}">
-                <a14:hiddenLine xmlns="" xmlns:a14="http://schemas.microsoft.com/office/drawing/2010/main" w="9525">
+                <a14:hiddenLine xmlns:a14="http://schemas.microsoft.com/office/drawing/2010/main" xmlns="" w="9525">
                   <a:solidFill>
                     <a:srgbClr val="000000"/>
                   </a:solidFill>
@@ -4425,7 +4426,7 @@
             </a:ln>
             <a:extLst>
               <a:ext uri="{91240B29-F687-4f45-9708-019B960494DF}">
-                <a14:hiddenLine xmlns="" xmlns:a14="http://schemas.microsoft.com/office/drawing/2010/main" w="9525">
+                <a14:hiddenLine xmlns:a14="http://schemas.microsoft.com/office/drawing/2010/main" xmlns="" w="9525">
                   <a:solidFill>
                     <a:srgbClr val="000000"/>
                   </a:solidFill>
@@ -4515,7 +4516,7 @@
             </a:ln>
             <a:extLst>
               <a:ext uri="{91240B29-F687-4f45-9708-019B960494DF}">
-                <a14:hiddenLine xmlns="" xmlns:a14="http://schemas.microsoft.com/office/drawing/2010/main" w="9525">
+                <a14:hiddenLine xmlns:a14="http://schemas.microsoft.com/office/drawing/2010/main" xmlns="" w="9525">
                   <a:solidFill>
                     <a:srgbClr val="000000"/>
                   </a:solidFill>
@@ -4580,7 +4581,7 @@
             </a:ln>
             <a:extLst>
               <a:ext uri="{91240B29-F687-4f45-9708-019B960494DF}">
-                <a14:hiddenLine xmlns="" xmlns:a14="http://schemas.microsoft.com/office/drawing/2010/main" w="9525">
+                <a14:hiddenLine xmlns:a14="http://schemas.microsoft.com/office/drawing/2010/main" xmlns="" w="9525">
                   <a:solidFill>
                     <a:srgbClr val="000000"/>
                   </a:solidFill>
@@ -4642,7 +4643,7 @@
             </a:ln>
             <a:extLst>
               <a:ext uri="{91240B29-F687-4f45-9708-019B960494DF}">
-                <a14:hiddenLine xmlns="" xmlns:a14="http://schemas.microsoft.com/office/drawing/2010/main" w="9525">
+                <a14:hiddenLine xmlns:a14="http://schemas.microsoft.com/office/drawing/2010/main" xmlns="" w="9525">
                   <a:solidFill>
                     <a:srgbClr val="000000"/>
                   </a:solidFill>
@@ -4732,7 +4733,7 @@
             </a:ln>
             <a:extLst>
               <a:ext uri="{91240B29-F687-4f45-9708-019B960494DF}">
-                <a14:hiddenLine xmlns="" xmlns:a14="http://schemas.microsoft.com/office/drawing/2010/main" w="9525">
+                <a14:hiddenLine xmlns:a14="http://schemas.microsoft.com/office/drawing/2010/main" xmlns="" w="9525">
                   <a:solidFill>
                     <a:srgbClr val="000000"/>
                   </a:solidFill>
@@ -4822,7 +4823,7 @@
             </a:ln>
             <a:extLst>
               <a:ext uri="{91240B29-F687-4f45-9708-019B960494DF}">
-                <a14:hiddenLine xmlns="" xmlns:a14="http://schemas.microsoft.com/office/drawing/2010/main" w="9525">
+                <a14:hiddenLine xmlns:a14="http://schemas.microsoft.com/office/drawing/2010/main" xmlns="" w="9525">
                   <a:solidFill>
                     <a:srgbClr val="000000"/>
                   </a:solidFill>
@@ -4884,7 +4885,7 @@
             </a:ln>
             <a:extLst>
               <a:ext uri="{91240B29-F687-4f45-9708-019B960494DF}">
-                <a14:hiddenLine xmlns="" xmlns:a14="http://schemas.microsoft.com/office/drawing/2010/main" w="9525">
+                <a14:hiddenLine xmlns:a14="http://schemas.microsoft.com/office/drawing/2010/main" xmlns="" w="9525">
                   <a:solidFill>
                     <a:srgbClr val="000000"/>
                   </a:solidFill>
@@ -5004,7 +5005,7 @@
             </a:ln>
             <a:extLst>
               <a:ext uri="{91240B29-F687-4f45-9708-019B960494DF}">
-                <a14:hiddenLine xmlns="" xmlns:a14="http://schemas.microsoft.com/office/drawing/2010/main" w="9525">
+                <a14:hiddenLine xmlns:a14="http://schemas.microsoft.com/office/drawing/2010/main" xmlns="" w="9525">
                   <a:solidFill>
                     <a:srgbClr val="000000"/>
                   </a:solidFill>
@@ -5072,7 +5073,7 @@
             </a:ln>
             <a:extLst>
               <a:ext uri="{91240B29-F687-4f45-9708-019B960494DF}">
-                <a14:hiddenLine xmlns="" xmlns:a14="http://schemas.microsoft.com/office/drawing/2010/main" w="9525">
+                <a14:hiddenLine xmlns:a14="http://schemas.microsoft.com/office/drawing/2010/main" xmlns="" w="9525">
                   <a:solidFill>
                     <a:srgbClr val="000000"/>
                   </a:solidFill>
@@ -5162,7 +5163,7 @@
             </a:ln>
             <a:extLst>
               <a:ext uri="{91240B29-F687-4f45-9708-019B960494DF}">
-                <a14:hiddenLine xmlns="" xmlns:a14="http://schemas.microsoft.com/office/drawing/2010/main" w="9525">
+                <a14:hiddenLine xmlns:a14="http://schemas.microsoft.com/office/drawing/2010/main" xmlns="" w="9525">
                   <a:solidFill>
                     <a:srgbClr val="000000"/>
                   </a:solidFill>
@@ -5303,7 +5304,7 @@
             <a:fld id="{B61BEF0D-F0BB-DE4B-95CE-6DB70DBA9567}" type="datetimeFigureOut">
               <a:rPr lang="en-US" smtClean="0"/>
               <a:pPr/>
-              <a:t>25/07/2018</a:t>
+              <a:t>28/07/2018</a:t>
             </a:fld>
             <a:endParaRPr lang="en-US" dirty="0"/>
           </a:p>
@@ -5572,7 +5573,7 @@
             <a:fld id="{B61BEF0D-F0BB-DE4B-95CE-6DB70DBA9567}" type="datetimeFigureOut">
               <a:rPr lang="en-US" smtClean="0"/>
               <a:pPr/>
-              <a:t>25/07/2018</a:t>
+              <a:t>28/07/2018</a:t>
             </a:fld>
             <a:endParaRPr lang="en-US" dirty="0"/>
           </a:p>
@@ -5770,7 +5771,7 @@
             <a:fld id="{B61BEF0D-F0BB-DE4B-95CE-6DB70DBA9567}" type="datetimeFigureOut">
               <a:rPr lang="en-US" smtClean="0"/>
               <a:pPr/>
-              <a:t>25/07/2018</a:t>
+              <a:t>28/07/2018</a:t>
             </a:fld>
             <a:endParaRPr lang="en-US" dirty="0"/>
           </a:p>
@@ -6035,7 +6036,7 @@
             <a:fld id="{B61BEF0D-F0BB-DE4B-95CE-6DB70DBA9567}" type="datetimeFigureOut">
               <a:rPr lang="en-US" smtClean="0"/>
               <a:pPr/>
-              <a:t>25/07/2018</a:t>
+              <a:t>28/07/2018</a:t>
             </a:fld>
             <a:endParaRPr lang="en-US" dirty="0"/>
           </a:p>
@@ -6471,7 +6472,7 @@
             <a:fld id="{B61BEF0D-F0BB-DE4B-95CE-6DB70DBA9567}" type="datetimeFigureOut">
               <a:rPr lang="en-US" smtClean="0"/>
               <a:pPr/>
-              <a:t>25/07/2018</a:t>
+              <a:t>28/07/2018</a:t>
             </a:fld>
             <a:endParaRPr lang="en-US" dirty="0"/>
           </a:p>
@@ -7019,7 +7020,7 @@
             <a:fld id="{B61BEF0D-F0BB-DE4B-95CE-6DB70DBA9567}" type="datetimeFigureOut">
               <a:rPr lang="en-US" smtClean="0"/>
               <a:pPr/>
-              <a:t>25/07/2018</a:t>
+              <a:t>28/07/2018</a:t>
             </a:fld>
             <a:endParaRPr lang="en-US" dirty="0"/>
           </a:p>
@@ -7741,7 +7742,7 @@
             <a:fld id="{B61BEF0D-F0BB-DE4B-95CE-6DB70DBA9567}" type="datetimeFigureOut">
               <a:rPr lang="en-US" smtClean="0"/>
               <a:pPr/>
-              <a:t>25/07/2018</a:t>
+              <a:t>28/07/2018</a:t>
             </a:fld>
             <a:endParaRPr lang="en-US" dirty="0"/>
           </a:p>
@@ -7913,7 +7914,7 @@
             <a:fld id="{B61BEF0D-F0BB-DE4B-95CE-6DB70DBA9567}" type="datetimeFigureOut">
               <a:rPr lang="en-US" smtClean="0"/>
               <a:pPr/>
-              <a:t>25/07/2018</a:t>
+              <a:t>28/07/2018</a:t>
             </a:fld>
             <a:endParaRPr lang="en-US" dirty="0"/>
           </a:p>
@@ -8095,7 +8096,7 @@
             <a:fld id="{B61BEF0D-F0BB-DE4B-95CE-6DB70DBA9567}" type="datetimeFigureOut">
               <a:rPr lang="en-US" smtClean="0"/>
               <a:pPr/>
-              <a:t>25/07/2018</a:t>
+              <a:t>28/07/2018</a:t>
             </a:fld>
             <a:endParaRPr lang="en-US" dirty="0"/>
           </a:p>
@@ -8267,7 +8268,7 @@
             <a:fld id="{B61BEF0D-F0BB-DE4B-95CE-6DB70DBA9567}" type="datetimeFigureOut">
               <a:rPr lang="en-US" smtClean="0"/>
               <a:pPr/>
-              <a:t>25/07/2018</a:t>
+              <a:t>28/07/2018</a:t>
             </a:fld>
             <a:endParaRPr lang="en-US" dirty="0"/>
           </a:p>
@@ -8519,7 +8520,7 @@
             <a:fld id="{B61BEF0D-F0BB-DE4B-95CE-6DB70DBA9567}" type="datetimeFigureOut">
               <a:rPr lang="en-US" smtClean="0"/>
               <a:pPr/>
-              <a:t>25/07/2018</a:t>
+              <a:t>28/07/2018</a:t>
             </a:fld>
             <a:endParaRPr lang="en-US" dirty="0"/>
           </a:p>
@@ -8753,7 +8754,7 @@
             <a:fld id="{B61BEF0D-F0BB-DE4B-95CE-6DB70DBA9567}" type="datetimeFigureOut">
               <a:rPr lang="en-US" smtClean="0"/>
               <a:pPr/>
-              <a:t>25/07/2018</a:t>
+              <a:t>28/07/2018</a:t>
             </a:fld>
             <a:endParaRPr lang="en-US" dirty="0"/>
           </a:p>
@@ -9136,7 +9137,7 @@
             <a:fld id="{B61BEF0D-F0BB-DE4B-95CE-6DB70DBA9567}" type="datetimeFigureOut">
               <a:rPr lang="en-US" smtClean="0"/>
               <a:pPr/>
-              <a:t>25/07/2018</a:t>
+              <a:t>28/07/2018</a:t>
             </a:fld>
             <a:endParaRPr lang="en-US" dirty="0"/>
           </a:p>
@@ -9256,7 +9257,7 @@
             <a:fld id="{B61BEF0D-F0BB-DE4B-95CE-6DB70DBA9567}" type="datetimeFigureOut">
               <a:rPr lang="en-US" smtClean="0"/>
               <a:pPr/>
-              <a:t>25/07/2018</a:t>
+              <a:t>28/07/2018</a:t>
             </a:fld>
             <a:endParaRPr lang="en-US" dirty="0"/>
           </a:p>
@@ -9353,7 +9354,7 @@
             <a:fld id="{B61BEF0D-F0BB-DE4B-95CE-6DB70DBA9567}" type="datetimeFigureOut">
               <a:rPr lang="en-US" smtClean="0"/>
               <a:pPr/>
-              <a:t>25/07/2018</a:t>
+              <a:t>28/07/2018</a:t>
             </a:fld>
             <a:endParaRPr lang="en-US" dirty="0"/>
           </a:p>
@@ -9604,7 +9605,7 @@
             <a:fld id="{B61BEF0D-F0BB-DE4B-95CE-6DB70DBA9567}" type="datetimeFigureOut">
               <a:rPr lang="en-US" smtClean="0"/>
               <a:pPr/>
-              <a:t>25/07/2018</a:t>
+              <a:t>28/07/2018</a:t>
             </a:fld>
             <a:endParaRPr lang="en-US" dirty="0"/>
           </a:p>
@@ -9886,7 +9887,7 @@
             <a:fld id="{B61BEF0D-F0BB-DE4B-95CE-6DB70DBA9567}" type="datetimeFigureOut">
               <a:rPr lang="en-US" smtClean="0"/>
               <a:pPr/>
-              <a:t>25/07/2018</a:t>
+              <a:t>28/07/2018</a:t>
             </a:fld>
             <a:endParaRPr lang="en-US" dirty="0"/>
           </a:p>
@@ -10003,7 +10004,7 @@
           <a:noFill/>
           <a:extLst>
             <a:ext uri="{909E8E84-426E-40dd-AFC4-6F175D3DCCD1}">
-              <a14:hiddenFill xmlns="" xmlns:a14="http://schemas.microsoft.com/office/drawing/2010/main">
+              <a14:hiddenFill xmlns:a14="http://schemas.microsoft.com/office/drawing/2010/main" xmlns="">
                 <a:solidFill>
                   <a:srgbClr val="FFFFFF"/>
                 </a:solidFill>
@@ -10077,7 +10078,7 @@
               </a:ln>
               <a:extLst>
                 <a:ext uri="{91240B29-F687-4f45-9708-019B960494DF}">
-                  <a14:hiddenLine xmlns="" xmlns:a14="http://schemas.microsoft.com/office/drawing/2010/main" w="9525">
+                  <a14:hiddenLine xmlns:a14="http://schemas.microsoft.com/office/drawing/2010/main" xmlns="" w="9525">
                     <a:solidFill>
                       <a:srgbClr val="000000"/>
                     </a:solidFill>
@@ -10167,7 +10168,7 @@
               </a:ln>
               <a:extLst>
                 <a:ext uri="{91240B29-F687-4f45-9708-019B960494DF}">
-                  <a14:hiddenLine xmlns="" xmlns:a14="http://schemas.microsoft.com/office/drawing/2010/main" w="9525">
+                  <a14:hiddenLine xmlns:a14="http://schemas.microsoft.com/office/drawing/2010/main" xmlns="" w="9525">
                     <a:solidFill>
                       <a:srgbClr val="000000"/>
                     </a:solidFill>
@@ -10257,7 +10258,7 @@
               </a:ln>
               <a:extLst>
                 <a:ext uri="{91240B29-F687-4f45-9708-019B960494DF}">
-                  <a14:hiddenLine xmlns="" xmlns:a14="http://schemas.microsoft.com/office/drawing/2010/main" w="9525">
+                  <a14:hiddenLine xmlns:a14="http://schemas.microsoft.com/office/drawing/2010/main" xmlns="" w="9525">
                     <a:solidFill>
                       <a:srgbClr val="000000"/>
                     </a:solidFill>
@@ -10319,7 +10320,7 @@
               </a:ln>
               <a:extLst>
                 <a:ext uri="{91240B29-F687-4f45-9708-019B960494DF}">
-                  <a14:hiddenLine xmlns="" xmlns:a14="http://schemas.microsoft.com/office/drawing/2010/main" w="9525">
+                  <a14:hiddenLine xmlns:a14="http://schemas.microsoft.com/office/drawing/2010/main" xmlns="" w="9525">
                     <a:solidFill>
                       <a:srgbClr val="000000"/>
                     </a:solidFill>
@@ -10409,7 +10410,7 @@
               </a:ln>
               <a:extLst>
                 <a:ext uri="{91240B29-F687-4f45-9708-019B960494DF}">
-                  <a14:hiddenLine xmlns="" xmlns:a14="http://schemas.microsoft.com/office/drawing/2010/main" w="9525">
+                  <a14:hiddenLine xmlns:a14="http://schemas.microsoft.com/office/drawing/2010/main" xmlns="" w="9525">
                     <a:solidFill>
                       <a:srgbClr val="000000"/>
                     </a:solidFill>
@@ -10471,7 +10472,7 @@
               </a:ln>
               <a:extLst>
                 <a:ext uri="{91240B29-F687-4f45-9708-019B960494DF}">
-                  <a14:hiddenLine xmlns="" xmlns:a14="http://schemas.microsoft.com/office/drawing/2010/main" w="9525">
+                  <a14:hiddenLine xmlns:a14="http://schemas.microsoft.com/office/drawing/2010/main" xmlns="" w="9525">
                     <a:solidFill>
                       <a:srgbClr val="000000"/>
                     </a:solidFill>
@@ -10533,7 +10534,7 @@
               </a:ln>
               <a:extLst>
                 <a:ext uri="{91240B29-F687-4f45-9708-019B960494DF}">
-                  <a14:hiddenLine xmlns="" xmlns:a14="http://schemas.microsoft.com/office/drawing/2010/main" w="9525">
+                  <a14:hiddenLine xmlns:a14="http://schemas.microsoft.com/office/drawing/2010/main" xmlns="" w="9525">
                     <a:solidFill>
                       <a:srgbClr val="000000"/>
                     </a:solidFill>
@@ -10623,7 +10624,7 @@
               </a:ln>
               <a:extLst>
                 <a:ext uri="{91240B29-F687-4f45-9708-019B960494DF}">
-                  <a14:hiddenLine xmlns="" xmlns:a14="http://schemas.microsoft.com/office/drawing/2010/main" w="9525">
+                  <a14:hiddenLine xmlns:a14="http://schemas.microsoft.com/office/drawing/2010/main" xmlns="" w="9525">
                     <a:solidFill>
                       <a:srgbClr val="000000"/>
                     </a:solidFill>
@@ -10713,7 +10714,7 @@
               </a:ln>
               <a:extLst>
                 <a:ext uri="{91240B29-F687-4f45-9708-019B960494DF}">
-                  <a14:hiddenLine xmlns="" xmlns:a14="http://schemas.microsoft.com/office/drawing/2010/main" w="9525">
+                  <a14:hiddenLine xmlns:a14="http://schemas.microsoft.com/office/drawing/2010/main" xmlns="" w="9525">
                     <a:solidFill>
                       <a:srgbClr val="000000"/>
                     </a:solidFill>
@@ -10775,7 +10776,7 @@
               </a:ln>
               <a:extLst>
                 <a:ext uri="{91240B29-F687-4f45-9708-019B960494DF}">
-                  <a14:hiddenLine xmlns="" xmlns:a14="http://schemas.microsoft.com/office/drawing/2010/main" w="9525">
+                  <a14:hiddenLine xmlns:a14="http://schemas.microsoft.com/office/drawing/2010/main" xmlns="" w="9525">
                     <a:solidFill>
                       <a:srgbClr val="000000"/>
                     </a:solidFill>
@@ -10885,7 +10886,7 @@
               </a:ln>
               <a:extLst>
                 <a:ext uri="{91240B29-F687-4f45-9708-019B960494DF}">
-                  <a14:hiddenLine xmlns="" xmlns:a14="http://schemas.microsoft.com/office/drawing/2010/main" w="9525">
+                  <a14:hiddenLine xmlns:a14="http://schemas.microsoft.com/office/drawing/2010/main" xmlns="" w="9525">
                     <a:solidFill>
                       <a:srgbClr val="000000"/>
                     </a:solidFill>
@@ -10969,7 +10970,7 @@
               </a:ln>
               <a:extLst>
                 <a:ext uri="{91240B29-F687-4f45-9708-019B960494DF}">
-                  <a14:hiddenLine xmlns="" xmlns:a14="http://schemas.microsoft.com/office/drawing/2010/main" w="9525">
+                  <a14:hiddenLine xmlns:a14="http://schemas.microsoft.com/office/drawing/2010/main" xmlns="" w="9525">
                     <a:solidFill>
                       <a:srgbClr val="000000"/>
                     </a:solidFill>
@@ -11031,7 +11032,7 @@
               </a:ln>
               <a:extLst>
                 <a:ext uri="{91240B29-F687-4f45-9708-019B960494DF}">
-                  <a14:hiddenLine xmlns="" xmlns:a14="http://schemas.microsoft.com/office/drawing/2010/main" w="9525">
+                  <a14:hiddenLine xmlns:a14="http://schemas.microsoft.com/office/drawing/2010/main" xmlns="" w="9525">
                     <a:solidFill>
                       <a:srgbClr val="000000"/>
                     </a:solidFill>
@@ -11093,7 +11094,7 @@
               </a:ln>
               <a:extLst>
                 <a:ext uri="{91240B29-F687-4f45-9708-019B960494DF}">
-                  <a14:hiddenLine xmlns="" xmlns:a14="http://schemas.microsoft.com/office/drawing/2010/main" w="9525">
+                  <a14:hiddenLine xmlns:a14="http://schemas.microsoft.com/office/drawing/2010/main" xmlns="" w="9525">
                     <a:solidFill>
                       <a:srgbClr val="000000"/>
                     </a:solidFill>
@@ -11183,7 +11184,7 @@
               </a:ln>
               <a:extLst>
                 <a:ext uri="{91240B29-F687-4f45-9708-019B960494DF}">
-                  <a14:hiddenLine xmlns="" xmlns:a14="http://schemas.microsoft.com/office/drawing/2010/main" w="9525">
+                  <a14:hiddenLine xmlns:a14="http://schemas.microsoft.com/office/drawing/2010/main" xmlns="" w="9525">
                     <a:solidFill>
                       <a:srgbClr val="000000"/>
                     </a:solidFill>
@@ -11217,7 +11218,7 @@
               </a:ln>
               <a:extLst>
                 <a:ext uri="{91240B29-F687-4f45-9708-019B960494DF}">
-                  <a14:hiddenLine xmlns="" xmlns:a14="http://schemas.microsoft.com/office/drawing/2010/main" w="9525">
+                  <a14:hiddenLine xmlns:a14="http://schemas.microsoft.com/office/drawing/2010/main" xmlns="" w="9525">
                     <a:solidFill>
                       <a:srgbClr val="000000"/>
                     </a:solidFill>
@@ -11282,7 +11283,7 @@
               </a:ln>
               <a:extLst>
                 <a:ext uri="{91240B29-F687-4f45-9708-019B960494DF}">
-                  <a14:hiddenLine xmlns="" xmlns:a14="http://schemas.microsoft.com/office/drawing/2010/main" w="9525">
+                  <a14:hiddenLine xmlns:a14="http://schemas.microsoft.com/office/drawing/2010/main" xmlns="" w="9525">
                     <a:solidFill>
                       <a:srgbClr val="000000"/>
                     </a:solidFill>
@@ -11372,7 +11373,7 @@
               </a:ln>
               <a:extLst>
                 <a:ext uri="{91240B29-F687-4f45-9708-019B960494DF}">
-                  <a14:hiddenLine xmlns="" xmlns:a14="http://schemas.microsoft.com/office/drawing/2010/main" w="9525">
+                  <a14:hiddenLine xmlns:a14="http://schemas.microsoft.com/office/drawing/2010/main" xmlns="" w="9525">
                     <a:solidFill>
                       <a:srgbClr val="000000"/>
                     </a:solidFill>
@@ -11434,7 +11435,7 @@
               </a:ln>
               <a:extLst>
                 <a:ext uri="{91240B29-F687-4f45-9708-019B960494DF}">
-                  <a14:hiddenLine xmlns="" xmlns:a14="http://schemas.microsoft.com/office/drawing/2010/main" w="9525">
+                  <a14:hiddenLine xmlns:a14="http://schemas.microsoft.com/office/drawing/2010/main" xmlns="" w="9525">
                     <a:solidFill>
                       <a:srgbClr val="000000"/>
                     </a:solidFill>
@@ -11524,7 +11525,7 @@
               </a:ln>
               <a:extLst>
                 <a:ext uri="{91240B29-F687-4f45-9708-019B960494DF}">
-                  <a14:hiddenLine xmlns="" xmlns:a14="http://schemas.microsoft.com/office/drawing/2010/main" w="9525">
+                  <a14:hiddenLine xmlns:a14="http://schemas.microsoft.com/office/drawing/2010/main" xmlns="" w="9525">
                     <a:solidFill>
                       <a:srgbClr val="000000"/>
                     </a:solidFill>
@@ -11589,7 +11590,7 @@
               </a:ln>
               <a:extLst>
                 <a:ext uri="{91240B29-F687-4f45-9708-019B960494DF}">
-                  <a14:hiddenLine xmlns="" xmlns:a14="http://schemas.microsoft.com/office/drawing/2010/main" w="9525">
+                  <a14:hiddenLine xmlns:a14="http://schemas.microsoft.com/office/drawing/2010/main" xmlns="" w="9525">
                     <a:solidFill>
                       <a:srgbClr val="000000"/>
                     </a:solidFill>
@@ -11651,7 +11652,7 @@
               </a:ln>
               <a:extLst>
                 <a:ext uri="{91240B29-F687-4f45-9708-019B960494DF}">
-                  <a14:hiddenLine xmlns="" xmlns:a14="http://schemas.microsoft.com/office/drawing/2010/main" w="9525">
+                  <a14:hiddenLine xmlns:a14="http://schemas.microsoft.com/office/drawing/2010/main" xmlns="" w="9525">
                     <a:solidFill>
                       <a:srgbClr val="000000"/>
                     </a:solidFill>
@@ -11741,7 +11742,7 @@
               </a:ln>
               <a:extLst>
                 <a:ext uri="{91240B29-F687-4f45-9708-019B960494DF}">
-                  <a14:hiddenLine xmlns="" xmlns:a14="http://schemas.microsoft.com/office/drawing/2010/main" w="9525">
+                  <a14:hiddenLine xmlns:a14="http://schemas.microsoft.com/office/drawing/2010/main" xmlns="" w="9525">
                     <a:solidFill>
                       <a:srgbClr val="000000"/>
                     </a:solidFill>
@@ -11831,7 +11832,7 @@
               </a:ln>
               <a:extLst>
                 <a:ext uri="{91240B29-F687-4f45-9708-019B960494DF}">
-                  <a14:hiddenLine xmlns="" xmlns:a14="http://schemas.microsoft.com/office/drawing/2010/main" w="9525">
+                  <a14:hiddenLine xmlns:a14="http://schemas.microsoft.com/office/drawing/2010/main" xmlns="" w="9525">
                     <a:solidFill>
                       <a:srgbClr val="000000"/>
                     </a:solidFill>
@@ -11896,7 +11897,7 @@
               </a:ln>
               <a:extLst>
                 <a:ext uri="{91240B29-F687-4f45-9708-019B960494DF}">
-                  <a14:hiddenLine xmlns="" xmlns:a14="http://schemas.microsoft.com/office/drawing/2010/main" w="9525">
+                  <a14:hiddenLine xmlns:a14="http://schemas.microsoft.com/office/drawing/2010/main" xmlns="" w="9525">
                     <a:solidFill>
                       <a:srgbClr val="000000"/>
                     </a:solidFill>
@@ -12016,7 +12017,7 @@
               </a:ln>
               <a:extLst>
                 <a:ext uri="{91240B29-F687-4f45-9708-019B960494DF}">
-                  <a14:hiddenLine xmlns="" xmlns:a14="http://schemas.microsoft.com/office/drawing/2010/main" w="9525">
+                  <a14:hiddenLine xmlns:a14="http://schemas.microsoft.com/office/drawing/2010/main" xmlns="" w="9525">
                     <a:solidFill>
                       <a:srgbClr val="000000"/>
                     </a:solidFill>
@@ -12114,7 +12115,7 @@
               </a:ln>
               <a:extLst>
                 <a:ext uri="{91240B29-F687-4f45-9708-019B960494DF}">
-                  <a14:hiddenLine xmlns="" xmlns:a14="http://schemas.microsoft.com/office/drawing/2010/main" w="9525">
+                  <a14:hiddenLine xmlns:a14="http://schemas.microsoft.com/office/drawing/2010/main" xmlns="" w="9525">
                     <a:solidFill>
                       <a:srgbClr val="000000"/>
                     </a:solidFill>
@@ -12229,7 +12230,7 @@
               </a:ln>
               <a:extLst>
                 <a:ext uri="{91240B29-F687-4f45-9708-019B960494DF}">
-                  <a14:hiddenLine xmlns="" xmlns:a14="http://schemas.microsoft.com/office/drawing/2010/main" w="9525">
+                  <a14:hiddenLine xmlns:a14="http://schemas.microsoft.com/office/drawing/2010/main" xmlns="" w="9525">
                     <a:solidFill>
                       <a:srgbClr val="000000"/>
                     </a:solidFill>
@@ -12319,7 +12320,7 @@
               </a:ln>
               <a:extLst>
                 <a:ext uri="{91240B29-F687-4f45-9708-019B960494DF}">
-                  <a14:hiddenLine xmlns="" xmlns:a14="http://schemas.microsoft.com/office/drawing/2010/main" w="9525">
+                  <a14:hiddenLine xmlns:a14="http://schemas.microsoft.com/office/drawing/2010/main" xmlns="" w="9525">
                     <a:solidFill>
                       <a:srgbClr val="000000"/>
                     </a:solidFill>
@@ -12384,7 +12385,7 @@
               </a:ln>
               <a:extLst>
                 <a:ext uri="{91240B29-F687-4f45-9708-019B960494DF}">
-                  <a14:hiddenLine xmlns="" xmlns:a14="http://schemas.microsoft.com/office/drawing/2010/main" w="9525">
+                  <a14:hiddenLine xmlns:a14="http://schemas.microsoft.com/office/drawing/2010/main" xmlns="" w="9525">
                     <a:solidFill>
                       <a:srgbClr val="000000"/>
                     </a:solidFill>
@@ -12474,7 +12475,7 @@
               </a:ln>
               <a:extLst>
                 <a:ext uri="{91240B29-F687-4f45-9708-019B960494DF}">
-                  <a14:hiddenLine xmlns="" xmlns:a14="http://schemas.microsoft.com/office/drawing/2010/main" w="9525">
+                  <a14:hiddenLine xmlns:a14="http://schemas.microsoft.com/office/drawing/2010/main" xmlns="" w="9525">
                     <a:solidFill>
                       <a:srgbClr val="000000"/>
                     </a:solidFill>
@@ -12542,7 +12543,7 @@
               </a:ln>
               <a:extLst>
                 <a:ext uri="{91240B29-F687-4f45-9708-019B960494DF}">
-                  <a14:hiddenLine xmlns="" xmlns:a14="http://schemas.microsoft.com/office/drawing/2010/main" w="9525">
+                  <a14:hiddenLine xmlns:a14="http://schemas.microsoft.com/office/drawing/2010/main" xmlns="" w="9525">
                     <a:solidFill>
                       <a:srgbClr val="000000"/>
                     </a:solidFill>
@@ -12632,7 +12633,7 @@
               </a:ln>
               <a:extLst>
                 <a:ext uri="{91240B29-F687-4f45-9708-019B960494DF}">
-                  <a14:hiddenLine xmlns="" xmlns:a14="http://schemas.microsoft.com/office/drawing/2010/main" w="9525">
+                  <a14:hiddenLine xmlns:a14="http://schemas.microsoft.com/office/drawing/2010/main" xmlns="" w="9525">
                     <a:solidFill>
                       <a:srgbClr val="000000"/>
                     </a:solidFill>
@@ -12700,7 +12701,7 @@
               </a:ln>
               <a:extLst>
                 <a:ext uri="{91240B29-F687-4f45-9708-019B960494DF}">
-                  <a14:hiddenLine xmlns="" xmlns:a14="http://schemas.microsoft.com/office/drawing/2010/main" w="9525">
+                  <a14:hiddenLine xmlns:a14="http://schemas.microsoft.com/office/drawing/2010/main" xmlns="" w="9525">
                     <a:solidFill>
                       <a:srgbClr val="000000"/>
                     </a:solidFill>
@@ -12790,7 +12791,7 @@
               </a:ln>
               <a:extLst>
                 <a:ext uri="{91240B29-F687-4f45-9708-019B960494DF}">
-                  <a14:hiddenLine xmlns="" xmlns:a14="http://schemas.microsoft.com/office/drawing/2010/main" w="9525">
+                  <a14:hiddenLine xmlns:a14="http://schemas.microsoft.com/office/drawing/2010/main" xmlns="" w="9525">
                     <a:solidFill>
                       <a:srgbClr val="000000"/>
                     </a:solidFill>
@@ -12824,7 +12825,7 @@
               </a:ln>
               <a:extLst>
                 <a:ext uri="{91240B29-F687-4f45-9708-019B960494DF}">
-                  <a14:hiddenLine xmlns="" xmlns:a14="http://schemas.microsoft.com/office/drawing/2010/main" w="9525">
+                  <a14:hiddenLine xmlns:a14="http://schemas.microsoft.com/office/drawing/2010/main" xmlns="" w="9525">
                     <a:solidFill>
                       <a:srgbClr val="000000"/>
                     </a:solidFill>
@@ -12965,7 +12966,7 @@
             <a:fld id="{B61BEF0D-F0BB-DE4B-95CE-6DB70DBA9567}" type="datetimeFigureOut">
               <a:rPr lang="en-US" smtClean="0"/>
               <a:pPr/>
-              <a:t>25/07/2018</a:t>
+              <a:t>28/07/2018</a:t>
             </a:fld>
             <a:endParaRPr lang="en-US" dirty="0"/>
           </a:p>
@@ -22832,7 +22833,7 @@
         </p:blipFill>
         <p:spPr>
           <a:xfrm>
-            <a:off x="1389032" y="1913715"/>
+            <a:off x="1265222" y="1913715"/>
             <a:ext cx="7438095" cy="4523809"/>
           </a:xfrm>
           <a:prstGeom prst="rect">
@@ -22840,6 +22841,41 @@
           </a:prstGeom>
         </p:spPr>
       </p:pic>
+      <p:sp>
+        <p:nvSpPr>
+          <p:cNvPr id="3" name="TextBox 2">
+            <a:extLst>
+              <a:ext uri="{FF2B5EF4-FFF2-40B4-BE49-F238E27FC236}">
+                <a16:creationId xmlns:a16="http://schemas.microsoft.com/office/drawing/2014/main" id="{534DCD82-D2B1-4CAE-A308-DD5B7B85C094}"/>
+              </a:ext>
+            </a:extLst>
+          </p:cNvPr>
+          <p:cNvSpPr txBox="1"/>
+          <p:nvPr/>
+        </p:nvSpPr>
+        <p:spPr>
+          <a:xfrm>
+            <a:off x="9058940" y="2700670"/>
+            <a:ext cx="2775097" cy="1569660"/>
+          </a:xfrm>
+          <a:prstGeom prst="rect">
+            <a:avLst/>
+          </a:prstGeom>
+          <a:noFill/>
+        </p:spPr>
+        <p:txBody>
+          <a:bodyPr wrap="square" rtlCol="0">
+            <a:spAutoFit/>
+          </a:bodyPr>
+          <a:lstStyle/>
+          <a:p>
+            <a:r>
+              <a:rPr lang="en-US" sz="3200" dirty="0"/>
+              <a:t>Fix the code and push to clear the issue</a:t>
+            </a:r>
+          </a:p>
+        </p:txBody>
+      </p:sp>
     </p:spTree>
     <p:extLst>
       <p:ext uri="{BB962C8B-B14F-4D97-AF65-F5344CB8AC3E}">
@@ -22903,6 +22939,51 @@
                       </p:childTnLst>
                     </p:cTn>
                   </p:par>
+                  <p:par>
+                    <p:cTn id="7" fill="hold">
+                      <p:stCondLst>
+                        <p:cond delay="indefinite"/>
+                      </p:stCondLst>
+                      <p:childTnLst>
+                        <p:par>
+                          <p:cTn id="8" fill="hold">
+                            <p:stCondLst>
+                              <p:cond delay="0"/>
+                            </p:stCondLst>
+                            <p:childTnLst>
+                              <p:par>
+                                <p:cTn id="9" presetID="1" presetClass="entr" presetSubtype="0" fill="hold" grpId="0" nodeType="clickEffect">
+                                  <p:stCondLst>
+                                    <p:cond delay="0"/>
+                                  </p:stCondLst>
+                                  <p:childTnLst>
+                                    <p:set>
+                                      <p:cBhvr>
+                                        <p:cTn id="10" dur="1" fill="hold">
+                                          <p:stCondLst>
+                                            <p:cond delay="0"/>
+                                          </p:stCondLst>
+                                        </p:cTn>
+                                        <p:tgtEl>
+                                          <p:spTgt spid="3"/>
+                                        </p:tgtEl>
+                                        <p:attrNameLst>
+                                          <p:attrName>style.visibility</p:attrName>
+                                        </p:attrNameLst>
+                                      </p:cBhvr>
+                                      <p:to>
+                                        <p:strVal val="visible"/>
+                                      </p:to>
+                                    </p:set>
+                                  </p:childTnLst>
+                                </p:cTn>
+                              </p:par>
+                            </p:childTnLst>
+                          </p:cTn>
+                        </p:par>
+                      </p:childTnLst>
+                    </p:cTn>
+                  </p:par>
                 </p:childTnLst>
               </p:cTn>
               <p:prevCondLst>
@@ -22924,6 +23005,9 @@
         </p:cTn>
       </p:par>
     </p:tnLst>
+    <p:bldLst>
+      <p:bldP spid="3" grpId="0"/>
+    </p:bldLst>
   </p:timing>
 </p:sld>
 </file>
@@ -22950,7 +23034,7 @@
           <p:cNvPr id="2" name="Title 1">
             <a:extLst>
               <a:ext uri="{FF2B5EF4-FFF2-40B4-BE49-F238E27FC236}">
-                <a16:creationId xmlns:a16="http://schemas.microsoft.com/office/drawing/2014/main" id="{DEDF95E6-31A7-4A4D-B81B-67A931C484D1}"/>
+                <a16:creationId xmlns:a16="http://schemas.microsoft.com/office/drawing/2014/main" id="{861F233C-B236-4522-8293-96B783558169}"/>
               </a:ext>
             </a:extLst>
           </p:cNvPr>
@@ -22968,7 +23052,7 @@
           <a:p>
             <a:r>
               <a:rPr lang="en-US" dirty="0"/>
-              <a:t>Links and credits</a:t>
+              <a:t>Recap and clean-up</a:t>
             </a:r>
           </a:p>
         </p:txBody>
@@ -22978,7 +23062,7 @@
           <p:cNvPr id="3" name="Content Placeholder 2">
             <a:extLst>
               <a:ext uri="{FF2B5EF4-FFF2-40B4-BE49-F238E27FC236}">
-                <a16:creationId xmlns:a16="http://schemas.microsoft.com/office/drawing/2014/main" id="{854FB79B-E0E0-4106-9101-482D7D707EAC}"/>
+                <a16:creationId xmlns:a16="http://schemas.microsoft.com/office/drawing/2014/main" id="{745F733C-B22D-40C0-9DCF-A0B4081FE954}"/>
               </a:ext>
             </a:extLst>
           </p:cNvPr>
@@ -22994,87 +23078,14 @@
           <a:bodyPr/>
           <a:lstStyle/>
           <a:p>
-            <a:r>
-              <a:rPr lang="en-US" dirty="0"/>
-              <a:t>GitHub: </a:t>
-            </a:r>
-            <a:r>
-              <a:rPr lang="en-US" dirty="0">
-                <a:hlinkClick r:id="rId2"/>
-              </a:rPr>
-              <a:t>https://github.com</a:t>
-            </a:r>
-            <a:r>
-              <a:rPr lang="en-US" dirty="0"/>
-              <a:t> </a:t>
-            </a:r>
-          </a:p>
-          <a:p>
-            <a:r>
-              <a:rPr lang="en-US" dirty="0" err="1"/>
-              <a:t>Appveyor</a:t>
-            </a:r>
-            <a:r>
-              <a:rPr lang="en-US" dirty="0"/>
-              <a:t>: </a:t>
-            </a:r>
-            <a:r>
-              <a:rPr lang="en-US" dirty="0">
-                <a:hlinkClick r:id="rId3"/>
-              </a:rPr>
-              <a:t>https://appveyor.com</a:t>
-            </a:r>
-            <a:r>
-              <a:rPr lang="en-US" dirty="0"/>
-              <a:t> </a:t>
-            </a:r>
-          </a:p>
-          <a:p>
-            <a:r>
-              <a:rPr lang="en-US" dirty="0" err="1"/>
-              <a:t>Codecov</a:t>
-            </a:r>
-            <a:r>
-              <a:rPr lang="en-US" dirty="0"/>
-              <a:t>: </a:t>
-            </a:r>
-            <a:r>
-              <a:rPr lang="en-US" dirty="0">
-                <a:hlinkClick r:id="rId4"/>
-              </a:rPr>
-              <a:t>https://codecov.io</a:t>
-            </a:r>
-            <a:r>
-              <a:rPr lang="en-US" dirty="0"/>
-              <a:t> </a:t>
-            </a:r>
-          </a:p>
-          <a:p>
-            <a:r>
-              <a:rPr lang="en-US" dirty="0" err="1"/>
-              <a:t>Opencover</a:t>
-            </a:r>
-            <a:r>
-              <a:rPr lang="en-US" dirty="0"/>
-              <a:t>: </a:t>
-            </a:r>
-            <a:r>
-              <a:rPr lang="en-US" dirty="0">
-                <a:hlinkClick r:id="rId5"/>
-              </a:rPr>
-              <a:t>https://github.com/opencover/opencover/wiki/Usage</a:t>
-            </a:r>
-            <a:r>
-              <a:rPr lang="en-US" dirty="0"/>
-              <a:t> </a:t>
-            </a:r>
+            <a:endParaRPr lang="en-US" dirty="0"/>
           </a:p>
         </p:txBody>
       </p:sp>
     </p:spTree>
     <p:extLst>
       <p:ext uri="{BB962C8B-B14F-4D97-AF65-F5344CB8AC3E}">
-        <p14:creationId xmlns:p14="http://schemas.microsoft.com/office/powerpoint/2010/main" val="3021987684"/>
+        <p14:creationId xmlns:p14="http://schemas.microsoft.com/office/powerpoint/2010/main" val="3587398463"/>
       </p:ext>
     </p:extLst>
   </p:cSld>
@@ -23178,6 +23189,175 @@
     <p:extLst>
       <p:ext uri="{BB962C8B-B14F-4D97-AF65-F5344CB8AC3E}">
         <p14:creationId xmlns:p14="http://schemas.microsoft.com/office/powerpoint/2010/main" val="2367085396"/>
+      </p:ext>
+    </p:extLst>
+  </p:cSld>
+  <p:clrMapOvr>
+    <a:masterClrMapping/>
+  </p:clrMapOvr>
+</p:sld>
+</file>
+
+<file path=ppt/slides/slide40.xml><?xml version="1.0" encoding="utf-8"?>
+<p:sld xmlns:a="http://schemas.openxmlformats.org/drawingml/2006/main" xmlns:r="http://schemas.openxmlformats.org/officeDocument/2006/relationships" xmlns:p="http://schemas.openxmlformats.org/presentationml/2006/main">
+  <p:cSld>
+    <p:spTree>
+      <p:nvGrpSpPr>
+        <p:cNvPr id="1" name=""/>
+        <p:cNvGrpSpPr/>
+        <p:nvPr/>
+      </p:nvGrpSpPr>
+      <p:grpSpPr>
+        <a:xfrm>
+          <a:off x="0" y="0"/>
+          <a:ext cx="0" cy="0"/>
+          <a:chOff x="0" y="0"/>
+          <a:chExt cx="0" cy="0"/>
+        </a:xfrm>
+      </p:grpSpPr>
+      <p:sp>
+        <p:nvSpPr>
+          <p:cNvPr id="2" name="Title 1">
+            <a:extLst>
+              <a:ext uri="{FF2B5EF4-FFF2-40B4-BE49-F238E27FC236}">
+                <a16:creationId xmlns:a16="http://schemas.microsoft.com/office/drawing/2014/main" id="{DEDF95E6-31A7-4A4D-B81B-67A931C484D1}"/>
+              </a:ext>
+            </a:extLst>
+          </p:cNvPr>
+          <p:cNvSpPr>
+            <a:spLocks noGrp="1"/>
+          </p:cNvSpPr>
+          <p:nvPr>
+            <p:ph type="title"/>
+          </p:nvPr>
+        </p:nvSpPr>
+        <p:spPr/>
+        <p:txBody>
+          <a:bodyPr/>
+          <a:lstStyle/>
+          <a:p>
+            <a:r>
+              <a:rPr lang="en-US" dirty="0"/>
+              <a:t>Links and credits</a:t>
+            </a:r>
+          </a:p>
+        </p:txBody>
+      </p:sp>
+      <p:sp>
+        <p:nvSpPr>
+          <p:cNvPr id="3" name="Content Placeholder 2">
+            <a:extLst>
+              <a:ext uri="{FF2B5EF4-FFF2-40B4-BE49-F238E27FC236}">
+                <a16:creationId xmlns:a16="http://schemas.microsoft.com/office/drawing/2014/main" id="{854FB79B-E0E0-4106-9101-482D7D707EAC}"/>
+              </a:ext>
+            </a:extLst>
+          </p:cNvPr>
+          <p:cNvSpPr>
+            <a:spLocks noGrp="1"/>
+          </p:cNvSpPr>
+          <p:nvPr>
+            <p:ph idx="1"/>
+          </p:nvPr>
+        </p:nvSpPr>
+        <p:spPr/>
+        <p:txBody>
+          <a:bodyPr/>
+          <a:lstStyle/>
+          <a:p>
+            <a:r>
+              <a:rPr lang="en-US" dirty="0"/>
+              <a:t>GitHub: </a:t>
+            </a:r>
+            <a:r>
+              <a:rPr lang="en-US" dirty="0">
+                <a:hlinkClick r:id="rId2"/>
+              </a:rPr>
+              <a:t>https://github.com</a:t>
+            </a:r>
+            <a:r>
+              <a:rPr lang="en-US" dirty="0"/>
+              <a:t> </a:t>
+            </a:r>
+          </a:p>
+          <a:p>
+            <a:r>
+              <a:rPr lang="en-US" dirty="0" err="1"/>
+              <a:t>Appveyor</a:t>
+            </a:r>
+            <a:r>
+              <a:rPr lang="en-US" dirty="0"/>
+              <a:t>: </a:t>
+            </a:r>
+            <a:r>
+              <a:rPr lang="en-US" dirty="0">
+                <a:hlinkClick r:id="rId3"/>
+              </a:rPr>
+              <a:t>https://appveyor.com</a:t>
+            </a:r>
+            <a:r>
+              <a:rPr lang="en-US" dirty="0"/>
+              <a:t> </a:t>
+            </a:r>
+          </a:p>
+          <a:p>
+            <a:r>
+              <a:rPr lang="en-US" dirty="0" err="1"/>
+              <a:t>Codecov</a:t>
+            </a:r>
+            <a:r>
+              <a:rPr lang="en-US" dirty="0"/>
+              <a:t>: </a:t>
+            </a:r>
+            <a:r>
+              <a:rPr lang="en-US" dirty="0">
+                <a:hlinkClick r:id="rId4"/>
+              </a:rPr>
+              <a:t>https://codecov.io</a:t>
+            </a:r>
+            <a:r>
+              <a:rPr lang="en-US" dirty="0"/>
+              <a:t> </a:t>
+            </a:r>
+          </a:p>
+          <a:p>
+            <a:r>
+              <a:rPr lang="en-US" dirty="0" err="1"/>
+              <a:t>Opencover</a:t>
+            </a:r>
+            <a:r>
+              <a:rPr lang="en-US" dirty="0"/>
+              <a:t>: </a:t>
+            </a:r>
+            <a:r>
+              <a:rPr lang="en-US" dirty="0">
+                <a:hlinkClick r:id="rId5"/>
+              </a:rPr>
+              <a:t>https://github.com/opencover/opencover/wiki/Usage</a:t>
+            </a:r>
+            <a:endParaRPr lang="en-US" dirty="0"/>
+          </a:p>
+          <a:p>
+            <a:r>
+              <a:rPr lang="en-US" dirty="0"/>
+              <a:t>My Visual Studio: </a:t>
+            </a:r>
+            <a:r>
+              <a:rPr lang="en-US" dirty="0">
+                <a:hlinkClick r:id="rId6"/>
+              </a:rPr>
+              <a:t>https://my.visualstudio.com</a:t>
+            </a:r>
+            <a:r>
+              <a:rPr lang="en-US" dirty="0"/>
+              <a:t>  </a:t>
+            </a:r>
+          </a:p>
+        </p:txBody>
+      </p:sp>
+    </p:spTree>
+    <p:extLst>
+      <p:ext uri="{BB962C8B-B14F-4D97-AF65-F5344CB8AC3E}">
+        <p14:creationId xmlns:p14="http://schemas.microsoft.com/office/powerpoint/2010/main" val="3021987684"/>
       </p:ext>
     </p:extLst>
   </p:cSld>

</xml_diff>

<commit_message>
Add deployment to Azure (#9)
* Add deployment to Azure
</commit_message>
<xml_diff>
--- a/Presentation/Full Open-Source CI.pptx
+++ b/Presentation/Full Open-Source CI.pptx
@@ -43,7 +43,13 @@
     <p:sldId id="294" r:id="rId37"/>
     <p:sldId id="295" r:id="rId38"/>
     <p:sldId id="296" r:id="rId39"/>
-    <p:sldId id="273" r:id="rId40"/>
+    <p:sldId id="297" r:id="rId40"/>
+    <p:sldId id="298" r:id="rId41"/>
+    <p:sldId id="302" r:id="rId42"/>
+    <p:sldId id="299" r:id="rId43"/>
+    <p:sldId id="301" r:id="rId44"/>
+    <p:sldId id="300" r:id="rId45"/>
+    <p:sldId id="273" r:id="rId46"/>
   </p:sldIdLst>
   <p:sldSz cx="12192000" cy="6858000"/>
   <p:notesSz cx="6858000" cy="9144000"/>
@@ -5303,7 +5309,7 @@
             <a:fld id="{B61BEF0D-F0BB-DE4B-95CE-6DB70DBA9567}" type="datetimeFigureOut">
               <a:rPr lang="en-US" smtClean="0"/>
               <a:pPr/>
-              <a:t>25/07/2018</a:t>
+              <a:t>28/07/2018</a:t>
             </a:fld>
             <a:endParaRPr lang="en-US" dirty="0"/>
           </a:p>
@@ -5572,7 +5578,7 @@
             <a:fld id="{B61BEF0D-F0BB-DE4B-95CE-6DB70DBA9567}" type="datetimeFigureOut">
               <a:rPr lang="en-US" smtClean="0"/>
               <a:pPr/>
-              <a:t>25/07/2018</a:t>
+              <a:t>28/07/2018</a:t>
             </a:fld>
             <a:endParaRPr lang="en-US" dirty="0"/>
           </a:p>
@@ -5770,7 +5776,7 @@
             <a:fld id="{B61BEF0D-F0BB-DE4B-95CE-6DB70DBA9567}" type="datetimeFigureOut">
               <a:rPr lang="en-US" smtClean="0"/>
               <a:pPr/>
-              <a:t>25/07/2018</a:t>
+              <a:t>28/07/2018</a:t>
             </a:fld>
             <a:endParaRPr lang="en-US" dirty="0"/>
           </a:p>
@@ -6035,7 +6041,7 @@
             <a:fld id="{B61BEF0D-F0BB-DE4B-95CE-6DB70DBA9567}" type="datetimeFigureOut">
               <a:rPr lang="en-US" smtClean="0"/>
               <a:pPr/>
-              <a:t>25/07/2018</a:t>
+              <a:t>28/07/2018</a:t>
             </a:fld>
             <a:endParaRPr lang="en-US" dirty="0"/>
           </a:p>
@@ -6471,7 +6477,7 @@
             <a:fld id="{B61BEF0D-F0BB-DE4B-95CE-6DB70DBA9567}" type="datetimeFigureOut">
               <a:rPr lang="en-US" smtClean="0"/>
               <a:pPr/>
-              <a:t>25/07/2018</a:t>
+              <a:t>28/07/2018</a:t>
             </a:fld>
             <a:endParaRPr lang="en-US" dirty="0"/>
           </a:p>
@@ -7019,7 +7025,7 @@
             <a:fld id="{B61BEF0D-F0BB-DE4B-95CE-6DB70DBA9567}" type="datetimeFigureOut">
               <a:rPr lang="en-US" smtClean="0"/>
               <a:pPr/>
-              <a:t>25/07/2018</a:t>
+              <a:t>28/07/2018</a:t>
             </a:fld>
             <a:endParaRPr lang="en-US" dirty="0"/>
           </a:p>
@@ -7741,7 +7747,7 @@
             <a:fld id="{B61BEF0D-F0BB-DE4B-95CE-6DB70DBA9567}" type="datetimeFigureOut">
               <a:rPr lang="en-US" smtClean="0"/>
               <a:pPr/>
-              <a:t>25/07/2018</a:t>
+              <a:t>28/07/2018</a:t>
             </a:fld>
             <a:endParaRPr lang="en-US" dirty="0"/>
           </a:p>
@@ -7913,7 +7919,7 @@
             <a:fld id="{B61BEF0D-F0BB-DE4B-95CE-6DB70DBA9567}" type="datetimeFigureOut">
               <a:rPr lang="en-US" smtClean="0"/>
               <a:pPr/>
-              <a:t>25/07/2018</a:t>
+              <a:t>28/07/2018</a:t>
             </a:fld>
             <a:endParaRPr lang="en-US" dirty="0"/>
           </a:p>
@@ -8095,7 +8101,7 @@
             <a:fld id="{B61BEF0D-F0BB-DE4B-95CE-6DB70DBA9567}" type="datetimeFigureOut">
               <a:rPr lang="en-US" smtClean="0"/>
               <a:pPr/>
-              <a:t>25/07/2018</a:t>
+              <a:t>28/07/2018</a:t>
             </a:fld>
             <a:endParaRPr lang="en-US" dirty="0"/>
           </a:p>
@@ -8267,7 +8273,7 @@
             <a:fld id="{B61BEF0D-F0BB-DE4B-95CE-6DB70DBA9567}" type="datetimeFigureOut">
               <a:rPr lang="en-US" smtClean="0"/>
               <a:pPr/>
-              <a:t>25/07/2018</a:t>
+              <a:t>28/07/2018</a:t>
             </a:fld>
             <a:endParaRPr lang="en-US" dirty="0"/>
           </a:p>
@@ -8519,7 +8525,7 @@
             <a:fld id="{B61BEF0D-F0BB-DE4B-95CE-6DB70DBA9567}" type="datetimeFigureOut">
               <a:rPr lang="en-US" smtClean="0"/>
               <a:pPr/>
-              <a:t>25/07/2018</a:t>
+              <a:t>28/07/2018</a:t>
             </a:fld>
             <a:endParaRPr lang="en-US" dirty="0"/>
           </a:p>
@@ -8753,7 +8759,7 @@
             <a:fld id="{B61BEF0D-F0BB-DE4B-95CE-6DB70DBA9567}" type="datetimeFigureOut">
               <a:rPr lang="en-US" smtClean="0"/>
               <a:pPr/>
-              <a:t>25/07/2018</a:t>
+              <a:t>28/07/2018</a:t>
             </a:fld>
             <a:endParaRPr lang="en-US" dirty="0"/>
           </a:p>
@@ -9136,7 +9142,7 @@
             <a:fld id="{B61BEF0D-F0BB-DE4B-95CE-6DB70DBA9567}" type="datetimeFigureOut">
               <a:rPr lang="en-US" smtClean="0"/>
               <a:pPr/>
-              <a:t>25/07/2018</a:t>
+              <a:t>28/07/2018</a:t>
             </a:fld>
             <a:endParaRPr lang="en-US" dirty="0"/>
           </a:p>
@@ -9256,7 +9262,7 @@
             <a:fld id="{B61BEF0D-F0BB-DE4B-95CE-6DB70DBA9567}" type="datetimeFigureOut">
               <a:rPr lang="en-US" smtClean="0"/>
               <a:pPr/>
-              <a:t>25/07/2018</a:t>
+              <a:t>28/07/2018</a:t>
             </a:fld>
             <a:endParaRPr lang="en-US" dirty="0"/>
           </a:p>
@@ -9353,7 +9359,7 @@
             <a:fld id="{B61BEF0D-F0BB-DE4B-95CE-6DB70DBA9567}" type="datetimeFigureOut">
               <a:rPr lang="en-US" smtClean="0"/>
               <a:pPr/>
-              <a:t>25/07/2018</a:t>
+              <a:t>28/07/2018</a:t>
             </a:fld>
             <a:endParaRPr lang="en-US" dirty="0"/>
           </a:p>
@@ -9604,7 +9610,7 @@
             <a:fld id="{B61BEF0D-F0BB-DE4B-95CE-6DB70DBA9567}" type="datetimeFigureOut">
               <a:rPr lang="en-US" smtClean="0"/>
               <a:pPr/>
-              <a:t>25/07/2018</a:t>
+              <a:t>28/07/2018</a:t>
             </a:fld>
             <a:endParaRPr lang="en-US" dirty="0"/>
           </a:p>
@@ -9886,7 +9892,7 @@
             <a:fld id="{B61BEF0D-F0BB-DE4B-95CE-6DB70DBA9567}" type="datetimeFigureOut">
               <a:rPr lang="en-US" smtClean="0"/>
               <a:pPr/>
-              <a:t>25/07/2018</a:t>
+              <a:t>28/07/2018</a:t>
             </a:fld>
             <a:endParaRPr lang="en-US" dirty="0"/>
           </a:p>
@@ -12965,7 +12971,7 @@
             <a:fld id="{B61BEF0D-F0BB-DE4B-95CE-6DB70DBA9567}" type="datetimeFigureOut">
               <a:rPr lang="en-US" smtClean="0"/>
               <a:pPr/>
-              <a:t>25/07/2018</a:t>
+              <a:t>28/07/2018</a:t>
             </a:fld>
             <a:endParaRPr lang="en-US" dirty="0"/>
           </a:p>
@@ -22832,7 +22838,7 @@
         </p:blipFill>
         <p:spPr>
           <a:xfrm>
-            <a:off x="1389032" y="1913715"/>
+            <a:off x="1265222" y="1913715"/>
             <a:ext cx="7438095" cy="4523809"/>
           </a:xfrm>
           <a:prstGeom prst="rect">
@@ -22840,6 +22846,41 @@
           </a:prstGeom>
         </p:spPr>
       </p:pic>
+      <p:sp>
+        <p:nvSpPr>
+          <p:cNvPr id="3" name="TextBox 2">
+            <a:extLst>
+              <a:ext uri="{FF2B5EF4-FFF2-40B4-BE49-F238E27FC236}">
+                <a16:creationId xmlns:a16="http://schemas.microsoft.com/office/drawing/2014/main" id="{534DCD82-D2B1-4CAE-A308-DD5B7B85C094}"/>
+              </a:ext>
+            </a:extLst>
+          </p:cNvPr>
+          <p:cNvSpPr txBox="1"/>
+          <p:nvPr/>
+        </p:nvSpPr>
+        <p:spPr>
+          <a:xfrm>
+            <a:off x="9058940" y="2700670"/>
+            <a:ext cx="2775097" cy="1569660"/>
+          </a:xfrm>
+          <a:prstGeom prst="rect">
+            <a:avLst/>
+          </a:prstGeom>
+          <a:noFill/>
+        </p:spPr>
+        <p:txBody>
+          <a:bodyPr wrap="square" rtlCol="0">
+            <a:spAutoFit/>
+          </a:bodyPr>
+          <a:lstStyle/>
+          <a:p>
+            <a:r>
+              <a:rPr lang="en-US" sz="3200" dirty="0"/>
+              <a:t>Fix the code and push to clear the issue</a:t>
+            </a:r>
+          </a:p>
+        </p:txBody>
+      </p:sp>
     </p:spTree>
     <p:extLst>
       <p:ext uri="{BB962C8B-B14F-4D97-AF65-F5344CB8AC3E}">
@@ -22903,6 +22944,51 @@
                       </p:childTnLst>
                     </p:cTn>
                   </p:par>
+                  <p:par>
+                    <p:cTn id="7" fill="hold">
+                      <p:stCondLst>
+                        <p:cond delay="indefinite"/>
+                      </p:stCondLst>
+                      <p:childTnLst>
+                        <p:par>
+                          <p:cTn id="8" fill="hold">
+                            <p:stCondLst>
+                              <p:cond delay="0"/>
+                            </p:stCondLst>
+                            <p:childTnLst>
+                              <p:par>
+                                <p:cTn id="9" presetID="1" presetClass="entr" presetSubtype="0" fill="hold" grpId="0" nodeType="clickEffect">
+                                  <p:stCondLst>
+                                    <p:cond delay="0"/>
+                                  </p:stCondLst>
+                                  <p:childTnLst>
+                                    <p:set>
+                                      <p:cBhvr>
+                                        <p:cTn id="10" dur="1" fill="hold">
+                                          <p:stCondLst>
+                                            <p:cond delay="0"/>
+                                          </p:stCondLst>
+                                        </p:cTn>
+                                        <p:tgtEl>
+                                          <p:spTgt spid="3"/>
+                                        </p:tgtEl>
+                                        <p:attrNameLst>
+                                          <p:attrName>style.visibility</p:attrName>
+                                        </p:attrNameLst>
+                                      </p:cBhvr>
+                                      <p:to>
+                                        <p:strVal val="visible"/>
+                                      </p:to>
+                                    </p:set>
+                                  </p:childTnLst>
+                                </p:cTn>
+                              </p:par>
+                            </p:childTnLst>
+                          </p:cTn>
+                        </p:par>
+                      </p:childTnLst>
+                    </p:cTn>
+                  </p:par>
                 </p:childTnLst>
               </p:cTn>
               <p:prevCondLst>
@@ -22924,6 +23010,9 @@
         </p:cTn>
       </p:par>
     </p:tnLst>
+    <p:bldLst>
+      <p:bldP spid="3" grpId="0"/>
+    </p:bldLst>
   </p:timing>
 </p:sld>
 </file>
@@ -22950,7 +23039,7 @@
           <p:cNvPr id="2" name="Title 1">
             <a:extLst>
               <a:ext uri="{FF2B5EF4-FFF2-40B4-BE49-F238E27FC236}">
-                <a16:creationId xmlns:a16="http://schemas.microsoft.com/office/drawing/2014/main" id="{DEDF95E6-31A7-4A4D-B81B-67A931C484D1}"/>
+                <a16:creationId xmlns:a16="http://schemas.microsoft.com/office/drawing/2014/main" id="{861F233C-B236-4522-8293-96B783558169}"/>
               </a:ext>
             </a:extLst>
           </p:cNvPr>
@@ -22968,7 +23057,7 @@
           <a:p>
             <a:r>
               <a:rPr lang="en-US" dirty="0"/>
-              <a:t>Links and credits</a:t>
+              <a:t>Recap and clean-up</a:t>
             </a:r>
           </a:p>
         </p:txBody>
@@ -22978,7 +23067,7 @@
           <p:cNvPr id="3" name="Content Placeholder 2">
             <a:extLst>
               <a:ext uri="{FF2B5EF4-FFF2-40B4-BE49-F238E27FC236}">
-                <a16:creationId xmlns:a16="http://schemas.microsoft.com/office/drawing/2014/main" id="{854FB79B-E0E0-4106-9101-482D7D707EAC}"/>
+                <a16:creationId xmlns:a16="http://schemas.microsoft.com/office/drawing/2014/main" id="{745F733C-B22D-40C0-9DCF-A0B4081FE954}"/>
               </a:ext>
             </a:extLst>
           </p:cNvPr>
@@ -22991,82 +23080,65 @@
         </p:nvSpPr>
         <p:spPr/>
         <p:txBody>
-          <a:bodyPr/>
+          <a:bodyPr>
+            <a:normAutofit fontScale="92500" lnSpcReduction="10000"/>
+          </a:bodyPr>
           <a:lstStyle/>
           <a:p>
             <a:r>
               <a:rPr lang="en-US" dirty="0"/>
-              <a:t>GitHub: </a:t>
-            </a:r>
-            <a:r>
-              <a:rPr lang="en-US" dirty="0">
-                <a:hlinkClick r:id="rId2"/>
-              </a:rPr>
-              <a:t>https://github.com</a:t>
-            </a:r>
+              <a:t>Created a dotnet core + react application using CLI scaffolding</a:t>
+            </a:r>
+          </a:p>
+          <a:p>
             <a:r>
               <a:rPr lang="en-US" dirty="0"/>
-              <a:t> </a:t>
-            </a:r>
-          </a:p>
-          <a:p>
+              <a:t>Added it to GitHub</a:t>
+            </a:r>
+          </a:p>
+          <a:p>
+            <a:r>
+              <a:rPr lang="en-US" dirty="0"/>
+              <a:t>Added an automated build on </a:t>
+            </a:r>
             <a:r>
               <a:rPr lang="en-US" dirty="0" err="1"/>
               <a:t>Appveyor</a:t>
             </a:r>
+            <a:endParaRPr lang="en-US" dirty="0"/>
+          </a:p>
+          <a:p>
             <a:r>
               <a:rPr lang="en-US" dirty="0"/>
-              <a:t>: </a:t>
-            </a:r>
-            <a:r>
-              <a:rPr lang="en-US" dirty="0">
-                <a:hlinkClick r:id="rId3"/>
-              </a:rPr>
-              <a:t>https://appveyor.com</a:t>
-            </a:r>
+              <a:t>Added code analysis and coverage</a:t>
+            </a:r>
+          </a:p>
+          <a:p>
             <a:r>
               <a:rPr lang="en-US" dirty="0"/>
-              <a:t> </a:t>
-            </a:r>
-          </a:p>
-          <a:p>
+              <a:t>Publish code stats to </a:t>
+            </a:r>
             <a:r>
               <a:rPr lang="en-US" dirty="0" err="1"/>
-              <a:t>Codecov</a:t>
+              <a:t>SonarCloud</a:t>
             </a:r>
             <a:r>
               <a:rPr lang="en-US" dirty="0"/>
-              <a:t>: </a:t>
-            </a:r>
-            <a:r>
-              <a:rPr lang="en-US" dirty="0">
-                <a:hlinkClick r:id="rId4"/>
-              </a:rPr>
-              <a:t>https://codecov.io</a:t>
-            </a:r>
+              <a:t> and </a:t>
+            </a:r>
+            <a:r>
+              <a:rPr lang="en-US" dirty="0" err="1"/>
+              <a:t>CodeCov</a:t>
+            </a:r>
+            <a:endParaRPr lang="en-US" dirty="0"/>
+          </a:p>
+          <a:p>
+            <a:endParaRPr lang="en-US" dirty="0"/>
+          </a:p>
+          <a:p>
             <a:r>
               <a:rPr lang="en-US" dirty="0"/>
-              <a:t> </a:t>
-            </a:r>
-          </a:p>
-          <a:p>
-            <a:r>
-              <a:rPr lang="en-US" dirty="0" err="1"/>
-              <a:t>Opencover</a:t>
-            </a:r>
-            <a:r>
-              <a:rPr lang="en-US" dirty="0"/>
-              <a:t>: </a:t>
-            </a:r>
-            <a:r>
-              <a:rPr lang="en-US" dirty="0">
-                <a:hlinkClick r:id="rId5"/>
-              </a:rPr>
-              <a:t>https://github.com/opencover/opencover/wiki/Usage</a:t>
-            </a:r>
-            <a:r>
-              <a:rPr lang="en-US" dirty="0"/>
-              <a:t> </a:t>
+              <a:t>Now it’s time to deploy to Azure!</a:t>
             </a:r>
           </a:p>
         </p:txBody>
@@ -23074,7 +23146,7 @@
     </p:spTree>
     <p:extLst>
       <p:ext uri="{BB962C8B-B14F-4D97-AF65-F5344CB8AC3E}">
-        <p14:creationId xmlns:p14="http://schemas.microsoft.com/office/powerpoint/2010/main" val="3021987684"/>
+        <p14:creationId xmlns:p14="http://schemas.microsoft.com/office/powerpoint/2010/main" val="3587398463"/>
       </p:ext>
     </p:extLst>
   </p:cSld>
@@ -23187,7 +23259,7 @@
 </p:sld>
 </file>
 
-<file path=ppt/slides/slide5.xml><?xml version="1.0" encoding="utf-8"?>
+<file path=ppt/slides/slide40.xml><?xml version="1.0" encoding="utf-8"?>
 <p:sld xmlns:a="http://schemas.openxmlformats.org/drawingml/2006/main" xmlns:r="http://schemas.openxmlformats.org/officeDocument/2006/relationships" xmlns:p="http://schemas.openxmlformats.org/presentationml/2006/main">
   <p:cSld>
     <p:spTree>
@@ -23209,7 +23281,7 @@
           <p:cNvPr id="2" name="Title 1">
             <a:extLst>
               <a:ext uri="{FF2B5EF4-FFF2-40B4-BE49-F238E27FC236}">
-                <a16:creationId xmlns:a16="http://schemas.microsoft.com/office/drawing/2014/main" id="{6F66E270-0382-448C-9CF8-03F6AA1FBB2F}"/>
+                <a16:creationId xmlns:a16="http://schemas.microsoft.com/office/drawing/2014/main" id="{646340FD-E71D-4C75-B50C-DF285BD505F4}"/>
               </a:ext>
             </a:extLst>
           </p:cNvPr>
@@ -23227,7 +23299,7 @@
           <a:p>
             <a:r>
               <a:rPr lang="en-US" dirty="0"/>
-              <a:t>Tools</a:t>
+              <a:t>First let’s get secure</a:t>
             </a:r>
           </a:p>
         </p:txBody>
@@ -23237,7 +23309,7 @@
           <p:cNvPr id="3" name="Content Placeholder 2">
             <a:extLst>
               <a:ext uri="{FF2B5EF4-FFF2-40B4-BE49-F238E27FC236}">
-                <a16:creationId xmlns:a16="http://schemas.microsoft.com/office/drawing/2014/main" id="{7C757845-1A6C-47F3-8980-554692B6DF1B}"/>
+                <a16:creationId xmlns:a16="http://schemas.microsoft.com/office/drawing/2014/main" id="{2D67CBB9-8893-4268-8C9D-E963A7059BE1}"/>
               </a:ext>
             </a:extLst>
           </p:cNvPr>
@@ -23250,67 +23322,966 @@
         </p:nvSpPr>
         <p:spPr/>
         <p:txBody>
-          <a:bodyPr>
-            <a:normAutofit/>
+          <a:bodyPr/>
+          <a:lstStyle/>
+          <a:p>
+            <a:r>
+              <a:rPr lang="en-US" dirty="0"/>
+              <a:t>If you don’t have it, download OpenSSL binaries and extract to a folder:</a:t>
+            </a:r>
+          </a:p>
+          <a:p>
+            <a:pPr marL="0" indent="0">
+              <a:buNone/>
+            </a:pPr>
+            <a:r>
+              <a:rPr lang="en-US" dirty="0">
+                <a:hlinkClick r:id="rId2"/>
+              </a:rPr>
+              <a:t>http://gnuwin32.sourceforge.net/packages/openssl.htm</a:t>
+            </a:r>
+            <a:endParaRPr lang="en-US" dirty="0"/>
+          </a:p>
+          <a:p>
+            <a:r>
+              <a:rPr lang="en-US" dirty="0"/>
+              <a:t>Open a PowerShell as Administrator and run those commands</a:t>
+            </a:r>
+          </a:p>
+        </p:txBody>
+      </p:sp>
+      <p:sp>
+        <p:nvSpPr>
+          <p:cNvPr id="4" name="Content Placeholder 2">
+            <a:extLst>
+              <a:ext uri="{FF2B5EF4-FFF2-40B4-BE49-F238E27FC236}">
+                <a16:creationId xmlns:a16="http://schemas.microsoft.com/office/drawing/2014/main" id="{E0B4848F-3576-420E-AFEC-AAE4A5938ED3}"/>
+              </a:ext>
+            </a:extLst>
+          </p:cNvPr>
+          <p:cNvSpPr txBox="1">
+            <a:spLocks/>
+          </p:cNvSpPr>
+          <p:nvPr/>
+        </p:nvSpPr>
+        <p:spPr>
+          <a:xfrm>
+            <a:off x="1141413" y="1988288"/>
+            <a:ext cx="9905998" cy="4251195"/>
+          </a:xfrm>
+          <a:prstGeom prst="rect">
+            <a:avLst/>
+          </a:prstGeom>
+          <a:solidFill>
+            <a:schemeClr val="bg1"/>
+          </a:solidFill>
+        </p:spPr>
+        <p:txBody>
+          <a:bodyPr vert="horz" lIns="91440" tIns="45720" rIns="91440" bIns="45720" rtlCol="0">
+            <a:normAutofit fontScale="92500" lnSpcReduction="10000"/>
           </a:bodyPr>
+          <a:lstStyle>
+            <a:lvl1pPr marL="228600" indent="-228600" algn="l" defTabSz="914400" rtl="0" eaLnBrk="1" latinLnBrk="0" hangingPunct="1">
+              <a:lnSpc>
+                <a:spcPct val="120000"/>
+              </a:lnSpc>
+              <a:spcBef>
+                <a:spcPts val="1000"/>
+              </a:spcBef>
+              <a:buSzPct val="125000"/>
+              <a:buFont typeface="Arial" panose="020B0604020202020204" pitchFamily="34" charset="0"/>
+              <a:buChar char="•"/>
+              <a:defRPr sz="2400" kern="1200">
+                <a:solidFill>
+                  <a:schemeClr val="tx1"/>
+                </a:solidFill>
+                <a:latin typeface="+mn-lt"/>
+                <a:ea typeface="+mn-ea"/>
+                <a:cs typeface="+mn-cs"/>
+              </a:defRPr>
+            </a:lvl1pPr>
+            <a:lvl2pPr marL="685800" indent="-228600" algn="l" defTabSz="914400" rtl="0" eaLnBrk="1" latinLnBrk="0" hangingPunct="1">
+              <a:lnSpc>
+                <a:spcPct val="120000"/>
+              </a:lnSpc>
+              <a:spcBef>
+                <a:spcPts val="500"/>
+              </a:spcBef>
+              <a:buSzPct val="125000"/>
+              <a:buFont typeface="Arial" panose="020B0604020202020204" pitchFamily="34" charset="0"/>
+              <a:buChar char="•"/>
+              <a:defRPr sz="2000" kern="1200">
+                <a:solidFill>
+                  <a:schemeClr val="tx1"/>
+                </a:solidFill>
+                <a:latin typeface="+mn-lt"/>
+                <a:ea typeface="+mn-ea"/>
+                <a:cs typeface="+mn-cs"/>
+              </a:defRPr>
+            </a:lvl2pPr>
+            <a:lvl3pPr marL="1143000" indent="-228600" algn="l" defTabSz="914400" rtl="0" eaLnBrk="1" latinLnBrk="0" hangingPunct="1">
+              <a:lnSpc>
+                <a:spcPct val="120000"/>
+              </a:lnSpc>
+              <a:spcBef>
+                <a:spcPts val="500"/>
+              </a:spcBef>
+              <a:buSzPct val="125000"/>
+              <a:buFont typeface="Arial" panose="020B0604020202020204" pitchFamily="34" charset="0"/>
+              <a:buChar char="•"/>
+              <a:defRPr sz="1800" kern="1200">
+                <a:solidFill>
+                  <a:schemeClr val="tx1"/>
+                </a:solidFill>
+                <a:latin typeface="+mn-lt"/>
+                <a:ea typeface="+mn-ea"/>
+                <a:cs typeface="+mn-cs"/>
+              </a:defRPr>
+            </a:lvl3pPr>
+            <a:lvl4pPr marL="1600200" indent="-228600" algn="l" defTabSz="914400" rtl="0" eaLnBrk="1" latinLnBrk="0" hangingPunct="1">
+              <a:lnSpc>
+                <a:spcPct val="120000"/>
+              </a:lnSpc>
+              <a:spcBef>
+                <a:spcPts val="500"/>
+              </a:spcBef>
+              <a:buSzPct val="125000"/>
+              <a:buFont typeface="Arial" panose="020B0604020202020204" pitchFamily="34" charset="0"/>
+              <a:buChar char="•"/>
+              <a:defRPr sz="1600" kern="1200">
+                <a:solidFill>
+                  <a:schemeClr val="tx1"/>
+                </a:solidFill>
+                <a:latin typeface="+mn-lt"/>
+                <a:ea typeface="+mn-ea"/>
+                <a:cs typeface="+mn-cs"/>
+              </a:defRPr>
+            </a:lvl4pPr>
+            <a:lvl5pPr marL="2057400" indent="-228600" algn="l" defTabSz="914400" rtl="0" eaLnBrk="1" latinLnBrk="0" hangingPunct="1">
+              <a:lnSpc>
+                <a:spcPct val="120000"/>
+              </a:lnSpc>
+              <a:spcBef>
+                <a:spcPts val="500"/>
+              </a:spcBef>
+              <a:buSzPct val="125000"/>
+              <a:buFont typeface="Arial" panose="020B0604020202020204" pitchFamily="34" charset="0"/>
+              <a:buChar char="•"/>
+              <a:defRPr sz="1600" kern="1200">
+                <a:solidFill>
+                  <a:schemeClr val="tx1"/>
+                </a:solidFill>
+                <a:latin typeface="+mn-lt"/>
+                <a:ea typeface="+mn-ea"/>
+                <a:cs typeface="+mn-cs"/>
+              </a:defRPr>
+            </a:lvl5pPr>
+            <a:lvl6pPr marL="2514600" indent="-228600" algn="l" defTabSz="914400" rtl="0" eaLnBrk="1" latinLnBrk="0" hangingPunct="1">
+              <a:lnSpc>
+                <a:spcPct val="120000"/>
+              </a:lnSpc>
+              <a:spcBef>
+                <a:spcPts val="500"/>
+              </a:spcBef>
+              <a:buSzPct val="125000"/>
+              <a:buFont typeface="Arial" panose="020B0604020202020204" pitchFamily="34" charset="0"/>
+              <a:buChar char="•"/>
+              <a:defRPr sz="1400" kern="1200">
+                <a:solidFill>
+                  <a:schemeClr val="tx1"/>
+                </a:solidFill>
+                <a:latin typeface="+mn-lt"/>
+                <a:ea typeface="+mn-ea"/>
+                <a:cs typeface="+mn-cs"/>
+              </a:defRPr>
+            </a:lvl6pPr>
+            <a:lvl7pPr marL="2971800" indent="-228600" algn="l" defTabSz="914400" rtl="0" eaLnBrk="1" latinLnBrk="0" hangingPunct="1">
+              <a:lnSpc>
+                <a:spcPct val="120000"/>
+              </a:lnSpc>
+              <a:spcBef>
+                <a:spcPts val="500"/>
+              </a:spcBef>
+              <a:buSzPct val="125000"/>
+              <a:buFont typeface="Arial" panose="020B0604020202020204" pitchFamily="34" charset="0"/>
+              <a:buChar char="•"/>
+              <a:defRPr sz="1400" kern="1200">
+                <a:solidFill>
+                  <a:schemeClr val="tx1"/>
+                </a:solidFill>
+                <a:latin typeface="+mn-lt"/>
+                <a:ea typeface="+mn-ea"/>
+                <a:cs typeface="+mn-cs"/>
+              </a:defRPr>
+            </a:lvl7pPr>
+            <a:lvl8pPr marL="3429000" indent="-228600" algn="l" defTabSz="914400" rtl="0" eaLnBrk="1" latinLnBrk="0" hangingPunct="1">
+              <a:lnSpc>
+                <a:spcPct val="120000"/>
+              </a:lnSpc>
+              <a:spcBef>
+                <a:spcPts val="500"/>
+              </a:spcBef>
+              <a:buSzPct val="125000"/>
+              <a:buFont typeface="Arial" panose="020B0604020202020204" pitchFamily="34" charset="0"/>
+              <a:buChar char="•"/>
+              <a:defRPr sz="1400" kern="1200">
+                <a:solidFill>
+                  <a:schemeClr val="tx1"/>
+                </a:solidFill>
+                <a:latin typeface="+mn-lt"/>
+                <a:ea typeface="+mn-ea"/>
+                <a:cs typeface="+mn-cs"/>
+              </a:defRPr>
+            </a:lvl8pPr>
+            <a:lvl9pPr marL="3886200" indent="-228600" algn="l" defTabSz="914400" rtl="0" eaLnBrk="1" latinLnBrk="0" hangingPunct="1">
+              <a:lnSpc>
+                <a:spcPct val="120000"/>
+              </a:lnSpc>
+              <a:spcBef>
+                <a:spcPts val="500"/>
+              </a:spcBef>
+              <a:buSzPct val="125000"/>
+              <a:buFont typeface="Arial" panose="020B0604020202020204" pitchFamily="34" charset="0"/>
+              <a:buChar char="•"/>
+              <a:defRPr sz="1400" kern="1200">
+                <a:solidFill>
+                  <a:schemeClr val="tx1"/>
+                </a:solidFill>
+                <a:latin typeface="+mn-lt"/>
+                <a:ea typeface="+mn-ea"/>
+                <a:cs typeface="+mn-cs"/>
+              </a:defRPr>
+            </a:lvl9pPr>
+          </a:lstStyle>
+          <a:p>
+            <a:pPr marL="0" indent="0">
+              <a:buNone/>
+            </a:pPr>
+            <a:r>
+              <a:rPr lang="en-US" sz="2000" dirty="0">
+                <a:solidFill>
+                  <a:srgbClr val="92D050"/>
+                </a:solidFill>
+              </a:rPr>
+              <a:t>$cert = New-</a:t>
+            </a:r>
+            <a:r>
+              <a:rPr lang="en-US" sz="2000" dirty="0" err="1">
+                <a:solidFill>
+                  <a:srgbClr val="92D050"/>
+                </a:solidFill>
+              </a:rPr>
+              <a:t>SelfSignedCertificate</a:t>
+            </a:r>
+            <a:r>
+              <a:rPr lang="en-US" sz="2000" dirty="0">
+                <a:solidFill>
+                  <a:srgbClr val="92D050"/>
+                </a:solidFill>
+              </a:rPr>
+              <a:t> -</a:t>
+            </a:r>
+            <a:r>
+              <a:rPr lang="en-US" sz="2000" dirty="0" err="1">
+                <a:solidFill>
+                  <a:srgbClr val="92D050"/>
+                </a:solidFill>
+              </a:rPr>
+              <a:t>DnsName</a:t>
+            </a:r>
+            <a:r>
+              <a:rPr lang="en-US" sz="2000" dirty="0">
+                <a:solidFill>
+                  <a:srgbClr val="92D050"/>
+                </a:solidFill>
+              </a:rPr>
+              <a:t> management.azure.cloudapp.net -</a:t>
+            </a:r>
+            <a:r>
+              <a:rPr lang="en-US" sz="2000" dirty="0" err="1">
+                <a:solidFill>
+                  <a:srgbClr val="92D050"/>
+                </a:solidFill>
+              </a:rPr>
+              <a:t>CertStoreLocation</a:t>
+            </a:r>
+            <a:r>
+              <a:rPr lang="en-US" sz="2000" dirty="0">
+                <a:solidFill>
+                  <a:srgbClr val="92D050"/>
+                </a:solidFill>
+              </a:rPr>
+              <a:t> "cert:\</a:t>
+            </a:r>
+            <a:r>
+              <a:rPr lang="en-US" sz="2000" dirty="0" err="1">
+                <a:solidFill>
+                  <a:srgbClr val="92D050"/>
+                </a:solidFill>
+              </a:rPr>
+              <a:t>LocalMachine</a:t>
+            </a:r>
+            <a:r>
+              <a:rPr lang="en-US" sz="2000" dirty="0">
+                <a:solidFill>
+                  <a:srgbClr val="92D050"/>
+                </a:solidFill>
+              </a:rPr>
+              <a:t>\My" -</a:t>
+            </a:r>
+            <a:r>
+              <a:rPr lang="en-US" sz="2000" dirty="0" err="1">
+                <a:solidFill>
+                  <a:srgbClr val="92D050"/>
+                </a:solidFill>
+              </a:rPr>
+              <a:t>KeyLength</a:t>
+            </a:r>
+            <a:r>
+              <a:rPr lang="en-US" sz="2000" dirty="0">
+                <a:solidFill>
+                  <a:srgbClr val="92D050"/>
+                </a:solidFill>
+              </a:rPr>
+              <a:t> 2048 -</a:t>
+            </a:r>
+            <a:r>
+              <a:rPr lang="en-US" sz="2000" dirty="0" err="1">
+                <a:solidFill>
+                  <a:srgbClr val="92D050"/>
+                </a:solidFill>
+              </a:rPr>
+              <a:t>KeySpec</a:t>
+            </a:r>
+            <a:r>
+              <a:rPr lang="en-US" sz="2000" dirty="0">
+                <a:solidFill>
+                  <a:srgbClr val="92D050"/>
+                </a:solidFill>
+              </a:rPr>
+              <a:t> "</a:t>
+            </a:r>
+            <a:r>
+              <a:rPr lang="en-US" sz="2000" dirty="0" err="1">
+                <a:solidFill>
+                  <a:srgbClr val="92D050"/>
+                </a:solidFill>
+              </a:rPr>
+              <a:t>KeyExchange</a:t>
+            </a:r>
+            <a:r>
+              <a:rPr lang="en-US" sz="2000" dirty="0">
+                <a:solidFill>
+                  <a:srgbClr val="92D050"/>
+                </a:solidFill>
+              </a:rPr>
+              <a:t>“</a:t>
+            </a:r>
+          </a:p>
+          <a:p>
+            <a:pPr marL="0" indent="0">
+              <a:buNone/>
+            </a:pPr>
+            <a:r>
+              <a:rPr lang="en-US" sz="2000" dirty="0">
+                <a:solidFill>
+                  <a:srgbClr val="92D050"/>
+                </a:solidFill>
+              </a:rPr>
+              <a:t>$password = </a:t>
+            </a:r>
+            <a:r>
+              <a:rPr lang="en-US" sz="2000" dirty="0" err="1">
+                <a:solidFill>
+                  <a:srgbClr val="92D050"/>
+                </a:solidFill>
+              </a:rPr>
+              <a:t>ConvertTo-SecureString</a:t>
+            </a:r>
+            <a:r>
+              <a:rPr lang="en-US" sz="2000" dirty="0">
+                <a:solidFill>
+                  <a:srgbClr val="92D050"/>
+                </a:solidFill>
+              </a:rPr>
+              <a:t> -String "Password12" -Force -</a:t>
+            </a:r>
+            <a:r>
+              <a:rPr lang="en-US" sz="2000" dirty="0" err="1">
+                <a:solidFill>
+                  <a:srgbClr val="92D050"/>
+                </a:solidFill>
+              </a:rPr>
+              <a:t>AsPlainText</a:t>
+            </a:r>
+            <a:endParaRPr lang="en-US" sz="2000" dirty="0">
+              <a:solidFill>
+                <a:srgbClr val="92D050"/>
+              </a:solidFill>
+            </a:endParaRPr>
+          </a:p>
+          <a:p>
+            <a:pPr marL="0" indent="0">
+              <a:buNone/>
+            </a:pPr>
+            <a:r>
+              <a:rPr lang="en-US" sz="2000" dirty="0">
+                <a:solidFill>
+                  <a:srgbClr val="92D050"/>
+                </a:solidFill>
+              </a:rPr>
+              <a:t>Export-</a:t>
+            </a:r>
+            <a:r>
+              <a:rPr lang="en-US" sz="2000" dirty="0" err="1">
+                <a:solidFill>
+                  <a:srgbClr val="92D050"/>
+                </a:solidFill>
+              </a:rPr>
+              <a:t>PfxCertificate</a:t>
+            </a:r>
+            <a:r>
+              <a:rPr lang="en-US" sz="2000" dirty="0">
+                <a:solidFill>
+                  <a:srgbClr val="92D050"/>
+                </a:solidFill>
+              </a:rPr>
+              <a:t> -Cert $cert -</a:t>
+            </a:r>
+            <a:r>
+              <a:rPr lang="en-US" sz="2000" dirty="0" err="1">
+                <a:solidFill>
+                  <a:srgbClr val="92D050"/>
+                </a:solidFill>
+              </a:rPr>
+              <a:t>FilePath</a:t>
+            </a:r>
+            <a:r>
+              <a:rPr lang="en-US" sz="2000" dirty="0">
+                <a:solidFill>
+                  <a:srgbClr val="92D050"/>
+                </a:solidFill>
+              </a:rPr>
+              <a:t> ".\azure-manage-</a:t>
+            </a:r>
+            <a:r>
+              <a:rPr lang="en-US" sz="2000" dirty="0" err="1">
+                <a:solidFill>
+                  <a:srgbClr val="92D050"/>
+                </a:solidFill>
+              </a:rPr>
+              <a:t>cert.pfx</a:t>
+            </a:r>
+            <a:r>
+              <a:rPr lang="en-US" sz="2000" dirty="0">
+                <a:solidFill>
+                  <a:srgbClr val="92D050"/>
+                </a:solidFill>
+              </a:rPr>
+              <a:t>" -Password $password</a:t>
+            </a:r>
+          </a:p>
+          <a:p>
+            <a:pPr marL="0" indent="0">
+              <a:buNone/>
+            </a:pPr>
+            <a:r>
+              <a:rPr lang="fr-FR" sz="2000" dirty="0">
+                <a:solidFill>
+                  <a:srgbClr val="92D050"/>
+                </a:solidFill>
+              </a:rPr>
+              <a:t>Export-</a:t>
+            </a:r>
+            <a:r>
+              <a:rPr lang="fr-FR" sz="2000" dirty="0" err="1">
+                <a:solidFill>
+                  <a:srgbClr val="92D050"/>
+                </a:solidFill>
+              </a:rPr>
+              <a:t>Certificate</a:t>
+            </a:r>
+            <a:r>
+              <a:rPr lang="fr-FR" sz="2000" dirty="0">
+                <a:solidFill>
+                  <a:srgbClr val="92D050"/>
+                </a:solidFill>
+              </a:rPr>
+              <a:t> -Type CERT -Cert $cert -</a:t>
+            </a:r>
+            <a:r>
+              <a:rPr lang="fr-FR" sz="2000" dirty="0" err="1">
+                <a:solidFill>
+                  <a:srgbClr val="92D050"/>
+                </a:solidFill>
+              </a:rPr>
+              <a:t>FilePath</a:t>
+            </a:r>
+            <a:r>
+              <a:rPr lang="fr-FR" sz="2000" dirty="0">
+                <a:solidFill>
+                  <a:srgbClr val="92D050"/>
+                </a:solidFill>
+              </a:rPr>
+              <a:t> .\azure-manage-cert.cer</a:t>
+            </a:r>
+          </a:p>
+          <a:p>
+            <a:pPr marL="0" indent="0">
+              <a:buNone/>
+            </a:pPr>
+            <a:r>
+              <a:rPr lang="en-US" sz="2000" dirty="0" err="1">
+                <a:solidFill>
+                  <a:srgbClr val="92D050"/>
+                </a:solidFill>
+              </a:rPr>
+              <a:t>openssl</a:t>
+            </a:r>
+            <a:r>
+              <a:rPr lang="en-US" sz="2000" dirty="0">
+                <a:solidFill>
+                  <a:srgbClr val="92D050"/>
+                </a:solidFill>
+              </a:rPr>
+              <a:t> pkcs12 -in azure-manage-</a:t>
+            </a:r>
+            <a:r>
+              <a:rPr lang="en-US" sz="2000" dirty="0" err="1">
+                <a:solidFill>
+                  <a:srgbClr val="92D050"/>
+                </a:solidFill>
+              </a:rPr>
+              <a:t>cert.pfx</a:t>
+            </a:r>
+            <a:r>
+              <a:rPr lang="en-US" sz="2000" dirty="0">
+                <a:solidFill>
+                  <a:srgbClr val="92D050"/>
+                </a:solidFill>
+              </a:rPr>
+              <a:t> -password pass:Password12 -nodes -out </a:t>
+            </a:r>
+            <a:r>
+              <a:rPr lang="en-US" sz="2000" dirty="0" err="1">
+                <a:solidFill>
+                  <a:srgbClr val="92D050"/>
+                </a:solidFill>
+              </a:rPr>
+              <a:t>temp.pem</a:t>
+            </a:r>
+            <a:endParaRPr lang="en-US" sz="2000" dirty="0">
+              <a:solidFill>
+                <a:srgbClr val="92D050"/>
+              </a:solidFill>
+            </a:endParaRPr>
+          </a:p>
+          <a:p>
+            <a:pPr marL="0" indent="0">
+              <a:buNone/>
+            </a:pPr>
+            <a:r>
+              <a:rPr lang="en-US" sz="2000" dirty="0" err="1">
+                <a:solidFill>
+                  <a:srgbClr val="92D050"/>
+                </a:solidFill>
+              </a:rPr>
+              <a:t>openssl</a:t>
+            </a:r>
+            <a:r>
+              <a:rPr lang="en-US" sz="2000" dirty="0">
+                <a:solidFill>
+                  <a:srgbClr val="92D050"/>
+                </a:solidFill>
+              </a:rPr>
+              <a:t> pkcs12 -export -in </a:t>
+            </a:r>
+            <a:r>
+              <a:rPr lang="en-US" sz="2000" dirty="0" err="1">
+                <a:solidFill>
+                  <a:srgbClr val="92D050"/>
+                </a:solidFill>
+              </a:rPr>
+              <a:t>temp.pem</a:t>
+            </a:r>
+            <a:r>
+              <a:rPr lang="en-US" sz="2000" dirty="0">
+                <a:solidFill>
+                  <a:srgbClr val="92D050"/>
+                </a:solidFill>
+              </a:rPr>
+              <a:t> -</a:t>
+            </a:r>
+            <a:r>
+              <a:rPr lang="en-US" sz="2000" dirty="0" err="1">
+                <a:solidFill>
+                  <a:srgbClr val="92D050"/>
+                </a:solidFill>
+              </a:rPr>
+              <a:t>passout</a:t>
+            </a:r>
+            <a:r>
+              <a:rPr lang="en-US" sz="2000" dirty="0">
+                <a:solidFill>
+                  <a:srgbClr val="92D050"/>
+                </a:solidFill>
+              </a:rPr>
+              <a:t> pass: -out azure-manage-</a:t>
+            </a:r>
+            <a:r>
+              <a:rPr lang="en-US" sz="2000" dirty="0" err="1">
+                <a:solidFill>
+                  <a:srgbClr val="92D050"/>
+                </a:solidFill>
+              </a:rPr>
+              <a:t>cert.pfx</a:t>
+            </a:r>
+            <a:endParaRPr lang="en-US" sz="2000" dirty="0">
+              <a:solidFill>
+                <a:srgbClr val="92D050"/>
+              </a:solidFill>
+            </a:endParaRPr>
+          </a:p>
+          <a:p>
+            <a:pPr marL="0" indent="0">
+              <a:buNone/>
+            </a:pPr>
+            <a:r>
+              <a:rPr lang="en-US" sz="2000" dirty="0">
+                <a:solidFill>
+                  <a:srgbClr val="92D050"/>
+                </a:solidFill>
+              </a:rPr>
+              <a:t>del </a:t>
+            </a:r>
+            <a:r>
+              <a:rPr lang="en-US" sz="2000" dirty="0" err="1">
+                <a:solidFill>
+                  <a:srgbClr val="92D050"/>
+                </a:solidFill>
+              </a:rPr>
+              <a:t>temp.pem</a:t>
+            </a:r>
+            <a:endParaRPr lang="en-US" sz="2000" dirty="0">
+              <a:solidFill>
+                <a:srgbClr val="92D050"/>
+              </a:solidFill>
+            </a:endParaRPr>
+          </a:p>
+          <a:p>
+            <a:pPr marL="0" indent="0">
+              <a:buNone/>
+            </a:pPr>
+            <a:r>
+              <a:rPr lang="en-US" sz="2000" dirty="0">
+                <a:solidFill>
+                  <a:srgbClr val="92D050"/>
+                </a:solidFill>
+              </a:rPr>
+              <a:t>[Convert]::ToBase64String((Get-Content -Path ".\azure-manage-</a:t>
+            </a:r>
+            <a:r>
+              <a:rPr lang="en-US" sz="2000" dirty="0" err="1">
+                <a:solidFill>
+                  <a:srgbClr val="92D050"/>
+                </a:solidFill>
+              </a:rPr>
+              <a:t>cert.pfx</a:t>
+            </a:r>
+            <a:r>
+              <a:rPr lang="en-US" sz="2000" dirty="0">
+                <a:solidFill>
+                  <a:srgbClr val="92D050"/>
+                </a:solidFill>
+              </a:rPr>
+              <a:t>" -Encoding Byte)) | Out-File ".\azure-manage-cert.pfx.txt"</a:t>
+            </a:r>
+          </a:p>
+        </p:txBody>
+      </p:sp>
+      <p:pic>
+        <p:nvPicPr>
+          <p:cNvPr id="6" name="Picture 5">
+            <a:extLst>
+              <a:ext uri="{FF2B5EF4-FFF2-40B4-BE49-F238E27FC236}">
+                <a16:creationId xmlns:a16="http://schemas.microsoft.com/office/drawing/2014/main" id="{6E596F59-E6D4-49FA-90F5-7E07B3C11677}"/>
+              </a:ext>
+            </a:extLst>
+          </p:cNvPr>
+          <p:cNvPicPr>
+            <a:picLocks noChangeAspect="1"/>
+          </p:cNvPicPr>
+          <p:nvPr/>
+        </p:nvPicPr>
+        <p:blipFill>
+          <a:blip r:embed="rId3"/>
+          <a:stretch>
+            <a:fillRect/>
+          </a:stretch>
+        </p:blipFill>
+        <p:spPr>
+          <a:xfrm>
+            <a:off x="173116" y="994985"/>
+            <a:ext cx="11842590" cy="4868030"/>
+          </a:xfrm>
+          <a:prstGeom prst="rect">
+            <a:avLst/>
+          </a:prstGeom>
+        </p:spPr>
+      </p:pic>
+      <p:pic>
+        <p:nvPicPr>
+          <p:cNvPr id="7" name="Picture 6">
+            <a:extLst>
+              <a:ext uri="{FF2B5EF4-FFF2-40B4-BE49-F238E27FC236}">
+                <a16:creationId xmlns:a16="http://schemas.microsoft.com/office/drawing/2014/main" id="{CD8AA059-87D5-481D-AD75-F5CDCE24734D}"/>
+              </a:ext>
+            </a:extLst>
+          </p:cNvPr>
+          <p:cNvPicPr>
+            <a:picLocks noChangeAspect="1"/>
+          </p:cNvPicPr>
+          <p:nvPr/>
+        </p:nvPicPr>
+        <p:blipFill>
+          <a:blip r:embed="rId4"/>
+          <a:stretch>
+            <a:fillRect/>
+          </a:stretch>
+        </p:blipFill>
+        <p:spPr>
+          <a:xfrm>
+            <a:off x="1954846" y="2607929"/>
+            <a:ext cx="8279129" cy="1642141"/>
+          </a:xfrm>
+          <a:prstGeom prst="rect">
+            <a:avLst/>
+          </a:prstGeom>
+        </p:spPr>
+      </p:pic>
+    </p:spTree>
+    <p:extLst>
+      <p:ext uri="{BB962C8B-B14F-4D97-AF65-F5344CB8AC3E}">
+        <p14:creationId xmlns:p14="http://schemas.microsoft.com/office/powerpoint/2010/main" val="3837067578"/>
+      </p:ext>
+    </p:extLst>
+  </p:cSld>
+  <p:clrMapOvr>
+    <a:masterClrMapping/>
+  </p:clrMapOvr>
+  <p:timing>
+    <p:tnLst>
+      <p:par>
+        <p:cTn id="1" dur="indefinite" restart="never" nodeType="tmRoot">
+          <p:childTnLst>
+            <p:seq concurrent="1" nextAc="seek">
+              <p:cTn id="2" dur="indefinite" nodeType="mainSeq">
+                <p:childTnLst>
+                  <p:par>
+                    <p:cTn id="3" fill="hold">
+                      <p:stCondLst>
+                        <p:cond delay="indefinite"/>
+                      </p:stCondLst>
+                      <p:childTnLst>
+                        <p:par>
+                          <p:cTn id="4" fill="hold">
+                            <p:stCondLst>
+                              <p:cond delay="0"/>
+                            </p:stCondLst>
+                            <p:childTnLst>
+                              <p:par>
+                                <p:cTn id="5" presetID="1" presetClass="entr" presetSubtype="0" fill="hold" grpId="0" nodeType="clickEffect">
+                                  <p:stCondLst>
+                                    <p:cond delay="0"/>
+                                  </p:stCondLst>
+                                  <p:childTnLst>
+                                    <p:set>
+                                      <p:cBhvr>
+                                        <p:cTn id="6" dur="1" fill="hold">
+                                          <p:stCondLst>
+                                            <p:cond delay="0"/>
+                                          </p:stCondLst>
+                                        </p:cTn>
+                                        <p:tgtEl>
+                                          <p:spTgt spid="4"/>
+                                        </p:tgtEl>
+                                        <p:attrNameLst>
+                                          <p:attrName>style.visibility</p:attrName>
+                                        </p:attrNameLst>
+                                      </p:cBhvr>
+                                      <p:to>
+                                        <p:strVal val="visible"/>
+                                      </p:to>
+                                    </p:set>
+                                  </p:childTnLst>
+                                </p:cTn>
+                              </p:par>
+                            </p:childTnLst>
+                          </p:cTn>
+                        </p:par>
+                      </p:childTnLst>
+                    </p:cTn>
+                  </p:par>
+                  <p:par>
+                    <p:cTn id="7" fill="hold">
+                      <p:stCondLst>
+                        <p:cond delay="indefinite"/>
+                      </p:stCondLst>
+                      <p:childTnLst>
+                        <p:par>
+                          <p:cTn id="8" fill="hold">
+                            <p:stCondLst>
+                              <p:cond delay="0"/>
+                            </p:stCondLst>
+                            <p:childTnLst>
+                              <p:par>
+                                <p:cTn id="9" presetID="1" presetClass="entr" presetSubtype="0" fill="hold" nodeType="clickEffect">
+                                  <p:stCondLst>
+                                    <p:cond delay="0"/>
+                                  </p:stCondLst>
+                                  <p:childTnLst>
+                                    <p:set>
+                                      <p:cBhvr>
+                                        <p:cTn id="10" dur="1" fill="hold">
+                                          <p:stCondLst>
+                                            <p:cond delay="0"/>
+                                          </p:stCondLst>
+                                        </p:cTn>
+                                        <p:tgtEl>
+                                          <p:spTgt spid="6"/>
+                                        </p:tgtEl>
+                                        <p:attrNameLst>
+                                          <p:attrName>style.visibility</p:attrName>
+                                        </p:attrNameLst>
+                                      </p:cBhvr>
+                                      <p:to>
+                                        <p:strVal val="visible"/>
+                                      </p:to>
+                                    </p:set>
+                                  </p:childTnLst>
+                                </p:cTn>
+                              </p:par>
+                            </p:childTnLst>
+                          </p:cTn>
+                        </p:par>
+                      </p:childTnLst>
+                    </p:cTn>
+                  </p:par>
+                  <p:par>
+                    <p:cTn id="11" fill="hold">
+                      <p:stCondLst>
+                        <p:cond delay="indefinite"/>
+                      </p:stCondLst>
+                      <p:childTnLst>
+                        <p:par>
+                          <p:cTn id="12" fill="hold">
+                            <p:stCondLst>
+                              <p:cond delay="0"/>
+                            </p:stCondLst>
+                            <p:childTnLst>
+                              <p:par>
+                                <p:cTn id="13" presetID="1" presetClass="entr" presetSubtype="0" fill="hold" nodeType="clickEffect">
+                                  <p:stCondLst>
+                                    <p:cond delay="0"/>
+                                  </p:stCondLst>
+                                  <p:childTnLst>
+                                    <p:set>
+                                      <p:cBhvr>
+                                        <p:cTn id="14" dur="1" fill="hold">
+                                          <p:stCondLst>
+                                            <p:cond delay="0"/>
+                                          </p:stCondLst>
+                                        </p:cTn>
+                                        <p:tgtEl>
+                                          <p:spTgt spid="7"/>
+                                        </p:tgtEl>
+                                        <p:attrNameLst>
+                                          <p:attrName>style.visibility</p:attrName>
+                                        </p:attrNameLst>
+                                      </p:cBhvr>
+                                      <p:to>
+                                        <p:strVal val="visible"/>
+                                      </p:to>
+                                    </p:set>
+                                  </p:childTnLst>
+                                </p:cTn>
+                              </p:par>
+                            </p:childTnLst>
+                          </p:cTn>
+                        </p:par>
+                      </p:childTnLst>
+                    </p:cTn>
+                  </p:par>
+                </p:childTnLst>
+              </p:cTn>
+              <p:prevCondLst>
+                <p:cond evt="onPrev" delay="0">
+                  <p:tgtEl>
+                    <p:sldTgt/>
+                  </p:tgtEl>
+                </p:cond>
+              </p:prevCondLst>
+              <p:nextCondLst>
+                <p:cond evt="onNext" delay="0">
+                  <p:tgtEl>
+                    <p:sldTgt/>
+                  </p:tgtEl>
+                </p:cond>
+              </p:nextCondLst>
+            </p:seq>
+          </p:childTnLst>
+        </p:cTn>
+      </p:par>
+    </p:tnLst>
+    <p:bldLst>
+      <p:bldP spid="4" grpId="0" animBg="1"/>
+    </p:bldLst>
+  </p:timing>
+</p:sld>
+</file>
+
+<file path=ppt/slides/slide41.xml><?xml version="1.0" encoding="utf-8"?>
+<p:sld xmlns:a="http://schemas.openxmlformats.org/drawingml/2006/main" xmlns:r="http://schemas.openxmlformats.org/officeDocument/2006/relationships" xmlns:p="http://schemas.openxmlformats.org/presentationml/2006/main">
+  <p:cSld>
+    <p:spTree>
+      <p:nvGrpSpPr>
+        <p:cNvPr id="1" name=""/>
+        <p:cNvGrpSpPr/>
+        <p:nvPr/>
+      </p:nvGrpSpPr>
+      <p:grpSpPr>
+        <a:xfrm>
+          <a:off x="0" y="0"/>
+          <a:ext cx="0" cy="0"/>
+          <a:chOff x="0" y="0"/>
+          <a:chExt cx="0" cy="0"/>
+        </a:xfrm>
+      </p:grpSpPr>
+      <p:sp>
+        <p:nvSpPr>
+          <p:cNvPr id="2" name="Title 1">
+            <a:extLst>
+              <a:ext uri="{FF2B5EF4-FFF2-40B4-BE49-F238E27FC236}">
+                <a16:creationId xmlns:a16="http://schemas.microsoft.com/office/drawing/2014/main" id="{25C08FE1-F46C-47BB-8203-C54B226BA17F}"/>
+              </a:ext>
+            </a:extLst>
+          </p:cNvPr>
+          <p:cNvSpPr>
+            <a:spLocks noGrp="1"/>
+          </p:cNvSpPr>
+          <p:nvPr>
+            <p:ph type="title"/>
+          </p:nvPr>
+        </p:nvSpPr>
+        <p:spPr/>
+        <p:txBody>
+          <a:bodyPr/>
           <a:lstStyle/>
           <a:p>
-            <a:pPr algn="just"/>
             <a:r>
               <a:rPr lang="en-US" dirty="0"/>
-              <a:t>An IDE: VS Code for this demo, but any IDE that supports C# and </a:t>
-            </a:r>
-            <a:r>
-              <a:rPr lang="en-US" dirty="0" err="1"/>
-              <a:t>nodeJS</a:t>
-            </a:r>
-            <a:endParaRPr lang="en-US" dirty="0"/>
-          </a:p>
-          <a:p>
-            <a:pPr algn="just"/>
-            <a:r>
-              <a:rPr lang="en-US" dirty="0"/>
-              <a:t>Git: I will use command line</a:t>
-            </a:r>
-          </a:p>
-          <a:p>
-            <a:pPr algn="just"/>
-            <a:r>
-              <a:rPr lang="en-US" dirty="0" err="1"/>
-              <a:t>NodeJs</a:t>
-            </a:r>
-            <a:r>
-              <a:rPr lang="en-US" dirty="0"/>
-              <a:t>: mostly for the build environment</a:t>
-            </a:r>
-          </a:p>
-          <a:p>
-            <a:pPr algn="just"/>
-            <a:r>
-              <a:rPr lang="en-US" dirty="0"/>
-              <a:t>Yarn (or NPM)</a:t>
-            </a:r>
-          </a:p>
-          <a:p>
-            <a:pPr algn="just"/>
-            <a:r>
-              <a:rPr lang="en-US" dirty="0"/>
-              <a:t>Dotnet core 2.1 (other version should work fine)</a:t>
-            </a:r>
-          </a:p>
-          <a:p>
-            <a:pPr algn="just"/>
-            <a:r>
-              <a:rPr lang="en-US" dirty="0"/>
-              <a:t>Chocolatey (maybe not </a:t>
-            </a:r>
-            <a:r>
-              <a:rPr lang="en-US" dirty="0">
-                <a:sym typeface="Wingdings" panose="05000000000000000000" pitchFamily="2" charset="2"/>
-              </a:rPr>
-              <a:t> )</a:t>
-            </a:r>
-            <a:endParaRPr lang="en-US" dirty="0"/>
+              <a:t>Create the storage Account</a:t>
+            </a:r>
           </a:p>
         </p:txBody>
       </p:sp>
@@ -23319,7 +24290,7 @@
           <p:cNvPr id="4" name="Picture 3">
             <a:extLst>
               <a:ext uri="{FF2B5EF4-FFF2-40B4-BE49-F238E27FC236}">
-                <a16:creationId xmlns:a16="http://schemas.microsoft.com/office/drawing/2014/main" id="{69C5ED94-B7FC-49FE-A8F3-401D03ADC5BF}"/>
+                <a16:creationId xmlns:a16="http://schemas.microsoft.com/office/drawing/2014/main" id="{270C4E5A-80C7-49D9-9598-B8B8FD8E6F40}"/>
               </a:ext>
             </a:extLst>
           </p:cNvPr>
@@ -23336,8 +24307,8 @@
         </p:blipFill>
         <p:spPr>
           <a:xfrm>
-            <a:off x="3661669" y="838503"/>
-            <a:ext cx="4865484" cy="5180994"/>
+            <a:off x="3089650" y="271857"/>
+            <a:ext cx="6009524" cy="6314286"/>
           </a:xfrm>
           <a:prstGeom prst="rect">
             <a:avLst/>
@@ -23347,7 +24318,7 @@
     </p:spTree>
     <p:extLst>
       <p:ext uri="{BB962C8B-B14F-4D97-AF65-F5344CB8AC3E}">
-        <p14:creationId xmlns:p14="http://schemas.microsoft.com/office/powerpoint/2010/main" val="3068686399"/>
+        <p14:creationId xmlns:p14="http://schemas.microsoft.com/office/powerpoint/2010/main" val="641481710"/>
       </p:ext>
     </p:extLst>
   </p:cSld>
@@ -23429,6 +24400,995 @@
       </p:par>
     </p:tnLst>
   </p:timing>
+</p:sld>
+</file>
+
+<file path=ppt/slides/slide42.xml><?xml version="1.0" encoding="utf-8"?>
+<p:sld xmlns:a="http://schemas.openxmlformats.org/drawingml/2006/main" xmlns:r="http://schemas.openxmlformats.org/officeDocument/2006/relationships" xmlns:p="http://schemas.openxmlformats.org/presentationml/2006/main">
+  <p:cSld>
+    <p:spTree>
+      <p:nvGrpSpPr>
+        <p:cNvPr id="1" name=""/>
+        <p:cNvGrpSpPr/>
+        <p:nvPr/>
+      </p:nvGrpSpPr>
+      <p:grpSpPr>
+        <a:xfrm>
+          <a:off x="0" y="0"/>
+          <a:ext cx="0" cy="0"/>
+          <a:chOff x="0" y="0"/>
+          <a:chExt cx="0" cy="0"/>
+        </a:xfrm>
+      </p:grpSpPr>
+      <p:sp>
+        <p:nvSpPr>
+          <p:cNvPr id="2" name="Title 1">
+            <a:extLst>
+              <a:ext uri="{FF2B5EF4-FFF2-40B4-BE49-F238E27FC236}">
+                <a16:creationId xmlns:a16="http://schemas.microsoft.com/office/drawing/2014/main" id="{13856A83-7BC4-489A-985A-B5A1120BDBF7}"/>
+              </a:ext>
+            </a:extLst>
+          </p:cNvPr>
+          <p:cNvSpPr>
+            <a:spLocks noGrp="1"/>
+          </p:cNvSpPr>
+          <p:nvPr>
+            <p:ph type="title"/>
+          </p:nvPr>
+        </p:nvSpPr>
+        <p:spPr/>
+        <p:txBody>
+          <a:bodyPr/>
+          <a:lstStyle/>
+          <a:p>
+            <a:r>
+              <a:rPr lang="en-US" dirty="0"/>
+              <a:t>Create the Azure Cloud Instance</a:t>
+            </a:r>
+          </a:p>
+        </p:txBody>
+      </p:sp>
+      <p:sp>
+        <p:nvSpPr>
+          <p:cNvPr id="3" name="Content Placeholder 2">
+            <a:extLst>
+              <a:ext uri="{FF2B5EF4-FFF2-40B4-BE49-F238E27FC236}">
+                <a16:creationId xmlns:a16="http://schemas.microsoft.com/office/drawing/2014/main" id="{E2DE3A24-F3D1-47AE-8535-40A5606D8B2B}"/>
+              </a:ext>
+            </a:extLst>
+          </p:cNvPr>
+          <p:cNvSpPr>
+            <a:spLocks noGrp="1"/>
+          </p:cNvSpPr>
+          <p:nvPr>
+            <p:ph idx="1"/>
+          </p:nvPr>
+        </p:nvSpPr>
+        <p:spPr/>
+        <p:txBody>
+          <a:bodyPr/>
+          <a:lstStyle/>
+          <a:p>
+            <a:r>
+              <a:rPr lang="en-US" dirty="0"/>
+              <a:t>Sign-in to your </a:t>
+            </a:r>
+            <a:r>
+              <a:rPr lang="en-US" dirty="0">
+                <a:hlinkClick r:id="rId2"/>
+              </a:rPr>
+              <a:t>https://portal.azure.com/</a:t>
+            </a:r>
+            <a:endParaRPr lang="en-US" dirty="0"/>
+          </a:p>
+          <a:p>
+            <a:r>
+              <a:rPr lang="en-US" dirty="0"/>
+              <a:t>Navigate to “All Services” </a:t>
+            </a:r>
+            <a:r>
+              <a:rPr lang="en-US" dirty="0">
+                <a:sym typeface="Wingdings" panose="05000000000000000000" pitchFamily="2" charset="2"/>
+              </a:rPr>
+              <a:t> “Subscriptions”  &lt;your subscription id&gt;  “Management Certificates”</a:t>
+            </a:r>
+            <a:endParaRPr lang="en-US" dirty="0"/>
+          </a:p>
+          <a:p>
+            <a:r>
+              <a:rPr lang="en-US" dirty="0"/>
+              <a:t>Upload the azure-manage-cert.cer file</a:t>
+            </a:r>
+          </a:p>
+          <a:p>
+            <a:r>
+              <a:rPr lang="en-US" dirty="0"/>
+              <a:t>Encrypt in </a:t>
+            </a:r>
+            <a:r>
+              <a:rPr lang="en-US" dirty="0" err="1"/>
+              <a:t>AppVeyor</a:t>
+            </a:r>
+            <a:r>
+              <a:rPr lang="en-US" dirty="0"/>
+              <a:t> the content of azure-manage-cert.pfx.txt</a:t>
+            </a:r>
+          </a:p>
+        </p:txBody>
+      </p:sp>
+      <p:pic>
+        <p:nvPicPr>
+          <p:cNvPr id="5" name="Picture 4">
+            <a:extLst>
+              <a:ext uri="{FF2B5EF4-FFF2-40B4-BE49-F238E27FC236}">
+                <a16:creationId xmlns:a16="http://schemas.microsoft.com/office/drawing/2014/main" id="{165348EB-DA04-422A-B629-DBEF9E933561}"/>
+              </a:ext>
+            </a:extLst>
+          </p:cNvPr>
+          <p:cNvPicPr>
+            <a:picLocks noChangeAspect="1"/>
+          </p:cNvPicPr>
+          <p:nvPr/>
+        </p:nvPicPr>
+        <p:blipFill>
+          <a:blip r:embed="rId3"/>
+          <a:stretch>
+            <a:fillRect/>
+          </a:stretch>
+        </p:blipFill>
+        <p:spPr>
+          <a:xfrm>
+            <a:off x="2375363" y="1624238"/>
+            <a:ext cx="7438095" cy="3609524"/>
+          </a:xfrm>
+          <a:prstGeom prst="rect">
+            <a:avLst/>
+          </a:prstGeom>
+        </p:spPr>
+      </p:pic>
+    </p:spTree>
+    <p:extLst>
+      <p:ext uri="{BB962C8B-B14F-4D97-AF65-F5344CB8AC3E}">
+        <p14:creationId xmlns:p14="http://schemas.microsoft.com/office/powerpoint/2010/main" val="720056745"/>
+      </p:ext>
+    </p:extLst>
+  </p:cSld>
+  <p:clrMapOvr>
+    <a:masterClrMapping/>
+  </p:clrMapOvr>
+  <p:timing>
+    <p:tnLst>
+      <p:par>
+        <p:cTn id="1" dur="indefinite" restart="never" nodeType="tmRoot">
+          <p:childTnLst>
+            <p:seq concurrent="1" nextAc="seek">
+              <p:cTn id="2" dur="indefinite" nodeType="mainSeq">
+                <p:childTnLst>
+                  <p:par>
+                    <p:cTn id="3" fill="hold">
+                      <p:stCondLst>
+                        <p:cond delay="indefinite"/>
+                      </p:stCondLst>
+                      <p:childTnLst>
+                        <p:par>
+                          <p:cTn id="4" fill="hold">
+                            <p:stCondLst>
+                              <p:cond delay="0"/>
+                            </p:stCondLst>
+                            <p:childTnLst>
+                              <p:par>
+                                <p:cTn id="5" presetID="1" presetClass="entr" presetSubtype="0" fill="hold" nodeType="clickEffect">
+                                  <p:stCondLst>
+                                    <p:cond delay="0"/>
+                                  </p:stCondLst>
+                                  <p:childTnLst>
+                                    <p:set>
+                                      <p:cBhvr>
+                                        <p:cTn id="6" dur="1" fill="hold">
+                                          <p:stCondLst>
+                                            <p:cond delay="0"/>
+                                          </p:stCondLst>
+                                        </p:cTn>
+                                        <p:tgtEl>
+                                          <p:spTgt spid="5"/>
+                                        </p:tgtEl>
+                                        <p:attrNameLst>
+                                          <p:attrName>style.visibility</p:attrName>
+                                        </p:attrNameLst>
+                                      </p:cBhvr>
+                                      <p:to>
+                                        <p:strVal val="visible"/>
+                                      </p:to>
+                                    </p:set>
+                                  </p:childTnLst>
+                                </p:cTn>
+                              </p:par>
+                            </p:childTnLst>
+                          </p:cTn>
+                        </p:par>
+                      </p:childTnLst>
+                    </p:cTn>
+                  </p:par>
+                  <p:par>
+                    <p:cTn id="7" fill="hold">
+                      <p:stCondLst>
+                        <p:cond delay="indefinite"/>
+                      </p:stCondLst>
+                      <p:childTnLst>
+                        <p:par>
+                          <p:cTn id="8" fill="hold">
+                            <p:stCondLst>
+                              <p:cond delay="0"/>
+                            </p:stCondLst>
+                            <p:childTnLst>
+                              <p:par>
+                                <p:cTn id="9" presetID="1" presetClass="exit" presetSubtype="0" fill="hold" nodeType="clickEffect">
+                                  <p:stCondLst>
+                                    <p:cond delay="0"/>
+                                  </p:stCondLst>
+                                  <p:childTnLst>
+                                    <p:set>
+                                      <p:cBhvr>
+                                        <p:cTn id="10" dur="1" fill="hold">
+                                          <p:stCondLst>
+                                            <p:cond delay="0"/>
+                                          </p:stCondLst>
+                                        </p:cTn>
+                                        <p:tgtEl>
+                                          <p:spTgt spid="5"/>
+                                        </p:tgtEl>
+                                        <p:attrNameLst>
+                                          <p:attrName>style.visibility</p:attrName>
+                                        </p:attrNameLst>
+                                      </p:cBhvr>
+                                      <p:to>
+                                        <p:strVal val="hidden"/>
+                                      </p:to>
+                                    </p:set>
+                                  </p:childTnLst>
+                                </p:cTn>
+                              </p:par>
+                            </p:childTnLst>
+                          </p:cTn>
+                        </p:par>
+                      </p:childTnLst>
+                    </p:cTn>
+                  </p:par>
+                </p:childTnLst>
+              </p:cTn>
+              <p:prevCondLst>
+                <p:cond evt="onPrev" delay="0">
+                  <p:tgtEl>
+                    <p:sldTgt/>
+                  </p:tgtEl>
+                </p:cond>
+              </p:prevCondLst>
+              <p:nextCondLst>
+                <p:cond evt="onNext" delay="0">
+                  <p:tgtEl>
+                    <p:sldTgt/>
+                  </p:tgtEl>
+                </p:cond>
+              </p:nextCondLst>
+            </p:seq>
+          </p:childTnLst>
+        </p:cTn>
+      </p:par>
+    </p:tnLst>
+  </p:timing>
+</p:sld>
+</file>
+
+<file path=ppt/slides/slide43.xml><?xml version="1.0" encoding="utf-8"?>
+<p:sld xmlns:a="http://schemas.openxmlformats.org/drawingml/2006/main" xmlns:r="http://schemas.openxmlformats.org/officeDocument/2006/relationships" xmlns:p="http://schemas.openxmlformats.org/presentationml/2006/main">
+  <p:cSld>
+    <p:spTree>
+      <p:nvGrpSpPr>
+        <p:cNvPr id="1" name=""/>
+        <p:cNvGrpSpPr/>
+        <p:nvPr/>
+      </p:nvGrpSpPr>
+      <p:grpSpPr>
+        <a:xfrm>
+          <a:off x="0" y="0"/>
+          <a:ext cx="0" cy="0"/>
+          <a:chOff x="0" y="0"/>
+          <a:chExt cx="0" cy="0"/>
+        </a:xfrm>
+      </p:grpSpPr>
+      <p:sp>
+        <p:nvSpPr>
+          <p:cNvPr id="2" name="Title 1">
+            <a:extLst>
+              <a:ext uri="{FF2B5EF4-FFF2-40B4-BE49-F238E27FC236}">
+                <a16:creationId xmlns:a16="http://schemas.microsoft.com/office/drawing/2014/main" id="{89958A99-41C5-4F64-B613-67D7A1921BBF}"/>
+              </a:ext>
+            </a:extLst>
+          </p:cNvPr>
+          <p:cNvSpPr>
+            <a:spLocks noGrp="1"/>
+          </p:cNvSpPr>
+          <p:nvPr>
+            <p:ph type="title"/>
+          </p:nvPr>
+        </p:nvSpPr>
+        <p:spPr/>
+        <p:txBody>
+          <a:bodyPr/>
+          <a:lstStyle/>
+          <a:p>
+            <a:r>
+              <a:rPr lang="en-US" dirty="0"/>
+              <a:t>Create the Azure Cloud Instance (cont.)</a:t>
+            </a:r>
+          </a:p>
+        </p:txBody>
+      </p:sp>
+      <p:pic>
+        <p:nvPicPr>
+          <p:cNvPr id="4" name="Picture 3">
+            <a:extLst>
+              <a:ext uri="{FF2B5EF4-FFF2-40B4-BE49-F238E27FC236}">
+                <a16:creationId xmlns:a16="http://schemas.microsoft.com/office/drawing/2014/main" id="{7385984C-C6E4-4FF2-9842-0FE50B1B67E0}"/>
+              </a:ext>
+            </a:extLst>
+          </p:cNvPr>
+          <p:cNvPicPr>
+            <a:picLocks noChangeAspect="1"/>
+          </p:cNvPicPr>
+          <p:nvPr/>
+        </p:nvPicPr>
+        <p:blipFill>
+          <a:blip r:embed="rId2"/>
+          <a:stretch>
+            <a:fillRect/>
+          </a:stretch>
+        </p:blipFill>
+        <p:spPr>
+          <a:xfrm>
+            <a:off x="3606857" y="1583728"/>
+            <a:ext cx="4978285" cy="5019090"/>
+          </a:xfrm>
+          <a:prstGeom prst="rect">
+            <a:avLst/>
+          </a:prstGeom>
+        </p:spPr>
+      </p:pic>
+      <p:pic>
+        <p:nvPicPr>
+          <p:cNvPr id="5" name="Picture 4">
+            <a:extLst>
+              <a:ext uri="{FF2B5EF4-FFF2-40B4-BE49-F238E27FC236}">
+                <a16:creationId xmlns:a16="http://schemas.microsoft.com/office/drawing/2014/main" id="{95F253D6-8039-41F9-A1DE-1F2B1B0023C3}"/>
+              </a:ext>
+            </a:extLst>
+          </p:cNvPr>
+          <p:cNvPicPr>
+            <a:picLocks noChangeAspect="1"/>
+          </p:cNvPicPr>
+          <p:nvPr/>
+        </p:nvPicPr>
+        <p:blipFill>
+          <a:blip r:embed="rId3"/>
+          <a:stretch>
+            <a:fillRect/>
+          </a:stretch>
+        </p:blipFill>
+        <p:spPr>
+          <a:xfrm>
+            <a:off x="4599174" y="1878987"/>
+            <a:ext cx="2990476" cy="4428571"/>
+          </a:xfrm>
+          <a:prstGeom prst="rect">
+            <a:avLst/>
+          </a:prstGeom>
+        </p:spPr>
+      </p:pic>
+      <p:sp>
+        <p:nvSpPr>
+          <p:cNvPr id="6" name="TextBox 5">
+            <a:extLst>
+              <a:ext uri="{FF2B5EF4-FFF2-40B4-BE49-F238E27FC236}">
+                <a16:creationId xmlns:a16="http://schemas.microsoft.com/office/drawing/2014/main" id="{8D434334-A6F7-4FC3-8001-1A729C91DDA5}"/>
+              </a:ext>
+            </a:extLst>
+          </p:cNvPr>
+          <p:cNvSpPr txBox="1"/>
+          <p:nvPr/>
+        </p:nvSpPr>
+        <p:spPr>
+          <a:xfrm>
+            <a:off x="9080205" y="3030279"/>
+            <a:ext cx="2636874" cy="923330"/>
+          </a:xfrm>
+          <a:prstGeom prst="rect">
+            <a:avLst/>
+          </a:prstGeom>
+          <a:noFill/>
+        </p:spPr>
+        <p:txBody>
+          <a:bodyPr wrap="square" rtlCol="0">
+            <a:spAutoFit/>
+          </a:bodyPr>
+          <a:lstStyle/>
+          <a:p>
+            <a:r>
+              <a:rPr lang="en-US" dirty="0"/>
+              <a:t>Select “West Central US” for Location if you are using a Free Trial account</a:t>
+            </a:r>
+          </a:p>
+        </p:txBody>
+      </p:sp>
+    </p:spTree>
+    <p:extLst>
+      <p:ext uri="{BB962C8B-B14F-4D97-AF65-F5344CB8AC3E}">
+        <p14:creationId xmlns:p14="http://schemas.microsoft.com/office/powerpoint/2010/main" val="1490884495"/>
+      </p:ext>
+    </p:extLst>
+  </p:cSld>
+  <p:clrMapOvr>
+    <a:masterClrMapping/>
+  </p:clrMapOvr>
+  <p:timing>
+    <p:tnLst>
+      <p:par>
+        <p:cTn id="1" dur="indefinite" restart="never" nodeType="tmRoot">
+          <p:childTnLst>
+            <p:seq concurrent="1" nextAc="seek">
+              <p:cTn id="2" dur="indefinite" nodeType="mainSeq">
+                <p:childTnLst>
+                  <p:par>
+                    <p:cTn id="3" fill="hold">
+                      <p:stCondLst>
+                        <p:cond delay="indefinite"/>
+                      </p:stCondLst>
+                      <p:childTnLst>
+                        <p:par>
+                          <p:cTn id="4" fill="hold">
+                            <p:stCondLst>
+                              <p:cond delay="0"/>
+                            </p:stCondLst>
+                            <p:childTnLst>
+                              <p:par>
+                                <p:cTn id="5" presetID="1" presetClass="exit" presetSubtype="0" fill="hold" nodeType="clickEffect">
+                                  <p:stCondLst>
+                                    <p:cond delay="0"/>
+                                  </p:stCondLst>
+                                  <p:childTnLst>
+                                    <p:set>
+                                      <p:cBhvr>
+                                        <p:cTn id="6" dur="1" fill="hold">
+                                          <p:stCondLst>
+                                            <p:cond delay="0"/>
+                                          </p:stCondLst>
+                                        </p:cTn>
+                                        <p:tgtEl>
+                                          <p:spTgt spid="4"/>
+                                        </p:tgtEl>
+                                        <p:attrNameLst>
+                                          <p:attrName>style.visibility</p:attrName>
+                                        </p:attrNameLst>
+                                      </p:cBhvr>
+                                      <p:to>
+                                        <p:strVal val="hidden"/>
+                                      </p:to>
+                                    </p:set>
+                                  </p:childTnLst>
+                                </p:cTn>
+                              </p:par>
+                              <p:par>
+                                <p:cTn id="7" presetID="1" presetClass="entr" presetSubtype="0" fill="hold" nodeType="withEffect">
+                                  <p:stCondLst>
+                                    <p:cond delay="0"/>
+                                  </p:stCondLst>
+                                  <p:childTnLst>
+                                    <p:set>
+                                      <p:cBhvr>
+                                        <p:cTn id="8" dur="1" fill="hold">
+                                          <p:stCondLst>
+                                            <p:cond delay="0"/>
+                                          </p:stCondLst>
+                                        </p:cTn>
+                                        <p:tgtEl>
+                                          <p:spTgt spid="5"/>
+                                        </p:tgtEl>
+                                        <p:attrNameLst>
+                                          <p:attrName>style.visibility</p:attrName>
+                                        </p:attrNameLst>
+                                      </p:cBhvr>
+                                      <p:to>
+                                        <p:strVal val="visible"/>
+                                      </p:to>
+                                    </p:set>
+                                  </p:childTnLst>
+                                </p:cTn>
+                              </p:par>
+                              <p:par>
+                                <p:cTn id="9" presetID="1" presetClass="entr" presetSubtype="0" fill="hold" grpId="0" nodeType="withEffect">
+                                  <p:stCondLst>
+                                    <p:cond delay="0"/>
+                                  </p:stCondLst>
+                                  <p:childTnLst>
+                                    <p:set>
+                                      <p:cBhvr>
+                                        <p:cTn id="10" dur="1" fill="hold">
+                                          <p:stCondLst>
+                                            <p:cond delay="0"/>
+                                          </p:stCondLst>
+                                        </p:cTn>
+                                        <p:tgtEl>
+                                          <p:spTgt spid="6"/>
+                                        </p:tgtEl>
+                                        <p:attrNameLst>
+                                          <p:attrName>style.visibility</p:attrName>
+                                        </p:attrNameLst>
+                                      </p:cBhvr>
+                                      <p:to>
+                                        <p:strVal val="visible"/>
+                                      </p:to>
+                                    </p:set>
+                                  </p:childTnLst>
+                                </p:cTn>
+                              </p:par>
+                            </p:childTnLst>
+                          </p:cTn>
+                        </p:par>
+                      </p:childTnLst>
+                    </p:cTn>
+                  </p:par>
+                </p:childTnLst>
+              </p:cTn>
+              <p:prevCondLst>
+                <p:cond evt="onPrev" delay="0">
+                  <p:tgtEl>
+                    <p:sldTgt/>
+                  </p:tgtEl>
+                </p:cond>
+              </p:prevCondLst>
+              <p:nextCondLst>
+                <p:cond evt="onNext" delay="0">
+                  <p:tgtEl>
+                    <p:sldTgt/>
+                  </p:tgtEl>
+                </p:cond>
+              </p:nextCondLst>
+            </p:seq>
+          </p:childTnLst>
+        </p:cTn>
+      </p:par>
+    </p:tnLst>
+    <p:bldLst>
+      <p:bldP spid="6" grpId="0"/>
+    </p:bldLst>
+  </p:timing>
+</p:sld>
+</file>
+
+<file path=ppt/slides/slide44.xml><?xml version="1.0" encoding="utf-8"?>
+<p:sld xmlns:a="http://schemas.openxmlformats.org/drawingml/2006/main" xmlns:r="http://schemas.openxmlformats.org/officeDocument/2006/relationships" xmlns:p="http://schemas.openxmlformats.org/presentationml/2006/main">
+  <p:cSld>
+    <p:spTree>
+      <p:nvGrpSpPr>
+        <p:cNvPr id="1" name=""/>
+        <p:cNvGrpSpPr/>
+        <p:nvPr/>
+      </p:nvGrpSpPr>
+      <p:grpSpPr>
+        <a:xfrm>
+          <a:off x="0" y="0"/>
+          <a:ext cx="0" cy="0"/>
+          <a:chOff x="0" y="0"/>
+          <a:chExt cx="0" cy="0"/>
+        </a:xfrm>
+      </p:grpSpPr>
+      <p:sp>
+        <p:nvSpPr>
+          <p:cNvPr id="2" name="Title 1">
+            <a:extLst>
+              <a:ext uri="{FF2B5EF4-FFF2-40B4-BE49-F238E27FC236}">
+                <a16:creationId xmlns:a16="http://schemas.microsoft.com/office/drawing/2014/main" id="{8A54F36B-4540-466F-8E37-ED67F54E6EF3}"/>
+              </a:ext>
+            </a:extLst>
+          </p:cNvPr>
+          <p:cNvSpPr>
+            <a:spLocks noGrp="1"/>
+          </p:cNvSpPr>
+          <p:nvPr>
+            <p:ph type="title"/>
+          </p:nvPr>
+        </p:nvSpPr>
+        <p:spPr/>
+        <p:txBody>
+          <a:bodyPr/>
+          <a:lstStyle/>
+          <a:p>
+            <a:r>
+              <a:rPr lang="en-US" dirty="0"/>
+              <a:t>Update </a:t>
+            </a:r>
+            <a:r>
+              <a:rPr lang="en-US" dirty="0" err="1"/>
+              <a:t>AppVeyor.yml</a:t>
+            </a:r>
+            <a:endParaRPr lang="en-US" dirty="0"/>
+          </a:p>
+        </p:txBody>
+      </p:sp>
+      <p:sp>
+        <p:nvSpPr>
+          <p:cNvPr id="3" name="Content Placeholder 2">
+            <a:extLst>
+              <a:ext uri="{FF2B5EF4-FFF2-40B4-BE49-F238E27FC236}">
+                <a16:creationId xmlns:a16="http://schemas.microsoft.com/office/drawing/2014/main" id="{73737364-326C-4DF6-AC11-7FBA206E23B6}"/>
+              </a:ext>
+            </a:extLst>
+          </p:cNvPr>
+          <p:cNvSpPr>
+            <a:spLocks noGrp="1"/>
+          </p:cNvSpPr>
+          <p:nvPr>
+            <p:ph idx="1"/>
+          </p:nvPr>
+        </p:nvSpPr>
+        <p:spPr/>
+        <p:txBody>
+          <a:bodyPr/>
+          <a:lstStyle/>
+          <a:p>
+            <a:endParaRPr lang="en-US" dirty="0"/>
+          </a:p>
+        </p:txBody>
+      </p:sp>
+    </p:spTree>
+    <p:extLst>
+      <p:ext uri="{BB962C8B-B14F-4D97-AF65-F5344CB8AC3E}">
+        <p14:creationId xmlns:p14="http://schemas.microsoft.com/office/powerpoint/2010/main" val="3125157864"/>
+      </p:ext>
+    </p:extLst>
+  </p:cSld>
+  <p:clrMapOvr>
+    <a:masterClrMapping/>
+  </p:clrMapOvr>
+</p:sld>
+</file>
+
+<file path=ppt/slides/slide45.xml><?xml version="1.0" encoding="utf-8"?>
+<p:sld xmlns:a="http://schemas.openxmlformats.org/drawingml/2006/main" xmlns:r="http://schemas.openxmlformats.org/officeDocument/2006/relationships" xmlns:p="http://schemas.openxmlformats.org/presentationml/2006/main">
+  <p:cSld>
+    <p:spTree>
+      <p:nvGrpSpPr>
+        <p:cNvPr id="1" name=""/>
+        <p:cNvGrpSpPr/>
+        <p:nvPr/>
+      </p:nvGrpSpPr>
+      <p:grpSpPr>
+        <a:xfrm>
+          <a:off x="0" y="0"/>
+          <a:ext cx="0" cy="0"/>
+          <a:chOff x="0" y="0"/>
+          <a:chExt cx="0" cy="0"/>
+        </a:xfrm>
+      </p:grpSpPr>
+      <p:sp>
+        <p:nvSpPr>
+          <p:cNvPr id="2" name="Title 1">
+            <a:extLst>
+              <a:ext uri="{FF2B5EF4-FFF2-40B4-BE49-F238E27FC236}">
+                <a16:creationId xmlns:a16="http://schemas.microsoft.com/office/drawing/2014/main" id="{DEDF95E6-31A7-4A4D-B81B-67A931C484D1}"/>
+              </a:ext>
+            </a:extLst>
+          </p:cNvPr>
+          <p:cNvSpPr>
+            <a:spLocks noGrp="1"/>
+          </p:cNvSpPr>
+          <p:nvPr>
+            <p:ph type="title"/>
+          </p:nvPr>
+        </p:nvSpPr>
+        <p:spPr/>
+        <p:txBody>
+          <a:bodyPr/>
+          <a:lstStyle/>
+          <a:p>
+            <a:r>
+              <a:rPr lang="en-US" dirty="0"/>
+              <a:t>Links and credits</a:t>
+            </a:r>
+          </a:p>
+        </p:txBody>
+      </p:sp>
+      <p:sp>
+        <p:nvSpPr>
+          <p:cNvPr id="3" name="Content Placeholder 2">
+            <a:extLst>
+              <a:ext uri="{FF2B5EF4-FFF2-40B4-BE49-F238E27FC236}">
+                <a16:creationId xmlns:a16="http://schemas.microsoft.com/office/drawing/2014/main" id="{854FB79B-E0E0-4106-9101-482D7D707EAC}"/>
+              </a:ext>
+            </a:extLst>
+          </p:cNvPr>
+          <p:cNvSpPr>
+            <a:spLocks noGrp="1"/>
+          </p:cNvSpPr>
+          <p:nvPr>
+            <p:ph idx="1"/>
+          </p:nvPr>
+        </p:nvSpPr>
+        <p:spPr/>
+        <p:txBody>
+          <a:bodyPr>
+            <a:normAutofit fontScale="92500" lnSpcReduction="10000"/>
+          </a:bodyPr>
+          <a:lstStyle/>
+          <a:p>
+            <a:r>
+              <a:rPr lang="en-US" dirty="0"/>
+              <a:t>GitHub: </a:t>
+            </a:r>
+            <a:r>
+              <a:rPr lang="en-US" dirty="0">
+                <a:hlinkClick r:id="rId2"/>
+              </a:rPr>
+              <a:t>https://github.com</a:t>
+            </a:r>
+            <a:r>
+              <a:rPr lang="en-US" dirty="0"/>
+              <a:t> </a:t>
+            </a:r>
+          </a:p>
+          <a:p>
+            <a:r>
+              <a:rPr lang="en-US" dirty="0" err="1"/>
+              <a:t>Appveyor</a:t>
+            </a:r>
+            <a:r>
+              <a:rPr lang="en-US" dirty="0"/>
+              <a:t>: </a:t>
+            </a:r>
+            <a:r>
+              <a:rPr lang="en-US" dirty="0">
+                <a:hlinkClick r:id="rId3"/>
+              </a:rPr>
+              <a:t>https://appveyor.com</a:t>
+            </a:r>
+            <a:r>
+              <a:rPr lang="en-US" dirty="0"/>
+              <a:t> </a:t>
+            </a:r>
+          </a:p>
+          <a:p>
+            <a:r>
+              <a:rPr lang="en-US" dirty="0" err="1"/>
+              <a:t>Codecov</a:t>
+            </a:r>
+            <a:r>
+              <a:rPr lang="en-US" dirty="0"/>
+              <a:t>: </a:t>
+            </a:r>
+            <a:r>
+              <a:rPr lang="en-US" dirty="0">
+                <a:hlinkClick r:id="rId4"/>
+              </a:rPr>
+              <a:t>https://codecov.io</a:t>
+            </a:r>
+            <a:r>
+              <a:rPr lang="en-US" dirty="0"/>
+              <a:t> </a:t>
+            </a:r>
+          </a:p>
+          <a:p>
+            <a:r>
+              <a:rPr lang="en-US" dirty="0" err="1"/>
+              <a:t>SonarCloud</a:t>
+            </a:r>
+            <a:r>
+              <a:rPr lang="en-US" dirty="0"/>
+              <a:t>: </a:t>
+            </a:r>
+            <a:r>
+              <a:rPr lang="en-US" dirty="0">
+                <a:hlinkClick r:id="rId5"/>
+              </a:rPr>
+              <a:t>https://sonarcloud.io</a:t>
+            </a:r>
+            <a:r>
+              <a:rPr lang="en-US" dirty="0"/>
+              <a:t> </a:t>
+            </a:r>
+          </a:p>
+          <a:p>
+            <a:r>
+              <a:rPr lang="en-US" dirty="0" err="1"/>
+              <a:t>Opencover</a:t>
+            </a:r>
+            <a:r>
+              <a:rPr lang="en-US" dirty="0"/>
+              <a:t>: </a:t>
+            </a:r>
+            <a:r>
+              <a:rPr lang="en-US" dirty="0">
+                <a:hlinkClick r:id="rId6"/>
+              </a:rPr>
+              <a:t>https://github.com/opencover/opencover/wiki/Usage</a:t>
+            </a:r>
+            <a:endParaRPr lang="en-US" dirty="0"/>
+          </a:p>
+          <a:p>
+            <a:r>
+              <a:rPr lang="en-US" dirty="0"/>
+              <a:t>Azure Portal: </a:t>
+            </a:r>
+            <a:r>
+              <a:rPr lang="en-US" dirty="0">
+                <a:hlinkClick r:id="rId7"/>
+              </a:rPr>
+              <a:t>https://portal.azure.com/</a:t>
+            </a:r>
+            <a:r>
+              <a:rPr lang="en-US" dirty="0"/>
+              <a:t> </a:t>
+            </a:r>
+          </a:p>
+          <a:p>
+            <a:r>
+              <a:rPr lang="en-US" dirty="0"/>
+              <a:t>My Visual Studio: </a:t>
+            </a:r>
+            <a:r>
+              <a:rPr lang="en-US" dirty="0">
+                <a:hlinkClick r:id="rId8"/>
+              </a:rPr>
+              <a:t>https://my.visualstudio.com</a:t>
+            </a:r>
+            <a:r>
+              <a:rPr lang="en-US" dirty="0"/>
+              <a:t>  </a:t>
+            </a:r>
+          </a:p>
+        </p:txBody>
+      </p:sp>
+    </p:spTree>
+    <p:extLst>
+      <p:ext uri="{BB962C8B-B14F-4D97-AF65-F5344CB8AC3E}">
+        <p14:creationId xmlns:p14="http://schemas.microsoft.com/office/powerpoint/2010/main" val="3021987684"/>
+      </p:ext>
+    </p:extLst>
+  </p:cSld>
+  <p:clrMapOvr>
+    <a:masterClrMapping/>
+  </p:clrMapOvr>
+</p:sld>
+</file>
+
+<file path=ppt/slides/slide5.xml><?xml version="1.0" encoding="utf-8"?>
+<p:sld xmlns:a="http://schemas.openxmlformats.org/drawingml/2006/main" xmlns:r="http://schemas.openxmlformats.org/officeDocument/2006/relationships" xmlns:p="http://schemas.openxmlformats.org/presentationml/2006/main">
+  <p:cSld>
+    <p:spTree>
+      <p:nvGrpSpPr>
+        <p:cNvPr id="1" name=""/>
+        <p:cNvGrpSpPr/>
+        <p:nvPr/>
+      </p:nvGrpSpPr>
+      <p:grpSpPr>
+        <a:xfrm>
+          <a:off x="0" y="0"/>
+          <a:ext cx="0" cy="0"/>
+          <a:chOff x="0" y="0"/>
+          <a:chExt cx="0" cy="0"/>
+        </a:xfrm>
+      </p:grpSpPr>
+      <p:sp>
+        <p:nvSpPr>
+          <p:cNvPr id="2" name="Title 1">
+            <a:extLst>
+              <a:ext uri="{FF2B5EF4-FFF2-40B4-BE49-F238E27FC236}">
+                <a16:creationId xmlns:a16="http://schemas.microsoft.com/office/drawing/2014/main" id="{6F66E270-0382-448C-9CF8-03F6AA1FBB2F}"/>
+              </a:ext>
+            </a:extLst>
+          </p:cNvPr>
+          <p:cNvSpPr>
+            <a:spLocks noGrp="1"/>
+          </p:cNvSpPr>
+          <p:nvPr>
+            <p:ph type="title"/>
+          </p:nvPr>
+        </p:nvSpPr>
+        <p:spPr/>
+        <p:txBody>
+          <a:bodyPr/>
+          <a:lstStyle/>
+          <a:p>
+            <a:r>
+              <a:rPr lang="en-US" dirty="0"/>
+              <a:t>Tools</a:t>
+            </a:r>
+          </a:p>
+        </p:txBody>
+      </p:sp>
+      <p:sp>
+        <p:nvSpPr>
+          <p:cNvPr id="3" name="Content Placeholder 2">
+            <a:extLst>
+              <a:ext uri="{FF2B5EF4-FFF2-40B4-BE49-F238E27FC236}">
+                <a16:creationId xmlns:a16="http://schemas.microsoft.com/office/drawing/2014/main" id="{7C757845-1A6C-47F3-8980-554692B6DF1B}"/>
+              </a:ext>
+            </a:extLst>
+          </p:cNvPr>
+          <p:cNvSpPr>
+            <a:spLocks noGrp="1"/>
+          </p:cNvSpPr>
+          <p:nvPr>
+            <p:ph idx="1"/>
+          </p:nvPr>
+        </p:nvSpPr>
+        <p:spPr/>
+        <p:txBody>
+          <a:bodyPr>
+            <a:normAutofit/>
+          </a:bodyPr>
+          <a:lstStyle/>
+          <a:p>
+            <a:pPr algn="just"/>
+            <a:r>
+              <a:rPr lang="en-US" dirty="0"/>
+              <a:t>An IDE: VS Code for this demo, but any IDE that supports C# and </a:t>
+            </a:r>
+            <a:r>
+              <a:rPr lang="en-US" dirty="0" err="1"/>
+              <a:t>nodeJS</a:t>
+            </a:r>
+            <a:endParaRPr lang="en-US" dirty="0"/>
+          </a:p>
+          <a:p>
+            <a:pPr algn="just"/>
+            <a:r>
+              <a:rPr lang="en-US" dirty="0"/>
+              <a:t>Git: I will use command line</a:t>
+            </a:r>
+          </a:p>
+          <a:p>
+            <a:pPr algn="just"/>
+            <a:r>
+              <a:rPr lang="en-US" dirty="0" err="1"/>
+              <a:t>NodeJs</a:t>
+            </a:r>
+            <a:r>
+              <a:rPr lang="en-US" dirty="0"/>
+              <a:t>: mostly for the build environment</a:t>
+            </a:r>
+          </a:p>
+          <a:p>
+            <a:pPr algn="just"/>
+            <a:r>
+              <a:rPr lang="en-US" dirty="0"/>
+              <a:t>Yarn (or NPM)</a:t>
+            </a:r>
+          </a:p>
+          <a:p>
+            <a:pPr algn="just"/>
+            <a:r>
+              <a:rPr lang="en-US" dirty="0"/>
+              <a:t>Dotnet core 2.1 (other version should work fine)</a:t>
+            </a:r>
+          </a:p>
+          <a:p>
+            <a:pPr algn="just"/>
+            <a:r>
+              <a:rPr lang="en-US" dirty="0"/>
+              <a:t>Azure CLI SDK (and OpenSSL)</a:t>
+            </a:r>
+          </a:p>
+        </p:txBody>
+      </p:sp>
+    </p:spTree>
+    <p:extLst>
+      <p:ext uri="{BB962C8B-B14F-4D97-AF65-F5344CB8AC3E}">
+        <p14:creationId xmlns:p14="http://schemas.microsoft.com/office/powerpoint/2010/main" val="3068686399"/>
+      </p:ext>
+    </p:extLst>
+  </p:cSld>
+  <p:clrMapOvr>
+    <a:masterClrMapping/>
+  </p:clrMapOvr>
 </p:sld>
 </file>
 

</xml_diff>

<commit_message>
Final update of PPT
</commit_message>
<xml_diff>
--- a/Presentation/Full Open-Source CI.pptx
+++ b/Presentation/Full Open-Source CI.pptx
@@ -42,14 +42,16 @@
     <p:sldId id="294" r:id="rId36"/>
     <p:sldId id="295" r:id="rId37"/>
     <p:sldId id="296" r:id="rId38"/>
-    <p:sldId id="297" r:id="rId39"/>
-    <p:sldId id="304" r:id="rId40"/>
-    <p:sldId id="305" r:id="rId41"/>
-    <p:sldId id="303" r:id="rId42"/>
-    <p:sldId id="306" r:id="rId43"/>
-    <p:sldId id="307" r:id="rId44"/>
-    <p:sldId id="300" r:id="rId45"/>
-    <p:sldId id="273" r:id="rId46"/>
+    <p:sldId id="304" r:id="rId39"/>
+    <p:sldId id="305" r:id="rId40"/>
+    <p:sldId id="303" r:id="rId41"/>
+    <p:sldId id="306" r:id="rId42"/>
+    <p:sldId id="307" r:id="rId43"/>
+    <p:sldId id="300" r:id="rId44"/>
+    <p:sldId id="308" r:id="rId45"/>
+    <p:sldId id="297" r:id="rId46"/>
+    <p:sldId id="309" r:id="rId47"/>
+    <p:sldId id="273" r:id="rId48"/>
   </p:sldIdLst>
   <p:sldSz cx="12192000" cy="6858000"/>
   <p:notesSz cx="6858000" cy="9144000"/>
@@ -1082,7 +1084,7 @@
           <a:noFill/>
           <a:extLst>
             <a:ext uri="{909E8E84-426E-40dd-AFC4-6F175D3DCCD1}">
-              <a14:hiddenFill xmlns="" xmlns:a14="http://schemas.microsoft.com/office/drawing/2010/main">
+              <a14:hiddenFill xmlns:a14="http://schemas.microsoft.com/office/drawing/2010/main" xmlns="">
                 <a:solidFill>
                   <a:srgbClr val="FFFFFF"/>
                 </a:solidFill>
@@ -1142,7 +1144,7 @@
             </a:ln>
             <a:extLst>
               <a:ext uri="{91240B29-F687-4f45-9708-019B960494DF}">
-                <a14:hiddenLine xmlns="" xmlns:a14="http://schemas.microsoft.com/office/drawing/2010/main" w="9525">
+                <a14:hiddenLine xmlns:a14="http://schemas.microsoft.com/office/drawing/2010/main" xmlns="" w="9525">
                   <a:solidFill>
                     <a:srgbClr val="000000"/>
                   </a:solidFill>
@@ -1232,7 +1234,7 @@
             </a:ln>
             <a:extLst>
               <a:ext uri="{91240B29-F687-4f45-9708-019B960494DF}">
-                <a14:hiddenLine xmlns="" xmlns:a14="http://schemas.microsoft.com/office/drawing/2010/main" w="9525">
+                <a14:hiddenLine xmlns:a14="http://schemas.microsoft.com/office/drawing/2010/main" xmlns="" w="9525">
                   <a:solidFill>
                     <a:srgbClr val="000000"/>
                   </a:solidFill>
@@ -1322,7 +1324,7 @@
             </a:ln>
             <a:extLst>
               <a:ext uri="{91240B29-F687-4f45-9708-019B960494DF}">
-                <a14:hiddenLine xmlns="" xmlns:a14="http://schemas.microsoft.com/office/drawing/2010/main" w="9525">
+                <a14:hiddenLine xmlns:a14="http://schemas.microsoft.com/office/drawing/2010/main" xmlns="" w="9525">
                   <a:solidFill>
                     <a:srgbClr val="000000"/>
                   </a:solidFill>
@@ -1356,7 +1358,7 @@
             </a:ln>
             <a:extLst>
               <a:ext uri="{91240B29-F687-4f45-9708-019B960494DF}">
-                <a14:hiddenLine xmlns="" xmlns:a14="http://schemas.microsoft.com/office/drawing/2010/main" w="9525">
+                <a14:hiddenLine xmlns:a14="http://schemas.microsoft.com/office/drawing/2010/main" xmlns="" w="9525">
                   <a:solidFill>
                     <a:srgbClr val="000000"/>
                   </a:solidFill>
@@ -1446,7 +1448,7 @@
             </a:ln>
             <a:extLst>
               <a:ext uri="{91240B29-F687-4f45-9708-019B960494DF}">
-                <a14:hiddenLine xmlns="" xmlns:a14="http://schemas.microsoft.com/office/drawing/2010/main" w="9525">
+                <a14:hiddenLine xmlns:a14="http://schemas.microsoft.com/office/drawing/2010/main" xmlns="" w="9525">
                   <a:solidFill>
                     <a:srgbClr val="000000"/>
                   </a:solidFill>
@@ -1508,7 +1510,7 @@
             </a:ln>
             <a:extLst>
               <a:ext uri="{91240B29-F687-4f45-9708-019B960494DF}">
-                <a14:hiddenLine xmlns="" xmlns:a14="http://schemas.microsoft.com/office/drawing/2010/main" w="9525">
+                <a14:hiddenLine xmlns:a14="http://schemas.microsoft.com/office/drawing/2010/main" xmlns="" w="9525">
                   <a:solidFill>
                     <a:srgbClr val="000000"/>
                   </a:solidFill>
@@ -1570,7 +1572,7 @@
             </a:ln>
             <a:extLst>
               <a:ext uri="{91240B29-F687-4f45-9708-019B960494DF}">
-                <a14:hiddenLine xmlns="" xmlns:a14="http://schemas.microsoft.com/office/drawing/2010/main" w="9525">
+                <a14:hiddenLine xmlns:a14="http://schemas.microsoft.com/office/drawing/2010/main" xmlns="" w="9525">
                   <a:solidFill>
                     <a:srgbClr val="000000"/>
                   </a:solidFill>
@@ -1660,7 +1662,7 @@
             </a:ln>
             <a:extLst>
               <a:ext uri="{91240B29-F687-4f45-9708-019B960494DF}">
-                <a14:hiddenLine xmlns="" xmlns:a14="http://schemas.microsoft.com/office/drawing/2010/main" w="9525">
+                <a14:hiddenLine xmlns:a14="http://schemas.microsoft.com/office/drawing/2010/main" xmlns="" w="9525">
                   <a:solidFill>
                     <a:srgbClr val="000000"/>
                   </a:solidFill>
@@ -1722,7 +1724,7 @@
             </a:ln>
             <a:extLst>
               <a:ext uri="{91240B29-F687-4f45-9708-019B960494DF}">
-                <a14:hiddenLine xmlns="" xmlns:a14="http://schemas.microsoft.com/office/drawing/2010/main" w="9525">
+                <a14:hiddenLine xmlns:a14="http://schemas.microsoft.com/office/drawing/2010/main" xmlns="" w="9525">
                   <a:solidFill>
                     <a:srgbClr val="000000"/>
                   </a:solidFill>
@@ -1784,7 +1786,7 @@
             </a:ln>
             <a:extLst>
               <a:ext uri="{91240B29-F687-4f45-9708-019B960494DF}">
-                <a14:hiddenLine xmlns="" xmlns:a14="http://schemas.microsoft.com/office/drawing/2010/main" w="9525">
+                <a14:hiddenLine xmlns:a14="http://schemas.microsoft.com/office/drawing/2010/main" xmlns="" w="9525">
                   <a:solidFill>
                     <a:srgbClr val="000000"/>
                   </a:solidFill>
@@ -1874,7 +1876,7 @@
             </a:ln>
             <a:extLst>
               <a:ext uri="{91240B29-F687-4f45-9708-019B960494DF}">
-                <a14:hiddenLine xmlns="" xmlns:a14="http://schemas.microsoft.com/office/drawing/2010/main" w="9525">
+                <a14:hiddenLine xmlns:a14="http://schemas.microsoft.com/office/drawing/2010/main" xmlns="" w="9525">
                   <a:solidFill>
                     <a:srgbClr val="000000"/>
                   </a:solidFill>
@@ -1964,7 +1966,7 @@
             </a:ln>
             <a:extLst>
               <a:ext uri="{91240B29-F687-4f45-9708-019B960494DF}">
-                <a14:hiddenLine xmlns="" xmlns:a14="http://schemas.microsoft.com/office/drawing/2010/main" w="9525">
+                <a14:hiddenLine xmlns:a14="http://schemas.microsoft.com/office/drawing/2010/main" xmlns="" w="9525">
                   <a:solidFill>
                     <a:srgbClr val="000000"/>
                   </a:solidFill>
@@ -2026,7 +2028,7 @@
             </a:ln>
             <a:extLst>
               <a:ext uri="{91240B29-F687-4f45-9708-019B960494DF}">
-                <a14:hiddenLine xmlns="" xmlns:a14="http://schemas.microsoft.com/office/drawing/2010/main" w="9525">
+                <a14:hiddenLine xmlns:a14="http://schemas.microsoft.com/office/drawing/2010/main" xmlns="" w="9525">
                   <a:solidFill>
                     <a:srgbClr val="000000"/>
                   </a:solidFill>
@@ -2136,7 +2138,7 @@
             </a:ln>
             <a:extLst>
               <a:ext uri="{91240B29-F687-4f45-9708-019B960494DF}">
-                <a14:hiddenLine xmlns="" xmlns:a14="http://schemas.microsoft.com/office/drawing/2010/main" w="9525">
+                <a14:hiddenLine xmlns:a14="http://schemas.microsoft.com/office/drawing/2010/main" xmlns="" w="9525">
                   <a:solidFill>
                     <a:srgbClr val="000000"/>
                   </a:solidFill>
@@ -2198,7 +2200,7 @@
             </a:ln>
             <a:extLst>
               <a:ext uri="{91240B29-F687-4f45-9708-019B960494DF}">
-                <a14:hiddenLine xmlns="" xmlns:a14="http://schemas.microsoft.com/office/drawing/2010/main" w="9525">
+                <a14:hiddenLine xmlns:a14="http://schemas.microsoft.com/office/drawing/2010/main" xmlns="" w="9525">
                   <a:solidFill>
                     <a:srgbClr val="000000"/>
                   </a:solidFill>
@@ -2288,7 +2290,7 @@
             </a:ln>
             <a:extLst>
               <a:ext uri="{91240B29-F687-4f45-9708-019B960494DF}">
-                <a14:hiddenLine xmlns="" xmlns:a14="http://schemas.microsoft.com/office/drawing/2010/main" w="9525">
+                <a14:hiddenLine xmlns:a14="http://schemas.microsoft.com/office/drawing/2010/main" xmlns="" w="9525">
                   <a:solidFill>
                     <a:srgbClr val="000000"/>
                   </a:solidFill>
@@ -2378,7 +2380,7 @@
             </a:ln>
             <a:extLst>
               <a:ext uri="{91240B29-F687-4f45-9708-019B960494DF}">
-                <a14:hiddenLine xmlns="" xmlns:a14="http://schemas.microsoft.com/office/drawing/2010/main" w="9525">
+                <a14:hiddenLine xmlns:a14="http://schemas.microsoft.com/office/drawing/2010/main" xmlns="" w="9525">
                   <a:solidFill>
                     <a:srgbClr val="000000"/>
                   </a:solidFill>
@@ -2440,7 +2442,7 @@
             </a:ln>
             <a:extLst>
               <a:ext uri="{91240B29-F687-4f45-9708-019B960494DF}">
-                <a14:hiddenLine xmlns="" xmlns:a14="http://schemas.microsoft.com/office/drawing/2010/main" w="9525">
+                <a14:hiddenLine xmlns:a14="http://schemas.microsoft.com/office/drawing/2010/main" xmlns="" w="9525">
                   <a:solidFill>
                     <a:srgbClr val="000000"/>
                   </a:solidFill>
@@ -2530,7 +2532,7 @@
             </a:ln>
             <a:extLst>
               <a:ext uri="{91240B29-F687-4f45-9708-019B960494DF}">
-                <a14:hiddenLine xmlns="" xmlns:a14="http://schemas.microsoft.com/office/drawing/2010/main" w="9525">
+                <a14:hiddenLine xmlns:a14="http://schemas.microsoft.com/office/drawing/2010/main" xmlns="" w="9525">
                   <a:solidFill>
                     <a:srgbClr val="000000"/>
                   </a:solidFill>
@@ -2620,7 +2622,7 @@
             </a:ln>
             <a:extLst>
               <a:ext uri="{91240B29-F687-4f45-9708-019B960494DF}">
-                <a14:hiddenLine xmlns="" xmlns:a14="http://schemas.microsoft.com/office/drawing/2010/main" w="9525">
+                <a14:hiddenLine xmlns:a14="http://schemas.microsoft.com/office/drawing/2010/main" xmlns="" w="9525">
                   <a:solidFill>
                     <a:srgbClr val="000000"/>
                   </a:solidFill>
@@ -2676,7 +2678,7 @@
             </a:ln>
             <a:extLst>
               <a:ext uri="{91240B29-F687-4f45-9708-019B960494DF}">
-                <a14:hiddenLine xmlns="" xmlns:a14="http://schemas.microsoft.com/office/drawing/2010/main" w="9525">
+                <a14:hiddenLine xmlns:a14="http://schemas.microsoft.com/office/drawing/2010/main" xmlns="" w="9525">
                   <a:solidFill>
                     <a:srgbClr val="000000"/>
                   </a:solidFill>
@@ -2766,7 +2768,7 @@
             </a:ln>
             <a:extLst>
               <a:ext uri="{91240B29-F687-4f45-9708-019B960494DF}">
-                <a14:hiddenLine xmlns="" xmlns:a14="http://schemas.microsoft.com/office/drawing/2010/main" w="9525">
+                <a14:hiddenLine xmlns:a14="http://schemas.microsoft.com/office/drawing/2010/main" xmlns="" w="9525">
                   <a:solidFill>
                     <a:srgbClr val="000000"/>
                   </a:solidFill>
@@ -2822,7 +2824,7 @@
             </a:ln>
             <a:extLst>
               <a:ext uri="{91240B29-F687-4f45-9708-019B960494DF}">
-                <a14:hiddenLine xmlns="" xmlns:a14="http://schemas.microsoft.com/office/drawing/2010/main" w="9525">
+                <a14:hiddenLine xmlns:a14="http://schemas.microsoft.com/office/drawing/2010/main" xmlns="" w="9525">
                   <a:solidFill>
                     <a:srgbClr val="000000"/>
                   </a:solidFill>
@@ -2912,7 +2914,7 @@
             </a:ln>
             <a:extLst>
               <a:ext uri="{91240B29-F687-4f45-9708-019B960494DF}">
-                <a14:hiddenLine xmlns="" xmlns:a14="http://schemas.microsoft.com/office/drawing/2010/main" w="9525">
+                <a14:hiddenLine xmlns:a14="http://schemas.microsoft.com/office/drawing/2010/main" xmlns="" w="9525">
                   <a:solidFill>
                     <a:srgbClr val="000000"/>
                   </a:solidFill>
@@ -2980,7 +2982,7 @@
             </a:ln>
             <a:extLst>
               <a:ext uri="{91240B29-F687-4f45-9708-019B960494DF}">
-                <a14:hiddenLine xmlns="" xmlns:a14="http://schemas.microsoft.com/office/drawing/2010/main" w="9525">
+                <a14:hiddenLine xmlns:a14="http://schemas.microsoft.com/office/drawing/2010/main" xmlns="" w="9525">
                   <a:solidFill>
                     <a:srgbClr val="000000"/>
                   </a:solidFill>
@@ -3070,7 +3072,7 @@
             </a:ln>
             <a:extLst>
               <a:ext uri="{91240B29-F687-4f45-9708-019B960494DF}">
-                <a14:hiddenLine xmlns="" xmlns:a14="http://schemas.microsoft.com/office/drawing/2010/main" w="9525">
+                <a14:hiddenLine xmlns:a14="http://schemas.microsoft.com/office/drawing/2010/main" xmlns="" w="9525">
                   <a:solidFill>
                     <a:srgbClr val="000000"/>
                   </a:solidFill>
@@ -3138,7 +3140,7 @@
             </a:ln>
             <a:extLst>
               <a:ext uri="{91240B29-F687-4f45-9708-019B960494DF}">
-                <a14:hiddenLine xmlns="" xmlns:a14="http://schemas.microsoft.com/office/drawing/2010/main" w="9525">
+                <a14:hiddenLine xmlns:a14="http://schemas.microsoft.com/office/drawing/2010/main" xmlns="" w="9525">
                   <a:solidFill>
                     <a:srgbClr val="000000"/>
                   </a:solidFill>
@@ -3228,7 +3230,7 @@
             </a:ln>
             <a:extLst>
               <a:ext uri="{91240B29-F687-4f45-9708-019B960494DF}">
-                <a14:hiddenLine xmlns="" xmlns:a14="http://schemas.microsoft.com/office/drawing/2010/main" w="9525">
+                <a14:hiddenLine xmlns:a14="http://schemas.microsoft.com/office/drawing/2010/main" xmlns="" w="9525">
                   <a:solidFill>
                     <a:srgbClr val="000000"/>
                   </a:solidFill>
@@ -3262,7 +3264,7 @@
             </a:ln>
             <a:extLst>
               <a:ext uri="{91240B29-F687-4f45-9708-019B960494DF}">
-                <a14:hiddenLine xmlns="" xmlns:a14="http://schemas.microsoft.com/office/drawing/2010/main" w="9525">
+                <a14:hiddenLine xmlns:a14="http://schemas.microsoft.com/office/drawing/2010/main" xmlns="" w="9525">
                   <a:solidFill>
                     <a:srgbClr val="000000"/>
                   </a:solidFill>
@@ -3352,7 +3354,7 @@
             </a:ln>
             <a:extLst>
               <a:ext uri="{91240B29-F687-4f45-9708-019B960494DF}">
-                <a14:hiddenLine xmlns="" xmlns:a14="http://schemas.microsoft.com/office/drawing/2010/main" w="9525">
+                <a14:hiddenLine xmlns:a14="http://schemas.microsoft.com/office/drawing/2010/main" xmlns="" w="9525">
                   <a:solidFill>
                     <a:srgbClr val="000000"/>
                   </a:solidFill>
@@ -3414,7 +3416,7 @@
             </a:ln>
             <a:extLst>
               <a:ext uri="{91240B29-F687-4f45-9708-019B960494DF}">
-                <a14:hiddenLine xmlns="" xmlns:a14="http://schemas.microsoft.com/office/drawing/2010/main" w="9525">
+                <a14:hiddenLine xmlns:a14="http://schemas.microsoft.com/office/drawing/2010/main" xmlns="" w="9525">
                   <a:solidFill>
                     <a:srgbClr val="000000"/>
                   </a:solidFill>
@@ -3476,7 +3478,7 @@
             </a:ln>
             <a:extLst>
               <a:ext uri="{91240B29-F687-4f45-9708-019B960494DF}">
-                <a14:hiddenLine xmlns="" xmlns:a14="http://schemas.microsoft.com/office/drawing/2010/main" w="9525">
+                <a14:hiddenLine xmlns:a14="http://schemas.microsoft.com/office/drawing/2010/main" xmlns="" w="9525">
                   <a:solidFill>
                     <a:srgbClr val="000000"/>
                   </a:solidFill>
@@ -3566,7 +3568,7 @@
             </a:ln>
             <a:extLst>
               <a:ext uri="{91240B29-F687-4f45-9708-019B960494DF}">
-                <a14:hiddenLine xmlns="" xmlns:a14="http://schemas.microsoft.com/office/drawing/2010/main" w="9525">
+                <a14:hiddenLine xmlns:a14="http://schemas.microsoft.com/office/drawing/2010/main" xmlns="" w="9525">
                   <a:solidFill>
                     <a:srgbClr val="000000"/>
                   </a:solidFill>
@@ -3634,7 +3636,7 @@
             </a:ln>
             <a:extLst>
               <a:ext uri="{91240B29-F687-4f45-9708-019B960494DF}">
-                <a14:hiddenLine xmlns="" xmlns:a14="http://schemas.microsoft.com/office/drawing/2010/main" w="9525">
+                <a14:hiddenLine xmlns:a14="http://schemas.microsoft.com/office/drawing/2010/main" xmlns="" w="9525">
                   <a:solidFill>
                     <a:srgbClr val="000000"/>
                   </a:solidFill>
@@ -3696,7 +3698,7 @@
             </a:ln>
             <a:extLst>
               <a:ext uri="{91240B29-F687-4f45-9708-019B960494DF}">
-                <a14:hiddenLine xmlns="" xmlns:a14="http://schemas.microsoft.com/office/drawing/2010/main" w="9525">
+                <a14:hiddenLine xmlns:a14="http://schemas.microsoft.com/office/drawing/2010/main" xmlns="" w="9525">
                   <a:solidFill>
                     <a:srgbClr val="000000"/>
                   </a:solidFill>
@@ -3786,7 +3788,7 @@
             </a:ln>
             <a:extLst>
               <a:ext uri="{91240B29-F687-4f45-9708-019B960494DF}">
-                <a14:hiddenLine xmlns="" xmlns:a14="http://schemas.microsoft.com/office/drawing/2010/main" w="9525">
+                <a14:hiddenLine xmlns:a14="http://schemas.microsoft.com/office/drawing/2010/main" xmlns="" w="9525">
                   <a:solidFill>
                     <a:srgbClr val="000000"/>
                   </a:solidFill>
@@ -3848,7 +3850,7 @@
             </a:ln>
             <a:extLst>
               <a:ext uri="{91240B29-F687-4f45-9708-019B960494DF}">
-                <a14:hiddenLine xmlns="" xmlns:a14="http://schemas.microsoft.com/office/drawing/2010/main" w="9525">
+                <a14:hiddenLine xmlns:a14="http://schemas.microsoft.com/office/drawing/2010/main" xmlns="" w="9525">
                   <a:solidFill>
                     <a:srgbClr val="000000"/>
                   </a:solidFill>
@@ -3938,7 +3940,7 @@
             </a:ln>
             <a:extLst>
               <a:ext uri="{91240B29-F687-4f45-9708-019B960494DF}">
-                <a14:hiddenLine xmlns="" xmlns:a14="http://schemas.microsoft.com/office/drawing/2010/main" w="9525">
+                <a14:hiddenLine xmlns:a14="http://schemas.microsoft.com/office/drawing/2010/main" xmlns="" w="9525">
                   <a:solidFill>
                     <a:srgbClr val="000000"/>
                   </a:solidFill>
@@ -4000,7 +4002,7 @@
             </a:ln>
             <a:extLst>
               <a:ext uri="{91240B29-F687-4f45-9708-019B960494DF}">
-                <a14:hiddenLine xmlns="" xmlns:a14="http://schemas.microsoft.com/office/drawing/2010/main" w="9525">
+                <a14:hiddenLine xmlns:a14="http://schemas.microsoft.com/office/drawing/2010/main" xmlns="" w="9525">
                   <a:solidFill>
                     <a:srgbClr val="000000"/>
                   </a:solidFill>
@@ -4090,7 +4092,7 @@
             </a:ln>
             <a:extLst>
               <a:ext uri="{91240B29-F687-4f45-9708-019B960494DF}">
-                <a14:hiddenLine xmlns="" xmlns:a14="http://schemas.microsoft.com/office/drawing/2010/main" w="9525">
+                <a14:hiddenLine xmlns:a14="http://schemas.microsoft.com/office/drawing/2010/main" xmlns="" w="9525">
                   <a:solidFill>
                     <a:srgbClr val="000000"/>
                   </a:solidFill>
@@ -4124,7 +4126,7 @@
             </a:ln>
             <a:extLst>
               <a:ext uri="{91240B29-F687-4f45-9708-019B960494DF}">
-                <a14:hiddenLine xmlns="" xmlns:a14="http://schemas.microsoft.com/office/drawing/2010/main" w="9525">
+                <a14:hiddenLine xmlns:a14="http://schemas.microsoft.com/office/drawing/2010/main" xmlns="" w="9525">
                   <a:solidFill>
                     <a:srgbClr val="000000"/>
                   </a:solidFill>
@@ -4189,7 +4191,7 @@
             </a:ln>
             <a:extLst>
               <a:ext uri="{91240B29-F687-4f45-9708-019B960494DF}">
-                <a14:hiddenLine xmlns="" xmlns:a14="http://schemas.microsoft.com/office/drawing/2010/main" w="9525">
+                <a14:hiddenLine xmlns:a14="http://schemas.microsoft.com/office/drawing/2010/main" xmlns="" w="9525">
                   <a:solidFill>
                     <a:srgbClr val="000000"/>
                   </a:solidFill>
@@ -4279,7 +4281,7 @@
             </a:ln>
             <a:extLst>
               <a:ext uri="{91240B29-F687-4f45-9708-019B960494DF}">
-                <a14:hiddenLine xmlns="" xmlns:a14="http://schemas.microsoft.com/office/drawing/2010/main" w="9525">
+                <a14:hiddenLine xmlns:a14="http://schemas.microsoft.com/office/drawing/2010/main" xmlns="" w="9525">
                   <a:solidFill>
                     <a:srgbClr val="000000"/>
                   </a:solidFill>
@@ -4341,7 +4343,7 @@
             </a:ln>
             <a:extLst>
               <a:ext uri="{91240B29-F687-4f45-9708-019B960494DF}">
-                <a14:hiddenLine xmlns="" xmlns:a14="http://schemas.microsoft.com/office/drawing/2010/main" w="9525">
+                <a14:hiddenLine xmlns:a14="http://schemas.microsoft.com/office/drawing/2010/main" xmlns="" w="9525">
                   <a:solidFill>
                     <a:srgbClr val="000000"/>
                   </a:solidFill>
@@ -4431,7 +4433,7 @@
             </a:ln>
             <a:extLst>
               <a:ext uri="{91240B29-F687-4f45-9708-019B960494DF}">
-                <a14:hiddenLine xmlns="" xmlns:a14="http://schemas.microsoft.com/office/drawing/2010/main" w="9525">
+                <a14:hiddenLine xmlns:a14="http://schemas.microsoft.com/office/drawing/2010/main" xmlns="" w="9525">
                   <a:solidFill>
                     <a:srgbClr val="000000"/>
                   </a:solidFill>
@@ -4521,7 +4523,7 @@
             </a:ln>
             <a:extLst>
               <a:ext uri="{91240B29-F687-4f45-9708-019B960494DF}">
-                <a14:hiddenLine xmlns="" xmlns:a14="http://schemas.microsoft.com/office/drawing/2010/main" w="9525">
+                <a14:hiddenLine xmlns:a14="http://schemas.microsoft.com/office/drawing/2010/main" xmlns="" w="9525">
                   <a:solidFill>
                     <a:srgbClr val="000000"/>
                   </a:solidFill>
@@ -4586,7 +4588,7 @@
             </a:ln>
             <a:extLst>
               <a:ext uri="{91240B29-F687-4f45-9708-019B960494DF}">
-                <a14:hiddenLine xmlns="" xmlns:a14="http://schemas.microsoft.com/office/drawing/2010/main" w="9525">
+                <a14:hiddenLine xmlns:a14="http://schemas.microsoft.com/office/drawing/2010/main" xmlns="" w="9525">
                   <a:solidFill>
                     <a:srgbClr val="000000"/>
                   </a:solidFill>
@@ -4648,7 +4650,7 @@
             </a:ln>
             <a:extLst>
               <a:ext uri="{91240B29-F687-4f45-9708-019B960494DF}">
-                <a14:hiddenLine xmlns="" xmlns:a14="http://schemas.microsoft.com/office/drawing/2010/main" w="9525">
+                <a14:hiddenLine xmlns:a14="http://schemas.microsoft.com/office/drawing/2010/main" xmlns="" w="9525">
                   <a:solidFill>
                     <a:srgbClr val="000000"/>
                   </a:solidFill>
@@ -4738,7 +4740,7 @@
             </a:ln>
             <a:extLst>
               <a:ext uri="{91240B29-F687-4f45-9708-019B960494DF}">
-                <a14:hiddenLine xmlns="" xmlns:a14="http://schemas.microsoft.com/office/drawing/2010/main" w="9525">
+                <a14:hiddenLine xmlns:a14="http://schemas.microsoft.com/office/drawing/2010/main" xmlns="" w="9525">
                   <a:solidFill>
                     <a:srgbClr val="000000"/>
                   </a:solidFill>
@@ -4828,7 +4830,7 @@
             </a:ln>
             <a:extLst>
               <a:ext uri="{91240B29-F687-4f45-9708-019B960494DF}">
-                <a14:hiddenLine xmlns="" xmlns:a14="http://schemas.microsoft.com/office/drawing/2010/main" w="9525">
+                <a14:hiddenLine xmlns:a14="http://schemas.microsoft.com/office/drawing/2010/main" xmlns="" w="9525">
                   <a:solidFill>
                     <a:srgbClr val="000000"/>
                   </a:solidFill>
@@ -4890,7 +4892,7 @@
             </a:ln>
             <a:extLst>
               <a:ext uri="{91240B29-F687-4f45-9708-019B960494DF}">
-                <a14:hiddenLine xmlns="" xmlns:a14="http://schemas.microsoft.com/office/drawing/2010/main" w="9525">
+                <a14:hiddenLine xmlns:a14="http://schemas.microsoft.com/office/drawing/2010/main" xmlns="" w="9525">
                   <a:solidFill>
                     <a:srgbClr val="000000"/>
                   </a:solidFill>
@@ -5010,7 +5012,7 @@
             </a:ln>
             <a:extLst>
               <a:ext uri="{91240B29-F687-4f45-9708-019B960494DF}">
-                <a14:hiddenLine xmlns="" xmlns:a14="http://schemas.microsoft.com/office/drawing/2010/main" w="9525">
+                <a14:hiddenLine xmlns:a14="http://schemas.microsoft.com/office/drawing/2010/main" xmlns="" w="9525">
                   <a:solidFill>
                     <a:srgbClr val="000000"/>
                   </a:solidFill>
@@ -5078,7 +5080,7 @@
             </a:ln>
             <a:extLst>
               <a:ext uri="{91240B29-F687-4f45-9708-019B960494DF}">
-                <a14:hiddenLine xmlns="" xmlns:a14="http://schemas.microsoft.com/office/drawing/2010/main" w="9525">
+                <a14:hiddenLine xmlns:a14="http://schemas.microsoft.com/office/drawing/2010/main" xmlns="" w="9525">
                   <a:solidFill>
                     <a:srgbClr val="000000"/>
                   </a:solidFill>
@@ -5168,7 +5170,7 @@
             </a:ln>
             <a:extLst>
               <a:ext uri="{91240B29-F687-4f45-9708-019B960494DF}">
-                <a14:hiddenLine xmlns="" xmlns:a14="http://schemas.microsoft.com/office/drawing/2010/main" w="9525">
+                <a14:hiddenLine xmlns:a14="http://schemas.microsoft.com/office/drawing/2010/main" xmlns="" w="9525">
                   <a:solidFill>
                     <a:srgbClr val="000000"/>
                   </a:solidFill>
@@ -10009,7 +10011,7 @@
           <a:noFill/>
           <a:extLst>
             <a:ext uri="{909E8E84-426E-40dd-AFC4-6F175D3DCCD1}">
-              <a14:hiddenFill xmlns="" xmlns:a14="http://schemas.microsoft.com/office/drawing/2010/main">
+              <a14:hiddenFill xmlns:a14="http://schemas.microsoft.com/office/drawing/2010/main" xmlns="">
                 <a:solidFill>
                   <a:srgbClr val="FFFFFF"/>
                 </a:solidFill>
@@ -10083,7 +10085,7 @@
               </a:ln>
               <a:extLst>
                 <a:ext uri="{91240B29-F687-4f45-9708-019B960494DF}">
-                  <a14:hiddenLine xmlns="" xmlns:a14="http://schemas.microsoft.com/office/drawing/2010/main" w="9525">
+                  <a14:hiddenLine xmlns:a14="http://schemas.microsoft.com/office/drawing/2010/main" xmlns="" w="9525">
                     <a:solidFill>
                       <a:srgbClr val="000000"/>
                     </a:solidFill>
@@ -10173,7 +10175,7 @@
               </a:ln>
               <a:extLst>
                 <a:ext uri="{91240B29-F687-4f45-9708-019B960494DF}">
-                  <a14:hiddenLine xmlns="" xmlns:a14="http://schemas.microsoft.com/office/drawing/2010/main" w="9525">
+                  <a14:hiddenLine xmlns:a14="http://schemas.microsoft.com/office/drawing/2010/main" xmlns="" w="9525">
                     <a:solidFill>
                       <a:srgbClr val="000000"/>
                     </a:solidFill>
@@ -10263,7 +10265,7 @@
               </a:ln>
               <a:extLst>
                 <a:ext uri="{91240B29-F687-4f45-9708-019B960494DF}">
-                  <a14:hiddenLine xmlns="" xmlns:a14="http://schemas.microsoft.com/office/drawing/2010/main" w="9525">
+                  <a14:hiddenLine xmlns:a14="http://schemas.microsoft.com/office/drawing/2010/main" xmlns="" w="9525">
                     <a:solidFill>
                       <a:srgbClr val="000000"/>
                     </a:solidFill>
@@ -10325,7 +10327,7 @@
               </a:ln>
               <a:extLst>
                 <a:ext uri="{91240B29-F687-4f45-9708-019B960494DF}">
-                  <a14:hiddenLine xmlns="" xmlns:a14="http://schemas.microsoft.com/office/drawing/2010/main" w="9525">
+                  <a14:hiddenLine xmlns:a14="http://schemas.microsoft.com/office/drawing/2010/main" xmlns="" w="9525">
                     <a:solidFill>
                       <a:srgbClr val="000000"/>
                     </a:solidFill>
@@ -10415,7 +10417,7 @@
               </a:ln>
               <a:extLst>
                 <a:ext uri="{91240B29-F687-4f45-9708-019B960494DF}">
-                  <a14:hiddenLine xmlns="" xmlns:a14="http://schemas.microsoft.com/office/drawing/2010/main" w="9525">
+                  <a14:hiddenLine xmlns:a14="http://schemas.microsoft.com/office/drawing/2010/main" xmlns="" w="9525">
                     <a:solidFill>
                       <a:srgbClr val="000000"/>
                     </a:solidFill>
@@ -10477,7 +10479,7 @@
               </a:ln>
               <a:extLst>
                 <a:ext uri="{91240B29-F687-4f45-9708-019B960494DF}">
-                  <a14:hiddenLine xmlns="" xmlns:a14="http://schemas.microsoft.com/office/drawing/2010/main" w="9525">
+                  <a14:hiddenLine xmlns:a14="http://schemas.microsoft.com/office/drawing/2010/main" xmlns="" w="9525">
                     <a:solidFill>
                       <a:srgbClr val="000000"/>
                     </a:solidFill>
@@ -10539,7 +10541,7 @@
               </a:ln>
               <a:extLst>
                 <a:ext uri="{91240B29-F687-4f45-9708-019B960494DF}">
-                  <a14:hiddenLine xmlns="" xmlns:a14="http://schemas.microsoft.com/office/drawing/2010/main" w="9525">
+                  <a14:hiddenLine xmlns:a14="http://schemas.microsoft.com/office/drawing/2010/main" xmlns="" w="9525">
                     <a:solidFill>
                       <a:srgbClr val="000000"/>
                     </a:solidFill>
@@ -10629,7 +10631,7 @@
               </a:ln>
               <a:extLst>
                 <a:ext uri="{91240B29-F687-4f45-9708-019B960494DF}">
-                  <a14:hiddenLine xmlns="" xmlns:a14="http://schemas.microsoft.com/office/drawing/2010/main" w="9525">
+                  <a14:hiddenLine xmlns:a14="http://schemas.microsoft.com/office/drawing/2010/main" xmlns="" w="9525">
                     <a:solidFill>
                       <a:srgbClr val="000000"/>
                     </a:solidFill>
@@ -10719,7 +10721,7 @@
               </a:ln>
               <a:extLst>
                 <a:ext uri="{91240B29-F687-4f45-9708-019B960494DF}">
-                  <a14:hiddenLine xmlns="" xmlns:a14="http://schemas.microsoft.com/office/drawing/2010/main" w="9525">
+                  <a14:hiddenLine xmlns:a14="http://schemas.microsoft.com/office/drawing/2010/main" xmlns="" w="9525">
                     <a:solidFill>
                       <a:srgbClr val="000000"/>
                     </a:solidFill>
@@ -10781,7 +10783,7 @@
               </a:ln>
               <a:extLst>
                 <a:ext uri="{91240B29-F687-4f45-9708-019B960494DF}">
-                  <a14:hiddenLine xmlns="" xmlns:a14="http://schemas.microsoft.com/office/drawing/2010/main" w="9525">
+                  <a14:hiddenLine xmlns:a14="http://schemas.microsoft.com/office/drawing/2010/main" xmlns="" w="9525">
                     <a:solidFill>
                       <a:srgbClr val="000000"/>
                     </a:solidFill>
@@ -10891,7 +10893,7 @@
               </a:ln>
               <a:extLst>
                 <a:ext uri="{91240B29-F687-4f45-9708-019B960494DF}">
-                  <a14:hiddenLine xmlns="" xmlns:a14="http://schemas.microsoft.com/office/drawing/2010/main" w="9525">
+                  <a14:hiddenLine xmlns:a14="http://schemas.microsoft.com/office/drawing/2010/main" xmlns="" w="9525">
                     <a:solidFill>
                       <a:srgbClr val="000000"/>
                     </a:solidFill>
@@ -10975,7 +10977,7 @@
               </a:ln>
               <a:extLst>
                 <a:ext uri="{91240B29-F687-4f45-9708-019B960494DF}">
-                  <a14:hiddenLine xmlns="" xmlns:a14="http://schemas.microsoft.com/office/drawing/2010/main" w="9525">
+                  <a14:hiddenLine xmlns:a14="http://schemas.microsoft.com/office/drawing/2010/main" xmlns="" w="9525">
                     <a:solidFill>
                       <a:srgbClr val="000000"/>
                     </a:solidFill>
@@ -11037,7 +11039,7 @@
               </a:ln>
               <a:extLst>
                 <a:ext uri="{91240B29-F687-4f45-9708-019B960494DF}">
-                  <a14:hiddenLine xmlns="" xmlns:a14="http://schemas.microsoft.com/office/drawing/2010/main" w="9525">
+                  <a14:hiddenLine xmlns:a14="http://schemas.microsoft.com/office/drawing/2010/main" xmlns="" w="9525">
                     <a:solidFill>
                       <a:srgbClr val="000000"/>
                     </a:solidFill>
@@ -11099,7 +11101,7 @@
               </a:ln>
               <a:extLst>
                 <a:ext uri="{91240B29-F687-4f45-9708-019B960494DF}">
-                  <a14:hiddenLine xmlns="" xmlns:a14="http://schemas.microsoft.com/office/drawing/2010/main" w="9525">
+                  <a14:hiddenLine xmlns:a14="http://schemas.microsoft.com/office/drawing/2010/main" xmlns="" w="9525">
                     <a:solidFill>
                       <a:srgbClr val="000000"/>
                     </a:solidFill>
@@ -11189,7 +11191,7 @@
               </a:ln>
               <a:extLst>
                 <a:ext uri="{91240B29-F687-4f45-9708-019B960494DF}">
-                  <a14:hiddenLine xmlns="" xmlns:a14="http://schemas.microsoft.com/office/drawing/2010/main" w="9525">
+                  <a14:hiddenLine xmlns:a14="http://schemas.microsoft.com/office/drawing/2010/main" xmlns="" w="9525">
                     <a:solidFill>
                       <a:srgbClr val="000000"/>
                     </a:solidFill>
@@ -11223,7 +11225,7 @@
               </a:ln>
               <a:extLst>
                 <a:ext uri="{91240B29-F687-4f45-9708-019B960494DF}">
-                  <a14:hiddenLine xmlns="" xmlns:a14="http://schemas.microsoft.com/office/drawing/2010/main" w="9525">
+                  <a14:hiddenLine xmlns:a14="http://schemas.microsoft.com/office/drawing/2010/main" xmlns="" w="9525">
                     <a:solidFill>
                       <a:srgbClr val="000000"/>
                     </a:solidFill>
@@ -11288,7 +11290,7 @@
               </a:ln>
               <a:extLst>
                 <a:ext uri="{91240B29-F687-4f45-9708-019B960494DF}">
-                  <a14:hiddenLine xmlns="" xmlns:a14="http://schemas.microsoft.com/office/drawing/2010/main" w="9525">
+                  <a14:hiddenLine xmlns:a14="http://schemas.microsoft.com/office/drawing/2010/main" xmlns="" w="9525">
                     <a:solidFill>
                       <a:srgbClr val="000000"/>
                     </a:solidFill>
@@ -11378,7 +11380,7 @@
               </a:ln>
               <a:extLst>
                 <a:ext uri="{91240B29-F687-4f45-9708-019B960494DF}">
-                  <a14:hiddenLine xmlns="" xmlns:a14="http://schemas.microsoft.com/office/drawing/2010/main" w="9525">
+                  <a14:hiddenLine xmlns:a14="http://schemas.microsoft.com/office/drawing/2010/main" xmlns="" w="9525">
                     <a:solidFill>
                       <a:srgbClr val="000000"/>
                     </a:solidFill>
@@ -11440,7 +11442,7 @@
               </a:ln>
               <a:extLst>
                 <a:ext uri="{91240B29-F687-4f45-9708-019B960494DF}">
-                  <a14:hiddenLine xmlns="" xmlns:a14="http://schemas.microsoft.com/office/drawing/2010/main" w="9525">
+                  <a14:hiddenLine xmlns:a14="http://schemas.microsoft.com/office/drawing/2010/main" xmlns="" w="9525">
                     <a:solidFill>
                       <a:srgbClr val="000000"/>
                     </a:solidFill>
@@ -11530,7 +11532,7 @@
               </a:ln>
               <a:extLst>
                 <a:ext uri="{91240B29-F687-4f45-9708-019B960494DF}">
-                  <a14:hiddenLine xmlns="" xmlns:a14="http://schemas.microsoft.com/office/drawing/2010/main" w="9525">
+                  <a14:hiddenLine xmlns:a14="http://schemas.microsoft.com/office/drawing/2010/main" xmlns="" w="9525">
                     <a:solidFill>
                       <a:srgbClr val="000000"/>
                     </a:solidFill>
@@ -11595,7 +11597,7 @@
               </a:ln>
               <a:extLst>
                 <a:ext uri="{91240B29-F687-4f45-9708-019B960494DF}">
-                  <a14:hiddenLine xmlns="" xmlns:a14="http://schemas.microsoft.com/office/drawing/2010/main" w="9525">
+                  <a14:hiddenLine xmlns:a14="http://schemas.microsoft.com/office/drawing/2010/main" xmlns="" w="9525">
                     <a:solidFill>
                       <a:srgbClr val="000000"/>
                     </a:solidFill>
@@ -11657,7 +11659,7 @@
               </a:ln>
               <a:extLst>
                 <a:ext uri="{91240B29-F687-4f45-9708-019B960494DF}">
-                  <a14:hiddenLine xmlns="" xmlns:a14="http://schemas.microsoft.com/office/drawing/2010/main" w="9525">
+                  <a14:hiddenLine xmlns:a14="http://schemas.microsoft.com/office/drawing/2010/main" xmlns="" w="9525">
                     <a:solidFill>
                       <a:srgbClr val="000000"/>
                     </a:solidFill>
@@ -11747,7 +11749,7 @@
               </a:ln>
               <a:extLst>
                 <a:ext uri="{91240B29-F687-4f45-9708-019B960494DF}">
-                  <a14:hiddenLine xmlns="" xmlns:a14="http://schemas.microsoft.com/office/drawing/2010/main" w="9525">
+                  <a14:hiddenLine xmlns:a14="http://schemas.microsoft.com/office/drawing/2010/main" xmlns="" w="9525">
                     <a:solidFill>
                       <a:srgbClr val="000000"/>
                     </a:solidFill>
@@ -11837,7 +11839,7 @@
               </a:ln>
               <a:extLst>
                 <a:ext uri="{91240B29-F687-4f45-9708-019B960494DF}">
-                  <a14:hiddenLine xmlns="" xmlns:a14="http://schemas.microsoft.com/office/drawing/2010/main" w="9525">
+                  <a14:hiddenLine xmlns:a14="http://schemas.microsoft.com/office/drawing/2010/main" xmlns="" w="9525">
                     <a:solidFill>
                       <a:srgbClr val="000000"/>
                     </a:solidFill>
@@ -11902,7 +11904,7 @@
               </a:ln>
               <a:extLst>
                 <a:ext uri="{91240B29-F687-4f45-9708-019B960494DF}">
-                  <a14:hiddenLine xmlns="" xmlns:a14="http://schemas.microsoft.com/office/drawing/2010/main" w="9525">
+                  <a14:hiddenLine xmlns:a14="http://schemas.microsoft.com/office/drawing/2010/main" xmlns="" w="9525">
                     <a:solidFill>
                       <a:srgbClr val="000000"/>
                     </a:solidFill>
@@ -12022,7 +12024,7 @@
               </a:ln>
               <a:extLst>
                 <a:ext uri="{91240B29-F687-4f45-9708-019B960494DF}">
-                  <a14:hiddenLine xmlns="" xmlns:a14="http://schemas.microsoft.com/office/drawing/2010/main" w="9525">
+                  <a14:hiddenLine xmlns:a14="http://schemas.microsoft.com/office/drawing/2010/main" xmlns="" w="9525">
                     <a:solidFill>
                       <a:srgbClr val="000000"/>
                     </a:solidFill>
@@ -12120,7 +12122,7 @@
               </a:ln>
               <a:extLst>
                 <a:ext uri="{91240B29-F687-4f45-9708-019B960494DF}">
-                  <a14:hiddenLine xmlns="" xmlns:a14="http://schemas.microsoft.com/office/drawing/2010/main" w="9525">
+                  <a14:hiddenLine xmlns:a14="http://schemas.microsoft.com/office/drawing/2010/main" xmlns="" w="9525">
                     <a:solidFill>
                       <a:srgbClr val="000000"/>
                     </a:solidFill>
@@ -12235,7 +12237,7 @@
               </a:ln>
               <a:extLst>
                 <a:ext uri="{91240B29-F687-4f45-9708-019B960494DF}">
-                  <a14:hiddenLine xmlns="" xmlns:a14="http://schemas.microsoft.com/office/drawing/2010/main" w="9525">
+                  <a14:hiddenLine xmlns:a14="http://schemas.microsoft.com/office/drawing/2010/main" xmlns="" w="9525">
                     <a:solidFill>
                       <a:srgbClr val="000000"/>
                     </a:solidFill>
@@ -12325,7 +12327,7 @@
               </a:ln>
               <a:extLst>
                 <a:ext uri="{91240B29-F687-4f45-9708-019B960494DF}">
-                  <a14:hiddenLine xmlns="" xmlns:a14="http://schemas.microsoft.com/office/drawing/2010/main" w="9525">
+                  <a14:hiddenLine xmlns:a14="http://schemas.microsoft.com/office/drawing/2010/main" xmlns="" w="9525">
                     <a:solidFill>
                       <a:srgbClr val="000000"/>
                     </a:solidFill>
@@ -12390,7 +12392,7 @@
               </a:ln>
               <a:extLst>
                 <a:ext uri="{91240B29-F687-4f45-9708-019B960494DF}">
-                  <a14:hiddenLine xmlns="" xmlns:a14="http://schemas.microsoft.com/office/drawing/2010/main" w="9525">
+                  <a14:hiddenLine xmlns:a14="http://schemas.microsoft.com/office/drawing/2010/main" xmlns="" w="9525">
                     <a:solidFill>
                       <a:srgbClr val="000000"/>
                     </a:solidFill>
@@ -12480,7 +12482,7 @@
               </a:ln>
               <a:extLst>
                 <a:ext uri="{91240B29-F687-4f45-9708-019B960494DF}">
-                  <a14:hiddenLine xmlns="" xmlns:a14="http://schemas.microsoft.com/office/drawing/2010/main" w="9525">
+                  <a14:hiddenLine xmlns:a14="http://schemas.microsoft.com/office/drawing/2010/main" xmlns="" w="9525">
                     <a:solidFill>
                       <a:srgbClr val="000000"/>
                     </a:solidFill>
@@ -12548,7 +12550,7 @@
               </a:ln>
               <a:extLst>
                 <a:ext uri="{91240B29-F687-4f45-9708-019B960494DF}">
-                  <a14:hiddenLine xmlns="" xmlns:a14="http://schemas.microsoft.com/office/drawing/2010/main" w="9525">
+                  <a14:hiddenLine xmlns:a14="http://schemas.microsoft.com/office/drawing/2010/main" xmlns="" w="9525">
                     <a:solidFill>
                       <a:srgbClr val="000000"/>
                     </a:solidFill>
@@ -12638,7 +12640,7 @@
               </a:ln>
               <a:extLst>
                 <a:ext uri="{91240B29-F687-4f45-9708-019B960494DF}">
-                  <a14:hiddenLine xmlns="" xmlns:a14="http://schemas.microsoft.com/office/drawing/2010/main" w="9525">
+                  <a14:hiddenLine xmlns:a14="http://schemas.microsoft.com/office/drawing/2010/main" xmlns="" w="9525">
                     <a:solidFill>
                       <a:srgbClr val="000000"/>
                     </a:solidFill>
@@ -12706,7 +12708,7 @@
               </a:ln>
               <a:extLst>
                 <a:ext uri="{91240B29-F687-4f45-9708-019B960494DF}">
-                  <a14:hiddenLine xmlns="" xmlns:a14="http://schemas.microsoft.com/office/drawing/2010/main" w="9525">
+                  <a14:hiddenLine xmlns:a14="http://schemas.microsoft.com/office/drawing/2010/main" xmlns="" w="9525">
                     <a:solidFill>
                       <a:srgbClr val="000000"/>
                     </a:solidFill>
@@ -12796,7 +12798,7 @@
               </a:ln>
               <a:extLst>
                 <a:ext uri="{91240B29-F687-4f45-9708-019B960494DF}">
-                  <a14:hiddenLine xmlns="" xmlns:a14="http://schemas.microsoft.com/office/drawing/2010/main" w="9525">
+                  <a14:hiddenLine xmlns:a14="http://schemas.microsoft.com/office/drawing/2010/main" xmlns="" w="9525">
                     <a:solidFill>
                       <a:srgbClr val="000000"/>
                     </a:solidFill>
@@ -12830,7 +12832,7 @@
               </a:ln>
               <a:extLst>
                 <a:ext uri="{91240B29-F687-4f45-9708-019B960494DF}">
-                  <a14:hiddenLine xmlns="" xmlns:a14="http://schemas.microsoft.com/office/drawing/2010/main" w="9525">
+                  <a14:hiddenLine xmlns:a14="http://schemas.microsoft.com/office/drawing/2010/main" xmlns="" w="9525">
                     <a:solidFill>
                       <a:srgbClr val="000000"/>
                     </a:solidFill>
@@ -23042,145 +23044,6 @@
           <p:cNvPr id="2" name="Title 1">
             <a:extLst>
               <a:ext uri="{FF2B5EF4-FFF2-40B4-BE49-F238E27FC236}">
-                <a16:creationId xmlns:a16="http://schemas.microsoft.com/office/drawing/2014/main" id="{861F233C-B236-4522-8293-96B783558169}"/>
-              </a:ext>
-            </a:extLst>
-          </p:cNvPr>
-          <p:cNvSpPr>
-            <a:spLocks noGrp="1"/>
-          </p:cNvSpPr>
-          <p:nvPr>
-            <p:ph type="title"/>
-          </p:nvPr>
-        </p:nvSpPr>
-        <p:spPr/>
-        <p:txBody>
-          <a:bodyPr/>
-          <a:lstStyle/>
-          <a:p>
-            <a:r>
-              <a:rPr lang="en-US" dirty="0"/>
-              <a:t>Recap and clean-up</a:t>
-            </a:r>
-          </a:p>
-        </p:txBody>
-      </p:sp>
-      <p:sp>
-        <p:nvSpPr>
-          <p:cNvPr id="3" name="Content Placeholder 2">
-            <a:extLst>
-              <a:ext uri="{FF2B5EF4-FFF2-40B4-BE49-F238E27FC236}">
-                <a16:creationId xmlns:a16="http://schemas.microsoft.com/office/drawing/2014/main" id="{745F733C-B22D-40C0-9DCF-A0B4081FE954}"/>
-              </a:ext>
-            </a:extLst>
-          </p:cNvPr>
-          <p:cNvSpPr>
-            <a:spLocks noGrp="1"/>
-          </p:cNvSpPr>
-          <p:nvPr>
-            <p:ph idx="1"/>
-          </p:nvPr>
-        </p:nvSpPr>
-        <p:spPr/>
-        <p:txBody>
-          <a:bodyPr>
-            <a:normAutofit fontScale="92500" lnSpcReduction="10000"/>
-          </a:bodyPr>
-          <a:lstStyle/>
-          <a:p>
-            <a:r>
-              <a:rPr lang="en-US" dirty="0"/>
-              <a:t>Created a dotnet core + react application using CLI scaffolding</a:t>
-            </a:r>
-          </a:p>
-          <a:p>
-            <a:r>
-              <a:rPr lang="en-US" dirty="0"/>
-              <a:t>Added it to GitHub</a:t>
-            </a:r>
-          </a:p>
-          <a:p>
-            <a:r>
-              <a:rPr lang="en-US" dirty="0"/>
-              <a:t>Added an automated build on </a:t>
-            </a:r>
-            <a:r>
-              <a:rPr lang="en-US" dirty="0" err="1"/>
-              <a:t>Appveyor</a:t>
-            </a:r>
-            <a:endParaRPr lang="en-US" dirty="0"/>
-          </a:p>
-          <a:p>
-            <a:r>
-              <a:rPr lang="en-US" dirty="0"/>
-              <a:t>Added code analysis and coverage</a:t>
-            </a:r>
-          </a:p>
-          <a:p>
-            <a:r>
-              <a:rPr lang="en-US" dirty="0"/>
-              <a:t>Publish code stats to </a:t>
-            </a:r>
-            <a:r>
-              <a:rPr lang="en-US" dirty="0" err="1"/>
-              <a:t>SonarCloud</a:t>
-            </a:r>
-            <a:r>
-              <a:rPr lang="en-US" dirty="0"/>
-              <a:t> and </a:t>
-            </a:r>
-            <a:r>
-              <a:rPr lang="en-US" dirty="0" err="1"/>
-              <a:t>CodeCov</a:t>
-            </a:r>
-            <a:endParaRPr lang="en-US" dirty="0"/>
-          </a:p>
-          <a:p>
-            <a:endParaRPr lang="en-US" dirty="0"/>
-          </a:p>
-          <a:p>
-            <a:r>
-              <a:rPr lang="en-US" dirty="0"/>
-              <a:t>Now it’s time to deploy to Azure!</a:t>
-            </a:r>
-          </a:p>
-        </p:txBody>
-      </p:sp>
-    </p:spTree>
-    <p:extLst>
-      <p:ext uri="{BB962C8B-B14F-4D97-AF65-F5344CB8AC3E}">
-        <p14:creationId xmlns:p14="http://schemas.microsoft.com/office/powerpoint/2010/main" val="3587398463"/>
-      </p:ext>
-    </p:extLst>
-  </p:cSld>
-  <p:clrMapOvr>
-    <a:masterClrMapping/>
-  </p:clrMapOvr>
-</p:sld>
-</file>
-
-<file path=ppt/slides/slide39.xml><?xml version="1.0" encoding="utf-8"?>
-<p:sld xmlns:a="http://schemas.openxmlformats.org/drawingml/2006/main" xmlns:r="http://schemas.openxmlformats.org/officeDocument/2006/relationships" xmlns:p="http://schemas.openxmlformats.org/presentationml/2006/main">
-  <p:cSld>
-    <p:spTree>
-      <p:nvGrpSpPr>
-        <p:cNvPr id="1" name=""/>
-        <p:cNvGrpSpPr/>
-        <p:nvPr/>
-      </p:nvGrpSpPr>
-      <p:grpSpPr>
-        <a:xfrm>
-          <a:off x="0" y="0"/>
-          <a:ext cx="0" cy="0"/>
-          <a:chOff x="0" y="0"/>
-          <a:chExt cx="0" cy="0"/>
-        </a:xfrm>
-      </p:grpSpPr>
-      <p:sp>
-        <p:nvSpPr>
-          <p:cNvPr id="2" name="Title 1">
-            <a:extLst>
-              <a:ext uri="{FF2B5EF4-FFF2-40B4-BE49-F238E27FC236}">
                 <a16:creationId xmlns:a16="http://schemas.microsoft.com/office/drawing/2014/main" id="{6EB3E90D-963F-44D8-AC19-D72B412555B7}"/>
               </a:ext>
             </a:extLst>
@@ -23375,133 +23238,7 @@
 </p:sld>
 </file>
 
-<file path=ppt/slides/slide4.xml><?xml version="1.0" encoding="utf-8"?>
-<p:sld xmlns:a="http://schemas.openxmlformats.org/drawingml/2006/main" xmlns:r="http://schemas.openxmlformats.org/officeDocument/2006/relationships" xmlns:p="http://schemas.openxmlformats.org/presentationml/2006/main">
-  <p:cSld>
-    <p:spTree>
-      <p:nvGrpSpPr>
-        <p:cNvPr id="1" name=""/>
-        <p:cNvGrpSpPr/>
-        <p:nvPr/>
-      </p:nvGrpSpPr>
-      <p:grpSpPr>
-        <a:xfrm>
-          <a:off x="0" y="0"/>
-          <a:ext cx="0" cy="0"/>
-          <a:chOff x="0" y="0"/>
-          <a:chExt cx="0" cy="0"/>
-        </a:xfrm>
-      </p:grpSpPr>
-      <p:sp>
-        <p:nvSpPr>
-          <p:cNvPr id="2" name="Title 1">
-            <a:extLst>
-              <a:ext uri="{FF2B5EF4-FFF2-40B4-BE49-F238E27FC236}">
-                <a16:creationId xmlns:a16="http://schemas.microsoft.com/office/drawing/2014/main" id="{6F66E270-0382-448C-9CF8-03F6AA1FBB2F}"/>
-              </a:ext>
-            </a:extLst>
-          </p:cNvPr>
-          <p:cNvSpPr>
-            <a:spLocks noGrp="1"/>
-          </p:cNvSpPr>
-          <p:nvPr>
-            <p:ph type="title"/>
-          </p:nvPr>
-        </p:nvSpPr>
-        <p:spPr/>
-        <p:txBody>
-          <a:bodyPr/>
-          <a:lstStyle/>
-          <a:p>
-            <a:r>
-              <a:rPr lang="en-US" dirty="0"/>
-              <a:t>Tools</a:t>
-            </a:r>
-          </a:p>
-        </p:txBody>
-      </p:sp>
-      <p:sp>
-        <p:nvSpPr>
-          <p:cNvPr id="3" name="Content Placeholder 2">
-            <a:extLst>
-              <a:ext uri="{FF2B5EF4-FFF2-40B4-BE49-F238E27FC236}">
-                <a16:creationId xmlns:a16="http://schemas.microsoft.com/office/drawing/2014/main" id="{7C757845-1A6C-47F3-8980-554692B6DF1B}"/>
-              </a:ext>
-            </a:extLst>
-          </p:cNvPr>
-          <p:cNvSpPr>
-            <a:spLocks noGrp="1"/>
-          </p:cNvSpPr>
-          <p:nvPr>
-            <p:ph idx="1"/>
-          </p:nvPr>
-        </p:nvSpPr>
-        <p:spPr/>
-        <p:txBody>
-          <a:bodyPr>
-            <a:normAutofit/>
-          </a:bodyPr>
-          <a:lstStyle/>
-          <a:p>
-            <a:pPr algn="just"/>
-            <a:r>
-              <a:rPr lang="en-US" dirty="0"/>
-              <a:t>An IDE: VS Code for this demo, but any IDE that supports C# and </a:t>
-            </a:r>
-            <a:r>
-              <a:rPr lang="en-US" dirty="0" err="1"/>
-              <a:t>nodeJS</a:t>
-            </a:r>
-            <a:endParaRPr lang="en-US" dirty="0"/>
-          </a:p>
-          <a:p>
-            <a:pPr algn="just"/>
-            <a:r>
-              <a:rPr lang="en-US" dirty="0"/>
-              <a:t>Git: I will use command line</a:t>
-            </a:r>
-          </a:p>
-          <a:p>
-            <a:pPr algn="just"/>
-            <a:r>
-              <a:rPr lang="en-US" dirty="0" err="1"/>
-              <a:t>NodeJs</a:t>
-            </a:r>
-            <a:r>
-              <a:rPr lang="en-US" dirty="0"/>
-              <a:t>: mostly for the build environment, version 8.x (other version might work)</a:t>
-            </a:r>
-          </a:p>
-          <a:p>
-            <a:pPr algn="just"/>
-            <a:r>
-              <a:rPr lang="en-US" dirty="0"/>
-              <a:t>Yarn (or NPM) 1.7.0 (also tested 1.5.1)</a:t>
-            </a:r>
-          </a:p>
-          <a:p>
-            <a:pPr algn="just"/>
-            <a:r>
-              <a:rPr lang="en-US" dirty="0"/>
-              <a:t>Dotnet core 2.1 (other version should work fine)</a:t>
-            </a:r>
-          </a:p>
-        </p:txBody>
-      </p:sp>
-    </p:spTree>
-    <p:extLst>
-      <p:ext uri="{BB962C8B-B14F-4D97-AF65-F5344CB8AC3E}">
-        <p14:creationId xmlns:p14="http://schemas.microsoft.com/office/powerpoint/2010/main" val="3068686399"/>
-      </p:ext>
-    </p:extLst>
-  </p:cSld>
-  <p:clrMapOvr>
-    <a:masterClrMapping/>
-  </p:clrMapOvr>
-</p:sld>
-</file>
-
-<file path=ppt/slides/slide40.xml><?xml version="1.0" encoding="utf-8"?>
+<file path=ppt/slides/slide39.xml><?xml version="1.0" encoding="utf-8"?>
 <p:sld xmlns:a="http://schemas.openxmlformats.org/drawingml/2006/main" xmlns:r="http://schemas.openxmlformats.org/officeDocument/2006/relationships" xmlns:p="http://schemas.openxmlformats.org/presentationml/2006/main">
   <p:cSld>
     <p:spTree>
@@ -23823,7 +23560,133 @@
 </p:sld>
 </file>
 
-<file path=ppt/slides/slide41.xml><?xml version="1.0" encoding="utf-8"?>
+<file path=ppt/slides/slide4.xml><?xml version="1.0" encoding="utf-8"?>
+<p:sld xmlns:a="http://schemas.openxmlformats.org/drawingml/2006/main" xmlns:r="http://schemas.openxmlformats.org/officeDocument/2006/relationships" xmlns:p="http://schemas.openxmlformats.org/presentationml/2006/main">
+  <p:cSld>
+    <p:spTree>
+      <p:nvGrpSpPr>
+        <p:cNvPr id="1" name=""/>
+        <p:cNvGrpSpPr/>
+        <p:nvPr/>
+      </p:nvGrpSpPr>
+      <p:grpSpPr>
+        <a:xfrm>
+          <a:off x="0" y="0"/>
+          <a:ext cx="0" cy="0"/>
+          <a:chOff x="0" y="0"/>
+          <a:chExt cx="0" cy="0"/>
+        </a:xfrm>
+      </p:grpSpPr>
+      <p:sp>
+        <p:nvSpPr>
+          <p:cNvPr id="2" name="Title 1">
+            <a:extLst>
+              <a:ext uri="{FF2B5EF4-FFF2-40B4-BE49-F238E27FC236}">
+                <a16:creationId xmlns:a16="http://schemas.microsoft.com/office/drawing/2014/main" id="{6F66E270-0382-448C-9CF8-03F6AA1FBB2F}"/>
+              </a:ext>
+            </a:extLst>
+          </p:cNvPr>
+          <p:cNvSpPr>
+            <a:spLocks noGrp="1"/>
+          </p:cNvSpPr>
+          <p:nvPr>
+            <p:ph type="title"/>
+          </p:nvPr>
+        </p:nvSpPr>
+        <p:spPr/>
+        <p:txBody>
+          <a:bodyPr/>
+          <a:lstStyle/>
+          <a:p>
+            <a:r>
+              <a:rPr lang="en-US" dirty="0"/>
+              <a:t>Tools</a:t>
+            </a:r>
+          </a:p>
+        </p:txBody>
+      </p:sp>
+      <p:sp>
+        <p:nvSpPr>
+          <p:cNvPr id="3" name="Content Placeholder 2">
+            <a:extLst>
+              <a:ext uri="{FF2B5EF4-FFF2-40B4-BE49-F238E27FC236}">
+                <a16:creationId xmlns:a16="http://schemas.microsoft.com/office/drawing/2014/main" id="{7C757845-1A6C-47F3-8980-554692B6DF1B}"/>
+              </a:ext>
+            </a:extLst>
+          </p:cNvPr>
+          <p:cNvSpPr>
+            <a:spLocks noGrp="1"/>
+          </p:cNvSpPr>
+          <p:nvPr>
+            <p:ph idx="1"/>
+          </p:nvPr>
+        </p:nvSpPr>
+        <p:spPr/>
+        <p:txBody>
+          <a:bodyPr>
+            <a:normAutofit/>
+          </a:bodyPr>
+          <a:lstStyle/>
+          <a:p>
+            <a:pPr algn="just"/>
+            <a:r>
+              <a:rPr lang="en-US" dirty="0"/>
+              <a:t>An IDE: VS Code for this demo, but any IDE that supports C# and </a:t>
+            </a:r>
+            <a:r>
+              <a:rPr lang="en-US" dirty="0" err="1"/>
+              <a:t>nodeJS</a:t>
+            </a:r>
+            <a:endParaRPr lang="en-US" dirty="0"/>
+          </a:p>
+          <a:p>
+            <a:pPr algn="just"/>
+            <a:r>
+              <a:rPr lang="en-US" dirty="0"/>
+              <a:t>Git: I will use command line</a:t>
+            </a:r>
+          </a:p>
+          <a:p>
+            <a:pPr algn="just"/>
+            <a:r>
+              <a:rPr lang="en-US" dirty="0" err="1"/>
+              <a:t>NodeJs</a:t>
+            </a:r>
+            <a:r>
+              <a:rPr lang="en-US" dirty="0"/>
+              <a:t>: mostly for the build environment, version 8.x (other version might work)</a:t>
+            </a:r>
+          </a:p>
+          <a:p>
+            <a:pPr algn="just"/>
+            <a:r>
+              <a:rPr lang="en-US" dirty="0"/>
+              <a:t>Yarn (or NPM) 1.7.0 (also tested 1.5.1)</a:t>
+            </a:r>
+          </a:p>
+          <a:p>
+            <a:pPr algn="just"/>
+            <a:r>
+              <a:rPr lang="en-US" dirty="0"/>
+              <a:t>Dotnet core 2.1 (other version should work fine)</a:t>
+            </a:r>
+          </a:p>
+        </p:txBody>
+      </p:sp>
+    </p:spTree>
+    <p:extLst>
+      <p:ext uri="{BB962C8B-B14F-4D97-AF65-F5344CB8AC3E}">
+        <p14:creationId xmlns:p14="http://schemas.microsoft.com/office/powerpoint/2010/main" val="3068686399"/>
+      </p:ext>
+    </p:extLst>
+  </p:cSld>
+  <p:clrMapOvr>
+    <a:masterClrMapping/>
+  </p:clrMapOvr>
+</p:sld>
+</file>
+
+<file path=ppt/slides/slide40.xml><?xml version="1.0" encoding="utf-8"?>
 <p:sld xmlns:a="http://schemas.openxmlformats.org/drawingml/2006/main" xmlns:r="http://schemas.openxmlformats.org/officeDocument/2006/relationships" xmlns:p="http://schemas.openxmlformats.org/presentationml/2006/main">
   <p:cSld>
     <p:spTree>
@@ -24264,7 +24127,7 @@
 </p:sld>
 </file>
 
-<file path=ppt/slides/slide42.xml><?xml version="1.0" encoding="utf-8"?>
+<file path=ppt/slides/slide41.xml><?xml version="1.0" encoding="utf-8"?>
 <p:sld xmlns:a="http://schemas.openxmlformats.org/drawingml/2006/main" xmlns:r="http://schemas.openxmlformats.org/officeDocument/2006/relationships" xmlns:p="http://schemas.openxmlformats.org/presentationml/2006/main">
   <p:cSld>
     <p:spTree>
@@ -24473,7 +24336,7 @@
 </p:sld>
 </file>
 
-<file path=ppt/slides/slide43.xml><?xml version="1.0" encoding="utf-8"?>
+<file path=ppt/slides/slide42.xml><?xml version="1.0" encoding="utf-8"?>
 <p:sld xmlns:a="http://schemas.openxmlformats.org/drawingml/2006/main" xmlns:r="http://schemas.openxmlformats.org/officeDocument/2006/relationships" xmlns:p="http://schemas.openxmlformats.org/presentationml/2006/main">
   <p:cSld>
     <p:spTree>
@@ -24943,7 +24806,7 @@
 </p:sld>
 </file>
 
-<file path=ppt/slides/slide44.xml><?xml version="1.0" encoding="utf-8"?>
+<file path=ppt/slides/slide43.xml><?xml version="1.0" encoding="utf-8"?>
 <p:sld xmlns:a="http://schemas.openxmlformats.org/drawingml/2006/main" xmlns:r="http://schemas.openxmlformats.org/officeDocument/2006/relationships" xmlns:p="http://schemas.openxmlformats.org/presentationml/2006/main">
   <p:cSld>
     <p:spTree>
@@ -25009,7 +24872,12 @@
             <p:ph idx="1"/>
           </p:nvPr>
         </p:nvSpPr>
-        <p:spPr/>
+        <p:spPr>
+          <a:xfrm>
+            <a:off x="1141413" y="2249487"/>
+            <a:ext cx="5871784" cy="3541714"/>
+          </a:xfrm>
+        </p:spPr>
         <p:txBody>
           <a:bodyPr/>
           <a:lstStyle/>
@@ -25017,6 +24885,27 @@
             <a:r>
               <a:rPr lang="en-US" dirty="0"/>
               <a:t>Encrypt the azure password you created</a:t>
+            </a:r>
+          </a:p>
+          <a:p>
+            <a:r>
+              <a:rPr lang="en-US" dirty="0"/>
+              <a:t>Don’t create a PR: </a:t>
+            </a:r>
+            <a:r>
+              <a:rPr lang="en-US" dirty="0" err="1"/>
+              <a:t>AppVeyor</a:t>
+            </a:r>
+            <a:r>
+              <a:rPr lang="en-US" dirty="0"/>
+              <a:t> doesn’t deploy on Pull Requests</a:t>
+            </a:r>
+          </a:p>
+          <a:p>
+            <a:pPr lvl="1"/>
+            <a:r>
+              <a:rPr lang="en-US" dirty="0"/>
+              <a:t>If you need to, there is a deployment setting you can use</a:t>
             </a:r>
           </a:p>
         </p:txBody>
@@ -25051,6 +24940,66 @@
           </a:prstGeom>
         </p:spPr>
       </p:pic>
+      <p:pic>
+        <p:nvPicPr>
+          <p:cNvPr id="5" name="Picture 4">
+            <a:extLst>
+              <a:ext uri="{FF2B5EF4-FFF2-40B4-BE49-F238E27FC236}">
+                <a16:creationId xmlns:a16="http://schemas.microsoft.com/office/drawing/2014/main" id="{83CC39DD-D032-4494-B6D7-EF459BD36782}"/>
+              </a:ext>
+            </a:extLst>
+          </p:cNvPr>
+          <p:cNvPicPr>
+            <a:picLocks noChangeAspect="1"/>
+          </p:cNvPicPr>
+          <p:nvPr/>
+        </p:nvPicPr>
+        <p:blipFill>
+          <a:blip r:embed="rId3"/>
+          <a:stretch>
+            <a:fillRect/>
+          </a:stretch>
+        </p:blipFill>
+        <p:spPr>
+          <a:xfrm>
+            <a:off x="1453495" y="1957571"/>
+            <a:ext cx="5247619" cy="2942857"/>
+          </a:xfrm>
+          <a:prstGeom prst="rect">
+            <a:avLst/>
+          </a:prstGeom>
+        </p:spPr>
+      </p:pic>
+      <p:pic>
+        <p:nvPicPr>
+          <p:cNvPr id="6" name="Picture 5">
+            <a:extLst>
+              <a:ext uri="{FF2B5EF4-FFF2-40B4-BE49-F238E27FC236}">
+                <a16:creationId xmlns:a16="http://schemas.microsoft.com/office/drawing/2014/main" id="{67B4F5D2-0C98-4402-92E6-F89971B0A130}"/>
+              </a:ext>
+            </a:extLst>
+          </p:cNvPr>
+          <p:cNvPicPr>
+            <a:picLocks noChangeAspect="1"/>
+          </p:cNvPicPr>
+          <p:nvPr/>
+        </p:nvPicPr>
+        <p:blipFill>
+          <a:blip r:embed="rId4"/>
+          <a:stretch>
+            <a:fillRect/>
+          </a:stretch>
+        </p:blipFill>
+        <p:spPr>
+          <a:xfrm>
+            <a:off x="2034095" y="276619"/>
+            <a:ext cx="8123809" cy="6304762"/>
+          </a:xfrm>
+          <a:prstGeom prst="rect">
+            <a:avLst/>
+          </a:prstGeom>
+        </p:spPr>
+      </p:pic>
     </p:spTree>
     <p:extLst>
       <p:ext uri="{BB962C8B-B14F-4D97-AF65-F5344CB8AC3E}">
@@ -25061,10 +25010,626 @@
   <p:clrMapOvr>
     <a:masterClrMapping/>
   </p:clrMapOvr>
+  <p:timing>
+    <p:tnLst>
+      <p:par>
+        <p:cTn id="1" dur="indefinite" restart="never" nodeType="tmRoot">
+          <p:childTnLst>
+            <p:seq concurrent="1" nextAc="seek">
+              <p:cTn id="2" dur="indefinite" nodeType="mainSeq">
+                <p:childTnLst>
+                  <p:par>
+                    <p:cTn id="3" fill="hold">
+                      <p:stCondLst>
+                        <p:cond delay="indefinite"/>
+                      </p:stCondLst>
+                      <p:childTnLst>
+                        <p:par>
+                          <p:cTn id="4" fill="hold">
+                            <p:stCondLst>
+                              <p:cond delay="0"/>
+                            </p:stCondLst>
+                            <p:childTnLst>
+                              <p:par>
+                                <p:cTn id="5" presetID="1" presetClass="entr" presetSubtype="0" fill="hold" nodeType="clickEffect">
+                                  <p:stCondLst>
+                                    <p:cond delay="0"/>
+                                  </p:stCondLst>
+                                  <p:childTnLst>
+                                    <p:set>
+                                      <p:cBhvr>
+                                        <p:cTn id="6" dur="1" fill="hold">
+                                          <p:stCondLst>
+                                            <p:cond delay="0"/>
+                                          </p:stCondLst>
+                                        </p:cTn>
+                                        <p:tgtEl>
+                                          <p:spTgt spid="5"/>
+                                        </p:tgtEl>
+                                        <p:attrNameLst>
+                                          <p:attrName>style.visibility</p:attrName>
+                                        </p:attrNameLst>
+                                      </p:cBhvr>
+                                      <p:to>
+                                        <p:strVal val="visible"/>
+                                      </p:to>
+                                    </p:set>
+                                  </p:childTnLst>
+                                </p:cTn>
+                              </p:par>
+                            </p:childTnLst>
+                          </p:cTn>
+                        </p:par>
+                      </p:childTnLst>
+                    </p:cTn>
+                  </p:par>
+                  <p:par>
+                    <p:cTn id="7" fill="hold">
+                      <p:stCondLst>
+                        <p:cond delay="indefinite"/>
+                      </p:stCondLst>
+                      <p:childTnLst>
+                        <p:par>
+                          <p:cTn id="8" fill="hold">
+                            <p:stCondLst>
+                              <p:cond delay="0"/>
+                            </p:stCondLst>
+                            <p:childTnLst>
+                              <p:par>
+                                <p:cTn id="9" presetID="1" presetClass="entr" presetSubtype="0" fill="hold" nodeType="clickEffect">
+                                  <p:stCondLst>
+                                    <p:cond delay="0"/>
+                                  </p:stCondLst>
+                                  <p:childTnLst>
+                                    <p:set>
+                                      <p:cBhvr>
+                                        <p:cTn id="10" dur="1" fill="hold">
+                                          <p:stCondLst>
+                                            <p:cond delay="0"/>
+                                          </p:stCondLst>
+                                        </p:cTn>
+                                        <p:tgtEl>
+                                          <p:spTgt spid="6"/>
+                                        </p:tgtEl>
+                                        <p:attrNameLst>
+                                          <p:attrName>style.visibility</p:attrName>
+                                        </p:attrNameLst>
+                                      </p:cBhvr>
+                                      <p:to>
+                                        <p:strVal val="visible"/>
+                                      </p:to>
+                                    </p:set>
+                                  </p:childTnLst>
+                                </p:cTn>
+                              </p:par>
+                              <p:par>
+                                <p:cTn id="11" presetID="1" presetClass="exit" presetSubtype="0" fill="hold" nodeType="withEffect">
+                                  <p:stCondLst>
+                                    <p:cond delay="0"/>
+                                  </p:stCondLst>
+                                  <p:childTnLst>
+                                    <p:set>
+                                      <p:cBhvr>
+                                        <p:cTn id="12" dur="1" fill="hold">
+                                          <p:stCondLst>
+                                            <p:cond delay="0"/>
+                                          </p:stCondLst>
+                                        </p:cTn>
+                                        <p:tgtEl>
+                                          <p:spTgt spid="5"/>
+                                        </p:tgtEl>
+                                        <p:attrNameLst>
+                                          <p:attrName>style.visibility</p:attrName>
+                                        </p:attrNameLst>
+                                      </p:cBhvr>
+                                      <p:to>
+                                        <p:strVal val="hidden"/>
+                                      </p:to>
+                                    </p:set>
+                                  </p:childTnLst>
+                                </p:cTn>
+                              </p:par>
+                              <p:par>
+                                <p:cTn id="13" presetID="1" presetClass="exit" presetSubtype="0" fill="hold" nodeType="withEffect">
+                                  <p:stCondLst>
+                                    <p:cond delay="0"/>
+                                  </p:stCondLst>
+                                  <p:childTnLst>
+                                    <p:set>
+                                      <p:cBhvr>
+                                        <p:cTn id="14" dur="1" fill="hold">
+                                          <p:stCondLst>
+                                            <p:cond delay="0"/>
+                                          </p:stCondLst>
+                                        </p:cTn>
+                                        <p:tgtEl>
+                                          <p:spTgt spid="4"/>
+                                        </p:tgtEl>
+                                        <p:attrNameLst>
+                                          <p:attrName>style.visibility</p:attrName>
+                                        </p:attrNameLst>
+                                      </p:cBhvr>
+                                      <p:to>
+                                        <p:strVal val="hidden"/>
+                                      </p:to>
+                                    </p:set>
+                                  </p:childTnLst>
+                                </p:cTn>
+                              </p:par>
+                            </p:childTnLst>
+                          </p:cTn>
+                        </p:par>
+                      </p:childTnLst>
+                    </p:cTn>
+                  </p:par>
+                </p:childTnLst>
+              </p:cTn>
+              <p:prevCondLst>
+                <p:cond evt="onPrev" delay="0">
+                  <p:tgtEl>
+                    <p:sldTgt/>
+                  </p:tgtEl>
+                </p:cond>
+              </p:prevCondLst>
+              <p:nextCondLst>
+                <p:cond evt="onNext" delay="0">
+                  <p:tgtEl>
+                    <p:sldTgt/>
+                  </p:tgtEl>
+                </p:cond>
+              </p:nextCondLst>
+            </p:seq>
+          </p:childTnLst>
+        </p:cTn>
+      </p:par>
+    </p:tnLst>
+  </p:timing>
+</p:sld>
+</file>
+
+<file path=ppt/slides/slide44.xml><?xml version="1.0" encoding="utf-8"?>
+<p:sld xmlns:a="http://schemas.openxmlformats.org/drawingml/2006/main" xmlns:r="http://schemas.openxmlformats.org/officeDocument/2006/relationships" xmlns:p="http://schemas.openxmlformats.org/presentationml/2006/main">
+  <p:cSld>
+    <p:spTree>
+      <p:nvGrpSpPr>
+        <p:cNvPr id="1" name=""/>
+        <p:cNvGrpSpPr/>
+        <p:nvPr/>
+      </p:nvGrpSpPr>
+      <p:grpSpPr>
+        <a:xfrm>
+          <a:off x="0" y="0"/>
+          <a:ext cx="0" cy="0"/>
+          <a:chOff x="0" y="0"/>
+          <a:chExt cx="0" cy="0"/>
+        </a:xfrm>
+      </p:grpSpPr>
+      <p:sp>
+        <p:nvSpPr>
+          <p:cNvPr id="2" name="Title 1">
+            <a:extLst>
+              <a:ext uri="{FF2B5EF4-FFF2-40B4-BE49-F238E27FC236}">
+                <a16:creationId xmlns:a16="http://schemas.microsoft.com/office/drawing/2014/main" id="{7EA085FF-E1EA-494E-8540-69B0A7D62243}"/>
+              </a:ext>
+            </a:extLst>
+          </p:cNvPr>
+          <p:cNvSpPr>
+            <a:spLocks noGrp="1"/>
+          </p:cNvSpPr>
+          <p:nvPr>
+            <p:ph type="title"/>
+          </p:nvPr>
+        </p:nvSpPr>
+        <p:spPr/>
+        <p:txBody>
+          <a:bodyPr/>
+          <a:lstStyle/>
+          <a:p>
+            <a:r>
+              <a:rPr lang="en-US" dirty="0"/>
+              <a:t>Let’s see our application</a:t>
+            </a:r>
+          </a:p>
+        </p:txBody>
+      </p:sp>
+      <p:pic>
+        <p:nvPicPr>
+          <p:cNvPr id="4" name="Picture 3">
+            <a:extLst>
+              <a:ext uri="{FF2B5EF4-FFF2-40B4-BE49-F238E27FC236}">
+                <a16:creationId xmlns:a16="http://schemas.microsoft.com/office/drawing/2014/main" id="{B11F82AA-CC70-403A-8063-EA42C797D8F2}"/>
+              </a:ext>
+            </a:extLst>
+          </p:cNvPr>
+          <p:cNvPicPr>
+            <a:picLocks noChangeAspect="1"/>
+          </p:cNvPicPr>
+          <p:nvPr/>
+        </p:nvPicPr>
+        <p:blipFill>
+          <a:blip r:embed="rId2"/>
+          <a:stretch>
+            <a:fillRect/>
+          </a:stretch>
+        </p:blipFill>
+        <p:spPr>
+          <a:xfrm>
+            <a:off x="1829333" y="2200428"/>
+            <a:ext cx="8533333" cy="2457143"/>
+          </a:xfrm>
+          <a:prstGeom prst="rect">
+            <a:avLst/>
+          </a:prstGeom>
+        </p:spPr>
+      </p:pic>
+      <p:pic>
+        <p:nvPicPr>
+          <p:cNvPr id="5" name="Picture 4">
+            <a:extLst>
+              <a:ext uri="{FF2B5EF4-FFF2-40B4-BE49-F238E27FC236}">
+                <a16:creationId xmlns:a16="http://schemas.microsoft.com/office/drawing/2014/main" id="{208246D0-BB98-44D3-BD1A-1D26AC489E31}"/>
+              </a:ext>
+            </a:extLst>
+          </p:cNvPr>
+          <p:cNvPicPr>
+            <a:picLocks noChangeAspect="1"/>
+          </p:cNvPicPr>
+          <p:nvPr/>
+        </p:nvPicPr>
+        <p:blipFill>
+          <a:blip r:embed="rId3"/>
+          <a:stretch>
+            <a:fillRect/>
+          </a:stretch>
+        </p:blipFill>
+        <p:spPr>
+          <a:xfrm>
+            <a:off x="1205524" y="924238"/>
+            <a:ext cx="9780952" cy="5009524"/>
+          </a:xfrm>
+          <a:prstGeom prst="rect">
+            <a:avLst/>
+          </a:prstGeom>
+        </p:spPr>
+      </p:pic>
+    </p:spTree>
+    <p:extLst>
+      <p:ext uri="{BB962C8B-B14F-4D97-AF65-F5344CB8AC3E}">
+        <p14:creationId xmlns:p14="http://schemas.microsoft.com/office/powerpoint/2010/main" val="3886905502"/>
+      </p:ext>
+    </p:extLst>
+  </p:cSld>
+  <p:clrMapOvr>
+    <a:masterClrMapping/>
+  </p:clrMapOvr>
+  <p:timing>
+    <p:tnLst>
+      <p:par>
+        <p:cTn id="1" dur="indefinite" restart="never" nodeType="tmRoot">
+          <p:childTnLst>
+            <p:seq concurrent="1" nextAc="seek">
+              <p:cTn id="2" dur="indefinite" nodeType="mainSeq">
+                <p:childTnLst>
+                  <p:par>
+                    <p:cTn id="3" fill="hold">
+                      <p:stCondLst>
+                        <p:cond delay="indefinite"/>
+                      </p:stCondLst>
+                      <p:childTnLst>
+                        <p:par>
+                          <p:cTn id="4" fill="hold">
+                            <p:stCondLst>
+                              <p:cond delay="0"/>
+                            </p:stCondLst>
+                            <p:childTnLst>
+                              <p:par>
+                                <p:cTn id="5" presetID="1" presetClass="entr" presetSubtype="0" fill="hold" nodeType="clickEffect">
+                                  <p:stCondLst>
+                                    <p:cond delay="0"/>
+                                  </p:stCondLst>
+                                  <p:childTnLst>
+                                    <p:set>
+                                      <p:cBhvr>
+                                        <p:cTn id="6" dur="1" fill="hold">
+                                          <p:stCondLst>
+                                            <p:cond delay="0"/>
+                                          </p:stCondLst>
+                                        </p:cTn>
+                                        <p:tgtEl>
+                                          <p:spTgt spid="5"/>
+                                        </p:tgtEl>
+                                        <p:attrNameLst>
+                                          <p:attrName>style.visibility</p:attrName>
+                                        </p:attrNameLst>
+                                      </p:cBhvr>
+                                      <p:to>
+                                        <p:strVal val="visible"/>
+                                      </p:to>
+                                    </p:set>
+                                  </p:childTnLst>
+                                </p:cTn>
+                              </p:par>
+                            </p:childTnLst>
+                          </p:cTn>
+                        </p:par>
+                      </p:childTnLst>
+                    </p:cTn>
+                  </p:par>
+                </p:childTnLst>
+              </p:cTn>
+              <p:prevCondLst>
+                <p:cond evt="onPrev" delay="0">
+                  <p:tgtEl>
+                    <p:sldTgt/>
+                  </p:tgtEl>
+                </p:cond>
+              </p:prevCondLst>
+              <p:nextCondLst>
+                <p:cond evt="onNext" delay="0">
+                  <p:tgtEl>
+                    <p:sldTgt/>
+                  </p:tgtEl>
+                </p:cond>
+              </p:nextCondLst>
+            </p:seq>
+          </p:childTnLst>
+        </p:cTn>
+      </p:par>
+    </p:tnLst>
+  </p:timing>
 </p:sld>
 </file>
 
 <file path=ppt/slides/slide45.xml><?xml version="1.0" encoding="utf-8"?>
+<p:sld xmlns:a="http://schemas.openxmlformats.org/drawingml/2006/main" xmlns:r="http://schemas.openxmlformats.org/officeDocument/2006/relationships" xmlns:p="http://schemas.openxmlformats.org/presentationml/2006/main">
+  <p:cSld>
+    <p:spTree>
+      <p:nvGrpSpPr>
+        <p:cNvPr id="1" name=""/>
+        <p:cNvGrpSpPr/>
+        <p:nvPr/>
+      </p:nvGrpSpPr>
+      <p:grpSpPr>
+        <a:xfrm>
+          <a:off x="0" y="0"/>
+          <a:ext cx="0" cy="0"/>
+          <a:chOff x="0" y="0"/>
+          <a:chExt cx="0" cy="0"/>
+        </a:xfrm>
+      </p:grpSpPr>
+      <p:sp>
+        <p:nvSpPr>
+          <p:cNvPr id="2" name="Title 1">
+            <a:extLst>
+              <a:ext uri="{FF2B5EF4-FFF2-40B4-BE49-F238E27FC236}">
+                <a16:creationId xmlns:a16="http://schemas.microsoft.com/office/drawing/2014/main" id="{861F233C-B236-4522-8293-96B783558169}"/>
+              </a:ext>
+            </a:extLst>
+          </p:cNvPr>
+          <p:cNvSpPr>
+            <a:spLocks noGrp="1"/>
+          </p:cNvSpPr>
+          <p:nvPr>
+            <p:ph type="title"/>
+          </p:nvPr>
+        </p:nvSpPr>
+        <p:spPr/>
+        <p:txBody>
+          <a:bodyPr/>
+          <a:lstStyle/>
+          <a:p>
+            <a:r>
+              <a:rPr lang="en-US" dirty="0"/>
+              <a:t>Recap</a:t>
+            </a:r>
+          </a:p>
+        </p:txBody>
+      </p:sp>
+      <p:sp>
+        <p:nvSpPr>
+          <p:cNvPr id="3" name="Content Placeholder 2">
+            <a:extLst>
+              <a:ext uri="{FF2B5EF4-FFF2-40B4-BE49-F238E27FC236}">
+                <a16:creationId xmlns:a16="http://schemas.microsoft.com/office/drawing/2014/main" id="{745F733C-B22D-40C0-9DCF-A0B4081FE954}"/>
+              </a:ext>
+            </a:extLst>
+          </p:cNvPr>
+          <p:cNvSpPr>
+            <a:spLocks noGrp="1"/>
+          </p:cNvSpPr>
+          <p:nvPr>
+            <p:ph idx="1"/>
+          </p:nvPr>
+        </p:nvSpPr>
+        <p:spPr>
+          <a:xfrm>
+            <a:off x="1141412" y="2249486"/>
+            <a:ext cx="9905999" cy="4218425"/>
+          </a:xfrm>
+        </p:spPr>
+        <p:txBody>
+          <a:bodyPr>
+            <a:normAutofit/>
+          </a:bodyPr>
+          <a:lstStyle/>
+          <a:p>
+            <a:r>
+              <a:rPr lang="en-US" dirty="0"/>
+              <a:t>Created a dotnet core + react application using CLI scaffolding</a:t>
+            </a:r>
+          </a:p>
+          <a:p>
+            <a:r>
+              <a:rPr lang="en-US" dirty="0"/>
+              <a:t>Added it to GitHub</a:t>
+            </a:r>
+          </a:p>
+          <a:p>
+            <a:r>
+              <a:rPr lang="en-US" dirty="0"/>
+              <a:t>Added an automated build on </a:t>
+            </a:r>
+            <a:r>
+              <a:rPr lang="en-US" dirty="0" err="1"/>
+              <a:t>Appveyor</a:t>
+            </a:r>
+            <a:endParaRPr lang="en-US" dirty="0"/>
+          </a:p>
+          <a:p>
+            <a:r>
+              <a:rPr lang="en-US" dirty="0"/>
+              <a:t>Added code analysis and coverage</a:t>
+            </a:r>
+          </a:p>
+          <a:p>
+            <a:r>
+              <a:rPr lang="en-US" dirty="0"/>
+              <a:t>Published code stats to </a:t>
+            </a:r>
+            <a:r>
+              <a:rPr lang="en-US" dirty="0" err="1"/>
+              <a:t>SonarCloud</a:t>
+            </a:r>
+            <a:r>
+              <a:rPr lang="en-US" dirty="0"/>
+              <a:t> and </a:t>
+            </a:r>
+            <a:r>
+              <a:rPr lang="en-US" dirty="0" err="1"/>
+              <a:t>CodeCov</a:t>
+            </a:r>
+            <a:endParaRPr lang="en-US" dirty="0"/>
+          </a:p>
+          <a:p>
+            <a:r>
+              <a:rPr lang="en-US" dirty="0"/>
+              <a:t>Created a free tier environment in Azure</a:t>
+            </a:r>
+          </a:p>
+          <a:p>
+            <a:r>
+              <a:rPr lang="en-US" dirty="0"/>
+              <a:t>Deployed to Azure!</a:t>
+            </a:r>
+          </a:p>
+        </p:txBody>
+      </p:sp>
+    </p:spTree>
+    <p:extLst>
+      <p:ext uri="{BB962C8B-B14F-4D97-AF65-F5344CB8AC3E}">
+        <p14:creationId xmlns:p14="http://schemas.microsoft.com/office/powerpoint/2010/main" val="3587398463"/>
+      </p:ext>
+    </p:extLst>
+  </p:cSld>
+  <p:clrMapOvr>
+    <a:masterClrMapping/>
+  </p:clrMapOvr>
+</p:sld>
+</file>
+
+<file path=ppt/slides/slide46.xml><?xml version="1.0" encoding="utf-8"?>
+<p:sld xmlns:a="http://schemas.openxmlformats.org/drawingml/2006/main" xmlns:r="http://schemas.openxmlformats.org/officeDocument/2006/relationships" xmlns:p="http://schemas.openxmlformats.org/presentationml/2006/main">
+  <p:cSld>
+    <p:spTree>
+      <p:nvGrpSpPr>
+        <p:cNvPr id="1" name=""/>
+        <p:cNvGrpSpPr/>
+        <p:nvPr/>
+      </p:nvGrpSpPr>
+      <p:grpSpPr>
+        <a:xfrm>
+          <a:off x="0" y="0"/>
+          <a:ext cx="0" cy="0"/>
+          <a:chOff x="0" y="0"/>
+          <a:chExt cx="0" cy="0"/>
+        </a:xfrm>
+      </p:grpSpPr>
+      <p:sp>
+        <p:nvSpPr>
+          <p:cNvPr id="2" name="Title 1">
+            <a:extLst>
+              <a:ext uri="{FF2B5EF4-FFF2-40B4-BE49-F238E27FC236}">
+                <a16:creationId xmlns:a16="http://schemas.microsoft.com/office/drawing/2014/main" id="{F89F409D-4785-4A2E-9CC5-9D4190260EC9}"/>
+              </a:ext>
+            </a:extLst>
+          </p:cNvPr>
+          <p:cNvSpPr>
+            <a:spLocks noGrp="1"/>
+          </p:cNvSpPr>
+          <p:nvPr>
+            <p:ph type="title"/>
+          </p:nvPr>
+        </p:nvSpPr>
+        <p:spPr/>
+        <p:txBody>
+          <a:bodyPr/>
+          <a:lstStyle/>
+          <a:p>
+            <a:r>
+              <a:rPr lang="en-US" dirty="0"/>
+              <a:t>Thank You</a:t>
+            </a:r>
+          </a:p>
+        </p:txBody>
+      </p:sp>
+      <p:sp>
+        <p:nvSpPr>
+          <p:cNvPr id="3" name="Content Placeholder 2">
+            <a:extLst>
+              <a:ext uri="{FF2B5EF4-FFF2-40B4-BE49-F238E27FC236}">
+                <a16:creationId xmlns:a16="http://schemas.microsoft.com/office/drawing/2014/main" id="{AB55BA0C-E018-44FD-A8D7-04A83AFC621C}"/>
+              </a:ext>
+            </a:extLst>
+          </p:cNvPr>
+          <p:cNvSpPr>
+            <a:spLocks noGrp="1"/>
+          </p:cNvSpPr>
+          <p:nvPr>
+            <p:ph idx="1"/>
+          </p:nvPr>
+        </p:nvSpPr>
+        <p:spPr/>
+        <p:txBody>
+          <a:bodyPr/>
+          <a:lstStyle/>
+          <a:p>
+            <a:r>
+              <a:rPr lang="en-US" dirty="0"/>
+              <a:t>Questions and Answers?</a:t>
+            </a:r>
+          </a:p>
+          <a:p>
+            <a:r>
+              <a:rPr lang="en-US" dirty="0"/>
+              <a:t>Agoda is hiring: </a:t>
+            </a:r>
+            <a:r>
+              <a:rPr lang="en-US" dirty="0">
+                <a:hlinkClick r:id="rId2"/>
+              </a:rPr>
+              <a:t>https://careersatagoda.com/departments/technology/</a:t>
+            </a:r>
+            <a:r>
+              <a:rPr lang="en-US" dirty="0"/>
+              <a:t> </a:t>
+            </a:r>
+          </a:p>
+        </p:txBody>
+      </p:sp>
+    </p:spTree>
+    <p:extLst>
+      <p:ext uri="{BB962C8B-B14F-4D97-AF65-F5344CB8AC3E}">
+        <p14:creationId xmlns:p14="http://schemas.microsoft.com/office/powerpoint/2010/main" val="3682157663"/>
+      </p:ext>
+    </p:extLst>
+  </p:cSld>
+  <p:clrMapOvr>
+    <a:masterClrMapping/>
+  </p:clrMapOvr>
+</p:sld>
+</file>
+
+<file path=ppt/slides/slide47.xml><?xml version="1.0" encoding="utf-8"?>
 <p:sld xmlns:a="http://schemas.openxmlformats.org/drawingml/2006/main" xmlns:r="http://schemas.openxmlformats.org/officeDocument/2006/relationships" xmlns:p="http://schemas.openxmlformats.org/presentationml/2006/main">
   <p:cSld>
     <p:spTree>

</xml_diff>